<commit_message>
20/10/21 Fixed Build Issues
</commit_message>
<xml_diff>
--- a/TJCPowerPoint/Resources/ServiceWidescreen.pptx
+++ b/TJCPowerPoint/Resources/ServiceWidescreen.pptx
@@ -5397,6 +5397,108 @@
       </p:grpSpPr>
       <p:sp>
         <p:nvSpPr>
+          <p:cNvPr id="7" name="Text Box 12">
+            <a:extLst>
+              <a:ext uri="{FF2B5EF4-FFF2-40B4-BE49-F238E27FC236}">
+                <a16:creationId xmlns:a16="http://schemas.microsoft.com/office/drawing/2014/main" id="{4A814393-22EC-4030-B099-593A4A5B942E}"/>
+              </a:ext>
+            </a:extLst>
+          </p:cNvPr>
+          <p:cNvSpPr txBox="1">
+            <a:spLocks noChangeArrowheads="1"/>
+          </p:cNvSpPr>
+          <p:nvPr/>
+        </p:nvSpPr>
+        <p:spPr bwMode="auto">
+          <a:xfrm>
+            <a:off x="1871470" y="116632"/>
+            <a:ext cx="8449060" cy="648072"/>
+          </a:xfrm>
+          <a:prstGeom prst="rect">
+            <a:avLst/>
+          </a:prstGeom>
+          <a:noFill/>
+          <a:ln>
+            <a:noFill/>
+          </a:ln>
+          <a:effectLst/>
+          <a:extLst>
+            <a:ext uri="{909E8E84-426E-40DD-AFC4-6F175D3DCCD1}">
+              <a14:hiddenFill xmlns:a14="http://schemas.microsoft.com/office/drawing/2010/main">
+                <a:solidFill>
+                  <a:schemeClr val="accent1"/>
+                </a:solidFill>
+              </a14:hiddenFill>
+            </a:ext>
+            <a:ext uri="{91240B29-F687-4F45-9708-019B960494DF}">
+              <a14:hiddenLine xmlns:a14="http://schemas.microsoft.com/office/drawing/2010/main" w="9525">
+                <a:solidFill>
+                  <a:schemeClr val="tx1"/>
+                </a:solidFill>
+                <a:miter lim="800000"/>
+                <a:headEnd/>
+                <a:tailEnd/>
+              </a14:hiddenLine>
+            </a:ext>
+            <a:ext uri="{AF507438-7753-43E0-B8FC-AC1667EBCBE1}">
+              <a14:hiddenEffects xmlns:a14="http://schemas.microsoft.com/office/drawing/2010/main">
+                <a:effectLst>
+                  <a:outerShdw dist="35921" dir="2700000" algn="ctr" rotWithShape="0">
+                    <a:schemeClr val="bg2"/>
+                  </a:outerShdw>
+                </a:effectLst>
+              </a14:hiddenEffects>
+            </a:ext>
+          </a:extLst>
+        </p:spPr>
+        <p:txBody>
+          <a:bodyPr wrap="square">
+            <a:noAutofit/>
+          </a:bodyPr>
+          <a:lstStyle/>
+          <a:p>
+            <a:pPr algn="ctr"/>
+            <a:r>
+              <a:rPr lang="en-GB" altLang="en-US" sz="3200" b="1" u="sng" dirty="0">
+                <a:solidFill>
+                  <a:schemeClr val="bg1"/>
+                </a:solidFill>
+                <a:latin typeface="Century Gothic" panose="020B0502020202020204" pitchFamily="34" charset="0"/>
+              </a:rPr>
+              <a:t>Prayer Requests</a:t>
+            </a:r>
+            <a:r>
+              <a:rPr lang="en-GB" altLang="en-US" sz="3200" b="1" u="sng" dirty="0">
+                <a:solidFill>
+                  <a:schemeClr val="bg1"/>
+                </a:solidFill>
+                <a:latin typeface="Century Gothic" panose="020B0502020202020204" pitchFamily="34" charset="0"/>
+                <a:ea typeface="金梅新中楷全字體" panose="02010509060101010101" pitchFamily="49" charset="-120"/>
+              </a:rPr>
+              <a:t>- </a:t>
+            </a:r>
+            <a:r>
+              <a:rPr lang="zh-TW" altLang="en-US" sz="3200" b="1" u="sng" dirty="0">
+                <a:solidFill>
+                  <a:schemeClr val="bg1"/>
+                </a:solidFill>
+                <a:latin typeface="Century Gothic" panose="020B0502020202020204" pitchFamily="34" charset="0"/>
+                <a:ea typeface="金梅新中楷全字體" panose="02010509060101010101" pitchFamily="49" charset="-120"/>
+              </a:rPr>
+              <a:t>代禱</a:t>
+            </a:r>
+            <a:endParaRPr lang="en-GB" altLang="zh-TW" sz="3200" b="1" u="sng" dirty="0">
+              <a:solidFill>
+                <a:schemeClr val="bg1"/>
+              </a:solidFill>
+              <a:latin typeface="Century Gothic" panose="020B0502020202020204" pitchFamily="34" charset="0"/>
+              <a:ea typeface="金梅新中楷全字體" panose="02010509060101010101" pitchFamily="49" charset="-120"/>
+            </a:endParaRPr>
+          </a:p>
+        </p:txBody>
+      </p:sp>
+      <p:sp>
+        <p:nvSpPr>
           <p:cNvPr id="8" name="Title 1">
             <a:extLst>
               <a:ext uri="{FF2B5EF4-FFF2-40B4-BE49-F238E27FC236}">
@@ -5442,6 +5544,216 @@
           </a:p>
         </p:txBody>
       </p:sp>
+      <p:sp>
+        <p:nvSpPr>
+          <p:cNvPr id="9" name="Text Box 11">
+            <a:extLst>
+              <a:ext uri="{FF2B5EF4-FFF2-40B4-BE49-F238E27FC236}">
+                <a16:creationId xmlns:a16="http://schemas.microsoft.com/office/drawing/2014/main" id="{A5F6359B-EDA7-4B4D-903A-22796AF5B2D4}"/>
+              </a:ext>
+            </a:extLst>
+          </p:cNvPr>
+          <p:cNvSpPr txBox="1">
+            <a:spLocks noChangeArrowheads="1"/>
+          </p:cNvSpPr>
+          <p:nvPr/>
+        </p:nvSpPr>
+        <p:spPr bwMode="auto">
+          <a:xfrm>
+            <a:off x="767482" y="6165304"/>
+            <a:ext cx="2736156" cy="338554"/>
+          </a:xfrm>
+          <a:prstGeom prst="rect">
+            <a:avLst/>
+          </a:prstGeom>
+          <a:noFill/>
+          <a:ln>
+            <a:noFill/>
+          </a:ln>
+          <a:effectLst/>
+          <a:extLst>
+            <a:ext uri="{909E8E84-426E-40DD-AFC4-6F175D3DCCD1}">
+              <a14:hiddenFill xmlns:a14="http://schemas.microsoft.com/office/drawing/2010/main">
+                <a:solidFill>
+                  <a:schemeClr val="accent1"/>
+                </a:solidFill>
+              </a14:hiddenFill>
+            </a:ext>
+            <a:ext uri="{91240B29-F687-4F45-9708-019B960494DF}">
+              <a14:hiddenLine xmlns:a14="http://schemas.microsoft.com/office/drawing/2010/main" w="9525">
+                <a:solidFill>
+                  <a:schemeClr val="tx1"/>
+                </a:solidFill>
+                <a:miter lim="800000"/>
+                <a:headEnd/>
+                <a:tailEnd/>
+              </a14:hiddenLine>
+            </a:ext>
+            <a:ext uri="{AF507438-7753-43E0-B8FC-AC1667EBCBE1}">
+              <a14:hiddenEffects xmlns:a14="http://schemas.microsoft.com/office/drawing/2010/main">
+                <a:effectLst>
+                  <a:outerShdw dist="35921" dir="2700000" algn="ctr" rotWithShape="0">
+                    <a:schemeClr val="bg2"/>
+                  </a:outerShdw>
+                </a:effectLst>
+              </a14:hiddenEffects>
+            </a:ext>
+          </a:extLst>
+        </p:spPr>
+        <p:txBody>
+          <a:bodyPr wrap="square">
+            <a:spAutoFit/>
+          </a:bodyPr>
+          <a:lstStyle/>
+          <a:p>
+            <a:pPr>
+              <a:spcBef>
+                <a:spcPct val="50000"/>
+              </a:spcBef>
+            </a:pPr>
+            <a:r>
+              <a:rPr lang="en-US" altLang="en-US" sz="1600" dirty="0">
+                <a:solidFill>
+                  <a:schemeClr val="bg1"/>
+                </a:solidFill>
+                <a:latin typeface="Century Gothic" panose="020B0502020202020204" pitchFamily="34" charset="0"/>
+                <a:ea typeface="金梅新中楷全字體" panose="02010509060101010101" pitchFamily="49" charset="-120"/>
+              </a:rPr>
+              <a:t>請 關 您 的 手 提 電 話 </a:t>
+            </a:r>
+          </a:p>
+        </p:txBody>
+      </p:sp>
+      <p:sp>
+        <p:nvSpPr>
+          <p:cNvPr id="10" name="Text Box 12">
+            <a:extLst>
+              <a:ext uri="{FF2B5EF4-FFF2-40B4-BE49-F238E27FC236}">
+                <a16:creationId xmlns:a16="http://schemas.microsoft.com/office/drawing/2014/main" id="{4F2342DD-2BD5-48A1-AD38-7EE43180200F}"/>
+              </a:ext>
+            </a:extLst>
+          </p:cNvPr>
+          <p:cNvSpPr txBox="1">
+            <a:spLocks noChangeArrowheads="1"/>
+          </p:cNvSpPr>
+          <p:nvPr/>
+        </p:nvSpPr>
+        <p:spPr bwMode="auto">
+          <a:xfrm>
+            <a:off x="767482" y="6427242"/>
+            <a:ext cx="3672334" cy="276999"/>
+          </a:xfrm>
+          <a:prstGeom prst="rect">
+            <a:avLst/>
+          </a:prstGeom>
+          <a:noFill/>
+          <a:ln>
+            <a:noFill/>
+          </a:ln>
+          <a:effectLst/>
+          <a:extLst>
+            <a:ext uri="{909E8E84-426E-40DD-AFC4-6F175D3DCCD1}">
+              <a14:hiddenFill xmlns:a14="http://schemas.microsoft.com/office/drawing/2010/main">
+                <a:solidFill>
+                  <a:schemeClr val="accent1"/>
+                </a:solidFill>
+              </a14:hiddenFill>
+            </a:ext>
+            <a:ext uri="{91240B29-F687-4F45-9708-019B960494DF}">
+              <a14:hiddenLine xmlns:a14="http://schemas.microsoft.com/office/drawing/2010/main" w="9525">
+                <a:solidFill>
+                  <a:schemeClr val="tx1"/>
+                </a:solidFill>
+                <a:miter lim="800000"/>
+                <a:headEnd/>
+                <a:tailEnd/>
+              </a14:hiddenLine>
+            </a:ext>
+            <a:ext uri="{AF507438-7753-43E0-B8FC-AC1667EBCBE1}">
+              <a14:hiddenEffects xmlns:a14="http://schemas.microsoft.com/office/drawing/2010/main">
+                <a:effectLst>
+                  <a:outerShdw dist="35921" dir="2700000" algn="ctr" rotWithShape="0">
+                    <a:schemeClr val="bg2"/>
+                  </a:outerShdw>
+                </a:effectLst>
+              </a14:hiddenEffects>
+            </a:ext>
+          </a:extLst>
+        </p:spPr>
+        <p:txBody>
+          <a:bodyPr wrap="square">
+            <a:spAutoFit/>
+          </a:bodyPr>
+          <a:lstStyle/>
+          <a:p>
+            <a:pPr>
+              <a:spcBef>
+                <a:spcPct val="50000"/>
+              </a:spcBef>
+            </a:pPr>
+            <a:r>
+              <a:rPr lang="en-GB" altLang="en-US" sz="1200" b="1" dirty="0">
+                <a:solidFill>
+                  <a:schemeClr val="bg1"/>
+                </a:solidFill>
+                <a:latin typeface="Century Gothic" panose="020B0502020202020204" pitchFamily="34" charset="0"/>
+              </a:rPr>
+              <a:t>PLEASE SWITCH OFF YOUR MOBILE PHONE</a:t>
+            </a:r>
+            <a:endParaRPr lang="en-US" altLang="en-US" sz="1200" b="1" dirty="0">
+              <a:solidFill>
+                <a:schemeClr val="bg1"/>
+              </a:solidFill>
+              <a:latin typeface="Century Gothic" panose="020B0502020202020204" pitchFamily="34" charset="0"/>
+            </a:endParaRPr>
+          </a:p>
+        </p:txBody>
+      </p:sp>
+      <p:pic>
+        <p:nvPicPr>
+          <p:cNvPr id="11" name="Picture 2" descr="Custom No Mobile Phones Sign | The Sign Shed">
+            <a:extLst>
+              <a:ext uri="{FF2B5EF4-FFF2-40B4-BE49-F238E27FC236}">
+                <a16:creationId xmlns:a16="http://schemas.microsoft.com/office/drawing/2014/main" id="{69B74F00-D138-4D1A-BB3A-FF6169EDC215}"/>
+              </a:ext>
+            </a:extLst>
+          </p:cNvPr>
+          <p:cNvPicPr>
+            <a:picLocks noChangeAspect="1" noChangeArrowheads="1"/>
+          </p:cNvPicPr>
+          <p:nvPr/>
+        </p:nvPicPr>
+        <p:blipFill rotWithShape="1">
+          <a:blip r:embed="rId2" cstate="print">
+            <a:extLst>
+              <a:ext uri="{28A0092B-C50C-407E-A947-70E740481C1C}">
+                <a14:useLocalDpi xmlns:a14="http://schemas.microsoft.com/office/drawing/2010/main" val="0"/>
+              </a:ext>
+            </a:extLst>
+          </a:blip>
+          <a:srcRect l="3327" t="11250" r="71169" b="12911"/>
+          <a:stretch/>
+        </p:blipFill>
+        <p:spPr bwMode="auto">
+          <a:xfrm>
+            <a:off x="335360" y="6202015"/>
+            <a:ext cx="432048" cy="432048"/>
+          </a:xfrm>
+          <a:prstGeom prst="rect">
+            <a:avLst/>
+          </a:prstGeom>
+          <a:noFill/>
+          <a:extLst>
+            <a:ext uri="{909E8E84-426E-40DD-AFC4-6F175D3DCCD1}">
+              <a14:hiddenFill xmlns:a14="http://schemas.microsoft.com/office/drawing/2010/main">
+                <a:solidFill>
+                  <a:srgbClr val="FFFFFF"/>
+                </a:solidFill>
+              </a14:hiddenFill>
+            </a:ext>
+          </a:extLst>
+        </p:spPr>
+      </p:pic>
       <p:pic>
         <p:nvPicPr>
           <p:cNvPr id="1026" name="Picture 2">
@@ -5457,7 +5769,7 @@
           <p:nvPr/>
         </p:nvPicPr>
         <p:blipFill>
-          <a:blip r:embed="rId2">
+          <a:blip r:embed="rId3">
             <a:extLst>
               <a:ext uri="{28A0092B-C50C-407E-A947-70E740481C1C}">
                 <a14:useLocalDpi xmlns:a14="http://schemas.microsoft.com/office/drawing/2010/main" val="0"/>

</xml_diff>

<commit_message>
Revert "20/10/21 Fixed Build Issues"
This reverts commit 88dbb959aba51a5ee37aaa43414b3c07b0da9a12.
</commit_message>
<xml_diff>
--- a/TJCPowerPoint/Resources/ServiceWidescreen.pptx
+++ b/TJCPowerPoint/Resources/ServiceWidescreen.pptx
@@ -5397,108 +5397,6 @@
       </p:grpSpPr>
       <p:sp>
         <p:nvSpPr>
-          <p:cNvPr id="7" name="Text Box 12">
-            <a:extLst>
-              <a:ext uri="{FF2B5EF4-FFF2-40B4-BE49-F238E27FC236}">
-                <a16:creationId xmlns:a16="http://schemas.microsoft.com/office/drawing/2014/main" id="{4A814393-22EC-4030-B099-593A4A5B942E}"/>
-              </a:ext>
-            </a:extLst>
-          </p:cNvPr>
-          <p:cNvSpPr txBox="1">
-            <a:spLocks noChangeArrowheads="1"/>
-          </p:cNvSpPr>
-          <p:nvPr/>
-        </p:nvSpPr>
-        <p:spPr bwMode="auto">
-          <a:xfrm>
-            <a:off x="1871470" y="116632"/>
-            <a:ext cx="8449060" cy="648072"/>
-          </a:xfrm>
-          <a:prstGeom prst="rect">
-            <a:avLst/>
-          </a:prstGeom>
-          <a:noFill/>
-          <a:ln>
-            <a:noFill/>
-          </a:ln>
-          <a:effectLst/>
-          <a:extLst>
-            <a:ext uri="{909E8E84-426E-40DD-AFC4-6F175D3DCCD1}">
-              <a14:hiddenFill xmlns:a14="http://schemas.microsoft.com/office/drawing/2010/main">
-                <a:solidFill>
-                  <a:schemeClr val="accent1"/>
-                </a:solidFill>
-              </a14:hiddenFill>
-            </a:ext>
-            <a:ext uri="{91240B29-F687-4F45-9708-019B960494DF}">
-              <a14:hiddenLine xmlns:a14="http://schemas.microsoft.com/office/drawing/2010/main" w="9525">
-                <a:solidFill>
-                  <a:schemeClr val="tx1"/>
-                </a:solidFill>
-                <a:miter lim="800000"/>
-                <a:headEnd/>
-                <a:tailEnd/>
-              </a14:hiddenLine>
-            </a:ext>
-            <a:ext uri="{AF507438-7753-43E0-B8FC-AC1667EBCBE1}">
-              <a14:hiddenEffects xmlns:a14="http://schemas.microsoft.com/office/drawing/2010/main">
-                <a:effectLst>
-                  <a:outerShdw dist="35921" dir="2700000" algn="ctr" rotWithShape="0">
-                    <a:schemeClr val="bg2"/>
-                  </a:outerShdw>
-                </a:effectLst>
-              </a14:hiddenEffects>
-            </a:ext>
-          </a:extLst>
-        </p:spPr>
-        <p:txBody>
-          <a:bodyPr wrap="square">
-            <a:noAutofit/>
-          </a:bodyPr>
-          <a:lstStyle/>
-          <a:p>
-            <a:pPr algn="ctr"/>
-            <a:r>
-              <a:rPr lang="en-GB" altLang="en-US" sz="3200" b="1" u="sng" dirty="0">
-                <a:solidFill>
-                  <a:schemeClr val="bg1"/>
-                </a:solidFill>
-                <a:latin typeface="Century Gothic" panose="020B0502020202020204" pitchFamily="34" charset="0"/>
-              </a:rPr>
-              <a:t>Prayer Requests</a:t>
-            </a:r>
-            <a:r>
-              <a:rPr lang="en-GB" altLang="en-US" sz="3200" b="1" u="sng" dirty="0">
-                <a:solidFill>
-                  <a:schemeClr val="bg1"/>
-                </a:solidFill>
-                <a:latin typeface="Century Gothic" panose="020B0502020202020204" pitchFamily="34" charset="0"/>
-                <a:ea typeface="金梅新中楷全字體" panose="02010509060101010101" pitchFamily="49" charset="-120"/>
-              </a:rPr>
-              <a:t>- </a:t>
-            </a:r>
-            <a:r>
-              <a:rPr lang="zh-TW" altLang="en-US" sz="3200" b="1" u="sng" dirty="0">
-                <a:solidFill>
-                  <a:schemeClr val="bg1"/>
-                </a:solidFill>
-                <a:latin typeface="Century Gothic" panose="020B0502020202020204" pitchFamily="34" charset="0"/>
-                <a:ea typeface="金梅新中楷全字體" panose="02010509060101010101" pitchFamily="49" charset="-120"/>
-              </a:rPr>
-              <a:t>代禱</a:t>
-            </a:r>
-            <a:endParaRPr lang="en-GB" altLang="zh-TW" sz="3200" b="1" u="sng" dirty="0">
-              <a:solidFill>
-                <a:schemeClr val="bg1"/>
-              </a:solidFill>
-              <a:latin typeface="Century Gothic" panose="020B0502020202020204" pitchFamily="34" charset="0"/>
-              <a:ea typeface="金梅新中楷全字體" panose="02010509060101010101" pitchFamily="49" charset="-120"/>
-            </a:endParaRPr>
-          </a:p>
-        </p:txBody>
-      </p:sp>
-      <p:sp>
-        <p:nvSpPr>
           <p:cNvPr id="8" name="Title 1">
             <a:extLst>
               <a:ext uri="{FF2B5EF4-FFF2-40B4-BE49-F238E27FC236}">
@@ -5544,216 +5442,6 @@
           </a:p>
         </p:txBody>
       </p:sp>
-      <p:sp>
-        <p:nvSpPr>
-          <p:cNvPr id="9" name="Text Box 11">
-            <a:extLst>
-              <a:ext uri="{FF2B5EF4-FFF2-40B4-BE49-F238E27FC236}">
-                <a16:creationId xmlns:a16="http://schemas.microsoft.com/office/drawing/2014/main" id="{A5F6359B-EDA7-4B4D-903A-22796AF5B2D4}"/>
-              </a:ext>
-            </a:extLst>
-          </p:cNvPr>
-          <p:cNvSpPr txBox="1">
-            <a:spLocks noChangeArrowheads="1"/>
-          </p:cNvSpPr>
-          <p:nvPr/>
-        </p:nvSpPr>
-        <p:spPr bwMode="auto">
-          <a:xfrm>
-            <a:off x="767482" y="6165304"/>
-            <a:ext cx="2736156" cy="338554"/>
-          </a:xfrm>
-          <a:prstGeom prst="rect">
-            <a:avLst/>
-          </a:prstGeom>
-          <a:noFill/>
-          <a:ln>
-            <a:noFill/>
-          </a:ln>
-          <a:effectLst/>
-          <a:extLst>
-            <a:ext uri="{909E8E84-426E-40DD-AFC4-6F175D3DCCD1}">
-              <a14:hiddenFill xmlns:a14="http://schemas.microsoft.com/office/drawing/2010/main">
-                <a:solidFill>
-                  <a:schemeClr val="accent1"/>
-                </a:solidFill>
-              </a14:hiddenFill>
-            </a:ext>
-            <a:ext uri="{91240B29-F687-4F45-9708-019B960494DF}">
-              <a14:hiddenLine xmlns:a14="http://schemas.microsoft.com/office/drawing/2010/main" w="9525">
-                <a:solidFill>
-                  <a:schemeClr val="tx1"/>
-                </a:solidFill>
-                <a:miter lim="800000"/>
-                <a:headEnd/>
-                <a:tailEnd/>
-              </a14:hiddenLine>
-            </a:ext>
-            <a:ext uri="{AF507438-7753-43E0-B8FC-AC1667EBCBE1}">
-              <a14:hiddenEffects xmlns:a14="http://schemas.microsoft.com/office/drawing/2010/main">
-                <a:effectLst>
-                  <a:outerShdw dist="35921" dir="2700000" algn="ctr" rotWithShape="0">
-                    <a:schemeClr val="bg2"/>
-                  </a:outerShdw>
-                </a:effectLst>
-              </a14:hiddenEffects>
-            </a:ext>
-          </a:extLst>
-        </p:spPr>
-        <p:txBody>
-          <a:bodyPr wrap="square">
-            <a:spAutoFit/>
-          </a:bodyPr>
-          <a:lstStyle/>
-          <a:p>
-            <a:pPr>
-              <a:spcBef>
-                <a:spcPct val="50000"/>
-              </a:spcBef>
-            </a:pPr>
-            <a:r>
-              <a:rPr lang="en-US" altLang="en-US" sz="1600" dirty="0">
-                <a:solidFill>
-                  <a:schemeClr val="bg1"/>
-                </a:solidFill>
-                <a:latin typeface="Century Gothic" panose="020B0502020202020204" pitchFamily="34" charset="0"/>
-                <a:ea typeface="金梅新中楷全字體" panose="02010509060101010101" pitchFamily="49" charset="-120"/>
-              </a:rPr>
-              <a:t>請 關 您 的 手 提 電 話 </a:t>
-            </a:r>
-          </a:p>
-        </p:txBody>
-      </p:sp>
-      <p:sp>
-        <p:nvSpPr>
-          <p:cNvPr id="10" name="Text Box 12">
-            <a:extLst>
-              <a:ext uri="{FF2B5EF4-FFF2-40B4-BE49-F238E27FC236}">
-                <a16:creationId xmlns:a16="http://schemas.microsoft.com/office/drawing/2014/main" id="{4F2342DD-2BD5-48A1-AD38-7EE43180200F}"/>
-              </a:ext>
-            </a:extLst>
-          </p:cNvPr>
-          <p:cNvSpPr txBox="1">
-            <a:spLocks noChangeArrowheads="1"/>
-          </p:cNvSpPr>
-          <p:nvPr/>
-        </p:nvSpPr>
-        <p:spPr bwMode="auto">
-          <a:xfrm>
-            <a:off x="767482" y="6427242"/>
-            <a:ext cx="3672334" cy="276999"/>
-          </a:xfrm>
-          <a:prstGeom prst="rect">
-            <a:avLst/>
-          </a:prstGeom>
-          <a:noFill/>
-          <a:ln>
-            <a:noFill/>
-          </a:ln>
-          <a:effectLst/>
-          <a:extLst>
-            <a:ext uri="{909E8E84-426E-40DD-AFC4-6F175D3DCCD1}">
-              <a14:hiddenFill xmlns:a14="http://schemas.microsoft.com/office/drawing/2010/main">
-                <a:solidFill>
-                  <a:schemeClr val="accent1"/>
-                </a:solidFill>
-              </a14:hiddenFill>
-            </a:ext>
-            <a:ext uri="{91240B29-F687-4F45-9708-019B960494DF}">
-              <a14:hiddenLine xmlns:a14="http://schemas.microsoft.com/office/drawing/2010/main" w="9525">
-                <a:solidFill>
-                  <a:schemeClr val="tx1"/>
-                </a:solidFill>
-                <a:miter lim="800000"/>
-                <a:headEnd/>
-                <a:tailEnd/>
-              </a14:hiddenLine>
-            </a:ext>
-            <a:ext uri="{AF507438-7753-43E0-B8FC-AC1667EBCBE1}">
-              <a14:hiddenEffects xmlns:a14="http://schemas.microsoft.com/office/drawing/2010/main">
-                <a:effectLst>
-                  <a:outerShdw dist="35921" dir="2700000" algn="ctr" rotWithShape="0">
-                    <a:schemeClr val="bg2"/>
-                  </a:outerShdw>
-                </a:effectLst>
-              </a14:hiddenEffects>
-            </a:ext>
-          </a:extLst>
-        </p:spPr>
-        <p:txBody>
-          <a:bodyPr wrap="square">
-            <a:spAutoFit/>
-          </a:bodyPr>
-          <a:lstStyle/>
-          <a:p>
-            <a:pPr>
-              <a:spcBef>
-                <a:spcPct val="50000"/>
-              </a:spcBef>
-            </a:pPr>
-            <a:r>
-              <a:rPr lang="en-GB" altLang="en-US" sz="1200" b="1" dirty="0">
-                <a:solidFill>
-                  <a:schemeClr val="bg1"/>
-                </a:solidFill>
-                <a:latin typeface="Century Gothic" panose="020B0502020202020204" pitchFamily="34" charset="0"/>
-              </a:rPr>
-              <a:t>PLEASE SWITCH OFF YOUR MOBILE PHONE</a:t>
-            </a:r>
-            <a:endParaRPr lang="en-US" altLang="en-US" sz="1200" b="1" dirty="0">
-              <a:solidFill>
-                <a:schemeClr val="bg1"/>
-              </a:solidFill>
-              <a:latin typeface="Century Gothic" panose="020B0502020202020204" pitchFamily="34" charset="0"/>
-            </a:endParaRPr>
-          </a:p>
-        </p:txBody>
-      </p:sp>
-      <p:pic>
-        <p:nvPicPr>
-          <p:cNvPr id="11" name="Picture 2" descr="Custom No Mobile Phones Sign | The Sign Shed">
-            <a:extLst>
-              <a:ext uri="{FF2B5EF4-FFF2-40B4-BE49-F238E27FC236}">
-                <a16:creationId xmlns:a16="http://schemas.microsoft.com/office/drawing/2014/main" id="{69B74F00-D138-4D1A-BB3A-FF6169EDC215}"/>
-              </a:ext>
-            </a:extLst>
-          </p:cNvPr>
-          <p:cNvPicPr>
-            <a:picLocks noChangeAspect="1" noChangeArrowheads="1"/>
-          </p:cNvPicPr>
-          <p:nvPr/>
-        </p:nvPicPr>
-        <p:blipFill rotWithShape="1">
-          <a:blip r:embed="rId2" cstate="print">
-            <a:extLst>
-              <a:ext uri="{28A0092B-C50C-407E-A947-70E740481C1C}">
-                <a14:useLocalDpi xmlns:a14="http://schemas.microsoft.com/office/drawing/2010/main" val="0"/>
-              </a:ext>
-            </a:extLst>
-          </a:blip>
-          <a:srcRect l="3327" t="11250" r="71169" b="12911"/>
-          <a:stretch/>
-        </p:blipFill>
-        <p:spPr bwMode="auto">
-          <a:xfrm>
-            <a:off x="335360" y="6202015"/>
-            <a:ext cx="432048" cy="432048"/>
-          </a:xfrm>
-          <a:prstGeom prst="rect">
-            <a:avLst/>
-          </a:prstGeom>
-          <a:noFill/>
-          <a:extLst>
-            <a:ext uri="{909E8E84-426E-40DD-AFC4-6F175D3DCCD1}">
-              <a14:hiddenFill xmlns:a14="http://schemas.microsoft.com/office/drawing/2010/main">
-                <a:solidFill>
-                  <a:srgbClr val="FFFFFF"/>
-                </a:solidFill>
-              </a14:hiddenFill>
-            </a:ext>
-          </a:extLst>
-        </p:spPr>
-      </p:pic>
       <p:pic>
         <p:nvPicPr>
           <p:cNvPr id="1026" name="Picture 2">
@@ -5769,7 +5457,7 @@
           <p:nvPr/>
         </p:nvPicPr>
         <p:blipFill>
-          <a:blip r:embed="rId3">
+          <a:blip r:embed="rId2">
             <a:extLst>
               <a:ext uri="{28A0092B-C50C-407E-A947-70E740481C1C}">
                 <a14:useLocalDpi xmlns:a14="http://schemas.microsoft.com/office/drawing/2010/main" val="0"/>

</xml_diff>

<commit_message>
20/05/22 Added TJC Logo, Alert Boxes, Auto change to show verses
</commit_message>
<xml_diff>
--- a/TJCPowerPoint/Resources/ServiceWidescreen.pptx
+++ b/TJCPowerPoint/Resources/ServiceWidescreen.pptx
@@ -5,18 +5,19 @@
     <p:sldMasterId id="2147483660" r:id="rId1"/>
   </p:sldMasterIdLst>
   <p:notesMasterIdLst>
-    <p:notesMasterId r:id="rId8"/>
+    <p:notesMasterId r:id="rId9"/>
   </p:notesMasterIdLst>
   <p:handoutMasterIdLst>
-    <p:handoutMasterId r:id="rId9"/>
+    <p:handoutMasterId r:id="rId10"/>
   </p:handoutMasterIdLst>
   <p:sldIdLst>
     <p:sldId id="357" r:id="rId2"/>
-    <p:sldId id="358" r:id="rId3"/>
-    <p:sldId id="362" r:id="rId4"/>
+    <p:sldId id="362" r:id="rId3"/>
+    <p:sldId id="358" r:id="rId4"/>
     <p:sldId id="360" r:id="rId5"/>
     <p:sldId id="361" r:id="rId6"/>
     <p:sldId id="359" r:id="rId7"/>
+    <p:sldId id="363" r:id="rId8"/>
   </p:sldIdLst>
   <p:sldSz cx="12192000" cy="6858000"/>
   <p:notesSz cx="6858000" cy="9144000"/>
@@ -4508,7 +4509,7 @@
         <p:spPr bwMode="auto">
           <a:xfrm>
             <a:off x="5952253" y="3819128"/>
-            <a:ext cx="5975949" cy="2308324"/>
+            <a:ext cx="6239747" cy="2308324"/>
           </a:xfrm>
           <a:prstGeom prst="rect">
             <a:avLst/>
@@ -4548,7 +4549,7 @@
           </a:extLst>
         </p:spPr>
         <p:txBody>
-          <a:bodyPr wrap="square">
+          <a:bodyPr wrap="square" lIns="0" rIns="0">
             <a:spAutoFit/>
           </a:bodyPr>
           <a:lstStyle/>
@@ -4685,237 +4686,42 @@
           </a:p>
         </p:txBody>
       </p:sp>
-      <p:grpSp>
-        <p:nvGrpSpPr>
-          <p:cNvPr id="3" name="Group 2">
+      <p:pic>
+        <p:nvPicPr>
+          <p:cNvPr id="14" name="Picture 13" descr="Logo&#10;&#10;Description automatically generated with medium confidence">
             <a:extLst>
               <a:ext uri="{FF2B5EF4-FFF2-40B4-BE49-F238E27FC236}">
-                <a16:creationId xmlns:a16="http://schemas.microsoft.com/office/drawing/2014/main" id="{78D3D5A9-8002-4946-8AAB-89E5571D684C}"/>
+                <a16:creationId xmlns:a16="http://schemas.microsoft.com/office/drawing/2014/main" id="{D601D51F-3402-FDB9-D1E1-CF9AEE9E0E3A}"/>
               </a:ext>
             </a:extLst>
           </p:cNvPr>
-          <p:cNvGrpSpPr/>
+          <p:cNvPicPr>
+            <a:picLocks noChangeAspect="1"/>
+          </p:cNvPicPr>
           <p:nvPr/>
-        </p:nvGrpSpPr>
-        <p:grpSpPr>
-          <a:xfrm>
-            <a:off x="335360" y="6165304"/>
-            <a:ext cx="4104456" cy="538937"/>
-            <a:chOff x="335360" y="6165304"/>
-            <a:chExt cx="4104456" cy="538937"/>
-          </a:xfrm>
-        </p:grpSpPr>
-        <p:sp>
-          <p:nvSpPr>
-            <p:cNvPr id="16" name="Text Box 11">
-              <a:extLst>
-                <a:ext uri="{FF2B5EF4-FFF2-40B4-BE49-F238E27FC236}">
-                  <a16:creationId xmlns:a16="http://schemas.microsoft.com/office/drawing/2014/main" id="{FD7E944A-711C-41E4-8491-C90508960074}"/>
-                </a:ext>
-              </a:extLst>
-            </p:cNvPr>
-            <p:cNvSpPr txBox="1">
-              <a:spLocks noChangeArrowheads="1"/>
-            </p:cNvSpPr>
-            <p:nvPr/>
-          </p:nvSpPr>
-          <p:spPr bwMode="auto">
-            <a:xfrm>
-              <a:off x="767482" y="6165304"/>
-              <a:ext cx="2736156" cy="338554"/>
-            </a:xfrm>
-            <a:prstGeom prst="rect">
-              <a:avLst/>
-            </a:prstGeom>
-            <a:noFill/>
-            <a:ln>
-              <a:noFill/>
-            </a:ln>
-            <a:effectLst/>
+        </p:nvPicPr>
+        <p:blipFill>
+          <a:blip r:embed="rId3" cstate="print">
             <a:extLst>
-              <a:ext uri="{909E8E84-426E-40DD-AFC4-6F175D3DCCD1}">
-                <a14:hiddenFill xmlns:a14="http://schemas.microsoft.com/office/drawing/2010/main">
-                  <a:solidFill>
-                    <a:schemeClr val="accent1"/>
-                  </a:solidFill>
-                </a14:hiddenFill>
-              </a:ext>
-              <a:ext uri="{91240B29-F687-4F45-9708-019B960494DF}">
-                <a14:hiddenLine xmlns:a14="http://schemas.microsoft.com/office/drawing/2010/main" w="9525">
-                  <a:solidFill>
-                    <a:schemeClr val="tx1"/>
-                  </a:solidFill>
-                  <a:miter lim="800000"/>
-                  <a:headEnd/>
-                  <a:tailEnd/>
-                </a14:hiddenLine>
-              </a:ext>
-              <a:ext uri="{AF507438-7753-43E0-B8FC-AC1667EBCBE1}">
-                <a14:hiddenEffects xmlns:a14="http://schemas.microsoft.com/office/drawing/2010/main">
-                  <a:effectLst>
-                    <a:outerShdw dist="35921" dir="2700000" algn="ctr" rotWithShape="0">
-                      <a:schemeClr val="bg2"/>
-                    </a:outerShdw>
-                  </a:effectLst>
-                </a14:hiddenEffects>
+              <a:ext uri="{28A0092B-C50C-407E-A947-70E740481C1C}">
+                <a14:useLocalDpi xmlns:a14="http://schemas.microsoft.com/office/drawing/2010/main" val="0"/>
               </a:ext>
             </a:extLst>
-          </p:spPr>
-          <p:txBody>
-            <a:bodyPr wrap="square">
-              <a:spAutoFit/>
-            </a:bodyPr>
-            <a:lstStyle/>
-            <a:p>
-              <a:pPr>
-                <a:spcBef>
-                  <a:spcPct val="50000"/>
-                </a:spcBef>
-              </a:pPr>
-              <a:r>
-                <a:rPr lang="en-US" altLang="en-US" sz="1600" dirty="0">
-                  <a:solidFill>
-                    <a:schemeClr val="bg1"/>
-                  </a:solidFill>
-                  <a:latin typeface="+mn-lt"/>
-                  <a:ea typeface="金梅新中楷全字體" panose="02010509060101010101" pitchFamily="49" charset="-120"/>
-                </a:rPr>
-                <a:t>請 關 您 的 手 提 電 話 </a:t>
-              </a:r>
-            </a:p>
-          </p:txBody>
-        </p:sp>
-        <p:sp>
-          <p:nvSpPr>
-            <p:cNvPr id="17" name="Text Box 12">
-              <a:extLst>
-                <a:ext uri="{FF2B5EF4-FFF2-40B4-BE49-F238E27FC236}">
-                  <a16:creationId xmlns:a16="http://schemas.microsoft.com/office/drawing/2014/main" id="{CAB9F7E6-2E50-4266-AC18-5A7B26BAC8FC}"/>
-                </a:ext>
-              </a:extLst>
-            </p:cNvPr>
-            <p:cNvSpPr txBox="1">
-              <a:spLocks noChangeArrowheads="1"/>
-            </p:cNvSpPr>
-            <p:nvPr/>
-          </p:nvSpPr>
-          <p:spPr bwMode="auto">
-            <a:xfrm>
-              <a:off x="767482" y="6427242"/>
-              <a:ext cx="3672334" cy="276999"/>
-            </a:xfrm>
-            <a:prstGeom prst="rect">
-              <a:avLst/>
-            </a:prstGeom>
-            <a:noFill/>
-            <a:ln>
-              <a:noFill/>
-            </a:ln>
-            <a:effectLst/>
-            <a:extLst>
-              <a:ext uri="{909E8E84-426E-40DD-AFC4-6F175D3DCCD1}">
-                <a14:hiddenFill xmlns:a14="http://schemas.microsoft.com/office/drawing/2010/main">
-                  <a:solidFill>
-                    <a:schemeClr val="accent1"/>
-                  </a:solidFill>
-                </a14:hiddenFill>
-              </a:ext>
-              <a:ext uri="{91240B29-F687-4F45-9708-019B960494DF}">
-                <a14:hiddenLine xmlns:a14="http://schemas.microsoft.com/office/drawing/2010/main" w="9525">
-                  <a:solidFill>
-                    <a:schemeClr val="tx1"/>
-                  </a:solidFill>
-                  <a:miter lim="800000"/>
-                  <a:headEnd/>
-                  <a:tailEnd/>
-                </a14:hiddenLine>
-              </a:ext>
-              <a:ext uri="{AF507438-7753-43E0-B8FC-AC1667EBCBE1}">
-                <a14:hiddenEffects xmlns:a14="http://schemas.microsoft.com/office/drawing/2010/main">
-                  <a:effectLst>
-                    <a:outerShdw dist="35921" dir="2700000" algn="ctr" rotWithShape="0">
-                      <a:schemeClr val="bg2"/>
-                    </a:outerShdw>
-                  </a:effectLst>
-                </a14:hiddenEffects>
-              </a:ext>
-            </a:extLst>
-          </p:spPr>
-          <p:txBody>
-            <a:bodyPr wrap="square">
-              <a:spAutoFit/>
-            </a:bodyPr>
-            <a:lstStyle/>
-            <a:p>
-              <a:pPr>
-                <a:spcBef>
-                  <a:spcPct val="50000"/>
-                </a:spcBef>
-              </a:pPr>
-              <a:r>
-                <a:rPr lang="en-GB" altLang="en-US" sz="1200" b="1" dirty="0">
-                  <a:solidFill>
-                    <a:schemeClr val="bg1"/>
-                  </a:solidFill>
-                  <a:latin typeface="Century Gothic" panose="020B0502020202020204" pitchFamily="34" charset="0"/>
-                </a:rPr>
-                <a:t>PLEASE SWITCH OFF YOUR MOBILE PHONE</a:t>
-              </a:r>
-              <a:endParaRPr lang="en-US" altLang="en-US" sz="1200" b="1" dirty="0">
-                <a:solidFill>
-                  <a:schemeClr val="bg1"/>
-                </a:solidFill>
-                <a:latin typeface="Century Gothic" panose="020B0502020202020204" pitchFamily="34" charset="0"/>
-              </a:endParaRPr>
-            </a:p>
-          </p:txBody>
-        </p:sp>
-        <p:pic>
-          <p:nvPicPr>
-            <p:cNvPr id="18" name="Picture 2" descr="Custom No Mobile Phones Sign | The Sign Shed">
-              <a:extLst>
-                <a:ext uri="{FF2B5EF4-FFF2-40B4-BE49-F238E27FC236}">
-                  <a16:creationId xmlns:a16="http://schemas.microsoft.com/office/drawing/2014/main" id="{198AE553-A78B-4238-8954-5B5301A1BDC8}"/>
-                </a:ext>
-              </a:extLst>
-            </p:cNvPr>
-            <p:cNvPicPr>
-              <a:picLocks noChangeAspect="1" noChangeArrowheads="1"/>
-            </p:cNvPicPr>
-            <p:nvPr/>
-          </p:nvPicPr>
-          <p:blipFill rotWithShape="1">
-            <a:blip r:embed="rId3" cstate="print">
-              <a:extLst>
-                <a:ext uri="{28A0092B-C50C-407E-A947-70E740481C1C}">
-                  <a14:useLocalDpi xmlns:a14="http://schemas.microsoft.com/office/drawing/2010/main" val="0"/>
-                </a:ext>
-              </a:extLst>
-            </a:blip>
-            <a:srcRect l="3327" t="11250" r="71169" b="12911"/>
-            <a:stretch/>
-          </p:blipFill>
-          <p:spPr bwMode="auto">
-            <a:xfrm>
-              <a:off x="335360" y="6202015"/>
-              <a:ext cx="432048" cy="432048"/>
-            </a:xfrm>
-            <a:prstGeom prst="rect">
-              <a:avLst/>
-            </a:prstGeom>
-            <a:noFill/>
-            <a:extLst>
-              <a:ext uri="{909E8E84-426E-40DD-AFC4-6F175D3DCCD1}">
-                <a14:hiddenFill xmlns:a14="http://schemas.microsoft.com/office/drawing/2010/main">
-                  <a:solidFill>
-                    <a:srgbClr val="FFFFFF"/>
-                  </a:solidFill>
-                </a14:hiddenFill>
-              </a:ext>
-            </a:extLst>
-          </p:spPr>
-        </p:pic>
-      </p:grpSp>
+          </a:blip>
+          <a:stretch>
+            <a:fillRect/>
+          </a:stretch>
+        </p:blipFill>
+        <p:spPr>
+          <a:xfrm>
+            <a:off x="335359" y="6269250"/>
+            <a:ext cx="2664297" cy="344791"/>
+          </a:xfrm>
+          <a:prstGeom prst="rect">
+            <a:avLst/>
+          </a:prstGeom>
+        </p:spPr>
+      </p:pic>
     </p:spTree>
   </p:cSld>
   <p:clrMapOvr>
@@ -4943,181 +4749,6 @@
       </p:grpSpPr>
       <p:sp>
         <p:nvSpPr>
-          <p:cNvPr id="6" name="Text Box 12">
-            <a:extLst>
-              <a:ext uri="{FF2B5EF4-FFF2-40B4-BE49-F238E27FC236}">
-                <a16:creationId xmlns:a16="http://schemas.microsoft.com/office/drawing/2014/main" id="{BEA17A2D-ADBC-44E7-8241-0C2921ADB5E3}"/>
-              </a:ext>
-            </a:extLst>
-          </p:cNvPr>
-          <p:cNvSpPr txBox="1">
-            <a:spLocks noChangeArrowheads="1"/>
-          </p:cNvSpPr>
-          <p:nvPr/>
-        </p:nvSpPr>
-        <p:spPr bwMode="auto">
-          <a:xfrm>
-            <a:off x="1524001" y="597314"/>
-            <a:ext cx="9143999" cy="6432086"/>
-          </a:xfrm>
-          <a:prstGeom prst="rect">
-            <a:avLst/>
-          </a:prstGeom>
-          <a:noFill/>
-          <a:ln>
-            <a:noFill/>
-          </a:ln>
-          <a:effectLst/>
-          <a:extLst>
-            <a:ext uri="{909E8E84-426E-40DD-AFC4-6F175D3DCCD1}">
-              <a14:hiddenFill xmlns:a14="http://schemas.microsoft.com/office/drawing/2010/main">
-                <a:solidFill>
-                  <a:schemeClr val="accent1"/>
-                </a:solidFill>
-              </a14:hiddenFill>
-            </a:ext>
-            <a:ext uri="{91240B29-F687-4F45-9708-019B960494DF}">
-              <a14:hiddenLine xmlns:a14="http://schemas.microsoft.com/office/drawing/2010/main" w="9525">
-                <a:solidFill>
-                  <a:schemeClr val="tx1"/>
-                </a:solidFill>
-                <a:miter lim="800000"/>
-                <a:headEnd/>
-                <a:tailEnd/>
-              </a14:hiddenLine>
-            </a:ext>
-            <a:ext uri="{AF507438-7753-43E0-B8FC-AC1667EBCBE1}">
-              <a14:hiddenEffects xmlns:a14="http://schemas.microsoft.com/office/drawing/2010/main">
-                <a:effectLst>
-                  <a:outerShdw dist="35921" dir="2700000" algn="ctr" rotWithShape="0">
-                    <a:schemeClr val="bg2"/>
-                  </a:outerShdw>
-                </a:effectLst>
-              </a14:hiddenEffects>
-            </a:ext>
-          </a:extLst>
-        </p:spPr>
-        <p:txBody>
-          <a:bodyPr wrap="square">
-            <a:noAutofit/>
-          </a:bodyPr>
-          <a:lstStyle/>
-          <a:p>
-            <a:pPr algn="ctr"/>
-            <a:endParaRPr lang="en-GB" altLang="zh-TW" sz="2200" b="1" dirty="0">
-              <a:solidFill>
-                <a:schemeClr val="bg1"/>
-              </a:solidFill>
-              <a:latin typeface="Century Gothic" panose="020B0502020202020204" pitchFamily="34" charset="0"/>
-              <a:ea typeface="金梅新中楷全字體" panose="02010509060101010101" pitchFamily="49" charset="-120"/>
-            </a:endParaRPr>
-          </a:p>
-        </p:txBody>
-      </p:sp>
-      <p:sp>
-        <p:nvSpPr>
-          <p:cNvPr id="7" name="Text Box 12">
-            <a:extLst>
-              <a:ext uri="{FF2B5EF4-FFF2-40B4-BE49-F238E27FC236}">
-                <a16:creationId xmlns:a16="http://schemas.microsoft.com/office/drawing/2014/main" id="{4A814393-22EC-4030-B099-593A4A5B942E}"/>
-              </a:ext>
-            </a:extLst>
-          </p:cNvPr>
-          <p:cNvSpPr txBox="1">
-            <a:spLocks noChangeArrowheads="1"/>
-          </p:cNvSpPr>
-          <p:nvPr/>
-        </p:nvSpPr>
-        <p:spPr bwMode="auto">
-          <a:xfrm>
-            <a:off x="1871470" y="116632"/>
-            <a:ext cx="8449060" cy="648072"/>
-          </a:xfrm>
-          <a:prstGeom prst="rect">
-            <a:avLst/>
-          </a:prstGeom>
-          <a:noFill/>
-          <a:ln>
-            <a:noFill/>
-          </a:ln>
-          <a:effectLst/>
-          <a:extLst>
-            <a:ext uri="{909E8E84-426E-40DD-AFC4-6F175D3DCCD1}">
-              <a14:hiddenFill xmlns:a14="http://schemas.microsoft.com/office/drawing/2010/main">
-                <a:solidFill>
-                  <a:schemeClr val="accent1"/>
-                </a:solidFill>
-              </a14:hiddenFill>
-            </a:ext>
-            <a:ext uri="{91240B29-F687-4F45-9708-019B960494DF}">
-              <a14:hiddenLine xmlns:a14="http://schemas.microsoft.com/office/drawing/2010/main" w="9525">
-                <a:solidFill>
-                  <a:schemeClr val="tx1"/>
-                </a:solidFill>
-                <a:miter lim="800000"/>
-                <a:headEnd/>
-                <a:tailEnd/>
-              </a14:hiddenLine>
-            </a:ext>
-            <a:ext uri="{AF507438-7753-43E0-B8FC-AC1667EBCBE1}">
-              <a14:hiddenEffects xmlns:a14="http://schemas.microsoft.com/office/drawing/2010/main">
-                <a:effectLst>
-                  <a:outerShdw dist="35921" dir="2700000" algn="ctr" rotWithShape="0">
-                    <a:schemeClr val="bg2"/>
-                  </a:outerShdw>
-                </a:effectLst>
-              </a14:hiddenEffects>
-            </a:ext>
-          </a:extLst>
-        </p:spPr>
-        <p:txBody>
-          <a:bodyPr wrap="square">
-            <a:noAutofit/>
-          </a:bodyPr>
-          <a:lstStyle/>
-          <a:p>
-            <a:pPr algn="ctr"/>
-            <a:r>
-              <a:rPr lang="en-GB" altLang="en-US" sz="3200" b="1" u="sng" dirty="0">
-                <a:solidFill>
-                  <a:schemeClr val="bg1"/>
-                </a:solidFill>
-                <a:latin typeface="Century Gothic" panose="020B0502020202020204" pitchFamily="34" charset="0"/>
-              </a:rPr>
-              <a:t>Prayer Requests</a:t>
-            </a:r>
-            <a:r>
-              <a:rPr lang="en-GB" altLang="en-US" sz="3200" b="1" u="sng" dirty="0">
-                <a:solidFill>
-                  <a:schemeClr val="bg1"/>
-                </a:solidFill>
-                <a:latin typeface="Century Gothic" panose="020B0502020202020204" pitchFamily="34" charset="0"/>
-                <a:ea typeface="金梅新中楷全字體" panose="02010509060101010101" pitchFamily="49" charset="-120"/>
-              </a:rPr>
-              <a:t>- </a:t>
-            </a:r>
-            <a:r>
-              <a:rPr lang="zh-TW" altLang="en-US" sz="3200" b="1" u="sng" dirty="0">
-                <a:solidFill>
-                  <a:schemeClr val="bg1"/>
-                </a:solidFill>
-                <a:latin typeface="Century Gothic" panose="020B0502020202020204" pitchFamily="34" charset="0"/>
-                <a:ea typeface="金梅新中楷全字體" panose="02010509060101010101" pitchFamily="49" charset="-120"/>
-              </a:rPr>
-              <a:t>代禱</a:t>
-            </a:r>
-            <a:endParaRPr lang="en-GB" altLang="zh-TW" sz="3200" b="1" u="sng" dirty="0">
-              <a:solidFill>
-                <a:schemeClr val="bg1"/>
-              </a:solidFill>
-              <a:latin typeface="Century Gothic" panose="020B0502020202020204" pitchFamily="34" charset="0"/>
-              <a:ea typeface="金梅新中楷全字體" panose="02010509060101010101" pitchFamily="49" charset="-120"/>
-            </a:endParaRPr>
-          </a:p>
-        </p:txBody>
-      </p:sp>
-      <p:sp>
-        <p:nvSpPr>
           <p:cNvPr id="8" name="Title 1">
             <a:extLst>
               <a:ext uri="{FF2B5EF4-FFF2-40B4-BE49-F238E27FC236}">
@@ -5146,191 +4777,79 @@
               <a:rPr lang="en-GB" dirty="0">
                 <a:latin typeface="Century Gothic" panose="020B0502020202020204" pitchFamily="34" charset="0"/>
               </a:rPr>
-              <a:t>Prayer Requests</a:t>
-            </a:r>
-          </a:p>
-        </p:txBody>
-      </p:sp>
-      <p:sp>
-        <p:nvSpPr>
-          <p:cNvPr id="9" name="Text Box 11">
+              <a:t>Prayer Requests (</a:t>
+            </a:r>
+            <a:r>
+              <a:rPr lang="en-GB" dirty="0" err="1">
+                <a:latin typeface="Century Gothic" panose="020B0502020202020204" pitchFamily="34" charset="0"/>
+              </a:rPr>
+              <a:t>Streamelements</a:t>
+            </a:r>
+            <a:r>
+              <a:rPr lang="en-GB" dirty="0">
+                <a:latin typeface="Century Gothic" panose="020B0502020202020204" pitchFamily="34" charset="0"/>
+              </a:rPr>
+              <a:t>)</a:t>
+            </a:r>
+          </a:p>
+        </p:txBody>
+      </p:sp>
+      <p:sp>
+        <p:nvSpPr>
+          <p:cNvPr id="2" name="TextBox 1">
             <a:extLst>
               <a:ext uri="{FF2B5EF4-FFF2-40B4-BE49-F238E27FC236}">
-                <a16:creationId xmlns:a16="http://schemas.microsoft.com/office/drawing/2014/main" id="{A5F6359B-EDA7-4B4D-903A-22796AF5B2D4}"/>
+                <a16:creationId xmlns:a16="http://schemas.microsoft.com/office/drawing/2014/main" id="{6EC0A171-41D3-4538-A3AA-95F4377BCA8B}"/>
               </a:ext>
             </a:extLst>
           </p:cNvPr>
-          <p:cNvSpPr txBox="1">
-            <a:spLocks noChangeArrowheads="1"/>
-          </p:cNvSpPr>
+          <p:cNvSpPr txBox="1"/>
           <p:nvPr/>
         </p:nvSpPr>
-        <p:spPr bwMode="auto">
+        <p:spPr>
           <a:xfrm>
-            <a:off x="767482" y="6165304"/>
-            <a:ext cx="2736156" cy="338554"/>
+            <a:off x="3575720" y="3105834"/>
+            <a:ext cx="5040560" cy="646331"/>
           </a:xfrm>
           <a:prstGeom prst="rect">
             <a:avLst/>
           </a:prstGeom>
           <a:noFill/>
-          <a:ln>
-            <a:noFill/>
-          </a:ln>
-          <a:effectLst/>
-          <a:extLst>
-            <a:ext uri="{909E8E84-426E-40DD-AFC4-6F175D3DCCD1}">
-              <a14:hiddenFill xmlns:a14="http://schemas.microsoft.com/office/drawing/2010/main">
-                <a:solidFill>
-                  <a:schemeClr val="accent1"/>
-                </a:solidFill>
-              </a14:hiddenFill>
-            </a:ext>
-            <a:ext uri="{91240B29-F687-4F45-9708-019B960494DF}">
-              <a14:hiddenLine xmlns:a14="http://schemas.microsoft.com/office/drawing/2010/main" w="9525">
-                <a:solidFill>
-                  <a:schemeClr val="tx1"/>
-                </a:solidFill>
-                <a:miter lim="800000"/>
-                <a:headEnd/>
-                <a:tailEnd/>
-              </a14:hiddenLine>
-            </a:ext>
-            <a:ext uri="{AF507438-7753-43E0-B8FC-AC1667EBCBE1}">
-              <a14:hiddenEffects xmlns:a14="http://schemas.microsoft.com/office/drawing/2010/main">
-                <a:effectLst>
-                  <a:outerShdw dist="35921" dir="2700000" algn="ctr" rotWithShape="0">
-                    <a:schemeClr val="bg2"/>
-                  </a:outerShdw>
-                </a:effectLst>
-              </a14:hiddenEffects>
-            </a:ext>
-          </a:extLst>
         </p:spPr>
         <p:txBody>
-          <a:bodyPr wrap="square">
+          <a:bodyPr wrap="square" rtlCol="0">
             <a:spAutoFit/>
           </a:bodyPr>
           <a:lstStyle/>
           <a:p>
-            <a:pPr>
-              <a:spcBef>
-                <a:spcPct val="50000"/>
-              </a:spcBef>
-            </a:pPr>
-            <a:r>
-              <a:rPr lang="en-US" altLang="en-US" sz="1600" dirty="0">
+            <a:pPr algn="ctr"/>
+            <a:r>
+              <a:rPr lang="en-GB" sz="3600" b="1" dirty="0">
                 <a:solidFill>
                   <a:schemeClr val="bg1"/>
                 </a:solidFill>
                 <a:latin typeface="Century Gothic" panose="020B0502020202020204" pitchFamily="34" charset="0"/>
-                <a:ea typeface="金梅新中楷全字體" panose="02010509060101010101" pitchFamily="49" charset="-120"/>
               </a:rPr>
-              <a:t>請 關 您 的 手 提 電 話 </a:t>
-            </a:r>
-          </a:p>
-        </p:txBody>
-      </p:sp>
-      <p:sp>
-        <p:nvSpPr>
-          <p:cNvPr id="10" name="Text Box 12">
+              <a:t>IMAGE PLACEHOLDER</a:t>
+            </a:r>
+          </a:p>
+        </p:txBody>
+      </p:sp>
+      <p:pic>
+        <p:nvPicPr>
+          <p:cNvPr id="4" name="Picture 3" descr="Logo&#10;&#10;Description automatically generated with medium confidence">
             <a:extLst>
               <a:ext uri="{FF2B5EF4-FFF2-40B4-BE49-F238E27FC236}">
-                <a16:creationId xmlns:a16="http://schemas.microsoft.com/office/drawing/2014/main" id="{4F2342DD-2BD5-48A1-AD38-7EE43180200F}"/>
-              </a:ext>
-            </a:extLst>
-          </p:cNvPr>
-          <p:cNvSpPr txBox="1">
-            <a:spLocks noChangeArrowheads="1"/>
-          </p:cNvSpPr>
-          <p:nvPr/>
-        </p:nvSpPr>
-        <p:spPr bwMode="auto">
-          <a:xfrm>
-            <a:off x="767482" y="6427242"/>
-            <a:ext cx="3672334" cy="276999"/>
-          </a:xfrm>
-          <a:prstGeom prst="rect">
-            <a:avLst/>
-          </a:prstGeom>
-          <a:noFill/>
-          <a:ln>
-            <a:noFill/>
-          </a:ln>
-          <a:effectLst/>
-          <a:extLst>
-            <a:ext uri="{909E8E84-426E-40DD-AFC4-6F175D3DCCD1}">
-              <a14:hiddenFill xmlns:a14="http://schemas.microsoft.com/office/drawing/2010/main">
-                <a:solidFill>
-                  <a:schemeClr val="accent1"/>
-                </a:solidFill>
-              </a14:hiddenFill>
-            </a:ext>
-            <a:ext uri="{91240B29-F687-4F45-9708-019B960494DF}">
-              <a14:hiddenLine xmlns:a14="http://schemas.microsoft.com/office/drawing/2010/main" w="9525">
-                <a:solidFill>
-                  <a:schemeClr val="tx1"/>
-                </a:solidFill>
-                <a:miter lim="800000"/>
-                <a:headEnd/>
-                <a:tailEnd/>
-              </a14:hiddenLine>
-            </a:ext>
-            <a:ext uri="{AF507438-7753-43E0-B8FC-AC1667EBCBE1}">
-              <a14:hiddenEffects xmlns:a14="http://schemas.microsoft.com/office/drawing/2010/main">
-                <a:effectLst>
-                  <a:outerShdw dist="35921" dir="2700000" algn="ctr" rotWithShape="0">
-                    <a:schemeClr val="bg2"/>
-                  </a:outerShdw>
-                </a:effectLst>
-              </a14:hiddenEffects>
-            </a:ext>
-          </a:extLst>
-        </p:spPr>
-        <p:txBody>
-          <a:bodyPr wrap="square">
-            <a:spAutoFit/>
-          </a:bodyPr>
-          <a:lstStyle/>
-          <a:p>
-            <a:pPr>
-              <a:spcBef>
-                <a:spcPct val="50000"/>
-              </a:spcBef>
-            </a:pPr>
-            <a:r>
-              <a:rPr lang="en-GB" altLang="en-US" sz="1200" b="1" dirty="0">
-                <a:solidFill>
-                  <a:schemeClr val="bg1"/>
-                </a:solidFill>
-                <a:latin typeface="Century Gothic" panose="020B0502020202020204" pitchFamily="34" charset="0"/>
-              </a:rPr>
-              <a:t>PLEASE SWITCH OFF YOUR MOBILE PHONE</a:t>
-            </a:r>
-            <a:endParaRPr lang="en-US" altLang="en-US" sz="1200" b="1" dirty="0">
-              <a:solidFill>
-                <a:schemeClr val="bg1"/>
-              </a:solidFill>
-              <a:latin typeface="Century Gothic" panose="020B0502020202020204" pitchFamily="34" charset="0"/>
-            </a:endParaRPr>
-          </a:p>
-        </p:txBody>
-      </p:sp>
-      <p:pic>
-        <p:nvPicPr>
-          <p:cNvPr id="11" name="Picture 2" descr="Custom No Mobile Phones Sign | The Sign Shed">
-            <a:extLst>
-              <a:ext uri="{FF2B5EF4-FFF2-40B4-BE49-F238E27FC236}">
-                <a16:creationId xmlns:a16="http://schemas.microsoft.com/office/drawing/2014/main" id="{69B74F00-D138-4D1A-BB3A-FF6169EDC215}"/>
+                <a16:creationId xmlns:a16="http://schemas.microsoft.com/office/drawing/2014/main" id="{EF8D15DB-F83E-5ECF-5377-49C260198166}"/>
               </a:ext>
             </a:extLst>
           </p:cNvPr>
           <p:cNvPicPr>
-            <a:picLocks noChangeAspect="1" noChangeArrowheads="1"/>
+            <a:picLocks noChangeAspect="1"/>
           </p:cNvPicPr>
           <p:nvPr/>
         </p:nvPicPr>
-        <p:blipFill rotWithShape="1">
+        <p:blipFill>
           <a:blip r:embed="rId2" cstate="print">
             <a:extLst>
               <a:ext uri="{28A0092B-C50C-407E-A947-70E740481C1C}">
@@ -5338,30 +4857,26 @@
               </a:ext>
             </a:extLst>
           </a:blip>
-          <a:srcRect l="3327" t="11250" r="71169" b="12911"/>
-          <a:stretch/>
+          <a:stretch>
+            <a:fillRect/>
+          </a:stretch>
         </p:blipFill>
-        <p:spPr bwMode="auto">
+        <p:spPr>
           <a:xfrm>
-            <a:off x="335360" y="6202015"/>
-            <a:ext cx="432048" cy="432048"/>
+            <a:off x="335359" y="6269250"/>
+            <a:ext cx="2664297" cy="344791"/>
           </a:xfrm>
           <a:prstGeom prst="rect">
             <a:avLst/>
           </a:prstGeom>
-          <a:noFill/>
-          <a:extLst>
-            <a:ext uri="{909E8E84-426E-40DD-AFC4-6F175D3DCCD1}">
-              <a14:hiddenFill xmlns:a14="http://schemas.microsoft.com/office/drawing/2010/main">
-                <a:solidFill>
-                  <a:srgbClr val="FFFFFF"/>
-                </a:solidFill>
-              </a14:hiddenFill>
-            </a:ext>
-          </a:extLst>
         </p:spPr>
       </p:pic>
     </p:spTree>
+    <p:extLst>
+      <p:ext uri="{BB962C8B-B14F-4D97-AF65-F5344CB8AC3E}">
+        <p14:creationId xmlns:p14="http://schemas.microsoft.com/office/powerpoint/2010/main" val="3351645641"/>
+      </p:ext>
+    </p:extLst>
   </p:cSld>
   <p:clrMapOvr>
     <a:masterClrMapping/>
@@ -5388,6 +4903,181 @@
       </p:grpSpPr>
       <p:sp>
         <p:nvSpPr>
+          <p:cNvPr id="6" name="Text Box 12">
+            <a:extLst>
+              <a:ext uri="{FF2B5EF4-FFF2-40B4-BE49-F238E27FC236}">
+                <a16:creationId xmlns:a16="http://schemas.microsoft.com/office/drawing/2014/main" id="{BEA17A2D-ADBC-44E7-8241-0C2921ADB5E3}"/>
+              </a:ext>
+            </a:extLst>
+          </p:cNvPr>
+          <p:cNvSpPr txBox="1">
+            <a:spLocks noChangeArrowheads="1"/>
+          </p:cNvSpPr>
+          <p:nvPr/>
+        </p:nvSpPr>
+        <p:spPr bwMode="auto">
+          <a:xfrm>
+            <a:off x="1" y="908720"/>
+            <a:ext cx="12192000" cy="5256584"/>
+          </a:xfrm>
+          <a:prstGeom prst="rect">
+            <a:avLst/>
+          </a:prstGeom>
+          <a:noFill/>
+          <a:ln>
+            <a:noFill/>
+          </a:ln>
+          <a:effectLst/>
+          <a:extLst>
+            <a:ext uri="{909E8E84-426E-40DD-AFC4-6F175D3DCCD1}">
+              <a14:hiddenFill xmlns:a14="http://schemas.microsoft.com/office/drawing/2010/main">
+                <a:solidFill>
+                  <a:schemeClr val="accent1"/>
+                </a:solidFill>
+              </a14:hiddenFill>
+            </a:ext>
+            <a:ext uri="{91240B29-F687-4F45-9708-019B960494DF}">
+              <a14:hiddenLine xmlns:a14="http://schemas.microsoft.com/office/drawing/2010/main" w="9525">
+                <a:solidFill>
+                  <a:schemeClr val="tx1"/>
+                </a:solidFill>
+                <a:miter lim="800000"/>
+                <a:headEnd/>
+                <a:tailEnd/>
+              </a14:hiddenLine>
+            </a:ext>
+            <a:ext uri="{AF507438-7753-43E0-B8FC-AC1667EBCBE1}">
+              <a14:hiddenEffects xmlns:a14="http://schemas.microsoft.com/office/drawing/2010/main">
+                <a:effectLst>
+                  <a:outerShdw dist="35921" dir="2700000" algn="ctr" rotWithShape="0">
+                    <a:schemeClr val="bg2"/>
+                  </a:outerShdw>
+                </a:effectLst>
+              </a14:hiddenEffects>
+            </a:ext>
+          </a:extLst>
+        </p:spPr>
+        <p:txBody>
+          <a:bodyPr wrap="square">
+            <a:noAutofit/>
+          </a:bodyPr>
+          <a:lstStyle/>
+          <a:p>
+            <a:pPr algn="ctr"/>
+            <a:endParaRPr lang="en-GB" altLang="zh-TW" sz="2200" b="1" dirty="0">
+              <a:solidFill>
+                <a:schemeClr val="bg1"/>
+              </a:solidFill>
+              <a:latin typeface="Century Gothic" panose="020B0502020202020204" pitchFamily="34" charset="0"/>
+              <a:ea typeface="金梅新中楷全字體" panose="02010509060101010101" pitchFamily="49" charset="-120"/>
+            </a:endParaRPr>
+          </a:p>
+        </p:txBody>
+      </p:sp>
+      <p:sp>
+        <p:nvSpPr>
+          <p:cNvPr id="7" name="Text Box 12">
+            <a:extLst>
+              <a:ext uri="{FF2B5EF4-FFF2-40B4-BE49-F238E27FC236}">
+                <a16:creationId xmlns:a16="http://schemas.microsoft.com/office/drawing/2014/main" id="{4A814393-22EC-4030-B099-593A4A5B942E}"/>
+              </a:ext>
+            </a:extLst>
+          </p:cNvPr>
+          <p:cNvSpPr txBox="1">
+            <a:spLocks noChangeArrowheads="1"/>
+          </p:cNvSpPr>
+          <p:nvPr/>
+        </p:nvSpPr>
+        <p:spPr bwMode="auto">
+          <a:xfrm>
+            <a:off x="1871470" y="260648"/>
+            <a:ext cx="8449060" cy="648072"/>
+          </a:xfrm>
+          <a:prstGeom prst="rect">
+            <a:avLst/>
+          </a:prstGeom>
+          <a:noFill/>
+          <a:ln>
+            <a:noFill/>
+          </a:ln>
+          <a:effectLst/>
+          <a:extLst>
+            <a:ext uri="{909E8E84-426E-40DD-AFC4-6F175D3DCCD1}">
+              <a14:hiddenFill xmlns:a14="http://schemas.microsoft.com/office/drawing/2010/main">
+                <a:solidFill>
+                  <a:schemeClr val="accent1"/>
+                </a:solidFill>
+              </a14:hiddenFill>
+            </a:ext>
+            <a:ext uri="{91240B29-F687-4F45-9708-019B960494DF}">
+              <a14:hiddenLine xmlns:a14="http://schemas.microsoft.com/office/drawing/2010/main" w="9525">
+                <a:solidFill>
+                  <a:schemeClr val="tx1"/>
+                </a:solidFill>
+                <a:miter lim="800000"/>
+                <a:headEnd/>
+                <a:tailEnd/>
+              </a14:hiddenLine>
+            </a:ext>
+            <a:ext uri="{AF507438-7753-43E0-B8FC-AC1667EBCBE1}">
+              <a14:hiddenEffects xmlns:a14="http://schemas.microsoft.com/office/drawing/2010/main">
+                <a:effectLst>
+                  <a:outerShdw dist="35921" dir="2700000" algn="ctr" rotWithShape="0">
+                    <a:schemeClr val="bg2"/>
+                  </a:outerShdw>
+                </a:effectLst>
+              </a14:hiddenEffects>
+            </a:ext>
+          </a:extLst>
+        </p:spPr>
+        <p:txBody>
+          <a:bodyPr wrap="square">
+            <a:noAutofit/>
+          </a:bodyPr>
+          <a:lstStyle/>
+          <a:p>
+            <a:pPr algn="ctr"/>
+            <a:r>
+              <a:rPr lang="en-GB" altLang="en-US" sz="3200" b="1" u="sng" dirty="0">
+                <a:solidFill>
+                  <a:schemeClr val="bg1"/>
+                </a:solidFill>
+                <a:latin typeface="Century Gothic" panose="020B0502020202020204" pitchFamily="34" charset="0"/>
+              </a:rPr>
+              <a:t>Prayer Requests</a:t>
+            </a:r>
+            <a:r>
+              <a:rPr lang="en-GB" altLang="en-US" sz="3200" b="1" u="sng" dirty="0">
+                <a:solidFill>
+                  <a:schemeClr val="bg1"/>
+                </a:solidFill>
+                <a:latin typeface="Century Gothic" panose="020B0502020202020204" pitchFamily="34" charset="0"/>
+                <a:ea typeface="金梅新中楷全字體" panose="02010509060101010101" pitchFamily="49" charset="-120"/>
+              </a:rPr>
+              <a:t>- </a:t>
+            </a:r>
+            <a:r>
+              <a:rPr lang="zh-TW" altLang="en-US" sz="3200" b="1" u="sng" dirty="0">
+                <a:solidFill>
+                  <a:schemeClr val="bg1"/>
+                </a:solidFill>
+                <a:latin typeface="Century Gothic" panose="020B0502020202020204" pitchFamily="34" charset="0"/>
+                <a:ea typeface="金梅新中楷全字體" panose="02010509060101010101" pitchFamily="49" charset="-120"/>
+              </a:rPr>
+              <a:t>代禱</a:t>
+            </a:r>
+            <a:endParaRPr lang="en-GB" altLang="zh-TW" sz="3200" b="1" u="sng" dirty="0">
+              <a:solidFill>
+                <a:schemeClr val="bg1"/>
+              </a:solidFill>
+              <a:latin typeface="Century Gothic" panose="020B0502020202020204" pitchFamily="34" charset="0"/>
+              <a:ea typeface="金梅新中楷全字體" panose="02010509060101010101" pitchFamily="49" charset="-120"/>
+            </a:endParaRPr>
+          </a:p>
+        </p:txBody>
+      </p:sp>
+      <p:sp>
+        <p:nvSpPr>
           <p:cNvPr id="8" name="Title 1">
             <a:extLst>
               <a:ext uri="{FF2B5EF4-FFF2-40B4-BE49-F238E27FC236}">
@@ -5416,70 +5106,48 @@
               <a:rPr lang="en-GB" dirty="0">
                 <a:latin typeface="Century Gothic" panose="020B0502020202020204" pitchFamily="34" charset="0"/>
               </a:rPr>
-              <a:t>Prayer Requests (</a:t>
-            </a:r>
-            <a:r>
-              <a:rPr lang="en-GB" dirty="0" err="1">
-                <a:latin typeface="Century Gothic" panose="020B0502020202020204" pitchFamily="34" charset="0"/>
-              </a:rPr>
-              <a:t>Streamelements</a:t>
-            </a:r>
-            <a:r>
-              <a:rPr lang="en-GB" dirty="0">
-                <a:latin typeface="Century Gothic" panose="020B0502020202020204" pitchFamily="34" charset="0"/>
-              </a:rPr>
-              <a:t>)</a:t>
-            </a:r>
-          </a:p>
-        </p:txBody>
-      </p:sp>
-      <p:sp>
-        <p:nvSpPr>
-          <p:cNvPr id="2" name="TextBox 1">
+              <a:t>Prayer Requests</a:t>
+            </a:r>
+          </a:p>
+        </p:txBody>
+      </p:sp>
+      <p:pic>
+        <p:nvPicPr>
+          <p:cNvPr id="12" name="Picture 11" descr="Logo&#10;&#10;Description automatically generated with medium confidence">
             <a:extLst>
               <a:ext uri="{FF2B5EF4-FFF2-40B4-BE49-F238E27FC236}">
-                <a16:creationId xmlns:a16="http://schemas.microsoft.com/office/drawing/2014/main" id="{6EC0A171-41D3-4538-A3AA-95F4377BCA8B}"/>
+                <a16:creationId xmlns:a16="http://schemas.microsoft.com/office/drawing/2014/main" id="{283A1F9D-9D7A-BE3F-52D7-C209A5783C48}"/>
               </a:ext>
             </a:extLst>
           </p:cNvPr>
-          <p:cNvSpPr txBox="1"/>
+          <p:cNvPicPr>
+            <a:picLocks noChangeAspect="1"/>
+          </p:cNvPicPr>
           <p:nvPr/>
-        </p:nvSpPr>
+        </p:nvPicPr>
+        <p:blipFill>
+          <a:blip r:embed="rId2" cstate="print">
+            <a:extLst>
+              <a:ext uri="{28A0092B-C50C-407E-A947-70E740481C1C}">
+                <a14:useLocalDpi xmlns:a14="http://schemas.microsoft.com/office/drawing/2010/main" val="0"/>
+              </a:ext>
+            </a:extLst>
+          </a:blip>
+          <a:stretch>
+            <a:fillRect/>
+          </a:stretch>
+        </p:blipFill>
         <p:spPr>
           <a:xfrm>
-            <a:off x="3575720" y="3105834"/>
-            <a:ext cx="5040560" cy="646331"/>
+            <a:off x="335359" y="6269250"/>
+            <a:ext cx="2664297" cy="344791"/>
           </a:xfrm>
           <a:prstGeom prst="rect">
             <a:avLst/>
           </a:prstGeom>
-          <a:noFill/>
         </p:spPr>
-        <p:txBody>
-          <a:bodyPr wrap="square" rtlCol="0">
-            <a:spAutoFit/>
-          </a:bodyPr>
-          <a:lstStyle/>
-          <a:p>
-            <a:pPr algn="ctr"/>
-            <a:r>
-              <a:rPr lang="en-GB" sz="3600" b="1" dirty="0">
-                <a:solidFill>
-                  <a:schemeClr val="bg1"/>
-                </a:solidFill>
-                <a:latin typeface="Century Gothic" panose="020B0502020202020204" pitchFamily="34" charset="0"/>
-              </a:rPr>
-              <a:t>IMAGE PLACEHOLDER</a:t>
-            </a:r>
-          </a:p>
-        </p:txBody>
-      </p:sp>
+      </p:pic>
     </p:spTree>
-    <p:extLst>
-      <p:ext uri="{BB962C8B-B14F-4D97-AF65-F5344CB8AC3E}">
-        <p14:creationId xmlns:p14="http://schemas.microsoft.com/office/powerpoint/2010/main" val="3351645641"/>
-      </p:ext>
-    </p:extLst>
   </p:cSld>
   <p:clrMapOvr>
     <a:masterClrMapping/>
@@ -5520,8 +5188,8 @@
         </p:nvSpPr>
         <p:spPr bwMode="auto">
           <a:xfrm>
-            <a:off x="1524000" y="597314"/>
-            <a:ext cx="9144000" cy="6432086"/>
+            <a:off x="0" y="908720"/>
+            <a:ext cx="12192000" cy="5360530"/>
           </a:xfrm>
           <a:prstGeom prst="rect">
             <a:avLst/>
@@ -5593,7 +5261,7 @@
         </p:nvSpPr>
         <p:spPr bwMode="auto">
           <a:xfrm>
-            <a:off x="2615493" y="165266"/>
+            <a:off x="2615493" y="260648"/>
             <a:ext cx="6961014" cy="432048"/>
           </a:xfrm>
           <a:prstGeom prst="rect">
@@ -5714,186 +5382,21 @@
           </a:p>
         </p:txBody>
       </p:sp>
-      <p:sp>
-        <p:nvSpPr>
-          <p:cNvPr id="15" name="Text Box 11">
+      <p:pic>
+        <p:nvPicPr>
+          <p:cNvPr id="8" name="Picture 7" descr="Logo&#10;&#10;Description automatically generated with medium confidence">
             <a:extLst>
               <a:ext uri="{FF2B5EF4-FFF2-40B4-BE49-F238E27FC236}">
-                <a16:creationId xmlns:a16="http://schemas.microsoft.com/office/drawing/2014/main" id="{477ACD59-8BFC-4C4F-A03C-2734A0DDEA0E}"/>
-              </a:ext>
-            </a:extLst>
-          </p:cNvPr>
-          <p:cNvSpPr txBox="1">
-            <a:spLocks noChangeArrowheads="1"/>
-          </p:cNvSpPr>
-          <p:nvPr/>
-        </p:nvSpPr>
-        <p:spPr bwMode="auto">
-          <a:xfrm>
-            <a:off x="767482" y="6165304"/>
-            <a:ext cx="2736156" cy="338554"/>
-          </a:xfrm>
-          <a:prstGeom prst="rect">
-            <a:avLst/>
-          </a:prstGeom>
-          <a:noFill/>
-          <a:ln>
-            <a:noFill/>
-          </a:ln>
-          <a:effectLst/>
-          <a:extLst>
-            <a:ext uri="{909E8E84-426E-40DD-AFC4-6F175D3DCCD1}">
-              <a14:hiddenFill xmlns:a14="http://schemas.microsoft.com/office/drawing/2010/main">
-                <a:solidFill>
-                  <a:schemeClr val="accent1"/>
-                </a:solidFill>
-              </a14:hiddenFill>
-            </a:ext>
-            <a:ext uri="{91240B29-F687-4F45-9708-019B960494DF}">
-              <a14:hiddenLine xmlns:a14="http://schemas.microsoft.com/office/drawing/2010/main" w="9525">
-                <a:solidFill>
-                  <a:schemeClr val="tx1"/>
-                </a:solidFill>
-                <a:miter lim="800000"/>
-                <a:headEnd/>
-                <a:tailEnd/>
-              </a14:hiddenLine>
-            </a:ext>
-            <a:ext uri="{AF507438-7753-43E0-B8FC-AC1667EBCBE1}">
-              <a14:hiddenEffects xmlns:a14="http://schemas.microsoft.com/office/drawing/2010/main">
-                <a:effectLst>
-                  <a:outerShdw dist="35921" dir="2700000" algn="ctr" rotWithShape="0">
-                    <a:schemeClr val="bg2"/>
-                  </a:outerShdw>
-                </a:effectLst>
-              </a14:hiddenEffects>
-            </a:ext>
-          </a:extLst>
-        </p:spPr>
-        <p:txBody>
-          <a:bodyPr wrap="square">
-            <a:spAutoFit/>
-          </a:bodyPr>
-          <a:lstStyle/>
-          <a:p>
-            <a:pPr>
-              <a:spcBef>
-                <a:spcPct val="50000"/>
-              </a:spcBef>
-            </a:pPr>
-            <a:r>
-              <a:rPr lang="en-US" altLang="en-US" sz="1600" dirty="0">
-                <a:solidFill>
-                  <a:schemeClr val="bg1"/>
-                </a:solidFill>
-                <a:latin typeface="Century Gothic" panose="020B0502020202020204" pitchFamily="34" charset="0"/>
-                <a:ea typeface="金梅新中楷全字體" panose="02010509060101010101" pitchFamily="49" charset="-120"/>
-              </a:rPr>
-              <a:t>請 關 您 的 手 提 電 話 </a:t>
-            </a:r>
-          </a:p>
-        </p:txBody>
-      </p:sp>
-      <p:sp>
-        <p:nvSpPr>
-          <p:cNvPr id="16" name="Text Box 12">
-            <a:extLst>
-              <a:ext uri="{FF2B5EF4-FFF2-40B4-BE49-F238E27FC236}">
-                <a16:creationId xmlns:a16="http://schemas.microsoft.com/office/drawing/2014/main" id="{B3226B90-A60E-4858-9843-992A1A218231}"/>
-              </a:ext>
-            </a:extLst>
-          </p:cNvPr>
-          <p:cNvSpPr txBox="1">
-            <a:spLocks noChangeArrowheads="1"/>
-          </p:cNvSpPr>
-          <p:nvPr/>
-        </p:nvSpPr>
-        <p:spPr bwMode="auto">
-          <a:xfrm>
-            <a:off x="767482" y="6427242"/>
-            <a:ext cx="3672334" cy="276999"/>
-          </a:xfrm>
-          <a:prstGeom prst="rect">
-            <a:avLst/>
-          </a:prstGeom>
-          <a:noFill/>
-          <a:ln>
-            <a:noFill/>
-          </a:ln>
-          <a:effectLst/>
-          <a:extLst>
-            <a:ext uri="{909E8E84-426E-40DD-AFC4-6F175D3DCCD1}">
-              <a14:hiddenFill xmlns:a14="http://schemas.microsoft.com/office/drawing/2010/main">
-                <a:solidFill>
-                  <a:schemeClr val="accent1"/>
-                </a:solidFill>
-              </a14:hiddenFill>
-            </a:ext>
-            <a:ext uri="{91240B29-F687-4F45-9708-019B960494DF}">
-              <a14:hiddenLine xmlns:a14="http://schemas.microsoft.com/office/drawing/2010/main" w="9525">
-                <a:solidFill>
-                  <a:schemeClr val="tx1"/>
-                </a:solidFill>
-                <a:miter lim="800000"/>
-                <a:headEnd/>
-                <a:tailEnd/>
-              </a14:hiddenLine>
-            </a:ext>
-            <a:ext uri="{AF507438-7753-43E0-B8FC-AC1667EBCBE1}">
-              <a14:hiddenEffects xmlns:a14="http://schemas.microsoft.com/office/drawing/2010/main">
-                <a:effectLst>
-                  <a:outerShdw dist="35921" dir="2700000" algn="ctr" rotWithShape="0">
-                    <a:schemeClr val="bg2"/>
-                  </a:outerShdw>
-                </a:effectLst>
-              </a14:hiddenEffects>
-            </a:ext>
-          </a:extLst>
-        </p:spPr>
-        <p:txBody>
-          <a:bodyPr wrap="square">
-            <a:spAutoFit/>
-          </a:bodyPr>
-          <a:lstStyle/>
-          <a:p>
-            <a:pPr>
-              <a:spcBef>
-                <a:spcPct val="50000"/>
-              </a:spcBef>
-            </a:pPr>
-            <a:r>
-              <a:rPr lang="en-GB" altLang="en-US" sz="1200" b="1" dirty="0">
-                <a:solidFill>
-                  <a:schemeClr val="bg1"/>
-                </a:solidFill>
-                <a:latin typeface="Century Gothic" panose="020B0502020202020204" pitchFamily="34" charset="0"/>
-              </a:rPr>
-              <a:t>PLEASE SWITCH OFF YOUR MOBILE PHONE</a:t>
-            </a:r>
-            <a:endParaRPr lang="en-US" altLang="en-US" sz="1200" b="1" dirty="0">
-              <a:solidFill>
-                <a:schemeClr val="bg1"/>
-              </a:solidFill>
-              <a:latin typeface="Century Gothic" panose="020B0502020202020204" pitchFamily="34" charset="0"/>
-            </a:endParaRPr>
-          </a:p>
-        </p:txBody>
-      </p:sp>
-      <p:pic>
-        <p:nvPicPr>
-          <p:cNvPr id="17" name="Picture 2" descr="Custom No Mobile Phones Sign | The Sign Shed">
-            <a:extLst>
-              <a:ext uri="{FF2B5EF4-FFF2-40B4-BE49-F238E27FC236}">
-                <a16:creationId xmlns:a16="http://schemas.microsoft.com/office/drawing/2014/main" id="{118396B3-35BF-481E-B54E-C6514DEC0556}"/>
+                <a16:creationId xmlns:a16="http://schemas.microsoft.com/office/drawing/2014/main" id="{A65649BC-6B24-CAB9-AF72-440EBBC7D223}"/>
               </a:ext>
             </a:extLst>
           </p:cNvPr>
           <p:cNvPicPr>
-            <a:picLocks noChangeAspect="1" noChangeArrowheads="1"/>
+            <a:picLocks noChangeAspect="1"/>
           </p:cNvPicPr>
           <p:nvPr/>
         </p:nvPicPr>
-        <p:blipFill rotWithShape="1">
+        <p:blipFill>
           <a:blip r:embed="rId2" cstate="print">
             <a:extLst>
               <a:ext uri="{28A0092B-C50C-407E-A947-70E740481C1C}">
@@ -5901,27 +5404,18 @@
               </a:ext>
             </a:extLst>
           </a:blip>
-          <a:srcRect l="3327" t="11250" r="71169" b="12911"/>
-          <a:stretch/>
+          <a:stretch>
+            <a:fillRect/>
+          </a:stretch>
         </p:blipFill>
-        <p:spPr bwMode="auto">
+        <p:spPr>
           <a:xfrm>
-            <a:off x="335360" y="6202015"/>
-            <a:ext cx="432048" cy="432048"/>
+            <a:off x="335359" y="6269250"/>
+            <a:ext cx="2664297" cy="344791"/>
           </a:xfrm>
           <a:prstGeom prst="rect">
             <a:avLst/>
           </a:prstGeom>
-          <a:noFill/>
-          <a:extLst>
-            <a:ext uri="{909E8E84-426E-40DD-AFC4-6F175D3DCCD1}">
-              <a14:hiddenFill xmlns:a14="http://schemas.microsoft.com/office/drawing/2010/main">
-                <a:solidFill>
-                  <a:srgbClr val="FFFFFF"/>
-                </a:solidFill>
-              </a14:hiddenFill>
-            </a:ext>
-          </a:extLst>
         </p:spPr>
       </p:pic>
     </p:spTree>
@@ -5968,7 +5462,7 @@
         </p:nvSpPr>
         <p:spPr>
           <a:xfrm>
-            <a:off x="623392" y="1418731"/>
+            <a:off x="551384" y="2204864"/>
             <a:ext cx="5616624" cy="735779"/>
           </a:xfrm>
           <a:prstGeom prst="rect">
@@ -5988,23 +5482,23 @@
               </a:lnSpc>
             </a:pPr>
             <a:r>
-              <a:rPr lang="en-GB" sz="3200" b="1" dirty="0">
+              <a:rPr lang="en-GB" sz="3200" dirty="0">
                 <a:solidFill>
                   <a:schemeClr val="bg1"/>
                 </a:solidFill>
                 <a:latin typeface="Century Gothic" panose="020B0502020202020204" pitchFamily="34" charset="0"/>
               </a:rPr>
-              <a:t>Bread:</a:t>
-            </a:r>
-          </a:p>
-        </p:txBody>
-      </p:sp>
-      <p:sp>
-        <p:nvSpPr>
-          <p:cNvPr id="9" name="TextBox 8">
+              <a:t>-</a:t>
+            </a:r>
+          </a:p>
+        </p:txBody>
+      </p:sp>
+      <p:sp>
+        <p:nvSpPr>
+          <p:cNvPr id="11" name="TextBox 10">
             <a:extLst>
               <a:ext uri="{FF2B5EF4-FFF2-40B4-BE49-F238E27FC236}">
-                <a16:creationId xmlns:a16="http://schemas.microsoft.com/office/drawing/2014/main" id="{4A2FC0DC-54B3-4412-B6AE-526721ED8741}"/>
+                <a16:creationId xmlns:a16="http://schemas.microsoft.com/office/drawing/2014/main" id="{60901149-CE29-414A-E785-70ADD41E8777}"/>
               </a:ext>
             </a:extLst>
           </p:cNvPr>
@@ -6013,7 +5507,7 @@
         </p:nvSpPr>
         <p:spPr>
           <a:xfrm>
-            <a:off x="5951984" y="1418731"/>
+            <a:off x="5879976" y="2204864"/>
             <a:ext cx="5616624" cy="735779"/>
           </a:xfrm>
           <a:prstGeom prst="rect">
@@ -6033,13 +5527,13 @@
               </a:lnSpc>
             </a:pPr>
             <a:r>
-              <a:rPr lang="en-GB" sz="3200" b="1" dirty="0">
+              <a:rPr lang="en-GB" sz="3200" dirty="0">
                 <a:solidFill>
                   <a:schemeClr val="bg1"/>
                 </a:solidFill>
                 <a:latin typeface="Century Gothic" panose="020B0502020202020204" pitchFamily="34" charset="0"/>
               </a:rPr>
-              <a:t>Cup:</a:t>
+              <a:t>-</a:t>
             </a:r>
           </a:p>
         </p:txBody>
@@ -6060,7 +5554,7 @@
         </p:nvSpPr>
         <p:spPr bwMode="auto">
           <a:xfrm>
-            <a:off x="2615493" y="165266"/>
+            <a:off x="2615493" y="333015"/>
             <a:ext cx="6961014" cy="671446"/>
           </a:xfrm>
           <a:prstGeom prst="rect">
@@ -6171,237 +5665,132 @@
           </a:p>
         </p:txBody>
       </p:sp>
-      <p:grpSp>
-        <p:nvGrpSpPr>
-          <p:cNvPr id="3" name="Group 2">
+      <p:pic>
+        <p:nvPicPr>
+          <p:cNvPr id="10" name="Picture 9" descr="Logo&#10;&#10;Description automatically generated with medium confidence">
             <a:extLst>
               <a:ext uri="{FF2B5EF4-FFF2-40B4-BE49-F238E27FC236}">
-                <a16:creationId xmlns:a16="http://schemas.microsoft.com/office/drawing/2014/main" id="{840D6C36-748A-4206-AE63-8E2CE72D6360}"/>
+                <a16:creationId xmlns:a16="http://schemas.microsoft.com/office/drawing/2014/main" id="{09972652-1A6A-1B4B-0131-D25F4E4DEDD8}"/>
               </a:ext>
             </a:extLst>
           </p:cNvPr>
-          <p:cNvGrpSpPr/>
+          <p:cNvPicPr>
+            <a:picLocks noChangeAspect="1"/>
+          </p:cNvPicPr>
           <p:nvPr/>
-        </p:nvGrpSpPr>
-        <p:grpSpPr>
-          <a:xfrm>
-            <a:off x="335360" y="6165304"/>
-            <a:ext cx="4104456" cy="538937"/>
-            <a:chOff x="335360" y="6165304"/>
-            <a:chExt cx="4104456" cy="538937"/>
-          </a:xfrm>
-        </p:grpSpPr>
-        <p:sp>
-          <p:nvSpPr>
-            <p:cNvPr id="15" name="Text Box 11">
-              <a:extLst>
-                <a:ext uri="{FF2B5EF4-FFF2-40B4-BE49-F238E27FC236}">
-                  <a16:creationId xmlns:a16="http://schemas.microsoft.com/office/drawing/2014/main" id="{477ACD59-8BFC-4C4F-A03C-2734A0DDEA0E}"/>
-                </a:ext>
-              </a:extLst>
-            </p:cNvPr>
-            <p:cNvSpPr txBox="1">
-              <a:spLocks noChangeArrowheads="1"/>
-            </p:cNvSpPr>
-            <p:nvPr/>
-          </p:nvSpPr>
-          <p:spPr bwMode="auto">
-            <a:xfrm>
-              <a:off x="767482" y="6165304"/>
-              <a:ext cx="2736156" cy="338554"/>
-            </a:xfrm>
-            <a:prstGeom prst="rect">
-              <a:avLst/>
-            </a:prstGeom>
-            <a:noFill/>
-            <a:ln>
-              <a:noFill/>
-            </a:ln>
-            <a:effectLst/>
+        </p:nvPicPr>
+        <p:blipFill>
+          <a:blip r:embed="rId2" cstate="print">
             <a:extLst>
-              <a:ext uri="{909E8E84-426E-40DD-AFC4-6F175D3DCCD1}">
-                <a14:hiddenFill xmlns:a14="http://schemas.microsoft.com/office/drawing/2010/main">
-                  <a:solidFill>
-                    <a:schemeClr val="accent1"/>
-                  </a:solidFill>
-                </a14:hiddenFill>
-              </a:ext>
-              <a:ext uri="{91240B29-F687-4F45-9708-019B960494DF}">
-                <a14:hiddenLine xmlns:a14="http://schemas.microsoft.com/office/drawing/2010/main" w="9525">
-                  <a:solidFill>
-                    <a:schemeClr val="tx1"/>
-                  </a:solidFill>
-                  <a:miter lim="800000"/>
-                  <a:headEnd/>
-                  <a:tailEnd/>
-                </a14:hiddenLine>
-              </a:ext>
-              <a:ext uri="{AF507438-7753-43E0-B8FC-AC1667EBCBE1}">
-                <a14:hiddenEffects xmlns:a14="http://schemas.microsoft.com/office/drawing/2010/main">
-                  <a:effectLst>
-                    <a:outerShdw dist="35921" dir="2700000" algn="ctr" rotWithShape="0">
-                      <a:schemeClr val="bg2"/>
-                    </a:outerShdw>
-                  </a:effectLst>
-                </a14:hiddenEffects>
+              <a:ext uri="{28A0092B-C50C-407E-A947-70E740481C1C}">
+                <a14:useLocalDpi xmlns:a14="http://schemas.microsoft.com/office/drawing/2010/main" val="0"/>
               </a:ext>
             </a:extLst>
-          </p:spPr>
-          <p:txBody>
-            <a:bodyPr wrap="square">
-              <a:spAutoFit/>
-            </a:bodyPr>
-            <a:lstStyle/>
-            <a:p>
-              <a:pPr>
-                <a:spcBef>
-                  <a:spcPct val="50000"/>
-                </a:spcBef>
-              </a:pPr>
-              <a:r>
-                <a:rPr lang="en-US" altLang="en-US" sz="1600" dirty="0">
-                  <a:solidFill>
-                    <a:schemeClr val="bg1"/>
-                  </a:solidFill>
-                  <a:latin typeface="Century Gothic" panose="020B0502020202020204" pitchFamily="34" charset="0"/>
-                  <a:ea typeface="金梅新中楷全字體" panose="02010509060101010101" pitchFamily="49" charset="-120"/>
-                </a:rPr>
-                <a:t>請 關 您 的 手 提 電 話 </a:t>
-              </a:r>
-            </a:p>
-          </p:txBody>
-        </p:sp>
-        <p:sp>
-          <p:nvSpPr>
-            <p:cNvPr id="16" name="Text Box 12">
-              <a:extLst>
-                <a:ext uri="{FF2B5EF4-FFF2-40B4-BE49-F238E27FC236}">
-                  <a16:creationId xmlns:a16="http://schemas.microsoft.com/office/drawing/2014/main" id="{B3226B90-A60E-4858-9843-992A1A218231}"/>
-                </a:ext>
-              </a:extLst>
-            </p:cNvPr>
-            <p:cNvSpPr txBox="1">
-              <a:spLocks noChangeArrowheads="1"/>
-            </p:cNvSpPr>
-            <p:nvPr/>
-          </p:nvSpPr>
-          <p:spPr bwMode="auto">
-            <a:xfrm>
-              <a:off x="767482" y="6427242"/>
-              <a:ext cx="3672334" cy="276999"/>
-            </a:xfrm>
-            <a:prstGeom prst="rect">
-              <a:avLst/>
-            </a:prstGeom>
-            <a:noFill/>
-            <a:ln>
-              <a:noFill/>
-            </a:ln>
-            <a:effectLst/>
+          </a:blip>
+          <a:stretch>
+            <a:fillRect/>
+          </a:stretch>
+        </p:blipFill>
+        <p:spPr>
+          <a:xfrm>
+            <a:off x="335359" y="6269250"/>
+            <a:ext cx="2664297" cy="344791"/>
+          </a:xfrm>
+          <a:prstGeom prst="rect">
+            <a:avLst/>
+          </a:prstGeom>
+        </p:spPr>
+      </p:pic>
+      <p:sp>
+        <p:nvSpPr>
+          <p:cNvPr id="7" name="TextBox 6">
             <a:extLst>
-              <a:ext uri="{909E8E84-426E-40DD-AFC4-6F175D3DCCD1}">
-                <a14:hiddenFill xmlns:a14="http://schemas.microsoft.com/office/drawing/2010/main">
-                  <a:solidFill>
-                    <a:schemeClr val="accent1"/>
-                  </a:solidFill>
-                </a14:hiddenFill>
-              </a:ext>
-              <a:ext uri="{91240B29-F687-4F45-9708-019B960494DF}">
-                <a14:hiddenLine xmlns:a14="http://schemas.microsoft.com/office/drawing/2010/main" w="9525">
-                  <a:solidFill>
-                    <a:schemeClr val="tx1"/>
-                  </a:solidFill>
-                  <a:miter lim="800000"/>
-                  <a:headEnd/>
-                  <a:tailEnd/>
-                </a14:hiddenLine>
-              </a:ext>
-              <a:ext uri="{AF507438-7753-43E0-B8FC-AC1667EBCBE1}">
-                <a14:hiddenEffects xmlns:a14="http://schemas.microsoft.com/office/drawing/2010/main">
-                  <a:effectLst>
-                    <a:outerShdw dist="35921" dir="2700000" algn="ctr" rotWithShape="0">
-                      <a:schemeClr val="bg2"/>
-                    </a:outerShdw>
-                  </a:effectLst>
-                </a14:hiddenEffects>
+              <a:ext uri="{FF2B5EF4-FFF2-40B4-BE49-F238E27FC236}">
+                <a16:creationId xmlns:a16="http://schemas.microsoft.com/office/drawing/2014/main" id="{A120D86B-9412-FFFA-2E86-3E358DE4B992}"/>
               </a:ext>
             </a:extLst>
-          </p:spPr>
-          <p:txBody>
-            <a:bodyPr wrap="square">
-              <a:spAutoFit/>
-            </a:bodyPr>
-            <a:lstStyle/>
-            <a:p>
-              <a:pPr>
-                <a:spcBef>
-                  <a:spcPct val="50000"/>
-                </a:spcBef>
-              </a:pPr>
-              <a:r>
-                <a:rPr lang="en-GB" altLang="en-US" sz="1200" b="1" dirty="0">
-                  <a:solidFill>
-                    <a:schemeClr val="bg1"/>
-                  </a:solidFill>
-                  <a:latin typeface="Century Gothic" panose="020B0502020202020204" pitchFamily="34" charset="0"/>
-                </a:rPr>
-                <a:t>PLEASE SWITCH OFF YOUR MOBILE PHONE</a:t>
-              </a:r>
-              <a:endParaRPr lang="en-US" altLang="en-US" sz="1200" b="1" dirty="0">
+          </p:cNvPr>
+          <p:cNvSpPr txBox="1"/>
+          <p:nvPr/>
+        </p:nvSpPr>
+        <p:spPr>
+          <a:xfrm>
+            <a:off x="551384" y="1495032"/>
+            <a:ext cx="5616624" cy="735779"/>
+          </a:xfrm>
+          <a:prstGeom prst="rect">
+            <a:avLst/>
+          </a:prstGeom>
+          <a:noFill/>
+        </p:spPr>
+        <p:txBody>
+          <a:bodyPr wrap="square" rtlCol="0">
+            <a:spAutoFit/>
+          </a:bodyPr>
+          <a:lstStyle/>
+          <a:p>
+            <a:pPr algn="ctr">
+              <a:lnSpc>
+                <a:spcPct val="150000"/>
+              </a:lnSpc>
+            </a:pPr>
+            <a:r>
+              <a:rPr lang="en-GB" sz="3200" b="1" dirty="0">
                 <a:solidFill>
                   <a:schemeClr val="bg1"/>
                 </a:solidFill>
                 <a:latin typeface="Century Gothic" panose="020B0502020202020204" pitchFamily="34" charset="0"/>
-              </a:endParaRPr>
-            </a:p>
-          </p:txBody>
-        </p:sp>
-        <p:pic>
-          <p:nvPicPr>
-            <p:cNvPr id="17" name="Picture 2" descr="Custom No Mobile Phones Sign | The Sign Shed">
-              <a:extLst>
-                <a:ext uri="{FF2B5EF4-FFF2-40B4-BE49-F238E27FC236}">
-                  <a16:creationId xmlns:a16="http://schemas.microsoft.com/office/drawing/2014/main" id="{118396B3-35BF-481E-B54E-C6514DEC0556}"/>
-                </a:ext>
-              </a:extLst>
-            </p:cNvPr>
-            <p:cNvPicPr>
-              <a:picLocks noChangeAspect="1" noChangeArrowheads="1"/>
-            </p:cNvPicPr>
-            <p:nvPr/>
-          </p:nvPicPr>
-          <p:blipFill rotWithShape="1">
-            <a:blip r:embed="rId2" cstate="print">
-              <a:extLst>
-                <a:ext uri="{28A0092B-C50C-407E-A947-70E740481C1C}">
-                  <a14:useLocalDpi xmlns:a14="http://schemas.microsoft.com/office/drawing/2010/main" val="0"/>
-                </a:ext>
-              </a:extLst>
-            </a:blip>
-            <a:srcRect l="3327" t="11250" r="71169" b="12911"/>
-            <a:stretch/>
-          </p:blipFill>
-          <p:spPr bwMode="auto">
-            <a:xfrm>
-              <a:off x="335360" y="6202015"/>
-              <a:ext cx="432048" cy="432048"/>
-            </a:xfrm>
-            <a:prstGeom prst="rect">
-              <a:avLst/>
-            </a:prstGeom>
-            <a:noFill/>
+              </a:rPr>
+              <a:t>Bread:</a:t>
+            </a:r>
+          </a:p>
+        </p:txBody>
+      </p:sp>
+      <p:sp>
+        <p:nvSpPr>
+          <p:cNvPr id="8" name="TextBox 7">
             <a:extLst>
-              <a:ext uri="{909E8E84-426E-40DD-AFC4-6F175D3DCCD1}">
-                <a14:hiddenFill xmlns:a14="http://schemas.microsoft.com/office/drawing/2010/main">
-                  <a:solidFill>
-                    <a:srgbClr val="FFFFFF"/>
-                  </a:solidFill>
-                </a14:hiddenFill>
+              <a:ext uri="{FF2B5EF4-FFF2-40B4-BE49-F238E27FC236}">
+                <a16:creationId xmlns:a16="http://schemas.microsoft.com/office/drawing/2014/main" id="{FAE06038-3F4F-5E0F-699C-9FFE1D160046}"/>
               </a:ext>
             </a:extLst>
-          </p:spPr>
-        </p:pic>
-      </p:grpSp>
+          </p:cNvPr>
+          <p:cNvSpPr txBox="1"/>
+          <p:nvPr/>
+        </p:nvSpPr>
+        <p:spPr>
+          <a:xfrm>
+            <a:off x="5889398" y="1542131"/>
+            <a:ext cx="5616624" cy="735779"/>
+          </a:xfrm>
+          <a:prstGeom prst="rect">
+            <a:avLst/>
+          </a:prstGeom>
+          <a:noFill/>
+        </p:spPr>
+        <p:txBody>
+          <a:bodyPr wrap="square" rtlCol="0">
+            <a:spAutoFit/>
+          </a:bodyPr>
+          <a:lstStyle/>
+          <a:p>
+            <a:pPr algn="ctr">
+              <a:lnSpc>
+                <a:spcPct val="150000"/>
+              </a:lnSpc>
+            </a:pPr>
+            <a:r>
+              <a:rPr lang="en-GB" sz="3200" b="1" dirty="0">
+                <a:solidFill>
+                  <a:schemeClr val="bg1"/>
+                </a:solidFill>
+                <a:latin typeface="Century Gothic" panose="020B0502020202020204" pitchFamily="34" charset="0"/>
+              </a:rPr>
+              <a:t>Cup:</a:t>
+            </a:r>
+          </a:p>
+        </p:txBody>
+      </p:sp>
     </p:spTree>
     <p:extLst>
       <p:ext uri="{BB962C8B-B14F-4D97-AF65-F5344CB8AC3E}">
@@ -6470,256 +5859,13 @@
       </p:sp>
       <p:sp>
         <p:nvSpPr>
-          <p:cNvPr id="7171" name="Content Placeholder 2"/>
-          <p:cNvSpPr>
-            <a:spLocks noGrp="1"/>
-          </p:cNvSpPr>
-          <p:nvPr>
-            <p:ph idx="1"/>
-          </p:nvPr>
-        </p:nvSpPr>
-        <p:spPr/>
-        <p:txBody>
-          <a:bodyPr/>
-          <a:lstStyle/>
-          <a:p>
-            <a:pPr marL="0" indent="0">
-              <a:buNone/>
-            </a:pPr>
-            <a:endParaRPr lang="en-GB" altLang="en-US" sz="800" b="1" dirty="0">
-              <a:solidFill>
-                <a:schemeClr val="bg1"/>
-              </a:solidFill>
-              <a:latin typeface="Century Gothic" panose="020B0502020202020204" pitchFamily="34" charset="0"/>
-            </a:endParaRPr>
-          </a:p>
-          <a:p>
-            <a:pPr marL="0" indent="0">
-              <a:buNone/>
-            </a:pPr>
-            <a:r>
-              <a:rPr lang="en-GB" altLang="en-US" sz="2600" b="1" dirty="0">
-                <a:solidFill>
-                  <a:schemeClr val="bg1"/>
-                </a:solidFill>
-                <a:latin typeface="Century Gothic" panose="020B0502020202020204" pitchFamily="34" charset="0"/>
-              </a:rPr>
-              <a:t>Begin : </a:t>
-            </a:r>
-            <a:r>
-              <a:rPr lang="en-GB" altLang="en-US" sz="2600" dirty="0">
-                <a:solidFill>
-                  <a:schemeClr val="bg1"/>
-                </a:solidFill>
-                <a:latin typeface="Century Gothic" panose="020B0502020202020204" pitchFamily="34" charset="0"/>
-              </a:rPr>
-              <a:t>Hallelujah in the name of Jesus Christ I pray</a:t>
-            </a:r>
-          </a:p>
-          <a:p>
-            <a:pPr marL="0" indent="0">
-              <a:buNone/>
-            </a:pPr>
-            <a:r>
-              <a:rPr lang="zh-TW" altLang="en-US" b="1" dirty="0">
-                <a:solidFill>
-                  <a:schemeClr val="bg1"/>
-                </a:solidFill>
-                <a:latin typeface="Century Gothic" panose="020B0502020202020204" pitchFamily="34" charset="0"/>
-                <a:ea typeface="金梅新中楷全字體" pitchFamily="49" charset="-120"/>
-              </a:rPr>
-              <a:t>開始</a:t>
-            </a:r>
-            <a:r>
-              <a:rPr lang="en-GB" altLang="zh-TW" b="1" dirty="0">
-                <a:solidFill>
-                  <a:schemeClr val="bg1"/>
-                </a:solidFill>
-                <a:latin typeface="Century Gothic" panose="020B0502020202020204" pitchFamily="34" charset="0"/>
-                <a:ea typeface="金梅新中楷全字體" pitchFamily="49" charset="-120"/>
-              </a:rPr>
-              <a:t> : </a:t>
-            </a:r>
-            <a:r>
-              <a:rPr lang="zh-TW" altLang="en-US" b="1" dirty="0">
-                <a:solidFill>
-                  <a:schemeClr val="bg1"/>
-                </a:solidFill>
-                <a:latin typeface="Century Gothic" panose="020B0502020202020204" pitchFamily="34" charset="0"/>
-                <a:ea typeface="金梅新中楷全字體" pitchFamily="49" charset="-120"/>
-              </a:rPr>
-              <a:t>哈利路亞奉主耶穌聖名禱告</a:t>
-            </a:r>
-            <a:endParaRPr lang="en-GB" altLang="zh-TW" dirty="0">
-              <a:solidFill>
-                <a:schemeClr val="bg1"/>
-              </a:solidFill>
-              <a:latin typeface="Century Gothic" panose="020B0502020202020204" pitchFamily="34" charset="0"/>
-              <a:ea typeface="金梅新中楷全字體" pitchFamily="49" charset="-120"/>
-            </a:endParaRPr>
-          </a:p>
-          <a:p>
-            <a:pPr marL="0" indent="0">
-              <a:buNone/>
-            </a:pPr>
-            <a:endParaRPr lang="en-GB" altLang="en-US" sz="800" b="1" dirty="0">
-              <a:solidFill>
-                <a:schemeClr val="bg1"/>
-              </a:solidFill>
-              <a:latin typeface="Century Gothic" panose="020B0502020202020204" pitchFamily="34" charset="0"/>
-            </a:endParaRPr>
-          </a:p>
-          <a:p>
-            <a:pPr marL="0" indent="0">
-              <a:buNone/>
-            </a:pPr>
-            <a:r>
-              <a:rPr lang="en-GB" altLang="en-US" sz="2600" b="1" dirty="0">
-                <a:solidFill>
-                  <a:schemeClr val="bg1"/>
-                </a:solidFill>
-                <a:latin typeface="Century Gothic" panose="020B0502020202020204" pitchFamily="34" charset="0"/>
-              </a:rPr>
-              <a:t>During :</a:t>
-            </a:r>
-            <a:r>
-              <a:rPr lang="en-GB" altLang="en-US" sz="2600" dirty="0">
-                <a:solidFill>
-                  <a:schemeClr val="bg1"/>
-                </a:solidFill>
-                <a:latin typeface="Century Gothic" panose="020B0502020202020204" pitchFamily="34" charset="0"/>
-              </a:rPr>
-              <a:t> Hallelujah praise the Lord Jesus</a:t>
-            </a:r>
-          </a:p>
-          <a:p>
-            <a:pPr marL="0" indent="0">
-              <a:buNone/>
-            </a:pPr>
-            <a:r>
-              <a:rPr lang="zh-TW" altLang="en-US" b="1" dirty="0">
-                <a:solidFill>
-                  <a:schemeClr val="bg1"/>
-                </a:solidFill>
-                <a:latin typeface="Century Gothic" panose="020B0502020202020204" pitchFamily="34" charset="0"/>
-                <a:ea typeface="金梅新中楷全字體" pitchFamily="49" charset="-120"/>
-              </a:rPr>
-              <a:t>中間 </a:t>
-            </a:r>
-            <a:r>
-              <a:rPr lang="en-GB" altLang="zh-TW" b="1" dirty="0">
-                <a:solidFill>
-                  <a:schemeClr val="bg1"/>
-                </a:solidFill>
-                <a:latin typeface="Century Gothic" panose="020B0502020202020204" pitchFamily="34" charset="0"/>
-                <a:ea typeface="金梅新中楷全字體" pitchFamily="49" charset="-120"/>
-              </a:rPr>
-              <a:t>: </a:t>
-            </a:r>
-            <a:r>
-              <a:rPr lang="zh-TW" altLang="en-US" b="1" dirty="0">
-                <a:solidFill>
-                  <a:schemeClr val="bg1"/>
-                </a:solidFill>
-                <a:latin typeface="Century Gothic" panose="020B0502020202020204" pitchFamily="34" charset="0"/>
-                <a:ea typeface="金梅新中楷全字體" pitchFamily="49" charset="-120"/>
-              </a:rPr>
-              <a:t>哈利路亞讚美主耶穌</a:t>
-            </a:r>
-            <a:endParaRPr lang="en-GB" altLang="zh-TW" dirty="0">
-              <a:solidFill>
-                <a:schemeClr val="bg1"/>
-              </a:solidFill>
-              <a:latin typeface="Century Gothic" panose="020B0502020202020204" pitchFamily="34" charset="0"/>
-              <a:ea typeface="金梅新中楷全字體" pitchFamily="49" charset="-120"/>
-            </a:endParaRPr>
-          </a:p>
-          <a:p>
-            <a:pPr marL="0" indent="0">
-              <a:buNone/>
-            </a:pPr>
-            <a:endParaRPr lang="en-GB" altLang="en-US" sz="800" b="1" dirty="0">
-              <a:solidFill>
-                <a:schemeClr val="bg1"/>
-              </a:solidFill>
-              <a:latin typeface="Century Gothic" panose="020B0502020202020204" pitchFamily="34" charset="0"/>
-            </a:endParaRPr>
-          </a:p>
-          <a:p>
-            <a:pPr marL="0" indent="0">
-              <a:buNone/>
-            </a:pPr>
-            <a:r>
-              <a:rPr lang="en-GB" altLang="en-US" sz="2600" b="1" dirty="0">
-                <a:solidFill>
-                  <a:schemeClr val="bg1"/>
-                </a:solidFill>
-                <a:latin typeface="Century Gothic" panose="020B0502020202020204" pitchFamily="34" charset="0"/>
-              </a:rPr>
-              <a:t>End : </a:t>
-            </a:r>
-            <a:r>
-              <a:rPr lang="en-GB" altLang="en-US" sz="2600" dirty="0">
-                <a:solidFill>
-                  <a:schemeClr val="bg1"/>
-                </a:solidFill>
-                <a:latin typeface="Century Gothic" panose="020B0502020202020204" pitchFamily="34" charset="0"/>
-              </a:rPr>
-              <a:t>Amen</a:t>
-            </a:r>
-          </a:p>
-          <a:p>
-            <a:pPr marL="0" indent="0">
-              <a:buNone/>
-            </a:pPr>
-            <a:r>
-              <a:rPr lang="zh-TW" altLang="en-US" b="1" dirty="0">
-                <a:solidFill>
-                  <a:schemeClr val="bg1"/>
-                </a:solidFill>
-                <a:latin typeface="Century Gothic" panose="020B0502020202020204" pitchFamily="34" charset="0"/>
-                <a:ea typeface="金梅新中楷全字體" pitchFamily="49" charset="-120"/>
-              </a:rPr>
-              <a:t>結束 </a:t>
-            </a:r>
-            <a:r>
-              <a:rPr lang="en-GB" altLang="zh-TW" b="1" dirty="0">
-                <a:solidFill>
-                  <a:schemeClr val="bg1"/>
-                </a:solidFill>
-                <a:latin typeface="Century Gothic" panose="020B0502020202020204" pitchFamily="34" charset="0"/>
-                <a:ea typeface="金梅新中楷全字體" pitchFamily="49" charset="-120"/>
-              </a:rPr>
-              <a:t>: </a:t>
-            </a:r>
-            <a:r>
-              <a:rPr lang="zh-TW" altLang="en-US" b="1" dirty="0">
-                <a:solidFill>
-                  <a:schemeClr val="bg1"/>
-                </a:solidFill>
-                <a:latin typeface="Century Gothic" panose="020B0502020202020204" pitchFamily="34" charset="0"/>
-                <a:ea typeface="金梅新中楷全字體" pitchFamily="49" charset="-120"/>
-              </a:rPr>
-              <a:t>阿們</a:t>
-            </a:r>
-            <a:endParaRPr lang="en-GB" altLang="en-US" sz="2800" dirty="0">
-              <a:solidFill>
-                <a:schemeClr val="bg1"/>
-              </a:solidFill>
-              <a:latin typeface="Century Gothic" panose="020B0502020202020204" pitchFamily="34" charset="0"/>
-            </a:endParaRPr>
-          </a:p>
-        </p:txBody>
-      </p:sp>
-      <p:sp>
-        <p:nvSpPr>
           <p:cNvPr id="2" name="TextBox 1"/>
           <p:cNvSpPr txBox="1"/>
           <p:nvPr/>
         </p:nvSpPr>
         <p:spPr>
           <a:xfrm>
-            <a:off x="839416" y="116632"/>
+            <a:off x="965684" y="391868"/>
             <a:ext cx="10260632" cy="1815882"/>
           </a:xfrm>
           <a:prstGeom prst="rect">
@@ -6741,24 +5887,7 @@
                 </a:solidFill>
                 <a:latin typeface="Century Gothic" panose="020B0502020202020204" pitchFamily="34" charset="0"/>
               </a:rPr>
-              <a:t>Welcome To True Jesus Church </a:t>
-            </a:r>
-            <a:br>
-              <a:rPr lang="en-GB" altLang="en-US" sz="2800" b="1" dirty="0">
-                <a:solidFill>
-                  <a:schemeClr val="bg1"/>
-                </a:solidFill>
-                <a:latin typeface="Century Gothic" panose="020B0502020202020204" pitchFamily="34" charset="0"/>
-              </a:rPr>
-            </a:br>
-            <a:r>
-              <a:rPr lang="en-GB" altLang="en-US" sz="2800" b="1" dirty="0">
-                <a:solidFill>
-                  <a:schemeClr val="bg1"/>
-                </a:solidFill>
-                <a:latin typeface="Century Gothic" panose="020B0502020202020204" pitchFamily="34" charset="0"/>
-              </a:rPr>
-              <a:t>Please Join Us In Prayer </a:t>
+              <a:t>Welcome To True Jesus Church , Please Join Us In Prayer </a:t>
             </a:r>
             <a:br>
               <a:rPr lang="en-GB" altLang="en-US" sz="2800" b="1" dirty="0">
@@ -6795,194 +5924,458 @@
                 <a:latin typeface="Century Gothic" panose="020B0502020202020204" pitchFamily="34" charset="0"/>
                 <a:ea typeface="金梅新中楷全字體" pitchFamily="49" charset="-120"/>
               </a:rPr>
-              <a:t>----------------------------------------------</a:t>
-            </a:r>
-            <a:endParaRPr lang="en-GB" sz="2800" dirty="0">
+              <a:t>-------------------------------------------------------------------</a:t>
+            </a:r>
+          </a:p>
+          <a:p>
+            <a:pPr algn="ctr"/>
+            <a:endParaRPr lang="en-GB" sz="2800" b="1" dirty="0">
+              <a:solidFill>
+                <a:schemeClr val="bg1"/>
+              </a:solidFill>
               <a:latin typeface="Century Gothic" panose="020B0502020202020204" pitchFamily="34" charset="0"/>
+              <a:ea typeface="金梅新中楷全字體" pitchFamily="49" charset="-120"/>
             </a:endParaRPr>
           </a:p>
         </p:txBody>
       </p:sp>
       <p:sp>
         <p:nvSpPr>
-          <p:cNvPr id="8" name="Text Box 11">
+          <p:cNvPr id="11" name="TextBox 10">
             <a:extLst>
               <a:ext uri="{FF2B5EF4-FFF2-40B4-BE49-F238E27FC236}">
-                <a16:creationId xmlns:a16="http://schemas.microsoft.com/office/drawing/2014/main" id="{95CA427C-F5C8-4A7C-B9BD-B79C02C03968}"/>
+                <a16:creationId xmlns:a16="http://schemas.microsoft.com/office/drawing/2014/main" id="{235016D5-86EA-E742-B39A-4D64FDB8E053}"/>
               </a:ext>
             </a:extLst>
           </p:cNvPr>
-          <p:cNvSpPr txBox="1">
-            <a:spLocks noChangeArrowheads="1"/>
-          </p:cNvSpPr>
+          <p:cNvSpPr txBox="1"/>
           <p:nvPr/>
         </p:nvSpPr>
-        <p:spPr bwMode="auto">
+        <p:spPr>
           <a:xfrm>
-            <a:off x="767482" y="6165304"/>
-            <a:ext cx="2736156" cy="338554"/>
+            <a:off x="335360" y="2111239"/>
+            <a:ext cx="5760640" cy="3416320"/>
           </a:xfrm>
           <a:prstGeom prst="rect">
             <a:avLst/>
           </a:prstGeom>
           <a:noFill/>
-          <a:ln>
-            <a:noFill/>
-          </a:ln>
-          <a:effectLst/>
-          <a:extLst>
-            <a:ext uri="{909E8E84-426E-40DD-AFC4-6F175D3DCCD1}">
-              <a14:hiddenFill xmlns:a14="http://schemas.microsoft.com/office/drawing/2010/main">
-                <a:solidFill>
-                  <a:schemeClr val="accent1"/>
-                </a:solidFill>
-              </a14:hiddenFill>
-            </a:ext>
-            <a:ext uri="{91240B29-F687-4F45-9708-019B960494DF}">
-              <a14:hiddenLine xmlns:a14="http://schemas.microsoft.com/office/drawing/2010/main" w="9525">
-                <a:solidFill>
-                  <a:schemeClr val="tx1"/>
-                </a:solidFill>
-                <a:miter lim="800000"/>
-                <a:headEnd/>
-                <a:tailEnd/>
-              </a14:hiddenLine>
-            </a:ext>
-            <a:ext uri="{AF507438-7753-43E0-B8FC-AC1667EBCBE1}">
-              <a14:hiddenEffects xmlns:a14="http://schemas.microsoft.com/office/drawing/2010/main">
-                <a:effectLst>
-                  <a:outerShdw dist="35921" dir="2700000" algn="ctr" rotWithShape="0">
-                    <a:schemeClr val="bg2"/>
-                  </a:outerShdw>
-                </a:effectLst>
-              </a14:hiddenEffects>
-            </a:ext>
-          </a:extLst>
         </p:spPr>
         <p:txBody>
-          <a:bodyPr wrap="square">
+          <a:bodyPr wrap="square" lIns="0" rtlCol="0" anchor="ctr">
             <a:spAutoFit/>
           </a:bodyPr>
           <a:lstStyle/>
           <a:p>
-            <a:pPr>
-              <a:spcBef>
-                <a:spcPct val="50000"/>
-              </a:spcBef>
-            </a:pPr>
-            <a:r>
-              <a:rPr lang="en-US" altLang="en-US" sz="1600" dirty="0">
-                <a:solidFill>
-                  <a:schemeClr val="bg1"/>
-                </a:solidFill>
+            <a:pPr algn="l"/>
+            <a:r>
+              <a:rPr lang="en-GB" sz="2400" i="0" dirty="0">
+                <a:solidFill>
+                  <a:srgbClr val="FFFFFF"/>
+                </a:solidFill>
+                <a:effectLst/>
                 <a:latin typeface="Century Gothic" panose="020B0502020202020204" pitchFamily="34" charset="0"/>
-                <a:ea typeface="金梅新中楷全字體" panose="02010509060101010101" pitchFamily="49" charset="-120"/>
               </a:rPr>
-              <a:t>請 關 您 的 手 提 電 話 </a:t>
-            </a:r>
-          </a:p>
-        </p:txBody>
-      </p:sp>
-      <p:sp>
-        <p:nvSpPr>
-          <p:cNvPr id="9" name="Text Box 12">
+              <a:t>Kneel with humility.</a:t>
+            </a:r>
+          </a:p>
+          <a:p>
+            <a:pPr algn="l"/>
+            <a:r>
+              <a:rPr lang="en-GB" sz="2400" i="0" dirty="0">
+                <a:solidFill>
+                  <a:srgbClr val="FFFFFF"/>
+                </a:solidFill>
+                <a:effectLst/>
+                <a:latin typeface="Century Gothic" panose="020B0502020202020204" pitchFamily="34" charset="0"/>
+              </a:rPr>
+              <a:t>Close your eyes to concentrate.</a:t>
+            </a:r>
+          </a:p>
+          <a:p>
+            <a:pPr algn="l"/>
+            <a:r>
+              <a:rPr lang="en-GB" sz="2400" i="0" dirty="0">
+                <a:solidFill>
+                  <a:srgbClr val="FFFFFF"/>
+                </a:solidFill>
+                <a:effectLst/>
+                <a:latin typeface="Century Gothic" panose="020B0502020202020204" pitchFamily="34" charset="0"/>
+              </a:rPr>
+              <a:t>Begin by saying, </a:t>
+            </a:r>
+            <a:r>
+              <a:rPr lang="en-GB" sz="2400" b="1" i="1" dirty="0">
+                <a:solidFill>
+                  <a:srgbClr val="DAF5FF"/>
+                </a:solidFill>
+                <a:effectLst/>
+                <a:latin typeface="Century Gothic" panose="020B0502020202020204" pitchFamily="34" charset="0"/>
+              </a:rPr>
+              <a:t>“In the name of the Lord Jesus Christ I pray.”</a:t>
+            </a:r>
+            <a:endParaRPr lang="en-GB" sz="2400" b="1" i="0" dirty="0">
+              <a:solidFill>
+                <a:srgbClr val="FFFFFF"/>
+              </a:solidFill>
+              <a:effectLst/>
+              <a:latin typeface="Century Gothic" panose="020B0502020202020204" pitchFamily="34" charset="0"/>
+            </a:endParaRPr>
+          </a:p>
+          <a:p>
+            <a:pPr algn="l"/>
+            <a:r>
+              <a:rPr lang="en-GB" sz="2400" i="0" dirty="0">
+                <a:solidFill>
+                  <a:srgbClr val="FFFFFF"/>
+                </a:solidFill>
+                <a:effectLst/>
+                <a:latin typeface="Century Gothic" panose="020B0502020202020204" pitchFamily="34" charset="0"/>
+              </a:rPr>
+              <a:t>Praise the Lord by saying, </a:t>
+            </a:r>
+            <a:r>
+              <a:rPr lang="en-GB" sz="2400" b="1" i="1" dirty="0">
+                <a:solidFill>
+                  <a:srgbClr val="DAF5FF"/>
+                </a:solidFill>
+                <a:effectLst/>
+                <a:latin typeface="Century Gothic" panose="020B0502020202020204" pitchFamily="34" charset="0"/>
+              </a:rPr>
+              <a:t>“Hallelujah!”</a:t>
+            </a:r>
+            <a:endParaRPr lang="en-GB" sz="2400" b="1" i="0" dirty="0">
+              <a:solidFill>
+                <a:srgbClr val="FFFFFF"/>
+              </a:solidFill>
+              <a:effectLst/>
+              <a:latin typeface="Century Gothic" panose="020B0502020202020204" pitchFamily="34" charset="0"/>
+            </a:endParaRPr>
+          </a:p>
+          <a:p>
+            <a:pPr algn="l"/>
+            <a:r>
+              <a:rPr lang="en-GB" sz="2400" i="0" dirty="0">
+                <a:solidFill>
+                  <a:srgbClr val="FFFFFF"/>
+                </a:solidFill>
+                <a:effectLst/>
+                <a:latin typeface="Century Gothic" panose="020B0502020202020204" pitchFamily="34" charset="0"/>
+              </a:rPr>
+              <a:t>Spend time to speak with God from your heart and ask Him to fill you with the Holy Spirit.</a:t>
+            </a:r>
+          </a:p>
+          <a:p>
+            <a:pPr algn="l"/>
+            <a:r>
+              <a:rPr lang="en-GB" sz="2400" i="0" dirty="0">
+                <a:solidFill>
+                  <a:srgbClr val="FFFFFF"/>
+                </a:solidFill>
+                <a:effectLst/>
+                <a:latin typeface="Century Gothic" panose="020B0502020202020204" pitchFamily="34" charset="0"/>
+              </a:rPr>
+              <a:t>Conclude your prayer with, </a:t>
+            </a:r>
+            <a:r>
+              <a:rPr lang="en-GB" sz="2400" b="1" i="1" dirty="0">
+                <a:solidFill>
+                  <a:srgbClr val="DAF5FF"/>
+                </a:solidFill>
+                <a:effectLst/>
+                <a:latin typeface="Century Gothic" panose="020B0502020202020204" pitchFamily="34" charset="0"/>
+              </a:rPr>
+              <a:t>“Amen.”</a:t>
+            </a:r>
+            <a:endParaRPr lang="en-GB" sz="2400" b="1" i="0" dirty="0">
+              <a:solidFill>
+                <a:srgbClr val="FFFFFF"/>
+              </a:solidFill>
+              <a:effectLst/>
+              <a:latin typeface="Century Gothic" panose="020B0502020202020204" pitchFamily="34" charset="0"/>
+            </a:endParaRPr>
+          </a:p>
+        </p:txBody>
+      </p:sp>
+      <p:sp>
+        <p:nvSpPr>
+          <p:cNvPr id="13" name="TextBox 12">
             <a:extLst>
               <a:ext uri="{FF2B5EF4-FFF2-40B4-BE49-F238E27FC236}">
-                <a16:creationId xmlns:a16="http://schemas.microsoft.com/office/drawing/2014/main" id="{B2DE150A-3568-4054-96DD-D8330B5C6053}"/>
+                <a16:creationId xmlns:a16="http://schemas.microsoft.com/office/drawing/2014/main" id="{C204AB72-B659-2754-2040-B5F198104EBB}"/>
               </a:ext>
             </a:extLst>
           </p:cNvPr>
-          <p:cNvSpPr txBox="1">
-            <a:spLocks noChangeArrowheads="1"/>
-          </p:cNvSpPr>
+          <p:cNvSpPr txBox="1"/>
           <p:nvPr/>
         </p:nvSpPr>
-        <p:spPr bwMode="auto">
+        <p:spPr>
           <a:xfrm>
-            <a:off x="767482" y="6427242"/>
-            <a:ext cx="3672334" cy="276999"/>
+            <a:off x="6168008" y="2111239"/>
+            <a:ext cx="6023992" cy="3539430"/>
           </a:xfrm>
           <a:prstGeom prst="rect">
             <a:avLst/>
           </a:prstGeom>
           <a:noFill/>
-          <a:ln>
-            <a:noFill/>
-          </a:ln>
-          <a:effectLst/>
-          <a:extLst>
-            <a:ext uri="{909E8E84-426E-40DD-AFC4-6F175D3DCCD1}">
-              <a14:hiddenFill xmlns:a14="http://schemas.microsoft.com/office/drawing/2010/main">
-                <a:solidFill>
-                  <a:schemeClr val="accent1"/>
-                </a:solidFill>
-              </a14:hiddenFill>
-            </a:ext>
-            <a:ext uri="{91240B29-F687-4F45-9708-019B960494DF}">
-              <a14:hiddenLine xmlns:a14="http://schemas.microsoft.com/office/drawing/2010/main" w="9525">
-                <a:solidFill>
-                  <a:schemeClr val="tx1"/>
-                </a:solidFill>
-                <a:miter lim="800000"/>
-                <a:headEnd/>
-                <a:tailEnd/>
-              </a14:hiddenLine>
-            </a:ext>
-            <a:ext uri="{AF507438-7753-43E0-B8FC-AC1667EBCBE1}">
-              <a14:hiddenEffects xmlns:a14="http://schemas.microsoft.com/office/drawing/2010/main">
-                <a:effectLst>
-                  <a:outerShdw dist="35921" dir="2700000" algn="ctr" rotWithShape="0">
-                    <a:schemeClr val="bg2"/>
-                  </a:outerShdw>
-                </a:effectLst>
-              </a14:hiddenEffects>
-            </a:ext>
-          </a:extLst>
         </p:spPr>
         <p:txBody>
-          <a:bodyPr wrap="square">
+          <a:bodyPr wrap="square" rtlCol="0" anchor="ctr">
             <a:spAutoFit/>
           </a:bodyPr>
           <a:lstStyle/>
           <a:p>
-            <a:pPr>
-              <a:spcBef>
-                <a:spcPct val="50000"/>
-              </a:spcBef>
-            </a:pPr>
-            <a:r>
-              <a:rPr lang="en-GB" altLang="en-US" sz="1200" b="1" dirty="0">
-                <a:solidFill>
-                  <a:schemeClr val="bg1"/>
-                </a:solidFill>
+            <a:pPr algn="l"/>
+            <a:r>
+              <a:rPr lang="zh-TW" altLang="en-US" sz="3200" i="0" dirty="0">
+                <a:solidFill>
+                  <a:srgbClr val="FFFFFF"/>
+                </a:solidFill>
+                <a:effectLst/>
                 <a:latin typeface="Century Gothic" panose="020B0502020202020204" pitchFamily="34" charset="0"/>
+                <a:ea typeface="金梅新中楷全字體" panose="02010509060101010101"/>
               </a:rPr>
-              <a:t>PLEASE SWITCH OFF YOUR MOBILE PHONE</a:t>
-            </a:r>
-            <a:endParaRPr lang="en-US" altLang="en-US" sz="1200" b="1" dirty="0">
+              <a:t>虔誠地跪下</a:t>
+            </a:r>
+          </a:p>
+          <a:p>
+            <a:pPr algn="l"/>
+            <a:r>
+              <a:rPr lang="zh-TW" altLang="en-US" sz="3200" i="0" dirty="0">
+                <a:solidFill>
+                  <a:srgbClr val="FFFFFF"/>
+                </a:solidFill>
+                <a:effectLst/>
+                <a:latin typeface="Century Gothic" panose="020B0502020202020204" pitchFamily="34" charset="0"/>
+                <a:ea typeface="金梅新中楷全字體" panose="02010509060101010101"/>
+              </a:rPr>
+              <a:t>閉上眼睛專心預備</a:t>
+            </a:r>
+          </a:p>
+          <a:p>
+            <a:pPr algn="l"/>
+            <a:r>
+              <a:rPr lang="zh-TW" altLang="en-US" sz="3200" i="0" dirty="0">
+                <a:solidFill>
+                  <a:srgbClr val="FFFFFF"/>
+                </a:solidFill>
+                <a:effectLst/>
+                <a:latin typeface="Century Gothic" panose="020B0502020202020204" pitchFamily="34" charset="0"/>
+                <a:ea typeface="金梅新中楷全字體" panose="02010509060101010101"/>
+              </a:rPr>
+              <a:t>先唸</a:t>
+            </a:r>
+            <a:r>
+              <a:rPr lang="en-US" altLang="zh-TW" sz="3200" i="0" dirty="0">
+                <a:solidFill>
+                  <a:srgbClr val="FFFFFF"/>
+                </a:solidFill>
+                <a:effectLst/>
+                <a:latin typeface="Century Gothic" panose="020B0502020202020204" pitchFamily="34" charset="0"/>
+                <a:ea typeface="金梅新中楷全字體" panose="02010509060101010101"/>
+              </a:rPr>
+              <a:t>, </a:t>
+            </a:r>
+            <a:r>
+              <a:rPr lang="en-US" altLang="zh-TW" sz="3200" b="1" i="0" dirty="0">
+                <a:solidFill>
+                  <a:srgbClr val="DAF5FF"/>
+                </a:solidFill>
+                <a:effectLst/>
+                <a:latin typeface="Century Gothic" panose="020B0502020202020204" pitchFamily="34" charset="0"/>
+                <a:ea typeface="金梅新中楷全字體" panose="02010509060101010101"/>
+              </a:rPr>
+              <a:t>“</a:t>
+            </a:r>
+            <a:r>
+              <a:rPr lang="zh-TW" altLang="en-US" sz="3200" b="1" i="0" dirty="0">
+                <a:solidFill>
+                  <a:srgbClr val="DAF5FF"/>
+                </a:solidFill>
+                <a:effectLst/>
+                <a:latin typeface="Century Gothic" panose="020B0502020202020204" pitchFamily="34" charset="0"/>
+                <a:ea typeface="金梅新中楷全字體" panose="02010509060101010101"/>
+              </a:rPr>
+              <a:t>奉主耶穌聖名禱告”</a:t>
+            </a:r>
+          </a:p>
+          <a:p>
+            <a:pPr algn="l"/>
+            <a:r>
+              <a:rPr lang="zh-TW" altLang="en-US" sz="3200" i="0" dirty="0">
+                <a:solidFill>
+                  <a:srgbClr val="FFFFFF"/>
+                </a:solidFill>
+                <a:effectLst/>
+                <a:latin typeface="Century Gothic" panose="020B0502020202020204" pitchFamily="34" charset="0"/>
+                <a:ea typeface="金梅新中楷全字體" panose="02010509060101010101"/>
+              </a:rPr>
+              <a:t>重複唸</a:t>
+            </a:r>
+            <a:r>
+              <a:rPr lang="en-US" altLang="zh-TW" sz="3200" i="0" dirty="0">
+                <a:solidFill>
+                  <a:srgbClr val="FFFFFF"/>
+                </a:solidFill>
+                <a:effectLst/>
+                <a:latin typeface="Century Gothic" panose="020B0502020202020204" pitchFamily="34" charset="0"/>
+                <a:ea typeface="金梅新中楷全字體" panose="02010509060101010101"/>
+              </a:rPr>
+              <a:t>, </a:t>
+            </a:r>
+            <a:r>
+              <a:rPr lang="en-US" altLang="zh-TW" sz="3200" b="1" i="0" dirty="0">
+                <a:solidFill>
+                  <a:srgbClr val="DAF5FF"/>
+                </a:solidFill>
+                <a:effectLst/>
+                <a:latin typeface="Century Gothic" panose="020B0502020202020204" pitchFamily="34" charset="0"/>
+                <a:ea typeface="金梅新中楷全字體" panose="02010509060101010101"/>
+              </a:rPr>
+              <a:t>“</a:t>
+            </a:r>
+            <a:r>
+              <a:rPr lang="zh-TW" altLang="en-US" sz="3200" b="1" i="0" dirty="0">
+                <a:solidFill>
+                  <a:srgbClr val="DAF5FF"/>
+                </a:solidFill>
+                <a:effectLst/>
+                <a:latin typeface="Century Gothic" panose="020B0502020202020204" pitchFamily="34" charset="0"/>
+                <a:ea typeface="金梅新中楷全字體" panose="02010509060101010101"/>
+              </a:rPr>
+              <a:t>哈利路亞</a:t>
+            </a:r>
+            <a:r>
+              <a:rPr lang="en-US" altLang="zh-TW" sz="3200" b="1" i="0" dirty="0">
+                <a:solidFill>
+                  <a:srgbClr val="DAF5FF"/>
+                </a:solidFill>
+                <a:effectLst/>
+                <a:latin typeface="Century Gothic" panose="020B0502020202020204" pitchFamily="34" charset="0"/>
+                <a:ea typeface="金梅新中楷全字體" panose="02010509060101010101"/>
+              </a:rPr>
+              <a:t>, </a:t>
+            </a:r>
+            <a:r>
+              <a:rPr lang="zh-TW" altLang="en-US" sz="3200" b="1" i="0" dirty="0">
+                <a:solidFill>
+                  <a:srgbClr val="DAF5FF"/>
+                </a:solidFill>
+                <a:effectLst/>
+                <a:latin typeface="Century Gothic" panose="020B0502020202020204" pitchFamily="34" charset="0"/>
+                <a:ea typeface="金梅新中楷全字體" panose="02010509060101010101"/>
+              </a:rPr>
+              <a:t>讚美主耶穌”</a:t>
+            </a:r>
+          </a:p>
+          <a:p>
+            <a:pPr algn="l"/>
+            <a:r>
+              <a:rPr lang="zh-TW" altLang="en-US" sz="3200" i="0" dirty="0">
+                <a:solidFill>
+                  <a:srgbClr val="FFFFFF"/>
+                </a:solidFill>
+                <a:effectLst/>
+                <a:latin typeface="Century Gothic" panose="020B0502020202020204" pitchFamily="34" charset="0"/>
+                <a:ea typeface="金梅新中楷全字體" panose="02010509060101010101"/>
+              </a:rPr>
+              <a:t>您也可以將您的需要告訴神</a:t>
+            </a:r>
+            <a:r>
+              <a:rPr lang="en-US" altLang="zh-TW" sz="3200" i="0" dirty="0">
+                <a:solidFill>
+                  <a:srgbClr val="FFFFFF"/>
+                </a:solidFill>
+                <a:effectLst/>
+                <a:latin typeface="Century Gothic" panose="020B0502020202020204" pitchFamily="34" charset="0"/>
+                <a:ea typeface="金梅新中楷全字體" panose="02010509060101010101"/>
+              </a:rPr>
+              <a:t>, </a:t>
+            </a:r>
+            <a:r>
+              <a:rPr lang="zh-TW" altLang="en-US" sz="3200" i="0" dirty="0">
+                <a:solidFill>
+                  <a:srgbClr val="FFFFFF"/>
+                </a:solidFill>
+                <a:effectLst/>
+                <a:latin typeface="Century Gothic" panose="020B0502020202020204" pitchFamily="34" charset="0"/>
+                <a:ea typeface="金梅新中楷全字體" panose="02010509060101010101"/>
+              </a:rPr>
+              <a:t>並祈求祂賞賜您聖靈</a:t>
+            </a:r>
+          </a:p>
+          <a:p>
+            <a:pPr algn="l"/>
+            <a:r>
+              <a:rPr lang="zh-TW" altLang="en-US" sz="3200" i="0" dirty="0">
+                <a:solidFill>
+                  <a:srgbClr val="FFFFFF"/>
+                </a:solidFill>
+                <a:effectLst/>
+                <a:latin typeface="Century Gothic" panose="020B0502020202020204" pitchFamily="34" charset="0"/>
+                <a:ea typeface="金梅新中楷全字體" panose="02010509060101010101"/>
+              </a:rPr>
+              <a:t>最後以 </a:t>
+            </a:r>
+            <a:r>
+              <a:rPr lang="zh-TW" altLang="en-US" sz="3200" b="1" i="0" dirty="0">
+                <a:solidFill>
+                  <a:srgbClr val="DAF5FF"/>
+                </a:solidFill>
+                <a:effectLst/>
+                <a:latin typeface="Century Gothic" panose="020B0502020202020204" pitchFamily="34" charset="0"/>
+                <a:ea typeface="金梅新中楷全字體" panose="02010509060101010101"/>
+              </a:rPr>
+              <a:t>“阿們</a:t>
+            </a:r>
+            <a:r>
+              <a:rPr lang="en-US" altLang="zh-TW" sz="3200" b="1" i="0" dirty="0">
+                <a:solidFill>
+                  <a:srgbClr val="DAF5FF"/>
+                </a:solidFill>
+                <a:effectLst/>
+                <a:latin typeface="Century Gothic" panose="020B0502020202020204" pitchFamily="34" charset="0"/>
+                <a:ea typeface="金梅新中楷全字體" panose="02010509060101010101"/>
+              </a:rPr>
+              <a:t>!” </a:t>
+            </a:r>
+            <a:r>
+              <a:rPr lang="zh-TW" altLang="en-US" sz="3200" i="0" dirty="0">
+                <a:solidFill>
+                  <a:srgbClr val="FFFFFF"/>
+                </a:solidFill>
+                <a:effectLst/>
+                <a:latin typeface="Century Gothic" panose="020B0502020202020204" pitchFamily="34" charset="0"/>
+                <a:ea typeface="金梅新中楷全字體" panose="02010509060101010101"/>
+              </a:rPr>
+              <a:t>結束禱告</a:t>
+            </a:r>
+            <a:endParaRPr lang="en-GB" sz="3200" i="0" dirty="0">
               <a:solidFill>
-                <a:schemeClr val="bg1"/>
+                <a:srgbClr val="FFFFFF"/>
               </a:solidFill>
+              <a:effectLst/>
               <a:latin typeface="Century Gothic" panose="020B0502020202020204" pitchFamily="34" charset="0"/>
+              <a:ea typeface="金梅新中楷全字體" panose="02010509060101010101"/>
             </a:endParaRPr>
           </a:p>
         </p:txBody>
       </p:sp>
       <p:pic>
         <p:nvPicPr>
-          <p:cNvPr id="10" name="Picture 2" descr="Custom No Mobile Phones Sign | The Sign Shed">
+          <p:cNvPr id="12" name="Picture 11" descr="Logo&#10;&#10;Description automatically generated with medium confidence">
             <a:extLst>
               <a:ext uri="{FF2B5EF4-FFF2-40B4-BE49-F238E27FC236}">
-                <a16:creationId xmlns:a16="http://schemas.microsoft.com/office/drawing/2014/main" id="{EDDDC766-0B69-4B94-B4A1-534F4DEA9BC2}"/>
+                <a16:creationId xmlns:a16="http://schemas.microsoft.com/office/drawing/2014/main" id="{F29E64E1-49CD-78DB-0ADB-1706C40BEF50}"/>
               </a:ext>
             </a:extLst>
           </p:cNvPr>
           <p:cNvPicPr>
-            <a:picLocks noChangeAspect="1" noChangeArrowheads="1"/>
+            <a:picLocks noChangeAspect="1"/>
           </p:cNvPicPr>
           <p:nvPr/>
         </p:nvPicPr>
-        <p:blipFill rotWithShape="1">
+        <p:blipFill>
           <a:blip r:embed="rId2" cstate="print">
             <a:extLst>
               <a:ext uri="{28A0092B-C50C-407E-A947-70E740481C1C}">
@@ -6990,33 +6383,186 @@
               </a:ext>
             </a:extLst>
           </a:blip>
-          <a:srcRect l="3327" t="11250" r="71169" b="12911"/>
-          <a:stretch/>
+          <a:stretch>
+            <a:fillRect/>
+          </a:stretch>
         </p:blipFill>
-        <p:spPr bwMode="auto">
+        <p:spPr>
           <a:xfrm>
-            <a:off x="335360" y="6202015"/>
-            <a:ext cx="432048" cy="432048"/>
+            <a:off x="335359" y="6269250"/>
+            <a:ext cx="2664297" cy="344791"/>
           </a:xfrm>
           <a:prstGeom prst="rect">
             <a:avLst/>
           </a:prstGeom>
-          <a:noFill/>
-          <a:extLst>
-            <a:ext uri="{909E8E84-426E-40DD-AFC4-6F175D3DCCD1}">
-              <a14:hiddenFill xmlns:a14="http://schemas.microsoft.com/office/drawing/2010/main">
-                <a:solidFill>
-                  <a:srgbClr val="FFFFFF"/>
-                </a:solidFill>
-              </a14:hiddenFill>
-            </a:ext>
-          </a:extLst>
         </p:spPr>
       </p:pic>
     </p:spTree>
     <p:extLst>
       <p:ext uri="{BB962C8B-B14F-4D97-AF65-F5344CB8AC3E}">
         <p14:creationId xmlns:p14="http://schemas.microsoft.com/office/powerpoint/2010/main" val="2970436884"/>
+      </p:ext>
+    </p:extLst>
+  </p:cSld>
+  <p:clrMapOvr>
+    <a:masterClrMapping/>
+  </p:clrMapOvr>
+</p:sld>
+</file>
+
+<file path=ppt/slides/slide7.xml><?xml version="1.0" encoding="utf-8"?>
+<p:sld xmlns:a="http://schemas.openxmlformats.org/drawingml/2006/main" xmlns:r="http://schemas.openxmlformats.org/officeDocument/2006/relationships" xmlns:p="http://schemas.openxmlformats.org/presentationml/2006/main">
+  <p:cSld>
+    <p:spTree>
+      <p:nvGrpSpPr>
+        <p:cNvPr id="1" name=""/>
+        <p:cNvGrpSpPr/>
+        <p:nvPr/>
+      </p:nvGrpSpPr>
+      <p:grpSpPr>
+        <a:xfrm>
+          <a:off x="0" y="0"/>
+          <a:ext cx="0" cy="0"/>
+          <a:chOff x="0" y="0"/>
+          <a:chExt cx="0" cy="0"/>
+        </a:xfrm>
+      </p:grpSpPr>
+      <p:sp>
+        <p:nvSpPr>
+          <p:cNvPr id="7170" name="Title 1"/>
+          <p:cNvSpPr>
+            <a:spLocks noGrp="1"/>
+          </p:cNvSpPr>
+          <p:nvPr>
+            <p:ph type="title"/>
+          </p:nvPr>
+        </p:nvSpPr>
+        <p:spPr>
+          <a:xfrm>
+            <a:off x="-8737648" y="2060848"/>
+            <a:ext cx="8507412" cy="1498600"/>
+          </a:xfrm>
+        </p:spPr>
+        <p:txBody>
+          <a:bodyPr>
+            <a:normAutofit/>
+          </a:bodyPr>
+          <a:lstStyle/>
+          <a:p>
+            <a:pPr algn="ctr"/>
+            <a:r>
+              <a:rPr lang="en-GB" altLang="en-US" dirty="0">
+                <a:latin typeface="Century Gothic" panose="020B0502020202020204" pitchFamily="34" charset="0"/>
+              </a:rPr>
+              <a:t>How to Pray</a:t>
+            </a:r>
+            <a:endParaRPr lang="en-GB" altLang="en-US" dirty="0">
+              <a:latin typeface="Century Gothic" panose="020B0502020202020204" pitchFamily="34" charset="0"/>
+              <a:ea typeface="金梅新中楷全字體" pitchFamily="49" charset="-120"/>
+            </a:endParaRPr>
+          </a:p>
+        </p:txBody>
+      </p:sp>
+      <p:pic>
+        <p:nvPicPr>
+          <p:cNvPr id="12" name="Picture 11" descr="Logo&#10;&#10;Description automatically generated with medium confidence">
+            <a:extLst>
+              <a:ext uri="{FF2B5EF4-FFF2-40B4-BE49-F238E27FC236}">
+                <a16:creationId xmlns:a16="http://schemas.microsoft.com/office/drawing/2014/main" id="{F29E64E1-49CD-78DB-0ADB-1706C40BEF50}"/>
+              </a:ext>
+            </a:extLst>
+          </p:cNvPr>
+          <p:cNvPicPr>
+            <a:picLocks noChangeAspect="1"/>
+          </p:cNvPicPr>
+          <p:nvPr/>
+        </p:nvPicPr>
+        <p:blipFill>
+          <a:blip r:embed="rId2" cstate="print">
+            <a:extLst>
+              <a:ext uri="{28A0092B-C50C-407E-A947-70E740481C1C}">
+                <a14:useLocalDpi xmlns:a14="http://schemas.microsoft.com/office/drawing/2010/main" val="0"/>
+              </a:ext>
+            </a:extLst>
+          </a:blip>
+          <a:stretch>
+            <a:fillRect/>
+          </a:stretch>
+        </p:blipFill>
+        <p:spPr>
+          <a:xfrm>
+            <a:off x="335359" y="6269250"/>
+            <a:ext cx="2664297" cy="344791"/>
+          </a:xfrm>
+          <a:prstGeom prst="rect">
+            <a:avLst/>
+          </a:prstGeom>
+        </p:spPr>
+      </p:pic>
+      <p:sp>
+        <p:nvSpPr>
+          <p:cNvPr id="9" name="TextBox 8">
+            <a:extLst>
+              <a:ext uri="{FF2B5EF4-FFF2-40B4-BE49-F238E27FC236}">
+                <a16:creationId xmlns:a16="http://schemas.microsoft.com/office/drawing/2014/main" id="{EB7FD2AF-7F03-5326-A748-9D97F0B7E43C}"/>
+              </a:ext>
+            </a:extLst>
+          </p:cNvPr>
+          <p:cNvSpPr txBox="1"/>
+          <p:nvPr/>
+        </p:nvSpPr>
+        <p:spPr>
+          <a:xfrm>
+            <a:off x="0" y="692696"/>
+            <a:ext cx="12192000" cy="1446550"/>
+          </a:xfrm>
+          <a:prstGeom prst="rect">
+            <a:avLst/>
+          </a:prstGeom>
+          <a:noFill/>
+        </p:spPr>
+        <p:txBody>
+          <a:bodyPr wrap="square" rtlCol="0">
+            <a:spAutoFit/>
+          </a:bodyPr>
+          <a:lstStyle/>
+          <a:p>
+            <a:pPr algn="ctr"/>
+            <a:r>
+              <a:rPr lang="en-GB" altLang="en-US" sz="4400" b="1" dirty="0">
+                <a:solidFill>
+                  <a:schemeClr val="bg1"/>
+                </a:solidFill>
+                <a:latin typeface="Century Gothic" panose="020B0502020202020204" pitchFamily="34" charset="0"/>
+              </a:rPr>
+              <a:t>Please Turn Off/Silence Your Devices</a:t>
+            </a:r>
+          </a:p>
+          <a:p>
+            <a:pPr algn="ctr"/>
+            <a:r>
+              <a:rPr lang="ja-JP" altLang="en-US" sz="4400" b="1" dirty="0">
+                <a:solidFill>
+                  <a:schemeClr val="bg1"/>
+                </a:solidFill>
+                <a:latin typeface="Century Gothic" panose="020B0502020202020204" pitchFamily="34" charset="0"/>
+              </a:rPr>
+              <a:t>請靜音或關閉所有電子設備</a:t>
+            </a:r>
+            <a:endParaRPr lang="en-GB" sz="4400" b="1" dirty="0">
+              <a:solidFill>
+                <a:schemeClr val="bg1"/>
+              </a:solidFill>
+              <a:latin typeface="Century Gothic" panose="020B0502020202020204" pitchFamily="34" charset="0"/>
+              <a:ea typeface="金梅新中楷全字體" pitchFamily="49" charset="-120"/>
+            </a:endParaRPr>
+          </a:p>
+        </p:txBody>
+      </p:sp>
+    </p:spTree>
+    <p:extLst>
+      <p:ext uri="{BB962C8B-B14F-4D97-AF65-F5344CB8AC3E}">
+        <p14:creationId xmlns:p14="http://schemas.microsoft.com/office/powerpoint/2010/main" val="1579287213"/>
       </p:ext>
     </p:extLst>
   </p:cSld>

</xml_diff>

<commit_message>
20/05/22 Turn Off Added to each slide
</commit_message>
<xml_diff>
--- a/TJCPowerPoint/Resources/ServiceWidescreen.pptx
+++ b/TJCPowerPoint/Resources/ServiceWidescreen.pptx
@@ -4236,16 +4236,7 @@
                 </a:solidFill>
                 <a:latin typeface="Century Gothic" panose="020B0502020202020204" pitchFamily="34" charset="0"/>
               </a:rPr>
-              <a:t>Hymn No</a:t>
-            </a:r>
-            <a:r>
-              <a:rPr lang="en-US" altLang="en-US" sz="5600" dirty="0">
-                <a:solidFill>
-                  <a:srgbClr val="FFFF99"/>
-                </a:solidFill>
-                <a:latin typeface="Century Gothic" panose="020B0502020202020204" pitchFamily="34" charset="0"/>
-              </a:rPr>
-              <a:t>.</a:t>
+              <a:t>Hymn No.</a:t>
             </a:r>
           </a:p>
         </p:txBody>
@@ -4615,7 +4606,7 @@
         </p:nvSpPr>
         <p:spPr bwMode="auto">
           <a:xfrm>
-            <a:off x="7464152" y="6269250"/>
+            <a:off x="263798" y="5785450"/>
             <a:ext cx="4464050" cy="400110"/>
           </a:xfrm>
           <a:prstGeom prst="rect">
@@ -4661,13 +4652,13 @@
           </a:bodyPr>
           <a:lstStyle/>
           <a:p>
-            <a:pPr algn="r">
+            <a:pPr>
               <a:spcBef>
                 <a:spcPct val="50000"/>
               </a:spcBef>
             </a:pPr>
             <a:r>
-              <a:rPr lang="en-US" altLang="zh-CN" sz="2000" b="1" dirty="0" err="1">
+              <a:rPr lang="en-US" altLang="zh-CN" sz="2000" dirty="0" err="1">
                 <a:solidFill>
                   <a:schemeClr val="bg1"/>
                 </a:solidFill>
@@ -4676,7 +4667,7 @@
               </a:rPr>
               <a:t>ServiceType</a:t>
             </a:r>
-            <a:endParaRPr lang="en-US" altLang="zh-CN" sz="2000" b="1" dirty="0">
+            <a:endParaRPr lang="en-US" altLang="zh-CN" sz="2000" dirty="0">
               <a:solidFill>
                 <a:schemeClr val="bg1"/>
               </a:solidFill>
@@ -4722,6 +4713,111 @@
           </a:prstGeom>
         </p:spPr>
       </p:pic>
+      <p:sp>
+        <p:nvSpPr>
+          <p:cNvPr id="16" name="TextBox 15">
+            <a:extLst>
+              <a:ext uri="{FF2B5EF4-FFF2-40B4-BE49-F238E27FC236}">
+                <a16:creationId xmlns:a16="http://schemas.microsoft.com/office/drawing/2014/main" id="{A9B7581C-46DB-838D-282E-D4FAAF819EAD}"/>
+              </a:ext>
+            </a:extLst>
+          </p:cNvPr>
+          <p:cNvSpPr txBox="1"/>
+          <p:nvPr/>
+        </p:nvSpPr>
+        <p:spPr>
+          <a:xfrm>
+            <a:off x="4727848" y="6269250"/>
+            <a:ext cx="7246931" cy="369332"/>
+          </a:xfrm>
+          <a:prstGeom prst="rect">
+            <a:avLst/>
+          </a:prstGeom>
+          <a:noFill/>
+          <a:ln w="12700">
+            <a:solidFill>
+              <a:srgbClr val="FF0000"/>
+            </a:solidFill>
+          </a:ln>
+        </p:spPr>
+        <p:txBody>
+          <a:bodyPr wrap="square" rtlCol="0" anchor="ctr">
+            <a:spAutoFit/>
+          </a:bodyPr>
+          <a:lstStyle/>
+          <a:p>
+            <a:r>
+              <a:rPr lang="en-GB" dirty="0">
+                <a:solidFill>
+                  <a:schemeClr val="bg1"/>
+                </a:solidFill>
+                <a:latin typeface="Century Gothic" panose="020B0502020202020204" pitchFamily="34" charset="0"/>
+              </a:rPr>
+              <a:t>Please Turn Off/Silence Your Devices </a:t>
+            </a:r>
+            <a:r>
+              <a:rPr lang="ja-JP" altLang="en-US" dirty="0">
+                <a:solidFill>
+                  <a:schemeClr val="bg1"/>
+                </a:solidFill>
+                <a:latin typeface="Century Gothic" panose="020B0502020202020204" pitchFamily="34" charset="0"/>
+              </a:rPr>
+              <a:t>請靜音或關閉所有電子設備</a:t>
+            </a:r>
+          </a:p>
+        </p:txBody>
+      </p:sp>
+      <p:pic>
+        <p:nvPicPr>
+          <p:cNvPr id="6" name="Picture 5" descr="Shape&#10;&#10;Description automatically generated with low confidence">
+            <a:extLst>
+              <a:ext uri="{FF2B5EF4-FFF2-40B4-BE49-F238E27FC236}">
+                <a16:creationId xmlns:a16="http://schemas.microsoft.com/office/drawing/2014/main" id="{60F51B84-28FB-5C8C-9FAA-CE4D35626CCC}"/>
+              </a:ext>
+            </a:extLst>
+          </p:cNvPr>
+          <p:cNvPicPr>
+            <a:picLocks noChangeAspect="1"/>
+          </p:cNvPicPr>
+          <p:nvPr/>
+        </p:nvPicPr>
+        <p:blipFill>
+          <a:blip r:embed="rId4" cstate="print">
+            <a:extLst>
+              <a:ext uri="{BEBA8EAE-BF5A-486C-A8C5-ECC9F3942E4B}">
+                <a14:imgProps xmlns:a14="http://schemas.microsoft.com/office/drawing/2010/main">
+                  <a14:imgLayer r:embed="rId5">
+                    <a14:imgEffect>
+                      <a14:colorTemperature colorTemp="11500"/>
+                    </a14:imgEffect>
+                    <a14:imgEffect>
+                      <a14:saturation sat="400000"/>
+                    </a14:imgEffect>
+                    <a14:imgEffect>
+                      <a14:brightnessContrast bright="100000" contrast="100000"/>
+                    </a14:imgEffect>
+                  </a14:imgLayer>
+                </a14:imgProps>
+              </a:ext>
+              <a:ext uri="{28A0092B-C50C-407E-A947-70E740481C1C}">
+                <a14:useLocalDpi xmlns:a14="http://schemas.microsoft.com/office/drawing/2010/main" val="0"/>
+              </a:ext>
+            </a:extLst>
+          </a:blip>
+          <a:stretch>
+            <a:fillRect/>
+          </a:stretch>
+        </p:blipFill>
+        <p:spPr>
+          <a:xfrm>
+            <a:off x="11658489" y="6309320"/>
+            <a:ext cx="280267" cy="280267"/>
+          </a:xfrm>
+          <a:prstGeom prst="rect">
+            <a:avLst/>
+          </a:prstGeom>
+        </p:spPr>
+      </p:pic>
     </p:spTree>
   </p:cSld>
   <p:clrMapOvr>
@@ -4865,6 +4961,111 @@
           <a:xfrm>
             <a:off x="335359" y="6269250"/>
             <a:ext cx="2664297" cy="344791"/>
+          </a:xfrm>
+          <a:prstGeom prst="rect">
+            <a:avLst/>
+          </a:prstGeom>
+        </p:spPr>
+      </p:pic>
+      <p:sp>
+        <p:nvSpPr>
+          <p:cNvPr id="7" name="TextBox 6">
+            <a:extLst>
+              <a:ext uri="{FF2B5EF4-FFF2-40B4-BE49-F238E27FC236}">
+                <a16:creationId xmlns:a16="http://schemas.microsoft.com/office/drawing/2014/main" id="{FBBBCCBC-05E2-CF12-4E20-877482BC8B6D}"/>
+              </a:ext>
+            </a:extLst>
+          </p:cNvPr>
+          <p:cNvSpPr txBox="1"/>
+          <p:nvPr/>
+        </p:nvSpPr>
+        <p:spPr>
+          <a:xfrm>
+            <a:off x="4727848" y="6269250"/>
+            <a:ext cx="7246931" cy="369332"/>
+          </a:xfrm>
+          <a:prstGeom prst="rect">
+            <a:avLst/>
+          </a:prstGeom>
+          <a:noFill/>
+          <a:ln w="12700">
+            <a:solidFill>
+              <a:srgbClr val="FF0000"/>
+            </a:solidFill>
+          </a:ln>
+        </p:spPr>
+        <p:txBody>
+          <a:bodyPr wrap="square" rtlCol="0" anchor="ctr">
+            <a:spAutoFit/>
+          </a:bodyPr>
+          <a:lstStyle/>
+          <a:p>
+            <a:r>
+              <a:rPr lang="en-GB" dirty="0">
+                <a:solidFill>
+                  <a:schemeClr val="bg1"/>
+                </a:solidFill>
+                <a:latin typeface="Century Gothic" panose="020B0502020202020204" pitchFamily="34" charset="0"/>
+              </a:rPr>
+              <a:t>Please Turn Off/Silence Your Devices </a:t>
+            </a:r>
+            <a:r>
+              <a:rPr lang="ja-JP" altLang="en-US" dirty="0">
+                <a:solidFill>
+                  <a:schemeClr val="bg1"/>
+                </a:solidFill>
+                <a:latin typeface="Century Gothic" panose="020B0502020202020204" pitchFamily="34" charset="0"/>
+              </a:rPr>
+              <a:t>請靜音或關閉所有電子設備</a:t>
+            </a:r>
+          </a:p>
+        </p:txBody>
+      </p:sp>
+      <p:pic>
+        <p:nvPicPr>
+          <p:cNvPr id="9" name="Picture 8" descr="Shape&#10;&#10;Description automatically generated with low confidence">
+            <a:extLst>
+              <a:ext uri="{FF2B5EF4-FFF2-40B4-BE49-F238E27FC236}">
+                <a16:creationId xmlns:a16="http://schemas.microsoft.com/office/drawing/2014/main" id="{E5FA3662-B218-9881-059F-4819B3270E54}"/>
+              </a:ext>
+            </a:extLst>
+          </p:cNvPr>
+          <p:cNvPicPr>
+            <a:picLocks noChangeAspect="1"/>
+          </p:cNvPicPr>
+          <p:nvPr/>
+        </p:nvPicPr>
+        <p:blipFill>
+          <a:blip r:embed="rId3" cstate="print">
+            <a:extLst>
+              <a:ext uri="{BEBA8EAE-BF5A-486C-A8C5-ECC9F3942E4B}">
+                <a14:imgProps xmlns:a14="http://schemas.microsoft.com/office/drawing/2010/main">
+                  <a14:imgLayer r:embed="rId4">
+                    <a14:imgEffect>
+                      <a14:colorTemperature colorTemp="11500"/>
+                    </a14:imgEffect>
+                    <a14:imgEffect>
+                      <a14:saturation sat="400000"/>
+                    </a14:imgEffect>
+                    <a14:imgEffect>
+                      <a14:brightnessContrast bright="100000" contrast="100000"/>
+                    </a14:imgEffect>
+                  </a14:imgLayer>
+                </a14:imgProps>
+              </a:ext>
+              <a:ext uri="{28A0092B-C50C-407E-A947-70E740481C1C}">
+                <a14:useLocalDpi xmlns:a14="http://schemas.microsoft.com/office/drawing/2010/main" val="0"/>
+              </a:ext>
+            </a:extLst>
+          </a:blip>
+          <a:stretch>
+            <a:fillRect/>
+          </a:stretch>
+        </p:blipFill>
+        <p:spPr>
+          <a:xfrm>
+            <a:off x="11658489" y="6309320"/>
+            <a:ext cx="280267" cy="280267"/>
           </a:xfrm>
           <a:prstGeom prst="rect">
             <a:avLst/>
@@ -5113,10 +5314,10 @@
       </p:sp>
       <p:pic>
         <p:nvPicPr>
-          <p:cNvPr id="12" name="Picture 11" descr="Logo&#10;&#10;Description automatically generated with medium confidence">
+          <p:cNvPr id="13" name="Picture 12" descr="Logo&#10;&#10;Description automatically generated with medium confidence">
             <a:extLst>
               <a:ext uri="{FF2B5EF4-FFF2-40B4-BE49-F238E27FC236}">
-                <a16:creationId xmlns:a16="http://schemas.microsoft.com/office/drawing/2014/main" id="{283A1F9D-9D7A-BE3F-52D7-C209A5783C48}"/>
+                <a16:creationId xmlns:a16="http://schemas.microsoft.com/office/drawing/2014/main" id="{6600E01F-4758-2B8B-681F-4C63BAF18B4D}"/>
               </a:ext>
             </a:extLst>
           </p:cNvPr>
@@ -5141,6 +5342,111 @@
           <a:xfrm>
             <a:off x="335359" y="6269250"/>
             <a:ext cx="2664297" cy="344791"/>
+          </a:xfrm>
+          <a:prstGeom prst="rect">
+            <a:avLst/>
+          </a:prstGeom>
+        </p:spPr>
+      </p:pic>
+      <p:sp>
+        <p:nvSpPr>
+          <p:cNvPr id="9" name="TextBox 8">
+            <a:extLst>
+              <a:ext uri="{FF2B5EF4-FFF2-40B4-BE49-F238E27FC236}">
+                <a16:creationId xmlns:a16="http://schemas.microsoft.com/office/drawing/2014/main" id="{1CCA3FC1-CDE7-6686-71F6-101A52A12056}"/>
+              </a:ext>
+            </a:extLst>
+          </p:cNvPr>
+          <p:cNvSpPr txBox="1"/>
+          <p:nvPr/>
+        </p:nvSpPr>
+        <p:spPr>
+          <a:xfrm>
+            <a:off x="4727848" y="6269250"/>
+            <a:ext cx="7246931" cy="369332"/>
+          </a:xfrm>
+          <a:prstGeom prst="rect">
+            <a:avLst/>
+          </a:prstGeom>
+          <a:noFill/>
+          <a:ln w="12700">
+            <a:solidFill>
+              <a:srgbClr val="FF0000"/>
+            </a:solidFill>
+          </a:ln>
+        </p:spPr>
+        <p:txBody>
+          <a:bodyPr wrap="square" rtlCol="0" anchor="ctr">
+            <a:spAutoFit/>
+          </a:bodyPr>
+          <a:lstStyle/>
+          <a:p>
+            <a:r>
+              <a:rPr lang="en-GB" dirty="0">
+                <a:solidFill>
+                  <a:schemeClr val="bg1"/>
+                </a:solidFill>
+                <a:latin typeface="Century Gothic" panose="020B0502020202020204" pitchFamily="34" charset="0"/>
+              </a:rPr>
+              <a:t>Please Turn Off/Silence Your Devices </a:t>
+            </a:r>
+            <a:r>
+              <a:rPr lang="ja-JP" altLang="en-US" dirty="0">
+                <a:solidFill>
+                  <a:schemeClr val="bg1"/>
+                </a:solidFill>
+                <a:latin typeface="Century Gothic" panose="020B0502020202020204" pitchFamily="34" charset="0"/>
+              </a:rPr>
+              <a:t>請靜音或關閉所有電子設備</a:t>
+            </a:r>
+          </a:p>
+        </p:txBody>
+      </p:sp>
+      <p:pic>
+        <p:nvPicPr>
+          <p:cNvPr id="10" name="Picture 9" descr="Shape&#10;&#10;Description automatically generated with low confidence">
+            <a:extLst>
+              <a:ext uri="{FF2B5EF4-FFF2-40B4-BE49-F238E27FC236}">
+                <a16:creationId xmlns:a16="http://schemas.microsoft.com/office/drawing/2014/main" id="{CB613418-962F-FCFF-C920-68BDD1AA5BB4}"/>
+              </a:ext>
+            </a:extLst>
+          </p:cNvPr>
+          <p:cNvPicPr>
+            <a:picLocks noChangeAspect="1"/>
+          </p:cNvPicPr>
+          <p:nvPr/>
+        </p:nvPicPr>
+        <p:blipFill>
+          <a:blip r:embed="rId3" cstate="print">
+            <a:extLst>
+              <a:ext uri="{BEBA8EAE-BF5A-486C-A8C5-ECC9F3942E4B}">
+                <a14:imgProps xmlns:a14="http://schemas.microsoft.com/office/drawing/2010/main">
+                  <a14:imgLayer r:embed="rId4">
+                    <a14:imgEffect>
+                      <a14:colorTemperature colorTemp="11500"/>
+                    </a14:imgEffect>
+                    <a14:imgEffect>
+                      <a14:saturation sat="400000"/>
+                    </a14:imgEffect>
+                    <a14:imgEffect>
+                      <a14:brightnessContrast bright="100000" contrast="100000"/>
+                    </a14:imgEffect>
+                  </a14:imgLayer>
+                </a14:imgProps>
+              </a:ext>
+              <a:ext uri="{28A0092B-C50C-407E-A947-70E740481C1C}">
+                <a14:useLocalDpi xmlns:a14="http://schemas.microsoft.com/office/drawing/2010/main" val="0"/>
+              </a:ext>
+            </a:extLst>
+          </a:blip>
+          <a:stretch>
+            <a:fillRect/>
+          </a:stretch>
+        </p:blipFill>
+        <p:spPr>
+          <a:xfrm>
+            <a:off x="11658489" y="6309320"/>
+            <a:ext cx="280267" cy="280267"/>
           </a:xfrm>
           <a:prstGeom prst="rect">
             <a:avLst/>
@@ -5384,10 +5690,10 @@
       </p:sp>
       <p:pic>
         <p:nvPicPr>
-          <p:cNvPr id="8" name="Picture 7" descr="Logo&#10;&#10;Description automatically generated with medium confidence">
+          <p:cNvPr id="9" name="Picture 8" descr="Logo&#10;&#10;Description automatically generated with medium confidence">
             <a:extLst>
               <a:ext uri="{FF2B5EF4-FFF2-40B4-BE49-F238E27FC236}">
-                <a16:creationId xmlns:a16="http://schemas.microsoft.com/office/drawing/2014/main" id="{A65649BC-6B24-CAB9-AF72-440EBBC7D223}"/>
+                <a16:creationId xmlns:a16="http://schemas.microsoft.com/office/drawing/2014/main" id="{605C6900-1A85-0725-D99B-AAF3A940D377}"/>
               </a:ext>
             </a:extLst>
           </p:cNvPr>
@@ -5412,6 +5718,111 @@
           <a:xfrm>
             <a:off x="335359" y="6269250"/>
             <a:ext cx="2664297" cy="344791"/>
+          </a:xfrm>
+          <a:prstGeom prst="rect">
+            <a:avLst/>
+          </a:prstGeom>
+        </p:spPr>
+      </p:pic>
+      <p:sp>
+        <p:nvSpPr>
+          <p:cNvPr id="7" name="TextBox 6">
+            <a:extLst>
+              <a:ext uri="{FF2B5EF4-FFF2-40B4-BE49-F238E27FC236}">
+                <a16:creationId xmlns:a16="http://schemas.microsoft.com/office/drawing/2014/main" id="{2B94C6DD-22CE-1BB7-508C-F71FE0F3999E}"/>
+              </a:ext>
+            </a:extLst>
+          </p:cNvPr>
+          <p:cNvSpPr txBox="1"/>
+          <p:nvPr/>
+        </p:nvSpPr>
+        <p:spPr>
+          <a:xfrm>
+            <a:off x="4727848" y="6269250"/>
+            <a:ext cx="7246931" cy="369332"/>
+          </a:xfrm>
+          <a:prstGeom prst="rect">
+            <a:avLst/>
+          </a:prstGeom>
+          <a:noFill/>
+          <a:ln w="12700">
+            <a:solidFill>
+              <a:srgbClr val="FF0000"/>
+            </a:solidFill>
+          </a:ln>
+        </p:spPr>
+        <p:txBody>
+          <a:bodyPr wrap="square" rtlCol="0" anchor="ctr">
+            <a:spAutoFit/>
+          </a:bodyPr>
+          <a:lstStyle/>
+          <a:p>
+            <a:r>
+              <a:rPr lang="en-GB" dirty="0">
+                <a:solidFill>
+                  <a:schemeClr val="bg1"/>
+                </a:solidFill>
+                <a:latin typeface="Century Gothic" panose="020B0502020202020204" pitchFamily="34" charset="0"/>
+              </a:rPr>
+              <a:t>Please Turn Off/Silence Your Devices </a:t>
+            </a:r>
+            <a:r>
+              <a:rPr lang="ja-JP" altLang="en-US" dirty="0">
+                <a:solidFill>
+                  <a:schemeClr val="bg1"/>
+                </a:solidFill>
+                <a:latin typeface="Century Gothic" panose="020B0502020202020204" pitchFamily="34" charset="0"/>
+              </a:rPr>
+              <a:t>請靜音或關閉所有電子設備</a:t>
+            </a:r>
+          </a:p>
+        </p:txBody>
+      </p:sp>
+      <p:pic>
+        <p:nvPicPr>
+          <p:cNvPr id="8" name="Picture 7" descr="Shape&#10;&#10;Description automatically generated with low confidence">
+            <a:extLst>
+              <a:ext uri="{FF2B5EF4-FFF2-40B4-BE49-F238E27FC236}">
+                <a16:creationId xmlns:a16="http://schemas.microsoft.com/office/drawing/2014/main" id="{0D9DC441-861C-D083-5FF1-426B383C7AA1}"/>
+              </a:ext>
+            </a:extLst>
+          </p:cNvPr>
+          <p:cNvPicPr>
+            <a:picLocks noChangeAspect="1"/>
+          </p:cNvPicPr>
+          <p:nvPr/>
+        </p:nvPicPr>
+        <p:blipFill>
+          <a:blip r:embed="rId3" cstate="print">
+            <a:extLst>
+              <a:ext uri="{BEBA8EAE-BF5A-486C-A8C5-ECC9F3942E4B}">
+                <a14:imgProps xmlns:a14="http://schemas.microsoft.com/office/drawing/2010/main">
+                  <a14:imgLayer r:embed="rId4">
+                    <a14:imgEffect>
+                      <a14:colorTemperature colorTemp="11500"/>
+                    </a14:imgEffect>
+                    <a14:imgEffect>
+                      <a14:saturation sat="400000"/>
+                    </a14:imgEffect>
+                    <a14:imgEffect>
+                      <a14:brightnessContrast bright="100000" contrast="100000"/>
+                    </a14:imgEffect>
+                  </a14:imgLayer>
+                </a14:imgProps>
+              </a:ext>
+              <a:ext uri="{28A0092B-C50C-407E-A947-70E740481C1C}">
+                <a14:useLocalDpi xmlns:a14="http://schemas.microsoft.com/office/drawing/2010/main" val="0"/>
+              </a:ext>
+            </a:extLst>
+          </a:blip>
+          <a:stretch>
+            <a:fillRect/>
+          </a:stretch>
+        </p:blipFill>
+        <p:spPr>
+          <a:xfrm>
+            <a:off x="11658489" y="6309320"/>
+            <a:ext cx="280267" cy="280267"/>
           </a:xfrm>
           <a:prstGeom prst="rect">
             <a:avLst/>
@@ -5665,12 +6076,102 @@
           </a:p>
         </p:txBody>
       </p:sp>
+      <p:sp>
+        <p:nvSpPr>
+          <p:cNvPr id="7" name="TextBox 6">
+            <a:extLst>
+              <a:ext uri="{FF2B5EF4-FFF2-40B4-BE49-F238E27FC236}">
+                <a16:creationId xmlns:a16="http://schemas.microsoft.com/office/drawing/2014/main" id="{A120D86B-9412-FFFA-2E86-3E358DE4B992}"/>
+              </a:ext>
+            </a:extLst>
+          </p:cNvPr>
+          <p:cNvSpPr txBox="1"/>
+          <p:nvPr/>
+        </p:nvSpPr>
+        <p:spPr>
+          <a:xfrm>
+            <a:off x="551384" y="1495032"/>
+            <a:ext cx="5616624" cy="735779"/>
+          </a:xfrm>
+          <a:prstGeom prst="rect">
+            <a:avLst/>
+          </a:prstGeom>
+          <a:noFill/>
+        </p:spPr>
+        <p:txBody>
+          <a:bodyPr wrap="square" rtlCol="0">
+            <a:spAutoFit/>
+          </a:bodyPr>
+          <a:lstStyle/>
+          <a:p>
+            <a:pPr algn="ctr">
+              <a:lnSpc>
+                <a:spcPct val="150000"/>
+              </a:lnSpc>
+            </a:pPr>
+            <a:r>
+              <a:rPr lang="en-GB" sz="3200" b="1" dirty="0">
+                <a:solidFill>
+                  <a:schemeClr val="bg1"/>
+                </a:solidFill>
+                <a:latin typeface="Century Gothic" panose="020B0502020202020204" pitchFamily="34" charset="0"/>
+              </a:rPr>
+              <a:t>Bread:</a:t>
+            </a:r>
+          </a:p>
+        </p:txBody>
+      </p:sp>
+      <p:sp>
+        <p:nvSpPr>
+          <p:cNvPr id="8" name="TextBox 7">
+            <a:extLst>
+              <a:ext uri="{FF2B5EF4-FFF2-40B4-BE49-F238E27FC236}">
+                <a16:creationId xmlns:a16="http://schemas.microsoft.com/office/drawing/2014/main" id="{FAE06038-3F4F-5E0F-699C-9FFE1D160046}"/>
+              </a:ext>
+            </a:extLst>
+          </p:cNvPr>
+          <p:cNvSpPr txBox="1"/>
+          <p:nvPr/>
+        </p:nvSpPr>
+        <p:spPr>
+          <a:xfrm>
+            <a:off x="5889398" y="1542131"/>
+            <a:ext cx="5616624" cy="735779"/>
+          </a:xfrm>
+          <a:prstGeom prst="rect">
+            <a:avLst/>
+          </a:prstGeom>
+          <a:noFill/>
+        </p:spPr>
+        <p:txBody>
+          <a:bodyPr wrap="square" rtlCol="0">
+            <a:spAutoFit/>
+          </a:bodyPr>
+          <a:lstStyle/>
+          <a:p>
+            <a:pPr algn="ctr">
+              <a:lnSpc>
+                <a:spcPct val="150000"/>
+              </a:lnSpc>
+            </a:pPr>
+            <a:r>
+              <a:rPr lang="en-GB" sz="3200" b="1" dirty="0">
+                <a:solidFill>
+                  <a:schemeClr val="bg1"/>
+                </a:solidFill>
+                <a:latin typeface="Century Gothic" panose="020B0502020202020204" pitchFamily="34" charset="0"/>
+              </a:rPr>
+              <a:t>Cup:</a:t>
+            </a:r>
+          </a:p>
+        </p:txBody>
+      </p:sp>
       <p:pic>
         <p:nvPicPr>
-          <p:cNvPr id="10" name="Picture 9" descr="Logo&#10;&#10;Description automatically generated with medium confidence">
+          <p:cNvPr id="15" name="Picture 14" descr="Logo&#10;&#10;Description automatically generated with medium confidence">
             <a:extLst>
               <a:ext uri="{FF2B5EF4-FFF2-40B4-BE49-F238E27FC236}">
-                <a16:creationId xmlns:a16="http://schemas.microsoft.com/office/drawing/2014/main" id="{09972652-1A6A-1B4B-0131-D25F4E4DEDD8}"/>
+                <a16:creationId xmlns:a16="http://schemas.microsoft.com/office/drawing/2014/main" id="{1B56477B-AF8D-03B6-F74E-187B3DB893EB}"/>
               </a:ext>
             </a:extLst>
           </p:cNvPr>
@@ -5703,10 +6204,10 @@
       </p:pic>
       <p:sp>
         <p:nvSpPr>
-          <p:cNvPr id="7" name="TextBox 6">
+          <p:cNvPr id="10" name="TextBox 9">
             <a:extLst>
               <a:ext uri="{FF2B5EF4-FFF2-40B4-BE49-F238E27FC236}">
-                <a16:creationId xmlns:a16="http://schemas.microsoft.com/office/drawing/2014/main" id="{A120D86B-9412-FFFA-2E86-3E358DE4B992}"/>
+                <a16:creationId xmlns:a16="http://schemas.microsoft.com/office/drawing/2014/main" id="{6B0E78A7-2C1A-D831-4793-20106228AC64}"/>
               </a:ext>
             </a:extLst>
           </p:cNvPr>
@@ -5715,82 +6216,97 @@
         </p:nvSpPr>
         <p:spPr>
           <a:xfrm>
-            <a:off x="551384" y="1495032"/>
-            <a:ext cx="5616624" cy="735779"/>
+            <a:off x="4727848" y="6269250"/>
+            <a:ext cx="7246931" cy="369332"/>
           </a:xfrm>
           <a:prstGeom prst="rect">
             <a:avLst/>
           </a:prstGeom>
           <a:noFill/>
-        </p:spPr>
-        <p:txBody>
-          <a:bodyPr wrap="square" rtlCol="0">
+          <a:ln w="12700">
+            <a:solidFill>
+              <a:srgbClr val="FF0000"/>
+            </a:solidFill>
+          </a:ln>
+        </p:spPr>
+        <p:txBody>
+          <a:bodyPr wrap="square" rtlCol="0" anchor="ctr">
             <a:spAutoFit/>
           </a:bodyPr>
           <a:lstStyle/>
           <a:p>
-            <a:pPr algn="ctr">
-              <a:lnSpc>
-                <a:spcPct val="150000"/>
-              </a:lnSpc>
-            </a:pPr>
-            <a:r>
-              <a:rPr lang="en-GB" sz="3200" b="1" dirty="0">
+            <a:r>
+              <a:rPr lang="en-GB" dirty="0">
                 <a:solidFill>
                   <a:schemeClr val="bg1"/>
                 </a:solidFill>
                 <a:latin typeface="Century Gothic" panose="020B0502020202020204" pitchFamily="34" charset="0"/>
               </a:rPr>
-              <a:t>Bread:</a:t>
-            </a:r>
-          </a:p>
-        </p:txBody>
-      </p:sp>
-      <p:sp>
-        <p:nvSpPr>
-          <p:cNvPr id="8" name="TextBox 7">
+              <a:t>Please Turn Off/Silence Your Devices </a:t>
+            </a:r>
+            <a:r>
+              <a:rPr lang="ja-JP" altLang="en-US" dirty="0">
+                <a:solidFill>
+                  <a:schemeClr val="bg1"/>
+                </a:solidFill>
+                <a:latin typeface="Century Gothic" panose="020B0502020202020204" pitchFamily="34" charset="0"/>
+              </a:rPr>
+              <a:t>請靜音或關閉所有電子設備</a:t>
+            </a:r>
+          </a:p>
+        </p:txBody>
+      </p:sp>
+      <p:pic>
+        <p:nvPicPr>
+          <p:cNvPr id="12" name="Picture 11" descr="Shape&#10;&#10;Description automatically generated with low confidence">
             <a:extLst>
               <a:ext uri="{FF2B5EF4-FFF2-40B4-BE49-F238E27FC236}">
-                <a16:creationId xmlns:a16="http://schemas.microsoft.com/office/drawing/2014/main" id="{FAE06038-3F4F-5E0F-699C-9FFE1D160046}"/>
+                <a16:creationId xmlns:a16="http://schemas.microsoft.com/office/drawing/2014/main" id="{471D372F-F992-2808-6EC2-F753888040DD}"/>
               </a:ext>
             </a:extLst>
           </p:cNvPr>
-          <p:cNvSpPr txBox="1"/>
+          <p:cNvPicPr>
+            <a:picLocks noChangeAspect="1"/>
+          </p:cNvPicPr>
           <p:nvPr/>
-        </p:nvSpPr>
+        </p:nvPicPr>
+        <p:blipFill>
+          <a:blip r:embed="rId3" cstate="print">
+            <a:extLst>
+              <a:ext uri="{BEBA8EAE-BF5A-486C-A8C5-ECC9F3942E4B}">
+                <a14:imgProps xmlns:a14="http://schemas.microsoft.com/office/drawing/2010/main">
+                  <a14:imgLayer r:embed="rId4">
+                    <a14:imgEffect>
+                      <a14:colorTemperature colorTemp="11500"/>
+                    </a14:imgEffect>
+                    <a14:imgEffect>
+                      <a14:saturation sat="400000"/>
+                    </a14:imgEffect>
+                    <a14:imgEffect>
+                      <a14:brightnessContrast bright="100000" contrast="100000"/>
+                    </a14:imgEffect>
+                  </a14:imgLayer>
+                </a14:imgProps>
+              </a:ext>
+              <a:ext uri="{28A0092B-C50C-407E-A947-70E740481C1C}">
+                <a14:useLocalDpi xmlns:a14="http://schemas.microsoft.com/office/drawing/2010/main" val="0"/>
+              </a:ext>
+            </a:extLst>
+          </a:blip>
+          <a:stretch>
+            <a:fillRect/>
+          </a:stretch>
+        </p:blipFill>
         <p:spPr>
           <a:xfrm>
-            <a:off x="5889398" y="1542131"/>
-            <a:ext cx="5616624" cy="735779"/>
+            <a:off x="11658489" y="6309320"/>
+            <a:ext cx="280267" cy="280267"/>
           </a:xfrm>
           <a:prstGeom prst="rect">
             <a:avLst/>
           </a:prstGeom>
-          <a:noFill/>
-        </p:spPr>
-        <p:txBody>
-          <a:bodyPr wrap="square" rtlCol="0">
-            <a:spAutoFit/>
-          </a:bodyPr>
-          <a:lstStyle/>
-          <a:p>
-            <a:pPr algn="ctr">
-              <a:lnSpc>
-                <a:spcPct val="150000"/>
-              </a:lnSpc>
-            </a:pPr>
-            <a:r>
-              <a:rPr lang="en-GB" sz="3200" b="1" dirty="0">
-                <a:solidFill>
-                  <a:schemeClr val="bg1"/>
-                </a:solidFill>
-                <a:latin typeface="Century Gothic" panose="020B0502020202020204" pitchFamily="34" charset="0"/>
-              </a:rPr>
-              <a:t>Cup:</a:t>
-            </a:r>
-          </a:p>
-        </p:txBody>
-      </p:sp>
+        </p:spPr>
+      </p:pic>
     </p:spTree>
     <p:extLst>
       <p:ext uri="{BB962C8B-B14F-4D97-AF65-F5344CB8AC3E}">
@@ -6363,10 +6879,10 @@
       </p:sp>
       <p:pic>
         <p:nvPicPr>
-          <p:cNvPr id="12" name="Picture 11" descr="Logo&#10;&#10;Description automatically generated with medium confidence">
+          <p:cNvPr id="9" name="Picture 8" descr="Logo&#10;&#10;Description automatically generated with medium confidence">
             <a:extLst>
               <a:ext uri="{FF2B5EF4-FFF2-40B4-BE49-F238E27FC236}">
-                <a16:creationId xmlns:a16="http://schemas.microsoft.com/office/drawing/2014/main" id="{F29E64E1-49CD-78DB-0ADB-1706C40BEF50}"/>
+                <a16:creationId xmlns:a16="http://schemas.microsoft.com/office/drawing/2014/main" id="{08FB6A1C-1FE7-894F-7F68-6DDAB352156F}"/>
               </a:ext>
             </a:extLst>
           </p:cNvPr>
@@ -6391,6 +6907,111 @@
           <a:xfrm>
             <a:off x="335359" y="6269250"/>
             <a:ext cx="2664297" cy="344791"/>
+          </a:xfrm>
+          <a:prstGeom prst="rect">
+            <a:avLst/>
+          </a:prstGeom>
+        </p:spPr>
+      </p:pic>
+      <p:sp>
+        <p:nvSpPr>
+          <p:cNvPr id="8" name="TextBox 7">
+            <a:extLst>
+              <a:ext uri="{FF2B5EF4-FFF2-40B4-BE49-F238E27FC236}">
+                <a16:creationId xmlns:a16="http://schemas.microsoft.com/office/drawing/2014/main" id="{2773390B-123D-F96F-081F-9943FC21B10E}"/>
+              </a:ext>
+            </a:extLst>
+          </p:cNvPr>
+          <p:cNvSpPr txBox="1"/>
+          <p:nvPr/>
+        </p:nvSpPr>
+        <p:spPr>
+          <a:xfrm>
+            <a:off x="4727848" y="6269250"/>
+            <a:ext cx="7246931" cy="369332"/>
+          </a:xfrm>
+          <a:prstGeom prst="rect">
+            <a:avLst/>
+          </a:prstGeom>
+          <a:noFill/>
+          <a:ln w="12700">
+            <a:solidFill>
+              <a:srgbClr val="FF0000"/>
+            </a:solidFill>
+          </a:ln>
+        </p:spPr>
+        <p:txBody>
+          <a:bodyPr wrap="square" rtlCol="0" anchor="ctr">
+            <a:spAutoFit/>
+          </a:bodyPr>
+          <a:lstStyle/>
+          <a:p>
+            <a:r>
+              <a:rPr lang="en-GB" dirty="0">
+                <a:solidFill>
+                  <a:schemeClr val="bg1"/>
+                </a:solidFill>
+                <a:latin typeface="Century Gothic" panose="020B0502020202020204" pitchFamily="34" charset="0"/>
+              </a:rPr>
+              <a:t>Please Turn Off/Silence Your Devices </a:t>
+            </a:r>
+            <a:r>
+              <a:rPr lang="ja-JP" altLang="en-US" dirty="0">
+                <a:solidFill>
+                  <a:schemeClr val="bg1"/>
+                </a:solidFill>
+                <a:latin typeface="Century Gothic" panose="020B0502020202020204" pitchFamily="34" charset="0"/>
+              </a:rPr>
+              <a:t>請靜音或關閉所有電子設備</a:t>
+            </a:r>
+          </a:p>
+        </p:txBody>
+      </p:sp>
+      <p:pic>
+        <p:nvPicPr>
+          <p:cNvPr id="12" name="Picture 11" descr="Shape&#10;&#10;Description automatically generated with low confidence">
+            <a:extLst>
+              <a:ext uri="{FF2B5EF4-FFF2-40B4-BE49-F238E27FC236}">
+                <a16:creationId xmlns:a16="http://schemas.microsoft.com/office/drawing/2014/main" id="{18CE34BC-5A9E-48C4-CF17-5E7B688F8CEE}"/>
+              </a:ext>
+            </a:extLst>
+          </p:cNvPr>
+          <p:cNvPicPr>
+            <a:picLocks noChangeAspect="1"/>
+          </p:cNvPicPr>
+          <p:nvPr/>
+        </p:nvPicPr>
+        <p:blipFill>
+          <a:blip r:embed="rId3" cstate="print">
+            <a:extLst>
+              <a:ext uri="{BEBA8EAE-BF5A-486C-A8C5-ECC9F3942E4B}">
+                <a14:imgProps xmlns:a14="http://schemas.microsoft.com/office/drawing/2010/main">
+                  <a14:imgLayer r:embed="rId4">
+                    <a14:imgEffect>
+                      <a14:colorTemperature colorTemp="11500"/>
+                    </a14:imgEffect>
+                    <a14:imgEffect>
+                      <a14:saturation sat="400000"/>
+                    </a14:imgEffect>
+                    <a14:imgEffect>
+                      <a14:brightnessContrast bright="100000" contrast="100000"/>
+                    </a14:imgEffect>
+                  </a14:imgLayer>
+                </a14:imgProps>
+              </a:ext>
+              <a:ext uri="{28A0092B-C50C-407E-A947-70E740481C1C}">
+                <a14:useLocalDpi xmlns:a14="http://schemas.microsoft.com/office/drawing/2010/main" val="0"/>
+              </a:ext>
+            </a:extLst>
+          </a:blip>
+          <a:stretch>
+            <a:fillRect/>
+          </a:stretch>
+        </p:blipFill>
+        <p:spPr>
+          <a:xfrm>
+            <a:off x="11658489" y="6309320"/>
+            <a:ext cx="280267" cy="280267"/>
           </a:xfrm>
           <a:prstGeom prst="rect">
             <a:avLst/>
@@ -6463,12 +7084,77 @@
           </a:p>
         </p:txBody>
       </p:sp>
+      <p:sp>
+        <p:nvSpPr>
+          <p:cNvPr id="9" name="TextBox 8">
+            <a:extLst>
+              <a:ext uri="{FF2B5EF4-FFF2-40B4-BE49-F238E27FC236}">
+                <a16:creationId xmlns:a16="http://schemas.microsoft.com/office/drawing/2014/main" id="{EB7FD2AF-7F03-5326-A748-9D97F0B7E43C}"/>
+              </a:ext>
+            </a:extLst>
+          </p:cNvPr>
+          <p:cNvSpPr txBox="1"/>
+          <p:nvPr/>
+        </p:nvSpPr>
+        <p:spPr>
+          <a:xfrm>
+            <a:off x="479376" y="637429"/>
+            <a:ext cx="11233247" cy="1446550"/>
+          </a:xfrm>
+          <a:prstGeom prst="rect">
+            <a:avLst/>
+          </a:prstGeom>
+          <a:noFill/>
+          <a:ln w="63500">
+            <a:solidFill>
+              <a:srgbClr val="FF0000"/>
+            </a:solidFill>
+          </a:ln>
+        </p:spPr>
+        <p:txBody>
+          <a:bodyPr wrap="square" rtlCol="0">
+            <a:spAutoFit/>
+          </a:bodyPr>
+          <a:lstStyle/>
+          <a:p>
+            <a:pPr algn="ctr"/>
+            <a:r>
+              <a:rPr lang="en-GB" altLang="en-US" sz="4400" b="1" dirty="0">
+                <a:solidFill>
+                  <a:schemeClr val="bg1"/>
+                </a:solidFill>
+                <a:latin typeface="Century Gothic" panose="020B0502020202020204" pitchFamily="34" charset="0"/>
+              </a:rPr>
+              <a:t>Please Turn Off/Silence Your Devices</a:t>
+            </a:r>
+          </a:p>
+          <a:p>
+            <a:pPr algn="ctr"/>
+            <a:r>
+              <a:rPr lang="ja-JP" altLang="en-US" sz="4400" b="1" dirty="0">
+                <a:solidFill>
+                  <a:schemeClr val="bg1"/>
+                </a:solidFill>
+                <a:latin typeface="Century Gothic" panose="020B0502020202020204" pitchFamily="34" charset="0"/>
+              </a:rPr>
+              <a:t>請靜音或關閉所有電子設備</a:t>
+            </a:r>
+            <a:endParaRPr lang="en-GB" sz="4400" b="1" dirty="0">
+              <a:solidFill>
+                <a:schemeClr val="bg1"/>
+              </a:solidFill>
+              <a:latin typeface="Century Gothic" panose="020B0502020202020204" pitchFamily="34" charset="0"/>
+              <a:ea typeface="金梅新中楷全字體" pitchFamily="49" charset="-120"/>
+            </a:endParaRPr>
+          </a:p>
+        </p:txBody>
+      </p:sp>
       <p:pic>
         <p:nvPicPr>
-          <p:cNvPr id="12" name="Picture 11" descr="Logo&#10;&#10;Description automatically generated with medium confidence">
+          <p:cNvPr id="7" name="Picture 6" descr="Logo&#10;&#10;Description automatically generated with medium confidence">
             <a:extLst>
               <a:ext uri="{FF2B5EF4-FFF2-40B4-BE49-F238E27FC236}">
-                <a16:creationId xmlns:a16="http://schemas.microsoft.com/office/drawing/2014/main" id="{F29E64E1-49CD-78DB-0ADB-1706C40BEF50}"/>
+                <a16:creationId xmlns:a16="http://schemas.microsoft.com/office/drawing/2014/main" id="{7D8F5CB1-CB81-80C7-2EEC-931ED922A40D}"/>
               </a:ext>
             </a:extLst>
           </p:cNvPr>
@@ -6499,66 +7185,147 @@
           </a:prstGeom>
         </p:spPr>
       </p:pic>
-      <p:sp>
-        <p:nvSpPr>
-          <p:cNvPr id="9" name="TextBox 8">
+      <p:pic>
+        <p:nvPicPr>
+          <p:cNvPr id="5" name="Picture 4" descr="Shape&#10;&#10;Description automatically generated with low confidence">
             <a:extLst>
               <a:ext uri="{FF2B5EF4-FFF2-40B4-BE49-F238E27FC236}">
-                <a16:creationId xmlns:a16="http://schemas.microsoft.com/office/drawing/2014/main" id="{EB7FD2AF-7F03-5326-A748-9D97F0B7E43C}"/>
+                <a16:creationId xmlns:a16="http://schemas.microsoft.com/office/drawing/2014/main" id="{AC9BD3E1-856D-B518-3D09-AA2FCBC6B91A}"/>
               </a:ext>
             </a:extLst>
           </p:cNvPr>
-          <p:cNvSpPr txBox="1"/>
+          <p:cNvPicPr>
+            <a:picLocks noChangeAspect="1"/>
+          </p:cNvPicPr>
           <p:nvPr/>
-        </p:nvSpPr>
+        </p:nvPicPr>
+        <p:blipFill>
+          <a:blip r:embed="rId3" cstate="print">
+            <a:extLst>
+              <a:ext uri="{BEBA8EAE-BF5A-486C-A8C5-ECC9F3942E4B}">
+                <a14:imgProps xmlns:a14="http://schemas.microsoft.com/office/drawing/2010/main">
+                  <a14:imgLayer r:embed="rId4">
+                    <a14:imgEffect>
+                      <a14:colorTemperature colorTemp="11500"/>
+                    </a14:imgEffect>
+                    <a14:imgEffect>
+                      <a14:saturation sat="400000"/>
+                    </a14:imgEffect>
+                    <a14:imgEffect>
+                      <a14:brightnessContrast bright="100000" contrast="100000"/>
+                    </a14:imgEffect>
+                  </a14:imgLayer>
+                </a14:imgProps>
+              </a:ext>
+              <a:ext uri="{28A0092B-C50C-407E-A947-70E740481C1C}">
+                <a14:useLocalDpi xmlns:a14="http://schemas.microsoft.com/office/drawing/2010/main" val="0"/>
+              </a:ext>
+            </a:extLst>
+          </a:blip>
+          <a:stretch>
+            <a:fillRect/>
+          </a:stretch>
+        </p:blipFill>
         <p:spPr>
           <a:xfrm>
-            <a:off x="0" y="692696"/>
-            <a:ext cx="12192000" cy="1446550"/>
+            <a:off x="1710701" y="2869813"/>
+            <a:ext cx="2359386" cy="2359386"/>
           </a:xfrm>
           <a:prstGeom prst="rect">
             <a:avLst/>
           </a:prstGeom>
-          <a:noFill/>
-        </p:spPr>
-        <p:txBody>
-          <a:bodyPr wrap="square" rtlCol="0">
-            <a:spAutoFit/>
-          </a:bodyPr>
-          <a:lstStyle/>
-          <a:p>
-            <a:pPr algn="ctr"/>
-            <a:r>
-              <a:rPr lang="en-GB" altLang="en-US" sz="4400" b="1" dirty="0">
-                <a:solidFill>
-                  <a:schemeClr val="bg1"/>
-                </a:solidFill>
-                <a:latin typeface="Century Gothic" panose="020B0502020202020204" pitchFamily="34" charset="0"/>
-              </a:rPr>
-              <a:t>Please Turn Off/Silence Your Devices</a:t>
-            </a:r>
-          </a:p>
-          <a:p>
-            <a:pPr algn="ctr"/>
-            <a:r>
-              <a:rPr lang="ja-JP" altLang="en-US" sz="4400" b="1" dirty="0">
-                <a:solidFill>
-                  <a:schemeClr val="bg1"/>
-                </a:solidFill>
-                <a:latin typeface="Century Gothic" panose="020B0502020202020204" pitchFamily="34" charset="0"/>
-              </a:rPr>
-              <a:t>請靜音或關閉所有電子設備</a:t>
-            </a:r>
-            <a:endParaRPr lang="en-GB" sz="4400" b="1" dirty="0">
-              <a:solidFill>
-                <a:schemeClr val="bg1"/>
-              </a:solidFill>
-              <a:latin typeface="Century Gothic" panose="020B0502020202020204" pitchFamily="34" charset="0"/>
-              <a:ea typeface="金梅新中楷全字體" pitchFamily="49" charset="-120"/>
-            </a:endParaRPr>
-          </a:p>
-        </p:txBody>
-      </p:sp>
+        </p:spPr>
+      </p:pic>
+      <p:pic>
+        <p:nvPicPr>
+          <p:cNvPr id="3" name="Picture 2" descr="Shape&#10;&#10;Description automatically generated with low confidence">
+            <a:extLst>
+              <a:ext uri="{FF2B5EF4-FFF2-40B4-BE49-F238E27FC236}">
+                <a16:creationId xmlns:a16="http://schemas.microsoft.com/office/drawing/2014/main" id="{F2B8EEB5-A2A8-2246-92B8-D793C3FDC5FE}"/>
+              </a:ext>
+            </a:extLst>
+          </p:cNvPr>
+          <p:cNvPicPr>
+            <a:picLocks noChangeAspect="1"/>
+          </p:cNvPicPr>
+          <p:nvPr/>
+        </p:nvPicPr>
+        <p:blipFill>
+          <a:blip r:embed="rId5">
+            <a:extLst>
+              <a:ext uri="{BEBA8EAE-BF5A-486C-A8C5-ECC9F3942E4B}">
+                <a14:imgProps xmlns:a14="http://schemas.microsoft.com/office/drawing/2010/main">
+                  <a14:imgLayer r:embed="rId6">
+                    <a14:imgEffect>
+                      <a14:brightnessContrast bright="100000" contrast="100000"/>
+                    </a14:imgEffect>
+                  </a14:imgLayer>
+                </a14:imgProps>
+              </a:ext>
+              <a:ext uri="{28A0092B-C50C-407E-A947-70E740481C1C}">
+                <a14:useLocalDpi xmlns:a14="http://schemas.microsoft.com/office/drawing/2010/main" val="0"/>
+              </a:ext>
+            </a:extLst>
+          </a:blip>
+          <a:stretch>
+            <a:fillRect/>
+          </a:stretch>
+        </p:blipFill>
+        <p:spPr>
+          <a:xfrm>
+            <a:off x="5015880" y="2869814"/>
+            <a:ext cx="2359385" cy="2359385"/>
+          </a:xfrm>
+          <a:prstGeom prst="rect">
+            <a:avLst/>
+          </a:prstGeom>
+        </p:spPr>
+      </p:pic>
+      <p:pic>
+        <p:nvPicPr>
+          <p:cNvPr id="6" name="Picture 5" descr="Shape&#10;&#10;Description automatically generated with low confidence">
+            <a:extLst>
+              <a:ext uri="{FF2B5EF4-FFF2-40B4-BE49-F238E27FC236}">
+                <a16:creationId xmlns:a16="http://schemas.microsoft.com/office/drawing/2014/main" id="{E4E05851-7A29-58F2-A0E9-7AFC98E740B6}"/>
+              </a:ext>
+            </a:extLst>
+          </p:cNvPr>
+          <p:cNvPicPr>
+            <a:picLocks noChangeAspect="1"/>
+          </p:cNvPicPr>
+          <p:nvPr/>
+        </p:nvPicPr>
+        <p:blipFill>
+          <a:blip r:embed="rId7">
+            <a:extLst>
+              <a:ext uri="{BEBA8EAE-BF5A-486C-A8C5-ECC9F3942E4B}">
+                <a14:imgProps xmlns:a14="http://schemas.microsoft.com/office/drawing/2010/main">
+                  <a14:imgLayer r:embed="rId8">
+                    <a14:imgEffect>
+                      <a14:brightnessContrast bright="100000" contrast="100000"/>
+                    </a14:imgEffect>
+                  </a14:imgLayer>
+                </a14:imgProps>
+              </a:ext>
+              <a:ext uri="{28A0092B-C50C-407E-A947-70E740481C1C}">
+                <a14:useLocalDpi xmlns:a14="http://schemas.microsoft.com/office/drawing/2010/main" val="0"/>
+              </a:ext>
+            </a:extLst>
+          </a:blip>
+          <a:stretch>
+            <a:fillRect/>
+          </a:stretch>
+        </p:blipFill>
+        <p:spPr>
+          <a:xfrm>
+            <a:off x="8121914" y="2866900"/>
+            <a:ext cx="2359385" cy="2359385"/>
+          </a:xfrm>
+          <a:prstGeom prst="rect">
+            <a:avLst/>
+          </a:prstGeom>
+        </p:spPr>
+      </p:pic>
     </p:spTree>
     <p:extLst>
       <p:ext uri="{BB962C8B-B14F-4D97-AF65-F5344CB8AC3E}">

</xml_diff>

<commit_message>
23/05/22 Prayer Edit Box simplified. Saving Simplified
</commit_message>
<xml_diff>
--- a/TJCPowerPoint/Resources/ServiceWidescreen.pptx
+++ b/TJCPowerPoint/Resources/ServiceWidescreen.pptx
@@ -5,10 +5,10 @@
     <p:sldMasterId id="2147483660" r:id="rId1"/>
   </p:sldMasterIdLst>
   <p:notesMasterIdLst>
-    <p:notesMasterId r:id="rId9"/>
+    <p:notesMasterId r:id="rId10"/>
   </p:notesMasterIdLst>
   <p:handoutMasterIdLst>
-    <p:handoutMasterId r:id="rId10"/>
+    <p:handoutMasterId r:id="rId11"/>
   </p:handoutMasterIdLst>
   <p:sldIdLst>
     <p:sldId id="357" r:id="rId2"/>
@@ -18,6 +18,7 @@
     <p:sldId id="361" r:id="rId6"/>
     <p:sldId id="359" r:id="rId7"/>
     <p:sldId id="363" r:id="rId8"/>
+    <p:sldId id="364" r:id="rId9"/>
   </p:sldIdLst>
   <p:sldSz cx="12192000" cy="6858000"/>
   <p:notesSz cx="6858000" cy="9144000"/>
@@ -4584,7 +4585,11 @@
           <a:lstStyle/>
           <a:p>
             <a:r>
-              <a:rPr lang="en-GB" dirty="0"/>
+              <a:rPr lang="en-GB" dirty="0">
+                <a:solidFill>
+                  <a:schemeClr val="bg1"/>
+                </a:solidFill>
+              </a:rPr>
               <a:t>Service/Hymnal</a:t>
             </a:r>
           </a:p>
@@ -4747,7 +4752,7 @@
               <a:avLst/>
             </a:prstGeom>
             <a:noFill/>
-            <a:ln w="12700">
+            <a:ln w="19050">
               <a:solidFill>
                 <a:srgbClr val="FF0000"/>
               </a:solidFill>
@@ -4885,21 +4890,12 @@
           <a:p>
             <a:r>
               <a:rPr lang="en-GB" dirty="0">
+                <a:solidFill>
+                  <a:schemeClr val="bg1"/>
+                </a:solidFill>
                 <a:latin typeface="Century Gothic" panose="020B0502020202020204" pitchFamily="34" charset="0"/>
               </a:rPr>
-              <a:t>Prayer Requests (</a:t>
-            </a:r>
-            <a:r>
-              <a:rPr lang="en-GB" dirty="0" err="1">
-                <a:latin typeface="Century Gothic" panose="020B0502020202020204" pitchFamily="34" charset="0"/>
-              </a:rPr>
-              <a:t>Streamelements</a:t>
-            </a:r>
-            <a:r>
-              <a:rPr lang="en-GB" dirty="0">
-                <a:latin typeface="Century Gothic" panose="020B0502020202020204" pitchFamily="34" charset="0"/>
-              </a:rPr>
-              <a:t>)</a:t>
+              <a:t>Prayer Requests (Image)</a:t>
             </a:r>
           </a:p>
         </p:txBody>
@@ -5022,7 +5018,7 @@
               <a:avLst/>
             </a:prstGeom>
             <a:noFill/>
-            <a:ln w="12700">
+            <a:ln w="19050">
               <a:solidFill>
                 <a:srgbClr val="FF0000"/>
               </a:solidFill>
@@ -5404,7 +5400,7 @@
             <a:avLst/>
           </a:prstGeom>
           <a:noFill/>
-          <a:ln w="12700">
+          <a:ln w="19050">
             <a:solidFill>
               <a:srgbClr val="FF0000"/>
             </a:solidFill>
@@ -5437,6 +5433,57 @@
           </a:p>
         </p:txBody>
       </p:sp>
+      <p:pic>
+        <p:nvPicPr>
+          <p:cNvPr id="9" name="Picture 8" descr="Shape&#10;&#10;Description automatically generated with low confidence">
+            <a:extLst>
+              <a:ext uri="{FF2B5EF4-FFF2-40B4-BE49-F238E27FC236}">
+                <a16:creationId xmlns:a16="http://schemas.microsoft.com/office/drawing/2014/main" id="{74DC84FB-B8E8-09F8-D629-C4E6D71E8C7F}"/>
+              </a:ext>
+            </a:extLst>
+          </p:cNvPr>
+          <p:cNvPicPr>
+            <a:picLocks noChangeAspect="1"/>
+          </p:cNvPicPr>
+          <p:nvPr/>
+        </p:nvPicPr>
+        <p:blipFill>
+          <a:blip r:embed="rId3" cstate="print">
+            <a:extLst>
+              <a:ext uri="{BEBA8EAE-BF5A-486C-A8C5-ECC9F3942E4B}">
+                <a14:imgProps xmlns:a14="http://schemas.microsoft.com/office/drawing/2010/main">
+                  <a14:imgLayer r:embed="rId4">
+                    <a14:imgEffect>
+                      <a14:colorTemperature colorTemp="11500"/>
+                    </a14:imgEffect>
+                    <a14:imgEffect>
+                      <a14:saturation sat="400000"/>
+                    </a14:imgEffect>
+                    <a14:imgEffect>
+                      <a14:brightnessContrast bright="100000" contrast="100000"/>
+                    </a14:imgEffect>
+                  </a14:imgLayer>
+                </a14:imgProps>
+              </a:ext>
+              <a:ext uri="{28A0092B-C50C-407E-A947-70E740481C1C}">
+                <a14:useLocalDpi xmlns:a14="http://schemas.microsoft.com/office/drawing/2010/main" val="0"/>
+              </a:ext>
+            </a:extLst>
+          </a:blip>
+          <a:stretch>
+            <a:fillRect/>
+          </a:stretch>
+        </p:blipFill>
+        <p:spPr>
+          <a:xfrm>
+            <a:off x="11658489" y="6309320"/>
+            <a:ext cx="280267" cy="280267"/>
+          </a:xfrm>
+          <a:prstGeom prst="rect">
+            <a:avLst/>
+          </a:prstGeom>
+        </p:spPr>
+      </p:pic>
     </p:spTree>
   </p:cSld>
   <p:clrMapOvr>
@@ -5663,8 +5710,12 @@
           <a:bodyPr/>
           <a:lstStyle/>
           <a:p>
+            <a:pPr algn="ctr"/>
             <a:r>
               <a:rPr lang="en-GB" dirty="0">
+                <a:solidFill>
+                  <a:schemeClr val="bg1"/>
+                </a:solidFill>
                 <a:latin typeface="Century Gothic" panose="020B0502020202020204" pitchFamily="34" charset="0"/>
               </a:rPr>
               <a:t>Announcements</a:t>
@@ -5749,7 +5800,7 @@
               <a:avLst/>
             </a:prstGeom>
             <a:noFill/>
-            <a:ln w="12700">
+            <a:ln w="19050">
               <a:solidFill>
                 <a:srgbClr val="FF0000"/>
               </a:solidFill>
@@ -6072,8 +6123,12 @@
           <a:bodyPr/>
           <a:lstStyle/>
           <a:p>
+            <a:pPr algn="ctr"/>
             <a:r>
               <a:rPr lang="en-GB" dirty="0">
+                <a:solidFill>
+                  <a:schemeClr val="bg1"/>
+                </a:solidFill>
                 <a:latin typeface="Century Gothic" panose="020B0502020202020204" pitchFamily="34" charset="0"/>
               </a:rPr>
               <a:t>Holy Communion</a:t>
@@ -6248,7 +6303,7 @@
               <a:avLst/>
             </a:prstGeom>
             <a:noFill/>
-            <a:ln w="12700">
+            <a:ln w="19050">
               <a:solidFill>
                 <a:srgbClr val="FF0000"/>
               </a:solidFill>
@@ -6388,11 +6443,17 @@
             <a:pPr algn="ctr"/>
             <a:r>
               <a:rPr lang="en-GB" altLang="en-US" dirty="0">
+                <a:solidFill>
+                  <a:schemeClr val="bg1"/>
+                </a:solidFill>
                 <a:latin typeface="Century Gothic" panose="020B0502020202020204" pitchFamily="34" charset="0"/>
               </a:rPr>
               <a:t>How to Pray</a:t>
             </a:r>
             <a:endParaRPr lang="en-GB" altLang="en-US" dirty="0">
+              <a:solidFill>
+                <a:schemeClr val="bg1"/>
+              </a:solidFill>
               <a:latin typeface="Century Gothic" panose="020B0502020202020204" pitchFamily="34" charset="0"/>
               <a:ea typeface="金梅新中楷全字體" pitchFamily="49" charset="-120"/>
             </a:endParaRPr>
@@ -6980,7 +7041,7 @@
               <a:avLst/>
             </a:prstGeom>
             <a:noFill/>
-            <a:ln w="12700">
+            <a:ln w="19050">
               <a:solidFill>
                 <a:srgbClr val="FF0000"/>
               </a:solidFill>
@@ -7062,6 +7123,11 @@
             <a:prstGeom prst="rect">
               <a:avLst/>
             </a:prstGeom>
+            <a:ln w="19050">
+              <a:solidFill>
+                <a:schemeClr val="tx1"/>
+              </a:solidFill>
+            </a:ln>
           </p:spPr>
         </p:pic>
       </p:grpSp>
@@ -7095,42 +7161,6 @@
           <a:chExt cx="0" cy="0"/>
         </a:xfrm>
       </p:grpSpPr>
-      <p:sp>
-        <p:nvSpPr>
-          <p:cNvPr id="7170" name="Title 1"/>
-          <p:cNvSpPr>
-            <a:spLocks noGrp="1"/>
-          </p:cNvSpPr>
-          <p:nvPr>
-            <p:ph type="title"/>
-          </p:nvPr>
-        </p:nvSpPr>
-        <p:spPr>
-          <a:xfrm>
-            <a:off x="-8737648" y="2060848"/>
-            <a:ext cx="8507412" cy="1498600"/>
-          </a:xfrm>
-        </p:spPr>
-        <p:txBody>
-          <a:bodyPr>
-            <a:normAutofit/>
-          </a:bodyPr>
-          <a:lstStyle/>
-          <a:p>
-            <a:pPr algn="ctr"/>
-            <a:r>
-              <a:rPr lang="en-GB" altLang="en-US" dirty="0">
-                <a:latin typeface="Century Gothic" panose="020B0502020202020204" pitchFamily="34" charset="0"/>
-              </a:rPr>
-              <a:t>How to Pray</a:t>
-            </a:r>
-            <a:endParaRPr lang="en-GB" altLang="en-US" dirty="0">
-              <a:latin typeface="Century Gothic" panose="020B0502020202020204" pitchFamily="34" charset="0"/>
-              <a:ea typeface="金梅新中楷全字體" pitchFamily="49" charset="-120"/>
-            </a:endParaRPr>
-          </a:p>
-        </p:txBody>
-      </p:sp>
       <p:sp>
         <p:nvSpPr>
           <p:cNvPr id="9" name="TextBox 8">
@@ -7377,6 +7407,299 @@
     <p:extLst>
       <p:ext uri="{BB962C8B-B14F-4D97-AF65-F5344CB8AC3E}">
         <p14:creationId xmlns:p14="http://schemas.microsoft.com/office/powerpoint/2010/main" val="1579287213"/>
+      </p:ext>
+    </p:extLst>
+  </p:cSld>
+  <p:clrMapOvr>
+    <a:masterClrMapping/>
+  </p:clrMapOvr>
+</p:sld>
+</file>
+
+<file path=ppt/slides/slide8.xml><?xml version="1.0" encoding="utf-8"?>
+<p:sld xmlns:a="http://schemas.openxmlformats.org/drawingml/2006/main" xmlns:r="http://schemas.openxmlformats.org/officeDocument/2006/relationships" xmlns:p="http://schemas.openxmlformats.org/presentationml/2006/main">
+  <p:cSld>
+    <p:spTree>
+      <p:nvGrpSpPr>
+        <p:cNvPr id="1" name=""/>
+        <p:cNvGrpSpPr/>
+        <p:nvPr/>
+      </p:nvGrpSpPr>
+      <p:grpSpPr>
+        <a:xfrm>
+          <a:off x="0" y="0"/>
+          <a:ext cx="0" cy="0"/>
+          <a:chOff x="0" y="0"/>
+          <a:chExt cx="0" cy="0"/>
+        </a:xfrm>
+      </p:grpSpPr>
+      <p:sp>
+        <p:nvSpPr>
+          <p:cNvPr id="10" name="Title 1">
+            <a:extLst>
+              <a:ext uri="{FF2B5EF4-FFF2-40B4-BE49-F238E27FC236}">
+                <a16:creationId xmlns:a16="http://schemas.microsoft.com/office/drawing/2014/main" id="{A29A4E1D-6B90-5AD8-9DB2-C35F6160DFE2}"/>
+              </a:ext>
+            </a:extLst>
+          </p:cNvPr>
+          <p:cNvSpPr txBox="1">
+            <a:spLocks/>
+          </p:cNvSpPr>
+          <p:nvPr/>
+        </p:nvSpPr>
+        <p:spPr>
+          <a:xfrm>
+            <a:off x="-7741368" y="2619557"/>
+            <a:ext cx="6858000" cy="2387600"/>
+          </a:xfrm>
+          <a:prstGeom prst="rect">
+            <a:avLst/>
+          </a:prstGeom>
+        </p:spPr>
+        <p:txBody>
+          <a:bodyPr vert="horz" lIns="91440" tIns="45720" rIns="91440" bIns="45720" rtlCol="0" anchor="ctr">
+            <a:normAutofit/>
+          </a:bodyPr>
+          <a:lstStyle>
+            <a:lvl1pPr algn="l" defTabSz="914400" rtl="0" eaLnBrk="1" latinLnBrk="0" hangingPunct="1">
+              <a:lnSpc>
+                <a:spcPct val="90000"/>
+              </a:lnSpc>
+              <a:spcBef>
+                <a:spcPct val="0"/>
+              </a:spcBef>
+              <a:buNone/>
+              <a:defRPr sz="4400" kern="1200">
+                <a:solidFill>
+                  <a:schemeClr val="tx1"/>
+                </a:solidFill>
+                <a:latin typeface="+mj-lt"/>
+                <a:ea typeface="+mj-ea"/>
+                <a:cs typeface="+mj-cs"/>
+              </a:defRPr>
+            </a:lvl1pPr>
+          </a:lstStyle>
+          <a:p>
+            <a:pPr algn="ctr"/>
+            <a:r>
+              <a:rPr lang="en-GB" dirty="0">
+                <a:solidFill>
+                  <a:schemeClr val="bg1"/>
+                </a:solidFill>
+                <a:latin typeface="Century Gothic" panose="020B0502020202020204" pitchFamily="34" charset="0"/>
+              </a:rPr>
+              <a:t>Service Times</a:t>
+            </a:r>
+          </a:p>
+        </p:txBody>
+      </p:sp>
+      <p:sp>
+        <p:nvSpPr>
+          <p:cNvPr id="11" name="TextBox 10">
+            <a:extLst>
+              <a:ext uri="{FF2B5EF4-FFF2-40B4-BE49-F238E27FC236}">
+                <a16:creationId xmlns:a16="http://schemas.microsoft.com/office/drawing/2014/main" id="{ADA8455D-134F-486C-C096-FFC55CA1AF07}"/>
+              </a:ext>
+            </a:extLst>
+          </p:cNvPr>
+          <p:cNvSpPr txBox="1"/>
+          <p:nvPr/>
+        </p:nvSpPr>
+        <p:spPr>
+          <a:xfrm>
+            <a:off x="3575720" y="3105834"/>
+            <a:ext cx="5040560" cy="646331"/>
+          </a:xfrm>
+          <a:prstGeom prst="rect">
+            <a:avLst/>
+          </a:prstGeom>
+          <a:noFill/>
+        </p:spPr>
+        <p:txBody>
+          <a:bodyPr wrap="square" rtlCol="0">
+            <a:spAutoFit/>
+          </a:bodyPr>
+          <a:lstStyle/>
+          <a:p>
+            <a:pPr algn="ctr"/>
+            <a:r>
+              <a:rPr lang="en-GB" sz="3600" b="1" dirty="0">
+                <a:solidFill>
+                  <a:schemeClr val="bg1"/>
+                </a:solidFill>
+                <a:latin typeface="Century Gothic" panose="020B0502020202020204" pitchFamily="34" charset="0"/>
+              </a:rPr>
+              <a:t>IMAGE PLACEHOLDER</a:t>
+            </a:r>
+          </a:p>
+        </p:txBody>
+      </p:sp>
+      <p:pic>
+        <p:nvPicPr>
+          <p:cNvPr id="12" name="Picture 11" descr="Logo&#10;&#10;Description automatically generated with medium confidence">
+            <a:extLst>
+              <a:ext uri="{FF2B5EF4-FFF2-40B4-BE49-F238E27FC236}">
+                <a16:creationId xmlns:a16="http://schemas.microsoft.com/office/drawing/2014/main" id="{FC6FCAC7-28DE-2AD7-A34C-985D97CD84F3}"/>
+              </a:ext>
+            </a:extLst>
+          </p:cNvPr>
+          <p:cNvPicPr>
+            <a:picLocks noChangeAspect="1"/>
+          </p:cNvPicPr>
+          <p:nvPr/>
+        </p:nvPicPr>
+        <p:blipFill>
+          <a:blip r:embed="rId2" cstate="print">
+            <a:extLst>
+              <a:ext uri="{28A0092B-C50C-407E-A947-70E740481C1C}">
+                <a14:useLocalDpi xmlns:a14="http://schemas.microsoft.com/office/drawing/2010/main" val="0"/>
+              </a:ext>
+            </a:extLst>
+          </a:blip>
+          <a:stretch>
+            <a:fillRect/>
+          </a:stretch>
+        </p:blipFill>
+        <p:spPr>
+          <a:xfrm>
+            <a:off x="335359" y="6269250"/>
+            <a:ext cx="2664297" cy="344791"/>
+          </a:xfrm>
+          <a:prstGeom prst="rect">
+            <a:avLst/>
+          </a:prstGeom>
+        </p:spPr>
+      </p:pic>
+      <p:grpSp>
+        <p:nvGrpSpPr>
+          <p:cNvPr id="13" name="Group 12">
+            <a:extLst>
+              <a:ext uri="{FF2B5EF4-FFF2-40B4-BE49-F238E27FC236}">
+                <a16:creationId xmlns:a16="http://schemas.microsoft.com/office/drawing/2014/main" id="{35212C79-2A94-CDE2-E1E0-4971A16CB7A4}"/>
+              </a:ext>
+            </a:extLst>
+          </p:cNvPr>
+          <p:cNvGrpSpPr/>
+          <p:nvPr/>
+        </p:nvGrpSpPr>
+        <p:grpSpPr>
+          <a:xfrm>
+            <a:off x="4727848" y="6269250"/>
+            <a:ext cx="7246931" cy="369332"/>
+            <a:chOff x="4727848" y="6269250"/>
+            <a:chExt cx="7246931" cy="369332"/>
+          </a:xfrm>
+        </p:grpSpPr>
+        <p:sp>
+          <p:nvSpPr>
+            <p:cNvPr id="14" name="TextBox 13">
+              <a:extLst>
+                <a:ext uri="{FF2B5EF4-FFF2-40B4-BE49-F238E27FC236}">
+                  <a16:creationId xmlns:a16="http://schemas.microsoft.com/office/drawing/2014/main" id="{F01C5CB4-79EB-E86F-3BC8-0D48A1127167}"/>
+                </a:ext>
+              </a:extLst>
+            </p:cNvPr>
+            <p:cNvSpPr txBox="1"/>
+            <p:nvPr/>
+          </p:nvSpPr>
+          <p:spPr>
+            <a:xfrm>
+              <a:off x="4727848" y="6269250"/>
+              <a:ext cx="7246931" cy="369332"/>
+            </a:xfrm>
+            <a:prstGeom prst="rect">
+              <a:avLst/>
+            </a:prstGeom>
+            <a:noFill/>
+            <a:ln w="19050">
+              <a:solidFill>
+                <a:srgbClr val="FF0000"/>
+              </a:solidFill>
+            </a:ln>
+          </p:spPr>
+          <p:txBody>
+            <a:bodyPr wrap="square" rtlCol="0" anchor="ctr">
+              <a:spAutoFit/>
+            </a:bodyPr>
+            <a:lstStyle/>
+            <a:p>
+              <a:r>
+                <a:rPr lang="en-GB" dirty="0">
+                  <a:solidFill>
+                    <a:schemeClr val="bg1"/>
+                  </a:solidFill>
+                  <a:latin typeface="Century Gothic" panose="020B0502020202020204" pitchFamily="34" charset="0"/>
+                </a:rPr>
+                <a:t>Please Turn Off/Silence Your Devices </a:t>
+              </a:r>
+              <a:r>
+                <a:rPr lang="ja-JP" altLang="en-US" dirty="0">
+                  <a:solidFill>
+                    <a:schemeClr val="bg1"/>
+                  </a:solidFill>
+                  <a:latin typeface="Century Gothic" panose="020B0502020202020204" pitchFamily="34" charset="0"/>
+                </a:rPr>
+                <a:t>請靜音或關閉所有電子設備</a:t>
+              </a:r>
+            </a:p>
+          </p:txBody>
+        </p:sp>
+        <p:pic>
+          <p:nvPicPr>
+            <p:cNvPr id="15" name="Picture 14" descr="Shape&#10;&#10;Description automatically generated with low confidence">
+              <a:extLst>
+                <a:ext uri="{FF2B5EF4-FFF2-40B4-BE49-F238E27FC236}">
+                  <a16:creationId xmlns:a16="http://schemas.microsoft.com/office/drawing/2014/main" id="{59210A52-B8A0-B230-BDDD-5B62C0DDCE8E}"/>
+                </a:ext>
+              </a:extLst>
+            </p:cNvPr>
+            <p:cNvPicPr>
+              <a:picLocks noChangeAspect="1"/>
+            </p:cNvPicPr>
+            <p:nvPr/>
+          </p:nvPicPr>
+          <p:blipFill>
+            <a:blip r:embed="rId3" cstate="print">
+              <a:extLst>
+                <a:ext uri="{BEBA8EAE-BF5A-486C-A8C5-ECC9F3942E4B}">
+                  <a14:imgProps xmlns:a14="http://schemas.microsoft.com/office/drawing/2010/main">
+                    <a14:imgLayer r:embed="rId4">
+                      <a14:imgEffect>
+                        <a14:colorTemperature colorTemp="11500"/>
+                      </a14:imgEffect>
+                      <a14:imgEffect>
+                        <a14:saturation sat="400000"/>
+                      </a14:imgEffect>
+                      <a14:imgEffect>
+                        <a14:brightnessContrast bright="100000" contrast="100000"/>
+                      </a14:imgEffect>
+                    </a14:imgLayer>
+                  </a14:imgProps>
+                </a:ext>
+                <a:ext uri="{28A0092B-C50C-407E-A947-70E740481C1C}">
+                  <a14:useLocalDpi xmlns:a14="http://schemas.microsoft.com/office/drawing/2010/main" val="0"/>
+                </a:ext>
+              </a:extLst>
+            </a:blip>
+            <a:stretch>
+              <a:fillRect/>
+            </a:stretch>
+          </p:blipFill>
+          <p:spPr>
+            <a:xfrm>
+              <a:off x="11658489" y="6309320"/>
+              <a:ext cx="280267" cy="280267"/>
+            </a:xfrm>
+            <a:prstGeom prst="rect">
+              <a:avLst/>
+            </a:prstGeom>
+          </p:spPr>
+        </p:pic>
+      </p:grpSp>
+    </p:spTree>
+    <p:extLst>
+      <p:ext uri="{BB962C8B-B14F-4D97-AF65-F5344CB8AC3E}">
+        <p14:creationId xmlns:p14="http://schemas.microsoft.com/office/powerpoint/2010/main" val="3742231344"/>
       </p:ext>
     </p:extLst>
   </p:cSld>

</xml_diff>

<commit_message>
07/10/22 Added Movable Chinese Title + Fixed Hymnal "Hymns" Positioning
</commit_message>
<xml_diff>
--- a/TJCPowerPoint/Resources/ServiceWidescreen.pptx
+++ b/TJCPowerPoint/Resources/ServiceWidescreen.pptx
@@ -3958,7 +3958,7 @@
         </p:nvSpPr>
         <p:spPr bwMode="auto">
           <a:xfrm>
-            <a:off x="0" y="260648"/>
+            <a:off x="0" y="66328"/>
             <a:ext cx="12192000" cy="914400"/>
           </a:xfrm>
           <a:prstGeom prst="rect">
@@ -4106,7 +4106,7 @@
         </p:nvSpPr>
         <p:spPr bwMode="auto">
           <a:xfrm>
-            <a:off x="1524000" y="2348880"/>
+            <a:off x="1524000" y="2406367"/>
             <a:ext cx="9144000" cy="2246769"/>
           </a:xfrm>
           <a:prstGeom prst="rect">
@@ -4184,7 +4184,7 @@
         </p:nvSpPr>
         <p:spPr bwMode="auto">
           <a:xfrm>
-            <a:off x="1530570" y="3356993"/>
+            <a:off x="1530570" y="3414480"/>
             <a:ext cx="9137431" cy="781752"/>
           </a:xfrm>
           <a:prstGeom prst="rect">
@@ -4260,7 +4260,7 @@
         </p:nvSpPr>
         <p:spPr bwMode="auto">
           <a:xfrm>
-            <a:off x="300061" y="2503862"/>
+            <a:off x="300061" y="2561349"/>
             <a:ext cx="5004520" cy="769441"/>
           </a:xfrm>
           <a:prstGeom prst="rect">

</xml_diff>

<commit_message>
01/11/22 Segoe UI changes
</commit_message>
<xml_diff>
--- a/TJCPowerPoint/Resources/ServiceWidescreen.pptx
+++ b/TJCPowerPoint/Resources/ServiceWidescreen.pptx
@@ -4014,8 +4014,9 @@
                 <a:solidFill>
                   <a:schemeClr val="bg1"/>
                 </a:solidFill>
-                <a:latin typeface="Century Gothic" panose="020B0502020202020204" pitchFamily="34" charset="0"/>
+                <a:latin typeface="Segoe UI" panose="020B0502040204020203" pitchFamily="34" charset="0"/>
                 <a:ea typeface="宋体" panose="02010600030101010101" pitchFamily="2" charset="-122"/>
+                <a:cs typeface="Segoe UI" panose="020B0502040204020203" pitchFamily="34" charset="0"/>
               </a:rPr>
               <a:t>English</a:t>
             </a:r>
@@ -4032,7 +4033,7 @@
         </p:nvSpPr>
         <p:spPr bwMode="auto">
           <a:xfrm>
-            <a:off x="0" y="1192571"/>
+            <a:off x="0" y="1078929"/>
             <a:ext cx="12192000" cy="1006475"/>
           </a:xfrm>
           <a:prstGeom prst="rect">
@@ -4142,16 +4143,16 @@
               <a:t>Hymns </a:t>
             </a:r>
             <a:r>
-              <a:rPr lang="zh-TW" altLang="en-US" sz="5600" dirty="0">
+              <a:rPr lang="zh-TW" altLang="en-US" sz="5400" dirty="0">
                 <a:solidFill>
                   <a:schemeClr val="bg1"/>
                 </a:solidFill>
                 <a:latin typeface="Microsoft JhengHei" panose="020B0604030504040204" pitchFamily="34" charset="-120"/>
                 <a:ea typeface="Microsoft JhengHei" panose="020B0604030504040204" pitchFamily="34" charset="-120"/>
               </a:rPr>
-              <a:t>詩</a:t>
-            </a:r>
-            <a:endParaRPr lang="en-US" altLang="en-US" sz="5600" dirty="0">
+              <a:t>诗歌</a:t>
+            </a:r>
+            <a:endParaRPr lang="en-US" altLang="en-US" sz="6000" dirty="0">
               <a:solidFill>
                 <a:schemeClr val="bg1"/>
               </a:solidFill>
@@ -4330,7 +4331,7 @@
                 <a:latin typeface="Microsoft JhengHei" panose="020B0604030504040204" pitchFamily="34" charset="-120"/>
                 <a:ea typeface="Microsoft JhengHei" panose="020B0604030504040204" pitchFamily="34" charset="-120"/>
               </a:rPr>
-              <a:t>經文</a:t>
+              <a:t>经文</a:t>
             </a:r>
             <a:endParaRPr lang="en-US" altLang="en-US" sz="4400" dirty="0">
               <a:solidFill>
@@ -4773,14 +4774,20 @@
                 <a:t>Please Turn Off/Silence Your Devices </a:t>
               </a:r>
               <a:r>
-                <a:rPr lang="ja-JP" altLang="en-US" dirty="0">
+                <a:rPr lang="zh-CN" altLang="en-US" dirty="0">
                   <a:solidFill>
                     <a:schemeClr val="bg1"/>
                   </a:solidFill>
                   <a:latin typeface="Century Gothic" panose="020B0502020202020204" pitchFamily="34" charset="0"/>
                 </a:rPr>
-                <a:t>請靜音或關閉所有電子設備</a:t>
+                <a:t>请静音或关闭所有电子设备</a:t>
               </a:r>
+              <a:endParaRPr lang="ja-JP" altLang="en-US" dirty="0">
+                <a:solidFill>
+                  <a:schemeClr val="bg1"/>
+                </a:solidFill>
+                <a:latin typeface="Century Gothic" panose="020B0502020202020204" pitchFamily="34" charset="0"/>
+              </a:endParaRPr>
             </a:p>
           </p:txBody>
         </p:sp>
@@ -4941,7 +4948,8 @@
                 <a:solidFill>
                   <a:schemeClr val="bg1"/>
                 </a:solidFill>
-                <a:latin typeface="Century Gothic" panose="020B0502020202020204" pitchFamily="34" charset="0"/>
+                <a:latin typeface="Segoe UI" panose="020B0502040204020203" pitchFamily="34" charset="0"/>
+                <a:cs typeface="Segoe UI" panose="020B0502040204020203" pitchFamily="34" charset="0"/>
               </a:rPr>
               <a:t>IMAGE PLACEHOLDER</a:t>
             </a:r>
@@ -5047,15 +5055,20 @@
                 <a:t>Please Turn Off/Silence Your Devices </a:t>
               </a:r>
               <a:r>
-                <a:rPr lang="ja-JP" altLang="en-US" dirty="0">
+                <a:rPr lang="zh-CN" altLang="en-US" dirty="0">
                   <a:solidFill>
                     <a:schemeClr val="bg1"/>
                   </a:solidFill>
-                  <a:latin typeface="Microsoft JhengHei" panose="020B0604030504040204" pitchFamily="34" charset="-120"/>
-                  <a:ea typeface="Microsoft JhengHei" panose="020B0604030504040204" pitchFamily="34" charset="-120"/>
+                  <a:latin typeface="Century Gothic" panose="020B0502020202020204" pitchFamily="34" charset="0"/>
                 </a:rPr>
-                <a:t>請靜音或關閉所有電子設備</a:t>
+                <a:t>请静音或关闭所有电子设备</a:t>
               </a:r>
+              <a:endParaRPr lang="ja-JP" altLang="en-US" dirty="0">
+                <a:solidFill>
+                  <a:schemeClr val="bg1"/>
+                </a:solidFill>
+                <a:latin typeface="Century Gothic" panose="020B0502020202020204" pitchFamily="34" charset="0"/>
+              </a:endParaRPr>
             </a:p>
           </p:txBody>
         </p:sp>
@@ -5290,9 +5303,10 @@
                 <a:solidFill>
                   <a:schemeClr val="bg1"/>
                 </a:solidFill>
-                <a:latin typeface="Century Gothic" panose="020B0502020202020204" pitchFamily="34" charset="0"/>
+                <a:latin typeface="Segoe UI" panose="020B0502040204020203" pitchFamily="34" charset="0"/>
+                <a:cs typeface="Segoe UI" panose="020B0502040204020203" pitchFamily="34" charset="0"/>
               </a:rPr>
-              <a:t>Prayer Requests</a:t>
+              <a:t>Prayer Requests </a:t>
             </a:r>
             <a:r>
               <a:rPr lang="en-GB" altLang="en-US" sz="3200" b="1" u="sng" dirty="0">
@@ -5438,15 +5452,20 @@
               <a:t>Please Turn Off/Silence Your Devices </a:t>
             </a:r>
             <a:r>
-              <a:rPr lang="ja-JP" altLang="en-US" dirty="0">
+              <a:rPr lang="zh-CN" altLang="en-US" dirty="0">
                 <a:solidFill>
                   <a:schemeClr val="bg1"/>
                 </a:solidFill>
-                <a:latin typeface="Microsoft JhengHei" panose="020B0604030504040204" pitchFamily="34" charset="-120"/>
-                <a:ea typeface="Microsoft JhengHei" panose="020B0604030504040204" pitchFamily="34" charset="-120"/>
+                <a:latin typeface="Century Gothic" panose="020B0502020202020204" pitchFamily="34" charset="0"/>
               </a:rPr>
-              <a:t>請靜音或關閉所有電子設備</a:t>
-            </a:r>
+              <a:t>请静音或关闭所有电子设备</a:t>
+            </a:r>
+            <a:endParaRPr lang="ja-JP" altLang="en-US" dirty="0">
+              <a:solidFill>
+                <a:schemeClr val="bg1"/>
+              </a:solidFill>
+              <a:latin typeface="Century Gothic" panose="020B0502020202020204" pitchFamily="34" charset="0"/>
+            </a:endParaRPr>
           </a:p>
         </p:txBody>
       </p:sp>
@@ -5675,9 +5694,19 @@
                 <a:solidFill>
                   <a:schemeClr val="bg1"/>
                 </a:solidFill>
+                <a:latin typeface="Segoe UI" panose="020B0502040204020203" pitchFamily="34" charset="0"/>
+                <a:cs typeface="Segoe UI" panose="020B0502040204020203" pitchFamily="34" charset="0"/>
+              </a:rPr>
+              <a:t>Announcements</a:t>
+            </a:r>
+            <a:r>
+              <a:rPr lang="en-GB" altLang="en-US" sz="3200" b="1" u="sng" dirty="0">
+                <a:solidFill>
+                  <a:schemeClr val="bg1"/>
+                </a:solidFill>
                 <a:latin typeface="Century Gothic" panose="020B0502020202020204" pitchFamily="34" charset="0"/>
               </a:rPr>
-              <a:t>Announcements </a:t>
+              <a:t> </a:t>
             </a:r>
             <a:r>
               <a:rPr lang="en-GB" altLang="en-US" sz="3200" b="1" u="sng" dirty="0">
@@ -5847,15 +5876,20 @@
                 <a:t>Please Turn Off/Silence Your Devices </a:t>
               </a:r>
               <a:r>
-                <a:rPr lang="ja-JP" altLang="en-US" dirty="0">
+                <a:rPr lang="zh-CN" altLang="en-US" dirty="0">
                   <a:solidFill>
                     <a:schemeClr val="bg1"/>
                   </a:solidFill>
-                  <a:latin typeface="Microsoft JhengHei" panose="020B0604030504040204" pitchFamily="34" charset="-120"/>
-                  <a:ea typeface="Microsoft JhengHei" panose="020B0604030504040204" pitchFamily="34" charset="-120"/>
+                  <a:latin typeface="Century Gothic" panose="020B0502020202020204" pitchFamily="34" charset="0"/>
                 </a:rPr>
-                <a:t>請靜音或關閉所有電子設備</a:t>
+                <a:t>请静音或关闭所有电子设备</a:t>
               </a:r>
+              <a:endParaRPr lang="ja-JP" altLang="en-US" dirty="0">
+                <a:solidFill>
+                  <a:schemeClr val="bg1"/>
+                </a:solidFill>
+                <a:latin typeface="Century Gothic" panose="020B0502020202020204" pitchFamily="34" charset="0"/>
+              </a:endParaRPr>
             </a:p>
           </p:txBody>
         </p:sp>
@@ -6107,7 +6141,8 @@
                 <a:solidFill>
                   <a:schemeClr val="bg1"/>
                 </a:solidFill>
-                <a:latin typeface="Century Gothic" panose="020B0502020202020204" pitchFamily="34" charset="0"/>
+                <a:latin typeface="Segoe UI" panose="020B0502040204020203" pitchFamily="34" charset="0"/>
+                <a:cs typeface="Segoe UI" panose="020B0502040204020203" pitchFamily="34" charset="0"/>
               </a:rPr>
               <a:t>Holy Communion </a:t>
             </a:r>
@@ -6360,14 +6395,20 @@
                 <a:t>Please Turn Off/Silence Your Devices </a:t>
               </a:r>
               <a:r>
-                <a:rPr lang="ja-JP" altLang="en-US" dirty="0">
+                <a:rPr lang="zh-CN" altLang="en-US" dirty="0">
                   <a:solidFill>
                     <a:schemeClr val="bg1"/>
                   </a:solidFill>
                   <a:latin typeface="Century Gothic" panose="020B0502020202020204" pitchFamily="34" charset="0"/>
                 </a:rPr>
-                <a:t>請靜音或關閉所有電子設備</a:t>
+                <a:t>请静音或关闭所有电子设备</a:t>
               </a:r>
+              <a:endParaRPr lang="ja-JP" altLang="en-US" dirty="0">
+                <a:solidFill>
+                  <a:schemeClr val="bg1"/>
+                </a:solidFill>
+                <a:latin typeface="Century Gothic" panose="020B0502020202020204" pitchFamily="34" charset="0"/>
+              </a:endParaRPr>
             </a:p>
           </p:txBody>
         </p:sp>
@@ -6531,7 +6572,8 @@
                 <a:solidFill>
                   <a:schemeClr val="bg1"/>
                 </a:solidFill>
-                <a:latin typeface="Century Gothic" panose="020B0502020202020204" pitchFamily="34" charset="0"/>
+                <a:latin typeface="Segoe UI" panose="020B0502040204020203" pitchFamily="34" charset="0"/>
+                <a:cs typeface="Segoe UI" panose="020B0502040204020203" pitchFamily="34" charset="0"/>
               </a:rPr>
               <a:t>Welcome To True Jesus Church , Please Join Us In Prayer </a:t>
             </a:r>
@@ -7106,15 +7148,20 @@
                 <a:t>Please Turn Off/Silence Your Devices </a:t>
               </a:r>
               <a:r>
-                <a:rPr lang="ja-JP" altLang="en-US" dirty="0">
+                <a:rPr lang="zh-CN" altLang="en-US" dirty="0">
                   <a:solidFill>
                     <a:schemeClr val="bg1"/>
                   </a:solidFill>
-                  <a:latin typeface="Microsoft JhengHei" panose="020B0604030504040204" pitchFamily="34" charset="-120"/>
-                  <a:ea typeface="Microsoft JhengHei" panose="020B0604030504040204" pitchFamily="34" charset="-120"/>
+                  <a:latin typeface="Century Gothic" panose="020B0502020202020204" pitchFamily="34" charset="0"/>
                 </a:rPr>
-                <a:t>請靜音或關閉所有電子設備</a:t>
+                <a:t>请静音或关闭所有电子设备</a:t>
               </a:r>
+              <a:endParaRPr lang="ja-JP" altLang="en-US" dirty="0">
+                <a:solidFill>
+                  <a:schemeClr val="bg1"/>
+                </a:solidFill>
+                <a:latin typeface="Century Gothic" panose="020B0502020202020204" pitchFamily="34" charset="0"/>
+              </a:endParaRPr>
             </a:p>
           </p:txBody>
         </p:sp>
@@ -7252,7 +7299,8 @@
                 <a:solidFill>
                   <a:schemeClr val="bg1"/>
                 </a:solidFill>
-                <a:latin typeface="Century Gothic" panose="020B0502020202020204" pitchFamily="34" charset="0"/>
+                <a:latin typeface="Segoe UI" panose="020B0502040204020203" pitchFamily="34" charset="0"/>
+                <a:cs typeface="Segoe UI" panose="020B0502040204020203" pitchFamily="34" charset="0"/>
               </a:rPr>
               <a:t>Please Turn Off/Silence Your Devices</a:t>
             </a:r>
@@ -7260,14 +7308,14 @@
           <a:p>
             <a:pPr algn="ctr"/>
             <a:r>
-              <a:rPr lang="ja-JP" altLang="en-US" sz="4400" b="1" dirty="0">
+              <a:rPr lang="zh-CN" altLang="en-US" sz="4400" b="1" dirty="0">
                 <a:solidFill>
                   <a:schemeClr val="bg1"/>
                 </a:solidFill>
                 <a:latin typeface="Microsoft JhengHei" panose="020B0604030504040204" pitchFamily="34" charset="-120"/>
                 <a:ea typeface="Microsoft JhengHei" panose="020B0604030504040204" pitchFamily="34" charset="-120"/>
               </a:rPr>
-              <a:t>請靜音或關閉所有電子設備</a:t>
+              <a:t>请静音或关闭所有电子设备</a:t>
             </a:r>
             <a:endParaRPr lang="en-GB" sz="4400" b="1" dirty="0">
               <a:solidFill>
@@ -7588,7 +7636,8 @@
                 <a:solidFill>
                   <a:schemeClr val="bg1"/>
                 </a:solidFill>
-                <a:latin typeface="Century Gothic" panose="020B0502020202020204" pitchFamily="34" charset="0"/>
+                <a:latin typeface="Segoe UI" panose="020B0502040204020203" pitchFamily="34" charset="0"/>
+                <a:cs typeface="Segoe UI" panose="020B0502040204020203" pitchFamily="34" charset="0"/>
               </a:rPr>
               <a:t>IMAGE PLACEHOLDER</a:t>
             </a:r>

</xml_diff>

<commit_message>
16/11/22 Refactoring 2 - Three State Program
Change to how hymnal is done, rather than relying on the title for detection, it now uses checkboxes like when showing hymns/bible verses.
Includes other visual changes and code refactoring.
</commit_message>
<xml_diff>
--- a/TJCPowerPoint/Resources/ServiceWidescreen.pptx
+++ b/TJCPowerPoint/Resources/ServiceWidescreen.pptx
@@ -5,20 +5,19 @@
     <p:sldMasterId id="2147483660" r:id="rId1"/>
   </p:sldMasterIdLst>
   <p:notesMasterIdLst>
-    <p:notesMasterId r:id="rId10"/>
+    <p:notesMasterId r:id="rId9"/>
   </p:notesMasterIdLst>
   <p:handoutMasterIdLst>
-    <p:handoutMasterId r:id="rId11"/>
+    <p:handoutMasterId r:id="rId10"/>
   </p:handoutMasterIdLst>
   <p:sldIdLst>
     <p:sldId id="357" r:id="rId2"/>
-    <p:sldId id="362" r:id="rId3"/>
-    <p:sldId id="358" r:id="rId4"/>
-    <p:sldId id="360" r:id="rId5"/>
-    <p:sldId id="361" r:id="rId6"/>
-    <p:sldId id="359" r:id="rId7"/>
-    <p:sldId id="363" r:id="rId8"/>
-    <p:sldId id="364" r:id="rId9"/>
+    <p:sldId id="358" r:id="rId3"/>
+    <p:sldId id="360" r:id="rId4"/>
+    <p:sldId id="361" r:id="rId5"/>
+    <p:sldId id="359" r:id="rId6"/>
+    <p:sldId id="363" r:id="rId7"/>
+    <p:sldId id="364" r:id="rId8"/>
   </p:sldIdLst>
   <p:sldSz cx="12192000" cy="6858000"/>
   <p:notesSz cx="6858000" cy="9144000"/>
@@ -4867,295 +4866,6 @@
       </p:grpSpPr>
       <p:sp>
         <p:nvSpPr>
-          <p:cNvPr id="8" name="Title 1">
-            <a:extLst>
-              <a:ext uri="{FF2B5EF4-FFF2-40B4-BE49-F238E27FC236}">
-                <a16:creationId xmlns:a16="http://schemas.microsoft.com/office/drawing/2014/main" id="{3DD2CCF3-660C-4B35-8262-BE8668E0E220}"/>
-              </a:ext>
-            </a:extLst>
-          </p:cNvPr>
-          <p:cNvSpPr>
-            <a:spLocks noGrp="1"/>
-          </p:cNvSpPr>
-          <p:nvPr>
-            <p:ph type="ctrTitle"/>
-          </p:nvPr>
-        </p:nvSpPr>
-        <p:spPr>
-          <a:xfrm>
-            <a:off x="-7741368" y="2619557"/>
-            <a:ext cx="6858000" cy="2387600"/>
-          </a:xfrm>
-        </p:spPr>
-        <p:txBody>
-          <a:bodyPr/>
-          <a:lstStyle/>
-          <a:p>
-            <a:r>
-              <a:rPr lang="en-GB" dirty="0">
-                <a:solidFill>
-                  <a:schemeClr val="bg1"/>
-                </a:solidFill>
-                <a:latin typeface="Century Gothic" panose="020B0502020202020204" pitchFamily="34" charset="0"/>
-              </a:rPr>
-              <a:t>Prayer Requests (Image)</a:t>
-            </a:r>
-          </a:p>
-        </p:txBody>
-      </p:sp>
-      <p:sp>
-        <p:nvSpPr>
-          <p:cNvPr id="2" name="TextBox 1">
-            <a:extLst>
-              <a:ext uri="{FF2B5EF4-FFF2-40B4-BE49-F238E27FC236}">
-                <a16:creationId xmlns:a16="http://schemas.microsoft.com/office/drawing/2014/main" id="{6EC0A171-41D3-4538-A3AA-95F4377BCA8B}"/>
-              </a:ext>
-            </a:extLst>
-          </p:cNvPr>
-          <p:cNvSpPr txBox="1"/>
-          <p:nvPr/>
-        </p:nvSpPr>
-        <p:spPr>
-          <a:xfrm>
-            <a:off x="2999656" y="3105834"/>
-            <a:ext cx="6192688" cy="646331"/>
-          </a:xfrm>
-          <a:prstGeom prst="rect">
-            <a:avLst/>
-          </a:prstGeom>
-          <a:noFill/>
-        </p:spPr>
-        <p:txBody>
-          <a:bodyPr wrap="square" rtlCol="0">
-            <a:spAutoFit/>
-          </a:bodyPr>
-          <a:lstStyle/>
-          <a:p>
-            <a:pPr algn="ctr"/>
-            <a:r>
-              <a:rPr lang="en-GB" sz="3600" b="1" dirty="0">
-                <a:solidFill>
-                  <a:schemeClr val="bg1"/>
-                </a:solidFill>
-                <a:latin typeface="Segoe UI" panose="020B0502040204020203" pitchFamily="34" charset="0"/>
-                <a:cs typeface="Segoe UI" panose="020B0502040204020203" pitchFamily="34" charset="0"/>
-              </a:rPr>
-              <a:t>PRAYER REQUEST IMAGE</a:t>
-            </a:r>
-          </a:p>
-        </p:txBody>
-      </p:sp>
-      <p:pic>
-        <p:nvPicPr>
-          <p:cNvPr id="7" name="Picture 6" descr="Logo&#10;&#10;Description automatically generated with medium confidence">
-            <a:extLst>
-              <a:ext uri="{FF2B5EF4-FFF2-40B4-BE49-F238E27FC236}">
-                <a16:creationId xmlns:a16="http://schemas.microsoft.com/office/drawing/2014/main" id="{EF3F0058-932D-CAD4-BFC4-012B47F2E596}"/>
-              </a:ext>
-            </a:extLst>
-          </p:cNvPr>
-          <p:cNvPicPr>
-            <a:picLocks noChangeAspect="1"/>
-          </p:cNvPicPr>
-          <p:nvPr/>
-        </p:nvPicPr>
-        <p:blipFill>
-          <a:blip r:embed="rId2" cstate="print">
-            <a:extLst>
-              <a:ext uri="{28A0092B-C50C-407E-A947-70E740481C1C}">
-                <a14:useLocalDpi xmlns:a14="http://schemas.microsoft.com/office/drawing/2010/main" val="0"/>
-              </a:ext>
-            </a:extLst>
-          </a:blip>
-          <a:stretch>
-            <a:fillRect/>
-          </a:stretch>
-        </p:blipFill>
-        <p:spPr>
-          <a:xfrm>
-            <a:off x="335359" y="6269250"/>
-            <a:ext cx="2664297" cy="344791"/>
-          </a:xfrm>
-          <a:prstGeom prst="rect">
-            <a:avLst/>
-          </a:prstGeom>
-        </p:spPr>
-      </p:pic>
-      <p:grpSp>
-        <p:nvGrpSpPr>
-          <p:cNvPr id="12" name="Group 11">
-            <a:extLst>
-              <a:ext uri="{FF2B5EF4-FFF2-40B4-BE49-F238E27FC236}">
-                <a16:creationId xmlns:a16="http://schemas.microsoft.com/office/drawing/2014/main" id="{EA784185-13AE-4868-C382-B47CF5BA31B0}"/>
-              </a:ext>
-            </a:extLst>
-          </p:cNvPr>
-          <p:cNvGrpSpPr/>
-          <p:nvPr/>
-        </p:nvGrpSpPr>
-        <p:grpSpPr>
-          <a:xfrm>
-            <a:off x="4943872" y="6269250"/>
-            <a:ext cx="7030907" cy="369332"/>
-            <a:chOff x="4943872" y="6269250"/>
-            <a:chExt cx="7030907" cy="369332"/>
-          </a:xfrm>
-        </p:grpSpPr>
-        <p:sp>
-          <p:nvSpPr>
-            <p:cNvPr id="13" name="TextBox 12">
-              <a:extLst>
-                <a:ext uri="{FF2B5EF4-FFF2-40B4-BE49-F238E27FC236}">
-                  <a16:creationId xmlns:a16="http://schemas.microsoft.com/office/drawing/2014/main" id="{DFAB295F-71BE-BE22-C4E0-5EF12CFEB00C}"/>
-                </a:ext>
-              </a:extLst>
-            </p:cNvPr>
-            <p:cNvSpPr txBox="1"/>
-            <p:nvPr/>
-          </p:nvSpPr>
-          <p:spPr>
-            <a:xfrm>
-              <a:off x="4943872" y="6269250"/>
-              <a:ext cx="7030907" cy="369332"/>
-            </a:xfrm>
-            <a:prstGeom prst="rect">
-              <a:avLst/>
-            </a:prstGeom>
-            <a:noFill/>
-            <a:ln w="19050">
-              <a:solidFill>
-                <a:srgbClr val="FF0000"/>
-              </a:solidFill>
-            </a:ln>
-          </p:spPr>
-          <p:txBody>
-            <a:bodyPr wrap="square" rtlCol="0" anchor="ctr">
-              <a:spAutoFit/>
-            </a:bodyPr>
-            <a:lstStyle/>
-            <a:p>
-              <a:r>
-                <a:rPr lang="en-GB" dirty="0">
-                  <a:solidFill>
-                    <a:schemeClr val="bg1"/>
-                  </a:solidFill>
-                  <a:latin typeface="Segoe UI Semibold" panose="020B0702040204020203" pitchFamily="34" charset="0"/>
-                  <a:cs typeface="Segoe UI Semibold" panose="020B0702040204020203" pitchFamily="34" charset="0"/>
-                </a:rPr>
-                <a:t>Please Turn Off/Silence Your Devices </a:t>
-              </a:r>
-              <a:r>
-                <a:rPr lang="zh-TW" altLang="en-US" b="1" dirty="0">
-                  <a:solidFill>
-                    <a:schemeClr val="bg1"/>
-                  </a:solidFill>
-                  <a:latin typeface="Microsoft JhengHei" panose="020B0604030504040204" pitchFamily="34" charset="-120"/>
-                  <a:ea typeface="Microsoft JhengHei" panose="020B0604030504040204" pitchFamily="34" charset="-120"/>
-                </a:rPr>
-                <a:t>請靜音或關閉所有電子設備</a:t>
-              </a:r>
-              <a:endParaRPr lang="ja-JP" altLang="en-US" b="1" dirty="0">
-                <a:solidFill>
-                  <a:schemeClr val="bg1"/>
-                </a:solidFill>
-                <a:latin typeface="Microsoft JhengHei" panose="020B0604030504040204" pitchFamily="34" charset="-120"/>
-                <a:ea typeface="Microsoft JhengHei" panose="020B0604030504040204" pitchFamily="34" charset="-120"/>
-              </a:endParaRPr>
-            </a:p>
-          </p:txBody>
-        </p:sp>
-        <p:pic>
-          <p:nvPicPr>
-            <p:cNvPr id="14" name="Picture 13" descr="Shape&#10;&#10;Description automatically generated with low confidence">
-              <a:extLst>
-                <a:ext uri="{FF2B5EF4-FFF2-40B4-BE49-F238E27FC236}">
-                  <a16:creationId xmlns:a16="http://schemas.microsoft.com/office/drawing/2014/main" id="{2C89D9E1-335C-8F1D-D009-8B3BEF47AAE9}"/>
-                </a:ext>
-              </a:extLst>
-            </p:cNvPr>
-            <p:cNvPicPr>
-              <a:picLocks noChangeAspect="1"/>
-            </p:cNvPicPr>
-            <p:nvPr/>
-          </p:nvPicPr>
-          <p:blipFill>
-            <a:blip r:embed="rId3" cstate="print">
-              <a:extLst>
-                <a:ext uri="{BEBA8EAE-BF5A-486C-A8C5-ECC9F3942E4B}">
-                  <a14:imgProps xmlns:a14="http://schemas.microsoft.com/office/drawing/2010/main">
-                    <a14:imgLayer r:embed="rId4">
-                      <a14:imgEffect>
-                        <a14:colorTemperature colorTemp="11500"/>
-                      </a14:imgEffect>
-                      <a14:imgEffect>
-                        <a14:saturation sat="400000"/>
-                      </a14:imgEffect>
-                      <a14:imgEffect>
-                        <a14:brightnessContrast bright="100000" contrast="100000"/>
-                      </a14:imgEffect>
-                    </a14:imgLayer>
-                  </a14:imgProps>
-                </a:ext>
-                <a:ext uri="{28A0092B-C50C-407E-A947-70E740481C1C}">
-                  <a14:useLocalDpi xmlns:a14="http://schemas.microsoft.com/office/drawing/2010/main" val="0"/>
-                </a:ext>
-              </a:extLst>
-            </a:blip>
-            <a:stretch>
-              <a:fillRect/>
-            </a:stretch>
-          </p:blipFill>
-          <p:spPr>
-            <a:xfrm>
-              <a:off x="11658489" y="6309320"/>
-              <a:ext cx="280267" cy="280267"/>
-            </a:xfrm>
-            <a:prstGeom prst="rect">
-              <a:avLst/>
-            </a:prstGeom>
-          </p:spPr>
-        </p:pic>
-      </p:grpSp>
-    </p:spTree>
-    <p:extLst>
-      <p:ext uri="{BB962C8B-B14F-4D97-AF65-F5344CB8AC3E}">
-        <p14:creationId xmlns:p14="http://schemas.microsoft.com/office/powerpoint/2010/main" val="3351645641"/>
-      </p:ext>
-    </p:extLst>
-  </p:cSld>
-  <p:clrMapOvr>
-    <a:masterClrMapping/>
-  </p:clrMapOvr>
-</p:sld>
-</file>
-
-<file path=ppt/slides/slide3.xml><?xml version="1.0" encoding="utf-8"?>
-<p:sld xmlns:a="http://schemas.openxmlformats.org/drawingml/2006/main" xmlns:r="http://schemas.openxmlformats.org/officeDocument/2006/relationships" xmlns:p="http://schemas.openxmlformats.org/presentationml/2006/main">
-  <p:cSld>
-    <p:bg>
-      <p:bgPr>
-        <a:solidFill>
-          <a:schemeClr val="tx1"/>
-        </a:solidFill>
-        <a:effectLst/>
-      </p:bgPr>
-    </p:bg>
-    <p:spTree>
-      <p:nvGrpSpPr>
-        <p:cNvPr id="1" name=""/>
-        <p:cNvGrpSpPr/>
-        <p:nvPr/>
-      </p:nvGrpSpPr>
-      <p:grpSpPr>
-        <a:xfrm>
-          <a:off x="0" y="0"/>
-          <a:ext cx="0" cy="0"/>
-          <a:chOff x="0" y="0"/>
-          <a:chExt cx="0" cy="0"/>
-        </a:xfrm>
-      </p:grpSpPr>
-      <p:sp>
-        <p:nvSpPr>
           <p:cNvPr id="6" name="Text Box 12">
             <a:extLst>
               <a:ext uri="{FF2B5EF4-FFF2-40B4-BE49-F238E27FC236}">
@@ -5544,7 +5254,7 @@
 </p:sld>
 </file>
 
-<file path=ppt/slides/slide4.xml><?xml version="1.0" encoding="utf-8"?>
+<file path=ppt/slides/slide3.xml><?xml version="1.0" encoding="utf-8"?>
 <p:sld xmlns:a="http://schemas.openxmlformats.org/drawingml/2006/main" xmlns:r="http://schemas.openxmlformats.org/officeDocument/2006/relationships" xmlns:p="http://schemas.openxmlformats.org/presentationml/2006/main">
   <p:cSld>
     <p:bg>
@@ -5977,7 +5687,7 @@
 </p:sld>
 </file>
 
-<file path=ppt/slides/slide5.xml><?xml version="1.0" encoding="utf-8"?>
+<file path=ppt/slides/slide4.xml><?xml version="1.0" encoding="utf-8"?>
 <p:sld xmlns:a="http://schemas.openxmlformats.org/drawingml/2006/main" xmlns:r="http://schemas.openxmlformats.org/officeDocument/2006/relationships" xmlns:p="http://schemas.openxmlformats.org/presentationml/2006/main">
   <p:cSld>
     <p:bg>
@@ -6567,7 +6277,7 @@
 </p:sld>
 </file>
 
-<file path=ppt/slides/slide6.xml><?xml version="1.0" encoding="utf-8"?>
+<file path=ppt/slides/slide5.xml><?xml version="1.0" encoding="utf-8"?>
 <p:sld xmlns:a="http://schemas.openxmlformats.org/drawingml/2006/main" xmlns:r="http://schemas.openxmlformats.org/officeDocument/2006/relationships" xmlns:p="http://schemas.openxmlformats.org/presentationml/2006/main">
   <p:cSld>
     <p:bg>
@@ -7320,13 +7030,13 @@
   <p:clrMapOvr>
     <a:masterClrMapping/>
   </p:clrMapOvr>
-  <mc:AlternateContent xmlns:mc="http://schemas.openxmlformats.org/markup-compatibility/2006">
-    <mc:Choice xmlns:p14="http://schemas.microsoft.com/office/powerpoint/2010/main" Requires="p14">
+  <mc:AlternateContent xmlns:mc="http://schemas.openxmlformats.org/markup-compatibility/2006" xmlns:p14="http://schemas.microsoft.com/office/powerpoint/2010/main">
+    <mc:Choice Requires="p14">
       <p:transition spd="med" p14:dur="700">
         <p:fade/>
       </p:transition>
     </mc:Choice>
-    <mc:Fallback>
+    <mc:Fallback xmlns="">
       <p:transition spd="med">
         <p:fade/>
       </p:transition>
@@ -7335,7 +7045,7 @@
 </p:sld>
 </file>
 
-<file path=ppt/slides/slide7.xml><?xml version="1.0" encoding="utf-8"?>
+<file path=ppt/slides/slide6.xml><?xml version="1.0" encoding="utf-8"?>
 <p:sld xmlns:a="http://schemas.openxmlformats.org/drawingml/2006/main" xmlns:r="http://schemas.openxmlformats.org/officeDocument/2006/relationships" xmlns:p="http://schemas.openxmlformats.org/presentationml/2006/main">
   <p:cSld>
     <p:bg>
@@ -7619,13 +7329,13 @@
   <p:clrMapOvr>
     <a:masterClrMapping/>
   </p:clrMapOvr>
-  <mc:AlternateContent xmlns:mc="http://schemas.openxmlformats.org/markup-compatibility/2006">
-    <mc:Choice xmlns:p14="http://schemas.microsoft.com/office/powerpoint/2010/main" Requires="p14">
+  <mc:AlternateContent xmlns:mc="http://schemas.openxmlformats.org/markup-compatibility/2006" xmlns:p14="http://schemas.microsoft.com/office/powerpoint/2010/main">
+    <mc:Choice Requires="p14">
       <p:transition spd="med" p14:dur="700">
         <p:fade/>
       </p:transition>
     </mc:Choice>
-    <mc:Fallback>
+    <mc:Fallback xmlns="">
       <p:transition spd="med">
         <p:fade/>
       </p:transition>
@@ -7634,7 +7344,7 @@
 </p:sld>
 </file>
 
-<file path=ppt/slides/slide8.xml><?xml version="1.0" encoding="utf-8"?>
+<file path=ppt/slides/slide7.xml><?xml version="1.0" encoding="utf-8"?>
 <p:sld xmlns:a="http://schemas.openxmlformats.org/drawingml/2006/main" xmlns:r="http://schemas.openxmlformats.org/officeDocument/2006/relationships" xmlns:p="http://schemas.openxmlformats.org/presentationml/2006/main">
   <p:cSld>
     <p:bg>

</xml_diff>

<commit_message>
27/11/22 Visual Changes + Bug Fix
Bug Fix: When in hymnal mode, then update title would not return to sermon hymns. Fixed
</commit_message>
<xml_diff>
--- a/TJCPowerPoint/Resources/ServiceWidescreen.pptx
+++ b/TJCPowerPoint/Resources/ServiceWidescreen.pptx
@@ -5,10 +5,10 @@
     <p:sldMasterId id="2147483660" r:id="rId1"/>
   </p:sldMasterIdLst>
   <p:notesMasterIdLst>
-    <p:notesMasterId r:id="rId9"/>
+    <p:notesMasterId r:id="rId10"/>
   </p:notesMasterIdLst>
   <p:handoutMasterIdLst>
-    <p:handoutMasterId r:id="rId10"/>
+    <p:handoutMasterId r:id="rId11"/>
   </p:handoutMasterIdLst>
   <p:sldIdLst>
     <p:sldId id="357" r:id="rId2"/>
@@ -16,8 +16,9 @@
     <p:sldId id="360" r:id="rId4"/>
     <p:sldId id="361" r:id="rId5"/>
     <p:sldId id="359" r:id="rId6"/>
-    <p:sldId id="363" r:id="rId7"/>
-    <p:sldId id="364" r:id="rId8"/>
+    <p:sldId id="365" r:id="rId7"/>
+    <p:sldId id="363" r:id="rId8"/>
+    <p:sldId id="364" r:id="rId9"/>
   </p:sldIdLst>
   <p:sldSz cx="12192000" cy="6858000"/>
   <p:notesSz cx="6858000" cy="9144000"/>
@@ -4106,8 +4107,8 @@
         </p:nvSpPr>
         <p:spPr bwMode="auto">
           <a:xfrm>
-            <a:off x="1524000" y="2393344"/>
-            <a:ext cx="9144000" cy="830997"/>
+            <a:off x="1519747" y="2515543"/>
+            <a:ext cx="9144000" cy="769441"/>
           </a:xfrm>
           <a:prstGeom prst="rect">
             <a:avLst/>
@@ -4133,16 +4134,25 @@
               </a:spcBef>
             </a:pPr>
             <a:r>
-              <a:rPr lang="en-GB" altLang="en-US" sz="4800" dirty="0">
+              <a:rPr lang="en-GB" altLang="en-US" sz="4000" dirty="0">
                 <a:solidFill>
                   <a:schemeClr val="bg1"/>
                 </a:solidFill>
                 <a:latin typeface="Century Gothic" panose="020B0502020202020204" pitchFamily="34" charset="0"/>
               </a:rPr>
-              <a:t>Hymns </a:t>
-            </a:r>
-            <a:r>
-              <a:rPr lang="zh-TW" altLang="en-US" sz="4400" dirty="0">
+              <a:t>Hymns</a:t>
+            </a:r>
+            <a:r>
+              <a:rPr lang="en-GB" altLang="en-US" sz="4400" dirty="0">
+                <a:solidFill>
+                  <a:schemeClr val="bg1"/>
+                </a:solidFill>
+                <a:latin typeface="Century Gothic" panose="020B0502020202020204" pitchFamily="34" charset="0"/>
+              </a:rPr>
+              <a:t> </a:t>
+            </a:r>
+            <a:r>
+              <a:rPr lang="zh-TW" altLang="en-US" sz="4000" dirty="0">
                 <a:solidFill>
                   <a:schemeClr val="bg1"/>
                 </a:solidFill>
@@ -4151,7 +4161,7 @@
               </a:rPr>
               <a:t>詩</a:t>
             </a:r>
-            <a:endParaRPr lang="en-US" altLang="en-US" sz="4800" b="1" dirty="0">
+            <a:endParaRPr lang="en-US" altLang="en-US" sz="4400" b="1" dirty="0">
               <a:solidFill>
                 <a:srgbClr val="FFFFFF"/>
               </a:solidFill>
@@ -4246,8 +4256,8 @@
         </p:nvSpPr>
         <p:spPr bwMode="auto">
           <a:xfrm>
-            <a:off x="222502" y="2449050"/>
-            <a:ext cx="5004520" cy="769441"/>
+            <a:off x="222502" y="2505090"/>
+            <a:ext cx="5004520" cy="707886"/>
           </a:xfrm>
           <a:prstGeom prst="rect">
             <a:avLst/>
@@ -4300,7 +4310,7 @@
               <a:buNone/>
             </a:pPr>
             <a:r>
-              <a:rPr lang="en-GB" altLang="en-US" sz="4400" dirty="0">
+              <a:rPr lang="en-GB" altLang="en-US" sz="4000" dirty="0">
                 <a:solidFill>
                   <a:schemeClr val="bg1"/>
                 </a:solidFill>
@@ -4309,7 +4319,7 @@
               <a:t>Bible Verse </a:t>
             </a:r>
             <a:r>
-              <a:rPr lang="zh-TW" altLang="en-US" sz="4400" dirty="0">
+              <a:rPr lang="zh-TW" altLang="en-US" sz="4000" dirty="0">
                 <a:solidFill>
                   <a:schemeClr val="bg1"/>
                 </a:solidFill>
@@ -4318,7 +4328,7 @@
               </a:rPr>
               <a:t>經文</a:t>
             </a:r>
-            <a:endParaRPr lang="en-US" altLang="en-US" sz="4400" dirty="0">
+            <a:endParaRPr lang="en-US" altLang="en-US" sz="4000" dirty="0">
               <a:solidFill>
                 <a:schemeClr val="bg1"/>
               </a:solidFill>
@@ -5001,7 +5011,7 @@
           <a:p>
             <a:pPr algn="ctr"/>
             <a:r>
-              <a:rPr lang="en-GB" altLang="en-US" sz="3200" b="1" u="sng" dirty="0">
+              <a:rPr lang="en-GB" altLang="en-US" sz="3200" b="1" dirty="0">
                 <a:solidFill>
                   <a:schemeClr val="bg1"/>
                 </a:solidFill>
@@ -5011,7 +5021,7 @@
               <a:t>Prayer Requests </a:t>
             </a:r>
             <a:r>
-              <a:rPr lang="en-GB" altLang="en-US" sz="3200" b="1" u="sng" dirty="0">
+              <a:rPr lang="en-GB" altLang="en-US" sz="3200" b="1" dirty="0">
                 <a:solidFill>
                   <a:schemeClr val="bg1"/>
                 </a:solidFill>
@@ -5021,7 +5031,7 @@
               <a:t>- </a:t>
             </a:r>
             <a:r>
-              <a:rPr lang="zh-TW" altLang="en-US" sz="3200" b="1" u="sng" dirty="0">
+              <a:rPr lang="zh-TW" altLang="en-US" sz="3200" b="1" dirty="0">
                 <a:solidFill>
                   <a:schemeClr val="bg1"/>
                 </a:solidFill>
@@ -5030,7 +5040,7 @@
               </a:rPr>
               <a:t>代禱</a:t>
             </a:r>
-            <a:endParaRPr lang="en-GB" altLang="zh-TW" sz="3200" b="1" u="sng" dirty="0">
+            <a:endParaRPr lang="en-GB" altLang="zh-TW" sz="3200" b="1" dirty="0">
               <a:solidFill>
                 <a:schemeClr val="bg1"/>
               </a:solidFill>
@@ -5416,7 +5426,7 @@
           <a:p>
             <a:pPr algn="ctr"/>
             <a:r>
-              <a:rPr lang="en-GB" altLang="en-US" sz="3200" b="1" u="sng" dirty="0">
+              <a:rPr lang="en-GB" altLang="en-US" sz="3200" b="1" dirty="0">
                 <a:solidFill>
                   <a:schemeClr val="bg1"/>
                 </a:solidFill>
@@ -5426,7 +5436,7 @@
               <a:t>Announcements</a:t>
             </a:r>
             <a:r>
-              <a:rPr lang="en-GB" altLang="en-US" sz="3200" b="1" u="sng" dirty="0">
+              <a:rPr lang="en-GB" altLang="en-US" sz="3200" b="1" dirty="0">
                 <a:solidFill>
                   <a:schemeClr val="bg1"/>
                 </a:solidFill>
@@ -5435,7 +5445,7 @@
               <a:t> </a:t>
             </a:r>
             <a:r>
-              <a:rPr lang="en-GB" altLang="en-US" sz="3200" b="1" u="sng" dirty="0">
+              <a:rPr lang="en-GB" altLang="en-US" sz="3200" b="1" dirty="0">
                 <a:solidFill>
                   <a:schemeClr val="bg1"/>
                 </a:solidFill>
@@ -5445,7 +5455,7 @@
               <a:t>- </a:t>
             </a:r>
             <a:r>
-              <a:rPr lang="zh-TW" altLang="en-US" sz="3200" b="1" u="sng" dirty="0">
+              <a:rPr lang="zh-TW" altLang="en-US" sz="3200" b="1" dirty="0">
                 <a:solidFill>
                   <a:schemeClr val="bg1"/>
                 </a:solidFill>
@@ -5454,7 +5464,7 @@
               </a:rPr>
               <a:t>佈告</a:t>
             </a:r>
-            <a:endParaRPr lang="en-GB" altLang="zh-TW" sz="3200" b="1" u="sng" dirty="0">
+            <a:endParaRPr lang="en-GB" altLang="zh-TW" sz="3200" b="1" dirty="0">
               <a:solidFill>
                 <a:schemeClr val="bg1"/>
               </a:solidFill>
@@ -5714,6 +5724,61 @@
       </p:grpSpPr>
       <p:sp>
         <p:nvSpPr>
+          <p:cNvPr id="4" name="Rectangle 3">
+            <a:extLst>
+              <a:ext uri="{FF2B5EF4-FFF2-40B4-BE49-F238E27FC236}">
+                <a16:creationId xmlns:a16="http://schemas.microsoft.com/office/drawing/2014/main" id="{92B26967-1931-B409-90C7-32C75D09D409}"/>
+              </a:ext>
+            </a:extLst>
+          </p:cNvPr>
+          <p:cNvSpPr/>
+          <p:nvPr/>
+        </p:nvSpPr>
+        <p:spPr>
+          <a:xfrm>
+            <a:off x="-1" y="0"/>
+            <a:ext cx="5118641" cy="6858000"/>
+          </a:xfrm>
+          <a:prstGeom prst="rect">
+            <a:avLst/>
+          </a:prstGeom>
+          <a:solidFill>
+            <a:schemeClr val="tx1">
+              <a:lumMod val="75000"/>
+              <a:lumOff val="25000"/>
+            </a:schemeClr>
+          </a:solidFill>
+          <a:ln>
+            <a:noFill/>
+          </a:ln>
+        </p:spPr>
+        <p:style>
+          <a:lnRef idx="2">
+            <a:schemeClr val="accent1">
+              <a:shade val="50000"/>
+            </a:schemeClr>
+          </a:lnRef>
+          <a:fillRef idx="1">
+            <a:schemeClr val="accent1"/>
+          </a:fillRef>
+          <a:effectRef idx="0">
+            <a:schemeClr val="accent1"/>
+          </a:effectRef>
+          <a:fontRef idx="minor">
+            <a:schemeClr val="lt1"/>
+          </a:fontRef>
+        </p:style>
+        <p:txBody>
+          <a:bodyPr rtlCol="0" anchor="ctr"/>
+          <a:lstStyle/>
+          <a:p>
+            <a:pPr algn="ctr"/>
+            <a:endParaRPr lang="en-GB"/>
+          </a:p>
+        </p:txBody>
+      </p:sp>
+      <p:sp>
+        <p:nvSpPr>
           <p:cNvPr id="6" name="TextBox 5">
             <a:extLst>
               <a:ext uri="{FF2B5EF4-FFF2-40B4-BE49-F238E27FC236}">
@@ -5726,18 +5791,13 @@
         </p:nvSpPr>
         <p:spPr>
           <a:xfrm>
-            <a:off x="335359" y="908720"/>
-            <a:ext cx="11521280" cy="769441"/>
+            <a:off x="-2" y="2875583"/>
+            <a:ext cx="5118640" cy="769441"/>
           </a:xfrm>
           <a:prstGeom prst="rect">
             <a:avLst/>
           </a:prstGeom>
-          <a:solidFill>
-            <a:schemeClr val="tx1">
-              <a:lumMod val="75000"/>
-              <a:lumOff val="25000"/>
-            </a:schemeClr>
-          </a:solidFill>
+          <a:noFill/>
         </p:spPr>
         <p:txBody>
           <a:bodyPr wrap="square" rtlCol="0">
@@ -5747,32 +5807,43 @@
           <a:p>
             <a:pPr algn="ctr"/>
             <a:r>
-              <a:rPr lang="en-GB" sz="4400" b="1" dirty="0">
+              <a:rPr lang="en-GB" sz="4400" dirty="0">
                 <a:solidFill>
                   <a:schemeClr val="bg1"/>
                 </a:solidFill>
-                <a:latin typeface="Segoe UI" panose="020B0502040204020203" pitchFamily="34" charset="0"/>
+                <a:latin typeface="Century Gothic" panose="020B0502020202020204" pitchFamily="34" charset="0"/>
                 <a:cs typeface="Segoe UI" panose="020B0502040204020203" pitchFamily="34" charset="0"/>
               </a:rPr>
-              <a:t>Hymns </a:t>
-            </a:r>
-            <a:r>
-              <a:rPr lang="ja-JP" altLang="en-US" sz="4400" b="1" dirty="0">
+              <a:t>Hymns</a:t>
+            </a:r>
+            <a:r>
+              <a:rPr lang="en-GB" sz="4400" dirty="0">
                 <a:solidFill>
                   <a:schemeClr val="bg1"/>
                 </a:solidFill>
-                <a:latin typeface="Microsoft JhengHei UI" panose="020B0604030504040204" pitchFamily="34" charset="-120"/>
-                <a:ea typeface="Microsoft JhengHei UI" panose="020B0604030504040204" pitchFamily="34" charset="-120"/>
+                <a:latin typeface="Microsoft JhengHei" panose="020B0604030504040204" pitchFamily="34" charset="-120"/>
+                <a:ea typeface="Microsoft JhengHei" panose="020B0604030504040204" pitchFamily="34" charset="-120"/>
+                <a:cs typeface="Segoe UI" panose="020B0502040204020203" pitchFamily="34" charset="0"/>
+              </a:rPr>
+              <a:t> </a:t>
+            </a:r>
+            <a:r>
+              <a:rPr lang="ja-JP" altLang="en-US" sz="4400" dirty="0">
+                <a:solidFill>
+                  <a:schemeClr val="bg1"/>
+                </a:solidFill>
+                <a:latin typeface="Microsoft JhengHei" panose="020B0604030504040204" pitchFamily="34" charset="-120"/>
+                <a:ea typeface="Microsoft JhengHei" panose="020B0604030504040204" pitchFamily="34" charset="-120"/>
                 <a:cs typeface="Segoe UI" panose="020B0502040204020203" pitchFamily="34" charset="0"/>
               </a:rPr>
               <a:t>詩</a:t>
             </a:r>
             <a:r>
-              <a:rPr lang="en-GB" sz="4400" b="1" dirty="0">
+              <a:rPr lang="en-GB" sz="4400" dirty="0">
                 <a:solidFill>
                   <a:schemeClr val="bg1"/>
                 </a:solidFill>
-                <a:latin typeface="Segoe UI" panose="020B0502040204020203" pitchFamily="34" charset="0"/>
+                <a:latin typeface="Century Gothic" panose="020B0502020202020204" pitchFamily="34" charset="0"/>
                 <a:cs typeface="Segoe UI" panose="020B0502040204020203" pitchFamily="34" charset="0"/>
               </a:rPr>
               <a:t>: </a:t>
@@ -5794,8 +5865,8 @@
         </p:nvSpPr>
         <p:spPr>
           <a:xfrm>
-            <a:off x="0" y="2327551"/>
-            <a:ext cx="6168008" cy="656718"/>
+            <a:off x="5118637" y="917319"/>
+            <a:ext cx="7073362" cy="576120"/>
           </a:xfrm>
           <a:prstGeom prst="rect">
             <a:avLst/>
@@ -5814,7 +5885,7 @@
               </a:lnSpc>
             </a:pPr>
             <a:r>
-              <a:rPr lang="en-GB" sz="2800" dirty="0">
+              <a:rPr lang="en-GB" sz="2400" dirty="0">
                 <a:solidFill>
                   <a:schemeClr val="bg1"/>
                 </a:solidFill>
@@ -5839,8 +5910,8 @@
         </p:nvSpPr>
         <p:spPr>
           <a:xfrm>
-            <a:off x="6096000" y="2327551"/>
-            <a:ext cx="6096000" cy="656718"/>
+            <a:off x="5118637" y="3983735"/>
+            <a:ext cx="7073362" cy="576120"/>
           </a:xfrm>
           <a:prstGeom prst="rect">
             <a:avLst/>
@@ -5859,7 +5930,7 @@
               </a:lnSpc>
             </a:pPr>
             <a:r>
-              <a:rPr lang="en-GB" sz="2800" dirty="0">
+              <a:rPr lang="en-GB" sz="2400" dirty="0">
                 <a:solidFill>
                   <a:schemeClr val="bg1"/>
                 </a:solidFill>
@@ -5886,8 +5957,8 @@
         </p:nvSpPr>
         <p:spPr bwMode="auto">
           <a:xfrm>
-            <a:off x="2615493" y="188640"/>
-            <a:ext cx="6961014" cy="671446"/>
+            <a:off x="291066" y="1132261"/>
+            <a:ext cx="4536504" cy="1377159"/>
           </a:xfrm>
           <a:prstGeom prst="rect">
             <a:avLst/>
@@ -5934,7 +6005,7 @@
           <a:p>
             <a:pPr algn="ctr"/>
             <a:r>
-              <a:rPr lang="en-GB" altLang="en-US" sz="3200" b="1" u="sng" dirty="0">
+              <a:rPr lang="en-GB" altLang="en-US" sz="4000" b="1" dirty="0">
                 <a:solidFill>
                   <a:schemeClr val="bg1"/>
                 </a:solidFill>
@@ -5944,7 +6015,7 @@
               <a:t>Holy Communion </a:t>
             </a:r>
             <a:r>
-              <a:rPr lang="ja-JP" altLang="en-US" sz="3200" b="1" i="0" u="sng" dirty="0">
+              <a:rPr lang="ja-JP" altLang="en-US" sz="4000" b="1" i="0" dirty="0">
                 <a:solidFill>
                   <a:schemeClr val="bg1"/>
                 </a:solidFill>
@@ -5954,7 +6025,7 @@
               </a:rPr>
               <a:t>聖餐典禮</a:t>
             </a:r>
-            <a:endParaRPr lang="en-GB" altLang="zh-TW" sz="3200" b="1" u="sng" dirty="0">
+            <a:endParaRPr lang="en-GB" altLang="zh-TW" sz="4000" b="1" dirty="0">
               <a:solidFill>
                 <a:schemeClr val="bg1"/>
               </a:solidFill>
@@ -6017,7 +6088,7 @@
         </p:nvSpPr>
         <p:spPr>
           <a:xfrm>
-            <a:off x="0" y="1562653"/>
+            <a:off x="5607318" y="181540"/>
             <a:ext cx="6096000" cy="735779"/>
           </a:xfrm>
           <a:prstGeom prst="rect">
@@ -6062,7 +6133,7 @@
         </p:nvSpPr>
         <p:spPr>
           <a:xfrm>
-            <a:off x="6132004" y="1556792"/>
+            <a:off x="5607318" y="3212976"/>
             <a:ext cx="6096000" cy="735779"/>
           </a:xfrm>
           <a:prstGeom prst="rect">
@@ -6129,141 +6200,6 @@
           </a:prstGeom>
         </p:spPr>
       </p:pic>
-      <p:grpSp>
-        <p:nvGrpSpPr>
-          <p:cNvPr id="9" name="Group 8">
-            <a:extLst>
-              <a:ext uri="{FF2B5EF4-FFF2-40B4-BE49-F238E27FC236}">
-                <a16:creationId xmlns:a16="http://schemas.microsoft.com/office/drawing/2014/main" id="{FA35DE02-3554-30EF-5C0C-D36458671DD8}"/>
-              </a:ext>
-            </a:extLst>
-          </p:cNvPr>
-          <p:cNvGrpSpPr/>
-          <p:nvPr/>
-        </p:nvGrpSpPr>
-        <p:grpSpPr>
-          <a:xfrm>
-            <a:off x="4943872" y="6269250"/>
-            <a:ext cx="7030907" cy="369332"/>
-            <a:chOff x="4943872" y="6269250"/>
-            <a:chExt cx="7030907" cy="369332"/>
-          </a:xfrm>
-        </p:grpSpPr>
-        <p:sp>
-          <p:nvSpPr>
-            <p:cNvPr id="12" name="TextBox 11">
-              <a:extLst>
-                <a:ext uri="{FF2B5EF4-FFF2-40B4-BE49-F238E27FC236}">
-                  <a16:creationId xmlns:a16="http://schemas.microsoft.com/office/drawing/2014/main" id="{7253A105-AF99-120A-0AFB-95D7548B80B4}"/>
-                </a:ext>
-              </a:extLst>
-            </p:cNvPr>
-            <p:cNvSpPr txBox="1"/>
-            <p:nvPr/>
-          </p:nvSpPr>
-          <p:spPr>
-            <a:xfrm>
-              <a:off x="4943872" y="6269250"/>
-              <a:ext cx="7030907" cy="369332"/>
-            </a:xfrm>
-            <a:prstGeom prst="rect">
-              <a:avLst/>
-            </a:prstGeom>
-            <a:noFill/>
-            <a:ln w="19050">
-              <a:solidFill>
-                <a:srgbClr val="FF0000"/>
-              </a:solidFill>
-            </a:ln>
-          </p:spPr>
-          <p:txBody>
-            <a:bodyPr wrap="square" rtlCol="0" anchor="ctr">
-              <a:spAutoFit/>
-            </a:bodyPr>
-            <a:lstStyle/>
-            <a:p>
-              <a:r>
-                <a:rPr lang="en-GB" dirty="0">
-                  <a:solidFill>
-                    <a:schemeClr val="bg1"/>
-                  </a:solidFill>
-                  <a:latin typeface="Segoe UI Semibold" panose="020B0702040204020203" pitchFamily="34" charset="0"/>
-                  <a:cs typeface="Segoe UI Semibold" panose="020B0702040204020203" pitchFamily="34" charset="0"/>
-                </a:rPr>
-                <a:t>Please Turn Off/Silence Your Devices </a:t>
-              </a:r>
-              <a:r>
-                <a:rPr lang="zh-TW" altLang="en-US" b="1" dirty="0">
-                  <a:solidFill>
-                    <a:schemeClr val="bg1"/>
-                  </a:solidFill>
-                  <a:latin typeface="Microsoft JhengHei" panose="020B0604030504040204" pitchFamily="34" charset="-120"/>
-                  <a:ea typeface="Microsoft JhengHei" panose="020B0604030504040204" pitchFamily="34" charset="-120"/>
-                </a:rPr>
-                <a:t>請靜音或關閉所有電子設備</a:t>
-              </a:r>
-              <a:endParaRPr lang="ja-JP" altLang="en-US" b="1" dirty="0">
-                <a:solidFill>
-                  <a:schemeClr val="bg1"/>
-                </a:solidFill>
-                <a:latin typeface="Microsoft JhengHei" panose="020B0604030504040204" pitchFamily="34" charset="-120"/>
-                <a:ea typeface="Microsoft JhengHei" panose="020B0604030504040204" pitchFamily="34" charset="-120"/>
-              </a:endParaRPr>
-            </a:p>
-          </p:txBody>
-        </p:sp>
-        <p:pic>
-          <p:nvPicPr>
-            <p:cNvPr id="15" name="Picture 14" descr="Shape&#10;&#10;Description automatically generated with low confidence">
-              <a:extLst>
-                <a:ext uri="{FF2B5EF4-FFF2-40B4-BE49-F238E27FC236}">
-                  <a16:creationId xmlns:a16="http://schemas.microsoft.com/office/drawing/2014/main" id="{E48848AA-660E-29D6-5F51-FA23126B5FBF}"/>
-                </a:ext>
-              </a:extLst>
-            </p:cNvPr>
-            <p:cNvPicPr>
-              <a:picLocks noChangeAspect="1"/>
-            </p:cNvPicPr>
-            <p:nvPr/>
-          </p:nvPicPr>
-          <p:blipFill>
-            <a:blip r:embed="rId3" cstate="print">
-              <a:extLst>
-                <a:ext uri="{BEBA8EAE-BF5A-486C-A8C5-ECC9F3942E4B}">
-                  <a14:imgProps xmlns:a14="http://schemas.microsoft.com/office/drawing/2010/main">
-                    <a14:imgLayer r:embed="rId4">
-                      <a14:imgEffect>
-                        <a14:colorTemperature colorTemp="11500"/>
-                      </a14:imgEffect>
-                      <a14:imgEffect>
-                        <a14:saturation sat="400000"/>
-                      </a14:imgEffect>
-                      <a14:imgEffect>
-                        <a14:brightnessContrast bright="100000" contrast="100000"/>
-                      </a14:imgEffect>
-                    </a14:imgLayer>
-                  </a14:imgProps>
-                </a:ext>
-                <a:ext uri="{28A0092B-C50C-407E-A947-70E740481C1C}">
-                  <a14:useLocalDpi xmlns:a14="http://schemas.microsoft.com/office/drawing/2010/main" val="0"/>
-                </a:ext>
-              </a:extLst>
-            </a:blip>
-            <a:stretch>
-              <a:fillRect/>
-            </a:stretch>
-          </p:blipFill>
-          <p:spPr>
-            <a:xfrm>
-              <a:off x="11658489" y="6309320"/>
-              <a:ext cx="280267" cy="280267"/>
-            </a:xfrm>
-            <a:prstGeom prst="rect">
-              <a:avLst/>
-            </a:prstGeom>
-          </p:spPr>
-        </p:pic>
-      </p:grpSp>
     </p:spTree>
     <p:extLst>
       <p:ext uri="{BB962C8B-B14F-4D97-AF65-F5344CB8AC3E}">
@@ -6353,7 +6289,7 @@
         <p:spPr>
           <a:xfrm>
             <a:off x="0" y="391868"/>
-            <a:ext cx="12191999" cy="1815882"/>
+            <a:ext cx="12191999" cy="954107"/>
           </a:xfrm>
           <a:prstGeom prst="rect">
             <a:avLst/>
@@ -6395,28 +6331,6 @@
               </a:rPr>
               <a:t>歡迎光臨真耶穌教會，請跟我們一起禱告</a:t>
             </a:r>
-            <a:br>
-              <a:rPr lang="en-GB" altLang="zh-TW" sz="2800" b="1" dirty="0">
-                <a:solidFill>
-                  <a:schemeClr val="bg1"/>
-                </a:solidFill>
-                <a:latin typeface="Century Gothic" panose="020B0502020202020204" pitchFamily="34" charset="0"/>
-                <a:ea typeface="金梅新中楷全字體" pitchFamily="49" charset="-120"/>
-              </a:rPr>
-            </a:br>
-            <a:r>
-              <a:rPr lang="en-GB" altLang="zh-TW" sz="2800" b="1" dirty="0">
-                <a:solidFill>
-                  <a:schemeClr val="bg1"/>
-                </a:solidFill>
-                <a:latin typeface="Century Gothic" panose="020B0502020202020204" pitchFamily="34" charset="0"/>
-                <a:ea typeface="金梅新中楷全字體" pitchFamily="49" charset="-120"/>
-              </a:rPr>
-              <a:t>------------------------------------------------------------------</a:t>
-            </a:r>
-          </a:p>
-          <a:p>
-            <a:pPr algn="ctr"/>
             <a:endParaRPr lang="en-GB" sz="2800" b="1" dirty="0">
               <a:solidFill>
                 <a:schemeClr val="bg1"/>
@@ -7020,6 +6934,49 @@
           </p:spPr>
         </p:pic>
       </p:grpSp>
+      <p:cxnSp>
+        <p:nvCxnSpPr>
+          <p:cNvPr id="5" name="Straight Connector 4">
+            <a:extLst>
+              <a:ext uri="{FF2B5EF4-FFF2-40B4-BE49-F238E27FC236}">
+                <a16:creationId xmlns:a16="http://schemas.microsoft.com/office/drawing/2014/main" id="{47A1ED19-9EAE-46BB-2964-AEB5C870521D}"/>
+              </a:ext>
+            </a:extLst>
+          </p:cNvPr>
+          <p:cNvCxnSpPr>
+            <a:cxnSpLocks/>
+          </p:cNvCxnSpPr>
+          <p:nvPr/>
+        </p:nvCxnSpPr>
+        <p:spPr>
+          <a:xfrm>
+            <a:off x="294302" y="1556792"/>
+            <a:ext cx="11603397" cy="0"/>
+          </a:xfrm>
+          <a:prstGeom prst="line">
+            <a:avLst/>
+          </a:prstGeom>
+          <a:ln w="76200">
+            <a:solidFill>
+              <a:schemeClr val="bg1"/>
+            </a:solidFill>
+          </a:ln>
+        </p:spPr>
+        <p:style>
+          <a:lnRef idx="1">
+            <a:schemeClr val="accent1"/>
+          </a:lnRef>
+          <a:fillRef idx="0">
+            <a:schemeClr val="accent1"/>
+          </a:fillRef>
+          <a:effectRef idx="0">
+            <a:schemeClr val="accent1"/>
+          </a:effectRef>
+          <a:fontRef idx="minor">
+            <a:schemeClr val="tx1"/>
+          </a:fontRef>
+        </p:style>
+      </p:cxnSp>
     </p:spTree>
     <p:extLst>
       <p:ext uri="{BB962C8B-B14F-4D97-AF65-F5344CB8AC3E}">
@@ -7030,28 +6987,497 @@
   <p:clrMapOvr>
     <a:masterClrMapping/>
   </p:clrMapOvr>
-  <mc:AlternateContent xmlns:mc="http://schemas.openxmlformats.org/markup-compatibility/2006" xmlns:p14="http://schemas.microsoft.com/office/powerpoint/2010/main">
-    <mc:Choice Requires="p14">
-      <p:transition spd="med" p14:dur="700">
-        <p:fade/>
-      </p:transition>
-    </mc:Choice>
-    <mc:Fallback xmlns="">
-      <p:transition spd="med">
-        <p:fade/>
-      </p:transition>
-    </mc:Fallback>
-  </mc:AlternateContent>
 </p:sld>
 </file>
 
 <file path=ppt/slides/slide6.xml><?xml version="1.0" encoding="utf-8"?>
 <p:sld xmlns:a="http://schemas.openxmlformats.org/drawingml/2006/main" xmlns:r="http://schemas.openxmlformats.org/officeDocument/2006/relationships" xmlns:p="http://schemas.openxmlformats.org/presentationml/2006/main">
   <p:cSld>
+    <p:spTree>
+      <p:nvGrpSpPr>
+        <p:cNvPr id="1" name=""/>
+        <p:cNvGrpSpPr/>
+        <p:nvPr/>
+      </p:nvGrpSpPr>
+      <p:grpSpPr>
+        <a:xfrm>
+          <a:off x="0" y="0"/>
+          <a:ext cx="0" cy="0"/>
+          <a:chOff x="0" y="0"/>
+          <a:chExt cx="0" cy="0"/>
+        </a:xfrm>
+      </p:grpSpPr>
+      <p:sp>
+        <p:nvSpPr>
+          <p:cNvPr id="5" name="TextBox 4">
+            <a:extLst>
+              <a:ext uri="{FF2B5EF4-FFF2-40B4-BE49-F238E27FC236}">
+                <a16:creationId xmlns:a16="http://schemas.microsoft.com/office/drawing/2014/main" id="{B8C2B8E2-D11D-57CD-53C8-E9766D2521CA}"/>
+              </a:ext>
+            </a:extLst>
+          </p:cNvPr>
+          <p:cNvSpPr txBox="1"/>
+          <p:nvPr/>
+        </p:nvSpPr>
+        <p:spPr>
+          <a:xfrm>
+            <a:off x="5896644" y="3524697"/>
+            <a:ext cx="6106884" cy="923330"/>
+          </a:xfrm>
+          <a:prstGeom prst="rect">
+            <a:avLst/>
+          </a:prstGeom>
+          <a:noFill/>
+        </p:spPr>
+        <p:txBody>
+          <a:bodyPr wrap="square">
+            <a:spAutoFit/>
+          </a:bodyPr>
+          <a:lstStyle/>
+          <a:p>
+            <a:pPr algn="r"/>
+            <a:fld id="{5A428485-E877-48E8-B288-A00821AA8FEC}" type="datetime13">
+              <a:rPr lang="en-US" altLang="en-US" sz="5400" b="1" smtClean="0">
+                <a:solidFill>
+                  <a:schemeClr val="bg1"/>
+                </a:solidFill>
+                <a:latin typeface="Segoe UI" panose="020B0502040204020203" pitchFamily="34" charset="0"/>
+                <a:cs typeface="Segoe UI" panose="020B0502040204020203" pitchFamily="34" charset="0"/>
+              </a:rPr>
+              <a:pPr algn="r"/>
+              <a:t>5:00:11 PM</a:t>
+            </a:fld>
+            <a:endParaRPr lang="en-GB" sz="5400" dirty="0"/>
+          </a:p>
+        </p:txBody>
+      </p:sp>
+      <p:sp>
+        <p:nvSpPr>
+          <p:cNvPr id="2" name="Rectangle 1">
+            <a:extLst>
+              <a:ext uri="{FF2B5EF4-FFF2-40B4-BE49-F238E27FC236}">
+                <a16:creationId xmlns:a16="http://schemas.microsoft.com/office/drawing/2014/main" id="{A5EDBB23-EE74-BD8E-68BB-188BA81E44C9}"/>
+              </a:ext>
+            </a:extLst>
+          </p:cNvPr>
+          <p:cNvSpPr/>
+          <p:nvPr/>
+        </p:nvSpPr>
+        <p:spPr>
+          <a:xfrm>
+            <a:off x="-1" y="0"/>
+            <a:ext cx="5118641" cy="6858000"/>
+          </a:xfrm>
+          <a:prstGeom prst="rect">
+            <a:avLst/>
+          </a:prstGeom>
+          <a:solidFill>
+            <a:schemeClr val="tx1">
+              <a:lumMod val="75000"/>
+              <a:lumOff val="25000"/>
+            </a:schemeClr>
+          </a:solidFill>
+          <a:ln>
+            <a:noFill/>
+          </a:ln>
+        </p:spPr>
+        <p:style>
+          <a:lnRef idx="2">
+            <a:schemeClr val="accent1">
+              <a:shade val="50000"/>
+            </a:schemeClr>
+          </a:lnRef>
+          <a:fillRef idx="1">
+            <a:schemeClr val="accent1"/>
+          </a:fillRef>
+          <a:effectRef idx="0">
+            <a:schemeClr val="accent1"/>
+          </a:effectRef>
+          <a:fontRef idx="minor">
+            <a:schemeClr val="lt1"/>
+          </a:fontRef>
+        </p:style>
+        <p:txBody>
+          <a:bodyPr rtlCol="0" anchor="ctr"/>
+          <a:lstStyle/>
+          <a:p>
+            <a:pPr algn="ctr"/>
+            <a:endParaRPr lang="en-GB"/>
+          </a:p>
+        </p:txBody>
+      </p:sp>
+      <p:pic>
+        <p:nvPicPr>
+          <p:cNvPr id="7" name="Picture 6" descr="Logo&#10;&#10;Description automatically generated with medium confidence">
+            <a:extLst>
+              <a:ext uri="{FF2B5EF4-FFF2-40B4-BE49-F238E27FC236}">
+                <a16:creationId xmlns:a16="http://schemas.microsoft.com/office/drawing/2014/main" id="{7D8F5CB1-CB81-80C7-2EEC-931ED922A40D}"/>
+              </a:ext>
+            </a:extLst>
+          </p:cNvPr>
+          <p:cNvPicPr>
+            <a:picLocks noChangeAspect="1"/>
+          </p:cNvPicPr>
+          <p:nvPr/>
+        </p:nvPicPr>
+        <p:blipFill>
+          <a:blip r:embed="rId2" cstate="print">
+            <a:extLst>
+              <a:ext uri="{28A0092B-C50C-407E-A947-70E740481C1C}">
+                <a14:useLocalDpi xmlns:a14="http://schemas.microsoft.com/office/drawing/2010/main" val="0"/>
+              </a:ext>
+            </a:extLst>
+          </a:blip>
+          <a:stretch>
+            <a:fillRect/>
+          </a:stretch>
+        </p:blipFill>
+        <p:spPr>
+          <a:xfrm>
+            <a:off x="701938" y="1330693"/>
+            <a:ext cx="3714759" cy="480733"/>
+          </a:xfrm>
+          <a:prstGeom prst="rect">
+            <a:avLst/>
+          </a:prstGeom>
+        </p:spPr>
+      </p:pic>
+      <p:sp>
+        <p:nvSpPr>
+          <p:cNvPr id="10" name="TextBox 9">
+            <a:extLst>
+              <a:ext uri="{FF2B5EF4-FFF2-40B4-BE49-F238E27FC236}">
+                <a16:creationId xmlns:a16="http://schemas.microsoft.com/office/drawing/2014/main" id="{6DA65BC6-CF8D-7742-7648-A497F05CD732}"/>
+              </a:ext>
+            </a:extLst>
+          </p:cNvPr>
+          <p:cNvSpPr txBox="1"/>
+          <p:nvPr/>
+        </p:nvSpPr>
+        <p:spPr>
+          <a:xfrm>
+            <a:off x="5231904" y="6023029"/>
+            <a:ext cx="6395128" cy="646331"/>
+          </a:xfrm>
+          <a:prstGeom prst="rect">
+            <a:avLst/>
+          </a:prstGeom>
+          <a:noFill/>
+          <a:ln w="19050">
+            <a:noFill/>
+          </a:ln>
+        </p:spPr>
+        <p:txBody>
+          <a:bodyPr wrap="square" rtlCol="0" anchor="ctr">
+            <a:spAutoFit/>
+          </a:bodyPr>
+          <a:lstStyle/>
+          <a:p>
+            <a:pPr algn="r"/>
+            <a:r>
+              <a:rPr lang="en-GB" dirty="0">
+                <a:solidFill>
+                  <a:schemeClr val="bg1"/>
+                </a:solidFill>
+                <a:latin typeface="Segoe UI Semibold" panose="020B0702040204020203" pitchFamily="34" charset="0"/>
+                <a:cs typeface="Segoe UI Semibold" panose="020B0702040204020203" pitchFamily="34" charset="0"/>
+              </a:rPr>
+              <a:t>Please Turn Off/Silence Your Devices </a:t>
+            </a:r>
+          </a:p>
+          <a:p>
+            <a:pPr algn="r"/>
+            <a:r>
+              <a:rPr lang="zh-TW" altLang="en-US" b="1" dirty="0">
+                <a:solidFill>
+                  <a:schemeClr val="bg1"/>
+                </a:solidFill>
+                <a:latin typeface="Microsoft JhengHei" panose="020B0604030504040204" pitchFamily="34" charset="-120"/>
+                <a:ea typeface="Microsoft JhengHei" panose="020B0604030504040204" pitchFamily="34" charset="-120"/>
+              </a:rPr>
+              <a:t>請靜音或關閉所有電子設備</a:t>
+            </a:r>
+            <a:endParaRPr lang="ja-JP" altLang="en-US" b="1" dirty="0">
+              <a:solidFill>
+                <a:schemeClr val="bg1"/>
+              </a:solidFill>
+              <a:latin typeface="Microsoft JhengHei" panose="020B0604030504040204" pitchFamily="34" charset="-120"/>
+              <a:ea typeface="Microsoft JhengHei" panose="020B0604030504040204" pitchFamily="34" charset="-120"/>
+            </a:endParaRPr>
+          </a:p>
+        </p:txBody>
+      </p:sp>
+      <p:pic>
+        <p:nvPicPr>
+          <p:cNvPr id="11" name="Picture 10" descr="Shape&#10;&#10;Description automatically generated with low confidence">
+            <a:extLst>
+              <a:ext uri="{FF2B5EF4-FFF2-40B4-BE49-F238E27FC236}">
+                <a16:creationId xmlns:a16="http://schemas.microsoft.com/office/drawing/2014/main" id="{D870190A-DEF8-5DAD-B86F-568A59A5C0E3}"/>
+              </a:ext>
+            </a:extLst>
+          </p:cNvPr>
+          <p:cNvPicPr>
+            <a:picLocks noChangeAspect="1"/>
+          </p:cNvPicPr>
+          <p:nvPr/>
+        </p:nvPicPr>
+        <p:blipFill>
+          <a:blip r:embed="rId3" cstate="print">
+            <a:extLst>
+              <a:ext uri="{BEBA8EAE-BF5A-486C-A8C5-ECC9F3942E4B}">
+                <a14:imgProps xmlns:a14="http://schemas.microsoft.com/office/drawing/2010/main">
+                  <a14:imgLayer r:embed="rId4">
+                    <a14:imgEffect>
+                      <a14:colorTemperature colorTemp="11500"/>
+                    </a14:imgEffect>
+                    <a14:imgEffect>
+                      <a14:saturation sat="400000"/>
+                    </a14:imgEffect>
+                    <a14:imgEffect>
+                      <a14:brightnessContrast bright="100000" contrast="100000"/>
+                    </a14:imgEffect>
+                  </a14:imgLayer>
+                </a14:imgProps>
+              </a:ext>
+              <a:ext uri="{28A0092B-C50C-407E-A947-70E740481C1C}">
+                <a14:useLocalDpi xmlns:a14="http://schemas.microsoft.com/office/drawing/2010/main" val="0"/>
+              </a:ext>
+            </a:extLst>
+          </a:blip>
+          <a:stretch>
+            <a:fillRect/>
+          </a:stretch>
+        </p:blipFill>
+        <p:spPr>
+          <a:xfrm>
+            <a:off x="11544706" y="6093296"/>
+            <a:ext cx="508138" cy="508138"/>
+          </a:xfrm>
+          <a:prstGeom prst="rect">
+            <a:avLst/>
+          </a:prstGeom>
+          <a:ln>
+            <a:noFill/>
+          </a:ln>
+        </p:spPr>
+      </p:pic>
+      <p:sp>
+        <p:nvSpPr>
+          <p:cNvPr id="15" name="TextBox 14">
+            <a:extLst>
+              <a:ext uri="{FF2B5EF4-FFF2-40B4-BE49-F238E27FC236}">
+                <a16:creationId xmlns:a16="http://schemas.microsoft.com/office/drawing/2014/main" id="{A43ACE95-BAD5-34EA-AAE0-5B30B782E5D7}"/>
+              </a:ext>
+            </a:extLst>
+          </p:cNvPr>
+          <p:cNvSpPr txBox="1"/>
+          <p:nvPr/>
+        </p:nvSpPr>
+        <p:spPr>
+          <a:xfrm>
+            <a:off x="363076" y="2274838"/>
+            <a:ext cx="4392485" cy="2308324"/>
+          </a:xfrm>
+          <a:prstGeom prst="rect">
+            <a:avLst/>
+          </a:prstGeom>
+          <a:noFill/>
+        </p:spPr>
+        <p:txBody>
+          <a:bodyPr wrap="square" rtlCol="0">
+            <a:spAutoFit/>
+          </a:bodyPr>
+          <a:lstStyle/>
+          <a:p>
+            <a:pPr algn="ctr"/>
+            <a:r>
+              <a:rPr lang="en-GB" altLang="en-US" sz="3600" b="1" dirty="0">
+                <a:solidFill>
+                  <a:schemeClr val="bg1"/>
+                </a:solidFill>
+                <a:latin typeface="Segoe UI" panose="020B0502040204020203" pitchFamily="34" charset="0"/>
+                <a:cs typeface="Segoe UI" panose="020B0502040204020203" pitchFamily="34" charset="0"/>
+              </a:rPr>
+              <a:t>Welcome To True Jesus Church</a:t>
+            </a:r>
+            <a:r>
+              <a:rPr lang="en-GB" altLang="en-US" sz="3600" b="1" dirty="0">
+                <a:solidFill>
+                  <a:schemeClr val="bg1"/>
+                </a:solidFill>
+                <a:latin typeface="Century Gothic" panose="020B0502020202020204" pitchFamily="34" charset="0"/>
+                <a:cs typeface="Segoe UI" panose="020B0502040204020203" pitchFamily="34" charset="0"/>
+              </a:rPr>
+              <a:t> </a:t>
+            </a:r>
+          </a:p>
+          <a:p>
+            <a:pPr algn="ctr"/>
+            <a:endParaRPr lang="en-GB" altLang="en-US" sz="3600" b="1" dirty="0">
+              <a:solidFill>
+                <a:schemeClr val="bg1"/>
+              </a:solidFill>
+              <a:latin typeface="Century Gothic" panose="020B0502020202020204" pitchFamily="34" charset="0"/>
+              <a:cs typeface="Segoe UI" panose="020B0502040204020203" pitchFamily="34" charset="0"/>
+            </a:endParaRPr>
+          </a:p>
+          <a:p>
+            <a:pPr algn="ctr"/>
+            <a:r>
+              <a:rPr lang="zh-TW" altLang="en-US" sz="3600" b="1" dirty="0">
+                <a:solidFill>
+                  <a:schemeClr val="bg1"/>
+                </a:solidFill>
+                <a:latin typeface="Microsoft JhengHei" panose="020B0604030504040204" pitchFamily="34" charset="-120"/>
+                <a:ea typeface="Microsoft JhengHei" panose="020B0604030504040204" pitchFamily="34" charset="-120"/>
+              </a:rPr>
+              <a:t>歡迎光臨真耶穌教會</a:t>
+            </a:r>
+            <a:endParaRPr lang="en-GB" sz="3600" b="1" dirty="0">
+              <a:solidFill>
+                <a:schemeClr val="bg1"/>
+              </a:solidFill>
+              <a:latin typeface="Century Gothic" panose="020B0502020202020204" pitchFamily="34" charset="0"/>
+              <a:ea typeface="金梅新中楷全字體" pitchFamily="49" charset="-120"/>
+            </a:endParaRPr>
+          </a:p>
+        </p:txBody>
+      </p:sp>
+      <p:pic>
+        <p:nvPicPr>
+          <p:cNvPr id="24" name="Picture 23">
+            <a:extLst>
+              <a:ext uri="{FF2B5EF4-FFF2-40B4-BE49-F238E27FC236}">
+                <a16:creationId xmlns:a16="http://schemas.microsoft.com/office/drawing/2014/main" id="{26876B72-FC5D-E685-B5CA-3B114DE93445}"/>
+              </a:ext>
+            </a:extLst>
+          </p:cNvPr>
+          <p:cNvPicPr>
+            <a:picLocks noChangeAspect="1"/>
+          </p:cNvPicPr>
+          <p:nvPr/>
+        </p:nvPicPr>
+        <p:blipFill>
+          <a:blip r:embed="rId5">
+            <a:lum bright="70000" contrast="-70000"/>
+          </a:blip>
+          <a:stretch>
+            <a:fillRect/>
+          </a:stretch>
+        </p:blipFill>
+        <p:spPr>
+          <a:xfrm>
+            <a:off x="9896028" y="1737993"/>
+            <a:ext cx="952500" cy="952500"/>
+          </a:xfrm>
+          <a:prstGeom prst="rect">
+            <a:avLst/>
+          </a:prstGeom>
+        </p:spPr>
+      </p:pic>
+      <p:pic>
+        <p:nvPicPr>
+          <p:cNvPr id="33" name="Picture 32">
+            <a:extLst>
+              <a:ext uri="{FF2B5EF4-FFF2-40B4-BE49-F238E27FC236}">
+                <a16:creationId xmlns:a16="http://schemas.microsoft.com/office/drawing/2014/main" id="{7D20D07D-D567-97E9-94C0-AEBC29E0D713}"/>
+              </a:ext>
+            </a:extLst>
+          </p:cNvPr>
+          <p:cNvPicPr>
+            <a:picLocks noChangeAspect="1"/>
+          </p:cNvPicPr>
+          <p:nvPr/>
+        </p:nvPicPr>
+        <p:blipFill>
+          <a:blip r:embed="rId6">
+            <a:lum bright="70000" contrast="-70000"/>
+          </a:blip>
+          <a:stretch>
+            <a:fillRect/>
+          </a:stretch>
+        </p:blipFill>
+        <p:spPr>
+          <a:xfrm>
+            <a:off x="10995829" y="1792496"/>
+            <a:ext cx="860811" cy="860811"/>
+          </a:xfrm>
+          <a:prstGeom prst="rect">
+            <a:avLst/>
+          </a:prstGeom>
+        </p:spPr>
+      </p:pic>
+      <p:sp>
+        <p:nvSpPr>
+          <p:cNvPr id="3" name="Date Placeholder 2">
+            <a:extLst>
+              <a:ext uri="{FF2B5EF4-FFF2-40B4-BE49-F238E27FC236}">
+                <a16:creationId xmlns:a16="http://schemas.microsoft.com/office/drawing/2014/main" id="{BAAB78FB-DD60-75C6-EF35-77AABE3524E6}"/>
+              </a:ext>
+            </a:extLst>
+          </p:cNvPr>
+          <p:cNvSpPr>
+            <a:spLocks noGrp="1"/>
+          </p:cNvSpPr>
+          <p:nvPr>
+            <p:ph type="dt" sz="half" idx="10"/>
+          </p:nvPr>
+        </p:nvSpPr>
+        <p:spPr>
+          <a:xfrm>
+            <a:off x="5118641" y="2778753"/>
+            <a:ext cx="6892121" cy="620499"/>
+          </a:xfrm>
+        </p:spPr>
+        <p:txBody>
+          <a:bodyPr/>
+          <a:lstStyle/>
+          <a:p>
+            <a:pPr algn="r"/>
+            <a:fld id="{262A5D92-C80E-4DBB-870F-20F2BA8487B9}" type="datetime2">
+              <a:rPr lang="en-US" altLang="en-US" sz="3600" b="1" smtClean="0">
+                <a:solidFill>
+                  <a:schemeClr val="bg1"/>
+                </a:solidFill>
+                <a:latin typeface="Segoe UI" panose="020B0502040204020203" pitchFamily="34" charset="0"/>
+                <a:cs typeface="Segoe UI" panose="020B0502040204020203" pitchFamily="34" charset="0"/>
+              </a:rPr>
+              <a:pPr algn="r"/>
+              <a:t>Sunday, November 27, 2022</a:t>
+            </a:fld>
+            <a:endParaRPr lang="en-US" altLang="en-US" sz="3600" b="1" dirty="0">
+              <a:solidFill>
+                <a:schemeClr val="bg1"/>
+              </a:solidFill>
+              <a:latin typeface="Segoe UI" panose="020B0502040204020203" pitchFamily="34" charset="0"/>
+              <a:cs typeface="Segoe UI" panose="020B0502040204020203" pitchFamily="34" charset="0"/>
+            </a:endParaRPr>
+          </a:p>
+        </p:txBody>
+      </p:sp>
+    </p:spTree>
+    <p:extLst>
+      <p:ext uri="{BB962C8B-B14F-4D97-AF65-F5344CB8AC3E}">
+        <p14:creationId xmlns:p14="http://schemas.microsoft.com/office/powerpoint/2010/main" val="35723793"/>
+      </p:ext>
+    </p:extLst>
+  </p:cSld>
+  <p:clrMapOvr>
+    <a:masterClrMapping/>
+  </p:clrMapOvr>
+</p:sld>
+</file>
+
+<file path=ppt/slides/slide7.xml><?xml version="1.0" encoding="utf-8"?>
+<p:sld xmlns:a="http://schemas.openxmlformats.org/drawingml/2006/main" xmlns:r="http://schemas.openxmlformats.org/officeDocument/2006/relationships" xmlns:p="http://schemas.openxmlformats.org/presentationml/2006/main">
+  <p:cSld>
     <p:bg>
       <p:bgPr>
         <a:solidFill>
-          <a:schemeClr val="tx1"/>
+          <a:schemeClr val="tx1">
+            <a:lumMod val="75000"/>
+            <a:lumOff val="25000"/>
+          </a:schemeClr>
         </a:solidFill>
         <a:effectLst/>
       </p:bgPr>
@@ -7329,22 +7755,10 @@
   <p:clrMapOvr>
     <a:masterClrMapping/>
   </p:clrMapOvr>
-  <mc:AlternateContent xmlns:mc="http://schemas.openxmlformats.org/markup-compatibility/2006" xmlns:p14="http://schemas.microsoft.com/office/powerpoint/2010/main">
-    <mc:Choice Requires="p14">
-      <p:transition spd="med" p14:dur="700">
-        <p:fade/>
-      </p:transition>
-    </mc:Choice>
-    <mc:Fallback xmlns="">
-      <p:transition spd="med">
-        <p:fade/>
-      </p:transition>
-    </mc:Fallback>
-  </mc:AlternateContent>
 </p:sld>
 </file>
 
-<file path=ppt/slides/slide7.xml><?xml version="1.0" encoding="utf-8"?>
+<file path=ppt/slides/slide8.xml><?xml version="1.0" encoding="utf-8"?>
 <p:sld xmlns:a="http://schemas.openxmlformats.org/drawingml/2006/main" xmlns:r="http://schemas.openxmlformats.org/officeDocument/2006/relationships" xmlns:p="http://schemas.openxmlformats.org/presentationml/2006/main">
   <p:cSld>
     <p:bg>

</xml_diff>

<commit_message>
27/11/22 Max 3 hymns shown for Holy Communion
</commit_message>
<xml_diff>
--- a/TJCPowerPoint/Resources/ServiceWidescreen.pptx
+++ b/TJCPowerPoint/Resources/ServiceWidescreen.pptx
@@ -4981,7 +4981,7 @@
         <p:spPr bwMode="auto">
           <a:xfrm>
             <a:off x="1519747" y="3025408"/>
-            <a:ext cx="9144000" cy="707886"/>
+            <a:ext cx="9144000" cy="646331"/>
           </a:xfrm>
           <a:prstGeom prst="rect">
             <a:avLst/>
@@ -5007,19 +5007,19 @@
               </a:spcBef>
             </a:pPr>
             <a:r>
-              <a:rPr lang="en-GB" altLang="en-US" sz="4000" dirty="0">
+              <a:rPr lang="en-GB" altLang="en-US" sz="3600" dirty="0">
                 <a:latin typeface="Century Gothic" panose="020B0502020202020204" pitchFamily="34" charset="0"/>
               </a:rPr>
               <a:t>Hymns </a:t>
             </a:r>
             <a:r>
-              <a:rPr lang="zh-TW" altLang="en-US" sz="4000" dirty="0">
+              <a:rPr lang="zh-TW" altLang="en-US" sz="3600" dirty="0">
                 <a:latin typeface="Microsoft JhengHei" panose="020B0604030504040204" pitchFamily="34" charset="-120"/>
                 <a:ea typeface="Microsoft JhengHei" panose="020B0604030504040204" pitchFamily="34" charset="-120"/>
               </a:rPr>
               <a:t>詩</a:t>
             </a:r>
-            <a:endParaRPr lang="en-US" altLang="en-US" sz="4000" b="1" dirty="0">
+            <a:endParaRPr lang="en-US" altLang="en-US" sz="3600" b="1" dirty="0">
               <a:latin typeface="Century Gothic" panose="020B0502020202020204" pitchFamily="34" charset="0"/>
             </a:endParaRPr>
           </a:p>
@@ -5035,7 +5035,7 @@
         </p:nvSpPr>
         <p:spPr bwMode="auto">
           <a:xfrm>
-            <a:off x="1530570" y="3924345"/>
+            <a:off x="1530570" y="3789040"/>
             <a:ext cx="9137431" cy="584775"/>
           </a:xfrm>
           <a:prstGeom prst="rect">
@@ -5417,7 +5417,7 @@
         </p:nvSpPr>
         <p:spPr bwMode="auto">
           <a:xfrm>
-            <a:off x="0" y="210344"/>
+            <a:off x="0" y="354360"/>
             <a:ext cx="12192000" cy="914400"/>
           </a:xfrm>
           <a:prstGeom prst="rect">
@@ -5489,7 +5489,7 @@
         </p:nvSpPr>
         <p:spPr bwMode="auto">
           <a:xfrm>
-            <a:off x="0" y="1198389"/>
+            <a:off x="0" y="1342405"/>
             <a:ext cx="12192000" cy="1006475"/>
           </a:xfrm>
           <a:prstGeom prst="rect">
@@ -5565,8 +5565,8 @@
         </p:nvSpPr>
         <p:spPr bwMode="auto">
           <a:xfrm>
-            <a:off x="222502" y="2505090"/>
-            <a:ext cx="5004520" cy="707886"/>
+            <a:off x="222502" y="2420888"/>
+            <a:ext cx="5004520" cy="646331"/>
           </a:xfrm>
           <a:prstGeom prst="rect">
             <a:avLst/>
@@ -5619,19 +5619,19 @@
               <a:buNone/>
             </a:pPr>
             <a:r>
-              <a:rPr lang="en-GB" altLang="en-US" sz="4000" dirty="0">
+              <a:rPr lang="en-GB" altLang="en-US" sz="3600" dirty="0">
                 <a:latin typeface="Century Gothic" panose="020B0502020202020204" pitchFamily="34" charset="0"/>
               </a:rPr>
               <a:t>Bible Verse </a:t>
             </a:r>
             <a:r>
-              <a:rPr lang="zh-TW" altLang="en-US" sz="4000" dirty="0">
+              <a:rPr lang="zh-TW" altLang="en-US" sz="3600" dirty="0">
                 <a:latin typeface="Microsoft JhengHei" panose="020B0604030504040204" pitchFamily="34" charset="-120"/>
                 <a:ea typeface="Microsoft JhengHei" panose="020B0604030504040204" pitchFamily="34" charset="-120"/>
               </a:rPr>
               <a:t>經文</a:t>
             </a:r>
-            <a:endParaRPr lang="en-US" altLang="en-US" sz="4000" dirty="0">
+            <a:endParaRPr lang="en-US" altLang="en-US" sz="3600" dirty="0">
               <a:latin typeface="Microsoft JhengHei" panose="020B0604030504040204" pitchFamily="34" charset="-120"/>
               <a:ea typeface="Microsoft JhengHei" panose="020B0604030504040204" pitchFamily="34" charset="-120"/>
             </a:endParaRPr>
@@ -5648,7 +5648,7 @@
         </p:nvSpPr>
         <p:spPr bwMode="auto">
           <a:xfrm>
-            <a:off x="119336" y="3429000"/>
+            <a:off x="119336" y="3344798"/>
             <a:ext cx="5652192" cy="830997"/>
           </a:xfrm>
           <a:prstGeom prst="rect">
@@ -5718,7 +5718,7 @@
         </p:nvSpPr>
         <p:spPr bwMode="auto">
           <a:xfrm>
-            <a:off x="300061" y="4365104"/>
+            <a:off x="300061" y="4280902"/>
             <a:ext cx="5471467" cy="830997"/>
           </a:xfrm>
           <a:prstGeom prst="rect">
@@ -5794,7 +5794,7 @@
         </p:nvSpPr>
         <p:spPr bwMode="auto">
           <a:xfrm>
-            <a:off x="5952253" y="3819128"/>
+            <a:off x="5952253" y="3734926"/>
             <a:ext cx="6239747" cy="2308324"/>
           </a:xfrm>
           <a:prstGeom prst="rect">

</xml_diff>

<commit_message>
02/01/22 Auto cycle through H.C hymns + delhymnbtn
</commit_message>
<xml_diff>
--- a/TJCPowerPoint/Resources/ServiceWidescreen.pptx
+++ b/TJCPowerPoint/Resources/ServiceWidescreen.pptx
@@ -4145,62 +4145,6 @@
           </a:p>
         </p:txBody>
       </p:sp>
-      <p:sp>
-        <p:nvSpPr>
-          <p:cNvPr id="10" name="TextBox 9">
-            <a:extLst>
-              <a:ext uri="{FF2B5EF4-FFF2-40B4-BE49-F238E27FC236}">
-                <a16:creationId xmlns:a16="http://schemas.microsoft.com/office/drawing/2014/main" id="{6DA65BC6-CF8D-7742-7648-A497F05CD732}"/>
-              </a:ext>
-            </a:extLst>
-          </p:cNvPr>
-          <p:cNvSpPr txBox="1"/>
-          <p:nvPr/>
-        </p:nvSpPr>
-        <p:spPr>
-          <a:xfrm>
-            <a:off x="5231904" y="6023029"/>
-            <a:ext cx="6395128" cy="646331"/>
-          </a:xfrm>
-          <a:prstGeom prst="rect">
-            <a:avLst/>
-          </a:prstGeom>
-          <a:noFill/>
-          <a:ln w="19050">
-            <a:noFill/>
-          </a:ln>
-        </p:spPr>
-        <p:txBody>
-          <a:bodyPr wrap="square" rtlCol="0" anchor="ctr">
-            <a:spAutoFit/>
-          </a:bodyPr>
-          <a:lstStyle/>
-          <a:p>
-            <a:pPr algn="r"/>
-            <a:r>
-              <a:rPr lang="en-GB" dirty="0">
-                <a:latin typeface="Segoe UI Semibold" panose="020B0702040204020203" pitchFamily="34" charset="0"/>
-                <a:cs typeface="Segoe UI Semibold" panose="020B0702040204020203" pitchFamily="34" charset="0"/>
-              </a:rPr>
-              <a:t>Please Turn Off/Silence Your Devices </a:t>
-            </a:r>
-          </a:p>
-          <a:p>
-            <a:pPr algn="r"/>
-            <a:r>
-              <a:rPr lang="zh-TW" altLang="en-US" b="1" dirty="0">
-                <a:latin typeface="Microsoft JhengHei" panose="020B0604030504040204" pitchFamily="34" charset="-120"/>
-                <a:ea typeface="Microsoft JhengHei" panose="020B0604030504040204" pitchFamily="34" charset="-120"/>
-              </a:rPr>
-              <a:t>請靜音或關閉所有電子設備</a:t>
-            </a:r>
-            <a:endParaRPr lang="ja-JP" altLang="en-US" b="1" dirty="0">
-              <a:latin typeface="Microsoft JhengHei" panose="020B0604030504040204" pitchFamily="34" charset="-120"/>
-              <a:ea typeface="Microsoft JhengHei" panose="020B0604030504040204" pitchFamily="34" charset="-120"/>
-            </a:endParaRPr>
-          </a:p>
-        </p:txBody>
-      </p:sp>
       <p:pic>
         <p:nvPicPr>
           <p:cNvPr id="11" name="Picture 10" descr="Shape&#10;&#10;Description automatically generated with low confidence">
@@ -4244,7 +4188,7 @@
         </p:blipFill>
         <p:spPr>
           <a:xfrm>
-            <a:off x="11544706" y="6093296"/>
+            <a:off x="11502624" y="6021645"/>
             <a:ext cx="508138" cy="508138"/>
           </a:xfrm>
           <a:prstGeom prst="rect">
@@ -4492,6 +4436,64 @@
           </a:prstGeom>
         </p:spPr>
       </p:pic>
+      <p:sp>
+        <p:nvSpPr>
+          <p:cNvPr id="7" name="TextBox 6">
+            <a:extLst>
+              <a:ext uri="{FF2B5EF4-FFF2-40B4-BE49-F238E27FC236}">
+                <a16:creationId xmlns:a16="http://schemas.microsoft.com/office/drawing/2014/main" id="{416F70EC-4301-ED90-9F3F-3259823B803F}"/>
+              </a:ext>
+            </a:extLst>
+          </p:cNvPr>
+          <p:cNvSpPr txBox="1"/>
+          <p:nvPr/>
+        </p:nvSpPr>
+        <p:spPr>
+          <a:xfrm>
+            <a:off x="7115825" y="5877272"/>
+            <a:ext cx="4524791" cy="796885"/>
+          </a:xfrm>
+          <a:prstGeom prst="roundRect">
+            <a:avLst>
+              <a:gd name="adj" fmla="val 20010"/>
+            </a:avLst>
+          </a:prstGeom>
+          <a:noFill/>
+          <a:ln w="19050">
+            <a:noFill/>
+          </a:ln>
+        </p:spPr>
+        <p:txBody>
+          <a:bodyPr wrap="square" rtlCol="0" anchor="ctr">
+            <a:spAutoFit/>
+          </a:bodyPr>
+          <a:lstStyle/>
+          <a:p>
+            <a:pPr algn="r"/>
+            <a:r>
+              <a:rPr lang="en-GB" sz="2000" dirty="0">
+                <a:latin typeface="Segoe UI Semibold" panose="020B0702040204020203" pitchFamily="34" charset="0"/>
+                <a:cs typeface="Segoe UI Semibold" panose="020B0702040204020203" pitchFamily="34" charset="0"/>
+              </a:rPr>
+              <a:t>Please Turn Off/Silence Your Devices</a:t>
+            </a:r>
+          </a:p>
+          <a:p>
+            <a:pPr algn="r"/>
+            <a:r>
+              <a:rPr lang="zh-TW" altLang="en-US" sz="2000" b="1" dirty="0">
+                <a:latin typeface="Microsoft JhengHei" panose="020B0604030504040204" pitchFamily="34" charset="-120"/>
+                <a:ea typeface="Microsoft JhengHei" panose="020B0604030504040204" pitchFamily="34" charset="-120"/>
+              </a:rPr>
+              <a:t>請靜音或關閉所有電子設備</a:t>
+            </a:r>
+            <a:endParaRPr lang="ja-JP" altLang="en-US" sz="2000" b="1" dirty="0">
+              <a:latin typeface="Microsoft JhengHei" panose="020B0604030504040204" pitchFamily="34" charset="-120"/>
+              <a:ea typeface="Microsoft JhengHei" panose="020B0604030504040204" pitchFamily="34" charset="-120"/>
+            </a:endParaRPr>
+          </a:p>
+        </p:txBody>
+      </p:sp>
     </p:spTree>
     <p:extLst>
       <p:ext uri="{BB962C8B-B14F-4D97-AF65-F5344CB8AC3E}">

</xml_diff>

<commit_message>
06/01/23 Change Font and Color for duplicate text boxes.
</commit_message>
<xml_diff>
--- a/TJCPowerPoint/Resources/ServiceWidescreen.pptx
+++ b/TJCPowerPoint/Resources/ServiceWidescreen.pptx
@@ -4378,7 +4378,7 @@
                 <a:cs typeface="Segoe UI" panose="020B0502040204020203" pitchFamily="34" charset="0"/>
               </a:rPr>
               <a:pPr algn="r"/>
-              <a:t>Monday, January 2, 2023</a:t>
+              <a:t>Thursday, January 5, 2023</a:t>
             </a:fld>
             <a:endParaRPr lang="en-US" altLang="en-US" sz="3600" b="1" dirty="0">
               <a:solidFill>
@@ -5012,7 +5012,7 @@
               <a:rPr lang="en-GB" altLang="en-US" sz="3600" dirty="0">
                 <a:latin typeface="Century Gothic" panose="020B0502020202020204" pitchFamily="34" charset="0"/>
               </a:rPr>
-              <a:t>Hymns </a:t>
+              <a:t>HYMNS </a:t>
             </a:r>
             <a:r>
               <a:rPr lang="zh-TW" altLang="en-US" sz="3600" dirty="0">
@@ -5567,8 +5567,8 @@
         </p:nvSpPr>
         <p:spPr bwMode="auto">
           <a:xfrm>
-            <a:off x="222502" y="2420888"/>
-            <a:ext cx="5004520" cy="646331"/>
+            <a:off x="252966" y="2677849"/>
+            <a:ext cx="5004520" cy="584775"/>
           </a:xfrm>
           <a:prstGeom prst="rect">
             <a:avLst/>
@@ -5621,19 +5621,19 @@
               <a:buNone/>
             </a:pPr>
             <a:r>
-              <a:rPr lang="en-GB" altLang="en-US" sz="3600" dirty="0">
+              <a:rPr lang="en-GB" altLang="en-US" sz="3200" dirty="0">
                 <a:latin typeface="Century Gothic" panose="020B0502020202020204" pitchFamily="34" charset="0"/>
               </a:rPr>
-              <a:t>Bible Verse </a:t>
-            </a:r>
-            <a:r>
-              <a:rPr lang="zh-TW" altLang="en-US" sz="3600" dirty="0">
+              <a:t>BIBLE VERSE </a:t>
+            </a:r>
+            <a:r>
+              <a:rPr lang="zh-TW" altLang="en-US" sz="3200" dirty="0">
                 <a:latin typeface="Microsoft JhengHei" panose="020B0604030504040204" pitchFamily="34" charset="-120"/>
                 <a:ea typeface="Microsoft JhengHei" panose="020B0604030504040204" pitchFamily="34" charset="-120"/>
               </a:rPr>
               <a:t>經文</a:t>
             </a:r>
-            <a:endParaRPr lang="en-US" altLang="en-US" sz="3600" dirty="0">
+            <a:endParaRPr lang="en-US" altLang="en-US" sz="3200" dirty="0">
               <a:latin typeface="Microsoft JhengHei" panose="020B0604030504040204" pitchFamily="34" charset="-120"/>
               <a:ea typeface="Microsoft JhengHei" panose="020B0604030504040204" pitchFamily="34" charset="-120"/>
             </a:endParaRPr>
@@ -6181,8 +6181,8 @@
         </p:nvSpPr>
         <p:spPr bwMode="auto">
           <a:xfrm>
-            <a:off x="1" y="1700808"/>
-            <a:ext cx="12192000" cy="4464496"/>
+            <a:off x="1" y="1628800"/>
+            <a:ext cx="12192000" cy="4536504"/>
           </a:xfrm>
           <a:prstGeom prst="rect">
             <a:avLst/>
@@ -6233,7 +6233,7 @@
               </a:lnSpc>
             </a:pPr>
             <a:r>
-              <a:rPr lang="en-GB" altLang="zh-TW" sz="4000" dirty="0">
+              <a:rPr lang="en-GB" altLang="zh-TW" sz="4800" dirty="0">
                 <a:latin typeface="Century Gothic" panose="020B0502020202020204" pitchFamily="34" charset="0"/>
                 <a:ea typeface="金梅新中楷全字體" panose="02010509060101010101" pitchFamily="49" charset="-120"/>
               </a:rPr>
@@ -6258,8 +6258,8 @@
         </p:nvSpPr>
         <p:spPr bwMode="auto">
           <a:xfrm>
-            <a:off x="1871470" y="704601"/>
-            <a:ext cx="8449060" cy="648072"/>
+            <a:off x="1871470" y="476672"/>
+            <a:ext cx="8449060" cy="924199"/>
           </a:xfrm>
           <a:prstGeom prst="rect">
             <a:avLst/>
@@ -6306,20 +6306,20 @@
           <a:p>
             <a:pPr algn="ctr"/>
             <a:r>
-              <a:rPr lang="en-GB" altLang="en-US" sz="4400" b="1" dirty="0">
+              <a:rPr lang="en-GB" altLang="en-US" sz="6000" b="1" dirty="0">
                 <a:latin typeface="Segoe UI" panose="020B0502040204020203" pitchFamily="34" charset="0"/>
                 <a:cs typeface="Segoe UI" panose="020B0502040204020203" pitchFamily="34" charset="0"/>
               </a:rPr>
               <a:t>HYMNAL </a:t>
             </a:r>
             <a:r>
-              <a:rPr lang="ja-JP" altLang="en-US" sz="4400" b="1" dirty="0">
+              <a:rPr lang="ja-JP" altLang="en-US" sz="6000" b="1" dirty="0">
                 <a:latin typeface="Segoe UI" panose="020B0502040204020203" pitchFamily="34" charset="0"/>
                 <a:cs typeface="Segoe UI" panose="020B0502040204020203" pitchFamily="34" charset="0"/>
               </a:rPr>
               <a:t>詩頌</a:t>
             </a:r>
-            <a:endParaRPr lang="en-GB" altLang="zh-TW" sz="4400" b="1" dirty="0">
+            <a:endParaRPr lang="en-GB" altLang="zh-TW" sz="6000" b="1" dirty="0">
               <a:latin typeface="Century Gothic" panose="020B0502020202020204" pitchFamily="34" charset="0"/>
               <a:ea typeface="金梅新中楷全字體" panose="02010509060101010101" pitchFamily="49" charset="-120"/>
             </a:endParaRPr>

</xml_diff>

<commit_message>
10/01/23 Added dictionary for slide and shape numbers
</commit_message>
<xml_diff>
--- a/TJCPowerPoint/Resources/ServiceWidescreen.pptx
+++ b/TJCPowerPoint/Resources/ServiceWidescreen.pptx
@@ -4378,7 +4378,7 @@
                 <a:cs typeface="Segoe UI" panose="020B0502040204020203" pitchFamily="34" charset="0"/>
               </a:rPr>
               <a:pPr algn="r"/>
-              <a:t>Monday, January 9, 2023</a:t>
+              <a:t>Tuesday, January 10, 2023</a:t>
             </a:fld>
             <a:endParaRPr lang="en-US" altLang="en-US" sz="3600" b="1" dirty="0">
               <a:solidFill>
@@ -5009,13 +5009,13 @@
               </a:spcBef>
             </a:pPr>
             <a:r>
-              <a:rPr lang="en-GB" altLang="en-US" sz="3200" dirty="0">
+              <a:rPr lang="en-GB" altLang="en-US" sz="3200" b="1" dirty="0">
                 <a:latin typeface="Century Gothic" panose="020B0502020202020204" pitchFamily="34" charset="0"/>
               </a:rPr>
               <a:t>HYMNS </a:t>
             </a:r>
             <a:r>
-              <a:rPr lang="zh-TW" altLang="en-US" sz="3200" dirty="0">
+              <a:rPr lang="zh-TW" altLang="en-US" sz="3200" b="1" dirty="0">
                 <a:latin typeface="Microsoft JhengHei" panose="020B0604030504040204" pitchFamily="34" charset="-120"/>
                 <a:ea typeface="Microsoft JhengHei" panose="020B0604030504040204" pitchFamily="34" charset="-120"/>
               </a:rPr>
@@ -5621,19 +5621,19 @@
               <a:buNone/>
             </a:pPr>
             <a:r>
-              <a:rPr lang="en-GB" altLang="en-US" sz="3200" dirty="0">
+              <a:rPr lang="en-GB" altLang="en-US" sz="3200" b="1" dirty="0">
                 <a:latin typeface="Century Gothic" panose="020B0502020202020204" pitchFamily="34" charset="0"/>
               </a:rPr>
               <a:t>BIBLE VERSE </a:t>
             </a:r>
             <a:r>
-              <a:rPr lang="zh-TW" altLang="en-US" sz="3200" dirty="0">
+              <a:rPr lang="zh-TW" altLang="en-US" sz="3200" b="1" dirty="0">
                 <a:latin typeface="Microsoft JhengHei" panose="020B0604030504040204" pitchFamily="34" charset="-120"/>
                 <a:ea typeface="Microsoft JhengHei" panose="020B0604030504040204" pitchFamily="34" charset="-120"/>
               </a:rPr>
               <a:t>經文</a:t>
             </a:r>
-            <a:endParaRPr lang="en-US" altLang="en-US" sz="3200" dirty="0">
+            <a:endParaRPr lang="en-US" altLang="en-US" sz="3200" b="1" dirty="0">
               <a:latin typeface="Microsoft JhengHei" panose="020B0604030504040204" pitchFamily="34" charset="-120"/>
               <a:ea typeface="Microsoft JhengHei" panose="020B0604030504040204" pitchFamily="34" charset="-120"/>
             </a:endParaRPr>

</xml_diff>

<commit_message>
14/01/23 More Dictionary Use
Removed previous slide tracker relying on calculated indexes.
Now using radio buttons, each one referring back to slide dictionary for slide number.
By default, program will disable presenter view (to prevent users from accidentally advancing slides)
Visual changes and buttons.
</commit_message>
<xml_diff>
--- a/TJCPowerPoint/Resources/ServiceWidescreen.pptx
+++ b/TJCPowerPoint/Resources/ServiceWidescreen.pptx
@@ -4378,7 +4378,7 @@
                 <a:cs typeface="Segoe UI" panose="020B0502040204020203" pitchFamily="34" charset="0"/>
               </a:rPr>
               <a:pPr algn="r"/>
-              <a:t>Thursday, January 12, 2023</a:t>
+              <a:t>Saturday, January 14, 2023</a:t>
             </a:fld>
             <a:endParaRPr lang="en-US" altLang="en-US" sz="3600" b="1" dirty="0">
               <a:solidFill>
@@ -4524,63 +4524,6 @@
           <a:chExt cx="0" cy="0"/>
         </a:xfrm>
       </p:grpSpPr>
-      <p:sp>
-        <p:nvSpPr>
-          <p:cNvPr id="10" name="Title 1">
-            <a:extLst>
-              <a:ext uri="{FF2B5EF4-FFF2-40B4-BE49-F238E27FC236}">
-                <a16:creationId xmlns:a16="http://schemas.microsoft.com/office/drawing/2014/main" id="{A29A4E1D-6B90-5AD8-9DB2-C35F6160DFE2}"/>
-              </a:ext>
-            </a:extLst>
-          </p:cNvPr>
-          <p:cNvSpPr txBox="1">
-            <a:spLocks/>
-          </p:cNvSpPr>
-          <p:nvPr/>
-        </p:nvSpPr>
-        <p:spPr>
-          <a:xfrm>
-            <a:off x="-7741368" y="2619557"/>
-            <a:ext cx="6858000" cy="2387600"/>
-          </a:xfrm>
-          <a:prstGeom prst="rect">
-            <a:avLst/>
-          </a:prstGeom>
-        </p:spPr>
-        <p:txBody>
-          <a:bodyPr vert="horz" lIns="91440" tIns="45720" rIns="91440" bIns="45720" rtlCol="0" anchor="ctr">
-            <a:normAutofit/>
-          </a:bodyPr>
-          <a:lstStyle>
-            <a:lvl1pPr algn="l" defTabSz="914400" rtl="0" eaLnBrk="1" latinLnBrk="0" hangingPunct="1">
-              <a:lnSpc>
-                <a:spcPct val="90000"/>
-              </a:lnSpc>
-              <a:spcBef>
-                <a:spcPct val="0"/>
-              </a:spcBef>
-              <a:buNone/>
-              <a:defRPr sz="4400" kern="1200">
-                <a:solidFill>
-                  <a:schemeClr val="tx1"/>
-                </a:solidFill>
-                <a:latin typeface="+mj-lt"/>
-                <a:ea typeface="+mj-ea"/>
-                <a:cs typeface="+mj-cs"/>
-              </a:defRPr>
-            </a:lvl1pPr>
-          </a:lstStyle>
-          <a:p>
-            <a:pPr algn="ctr"/>
-            <a:r>
-              <a:rPr lang="en-GB" dirty="0">
-                <a:latin typeface="Century Gothic" panose="020B0502020202020204" pitchFamily="34" charset="0"/>
-              </a:rPr>
-              <a:t>Service Times</a:t>
-            </a:r>
-          </a:p>
-        </p:txBody>
-      </p:sp>
       <p:sp>
         <p:nvSpPr>
           <p:cNvPr id="11" name="TextBox 10">
@@ -4835,7 +4778,7 @@
         <p:spPr bwMode="auto">
           <a:xfrm>
             <a:off x="0" y="814864"/>
-            <a:ext cx="12192000" cy="914400"/>
+            <a:ext cx="12192000" cy="830997"/>
           </a:xfrm>
           <a:prstGeom prst="rect">
             <a:avLst/>
@@ -4886,7 +4829,7 @@
               </a:spcBef>
             </a:pPr>
             <a:r>
-              <a:rPr lang="en-US" altLang="zh-CN" sz="5400" b="1" dirty="0">
+              <a:rPr lang="en-US" altLang="zh-CN" sz="4800" b="1" dirty="0">
                 <a:latin typeface="Segoe UI" panose="020B0502040204020203" pitchFamily="34" charset="0"/>
                 <a:ea typeface="宋体" panose="02010600030101010101" pitchFamily="2" charset="-122"/>
                 <a:cs typeface="Segoe UI" panose="020B0502040204020203" pitchFamily="34" charset="0"/>
@@ -4907,7 +4850,7 @@
         <p:spPr bwMode="auto">
           <a:xfrm>
             <a:off x="0" y="1802909"/>
-            <a:ext cx="12192000" cy="1006475"/>
+            <a:ext cx="12192000" cy="830997"/>
           </a:xfrm>
           <a:prstGeom prst="rect">
             <a:avLst/>
@@ -4958,7 +4901,7 @@
               </a:spcBef>
             </a:pPr>
             <a:r>
-              <a:rPr lang="en-US" altLang="zh-CN" sz="6000" b="1" dirty="0">
+              <a:rPr lang="en-US" altLang="zh-CN" sz="4800" b="1" dirty="0">
                 <a:solidFill>
                   <a:schemeClr val="accent1">
                     <a:lumMod val="50000"/>
@@ -4999,7 +4942,7 @@
         </p:spPr>
         <p:txBody>
           <a:bodyPr wrap="square">
-            <a:spAutoFit/>
+            <a:noAutofit/>
           </a:bodyPr>
           <a:lstStyle/>
           <a:p>
@@ -5117,7 +5060,7 @@
         <p:spPr bwMode="auto">
           <a:xfrm>
             <a:off x="252966" y="5877272"/>
-            <a:ext cx="4330866" cy="400110"/>
+            <a:ext cx="4330866" cy="338554"/>
           </a:xfrm>
           <a:prstGeom prst="rect">
             <a:avLst/>
@@ -5168,38 +5111,11 @@
               </a:spcBef>
             </a:pPr>
             <a:r>
-              <a:rPr lang="en-US" altLang="zh-CN" sz="2000" dirty="0">
+              <a:rPr lang="en-US" altLang="zh-CN" sz="1600" dirty="0">
                 <a:latin typeface="Century Gothic" panose="020B0502020202020204" pitchFamily="34" charset="0"/>
                 <a:ea typeface="宋体" panose="02010600030101010101" pitchFamily="2" charset="-122"/>
               </a:rPr>
               <a:t>Service Type</a:t>
-            </a:r>
-          </a:p>
-        </p:txBody>
-      </p:sp>
-      <p:sp>
-        <p:nvSpPr>
-          <p:cNvPr id="2" name="Title 1"/>
-          <p:cNvSpPr>
-            <a:spLocks noGrp="1"/>
-          </p:cNvSpPr>
-          <p:nvPr>
-            <p:ph type="ctrTitle"/>
-          </p:nvPr>
-        </p:nvSpPr>
-        <p:spPr>
-          <a:xfrm>
-            <a:off x="-8533456" y="2706867"/>
-            <a:ext cx="6539934" cy="1008018"/>
-          </a:xfrm>
-        </p:spPr>
-        <p:txBody>
-          <a:bodyPr/>
-          <a:lstStyle/>
-          <a:p>
-            <a:r>
-              <a:rPr lang="en-GB" dirty="0"/>
-              <a:t>Service/Hymnal</a:t>
             </a:r>
           </a:p>
         </p:txBody>
@@ -5420,7 +5336,7 @@
         <p:spPr bwMode="auto">
           <a:xfrm>
             <a:off x="0" y="498376"/>
-            <a:ext cx="12192000" cy="914400"/>
+            <a:ext cx="12192000" cy="830997"/>
           </a:xfrm>
           <a:prstGeom prst="rect">
             <a:avLst/>
@@ -5471,7 +5387,7 @@
               </a:spcBef>
             </a:pPr>
             <a:r>
-              <a:rPr lang="en-US" altLang="zh-CN" sz="5400" b="1" dirty="0">
+              <a:rPr lang="en-US" altLang="zh-CN" sz="4800" b="1" dirty="0">
                 <a:latin typeface="Segoe UI" panose="020B0502040204020203" pitchFamily="34" charset="0"/>
                 <a:ea typeface="宋体" panose="02010600030101010101" pitchFamily="2" charset="-122"/>
                 <a:cs typeface="Segoe UI" panose="020B0502040204020203" pitchFamily="34" charset="0"/>
@@ -5492,7 +5408,7 @@
         <p:spPr bwMode="auto">
           <a:xfrm>
             <a:off x="0" y="1486421"/>
-            <a:ext cx="12192000" cy="1006475"/>
+            <a:ext cx="12192000" cy="830997"/>
           </a:xfrm>
           <a:prstGeom prst="rect">
             <a:avLst/>
@@ -5543,7 +5459,7 @@
               </a:spcBef>
             </a:pPr>
             <a:r>
-              <a:rPr lang="en-US" altLang="zh-CN" sz="6000" b="1" dirty="0">
+              <a:rPr lang="en-US" altLang="zh-CN" sz="4800" b="1" dirty="0">
                 <a:solidFill>
                   <a:schemeClr val="accent1">
                     <a:lumMod val="50000"/>
@@ -5567,8 +5483,67 @@
         </p:nvSpPr>
         <p:spPr bwMode="auto">
           <a:xfrm>
-            <a:off x="252966" y="2677849"/>
-            <a:ext cx="5004520" cy="584775"/>
+            <a:off x="252966" y="2474466"/>
+            <a:ext cx="11685790" cy="3402807"/>
+          </a:xfrm>
+          <a:prstGeom prst="rect">
+            <a:avLst/>
+          </a:prstGeom>
+          <a:solidFill>
+            <a:srgbClr val="B2B2B2">
+              <a:alpha val="40000"/>
+            </a:srgbClr>
+          </a:solidFill>
+          <a:ln>
+            <a:noFill/>
+          </a:ln>
+          <a:effectLst/>
+        </p:spPr>
+        <p:txBody>
+          <a:bodyPr wrap="square">
+            <a:noAutofit/>
+          </a:bodyPr>
+          <a:lstStyle/>
+          <a:p>
+            <a:pPr eaLnBrk="1" hangingPunct="1">
+              <a:spcBef>
+                <a:spcPct val="50000"/>
+              </a:spcBef>
+              <a:buFontTx/>
+              <a:buNone/>
+            </a:pPr>
+            <a:r>
+              <a:rPr lang="en-GB" altLang="en-US" sz="3200" b="1" dirty="0">
+                <a:latin typeface="Century Gothic" panose="020B0502020202020204" pitchFamily="34" charset="0"/>
+              </a:rPr>
+              <a:t>BIBLE VERSE </a:t>
+            </a:r>
+            <a:r>
+              <a:rPr lang="zh-TW" altLang="en-US" sz="3200" b="1" dirty="0">
+                <a:latin typeface="Microsoft JhengHei" panose="020B0604030504040204" pitchFamily="34" charset="-120"/>
+                <a:ea typeface="Microsoft JhengHei" panose="020B0604030504040204" pitchFamily="34" charset="-120"/>
+              </a:rPr>
+              <a:t>經文</a:t>
+            </a:r>
+            <a:endParaRPr lang="en-US" altLang="en-US" sz="3200" b="1" dirty="0">
+              <a:latin typeface="Microsoft JhengHei" panose="020B0604030504040204" pitchFamily="34" charset="-120"/>
+              <a:ea typeface="Microsoft JhengHei" panose="020B0604030504040204" pitchFamily="34" charset="-120"/>
+            </a:endParaRPr>
+          </a:p>
+        </p:txBody>
+      </p:sp>
+      <p:sp>
+        <p:nvSpPr>
+          <p:cNvPr id="344071" name="Text Box 7"/>
+          <p:cNvSpPr txBox="1">
+            <a:spLocks noChangeArrowheads="1"/>
+          </p:cNvSpPr>
+          <p:nvPr/>
+        </p:nvSpPr>
+        <p:spPr bwMode="auto">
+          <a:xfrm>
+            <a:off x="0" y="3344798"/>
+            <a:ext cx="5771528" cy="954107"/>
           </a:xfrm>
           <a:prstGeom prst="rect">
             <a:avLst/>
@@ -5613,36 +5588,23 @@
           </a:bodyPr>
           <a:lstStyle/>
           <a:p>
-            <a:pPr eaLnBrk="1" hangingPunct="1">
+            <a:pPr algn="r">
               <a:spcBef>
                 <a:spcPct val="50000"/>
               </a:spcBef>
-              <a:buFontTx/>
-              <a:buNone/>
             </a:pPr>
             <a:r>
-              <a:rPr lang="en-GB" altLang="en-US" sz="3200" b="1" dirty="0">
+              <a:rPr lang="en-US" altLang="en-US" sz="5600" dirty="0">
                 <a:latin typeface="Century Gothic" panose="020B0502020202020204" pitchFamily="34" charset="0"/>
               </a:rPr>
-              <a:t>BIBLE VERSE </a:t>
-            </a:r>
-            <a:r>
-              <a:rPr lang="zh-TW" altLang="en-US" sz="3200" b="1" dirty="0">
-                <a:latin typeface="Microsoft JhengHei" panose="020B0604030504040204" pitchFamily="34" charset="-120"/>
-                <a:ea typeface="Microsoft JhengHei" panose="020B0604030504040204" pitchFamily="34" charset="-120"/>
-              </a:rPr>
-              <a:t>經文</a:t>
-            </a:r>
-            <a:endParaRPr lang="en-US" altLang="en-US" sz="3200" b="1" dirty="0">
-              <a:latin typeface="Microsoft JhengHei" panose="020B0604030504040204" pitchFamily="34" charset="-120"/>
-              <a:ea typeface="Microsoft JhengHei" panose="020B0604030504040204" pitchFamily="34" charset="-120"/>
-            </a:endParaRPr>
-          </a:p>
-        </p:txBody>
-      </p:sp>
-      <p:sp>
-        <p:nvSpPr>
-          <p:cNvPr id="344071" name="Text Box 7"/>
+              <a:t>English Book</a:t>
+            </a:r>
+          </a:p>
+        </p:txBody>
+      </p:sp>
+      <p:sp>
+        <p:nvSpPr>
+          <p:cNvPr id="344072" name="Text Box 8"/>
           <p:cNvSpPr txBox="1">
             <a:spLocks noChangeArrowheads="1"/>
           </p:cNvSpPr>
@@ -5650,8 +5612,8 @@
         </p:nvSpPr>
         <p:spPr bwMode="auto">
           <a:xfrm>
-            <a:off x="119336" y="3344798"/>
-            <a:ext cx="5652192" cy="830997"/>
+            <a:off x="1" y="4280902"/>
+            <a:ext cx="5771528" cy="954107"/>
           </a:xfrm>
           <a:prstGeom prst="rect">
             <a:avLst/>
@@ -5702,17 +5664,23 @@
               </a:spcBef>
             </a:pPr>
             <a:r>
-              <a:rPr lang="en-US" altLang="en-US" sz="4800" dirty="0">
-                <a:latin typeface="Century Gothic" panose="020B0502020202020204" pitchFamily="34" charset="0"/>
+              <a:rPr lang="en-US" altLang="en-US" sz="5600" dirty="0">
+                <a:solidFill>
+                  <a:schemeClr val="accent1">
+                    <a:lumMod val="50000"/>
+                  </a:schemeClr>
+                </a:solidFill>
+                <a:latin typeface="Microsoft JhengHei" panose="020B0604030504040204" pitchFamily="34" charset="-120"/>
+                <a:ea typeface="Microsoft JhengHei" panose="020B0604030504040204" pitchFamily="34" charset="-120"/>
               </a:rPr>
-              <a:t>English Book</a:t>
-            </a:r>
-          </a:p>
-        </p:txBody>
-      </p:sp>
-      <p:sp>
-        <p:nvSpPr>
-          <p:cNvPr id="344072" name="Text Box 8"/>
+              <a:t>Chinese Book</a:t>
+            </a:r>
+          </a:p>
+        </p:txBody>
+      </p:sp>
+      <p:sp>
+        <p:nvSpPr>
+          <p:cNvPr id="344073" name="Text Box 9"/>
           <p:cNvSpPr txBox="1">
             <a:spLocks noChangeArrowheads="1"/>
           </p:cNvSpPr>
@@ -5720,8 +5688,8 @@
         </p:nvSpPr>
         <p:spPr bwMode="auto">
           <a:xfrm>
-            <a:off x="300061" y="4280902"/>
-            <a:ext cx="5471467" cy="830997"/>
+            <a:off x="5952253" y="3734926"/>
+            <a:ext cx="6239747" cy="2246769"/>
           </a:xfrm>
           <a:prstGeom prst="rect">
             <a:avLst/>
@@ -5761,34 +5729,35 @@
           </a:extLst>
         </p:spPr>
         <p:txBody>
-          <a:bodyPr wrap="square">
+          <a:bodyPr wrap="square" lIns="0" rIns="0">
             <a:spAutoFit/>
           </a:bodyPr>
           <a:lstStyle/>
           <a:p>
-            <a:pPr algn="r">
+            <a:pPr>
               <a:spcBef>
                 <a:spcPct val="50000"/>
               </a:spcBef>
             </a:pPr>
             <a:r>
-              <a:rPr lang="en-US" altLang="en-US" sz="4800" dirty="0">
-                <a:solidFill>
-                  <a:schemeClr val="accent1">
-                    <a:lumMod val="50000"/>
-                  </a:schemeClr>
-                </a:solidFill>
-                <a:latin typeface="Microsoft JhengHei" panose="020B0604030504040204" pitchFamily="34" charset="-120"/>
-                <a:ea typeface="Microsoft JhengHei" panose="020B0604030504040204" pitchFamily="34" charset="-120"/>
+              <a:rPr lang="en-US" altLang="zh-CN" sz="7000" dirty="0">
+                <a:latin typeface="Century Gothic" panose="020B0502020202020204" pitchFamily="34" charset="0"/>
+                <a:ea typeface="宋体" panose="02010600030101010101" pitchFamily="2" charset="-122"/>
               </a:rPr>
-              <a:t>Chinese Book</a:t>
-            </a:r>
-          </a:p>
-        </p:txBody>
-      </p:sp>
-      <p:sp>
-        <p:nvSpPr>
-          <p:cNvPr id="344073" name="Text Box 9"/>
+              <a:t>Chapter &amp; Verse</a:t>
+            </a:r>
+          </a:p>
+        </p:txBody>
+      </p:sp>
+      <p:sp>
+        <p:nvSpPr>
+          <p:cNvPr id="15" name="Text Box 10">
+            <a:extLst>
+              <a:ext uri="{FF2B5EF4-FFF2-40B4-BE49-F238E27FC236}">
+                <a16:creationId xmlns:a16="http://schemas.microsoft.com/office/drawing/2014/main" id="{90246C2A-6C5E-406F-8738-05ACA671C742}"/>
+              </a:ext>
+            </a:extLst>
+          </p:cNvPr>
           <p:cNvSpPr txBox="1">
             <a:spLocks noChangeArrowheads="1"/>
           </p:cNvSpPr>
@@ -5796,8 +5765,8 @@
         </p:nvSpPr>
         <p:spPr bwMode="auto">
           <a:xfrm>
-            <a:off x="5952253" y="3734926"/>
-            <a:ext cx="6239747" cy="2308324"/>
+            <a:off x="252966" y="5877272"/>
+            <a:ext cx="4330866" cy="338554"/>
           </a:xfrm>
           <a:prstGeom prst="rect">
             <a:avLst/>
@@ -5837,7 +5806,7 @@
           </a:extLst>
         </p:spPr>
         <p:txBody>
-          <a:bodyPr wrap="square" lIns="0" rIns="0">
+          <a:bodyPr wrap="square">
             <a:spAutoFit/>
           </a:bodyPr>
           <a:lstStyle/>
@@ -5848,115 +5817,11 @@
               </a:spcBef>
             </a:pPr>
             <a:r>
-              <a:rPr lang="en-US" altLang="zh-CN" sz="7200" dirty="0">
-                <a:latin typeface="Century Gothic" panose="020B0502020202020204" pitchFamily="34" charset="0"/>
-                <a:ea typeface="宋体" panose="02010600030101010101" pitchFamily="2" charset="-122"/>
-              </a:rPr>
-              <a:t>Chapter &amp; Verse</a:t>
-            </a:r>
-          </a:p>
-        </p:txBody>
-      </p:sp>
-      <p:sp>
-        <p:nvSpPr>
-          <p:cNvPr id="15" name="Text Box 10">
-            <a:extLst>
-              <a:ext uri="{FF2B5EF4-FFF2-40B4-BE49-F238E27FC236}">
-                <a16:creationId xmlns:a16="http://schemas.microsoft.com/office/drawing/2014/main" id="{90246C2A-6C5E-406F-8738-05ACA671C742}"/>
-              </a:ext>
-            </a:extLst>
-          </p:cNvPr>
-          <p:cNvSpPr txBox="1">
-            <a:spLocks noChangeArrowheads="1"/>
-          </p:cNvSpPr>
-          <p:nvPr/>
-        </p:nvSpPr>
-        <p:spPr bwMode="auto">
-          <a:xfrm>
-            <a:off x="252966" y="5877272"/>
-            <a:ext cx="4330866" cy="400110"/>
-          </a:xfrm>
-          <a:prstGeom prst="rect">
-            <a:avLst/>
-          </a:prstGeom>
-          <a:noFill/>
-          <a:ln>
-            <a:noFill/>
-          </a:ln>
-          <a:effectLst/>
-          <a:extLst>
-            <a:ext uri="{909E8E84-426E-40DD-AFC4-6F175D3DCCD1}">
-              <a14:hiddenFill xmlns:a14="http://schemas.microsoft.com/office/drawing/2010/main">
-                <a:solidFill>
-                  <a:schemeClr val="accent1"/>
-                </a:solidFill>
-              </a14:hiddenFill>
-            </a:ext>
-            <a:ext uri="{91240B29-F687-4F45-9708-019B960494DF}">
-              <a14:hiddenLine xmlns:a14="http://schemas.microsoft.com/office/drawing/2010/main" w="9525">
-                <a:solidFill>
-                  <a:schemeClr val="tx1"/>
-                </a:solidFill>
-                <a:miter lim="800000"/>
-                <a:headEnd/>
-                <a:tailEnd/>
-              </a14:hiddenLine>
-            </a:ext>
-            <a:ext uri="{AF507438-7753-43E0-B8FC-AC1667EBCBE1}">
-              <a14:hiddenEffects xmlns:a14="http://schemas.microsoft.com/office/drawing/2010/main">
-                <a:effectLst>
-                  <a:outerShdw dist="35921" dir="2700000" algn="ctr" rotWithShape="0">
-                    <a:schemeClr val="bg2"/>
-                  </a:outerShdw>
-                </a:effectLst>
-              </a14:hiddenEffects>
-            </a:ext>
-          </a:extLst>
-        </p:spPr>
-        <p:txBody>
-          <a:bodyPr wrap="square">
-            <a:spAutoFit/>
-          </a:bodyPr>
-          <a:lstStyle/>
-          <a:p>
-            <a:pPr>
-              <a:spcBef>
-                <a:spcPct val="50000"/>
-              </a:spcBef>
-            </a:pPr>
-            <a:r>
-              <a:rPr lang="en-US" altLang="zh-CN" sz="2000" dirty="0">
+              <a:rPr lang="en-US" altLang="zh-CN" sz="1600" dirty="0">
                 <a:latin typeface="Century Gothic" panose="020B0502020202020204" pitchFamily="34" charset="0"/>
                 <a:ea typeface="宋体" panose="02010600030101010101" pitchFamily="2" charset="-122"/>
               </a:rPr>
               <a:t>Service Type</a:t>
-            </a:r>
-          </a:p>
-        </p:txBody>
-      </p:sp>
-      <p:sp>
-        <p:nvSpPr>
-          <p:cNvPr id="2" name="Title 1"/>
-          <p:cNvSpPr>
-            <a:spLocks noGrp="1"/>
-          </p:cNvSpPr>
-          <p:nvPr>
-            <p:ph type="ctrTitle"/>
-          </p:nvPr>
-        </p:nvSpPr>
-        <p:spPr>
-          <a:xfrm>
-            <a:off x="-8533456" y="2706867"/>
-            <a:ext cx="6539934" cy="1008018"/>
-          </a:xfrm>
-        </p:spPr>
-        <p:txBody>
-          <a:bodyPr/>
-          <a:lstStyle/>
-          <a:p>
-            <a:r>
-              <a:rPr lang="en-GB" dirty="0"/>
-              <a:t>Service/Hymnal</a:t>
             </a:r>
           </a:p>
         </p:txBody>
@@ -6326,41 +6191,6 @@
           </a:p>
         </p:txBody>
       </p:sp>
-      <p:sp>
-        <p:nvSpPr>
-          <p:cNvPr id="8" name="Title 1">
-            <a:extLst>
-              <a:ext uri="{FF2B5EF4-FFF2-40B4-BE49-F238E27FC236}">
-                <a16:creationId xmlns:a16="http://schemas.microsoft.com/office/drawing/2014/main" id="{3DD2CCF3-660C-4B35-8262-BE8668E0E220}"/>
-              </a:ext>
-            </a:extLst>
-          </p:cNvPr>
-          <p:cNvSpPr>
-            <a:spLocks noGrp="1"/>
-          </p:cNvSpPr>
-          <p:nvPr>
-            <p:ph type="ctrTitle"/>
-          </p:nvPr>
-        </p:nvSpPr>
-        <p:spPr>
-          <a:xfrm>
-            <a:off x="-7741368" y="2619557"/>
-            <a:ext cx="6858000" cy="2387600"/>
-          </a:xfrm>
-        </p:spPr>
-        <p:txBody>
-          <a:bodyPr/>
-          <a:lstStyle/>
-          <a:p>
-            <a:r>
-              <a:rPr lang="en-GB" dirty="0">
-                <a:latin typeface="Century Gothic" panose="020B0502020202020204" pitchFamily="34" charset="0"/>
-              </a:rPr>
-              <a:t>Prayer Requests</a:t>
-            </a:r>
-          </a:p>
-        </p:txBody>
-      </p:sp>
       <p:pic>
         <p:nvPicPr>
           <p:cNvPr id="2" name="Picture 1" descr="Logo&#10;&#10;Description automatically generated with medium confidence">
@@ -6719,41 +6549,6 @@
           </a:p>
         </p:txBody>
       </p:sp>
-      <p:sp>
-        <p:nvSpPr>
-          <p:cNvPr id="8" name="Title 1">
-            <a:extLst>
-              <a:ext uri="{FF2B5EF4-FFF2-40B4-BE49-F238E27FC236}">
-                <a16:creationId xmlns:a16="http://schemas.microsoft.com/office/drawing/2014/main" id="{3DD2CCF3-660C-4B35-8262-BE8668E0E220}"/>
-              </a:ext>
-            </a:extLst>
-          </p:cNvPr>
-          <p:cNvSpPr>
-            <a:spLocks noGrp="1"/>
-          </p:cNvSpPr>
-          <p:nvPr>
-            <p:ph type="ctrTitle"/>
-          </p:nvPr>
-        </p:nvSpPr>
-        <p:spPr>
-          <a:xfrm>
-            <a:off x="-7741368" y="2619557"/>
-            <a:ext cx="6858000" cy="2387600"/>
-          </a:xfrm>
-        </p:spPr>
-        <p:txBody>
-          <a:bodyPr/>
-          <a:lstStyle/>
-          <a:p>
-            <a:r>
-              <a:rPr lang="en-GB" dirty="0">
-                <a:latin typeface="Century Gothic" panose="020B0502020202020204" pitchFamily="34" charset="0"/>
-              </a:rPr>
-              <a:t>Prayer Requests</a:t>
-            </a:r>
-          </a:p>
-        </p:txBody>
-      </p:sp>
       <p:pic>
         <p:nvPicPr>
           <p:cNvPr id="2" name="Picture 1" descr="Logo&#10;&#10;Description automatically generated with medium confidence">
@@ -6969,7 +6764,7 @@
         </p:nvSpPr>
         <p:spPr bwMode="auto">
           <a:xfrm>
-            <a:off x="0" y="908720"/>
+            <a:off x="0" y="876782"/>
             <a:ext cx="12192000" cy="5360530"/>
           </a:xfrm>
           <a:prstGeom prst="rect">
@@ -7110,42 +6905,6 @@
               <a:latin typeface="Microsoft JhengHei" panose="020B0604030504040204" pitchFamily="34" charset="-120"/>
               <a:ea typeface="Microsoft JhengHei" panose="020B0604030504040204" pitchFamily="34" charset="-120"/>
             </a:endParaRPr>
-          </a:p>
-        </p:txBody>
-      </p:sp>
-      <p:sp>
-        <p:nvSpPr>
-          <p:cNvPr id="14" name="Title 1">
-            <a:extLst>
-              <a:ext uri="{FF2B5EF4-FFF2-40B4-BE49-F238E27FC236}">
-                <a16:creationId xmlns:a16="http://schemas.microsoft.com/office/drawing/2014/main" id="{24CDB64D-DDA9-4535-BAD4-A67954A30EFA}"/>
-              </a:ext>
-            </a:extLst>
-          </p:cNvPr>
-          <p:cNvSpPr>
-            <a:spLocks noGrp="1"/>
-          </p:cNvSpPr>
-          <p:nvPr>
-            <p:ph type="title"/>
-          </p:nvPr>
-        </p:nvSpPr>
-        <p:spPr>
-          <a:xfrm>
-            <a:off x="-8677472" y="1772816"/>
-            <a:ext cx="8229600" cy="1143000"/>
-          </a:xfrm>
-        </p:spPr>
-        <p:txBody>
-          <a:bodyPr/>
-          <a:lstStyle/>
-          <a:p>
-            <a:pPr algn="ctr"/>
-            <a:r>
-              <a:rPr lang="en-GB" dirty="0">
-                <a:latin typeface="Century Gothic" panose="020B0502020202020204" pitchFamily="34" charset="0"/>
-              </a:rPr>
-              <a:t>Announcements</a:t>
-            </a:r>
           </a:p>
         </p:txBody>
       </p:sp>
@@ -7445,16 +7204,12 @@
               </a:lnSpc>
             </a:pPr>
             <a:r>
-              <a:rPr lang="en-GB" sz="4400">
+              <a:rPr lang="en-GB" sz="4400" dirty="0">
                 <a:latin typeface="Century Gothic" panose="020B0502020202020204" pitchFamily="34" charset="0"/>
                 <a:cs typeface="Segoe UI" panose="020B0502040204020203" pitchFamily="34" charset="0"/>
               </a:rPr>
               <a:t>Hymn No.</a:t>
             </a:r>
-            <a:endParaRPr lang="en-GB" sz="4400" dirty="0">
-              <a:latin typeface="Century Gothic" panose="020B0502020202020204" pitchFamily="34" charset="0"/>
-              <a:cs typeface="Segoe UI" panose="020B0502040204020203" pitchFamily="34" charset="0"/>
-            </a:endParaRPr>
           </a:p>
         </p:txBody>
       </p:sp>
@@ -7629,42 +7384,6 @@
       </p:sp>
       <p:sp>
         <p:nvSpPr>
-          <p:cNvPr id="14" name="Title 1">
-            <a:extLst>
-              <a:ext uri="{FF2B5EF4-FFF2-40B4-BE49-F238E27FC236}">
-                <a16:creationId xmlns:a16="http://schemas.microsoft.com/office/drawing/2014/main" id="{24CDB64D-DDA9-4535-BAD4-A67954A30EFA}"/>
-              </a:ext>
-            </a:extLst>
-          </p:cNvPr>
-          <p:cNvSpPr>
-            <a:spLocks noGrp="1"/>
-          </p:cNvSpPr>
-          <p:nvPr>
-            <p:ph type="title"/>
-          </p:nvPr>
-        </p:nvSpPr>
-        <p:spPr>
-          <a:xfrm>
-            <a:off x="-8677472" y="1772816"/>
-            <a:ext cx="8229600" cy="1143000"/>
-          </a:xfrm>
-        </p:spPr>
-        <p:txBody>
-          <a:bodyPr/>
-          <a:lstStyle/>
-          <a:p>
-            <a:pPr algn="ctr"/>
-            <a:r>
-              <a:rPr lang="en-GB" dirty="0">
-                <a:latin typeface="Century Gothic" panose="020B0502020202020204" pitchFamily="34" charset="0"/>
-              </a:rPr>
-              <a:t>Holy Communion</a:t>
-            </a:r>
-          </a:p>
-        </p:txBody>
-      </p:sp>
-      <p:sp>
-        <p:nvSpPr>
           <p:cNvPr id="6" name="TextBox 5">
             <a:extLst>
               <a:ext uri="{FF2B5EF4-FFF2-40B4-BE49-F238E27FC236}">
@@ -7697,7 +7416,7 @@
                 <a:latin typeface="Century Gothic" panose="020B0502020202020204" pitchFamily="34" charset="0"/>
                 <a:cs typeface="Segoe UI" panose="020B0502040204020203" pitchFamily="34" charset="0"/>
               </a:rPr>
-              <a:t>Hymns</a:t>
+              <a:t>HYMNS</a:t>
             </a:r>
             <a:r>
               <a:rPr lang="en-GB" sz="3200" u="sng" dirty="0">
@@ -7887,42 +7606,6 @@
           <a:chExt cx="0" cy="0"/>
         </a:xfrm>
       </p:grpSpPr>
-      <p:sp>
-        <p:nvSpPr>
-          <p:cNvPr id="7170" name="Title 1"/>
-          <p:cNvSpPr>
-            <a:spLocks noGrp="1"/>
-          </p:cNvSpPr>
-          <p:nvPr>
-            <p:ph type="title"/>
-          </p:nvPr>
-        </p:nvSpPr>
-        <p:spPr>
-          <a:xfrm>
-            <a:off x="-8737648" y="2060848"/>
-            <a:ext cx="8507412" cy="1498600"/>
-          </a:xfrm>
-        </p:spPr>
-        <p:txBody>
-          <a:bodyPr>
-            <a:normAutofit/>
-          </a:bodyPr>
-          <a:lstStyle/>
-          <a:p>
-            <a:pPr algn="ctr"/>
-            <a:r>
-              <a:rPr lang="en-GB" altLang="en-US" dirty="0">
-                <a:latin typeface="Century Gothic" panose="020B0502020202020204" pitchFamily="34" charset="0"/>
-              </a:rPr>
-              <a:t>How to Pray</a:t>
-            </a:r>
-            <a:endParaRPr lang="en-GB" altLang="en-US" dirty="0">
-              <a:latin typeface="Century Gothic" panose="020B0502020202020204" pitchFamily="34" charset="0"/>
-              <a:ea typeface="金梅新中楷全字體" pitchFamily="49" charset="-120"/>
-            </a:endParaRPr>
-          </a:p>
-        </p:txBody>
-      </p:sp>
       <p:sp>
         <p:nvSpPr>
           <p:cNvPr id="2" name="TextBox 1"/>

</xml_diff>

<commit_message>
15/01/23 Bug Fixes and title only slide added
</commit_message>
<xml_diff>
--- a/TJCPowerPoint/Resources/ServiceWidescreen.pptx
+++ b/TJCPowerPoint/Resources/ServiceWidescreen.pptx
@@ -5,22 +5,23 @@
     <p:sldMasterId id="2147483660" r:id="rId1"/>
   </p:sldMasterIdLst>
   <p:notesMasterIdLst>
-    <p:notesMasterId r:id="rId12"/>
+    <p:notesMasterId r:id="rId13"/>
   </p:notesMasterIdLst>
   <p:handoutMasterIdLst>
-    <p:handoutMasterId r:id="rId13"/>
+    <p:handoutMasterId r:id="rId14"/>
   </p:handoutMasterIdLst>
   <p:sldIdLst>
     <p:sldId id="365" r:id="rId2"/>
     <p:sldId id="357" r:id="rId3"/>
-    <p:sldId id="367" r:id="rId4"/>
-    <p:sldId id="366" r:id="rId5"/>
-    <p:sldId id="358" r:id="rId6"/>
-    <p:sldId id="360" r:id="rId7"/>
-    <p:sldId id="361" r:id="rId8"/>
-    <p:sldId id="359" r:id="rId9"/>
-    <p:sldId id="363" r:id="rId10"/>
-    <p:sldId id="364" r:id="rId11"/>
+    <p:sldId id="368" r:id="rId4"/>
+    <p:sldId id="367" r:id="rId5"/>
+    <p:sldId id="366" r:id="rId6"/>
+    <p:sldId id="358" r:id="rId7"/>
+    <p:sldId id="360" r:id="rId8"/>
+    <p:sldId id="361" r:id="rId9"/>
+    <p:sldId id="359" r:id="rId10"/>
+    <p:sldId id="363" r:id="rId11"/>
+    <p:sldId id="364" r:id="rId12"/>
   </p:sldIdLst>
   <p:sldSz cx="12192000" cy="6858000"/>
   <p:notesSz cx="6858000" cy="9144000"/>
@@ -1186,6 +1187,96 @@
               <a:rPr lang="en-US" altLang="en-US" smtClean="0"/>
               <a:pPr/>
               <a:t>3</a:t>
+            </a:fld>
+            <a:endParaRPr lang="en-US" altLang="en-US"/>
+          </a:p>
+        </p:txBody>
+      </p:sp>
+    </p:spTree>
+    <p:extLst>
+      <p:ext uri="{BB962C8B-B14F-4D97-AF65-F5344CB8AC3E}">
+        <p14:creationId xmlns:p14="http://schemas.microsoft.com/office/powerpoint/2010/main" val="1863552247"/>
+      </p:ext>
+    </p:extLst>
+  </p:cSld>
+  <p:clrMapOvr>
+    <a:masterClrMapping/>
+  </p:clrMapOvr>
+</p:notes>
+</file>
+
+<file path=ppt/notesSlides/notesSlide3.xml><?xml version="1.0" encoding="utf-8"?>
+<p:notes xmlns:a="http://schemas.openxmlformats.org/drawingml/2006/main" xmlns:r="http://schemas.openxmlformats.org/officeDocument/2006/relationships" xmlns:p="http://schemas.openxmlformats.org/presentationml/2006/main">
+  <p:cSld>
+    <p:spTree>
+      <p:nvGrpSpPr>
+        <p:cNvPr id="1" name=""/>
+        <p:cNvGrpSpPr/>
+        <p:nvPr/>
+      </p:nvGrpSpPr>
+      <p:grpSpPr>
+        <a:xfrm>
+          <a:off x="0" y="0"/>
+          <a:ext cx="0" cy="0"/>
+          <a:chOff x="0" y="0"/>
+          <a:chExt cx="0" cy="0"/>
+        </a:xfrm>
+      </p:grpSpPr>
+      <p:sp>
+        <p:nvSpPr>
+          <p:cNvPr id="2" name="Slide Image Placeholder 1"/>
+          <p:cNvSpPr>
+            <a:spLocks noGrp="1" noRot="1" noChangeAspect="1"/>
+          </p:cNvSpPr>
+          <p:nvPr>
+            <p:ph type="sldImg"/>
+          </p:nvPr>
+        </p:nvSpPr>
+        <p:spPr>
+          <a:xfrm>
+            <a:off x="381000" y="685800"/>
+            <a:ext cx="6096000" cy="3429000"/>
+          </a:xfrm>
+        </p:spPr>
+      </p:sp>
+      <p:sp>
+        <p:nvSpPr>
+          <p:cNvPr id="3" name="Notes Placeholder 2"/>
+          <p:cNvSpPr>
+            <a:spLocks noGrp="1"/>
+          </p:cNvSpPr>
+          <p:nvPr>
+            <p:ph type="body" idx="1"/>
+          </p:nvPr>
+        </p:nvSpPr>
+        <p:spPr/>
+        <p:txBody>
+          <a:bodyPr/>
+          <a:lstStyle/>
+          <a:p>
+            <a:endParaRPr lang="en-GB" dirty="0"/>
+          </a:p>
+        </p:txBody>
+      </p:sp>
+      <p:sp>
+        <p:nvSpPr>
+          <p:cNvPr id="4" name="Slide Number Placeholder 3"/>
+          <p:cNvSpPr>
+            <a:spLocks noGrp="1"/>
+          </p:cNvSpPr>
+          <p:nvPr>
+            <p:ph type="sldNum" sz="quarter" idx="10"/>
+          </p:nvPr>
+        </p:nvSpPr>
+        <p:spPr/>
+        <p:txBody>
+          <a:bodyPr/>
+          <a:lstStyle/>
+          <a:p>
+            <a:fld id="{41DDB78E-45AE-4915-A272-867B43D17459}" type="slidenum">
+              <a:rPr lang="en-US" altLang="en-US" smtClean="0"/>
+              <a:pPr/>
+              <a:t>4</a:t>
             </a:fld>
             <a:endParaRPr lang="en-US" altLang="en-US"/>
           </a:p>
@@ -4378,7 +4469,7 @@
                 <a:cs typeface="Segoe UI" panose="020B0502040204020203" pitchFamily="34" charset="0"/>
               </a:rPr>
               <a:pPr algn="r"/>
-              <a:t>Saturday, January 14, 2023</a:t>
+              <a:t>Sunday, January 15, 2023</a:t>
             </a:fld>
             <a:endParaRPr lang="en-US" altLang="en-US" sz="3600" b="1" dirty="0">
               <a:solidFill>
@@ -4508,6 +4599,283 @@
 </file>
 
 <file path=ppt/slides/slide10.xml><?xml version="1.0" encoding="utf-8"?>
+<p:sld xmlns:a="http://schemas.openxmlformats.org/drawingml/2006/main" xmlns:r="http://schemas.openxmlformats.org/officeDocument/2006/relationships" xmlns:p="http://schemas.openxmlformats.org/presentationml/2006/main">
+  <p:cSld>
+    <p:spTree>
+      <p:nvGrpSpPr>
+        <p:cNvPr id="1" name=""/>
+        <p:cNvGrpSpPr/>
+        <p:nvPr/>
+      </p:nvGrpSpPr>
+      <p:grpSpPr>
+        <a:xfrm>
+          <a:off x="0" y="0"/>
+          <a:ext cx="0" cy="0"/>
+          <a:chOff x="0" y="0"/>
+          <a:chExt cx="0" cy="0"/>
+        </a:xfrm>
+      </p:grpSpPr>
+      <p:sp>
+        <p:nvSpPr>
+          <p:cNvPr id="9" name="TextBox 8">
+            <a:extLst>
+              <a:ext uri="{FF2B5EF4-FFF2-40B4-BE49-F238E27FC236}">
+                <a16:creationId xmlns:a16="http://schemas.microsoft.com/office/drawing/2014/main" id="{EB7FD2AF-7F03-5326-A748-9D97F0B7E43C}"/>
+              </a:ext>
+            </a:extLst>
+          </p:cNvPr>
+          <p:cNvSpPr txBox="1"/>
+          <p:nvPr/>
+        </p:nvSpPr>
+        <p:spPr>
+          <a:xfrm>
+            <a:off x="479376" y="637429"/>
+            <a:ext cx="11233247" cy="1446550"/>
+          </a:xfrm>
+          <a:prstGeom prst="rect">
+            <a:avLst/>
+          </a:prstGeom>
+          <a:noFill/>
+          <a:ln w="63500">
+            <a:noFill/>
+          </a:ln>
+        </p:spPr>
+        <p:txBody>
+          <a:bodyPr wrap="square" rtlCol="0">
+            <a:spAutoFit/>
+          </a:bodyPr>
+          <a:lstStyle/>
+          <a:p>
+            <a:pPr algn="ctr"/>
+            <a:r>
+              <a:rPr lang="en-GB" altLang="en-US" sz="4400" b="1" dirty="0">
+                <a:latin typeface="Segoe UI" panose="020B0502040204020203" pitchFamily="34" charset="0"/>
+                <a:cs typeface="Segoe UI" panose="020B0502040204020203" pitchFamily="34" charset="0"/>
+              </a:rPr>
+              <a:t>Please Turn Off/Silence Your Devices</a:t>
+            </a:r>
+            <a:endParaRPr lang="zh-TW" altLang="en-US" sz="4400" b="1" dirty="0">
+              <a:latin typeface="Microsoft JhengHei" panose="020B0604030504040204" pitchFamily="34" charset="-120"/>
+              <a:ea typeface="Microsoft JhengHei" panose="020B0604030504040204" pitchFamily="34" charset="-120"/>
+            </a:endParaRPr>
+          </a:p>
+          <a:p>
+            <a:pPr algn="ctr"/>
+            <a:r>
+              <a:rPr lang="zh-TW" altLang="en-US" sz="4400" b="1" dirty="0">
+                <a:latin typeface="Microsoft JhengHei" panose="020B0604030504040204" pitchFamily="34" charset="-120"/>
+                <a:ea typeface="Microsoft JhengHei" panose="020B0604030504040204" pitchFamily="34" charset="-120"/>
+              </a:rPr>
+              <a:t>請靜音或關閉所有電子設備</a:t>
+            </a:r>
+            <a:endParaRPr lang="en-GB" sz="4400" b="1" dirty="0">
+              <a:latin typeface="Microsoft JhengHei" panose="020B0604030504040204" pitchFamily="34" charset="-120"/>
+              <a:ea typeface="Microsoft JhengHei" panose="020B0604030504040204" pitchFamily="34" charset="-120"/>
+            </a:endParaRPr>
+          </a:p>
+        </p:txBody>
+      </p:sp>
+      <p:pic>
+        <p:nvPicPr>
+          <p:cNvPr id="5" name="Picture 4" descr="Shape&#10;&#10;Description automatically generated with low confidence">
+            <a:extLst>
+              <a:ext uri="{FF2B5EF4-FFF2-40B4-BE49-F238E27FC236}">
+                <a16:creationId xmlns:a16="http://schemas.microsoft.com/office/drawing/2014/main" id="{AC9BD3E1-856D-B518-3D09-AA2FCBC6B91A}"/>
+              </a:ext>
+            </a:extLst>
+          </p:cNvPr>
+          <p:cNvPicPr>
+            <a:picLocks noChangeAspect="1"/>
+          </p:cNvPicPr>
+          <p:nvPr/>
+        </p:nvPicPr>
+        <p:blipFill>
+          <a:blip r:embed="rId2" cstate="print">
+            <a:extLst>
+              <a:ext uri="{BEBA8EAE-BF5A-486C-A8C5-ECC9F3942E4B}">
+                <a14:imgProps xmlns:a14="http://schemas.microsoft.com/office/drawing/2010/main">
+                  <a14:imgLayer r:embed="rId3">
+                    <a14:imgEffect>
+                      <a14:colorTemperature colorTemp="11500"/>
+                    </a14:imgEffect>
+                    <a14:imgEffect>
+                      <a14:saturation sat="400000"/>
+                    </a14:imgEffect>
+                    <a14:imgEffect>
+                      <a14:brightnessContrast bright="-40000" contrast="-40000"/>
+                    </a14:imgEffect>
+                  </a14:imgLayer>
+                </a14:imgProps>
+              </a:ext>
+              <a:ext uri="{28A0092B-C50C-407E-A947-70E740481C1C}">
+                <a14:useLocalDpi xmlns:a14="http://schemas.microsoft.com/office/drawing/2010/main" val="0"/>
+              </a:ext>
+            </a:extLst>
+          </a:blip>
+          <a:stretch>
+            <a:fillRect/>
+          </a:stretch>
+        </p:blipFill>
+        <p:spPr>
+          <a:xfrm>
+            <a:off x="1710701" y="2869813"/>
+            <a:ext cx="2359386" cy="2359386"/>
+          </a:xfrm>
+          <a:prstGeom prst="rect">
+            <a:avLst/>
+          </a:prstGeom>
+        </p:spPr>
+      </p:pic>
+      <p:pic>
+        <p:nvPicPr>
+          <p:cNvPr id="3" name="Picture 2" descr="Shape&#10;&#10;Description automatically generated with low confidence">
+            <a:extLst>
+              <a:ext uri="{FF2B5EF4-FFF2-40B4-BE49-F238E27FC236}">
+                <a16:creationId xmlns:a16="http://schemas.microsoft.com/office/drawing/2014/main" id="{F2B8EEB5-A2A8-2246-92B8-D793C3FDC5FE}"/>
+              </a:ext>
+            </a:extLst>
+          </p:cNvPr>
+          <p:cNvPicPr>
+            <a:picLocks noChangeAspect="1"/>
+          </p:cNvPicPr>
+          <p:nvPr/>
+        </p:nvPicPr>
+        <p:blipFill>
+          <a:blip r:embed="rId4">
+            <a:extLst>
+              <a:ext uri="{BEBA8EAE-BF5A-486C-A8C5-ECC9F3942E4B}">
+                <a14:imgProps xmlns:a14="http://schemas.microsoft.com/office/drawing/2010/main">
+                  <a14:imgLayer r:embed="rId5">
+                    <a14:imgEffect>
+                      <a14:brightnessContrast bright="-40000" contrast="-40000"/>
+                    </a14:imgEffect>
+                  </a14:imgLayer>
+                </a14:imgProps>
+              </a:ext>
+              <a:ext uri="{28A0092B-C50C-407E-A947-70E740481C1C}">
+                <a14:useLocalDpi xmlns:a14="http://schemas.microsoft.com/office/drawing/2010/main" val="0"/>
+              </a:ext>
+            </a:extLst>
+          </a:blip>
+          <a:stretch>
+            <a:fillRect/>
+          </a:stretch>
+        </p:blipFill>
+        <p:spPr>
+          <a:xfrm>
+            <a:off x="5015880" y="2869814"/>
+            <a:ext cx="2359385" cy="2359385"/>
+          </a:xfrm>
+          <a:prstGeom prst="rect">
+            <a:avLst/>
+          </a:prstGeom>
+        </p:spPr>
+      </p:pic>
+      <p:pic>
+        <p:nvPicPr>
+          <p:cNvPr id="6" name="Picture 5" descr="Shape&#10;&#10;Description automatically generated with low confidence">
+            <a:extLst>
+              <a:ext uri="{FF2B5EF4-FFF2-40B4-BE49-F238E27FC236}">
+                <a16:creationId xmlns:a16="http://schemas.microsoft.com/office/drawing/2014/main" id="{E4E05851-7A29-58F2-A0E9-7AFC98E740B6}"/>
+              </a:ext>
+            </a:extLst>
+          </p:cNvPr>
+          <p:cNvPicPr>
+            <a:picLocks noChangeAspect="1"/>
+          </p:cNvPicPr>
+          <p:nvPr/>
+        </p:nvPicPr>
+        <p:blipFill>
+          <a:blip r:embed="rId6">
+            <a:extLst>
+              <a:ext uri="{BEBA8EAE-BF5A-486C-A8C5-ECC9F3942E4B}">
+                <a14:imgProps xmlns:a14="http://schemas.microsoft.com/office/drawing/2010/main">
+                  <a14:imgLayer r:embed="rId7">
+                    <a14:imgEffect>
+                      <a14:brightnessContrast bright="-40000" contrast="-40000"/>
+                    </a14:imgEffect>
+                  </a14:imgLayer>
+                </a14:imgProps>
+              </a:ext>
+              <a:ext uri="{28A0092B-C50C-407E-A947-70E740481C1C}">
+                <a14:useLocalDpi xmlns:a14="http://schemas.microsoft.com/office/drawing/2010/main" val="0"/>
+              </a:ext>
+            </a:extLst>
+          </a:blip>
+          <a:stretch>
+            <a:fillRect/>
+          </a:stretch>
+        </p:blipFill>
+        <p:spPr>
+          <a:xfrm>
+            <a:off x="8121914" y="2866900"/>
+            <a:ext cx="2359385" cy="2359385"/>
+          </a:xfrm>
+          <a:prstGeom prst="rect">
+            <a:avLst/>
+          </a:prstGeom>
+        </p:spPr>
+      </p:pic>
+      <p:pic>
+        <p:nvPicPr>
+          <p:cNvPr id="2" name="Picture 1" descr="Logo&#10;&#10;Description automatically generated with medium confidence">
+            <a:extLst>
+              <a:ext uri="{FF2B5EF4-FFF2-40B4-BE49-F238E27FC236}">
+                <a16:creationId xmlns:a16="http://schemas.microsoft.com/office/drawing/2014/main" id="{97EAE857-49D3-7B8C-B57E-A881B4864B2E}"/>
+              </a:ext>
+            </a:extLst>
+          </p:cNvPr>
+          <p:cNvPicPr>
+            <a:picLocks noChangeAspect="1"/>
+          </p:cNvPicPr>
+          <p:nvPr/>
+        </p:nvPicPr>
+        <p:blipFill>
+          <a:blip r:embed="rId8" cstate="print">
+            <a:biLevel thresh="75000"/>
+            <a:extLst>
+              <a:ext uri="{BEBA8EAE-BF5A-486C-A8C5-ECC9F3942E4B}">
+                <a14:imgProps xmlns:a14="http://schemas.microsoft.com/office/drawing/2010/main">
+                  <a14:imgLayer r:embed="rId9">
+                    <a14:imgEffect>
+                      <a14:brightnessContrast bright="-40000" contrast="-40000"/>
+                    </a14:imgEffect>
+                  </a14:imgLayer>
+                </a14:imgProps>
+              </a:ext>
+              <a:ext uri="{28A0092B-C50C-407E-A947-70E740481C1C}">
+                <a14:useLocalDpi xmlns:a14="http://schemas.microsoft.com/office/drawing/2010/main" val="0"/>
+              </a:ext>
+            </a:extLst>
+          </a:blip>
+          <a:stretch>
+            <a:fillRect/>
+          </a:stretch>
+        </p:blipFill>
+        <p:spPr>
+          <a:xfrm>
+            <a:off x="335359" y="6269250"/>
+            <a:ext cx="2664297" cy="344791"/>
+          </a:xfrm>
+          <a:prstGeom prst="rect">
+            <a:avLst/>
+          </a:prstGeom>
+        </p:spPr>
+      </p:pic>
+    </p:spTree>
+    <p:extLst>
+      <p:ext uri="{BB962C8B-B14F-4D97-AF65-F5344CB8AC3E}">
+        <p14:creationId xmlns:p14="http://schemas.microsoft.com/office/powerpoint/2010/main" val="1579287213"/>
+      </p:ext>
+    </p:extLst>
+  </p:cSld>
+  <p:clrMapOvr>
+    <a:masterClrMapping/>
+  </p:clrMapOvr>
+</p:sld>
+</file>
+
+<file path=ppt/slides/slide11.xml><?xml version="1.0" encoding="utf-8"?>
 <p:sld xmlns:a="http://schemas.openxmlformats.org/drawingml/2006/main" xmlns:r="http://schemas.openxmlformats.org/officeDocument/2006/relationships" xmlns:p="http://schemas.openxmlformats.org/presentationml/2006/main">
   <p:cSld>
     <p:spTree>
@@ -4777,7 +5145,7 @@
         </p:nvSpPr>
         <p:spPr bwMode="auto">
           <a:xfrm>
-            <a:off x="0" y="814864"/>
+            <a:off x="1" y="2077398"/>
             <a:ext cx="12192000" cy="830997"/>
           </a:xfrm>
           <a:prstGeom prst="rect">
@@ -4818,7 +5186,7 @@
           </a:extLst>
         </p:spPr>
         <p:txBody>
-          <a:bodyPr wrap="square">
+          <a:bodyPr wrap="square" anchor="b">
             <a:spAutoFit/>
           </a:bodyPr>
           <a:lstStyle/>
@@ -4849,7 +5217,7 @@
         </p:nvSpPr>
         <p:spPr bwMode="auto">
           <a:xfrm>
-            <a:off x="0" y="1802909"/>
+            <a:off x="0" y="3102059"/>
             <a:ext cx="12192000" cy="830997"/>
           </a:xfrm>
           <a:prstGeom prst="rect">
@@ -4911,134 +5279,6 @@
                 <a:ea typeface="金梅新中楷全字體" panose="02010509060101010101" pitchFamily="49" charset="-120"/>
               </a:rPr>
               <a:t>Chinese</a:t>
-            </a:r>
-          </a:p>
-        </p:txBody>
-      </p:sp>
-      <p:sp>
-        <p:nvSpPr>
-          <p:cNvPr id="344068" name="Text Box 4"/>
-          <p:cNvSpPr txBox="1">
-            <a:spLocks noChangeArrowheads="1"/>
-          </p:cNvSpPr>
-          <p:nvPr/>
-        </p:nvSpPr>
-        <p:spPr bwMode="auto">
-          <a:xfrm>
-            <a:off x="1519747" y="3025408"/>
-            <a:ext cx="9144000" cy="584775"/>
-          </a:xfrm>
-          <a:prstGeom prst="rect">
-            <a:avLst/>
-          </a:prstGeom>
-          <a:noFill/>
-          <a:ln w="9525">
-            <a:noFill/>
-            <a:miter lim="800000"/>
-            <a:headEnd/>
-            <a:tailEnd/>
-          </a:ln>
-          <a:effectLst/>
-        </p:spPr>
-        <p:txBody>
-          <a:bodyPr wrap="square">
-            <a:noAutofit/>
-          </a:bodyPr>
-          <a:lstStyle/>
-          <a:p>
-            <a:pPr algn="ctr">
-              <a:spcBef>
-                <a:spcPct val="50000"/>
-              </a:spcBef>
-            </a:pPr>
-            <a:r>
-              <a:rPr lang="en-GB" altLang="en-US" sz="3200" b="1" dirty="0">
-                <a:latin typeface="Century Gothic" panose="020B0502020202020204" pitchFamily="34" charset="0"/>
-              </a:rPr>
-              <a:t>HYMNS </a:t>
-            </a:r>
-            <a:r>
-              <a:rPr lang="zh-TW" altLang="en-US" sz="3200" b="1" dirty="0">
-                <a:latin typeface="Microsoft JhengHei" panose="020B0604030504040204" pitchFamily="34" charset="-120"/>
-                <a:ea typeface="Microsoft JhengHei" panose="020B0604030504040204" pitchFamily="34" charset="-120"/>
-              </a:rPr>
-              <a:t>詩</a:t>
-            </a:r>
-            <a:endParaRPr lang="en-US" altLang="en-US" sz="3200" b="1" dirty="0">
-              <a:latin typeface="Century Gothic" panose="020B0502020202020204" pitchFamily="34" charset="0"/>
-            </a:endParaRPr>
-          </a:p>
-        </p:txBody>
-      </p:sp>
-      <p:sp>
-        <p:nvSpPr>
-          <p:cNvPr id="344069" name="Text Box 5"/>
-          <p:cNvSpPr txBox="1">
-            <a:spLocks noChangeArrowheads="1"/>
-          </p:cNvSpPr>
-          <p:nvPr/>
-        </p:nvSpPr>
-        <p:spPr bwMode="auto">
-          <a:xfrm>
-            <a:off x="1530570" y="3789040"/>
-            <a:ext cx="9137431" cy="584775"/>
-          </a:xfrm>
-          <a:prstGeom prst="rect">
-            <a:avLst/>
-          </a:prstGeom>
-          <a:noFill/>
-          <a:ln>
-            <a:noFill/>
-          </a:ln>
-          <a:effectLst/>
-          <a:extLst>
-            <a:ext uri="{909E8E84-426E-40DD-AFC4-6F175D3DCCD1}">
-              <a14:hiddenFill xmlns:a14="http://schemas.microsoft.com/office/drawing/2010/main">
-                <a:solidFill>
-                  <a:schemeClr val="accent1"/>
-                </a:solidFill>
-              </a14:hiddenFill>
-            </a:ext>
-            <a:ext uri="{91240B29-F687-4F45-9708-019B960494DF}">
-              <a14:hiddenLine xmlns:a14="http://schemas.microsoft.com/office/drawing/2010/main" w="9525">
-                <a:solidFill>
-                  <a:schemeClr val="tx1"/>
-                </a:solidFill>
-                <a:miter lim="800000"/>
-                <a:headEnd/>
-                <a:tailEnd/>
-              </a14:hiddenLine>
-            </a:ext>
-            <a:ext uri="{AF507438-7753-43E0-B8FC-AC1667EBCBE1}">
-              <a14:hiddenEffects xmlns:a14="http://schemas.microsoft.com/office/drawing/2010/main">
-                <a:effectLst>
-                  <a:outerShdw dist="35921" dir="2700000" algn="ctr" rotWithShape="0">
-                    <a:schemeClr val="bg2"/>
-                  </a:outerShdw>
-                </a:effectLst>
-              </a14:hiddenEffects>
-            </a:ext>
-          </a:extLst>
-        </p:spPr>
-        <p:txBody>
-          <a:bodyPr wrap="square">
-            <a:spAutoFit/>
-          </a:bodyPr>
-          <a:lstStyle/>
-          <a:p>
-            <a:pPr algn="ctr">
-              <a:lnSpc>
-                <a:spcPct val="80000"/>
-              </a:lnSpc>
-              <a:spcBef>
-                <a:spcPct val="50000"/>
-              </a:spcBef>
-            </a:pPr>
-            <a:r>
-              <a:rPr lang="en-US" altLang="en-US" sz="4000" dirty="0">
-                <a:latin typeface="Century Gothic" panose="020B0502020202020204" pitchFamily="34" charset="0"/>
-              </a:rPr>
-              <a:t>Hymn No.</a:t>
             </a:r>
           </a:p>
         </p:txBody>
@@ -5321,13 +5561,7 @@
       </p:grpSpPr>
       <p:sp>
         <p:nvSpPr>
-          <p:cNvPr id="4" name="Text Box 2">
-            <a:extLst>
-              <a:ext uri="{FF2B5EF4-FFF2-40B4-BE49-F238E27FC236}">
-                <a16:creationId xmlns:a16="http://schemas.microsoft.com/office/drawing/2014/main" id="{21384A1C-6723-8919-8628-8B11E6CBD507}"/>
-              </a:ext>
-            </a:extLst>
-          </p:cNvPr>
+          <p:cNvPr id="344066" name="Text Box 2"/>
           <p:cNvSpPr txBox="1">
             <a:spLocks noChangeArrowheads="1"/>
           </p:cNvSpPr>
@@ -5335,7 +5569,7 @@
         </p:nvSpPr>
         <p:spPr bwMode="auto">
           <a:xfrm>
-            <a:off x="0" y="498376"/>
+            <a:off x="0" y="814864"/>
             <a:ext cx="12192000" cy="830997"/>
           </a:xfrm>
           <a:prstGeom prst="rect">
@@ -5407,7 +5641,7 @@
         </p:nvSpPr>
         <p:spPr bwMode="auto">
           <a:xfrm>
-            <a:off x="0" y="1486421"/>
+            <a:off x="0" y="1802909"/>
             <a:ext cx="12192000" cy="830997"/>
           </a:xfrm>
           <a:prstGeom prst="rect">
@@ -5475,7 +5709,7 @@
       </p:sp>
       <p:sp>
         <p:nvSpPr>
-          <p:cNvPr id="344070" name="Text Box 6"/>
+          <p:cNvPr id="344068" name="Text Box 4"/>
           <p:cNvSpPr txBox="1">
             <a:spLocks noChangeArrowheads="1"/>
           </p:cNvSpPr>
@@ -5483,19 +5717,18 @@
         </p:nvSpPr>
         <p:spPr bwMode="auto">
           <a:xfrm>
-            <a:off x="252966" y="2474466"/>
-            <a:ext cx="11685790" cy="3402807"/>
+            <a:off x="1519747" y="3025408"/>
+            <a:ext cx="9144000" cy="584775"/>
           </a:xfrm>
           <a:prstGeom prst="rect">
             <a:avLst/>
           </a:prstGeom>
-          <a:solidFill>
-            <a:srgbClr val="B2B2B2">
-              <a:alpha val="40000"/>
-            </a:srgbClr>
-          </a:solidFill>
-          <a:ln>
+          <a:noFill/>
+          <a:ln w="9525">
             <a:noFill/>
+            <a:miter lim="800000"/>
+            <a:headEnd/>
+            <a:tailEnd/>
           </a:ln>
           <a:effectLst/>
         </p:spPr>
@@ -5505,36 +5738,33 @@
           </a:bodyPr>
           <a:lstStyle/>
           <a:p>
-            <a:pPr eaLnBrk="1" hangingPunct="1">
+            <a:pPr algn="ctr">
               <a:spcBef>
                 <a:spcPct val="50000"/>
               </a:spcBef>
-              <a:buFontTx/>
-              <a:buNone/>
             </a:pPr>
             <a:r>
               <a:rPr lang="en-GB" altLang="en-US" sz="3200" b="1" dirty="0">
                 <a:latin typeface="Century Gothic" panose="020B0502020202020204" pitchFamily="34" charset="0"/>
               </a:rPr>
-              <a:t>BIBLE VERSE </a:t>
+              <a:t>HYMNS </a:t>
             </a:r>
             <a:r>
               <a:rPr lang="zh-TW" altLang="en-US" sz="3200" b="1" dirty="0">
                 <a:latin typeface="Microsoft JhengHei" panose="020B0604030504040204" pitchFamily="34" charset="-120"/>
                 <a:ea typeface="Microsoft JhengHei" panose="020B0604030504040204" pitchFamily="34" charset="-120"/>
               </a:rPr>
-              <a:t>經文</a:t>
+              <a:t>詩</a:t>
             </a:r>
             <a:endParaRPr lang="en-US" altLang="en-US" sz="3200" b="1" dirty="0">
-              <a:latin typeface="Microsoft JhengHei" panose="020B0604030504040204" pitchFamily="34" charset="-120"/>
-              <a:ea typeface="Microsoft JhengHei" panose="020B0604030504040204" pitchFamily="34" charset="-120"/>
+              <a:latin typeface="Century Gothic" panose="020B0502020202020204" pitchFamily="34" charset="0"/>
             </a:endParaRPr>
           </a:p>
         </p:txBody>
       </p:sp>
       <p:sp>
         <p:nvSpPr>
-          <p:cNvPr id="344071" name="Text Box 7"/>
+          <p:cNvPr id="344069" name="Text Box 5"/>
           <p:cNvSpPr txBox="1">
             <a:spLocks noChangeArrowheads="1"/>
           </p:cNvSpPr>
@@ -5542,8 +5772,8 @@
         </p:nvSpPr>
         <p:spPr bwMode="auto">
           <a:xfrm>
-            <a:off x="0" y="3344798"/>
-            <a:ext cx="5771528" cy="954107"/>
+            <a:off x="1530570" y="3789040"/>
+            <a:ext cx="9137431" cy="584775"/>
           </a:xfrm>
           <a:prstGeom prst="rect">
             <a:avLst/>
@@ -5588,163 +5818,19 @@
           </a:bodyPr>
           <a:lstStyle/>
           <a:p>
-            <a:pPr algn="r">
+            <a:pPr algn="ctr">
+              <a:lnSpc>
+                <a:spcPct val="80000"/>
+              </a:lnSpc>
               <a:spcBef>
                 <a:spcPct val="50000"/>
               </a:spcBef>
             </a:pPr>
             <a:r>
-              <a:rPr lang="en-US" altLang="en-US" sz="5600" dirty="0">
+              <a:rPr lang="en-US" altLang="en-US" sz="4000" dirty="0">
                 <a:latin typeface="Century Gothic" panose="020B0502020202020204" pitchFamily="34" charset="0"/>
               </a:rPr>
-              <a:t>English Book</a:t>
-            </a:r>
-          </a:p>
-        </p:txBody>
-      </p:sp>
-      <p:sp>
-        <p:nvSpPr>
-          <p:cNvPr id="344072" name="Text Box 8"/>
-          <p:cNvSpPr txBox="1">
-            <a:spLocks noChangeArrowheads="1"/>
-          </p:cNvSpPr>
-          <p:nvPr/>
-        </p:nvSpPr>
-        <p:spPr bwMode="auto">
-          <a:xfrm>
-            <a:off x="1" y="4280902"/>
-            <a:ext cx="5771528" cy="954107"/>
-          </a:xfrm>
-          <a:prstGeom prst="rect">
-            <a:avLst/>
-          </a:prstGeom>
-          <a:noFill/>
-          <a:ln>
-            <a:noFill/>
-          </a:ln>
-          <a:effectLst/>
-          <a:extLst>
-            <a:ext uri="{909E8E84-426E-40DD-AFC4-6F175D3DCCD1}">
-              <a14:hiddenFill xmlns:a14="http://schemas.microsoft.com/office/drawing/2010/main">
-                <a:solidFill>
-                  <a:schemeClr val="accent1"/>
-                </a:solidFill>
-              </a14:hiddenFill>
-            </a:ext>
-            <a:ext uri="{91240B29-F687-4F45-9708-019B960494DF}">
-              <a14:hiddenLine xmlns:a14="http://schemas.microsoft.com/office/drawing/2010/main" w="9525">
-                <a:solidFill>
-                  <a:schemeClr val="tx1"/>
-                </a:solidFill>
-                <a:miter lim="800000"/>
-                <a:headEnd/>
-                <a:tailEnd/>
-              </a14:hiddenLine>
-            </a:ext>
-            <a:ext uri="{AF507438-7753-43E0-B8FC-AC1667EBCBE1}">
-              <a14:hiddenEffects xmlns:a14="http://schemas.microsoft.com/office/drawing/2010/main">
-                <a:effectLst>
-                  <a:outerShdw dist="35921" dir="2700000" algn="ctr" rotWithShape="0">
-                    <a:schemeClr val="bg2"/>
-                  </a:outerShdw>
-                </a:effectLst>
-              </a14:hiddenEffects>
-            </a:ext>
-          </a:extLst>
-        </p:spPr>
-        <p:txBody>
-          <a:bodyPr wrap="square">
-            <a:spAutoFit/>
-          </a:bodyPr>
-          <a:lstStyle/>
-          <a:p>
-            <a:pPr algn="r">
-              <a:spcBef>
-                <a:spcPct val="50000"/>
-              </a:spcBef>
-            </a:pPr>
-            <a:r>
-              <a:rPr lang="en-US" altLang="en-US" sz="5600" dirty="0">
-                <a:solidFill>
-                  <a:schemeClr val="accent1">
-                    <a:lumMod val="50000"/>
-                  </a:schemeClr>
-                </a:solidFill>
-                <a:latin typeface="Microsoft JhengHei" panose="020B0604030504040204" pitchFamily="34" charset="-120"/>
-                <a:ea typeface="Microsoft JhengHei" panose="020B0604030504040204" pitchFamily="34" charset="-120"/>
-              </a:rPr>
-              <a:t>Chinese Book</a:t>
-            </a:r>
-          </a:p>
-        </p:txBody>
-      </p:sp>
-      <p:sp>
-        <p:nvSpPr>
-          <p:cNvPr id="344073" name="Text Box 9"/>
-          <p:cNvSpPr txBox="1">
-            <a:spLocks noChangeArrowheads="1"/>
-          </p:cNvSpPr>
-          <p:nvPr/>
-        </p:nvSpPr>
-        <p:spPr bwMode="auto">
-          <a:xfrm>
-            <a:off x="5952253" y="3734926"/>
-            <a:ext cx="6239747" cy="2246769"/>
-          </a:xfrm>
-          <a:prstGeom prst="rect">
-            <a:avLst/>
-          </a:prstGeom>
-          <a:noFill/>
-          <a:ln>
-            <a:noFill/>
-          </a:ln>
-          <a:effectLst/>
-          <a:extLst>
-            <a:ext uri="{909E8E84-426E-40DD-AFC4-6F175D3DCCD1}">
-              <a14:hiddenFill xmlns:a14="http://schemas.microsoft.com/office/drawing/2010/main">
-                <a:solidFill>
-                  <a:schemeClr val="accent1"/>
-                </a:solidFill>
-              </a14:hiddenFill>
-            </a:ext>
-            <a:ext uri="{91240B29-F687-4F45-9708-019B960494DF}">
-              <a14:hiddenLine xmlns:a14="http://schemas.microsoft.com/office/drawing/2010/main" w="9525">
-                <a:solidFill>
-                  <a:schemeClr val="tx1"/>
-                </a:solidFill>
-                <a:miter lim="800000"/>
-                <a:headEnd/>
-                <a:tailEnd/>
-              </a14:hiddenLine>
-            </a:ext>
-            <a:ext uri="{AF507438-7753-43E0-B8FC-AC1667EBCBE1}">
-              <a14:hiddenEffects xmlns:a14="http://schemas.microsoft.com/office/drawing/2010/main">
-                <a:effectLst>
-                  <a:outerShdw dist="35921" dir="2700000" algn="ctr" rotWithShape="0">
-                    <a:schemeClr val="bg2"/>
-                  </a:outerShdw>
-                </a:effectLst>
-              </a14:hiddenEffects>
-            </a:ext>
-          </a:extLst>
-        </p:spPr>
-        <p:txBody>
-          <a:bodyPr wrap="square" lIns="0" rIns="0">
-            <a:spAutoFit/>
-          </a:bodyPr>
-          <a:lstStyle/>
-          <a:p>
-            <a:pPr>
-              <a:spcBef>
-                <a:spcPct val="50000"/>
-              </a:spcBef>
-            </a:pPr>
-            <a:r>
-              <a:rPr lang="en-US" altLang="zh-CN" sz="7000" dirty="0">
-                <a:latin typeface="Century Gothic" panose="020B0502020202020204" pitchFamily="34" charset="0"/>
-                <a:ea typeface="宋体" panose="02010600030101010101" pitchFamily="2" charset="-122"/>
-              </a:rPr>
-              <a:t>Chapter &amp; Verse</a:t>
+              <a:t>Hymn No.</a:t>
             </a:r>
           </a:p>
         </p:txBody>
@@ -6003,6 +6089,715 @@
     </p:spTree>
     <p:extLst>
       <p:ext uri="{BB962C8B-B14F-4D97-AF65-F5344CB8AC3E}">
+        <p14:creationId xmlns:p14="http://schemas.microsoft.com/office/powerpoint/2010/main" val="4174124207"/>
+      </p:ext>
+    </p:extLst>
+  </p:cSld>
+  <p:clrMapOvr>
+    <a:masterClrMapping/>
+  </p:clrMapOvr>
+</p:sld>
+</file>
+
+<file path=ppt/slides/slide4.xml><?xml version="1.0" encoding="utf-8"?>
+<p:sld xmlns:a="http://schemas.openxmlformats.org/drawingml/2006/main" xmlns:r="http://schemas.openxmlformats.org/officeDocument/2006/relationships" xmlns:p="http://schemas.openxmlformats.org/presentationml/2006/main">
+  <p:cSld>
+    <p:spTree>
+      <p:nvGrpSpPr>
+        <p:cNvPr id="1" name=""/>
+        <p:cNvGrpSpPr/>
+        <p:nvPr/>
+      </p:nvGrpSpPr>
+      <p:grpSpPr>
+        <a:xfrm>
+          <a:off x="0" y="0"/>
+          <a:ext cx="0" cy="0"/>
+          <a:chOff x="0" y="0"/>
+          <a:chExt cx="0" cy="0"/>
+        </a:xfrm>
+      </p:grpSpPr>
+      <p:sp>
+        <p:nvSpPr>
+          <p:cNvPr id="4" name="Text Box 2">
+            <a:extLst>
+              <a:ext uri="{FF2B5EF4-FFF2-40B4-BE49-F238E27FC236}">
+                <a16:creationId xmlns:a16="http://schemas.microsoft.com/office/drawing/2014/main" id="{21384A1C-6723-8919-8628-8B11E6CBD507}"/>
+              </a:ext>
+            </a:extLst>
+          </p:cNvPr>
+          <p:cNvSpPr txBox="1">
+            <a:spLocks noChangeArrowheads="1"/>
+          </p:cNvSpPr>
+          <p:nvPr/>
+        </p:nvSpPr>
+        <p:spPr bwMode="auto">
+          <a:xfrm>
+            <a:off x="0" y="498376"/>
+            <a:ext cx="12192000" cy="830997"/>
+          </a:xfrm>
+          <a:prstGeom prst="rect">
+            <a:avLst/>
+          </a:prstGeom>
+          <a:noFill/>
+          <a:ln>
+            <a:noFill/>
+          </a:ln>
+          <a:effectLst/>
+          <a:extLst>
+            <a:ext uri="{909E8E84-426E-40DD-AFC4-6F175D3DCCD1}">
+              <a14:hiddenFill xmlns:a14="http://schemas.microsoft.com/office/drawing/2010/main">
+                <a:solidFill>
+                  <a:schemeClr val="accent1"/>
+                </a:solidFill>
+              </a14:hiddenFill>
+            </a:ext>
+            <a:ext uri="{91240B29-F687-4F45-9708-019B960494DF}">
+              <a14:hiddenLine xmlns:a14="http://schemas.microsoft.com/office/drawing/2010/main" w="9525">
+                <a:solidFill>
+                  <a:schemeClr val="tx1"/>
+                </a:solidFill>
+                <a:miter lim="800000"/>
+                <a:headEnd/>
+                <a:tailEnd/>
+              </a14:hiddenLine>
+            </a:ext>
+            <a:ext uri="{AF507438-7753-43E0-B8FC-AC1667EBCBE1}">
+              <a14:hiddenEffects xmlns:a14="http://schemas.microsoft.com/office/drawing/2010/main">
+                <a:effectLst>
+                  <a:outerShdw dist="35921" dir="2700000" algn="ctr" rotWithShape="0">
+                    <a:schemeClr val="bg2"/>
+                  </a:outerShdw>
+                </a:effectLst>
+              </a14:hiddenEffects>
+            </a:ext>
+          </a:extLst>
+        </p:spPr>
+        <p:txBody>
+          <a:bodyPr wrap="square">
+            <a:spAutoFit/>
+          </a:bodyPr>
+          <a:lstStyle/>
+          <a:p>
+            <a:pPr algn="ctr">
+              <a:spcBef>
+                <a:spcPct val="50000"/>
+              </a:spcBef>
+            </a:pPr>
+            <a:r>
+              <a:rPr lang="en-US" altLang="zh-CN" sz="4800" b="1" dirty="0">
+                <a:latin typeface="Segoe UI" panose="020B0502040204020203" pitchFamily="34" charset="0"/>
+                <a:ea typeface="宋体" panose="02010600030101010101" pitchFamily="2" charset="-122"/>
+                <a:cs typeface="Segoe UI" panose="020B0502040204020203" pitchFamily="34" charset="0"/>
+              </a:rPr>
+              <a:t>English</a:t>
+            </a:r>
+          </a:p>
+        </p:txBody>
+      </p:sp>
+      <p:sp>
+        <p:nvSpPr>
+          <p:cNvPr id="344067" name="Text Box 3"/>
+          <p:cNvSpPr txBox="1">
+            <a:spLocks noChangeArrowheads="1"/>
+          </p:cNvSpPr>
+          <p:nvPr/>
+        </p:nvSpPr>
+        <p:spPr bwMode="auto">
+          <a:xfrm>
+            <a:off x="0" y="1486421"/>
+            <a:ext cx="12192000" cy="830997"/>
+          </a:xfrm>
+          <a:prstGeom prst="rect">
+            <a:avLst/>
+          </a:prstGeom>
+          <a:noFill/>
+          <a:ln>
+            <a:noFill/>
+          </a:ln>
+          <a:effectLst/>
+          <a:extLst>
+            <a:ext uri="{909E8E84-426E-40DD-AFC4-6F175D3DCCD1}">
+              <a14:hiddenFill xmlns:a14="http://schemas.microsoft.com/office/drawing/2010/main">
+                <a:solidFill>
+                  <a:schemeClr val="accent1"/>
+                </a:solidFill>
+              </a14:hiddenFill>
+            </a:ext>
+            <a:ext uri="{91240B29-F687-4F45-9708-019B960494DF}">
+              <a14:hiddenLine xmlns:a14="http://schemas.microsoft.com/office/drawing/2010/main" w="9525">
+                <a:solidFill>
+                  <a:schemeClr val="tx1"/>
+                </a:solidFill>
+                <a:miter lim="800000"/>
+                <a:headEnd/>
+                <a:tailEnd/>
+              </a14:hiddenLine>
+            </a:ext>
+            <a:ext uri="{AF507438-7753-43E0-B8FC-AC1667EBCBE1}">
+              <a14:hiddenEffects xmlns:a14="http://schemas.microsoft.com/office/drawing/2010/main">
+                <a:effectLst>
+                  <a:outerShdw dist="35921" dir="2700000" algn="ctr" rotWithShape="0">
+                    <a:schemeClr val="bg2"/>
+                  </a:outerShdw>
+                </a:effectLst>
+              </a14:hiddenEffects>
+            </a:ext>
+          </a:extLst>
+        </p:spPr>
+        <p:txBody>
+          <a:bodyPr wrap="square">
+            <a:spAutoFit/>
+          </a:bodyPr>
+          <a:lstStyle/>
+          <a:p>
+            <a:pPr algn="ctr">
+              <a:spcBef>
+                <a:spcPct val="50000"/>
+              </a:spcBef>
+            </a:pPr>
+            <a:r>
+              <a:rPr lang="en-US" altLang="zh-CN" sz="4800" b="1" dirty="0">
+                <a:solidFill>
+                  <a:schemeClr val="accent1">
+                    <a:lumMod val="50000"/>
+                  </a:schemeClr>
+                </a:solidFill>
+                <a:latin typeface="金梅新中楷全字體" panose="02010509060101010101" pitchFamily="49" charset="-120"/>
+                <a:ea typeface="金梅新中楷全字體" panose="02010509060101010101" pitchFamily="49" charset="-120"/>
+              </a:rPr>
+              <a:t>Chinese</a:t>
+            </a:r>
+          </a:p>
+        </p:txBody>
+      </p:sp>
+      <p:sp>
+        <p:nvSpPr>
+          <p:cNvPr id="344070" name="Text Box 6"/>
+          <p:cNvSpPr txBox="1">
+            <a:spLocks noChangeArrowheads="1"/>
+          </p:cNvSpPr>
+          <p:nvPr/>
+        </p:nvSpPr>
+        <p:spPr bwMode="auto">
+          <a:xfrm>
+            <a:off x="252966" y="2474466"/>
+            <a:ext cx="11685790" cy="3402807"/>
+          </a:xfrm>
+          <a:prstGeom prst="roundRect">
+            <a:avLst>
+              <a:gd name="adj" fmla="val 2956"/>
+            </a:avLst>
+          </a:prstGeom>
+          <a:noFill/>
+          <a:ln w="57150">
+            <a:noFill/>
+          </a:ln>
+          <a:effectLst/>
+        </p:spPr>
+        <p:txBody>
+          <a:bodyPr wrap="square">
+            <a:noAutofit/>
+          </a:bodyPr>
+          <a:lstStyle/>
+          <a:p>
+            <a:pPr eaLnBrk="1" hangingPunct="1">
+              <a:spcBef>
+                <a:spcPct val="50000"/>
+              </a:spcBef>
+              <a:buFontTx/>
+              <a:buNone/>
+            </a:pPr>
+            <a:r>
+              <a:rPr lang="en-GB" altLang="en-US" sz="3200" b="1" dirty="0">
+                <a:latin typeface="Century Gothic" panose="020B0502020202020204" pitchFamily="34" charset="0"/>
+              </a:rPr>
+              <a:t>BIBLE VERSE </a:t>
+            </a:r>
+            <a:r>
+              <a:rPr lang="zh-TW" altLang="en-US" sz="3200" b="1" dirty="0">
+                <a:latin typeface="Microsoft JhengHei" panose="020B0604030504040204" pitchFamily="34" charset="-120"/>
+                <a:ea typeface="Microsoft JhengHei" panose="020B0604030504040204" pitchFamily="34" charset="-120"/>
+              </a:rPr>
+              <a:t>經文</a:t>
+            </a:r>
+            <a:endParaRPr lang="en-US" altLang="en-US" sz="3200" b="1" dirty="0">
+              <a:latin typeface="Microsoft JhengHei" panose="020B0604030504040204" pitchFamily="34" charset="-120"/>
+              <a:ea typeface="Microsoft JhengHei" panose="020B0604030504040204" pitchFamily="34" charset="-120"/>
+            </a:endParaRPr>
+          </a:p>
+        </p:txBody>
+      </p:sp>
+      <p:sp>
+        <p:nvSpPr>
+          <p:cNvPr id="344071" name="Text Box 7"/>
+          <p:cNvSpPr txBox="1">
+            <a:spLocks noChangeArrowheads="1"/>
+          </p:cNvSpPr>
+          <p:nvPr/>
+        </p:nvSpPr>
+        <p:spPr bwMode="auto">
+          <a:xfrm>
+            <a:off x="0" y="3344798"/>
+            <a:ext cx="5771528" cy="954107"/>
+          </a:xfrm>
+          <a:prstGeom prst="rect">
+            <a:avLst/>
+          </a:prstGeom>
+          <a:noFill/>
+          <a:ln>
+            <a:noFill/>
+          </a:ln>
+          <a:effectLst/>
+          <a:extLst>
+            <a:ext uri="{909E8E84-426E-40DD-AFC4-6F175D3DCCD1}">
+              <a14:hiddenFill xmlns:a14="http://schemas.microsoft.com/office/drawing/2010/main">
+                <a:solidFill>
+                  <a:schemeClr val="accent1"/>
+                </a:solidFill>
+              </a14:hiddenFill>
+            </a:ext>
+            <a:ext uri="{91240B29-F687-4F45-9708-019B960494DF}">
+              <a14:hiddenLine xmlns:a14="http://schemas.microsoft.com/office/drawing/2010/main" w="9525">
+                <a:solidFill>
+                  <a:schemeClr val="tx1"/>
+                </a:solidFill>
+                <a:miter lim="800000"/>
+                <a:headEnd/>
+                <a:tailEnd/>
+              </a14:hiddenLine>
+            </a:ext>
+            <a:ext uri="{AF507438-7753-43E0-B8FC-AC1667EBCBE1}">
+              <a14:hiddenEffects xmlns:a14="http://schemas.microsoft.com/office/drawing/2010/main">
+                <a:effectLst>
+                  <a:outerShdw dist="35921" dir="2700000" algn="ctr" rotWithShape="0">
+                    <a:schemeClr val="bg2"/>
+                  </a:outerShdw>
+                </a:effectLst>
+              </a14:hiddenEffects>
+            </a:ext>
+          </a:extLst>
+        </p:spPr>
+        <p:txBody>
+          <a:bodyPr wrap="square">
+            <a:spAutoFit/>
+          </a:bodyPr>
+          <a:lstStyle/>
+          <a:p>
+            <a:pPr algn="r">
+              <a:spcBef>
+                <a:spcPct val="50000"/>
+              </a:spcBef>
+            </a:pPr>
+            <a:r>
+              <a:rPr lang="en-US" altLang="en-US" sz="5600" dirty="0">
+                <a:latin typeface="Century Gothic" panose="020B0502020202020204" pitchFamily="34" charset="0"/>
+              </a:rPr>
+              <a:t>English Book</a:t>
+            </a:r>
+          </a:p>
+        </p:txBody>
+      </p:sp>
+      <p:sp>
+        <p:nvSpPr>
+          <p:cNvPr id="344072" name="Text Box 8"/>
+          <p:cNvSpPr txBox="1">
+            <a:spLocks noChangeArrowheads="1"/>
+          </p:cNvSpPr>
+          <p:nvPr/>
+        </p:nvSpPr>
+        <p:spPr bwMode="auto">
+          <a:xfrm>
+            <a:off x="1" y="4280902"/>
+            <a:ext cx="5771528" cy="954107"/>
+          </a:xfrm>
+          <a:prstGeom prst="rect">
+            <a:avLst/>
+          </a:prstGeom>
+          <a:noFill/>
+          <a:ln>
+            <a:noFill/>
+          </a:ln>
+          <a:effectLst/>
+          <a:extLst>
+            <a:ext uri="{909E8E84-426E-40DD-AFC4-6F175D3DCCD1}">
+              <a14:hiddenFill xmlns:a14="http://schemas.microsoft.com/office/drawing/2010/main">
+                <a:solidFill>
+                  <a:schemeClr val="accent1"/>
+                </a:solidFill>
+              </a14:hiddenFill>
+            </a:ext>
+            <a:ext uri="{91240B29-F687-4F45-9708-019B960494DF}">
+              <a14:hiddenLine xmlns:a14="http://schemas.microsoft.com/office/drawing/2010/main" w="9525">
+                <a:solidFill>
+                  <a:schemeClr val="tx1"/>
+                </a:solidFill>
+                <a:miter lim="800000"/>
+                <a:headEnd/>
+                <a:tailEnd/>
+              </a14:hiddenLine>
+            </a:ext>
+            <a:ext uri="{AF507438-7753-43E0-B8FC-AC1667EBCBE1}">
+              <a14:hiddenEffects xmlns:a14="http://schemas.microsoft.com/office/drawing/2010/main">
+                <a:effectLst>
+                  <a:outerShdw dist="35921" dir="2700000" algn="ctr" rotWithShape="0">
+                    <a:schemeClr val="bg2"/>
+                  </a:outerShdw>
+                </a:effectLst>
+              </a14:hiddenEffects>
+            </a:ext>
+          </a:extLst>
+        </p:spPr>
+        <p:txBody>
+          <a:bodyPr wrap="square">
+            <a:spAutoFit/>
+          </a:bodyPr>
+          <a:lstStyle/>
+          <a:p>
+            <a:pPr algn="r">
+              <a:spcBef>
+                <a:spcPct val="50000"/>
+              </a:spcBef>
+            </a:pPr>
+            <a:r>
+              <a:rPr lang="en-US" altLang="en-US" sz="5600" dirty="0">
+                <a:solidFill>
+                  <a:schemeClr val="accent1">
+                    <a:lumMod val="50000"/>
+                  </a:schemeClr>
+                </a:solidFill>
+                <a:latin typeface="Microsoft JhengHei" panose="020B0604030504040204" pitchFamily="34" charset="-120"/>
+                <a:ea typeface="Microsoft JhengHei" panose="020B0604030504040204" pitchFamily="34" charset="-120"/>
+              </a:rPr>
+              <a:t>Chinese Book</a:t>
+            </a:r>
+          </a:p>
+        </p:txBody>
+      </p:sp>
+      <p:sp>
+        <p:nvSpPr>
+          <p:cNvPr id="344073" name="Text Box 9"/>
+          <p:cNvSpPr txBox="1">
+            <a:spLocks noChangeArrowheads="1"/>
+          </p:cNvSpPr>
+          <p:nvPr/>
+        </p:nvSpPr>
+        <p:spPr bwMode="auto">
+          <a:xfrm>
+            <a:off x="5952252" y="3734926"/>
+            <a:ext cx="6239747" cy="1015663"/>
+          </a:xfrm>
+          <a:prstGeom prst="rect">
+            <a:avLst/>
+          </a:prstGeom>
+          <a:noFill/>
+          <a:ln>
+            <a:noFill/>
+          </a:ln>
+          <a:effectLst/>
+          <a:extLst>
+            <a:ext uri="{909E8E84-426E-40DD-AFC4-6F175D3DCCD1}">
+              <a14:hiddenFill xmlns:a14="http://schemas.microsoft.com/office/drawing/2010/main">
+                <a:solidFill>
+                  <a:schemeClr val="accent1"/>
+                </a:solidFill>
+              </a14:hiddenFill>
+            </a:ext>
+            <a:ext uri="{91240B29-F687-4F45-9708-019B960494DF}">
+              <a14:hiddenLine xmlns:a14="http://schemas.microsoft.com/office/drawing/2010/main" w="9525">
+                <a:solidFill>
+                  <a:schemeClr val="tx1"/>
+                </a:solidFill>
+                <a:miter lim="800000"/>
+                <a:headEnd/>
+                <a:tailEnd/>
+              </a14:hiddenLine>
+            </a:ext>
+            <a:ext uri="{AF507438-7753-43E0-B8FC-AC1667EBCBE1}">
+              <a14:hiddenEffects xmlns:a14="http://schemas.microsoft.com/office/drawing/2010/main">
+                <a:effectLst>
+                  <a:outerShdw dist="35921" dir="2700000" algn="ctr" rotWithShape="0">
+                    <a:schemeClr val="bg2"/>
+                  </a:outerShdw>
+                </a:effectLst>
+              </a14:hiddenEffects>
+            </a:ext>
+          </a:extLst>
+        </p:spPr>
+        <p:txBody>
+          <a:bodyPr wrap="square" lIns="0" rIns="0">
+            <a:noAutofit/>
+          </a:bodyPr>
+          <a:lstStyle/>
+          <a:p>
+            <a:pPr>
+              <a:spcBef>
+                <a:spcPct val="50000"/>
+              </a:spcBef>
+            </a:pPr>
+            <a:r>
+              <a:rPr lang="en-US" altLang="zh-CN" sz="6600" dirty="0">
+                <a:latin typeface="Century Gothic" panose="020B0502020202020204" pitchFamily="34" charset="0"/>
+                <a:ea typeface="宋体" panose="02010600030101010101" pitchFamily="2" charset="-122"/>
+              </a:rPr>
+              <a:t>Chapter &amp; Verse</a:t>
+            </a:r>
+          </a:p>
+        </p:txBody>
+      </p:sp>
+      <p:sp>
+        <p:nvSpPr>
+          <p:cNvPr id="15" name="Text Box 10">
+            <a:extLst>
+              <a:ext uri="{FF2B5EF4-FFF2-40B4-BE49-F238E27FC236}">
+                <a16:creationId xmlns:a16="http://schemas.microsoft.com/office/drawing/2014/main" id="{90246C2A-6C5E-406F-8738-05ACA671C742}"/>
+              </a:ext>
+            </a:extLst>
+          </p:cNvPr>
+          <p:cNvSpPr txBox="1">
+            <a:spLocks noChangeArrowheads="1"/>
+          </p:cNvSpPr>
+          <p:nvPr/>
+        </p:nvSpPr>
+        <p:spPr bwMode="auto">
+          <a:xfrm>
+            <a:off x="252966" y="5877272"/>
+            <a:ext cx="4330866" cy="338554"/>
+          </a:xfrm>
+          <a:prstGeom prst="rect">
+            <a:avLst/>
+          </a:prstGeom>
+          <a:noFill/>
+          <a:ln>
+            <a:noFill/>
+          </a:ln>
+          <a:effectLst/>
+          <a:extLst>
+            <a:ext uri="{909E8E84-426E-40DD-AFC4-6F175D3DCCD1}">
+              <a14:hiddenFill xmlns:a14="http://schemas.microsoft.com/office/drawing/2010/main">
+                <a:solidFill>
+                  <a:schemeClr val="accent1"/>
+                </a:solidFill>
+              </a14:hiddenFill>
+            </a:ext>
+            <a:ext uri="{91240B29-F687-4F45-9708-019B960494DF}">
+              <a14:hiddenLine xmlns:a14="http://schemas.microsoft.com/office/drawing/2010/main" w="9525">
+                <a:solidFill>
+                  <a:schemeClr val="tx1"/>
+                </a:solidFill>
+                <a:miter lim="800000"/>
+                <a:headEnd/>
+                <a:tailEnd/>
+              </a14:hiddenLine>
+            </a:ext>
+            <a:ext uri="{AF507438-7753-43E0-B8FC-AC1667EBCBE1}">
+              <a14:hiddenEffects xmlns:a14="http://schemas.microsoft.com/office/drawing/2010/main">
+                <a:effectLst>
+                  <a:outerShdw dist="35921" dir="2700000" algn="ctr" rotWithShape="0">
+                    <a:schemeClr val="bg2"/>
+                  </a:outerShdw>
+                </a:effectLst>
+              </a14:hiddenEffects>
+            </a:ext>
+          </a:extLst>
+        </p:spPr>
+        <p:txBody>
+          <a:bodyPr wrap="square">
+            <a:spAutoFit/>
+          </a:bodyPr>
+          <a:lstStyle/>
+          <a:p>
+            <a:pPr>
+              <a:spcBef>
+                <a:spcPct val="50000"/>
+              </a:spcBef>
+            </a:pPr>
+            <a:r>
+              <a:rPr lang="en-US" altLang="zh-CN" sz="1600" dirty="0">
+                <a:latin typeface="Century Gothic" panose="020B0502020202020204" pitchFamily="34" charset="0"/>
+                <a:ea typeface="宋体" panose="02010600030101010101" pitchFamily="2" charset="-122"/>
+              </a:rPr>
+              <a:t>Service Type</a:t>
+            </a:r>
+          </a:p>
+        </p:txBody>
+      </p:sp>
+      <p:grpSp>
+        <p:nvGrpSpPr>
+          <p:cNvPr id="22" name="Group 21">
+            <a:extLst>
+              <a:ext uri="{FF2B5EF4-FFF2-40B4-BE49-F238E27FC236}">
+                <a16:creationId xmlns:a16="http://schemas.microsoft.com/office/drawing/2014/main" id="{DCC0CD01-B0C7-17AF-454C-CAB88B5C80D6}"/>
+              </a:ext>
+            </a:extLst>
+          </p:cNvPr>
+          <p:cNvGrpSpPr/>
+          <p:nvPr/>
+        </p:nvGrpSpPr>
+        <p:grpSpPr>
+          <a:xfrm>
+            <a:off x="4943872" y="6249605"/>
+            <a:ext cx="7030907" cy="408623"/>
+            <a:chOff x="4943872" y="6249605"/>
+            <a:chExt cx="7030907" cy="408623"/>
+          </a:xfrm>
+        </p:grpSpPr>
+        <p:sp>
+          <p:nvSpPr>
+            <p:cNvPr id="23" name="TextBox 22">
+              <a:extLst>
+                <a:ext uri="{FF2B5EF4-FFF2-40B4-BE49-F238E27FC236}">
+                  <a16:creationId xmlns:a16="http://schemas.microsoft.com/office/drawing/2014/main" id="{05BB4C74-D38F-A3C1-A90A-E680D921BA2A}"/>
+                </a:ext>
+              </a:extLst>
+            </p:cNvPr>
+            <p:cNvSpPr txBox="1"/>
+            <p:nvPr/>
+          </p:nvSpPr>
+          <p:spPr>
+            <a:xfrm>
+              <a:off x="4943872" y="6249605"/>
+              <a:ext cx="7030907" cy="408623"/>
+            </a:xfrm>
+            <a:prstGeom prst="roundRect">
+              <a:avLst>
+                <a:gd name="adj" fmla="val 20010"/>
+              </a:avLst>
+            </a:prstGeom>
+            <a:noFill/>
+            <a:ln w="19050">
+              <a:solidFill>
+                <a:srgbClr val="FF0000"/>
+              </a:solidFill>
+            </a:ln>
+          </p:spPr>
+          <p:txBody>
+            <a:bodyPr wrap="square" rtlCol="0" anchor="ctr">
+              <a:spAutoFit/>
+            </a:bodyPr>
+            <a:lstStyle/>
+            <a:p>
+              <a:r>
+                <a:rPr lang="en-GB" dirty="0">
+                  <a:latin typeface="Segoe UI Semibold" panose="020B0702040204020203" pitchFamily="34" charset="0"/>
+                  <a:cs typeface="Segoe UI Semibold" panose="020B0702040204020203" pitchFamily="34" charset="0"/>
+                </a:rPr>
+                <a:t>Please Turn Off/Silence Your Devices </a:t>
+              </a:r>
+              <a:r>
+                <a:rPr lang="zh-TW" altLang="en-US" b="1" dirty="0">
+                  <a:latin typeface="Microsoft JhengHei" panose="020B0604030504040204" pitchFamily="34" charset="-120"/>
+                  <a:ea typeface="Microsoft JhengHei" panose="020B0604030504040204" pitchFamily="34" charset="-120"/>
+                </a:rPr>
+                <a:t>請靜音或關閉所有電子設備</a:t>
+              </a:r>
+              <a:endParaRPr lang="ja-JP" altLang="en-US" b="1" dirty="0">
+                <a:latin typeface="Microsoft JhengHei" panose="020B0604030504040204" pitchFamily="34" charset="-120"/>
+                <a:ea typeface="Microsoft JhengHei" panose="020B0604030504040204" pitchFamily="34" charset="-120"/>
+              </a:endParaRPr>
+            </a:p>
+          </p:txBody>
+        </p:sp>
+        <p:pic>
+          <p:nvPicPr>
+            <p:cNvPr id="24" name="Picture 23" descr="Shape&#10;&#10;Description automatically generated with low confidence">
+              <a:extLst>
+                <a:ext uri="{FF2B5EF4-FFF2-40B4-BE49-F238E27FC236}">
+                  <a16:creationId xmlns:a16="http://schemas.microsoft.com/office/drawing/2014/main" id="{10B15791-20DE-9334-AE79-E03696114A61}"/>
+                </a:ext>
+              </a:extLst>
+            </p:cNvPr>
+            <p:cNvPicPr>
+              <a:picLocks noChangeAspect="1"/>
+            </p:cNvPicPr>
+            <p:nvPr/>
+          </p:nvPicPr>
+          <p:blipFill>
+            <a:blip r:embed="rId3" cstate="print">
+              <a:extLst>
+                <a:ext uri="{BEBA8EAE-BF5A-486C-A8C5-ECC9F3942E4B}">
+                  <a14:imgProps xmlns:a14="http://schemas.microsoft.com/office/drawing/2010/main">
+                    <a14:imgLayer r:embed="rId4">
+                      <a14:imgEffect>
+                        <a14:colorTemperature colorTemp="11500"/>
+                      </a14:imgEffect>
+                      <a14:imgEffect>
+                        <a14:saturation sat="400000"/>
+                      </a14:imgEffect>
+                      <a14:imgEffect>
+                        <a14:brightnessContrast bright="-40000" contrast="-40000"/>
+                      </a14:imgEffect>
+                    </a14:imgLayer>
+                  </a14:imgProps>
+                </a:ext>
+                <a:ext uri="{28A0092B-C50C-407E-A947-70E740481C1C}">
+                  <a14:useLocalDpi xmlns:a14="http://schemas.microsoft.com/office/drawing/2010/main" val="0"/>
+                </a:ext>
+              </a:extLst>
+            </a:blip>
+            <a:stretch>
+              <a:fillRect/>
+            </a:stretch>
+          </p:blipFill>
+          <p:spPr>
+            <a:xfrm>
+              <a:off x="11658489" y="6309320"/>
+              <a:ext cx="280267" cy="280267"/>
+            </a:xfrm>
+            <a:prstGeom prst="rect">
+              <a:avLst/>
+            </a:prstGeom>
+          </p:spPr>
+        </p:pic>
+      </p:grpSp>
+      <p:pic>
+        <p:nvPicPr>
+          <p:cNvPr id="3" name="Picture 2" descr="Logo&#10;&#10;Description automatically generated with medium confidence">
+            <a:extLst>
+              <a:ext uri="{FF2B5EF4-FFF2-40B4-BE49-F238E27FC236}">
+                <a16:creationId xmlns:a16="http://schemas.microsoft.com/office/drawing/2014/main" id="{D9FAAAA7-28DF-9604-C947-11910295E41A}"/>
+              </a:ext>
+            </a:extLst>
+          </p:cNvPr>
+          <p:cNvPicPr>
+            <a:picLocks noChangeAspect="1"/>
+          </p:cNvPicPr>
+          <p:nvPr/>
+        </p:nvPicPr>
+        <p:blipFill>
+          <a:blip r:embed="rId5" cstate="print">
+            <a:biLevel thresh="75000"/>
+            <a:extLst>
+              <a:ext uri="{BEBA8EAE-BF5A-486C-A8C5-ECC9F3942E4B}">
+                <a14:imgProps xmlns:a14="http://schemas.microsoft.com/office/drawing/2010/main">
+                  <a14:imgLayer r:embed="rId6">
+                    <a14:imgEffect>
+                      <a14:brightnessContrast bright="-40000" contrast="-40000"/>
+                    </a14:imgEffect>
+                  </a14:imgLayer>
+                </a14:imgProps>
+              </a:ext>
+              <a:ext uri="{28A0092B-C50C-407E-A947-70E740481C1C}">
+                <a14:useLocalDpi xmlns:a14="http://schemas.microsoft.com/office/drawing/2010/main" val="0"/>
+              </a:ext>
+            </a:extLst>
+          </a:blip>
+          <a:stretch>
+            <a:fillRect/>
+          </a:stretch>
+        </p:blipFill>
+        <p:spPr>
+          <a:xfrm>
+            <a:off x="335359" y="6269250"/>
+            <a:ext cx="2664297" cy="344791"/>
+          </a:xfrm>
+          <a:prstGeom prst="rect">
+            <a:avLst/>
+          </a:prstGeom>
+        </p:spPr>
+      </p:pic>
+    </p:spTree>
+    <p:extLst>
+      <p:ext uri="{BB962C8B-B14F-4D97-AF65-F5344CB8AC3E}">
         <p14:creationId xmlns:p14="http://schemas.microsoft.com/office/powerpoint/2010/main" val="2369020613"/>
       </p:ext>
     </p:extLst>
@@ -6013,7 +6808,7 @@
 </p:sld>
 </file>
 
-<file path=ppt/slides/slide4.xml><?xml version="1.0" encoding="utf-8"?>
+<file path=ppt/slides/slide5.xml><?xml version="1.0" encoding="utf-8"?>
 <p:sld xmlns:a="http://schemas.openxmlformats.org/drawingml/2006/main" xmlns:r="http://schemas.openxmlformats.org/officeDocument/2006/relationships" xmlns:p="http://schemas.openxmlformats.org/presentationml/2006/main">
   <p:cSld>
     <p:spTree>
@@ -6378,7 +7173,7 @@
 </p:sld>
 </file>
 
-<file path=ppt/slides/slide5.xml><?xml version="1.0" encoding="utf-8"?>
+<file path=ppt/slides/slide6.xml><?xml version="1.0" encoding="utf-8"?>
 <p:sld xmlns:a="http://schemas.openxmlformats.org/drawingml/2006/main" xmlns:r="http://schemas.openxmlformats.org/officeDocument/2006/relationships" xmlns:p="http://schemas.openxmlformats.org/presentationml/2006/main">
   <p:cSld>
     <p:spTree>
@@ -6731,7 +7526,7 @@
 </p:sld>
 </file>
 
-<file path=ppt/slides/slide6.xml><?xml version="1.0" encoding="utf-8"?>
+<file path=ppt/slides/slide7.xml><?xml version="1.0" encoding="utf-8"?>
 <p:sld xmlns:a="http://schemas.openxmlformats.org/drawingml/2006/main" xmlns:r="http://schemas.openxmlformats.org/officeDocument/2006/relationships" xmlns:p="http://schemas.openxmlformats.org/presentationml/2006/main">
   <p:cSld>
     <p:spTree>
@@ -7095,7 +7890,7 @@
 </p:sld>
 </file>
 
-<file path=ppt/slides/slide7.xml><?xml version="1.0" encoding="utf-8"?>
+<file path=ppt/slides/slide8.xml><?xml version="1.0" encoding="utf-8"?>
 <p:sld xmlns:a="http://schemas.openxmlformats.org/drawingml/2006/main" xmlns:r="http://schemas.openxmlformats.org/officeDocument/2006/relationships" xmlns:p="http://schemas.openxmlformats.org/presentationml/2006/main">
   <p:cSld>
     <p:spTree>
@@ -7589,7 +8384,7 @@
 </p:sld>
 </file>
 
-<file path=ppt/slides/slide8.xml><?xml version="1.0" encoding="utf-8"?>
+<file path=ppt/slides/slide9.xml><?xml version="1.0" encoding="utf-8"?>
 <p:sld xmlns:a="http://schemas.openxmlformats.org/drawingml/2006/main" xmlns:r="http://schemas.openxmlformats.org/officeDocument/2006/relationships" xmlns:p="http://schemas.openxmlformats.org/presentationml/2006/main">
   <p:cSld>
     <p:spTree>
@@ -8275,283 +9070,6 @@
     <p:extLst>
       <p:ext uri="{BB962C8B-B14F-4D97-AF65-F5344CB8AC3E}">
         <p14:creationId xmlns:p14="http://schemas.microsoft.com/office/powerpoint/2010/main" val="2970436884"/>
-      </p:ext>
-    </p:extLst>
-  </p:cSld>
-  <p:clrMapOvr>
-    <a:masterClrMapping/>
-  </p:clrMapOvr>
-</p:sld>
-</file>
-
-<file path=ppt/slides/slide9.xml><?xml version="1.0" encoding="utf-8"?>
-<p:sld xmlns:a="http://schemas.openxmlformats.org/drawingml/2006/main" xmlns:r="http://schemas.openxmlformats.org/officeDocument/2006/relationships" xmlns:p="http://schemas.openxmlformats.org/presentationml/2006/main">
-  <p:cSld>
-    <p:spTree>
-      <p:nvGrpSpPr>
-        <p:cNvPr id="1" name=""/>
-        <p:cNvGrpSpPr/>
-        <p:nvPr/>
-      </p:nvGrpSpPr>
-      <p:grpSpPr>
-        <a:xfrm>
-          <a:off x="0" y="0"/>
-          <a:ext cx="0" cy="0"/>
-          <a:chOff x="0" y="0"/>
-          <a:chExt cx="0" cy="0"/>
-        </a:xfrm>
-      </p:grpSpPr>
-      <p:sp>
-        <p:nvSpPr>
-          <p:cNvPr id="9" name="TextBox 8">
-            <a:extLst>
-              <a:ext uri="{FF2B5EF4-FFF2-40B4-BE49-F238E27FC236}">
-                <a16:creationId xmlns:a16="http://schemas.microsoft.com/office/drawing/2014/main" id="{EB7FD2AF-7F03-5326-A748-9D97F0B7E43C}"/>
-              </a:ext>
-            </a:extLst>
-          </p:cNvPr>
-          <p:cNvSpPr txBox="1"/>
-          <p:nvPr/>
-        </p:nvSpPr>
-        <p:spPr>
-          <a:xfrm>
-            <a:off x="479376" y="637429"/>
-            <a:ext cx="11233247" cy="1446550"/>
-          </a:xfrm>
-          <a:prstGeom prst="rect">
-            <a:avLst/>
-          </a:prstGeom>
-          <a:noFill/>
-          <a:ln w="63500">
-            <a:noFill/>
-          </a:ln>
-        </p:spPr>
-        <p:txBody>
-          <a:bodyPr wrap="square" rtlCol="0">
-            <a:spAutoFit/>
-          </a:bodyPr>
-          <a:lstStyle/>
-          <a:p>
-            <a:pPr algn="ctr"/>
-            <a:r>
-              <a:rPr lang="en-GB" altLang="en-US" sz="4400" b="1" dirty="0">
-                <a:latin typeface="Segoe UI" panose="020B0502040204020203" pitchFamily="34" charset="0"/>
-                <a:cs typeface="Segoe UI" panose="020B0502040204020203" pitchFamily="34" charset="0"/>
-              </a:rPr>
-              <a:t>Please Turn Off/Silence Your Devices</a:t>
-            </a:r>
-            <a:endParaRPr lang="zh-TW" altLang="en-US" sz="4400" b="1" dirty="0">
-              <a:latin typeface="Microsoft JhengHei" panose="020B0604030504040204" pitchFamily="34" charset="-120"/>
-              <a:ea typeface="Microsoft JhengHei" panose="020B0604030504040204" pitchFamily="34" charset="-120"/>
-            </a:endParaRPr>
-          </a:p>
-          <a:p>
-            <a:pPr algn="ctr"/>
-            <a:r>
-              <a:rPr lang="zh-TW" altLang="en-US" sz="4400" b="1" dirty="0">
-                <a:latin typeface="Microsoft JhengHei" panose="020B0604030504040204" pitchFamily="34" charset="-120"/>
-                <a:ea typeface="Microsoft JhengHei" panose="020B0604030504040204" pitchFamily="34" charset="-120"/>
-              </a:rPr>
-              <a:t>請靜音或關閉所有電子設備</a:t>
-            </a:r>
-            <a:endParaRPr lang="en-GB" sz="4400" b="1" dirty="0">
-              <a:latin typeface="Microsoft JhengHei" panose="020B0604030504040204" pitchFamily="34" charset="-120"/>
-              <a:ea typeface="Microsoft JhengHei" panose="020B0604030504040204" pitchFamily="34" charset="-120"/>
-            </a:endParaRPr>
-          </a:p>
-        </p:txBody>
-      </p:sp>
-      <p:pic>
-        <p:nvPicPr>
-          <p:cNvPr id="5" name="Picture 4" descr="Shape&#10;&#10;Description automatically generated with low confidence">
-            <a:extLst>
-              <a:ext uri="{FF2B5EF4-FFF2-40B4-BE49-F238E27FC236}">
-                <a16:creationId xmlns:a16="http://schemas.microsoft.com/office/drawing/2014/main" id="{AC9BD3E1-856D-B518-3D09-AA2FCBC6B91A}"/>
-              </a:ext>
-            </a:extLst>
-          </p:cNvPr>
-          <p:cNvPicPr>
-            <a:picLocks noChangeAspect="1"/>
-          </p:cNvPicPr>
-          <p:nvPr/>
-        </p:nvPicPr>
-        <p:blipFill>
-          <a:blip r:embed="rId2" cstate="print">
-            <a:extLst>
-              <a:ext uri="{BEBA8EAE-BF5A-486C-A8C5-ECC9F3942E4B}">
-                <a14:imgProps xmlns:a14="http://schemas.microsoft.com/office/drawing/2010/main">
-                  <a14:imgLayer r:embed="rId3">
-                    <a14:imgEffect>
-                      <a14:colorTemperature colorTemp="11500"/>
-                    </a14:imgEffect>
-                    <a14:imgEffect>
-                      <a14:saturation sat="400000"/>
-                    </a14:imgEffect>
-                    <a14:imgEffect>
-                      <a14:brightnessContrast bright="-40000" contrast="-40000"/>
-                    </a14:imgEffect>
-                  </a14:imgLayer>
-                </a14:imgProps>
-              </a:ext>
-              <a:ext uri="{28A0092B-C50C-407E-A947-70E740481C1C}">
-                <a14:useLocalDpi xmlns:a14="http://schemas.microsoft.com/office/drawing/2010/main" val="0"/>
-              </a:ext>
-            </a:extLst>
-          </a:blip>
-          <a:stretch>
-            <a:fillRect/>
-          </a:stretch>
-        </p:blipFill>
-        <p:spPr>
-          <a:xfrm>
-            <a:off x="1710701" y="2869813"/>
-            <a:ext cx="2359386" cy="2359386"/>
-          </a:xfrm>
-          <a:prstGeom prst="rect">
-            <a:avLst/>
-          </a:prstGeom>
-        </p:spPr>
-      </p:pic>
-      <p:pic>
-        <p:nvPicPr>
-          <p:cNvPr id="3" name="Picture 2" descr="Shape&#10;&#10;Description automatically generated with low confidence">
-            <a:extLst>
-              <a:ext uri="{FF2B5EF4-FFF2-40B4-BE49-F238E27FC236}">
-                <a16:creationId xmlns:a16="http://schemas.microsoft.com/office/drawing/2014/main" id="{F2B8EEB5-A2A8-2246-92B8-D793C3FDC5FE}"/>
-              </a:ext>
-            </a:extLst>
-          </p:cNvPr>
-          <p:cNvPicPr>
-            <a:picLocks noChangeAspect="1"/>
-          </p:cNvPicPr>
-          <p:nvPr/>
-        </p:nvPicPr>
-        <p:blipFill>
-          <a:blip r:embed="rId4">
-            <a:extLst>
-              <a:ext uri="{BEBA8EAE-BF5A-486C-A8C5-ECC9F3942E4B}">
-                <a14:imgProps xmlns:a14="http://schemas.microsoft.com/office/drawing/2010/main">
-                  <a14:imgLayer r:embed="rId5">
-                    <a14:imgEffect>
-                      <a14:brightnessContrast bright="-40000" contrast="-40000"/>
-                    </a14:imgEffect>
-                  </a14:imgLayer>
-                </a14:imgProps>
-              </a:ext>
-              <a:ext uri="{28A0092B-C50C-407E-A947-70E740481C1C}">
-                <a14:useLocalDpi xmlns:a14="http://schemas.microsoft.com/office/drawing/2010/main" val="0"/>
-              </a:ext>
-            </a:extLst>
-          </a:blip>
-          <a:stretch>
-            <a:fillRect/>
-          </a:stretch>
-        </p:blipFill>
-        <p:spPr>
-          <a:xfrm>
-            <a:off x="5015880" y="2869814"/>
-            <a:ext cx="2359385" cy="2359385"/>
-          </a:xfrm>
-          <a:prstGeom prst="rect">
-            <a:avLst/>
-          </a:prstGeom>
-        </p:spPr>
-      </p:pic>
-      <p:pic>
-        <p:nvPicPr>
-          <p:cNvPr id="6" name="Picture 5" descr="Shape&#10;&#10;Description automatically generated with low confidence">
-            <a:extLst>
-              <a:ext uri="{FF2B5EF4-FFF2-40B4-BE49-F238E27FC236}">
-                <a16:creationId xmlns:a16="http://schemas.microsoft.com/office/drawing/2014/main" id="{E4E05851-7A29-58F2-A0E9-7AFC98E740B6}"/>
-              </a:ext>
-            </a:extLst>
-          </p:cNvPr>
-          <p:cNvPicPr>
-            <a:picLocks noChangeAspect="1"/>
-          </p:cNvPicPr>
-          <p:nvPr/>
-        </p:nvPicPr>
-        <p:blipFill>
-          <a:blip r:embed="rId6">
-            <a:extLst>
-              <a:ext uri="{BEBA8EAE-BF5A-486C-A8C5-ECC9F3942E4B}">
-                <a14:imgProps xmlns:a14="http://schemas.microsoft.com/office/drawing/2010/main">
-                  <a14:imgLayer r:embed="rId7">
-                    <a14:imgEffect>
-                      <a14:brightnessContrast bright="-40000" contrast="-40000"/>
-                    </a14:imgEffect>
-                  </a14:imgLayer>
-                </a14:imgProps>
-              </a:ext>
-              <a:ext uri="{28A0092B-C50C-407E-A947-70E740481C1C}">
-                <a14:useLocalDpi xmlns:a14="http://schemas.microsoft.com/office/drawing/2010/main" val="0"/>
-              </a:ext>
-            </a:extLst>
-          </a:blip>
-          <a:stretch>
-            <a:fillRect/>
-          </a:stretch>
-        </p:blipFill>
-        <p:spPr>
-          <a:xfrm>
-            <a:off x="8121914" y="2866900"/>
-            <a:ext cx="2359385" cy="2359385"/>
-          </a:xfrm>
-          <a:prstGeom prst="rect">
-            <a:avLst/>
-          </a:prstGeom>
-        </p:spPr>
-      </p:pic>
-      <p:pic>
-        <p:nvPicPr>
-          <p:cNvPr id="2" name="Picture 1" descr="Logo&#10;&#10;Description automatically generated with medium confidence">
-            <a:extLst>
-              <a:ext uri="{FF2B5EF4-FFF2-40B4-BE49-F238E27FC236}">
-                <a16:creationId xmlns:a16="http://schemas.microsoft.com/office/drawing/2014/main" id="{97EAE857-49D3-7B8C-B57E-A881B4864B2E}"/>
-              </a:ext>
-            </a:extLst>
-          </p:cNvPr>
-          <p:cNvPicPr>
-            <a:picLocks noChangeAspect="1"/>
-          </p:cNvPicPr>
-          <p:nvPr/>
-        </p:nvPicPr>
-        <p:blipFill>
-          <a:blip r:embed="rId8" cstate="print">
-            <a:biLevel thresh="75000"/>
-            <a:extLst>
-              <a:ext uri="{BEBA8EAE-BF5A-486C-A8C5-ECC9F3942E4B}">
-                <a14:imgProps xmlns:a14="http://schemas.microsoft.com/office/drawing/2010/main">
-                  <a14:imgLayer r:embed="rId9">
-                    <a14:imgEffect>
-                      <a14:brightnessContrast bright="-40000" contrast="-40000"/>
-                    </a14:imgEffect>
-                  </a14:imgLayer>
-                </a14:imgProps>
-              </a:ext>
-              <a:ext uri="{28A0092B-C50C-407E-A947-70E740481C1C}">
-                <a14:useLocalDpi xmlns:a14="http://schemas.microsoft.com/office/drawing/2010/main" val="0"/>
-              </a:ext>
-            </a:extLst>
-          </a:blip>
-          <a:stretch>
-            <a:fillRect/>
-          </a:stretch>
-        </p:blipFill>
-        <p:spPr>
-          <a:xfrm>
-            <a:off x="335359" y="6269250"/>
-            <a:ext cx="2664297" cy="344791"/>
-          </a:xfrm>
-          <a:prstGeom prst="rect">
-            <a:avLst/>
-          </a:prstGeom>
-        </p:spPr>
-      </p:pic>
-    </p:spTree>
-    <p:extLst>
-      <p:ext uri="{BB962C8B-B14F-4D97-AF65-F5344CB8AC3E}">
-        <p14:creationId xmlns:p14="http://schemas.microsoft.com/office/powerpoint/2010/main" val="1579287213"/>
       </p:ext>
     </p:extLst>
   </p:cSld>

</xml_diff>

<commit_message>
17/01/23 Muted audio from pressing enter
</commit_message>
<xml_diff>
--- a/TJCPowerPoint/Resources/ServiceWidescreen.pptx
+++ b/TJCPowerPoint/Resources/ServiceWidescreen.pptx
@@ -5094,7 +5094,7 @@
                 <a:cs typeface="Segoe UI" panose="020B0502040204020203" pitchFamily="34" charset="0"/>
               </a:rPr>
               <a:pPr algn="r"/>
-              <a:t>Sunday, January 15, 2023</a:t>
+              <a:t>Tuesday, January 17, 2023</a:t>
             </a:fld>
             <a:endParaRPr lang="en-US" altLang="en-US" sz="3600" b="1" dirty="0">
               <a:solidFill>
@@ -6370,19 +6370,22 @@
             </a:pPr>
             <a:r>
               <a:rPr lang="en-GB" altLang="en-US" sz="3200" b="1" dirty="0">
-                <a:latin typeface="Century Gothic" panose="020B0502020202020204" pitchFamily="34" charset="0"/>
+                <a:latin typeface="Segoe UI" panose="020B0502040204020203" pitchFamily="34" charset="0"/>
+                <a:cs typeface="Segoe UI" panose="020B0502040204020203" pitchFamily="34" charset="0"/>
               </a:rPr>
               <a:t>HYMNS </a:t>
             </a:r>
             <a:r>
               <a:rPr lang="zh-TW" altLang="en-US" sz="3200" b="1" dirty="0">
-                <a:latin typeface="Microsoft JhengHei" panose="020B0604030504040204" pitchFamily="34" charset="-120"/>
+                <a:latin typeface="Segoe UI" panose="020B0502040204020203" pitchFamily="34" charset="0"/>
                 <a:ea typeface="Microsoft JhengHei" panose="020B0604030504040204" pitchFamily="34" charset="-120"/>
+                <a:cs typeface="Segoe UI" panose="020B0502040204020203" pitchFamily="34" charset="0"/>
               </a:rPr>
               <a:t>詩</a:t>
             </a:r>
             <a:endParaRPr lang="en-US" altLang="en-US" sz="3200" b="1" dirty="0">
-              <a:latin typeface="Century Gothic" panose="020B0502020202020204" pitchFamily="34" charset="0"/>
+              <a:latin typeface="Segoe UI" panose="020B0502040204020203" pitchFamily="34" charset="0"/>
+              <a:cs typeface="Segoe UI" panose="020B0502040204020203" pitchFamily="34" charset="0"/>
             </a:endParaRPr>
           </a:p>
         </p:txBody>
@@ -6934,20 +6937,23 @@
             </a:pPr>
             <a:r>
               <a:rPr lang="en-GB" altLang="en-US" sz="3200" b="1" dirty="0">
-                <a:latin typeface="Century Gothic" panose="020B0502020202020204" pitchFamily="34" charset="0"/>
+                <a:latin typeface="Segoe UI" panose="020B0502040204020203" pitchFamily="34" charset="0"/>
+                <a:cs typeface="Segoe UI" panose="020B0502040204020203" pitchFamily="34" charset="0"/>
               </a:rPr>
               <a:t>BIBLE VERSE </a:t>
             </a:r>
             <a:r>
               <a:rPr lang="zh-TW" altLang="en-US" sz="3200" b="1" dirty="0">
-                <a:latin typeface="Microsoft JhengHei" panose="020B0604030504040204" pitchFamily="34" charset="-120"/>
+                <a:latin typeface="Segoe UI" panose="020B0502040204020203" pitchFamily="34" charset="0"/>
                 <a:ea typeface="Microsoft JhengHei" panose="020B0604030504040204" pitchFamily="34" charset="-120"/>
+                <a:cs typeface="Segoe UI" panose="020B0502040204020203" pitchFamily="34" charset="0"/>
               </a:rPr>
               <a:t>經文</a:t>
             </a:r>
             <a:endParaRPr lang="en-US" altLang="en-US" sz="3200" b="1" dirty="0">
-              <a:latin typeface="Microsoft JhengHei" panose="020B0604030504040204" pitchFamily="34" charset="-120"/>
+              <a:latin typeface="Segoe UI" panose="020B0502040204020203" pitchFamily="34" charset="0"/>
               <a:ea typeface="Microsoft JhengHei" panose="020B0604030504040204" pitchFamily="34" charset="-120"/>
+              <a:cs typeface="Segoe UI" panose="020B0502040204020203" pitchFamily="34" charset="0"/>
             </a:endParaRPr>
           </a:p>
         </p:txBody>

</xml_diff>

<commit_message>
22/01/23 Design Adjustments to .pptx
</commit_message>
<xml_diff>
--- a/TJCPowerPoint/Resources/ServiceWidescreen.pptx
+++ b/TJCPowerPoint/Resources/ServiceWidescreen.pptx
@@ -4434,20 +4434,9 @@
   <p:cSld>
     <p:bg>
       <p:bgPr>
-        <a:gradFill flip="none" rotWithShape="1">
-          <a:gsLst>
-            <a:gs pos="0">
-              <a:schemeClr val="bg1"/>
-            </a:gs>
-            <a:gs pos="95000">
-              <a:srgbClr val="DFE4EF">
-                <a:lumMod val="93000"/>
-              </a:srgbClr>
-            </a:gs>
-          </a:gsLst>
-          <a:lin ang="5400000" scaled="1"/>
-          <a:tileRect/>
-        </a:gradFill>
+        <a:solidFill>
+          <a:srgbClr val="DFE4EF"/>
+        </a:solidFill>
         <a:effectLst/>
       </p:bgPr>
     </p:bg>
@@ -5082,7 +5071,7 @@
                 <a:cs typeface="Segoe UI" panose="020B0502040204020203" pitchFamily="34" charset="0"/>
               </a:rPr>
               <a:pPr algn="ctr"/>
-              <a:t>Friday, January 20, 2023</a:t>
+              <a:t>Sunday, January 22, 2023</a:t>
             </a:fld>
             <a:endParaRPr lang="en-US" altLang="en-US" sz="5400" b="1" dirty="0">
               <a:solidFill>
@@ -5668,135 +5657,6 @@
       </p:sp>
       <p:grpSp>
         <p:nvGrpSpPr>
-          <p:cNvPr id="2" name="Group 1">
-            <a:extLst>
-              <a:ext uri="{FF2B5EF4-FFF2-40B4-BE49-F238E27FC236}">
-                <a16:creationId xmlns:a16="http://schemas.microsoft.com/office/drawing/2014/main" id="{CDA21167-098A-9040-28D3-29D5E6636198}"/>
-              </a:ext>
-            </a:extLst>
-          </p:cNvPr>
-          <p:cNvGrpSpPr/>
-          <p:nvPr/>
-        </p:nvGrpSpPr>
-        <p:grpSpPr>
-          <a:xfrm>
-            <a:off x="6744072" y="6335420"/>
-            <a:ext cx="5337952" cy="346472"/>
-            <a:chOff x="4943872" y="6231733"/>
-            <a:chExt cx="7030907" cy="444368"/>
-          </a:xfrm>
-        </p:grpSpPr>
-        <p:sp>
-          <p:nvSpPr>
-            <p:cNvPr id="3" name="TextBox 2">
-              <a:extLst>
-                <a:ext uri="{FF2B5EF4-FFF2-40B4-BE49-F238E27FC236}">
-                  <a16:creationId xmlns:a16="http://schemas.microsoft.com/office/drawing/2014/main" id="{0790F6C1-39D9-8891-FFA1-90548FCF8757}"/>
-                </a:ext>
-              </a:extLst>
-            </p:cNvPr>
-            <p:cNvSpPr txBox="1"/>
-            <p:nvPr/>
-          </p:nvSpPr>
-          <p:spPr>
-            <a:xfrm>
-              <a:off x="4943872" y="6231733"/>
-              <a:ext cx="7030907" cy="444368"/>
-            </a:xfrm>
-            <a:prstGeom prst="roundRect">
-              <a:avLst>
-                <a:gd name="adj" fmla="val 20010"/>
-              </a:avLst>
-            </a:prstGeom>
-            <a:noFill/>
-            <a:ln w="19050">
-              <a:solidFill>
-                <a:srgbClr val="FF0000"/>
-              </a:solidFill>
-            </a:ln>
-          </p:spPr>
-          <p:txBody>
-            <a:bodyPr wrap="square" rtlCol="0" anchor="ctr">
-              <a:spAutoFit/>
-            </a:bodyPr>
-            <a:lstStyle/>
-            <a:p>
-              <a:r>
-                <a:rPr lang="en-GB" sz="1400" b="1" dirty="0">
-                  <a:latin typeface="Source Sans Pro" panose="020B0503030403020204" pitchFamily="34" charset="0"/>
-                  <a:ea typeface="Source Sans Pro" panose="020B0503030403020204" pitchFamily="34" charset="0"/>
-                  <a:cs typeface="Segoe UI Semibold" panose="020B0702040204020203" pitchFamily="34" charset="0"/>
-                </a:rPr>
-                <a:t>Please Turn Off/Silence Your Devices </a:t>
-              </a:r>
-              <a:r>
-                <a:rPr lang="zh-TW" altLang="en-US" sz="1400" b="1" dirty="0">
-                  <a:latin typeface="Source Sans Pro" panose="020B0503030403020204" pitchFamily="34" charset="0"/>
-                  <a:ea typeface="Microsoft JhengHei" panose="020B0604030504040204" pitchFamily="34" charset="-120"/>
-                </a:rPr>
-                <a:t>請靜音或關閉所有電子設備</a:t>
-              </a:r>
-              <a:endParaRPr lang="ja-JP" altLang="en-US" sz="1400" b="1" dirty="0">
-                <a:latin typeface="Source Sans Pro" panose="020B0503030403020204" pitchFamily="34" charset="0"/>
-                <a:ea typeface="Microsoft JhengHei" panose="020B0604030504040204" pitchFamily="34" charset="-120"/>
-              </a:endParaRPr>
-            </a:p>
-          </p:txBody>
-        </p:sp>
-        <p:pic>
-          <p:nvPicPr>
-            <p:cNvPr id="4" name="Picture 3" descr="Shape&#10;&#10;Description automatically generated with low confidence">
-              <a:extLst>
-                <a:ext uri="{FF2B5EF4-FFF2-40B4-BE49-F238E27FC236}">
-                  <a16:creationId xmlns:a16="http://schemas.microsoft.com/office/drawing/2014/main" id="{45CB1242-3B09-A576-316B-A11BB94B74E1}"/>
-                </a:ext>
-              </a:extLst>
-            </p:cNvPr>
-            <p:cNvPicPr>
-              <a:picLocks noChangeAspect="1"/>
-            </p:cNvPicPr>
-            <p:nvPr/>
-          </p:nvPicPr>
-          <p:blipFill>
-            <a:blip r:embed="rId3" cstate="print">
-              <a:extLst>
-                <a:ext uri="{BEBA8EAE-BF5A-486C-A8C5-ECC9F3942E4B}">
-                  <a14:imgProps xmlns:a14="http://schemas.microsoft.com/office/drawing/2010/main">
-                    <a14:imgLayer r:embed="rId4">
-                      <a14:imgEffect>
-                        <a14:colorTemperature colorTemp="11500"/>
-                      </a14:imgEffect>
-                      <a14:imgEffect>
-                        <a14:saturation sat="400000"/>
-                      </a14:imgEffect>
-                      <a14:imgEffect>
-                        <a14:brightnessContrast bright="-40000" contrast="-40000"/>
-                      </a14:imgEffect>
-                    </a14:imgLayer>
-                  </a14:imgProps>
-                </a:ext>
-                <a:ext uri="{28A0092B-C50C-407E-A947-70E740481C1C}">
-                  <a14:useLocalDpi xmlns:a14="http://schemas.microsoft.com/office/drawing/2010/main" val="0"/>
-                </a:ext>
-              </a:extLst>
-            </a:blip>
-            <a:stretch>
-              <a:fillRect/>
-            </a:stretch>
-          </p:blipFill>
-          <p:spPr>
-            <a:xfrm>
-              <a:off x="11658489" y="6309320"/>
-              <a:ext cx="280267" cy="280267"/>
-            </a:xfrm>
-            <a:prstGeom prst="rect">
-              <a:avLst/>
-            </a:prstGeom>
-          </p:spPr>
-        </p:pic>
-      </p:grpSp>
-      <p:grpSp>
-        <p:nvGrpSpPr>
           <p:cNvPr id="6" name="Group 5">
             <a:extLst>
               <a:ext uri="{FF2B5EF4-FFF2-40B4-BE49-F238E27FC236}">
@@ -5830,7 +5690,7 @@
             <p:nvPr/>
           </p:nvPicPr>
           <p:blipFill>
-            <a:blip r:embed="rId5" cstate="print">
+            <a:blip r:embed="rId3" cstate="print">
               <a:biLevel thresh="75000"/>
               <a:extLst>
                 <a:ext uri="{28A0092B-C50C-407E-A947-70E740481C1C}">
@@ -5867,7 +5727,7 @@
             <p:nvPr/>
           </p:nvPicPr>
           <p:blipFill rotWithShape="1">
-            <a:blip r:embed="rId6" cstate="print">
+            <a:blip r:embed="rId4" cstate="print">
               <a:biLevel thresh="75000"/>
               <a:extLst>
                 <a:ext uri="{28A0092B-C50C-407E-A947-70E740481C1C}">
@@ -5882,6 +5742,135 @@
             <a:xfrm>
               <a:off x="6745384" y="4609005"/>
               <a:ext cx="3595842" cy="841456"/>
+            </a:xfrm>
+            <a:prstGeom prst="rect">
+              <a:avLst/>
+            </a:prstGeom>
+          </p:spPr>
+        </p:pic>
+      </p:grpSp>
+      <p:grpSp>
+        <p:nvGrpSpPr>
+          <p:cNvPr id="12" name="Group 11">
+            <a:extLst>
+              <a:ext uri="{FF2B5EF4-FFF2-40B4-BE49-F238E27FC236}">
+                <a16:creationId xmlns:a16="http://schemas.microsoft.com/office/drawing/2014/main" id="{1BA6BC62-6F78-C802-AA56-E6AE52E2D600}"/>
+              </a:ext>
+            </a:extLst>
+          </p:cNvPr>
+          <p:cNvGrpSpPr/>
+          <p:nvPr/>
+        </p:nvGrpSpPr>
+        <p:grpSpPr>
+          <a:xfrm>
+            <a:off x="5951984" y="6318094"/>
+            <a:ext cx="6130040" cy="381119"/>
+            <a:chOff x="3900570" y="6209512"/>
+            <a:chExt cx="8074208" cy="488804"/>
+          </a:xfrm>
+        </p:grpSpPr>
+        <p:sp>
+          <p:nvSpPr>
+            <p:cNvPr id="13" name="TextBox 12">
+              <a:extLst>
+                <a:ext uri="{FF2B5EF4-FFF2-40B4-BE49-F238E27FC236}">
+                  <a16:creationId xmlns:a16="http://schemas.microsoft.com/office/drawing/2014/main" id="{FCA5E6AC-05AA-9E2C-D56D-CB9F9AB12C50}"/>
+                </a:ext>
+              </a:extLst>
+            </p:cNvPr>
+            <p:cNvSpPr txBox="1"/>
+            <p:nvPr/>
+          </p:nvSpPr>
+          <p:spPr>
+            <a:xfrm>
+              <a:off x="3900570" y="6209512"/>
+              <a:ext cx="8074208" cy="488804"/>
+            </a:xfrm>
+            <a:prstGeom prst="roundRect">
+              <a:avLst>
+                <a:gd name="adj" fmla="val 20010"/>
+              </a:avLst>
+            </a:prstGeom>
+            <a:noFill/>
+            <a:ln w="19050">
+              <a:solidFill>
+                <a:srgbClr val="FF0000"/>
+              </a:solidFill>
+            </a:ln>
+          </p:spPr>
+          <p:txBody>
+            <a:bodyPr wrap="square" rtlCol="0" anchor="ctr">
+              <a:spAutoFit/>
+            </a:bodyPr>
+            <a:lstStyle/>
+            <a:p>
+              <a:r>
+                <a:rPr lang="en-GB" sz="1600" b="1" dirty="0">
+                  <a:latin typeface="Source Sans Pro" panose="020B0503030403020204" pitchFamily="34" charset="0"/>
+                  <a:ea typeface="Source Sans Pro" panose="020B0503030403020204" pitchFamily="34" charset="0"/>
+                  <a:cs typeface="Segoe UI Semibold" panose="020B0702040204020203" pitchFamily="34" charset="0"/>
+                </a:rPr>
+                <a:t>Please Turn Off/Silence Your Devices </a:t>
+              </a:r>
+              <a:r>
+                <a:rPr lang="zh-TW" altLang="en-US" sz="1600" b="1" dirty="0">
+                  <a:latin typeface="Source Sans Pro" panose="020B0503030403020204" pitchFamily="34" charset="0"/>
+                  <a:ea typeface="Microsoft JhengHei" panose="020B0604030504040204" pitchFamily="34" charset="-120"/>
+                </a:rPr>
+                <a:t>請靜音或關閉所有電子設備</a:t>
+              </a:r>
+              <a:endParaRPr lang="ja-JP" altLang="en-US" sz="1600" b="1" dirty="0">
+                <a:latin typeface="Source Sans Pro" panose="020B0503030403020204" pitchFamily="34" charset="0"/>
+                <a:ea typeface="Microsoft JhengHei" panose="020B0604030504040204" pitchFamily="34" charset="-120"/>
+              </a:endParaRPr>
+            </a:p>
+          </p:txBody>
+        </p:sp>
+        <p:pic>
+          <p:nvPicPr>
+            <p:cNvPr id="14" name="Picture 13" descr="Shape&#10;&#10;Description automatically generated with low confidence">
+              <a:extLst>
+                <a:ext uri="{FF2B5EF4-FFF2-40B4-BE49-F238E27FC236}">
+                  <a16:creationId xmlns:a16="http://schemas.microsoft.com/office/drawing/2014/main" id="{6332E253-2426-9EEA-8968-F1F3F92FC20F}"/>
+                </a:ext>
+              </a:extLst>
+            </p:cNvPr>
+            <p:cNvPicPr>
+              <a:picLocks noChangeAspect="1"/>
+            </p:cNvPicPr>
+            <p:nvPr/>
+          </p:nvPicPr>
+          <p:blipFill>
+            <a:blip r:embed="rId5" cstate="print">
+              <a:extLst>
+                <a:ext uri="{BEBA8EAE-BF5A-486C-A8C5-ECC9F3942E4B}">
+                  <a14:imgProps xmlns:a14="http://schemas.microsoft.com/office/drawing/2010/main">
+                    <a14:imgLayer r:embed="rId6">
+                      <a14:imgEffect>
+                        <a14:colorTemperature colorTemp="11500"/>
+                      </a14:imgEffect>
+                      <a14:imgEffect>
+                        <a14:saturation sat="400000"/>
+                      </a14:imgEffect>
+                      <a14:imgEffect>
+                        <a14:brightnessContrast bright="-40000" contrast="-40000"/>
+                      </a14:imgEffect>
+                    </a14:imgLayer>
+                  </a14:imgProps>
+                </a:ext>
+                <a:ext uri="{28A0092B-C50C-407E-A947-70E740481C1C}">
+                  <a14:useLocalDpi xmlns:a14="http://schemas.microsoft.com/office/drawing/2010/main" val="0"/>
+                </a:ext>
+              </a:extLst>
+            </a:blip>
+            <a:stretch>
+              <a:fillRect/>
+            </a:stretch>
+          </p:blipFill>
+          <p:spPr>
+            <a:xfrm>
+              <a:off x="11583067" y="6279910"/>
+              <a:ext cx="348008" cy="348008"/>
             </a:xfrm>
             <a:prstGeom prst="rect">
               <a:avLst/>
@@ -6158,10 +6147,10 @@
         </p:nvGrpSpPr>
         <p:grpSpPr>
           <a:xfrm>
-            <a:off x="6744072" y="6335420"/>
-            <a:ext cx="5337952" cy="346472"/>
-            <a:chOff x="4943872" y="6231733"/>
-            <a:chExt cx="7030907" cy="444368"/>
+            <a:off x="5951984" y="6318094"/>
+            <a:ext cx="6130040" cy="381119"/>
+            <a:chOff x="3900570" y="6209512"/>
+            <a:chExt cx="8074208" cy="488804"/>
           </a:xfrm>
         </p:grpSpPr>
         <p:sp>
@@ -6178,8 +6167,8 @@
           </p:nvSpPr>
           <p:spPr>
             <a:xfrm>
-              <a:off x="4943872" y="6231733"/>
-              <a:ext cx="7030907" cy="444368"/>
+              <a:off x="3900570" y="6209512"/>
+              <a:ext cx="8074208" cy="488804"/>
             </a:xfrm>
             <a:prstGeom prst="roundRect">
               <a:avLst>
@@ -6200,7 +6189,7 @@
             <a:lstStyle/>
             <a:p>
               <a:r>
-                <a:rPr lang="en-GB" sz="1400" b="1" dirty="0">
+                <a:rPr lang="en-GB" sz="1600" b="1" dirty="0">
                   <a:latin typeface="Source Sans Pro" panose="020B0503030403020204" pitchFamily="34" charset="0"/>
                   <a:ea typeface="Source Sans Pro" panose="020B0503030403020204" pitchFamily="34" charset="0"/>
                   <a:cs typeface="Segoe UI Semibold" panose="020B0702040204020203" pitchFamily="34" charset="0"/>
@@ -6208,13 +6197,13 @@
                 <a:t>Please Turn Off/Silence Your Devices </a:t>
               </a:r>
               <a:r>
-                <a:rPr lang="zh-TW" altLang="en-US" sz="1400" b="1" dirty="0">
+                <a:rPr lang="zh-TW" altLang="en-US" sz="1600" b="1" dirty="0">
                   <a:latin typeface="Source Sans Pro" panose="020B0503030403020204" pitchFamily="34" charset="0"/>
                   <a:ea typeface="Microsoft JhengHei" panose="020B0604030504040204" pitchFamily="34" charset="-120"/>
                 </a:rPr>
                 <a:t>請靜音或關閉所有電子設備</a:t>
               </a:r>
-              <a:endParaRPr lang="ja-JP" altLang="en-US" sz="1400" b="1" dirty="0">
+              <a:endParaRPr lang="ja-JP" altLang="en-US" sz="1600" b="1" dirty="0">
                 <a:latin typeface="Source Sans Pro" panose="020B0503030403020204" pitchFamily="34" charset="0"/>
                 <a:ea typeface="Microsoft JhengHei" panose="020B0604030504040204" pitchFamily="34" charset="-120"/>
               </a:endParaRPr>
@@ -6264,8 +6253,8 @@
           </p:blipFill>
           <p:spPr>
             <a:xfrm>
-              <a:off x="11658489" y="6309320"/>
-              <a:ext cx="280267" cy="280267"/>
+              <a:off x="11583067" y="6279910"/>
+              <a:ext cx="348008" cy="348008"/>
             </a:xfrm>
             <a:prstGeom prst="rect">
               <a:avLst/>
@@ -6621,7 +6610,7 @@
         </p:nvSpPr>
         <p:spPr bwMode="auto">
           <a:xfrm>
-            <a:off x="1519747" y="2780928"/>
+            <a:off x="1519747" y="2412740"/>
             <a:ext cx="9144000" cy="584775"/>
           </a:xfrm>
           <a:prstGeom prst="rect">
@@ -6681,7 +6670,7 @@
         </p:nvSpPr>
         <p:spPr bwMode="auto">
           <a:xfrm>
-            <a:off x="1530570" y="3544560"/>
+            <a:off x="1519747" y="3140968"/>
             <a:ext cx="9137431" cy="830997"/>
           </a:xfrm>
           <a:prstGeom prst="rect">
@@ -6823,135 +6812,6 @@
       </p:sp>
       <p:grpSp>
         <p:nvGrpSpPr>
-          <p:cNvPr id="9" name="Group 8">
-            <a:extLst>
-              <a:ext uri="{FF2B5EF4-FFF2-40B4-BE49-F238E27FC236}">
-                <a16:creationId xmlns:a16="http://schemas.microsoft.com/office/drawing/2014/main" id="{3AC90EAB-3AE3-8F61-0DE3-5DED10278E6D}"/>
-              </a:ext>
-            </a:extLst>
-          </p:cNvPr>
-          <p:cNvGrpSpPr/>
-          <p:nvPr/>
-        </p:nvGrpSpPr>
-        <p:grpSpPr>
-          <a:xfrm>
-            <a:off x="6744072" y="6335420"/>
-            <a:ext cx="5337952" cy="346472"/>
-            <a:chOff x="4943872" y="6231733"/>
-            <a:chExt cx="7030907" cy="444368"/>
-          </a:xfrm>
-        </p:grpSpPr>
-        <p:sp>
-          <p:nvSpPr>
-            <p:cNvPr id="10" name="TextBox 9">
-              <a:extLst>
-                <a:ext uri="{FF2B5EF4-FFF2-40B4-BE49-F238E27FC236}">
-                  <a16:creationId xmlns:a16="http://schemas.microsoft.com/office/drawing/2014/main" id="{AACE4DFA-3ED5-6D38-E84C-99B529CAE267}"/>
-                </a:ext>
-              </a:extLst>
-            </p:cNvPr>
-            <p:cNvSpPr txBox="1"/>
-            <p:nvPr/>
-          </p:nvSpPr>
-          <p:spPr>
-            <a:xfrm>
-              <a:off x="4943872" y="6231733"/>
-              <a:ext cx="7030907" cy="444368"/>
-            </a:xfrm>
-            <a:prstGeom prst="roundRect">
-              <a:avLst>
-                <a:gd name="adj" fmla="val 20010"/>
-              </a:avLst>
-            </a:prstGeom>
-            <a:noFill/>
-            <a:ln w="19050">
-              <a:solidFill>
-                <a:srgbClr val="FF0000"/>
-              </a:solidFill>
-            </a:ln>
-          </p:spPr>
-          <p:txBody>
-            <a:bodyPr wrap="square" rtlCol="0" anchor="ctr">
-              <a:spAutoFit/>
-            </a:bodyPr>
-            <a:lstStyle/>
-            <a:p>
-              <a:r>
-                <a:rPr lang="en-GB" sz="1400" b="1" dirty="0">
-                  <a:latin typeface="Source Sans Pro" panose="020B0503030403020204" pitchFamily="34" charset="0"/>
-                  <a:ea typeface="Source Sans Pro" panose="020B0503030403020204" pitchFamily="34" charset="0"/>
-                  <a:cs typeface="Segoe UI Semibold" panose="020B0702040204020203" pitchFamily="34" charset="0"/>
-                </a:rPr>
-                <a:t>Please Turn Off/Silence Your Devices </a:t>
-              </a:r>
-              <a:r>
-                <a:rPr lang="zh-TW" altLang="en-US" sz="1400" b="1" dirty="0">
-                  <a:latin typeface="Source Sans Pro" panose="020B0503030403020204" pitchFamily="34" charset="0"/>
-                  <a:ea typeface="Microsoft JhengHei" panose="020B0604030504040204" pitchFamily="34" charset="-120"/>
-                </a:rPr>
-                <a:t>請靜音或關閉所有電子設備</a:t>
-              </a:r>
-              <a:endParaRPr lang="ja-JP" altLang="en-US" sz="1400" b="1" dirty="0">
-                <a:latin typeface="Source Sans Pro" panose="020B0503030403020204" pitchFamily="34" charset="0"/>
-                <a:ea typeface="Microsoft JhengHei" panose="020B0604030504040204" pitchFamily="34" charset="-120"/>
-              </a:endParaRPr>
-            </a:p>
-          </p:txBody>
-        </p:sp>
-        <p:pic>
-          <p:nvPicPr>
-            <p:cNvPr id="11" name="Picture 10" descr="Shape&#10;&#10;Description automatically generated with low confidence">
-              <a:extLst>
-                <a:ext uri="{FF2B5EF4-FFF2-40B4-BE49-F238E27FC236}">
-                  <a16:creationId xmlns:a16="http://schemas.microsoft.com/office/drawing/2014/main" id="{E7439301-21C0-AB65-D00F-E94A396B95E5}"/>
-                </a:ext>
-              </a:extLst>
-            </p:cNvPr>
-            <p:cNvPicPr>
-              <a:picLocks noChangeAspect="1"/>
-            </p:cNvPicPr>
-            <p:nvPr/>
-          </p:nvPicPr>
-          <p:blipFill>
-            <a:blip r:embed="rId3" cstate="print">
-              <a:extLst>
-                <a:ext uri="{BEBA8EAE-BF5A-486C-A8C5-ECC9F3942E4B}">
-                  <a14:imgProps xmlns:a14="http://schemas.microsoft.com/office/drawing/2010/main">
-                    <a14:imgLayer r:embed="rId4">
-                      <a14:imgEffect>
-                        <a14:colorTemperature colorTemp="11500"/>
-                      </a14:imgEffect>
-                      <a14:imgEffect>
-                        <a14:saturation sat="400000"/>
-                      </a14:imgEffect>
-                      <a14:imgEffect>
-                        <a14:brightnessContrast bright="-40000" contrast="-40000"/>
-                      </a14:imgEffect>
-                    </a14:imgLayer>
-                  </a14:imgProps>
-                </a:ext>
-                <a:ext uri="{28A0092B-C50C-407E-A947-70E740481C1C}">
-                  <a14:useLocalDpi xmlns:a14="http://schemas.microsoft.com/office/drawing/2010/main" val="0"/>
-                </a:ext>
-              </a:extLst>
-            </a:blip>
-            <a:stretch>
-              <a:fillRect/>
-            </a:stretch>
-          </p:blipFill>
-          <p:spPr>
-            <a:xfrm>
-              <a:off x="11658489" y="6309320"/>
-              <a:ext cx="280267" cy="280267"/>
-            </a:xfrm>
-            <a:prstGeom prst="rect">
-              <a:avLst/>
-            </a:prstGeom>
-          </p:spPr>
-        </p:pic>
-      </p:grpSp>
-      <p:grpSp>
-        <p:nvGrpSpPr>
           <p:cNvPr id="12" name="Group 11">
             <a:extLst>
               <a:ext uri="{FF2B5EF4-FFF2-40B4-BE49-F238E27FC236}">
@@ -6985,7 +6845,7 @@
             <p:nvPr/>
           </p:nvPicPr>
           <p:blipFill>
-            <a:blip r:embed="rId5" cstate="print">
+            <a:blip r:embed="rId3" cstate="print">
               <a:biLevel thresh="75000"/>
               <a:extLst>
                 <a:ext uri="{28A0092B-C50C-407E-A947-70E740481C1C}">
@@ -7022,7 +6882,7 @@
             <p:nvPr/>
           </p:nvPicPr>
           <p:blipFill rotWithShape="1">
-            <a:blip r:embed="rId6" cstate="print">
+            <a:blip r:embed="rId4" cstate="print">
               <a:biLevel thresh="75000"/>
               <a:extLst>
                 <a:ext uri="{28A0092B-C50C-407E-A947-70E740481C1C}">
@@ -7037,6 +6897,135 @@
             <a:xfrm>
               <a:off x="6745384" y="4609005"/>
               <a:ext cx="3595842" cy="841456"/>
+            </a:xfrm>
+            <a:prstGeom prst="rect">
+              <a:avLst/>
+            </a:prstGeom>
+          </p:spPr>
+        </p:pic>
+      </p:grpSp>
+      <p:grpSp>
+        <p:nvGrpSpPr>
+          <p:cNvPr id="4" name="Group 3">
+            <a:extLst>
+              <a:ext uri="{FF2B5EF4-FFF2-40B4-BE49-F238E27FC236}">
+                <a16:creationId xmlns:a16="http://schemas.microsoft.com/office/drawing/2014/main" id="{17FDF6B0-AED5-8AD6-3A96-68D07DD91030}"/>
+              </a:ext>
+            </a:extLst>
+          </p:cNvPr>
+          <p:cNvGrpSpPr/>
+          <p:nvPr/>
+        </p:nvGrpSpPr>
+        <p:grpSpPr>
+          <a:xfrm>
+            <a:off x="5951984" y="6318094"/>
+            <a:ext cx="6130040" cy="381119"/>
+            <a:chOff x="3900570" y="6209512"/>
+            <a:chExt cx="8074208" cy="488804"/>
+          </a:xfrm>
+        </p:grpSpPr>
+        <p:sp>
+          <p:nvSpPr>
+            <p:cNvPr id="5" name="TextBox 4">
+              <a:extLst>
+                <a:ext uri="{FF2B5EF4-FFF2-40B4-BE49-F238E27FC236}">
+                  <a16:creationId xmlns:a16="http://schemas.microsoft.com/office/drawing/2014/main" id="{834E9ADC-F8FF-E7F4-9C09-314716E5FCC3}"/>
+                </a:ext>
+              </a:extLst>
+            </p:cNvPr>
+            <p:cNvSpPr txBox="1"/>
+            <p:nvPr/>
+          </p:nvSpPr>
+          <p:spPr>
+            <a:xfrm>
+              <a:off x="3900570" y="6209512"/>
+              <a:ext cx="8074208" cy="488804"/>
+            </a:xfrm>
+            <a:prstGeom prst="roundRect">
+              <a:avLst>
+                <a:gd name="adj" fmla="val 20010"/>
+              </a:avLst>
+            </a:prstGeom>
+            <a:noFill/>
+            <a:ln w="19050">
+              <a:solidFill>
+                <a:srgbClr val="FF0000"/>
+              </a:solidFill>
+            </a:ln>
+          </p:spPr>
+          <p:txBody>
+            <a:bodyPr wrap="square" rtlCol="0" anchor="ctr">
+              <a:spAutoFit/>
+            </a:bodyPr>
+            <a:lstStyle/>
+            <a:p>
+              <a:r>
+                <a:rPr lang="en-GB" sz="1600" b="1" dirty="0">
+                  <a:latin typeface="Source Sans Pro" panose="020B0503030403020204" pitchFamily="34" charset="0"/>
+                  <a:ea typeface="Source Sans Pro" panose="020B0503030403020204" pitchFamily="34" charset="0"/>
+                  <a:cs typeface="Segoe UI Semibold" panose="020B0702040204020203" pitchFamily="34" charset="0"/>
+                </a:rPr>
+                <a:t>Please Turn Off/Silence Your Devices </a:t>
+              </a:r>
+              <a:r>
+                <a:rPr lang="zh-TW" altLang="en-US" sz="1600" b="1" dirty="0">
+                  <a:latin typeface="Source Sans Pro" panose="020B0503030403020204" pitchFamily="34" charset="0"/>
+                  <a:ea typeface="Microsoft JhengHei" panose="020B0604030504040204" pitchFamily="34" charset="-120"/>
+                </a:rPr>
+                <a:t>請靜音或關閉所有電子設備</a:t>
+              </a:r>
+              <a:endParaRPr lang="ja-JP" altLang="en-US" sz="1600" b="1" dirty="0">
+                <a:latin typeface="Source Sans Pro" panose="020B0503030403020204" pitchFamily="34" charset="0"/>
+                <a:ea typeface="Microsoft JhengHei" panose="020B0604030504040204" pitchFamily="34" charset="-120"/>
+              </a:endParaRPr>
+            </a:p>
+          </p:txBody>
+        </p:sp>
+        <p:pic>
+          <p:nvPicPr>
+            <p:cNvPr id="6" name="Picture 5" descr="Shape&#10;&#10;Description automatically generated with low confidence">
+              <a:extLst>
+                <a:ext uri="{FF2B5EF4-FFF2-40B4-BE49-F238E27FC236}">
+                  <a16:creationId xmlns:a16="http://schemas.microsoft.com/office/drawing/2014/main" id="{ECB84A56-E5B7-DB3B-25F6-4B70CF33C6EA}"/>
+                </a:ext>
+              </a:extLst>
+            </p:cNvPr>
+            <p:cNvPicPr>
+              <a:picLocks noChangeAspect="1"/>
+            </p:cNvPicPr>
+            <p:nvPr/>
+          </p:nvPicPr>
+          <p:blipFill>
+            <a:blip r:embed="rId5" cstate="print">
+              <a:extLst>
+                <a:ext uri="{BEBA8EAE-BF5A-486C-A8C5-ECC9F3942E4B}">
+                  <a14:imgProps xmlns:a14="http://schemas.microsoft.com/office/drawing/2010/main">
+                    <a14:imgLayer r:embed="rId6">
+                      <a14:imgEffect>
+                        <a14:colorTemperature colorTemp="11500"/>
+                      </a14:imgEffect>
+                      <a14:imgEffect>
+                        <a14:saturation sat="400000"/>
+                      </a14:imgEffect>
+                      <a14:imgEffect>
+                        <a14:brightnessContrast bright="-40000" contrast="-40000"/>
+                      </a14:imgEffect>
+                    </a14:imgLayer>
+                  </a14:imgProps>
+                </a:ext>
+                <a:ext uri="{28A0092B-C50C-407E-A947-70E740481C1C}">
+                  <a14:useLocalDpi xmlns:a14="http://schemas.microsoft.com/office/drawing/2010/main" val="0"/>
+                </a:ext>
+              </a:extLst>
+            </a:blip>
+            <a:stretch>
+              <a:fillRect/>
+            </a:stretch>
+          </p:blipFill>
+          <p:spPr>
+            <a:xfrm>
+              <a:off x="11583067" y="6279910"/>
+              <a:ext cx="348008" cy="348008"/>
             </a:xfrm>
             <a:prstGeom prst="rect">
               <a:avLst/>
@@ -7304,7 +7293,7 @@
         </p:nvSpPr>
         <p:spPr bwMode="auto">
           <a:xfrm>
-            <a:off x="2160742" y="2348880"/>
+            <a:off x="2160742" y="2318320"/>
             <a:ext cx="3610786" cy="666501"/>
           </a:xfrm>
           <a:prstGeom prst="roundRect">
@@ -7380,7 +7369,7 @@
         </p:nvSpPr>
         <p:spPr bwMode="auto">
           <a:xfrm>
-            <a:off x="0" y="3064140"/>
+            <a:off x="0" y="3033580"/>
             <a:ext cx="5771528" cy="1015663"/>
           </a:xfrm>
           <a:prstGeom prst="rect">
@@ -7451,7 +7440,7 @@
         </p:nvSpPr>
         <p:spPr bwMode="auto">
           <a:xfrm>
-            <a:off x="0" y="4100081"/>
+            <a:off x="0" y="4069521"/>
             <a:ext cx="5771528" cy="1015663"/>
           </a:xfrm>
           <a:prstGeom prst="rect">
@@ -7527,7 +7516,7 @@
         </p:nvSpPr>
         <p:spPr bwMode="auto">
           <a:xfrm>
-            <a:off x="5952252" y="3493457"/>
+            <a:off x="5952252" y="3462897"/>
             <a:ext cx="6239747" cy="1015663"/>
           </a:xfrm>
           <a:prstGeom prst="rect">
@@ -7579,7 +7568,7 @@
               </a:spcBef>
             </a:pPr>
             <a:r>
-              <a:rPr lang="en-US" altLang="zh-CN" sz="6800" b="1" dirty="0">
+              <a:rPr lang="en-US" altLang="zh-CN" sz="7200" b="1" dirty="0">
                 <a:latin typeface="Century Gothic" panose="020B0502020202020204" pitchFamily="34" charset="0"/>
                 <a:ea typeface="Source Sans Pro Semibold" panose="020B0603030403020204" pitchFamily="34" charset="0"/>
               </a:rPr>
@@ -7667,135 +7656,6 @@
       </p:sp>
       <p:grpSp>
         <p:nvGrpSpPr>
-          <p:cNvPr id="3" name="Group 2">
-            <a:extLst>
-              <a:ext uri="{FF2B5EF4-FFF2-40B4-BE49-F238E27FC236}">
-                <a16:creationId xmlns:a16="http://schemas.microsoft.com/office/drawing/2014/main" id="{F5D36BDF-8FA1-95EC-D778-39F15D11C587}"/>
-              </a:ext>
-            </a:extLst>
-          </p:cNvPr>
-          <p:cNvGrpSpPr/>
-          <p:nvPr/>
-        </p:nvGrpSpPr>
-        <p:grpSpPr>
-          <a:xfrm>
-            <a:off x="6744072" y="6335420"/>
-            <a:ext cx="5337952" cy="346472"/>
-            <a:chOff x="4943872" y="6231733"/>
-            <a:chExt cx="7030907" cy="444368"/>
-          </a:xfrm>
-        </p:grpSpPr>
-        <p:sp>
-          <p:nvSpPr>
-            <p:cNvPr id="10" name="TextBox 9">
-              <a:extLst>
-                <a:ext uri="{FF2B5EF4-FFF2-40B4-BE49-F238E27FC236}">
-                  <a16:creationId xmlns:a16="http://schemas.microsoft.com/office/drawing/2014/main" id="{62E60AFB-A8DC-ABD8-F529-0E53531DA4F1}"/>
-                </a:ext>
-              </a:extLst>
-            </p:cNvPr>
-            <p:cNvSpPr txBox="1"/>
-            <p:nvPr/>
-          </p:nvSpPr>
-          <p:spPr>
-            <a:xfrm>
-              <a:off x="4943872" y="6231733"/>
-              <a:ext cx="7030907" cy="444368"/>
-            </a:xfrm>
-            <a:prstGeom prst="roundRect">
-              <a:avLst>
-                <a:gd name="adj" fmla="val 20010"/>
-              </a:avLst>
-            </a:prstGeom>
-            <a:noFill/>
-            <a:ln w="19050">
-              <a:solidFill>
-                <a:srgbClr val="FF0000"/>
-              </a:solidFill>
-            </a:ln>
-          </p:spPr>
-          <p:txBody>
-            <a:bodyPr wrap="square" rtlCol="0" anchor="ctr">
-              <a:spAutoFit/>
-            </a:bodyPr>
-            <a:lstStyle/>
-            <a:p>
-              <a:r>
-                <a:rPr lang="en-GB" sz="1400" b="1" dirty="0">
-                  <a:latin typeface="Source Sans Pro" panose="020B0503030403020204" pitchFamily="34" charset="0"/>
-                  <a:ea typeface="Source Sans Pro" panose="020B0503030403020204" pitchFamily="34" charset="0"/>
-                  <a:cs typeface="Segoe UI Semibold" panose="020B0702040204020203" pitchFamily="34" charset="0"/>
-                </a:rPr>
-                <a:t>Please Turn Off/Silence Your Devices </a:t>
-              </a:r>
-              <a:r>
-                <a:rPr lang="zh-TW" altLang="en-US" sz="1400" b="1" dirty="0">
-                  <a:latin typeface="Source Sans Pro" panose="020B0503030403020204" pitchFamily="34" charset="0"/>
-                  <a:ea typeface="Microsoft JhengHei" panose="020B0604030504040204" pitchFamily="34" charset="-120"/>
-                </a:rPr>
-                <a:t>請靜音或關閉所有電子設備</a:t>
-              </a:r>
-              <a:endParaRPr lang="ja-JP" altLang="en-US" sz="1400" b="1" dirty="0">
-                <a:latin typeface="Source Sans Pro" panose="020B0503030403020204" pitchFamily="34" charset="0"/>
-                <a:ea typeface="Microsoft JhengHei" panose="020B0604030504040204" pitchFamily="34" charset="-120"/>
-              </a:endParaRPr>
-            </a:p>
-          </p:txBody>
-        </p:sp>
-        <p:pic>
-          <p:nvPicPr>
-            <p:cNvPr id="11" name="Picture 10" descr="Shape&#10;&#10;Description automatically generated with low confidence">
-              <a:extLst>
-                <a:ext uri="{FF2B5EF4-FFF2-40B4-BE49-F238E27FC236}">
-                  <a16:creationId xmlns:a16="http://schemas.microsoft.com/office/drawing/2014/main" id="{B2C4DDAE-60BE-BC6D-D06B-224CC9E9D450}"/>
-                </a:ext>
-              </a:extLst>
-            </p:cNvPr>
-            <p:cNvPicPr>
-              <a:picLocks noChangeAspect="1"/>
-            </p:cNvPicPr>
-            <p:nvPr/>
-          </p:nvPicPr>
-          <p:blipFill>
-            <a:blip r:embed="rId3" cstate="print">
-              <a:extLst>
-                <a:ext uri="{BEBA8EAE-BF5A-486C-A8C5-ECC9F3942E4B}">
-                  <a14:imgProps xmlns:a14="http://schemas.microsoft.com/office/drawing/2010/main">
-                    <a14:imgLayer r:embed="rId4">
-                      <a14:imgEffect>
-                        <a14:colorTemperature colorTemp="11500"/>
-                      </a14:imgEffect>
-                      <a14:imgEffect>
-                        <a14:saturation sat="400000"/>
-                      </a14:imgEffect>
-                      <a14:imgEffect>
-                        <a14:brightnessContrast bright="-40000" contrast="-40000"/>
-                      </a14:imgEffect>
-                    </a14:imgLayer>
-                  </a14:imgProps>
-                </a:ext>
-                <a:ext uri="{28A0092B-C50C-407E-A947-70E740481C1C}">
-                  <a14:useLocalDpi xmlns:a14="http://schemas.microsoft.com/office/drawing/2010/main" val="0"/>
-                </a:ext>
-              </a:extLst>
-            </a:blip>
-            <a:stretch>
-              <a:fillRect/>
-            </a:stretch>
-          </p:blipFill>
-          <p:spPr>
-            <a:xfrm>
-              <a:off x="11658489" y="6309320"/>
-              <a:ext cx="280267" cy="280267"/>
-            </a:xfrm>
-            <a:prstGeom prst="rect">
-              <a:avLst/>
-            </a:prstGeom>
-          </p:spPr>
-        </p:pic>
-      </p:grpSp>
-      <p:grpSp>
-        <p:nvGrpSpPr>
           <p:cNvPr id="7" name="Group 6">
             <a:extLst>
               <a:ext uri="{FF2B5EF4-FFF2-40B4-BE49-F238E27FC236}">
@@ -7829,7 +7689,7 @@
             <p:nvPr/>
           </p:nvPicPr>
           <p:blipFill>
-            <a:blip r:embed="rId5" cstate="print">
+            <a:blip r:embed="rId3" cstate="print">
               <a:biLevel thresh="75000"/>
               <a:extLst>
                 <a:ext uri="{28A0092B-C50C-407E-A947-70E740481C1C}">
@@ -7866,7 +7726,7 @@
             <p:nvPr/>
           </p:nvPicPr>
           <p:blipFill rotWithShape="1">
-            <a:blip r:embed="rId6" cstate="print">
+            <a:blip r:embed="rId4" cstate="print">
               <a:biLevel thresh="75000"/>
               <a:extLst>
                 <a:ext uri="{28A0092B-C50C-407E-A947-70E740481C1C}">
@@ -7881,6 +7741,135 @@
             <a:xfrm>
               <a:off x="6745384" y="4609005"/>
               <a:ext cx="3595842" cy="841456"/>
+            </a:xfrm>
+            <a:prstGeom prst="rect">
+              <a:avLst/>
+            </a:prstGeom>
+          </p:spPr>
+        </p:pic>
+      </p:grpSp>
+      <p:grpSp>
+        <p:nvGrpSpPr>
+          <p:cNvPr id="12" name="Group 11">
+            <a:extLst>
+              <a:ext uri="{FF2B5EF4-FFF2-40B4-BE49-F238E27FC236}">
+                <a16:creationId xmlns:a16="http://schemas.microsoft.com/office/drawing/2014/main" id="{80F5226D-30D1-E385-621D-D5BF5B3AEE47}"/>
+              </a:ext>
+            </a:extLst>
+          </p:cNvPr>
+          <p:cNvGrpSpPr/>
+          <p:nvPr/>
+        </p:nvGrpSpPr>
+        <p:grpSpPr>
+          <a:xfrm>
+            <a:off x="5951984" y="6318094"/>
+            <a:ext cx="6130040" cy="381119"/>
+            <a:chOff x="3900570" y="6209512"/>
+            <a:chExt cx="8074208" cy="488804"/>
+          </a:xfrm>
+        </p:grpSpPr>
+        <p:sp>
+          <p:nvSpPr>
+            <p:cNvPr id="13" name="TextBox 12">
+              <a:extLst>
+                <a:ext uri="{FF2B5EF4-FFF2-40B4-BE49-F238E27FC236}">
+                  <a16:creationId xmlns:a16="http://schemas.microsoft.com/office/drawing/2014/main" id="{AF69CD71-8B27-7762-1389-A7E372787B3C}"/>
+                </a:ext>
+              </a:extLst>
+            </p:cNvPr>
+            <p:cNvSpPr txBox="1"/>
+            <p:nvPr/>
+          </p:nvSpPr>
+          <p:spPr>
+            <a:xfrm>
+              <a:off x="3900570" y="6209512"/>
+              <a:ext cx="8074208" cy="488804"/>
+            </a:xfrm>
+            <a:prstGeom prst="roundRect">
+              <a:avLst>
+                <a:gd name="adj" fmla="val 20010"/>
+              </a:avLst>
+            </a:prstGeom>
+            <a:noFill/>
+            <a:ln w="19050">
+              <a:solidFill>
+                <a:srgbClr val="FF0000"/>
+              </a:solidFill>
+            </a:ln>
+          </p:spPr>
+          <p:txBody>
+            <a:bodyPr wrap="square" rtlCol="0" anchor="ctr">
+              <a:spAutoFit/>
+            </a:bodyPr>
+            <a:lstStyle/>
+            <a:p>
+              <a:r>
+                <a:rPr lang="en-GB" sz="1600" b="1" dirty="0">
+                  <a:latin typeface="Source Sans Pro" panose="020B0503030403020204" pitchFamily="34" charset="0"/>
+                  <a:ea typeface="Source Sans Pro" panose="020B0503030403020204" pitchFamily="34" charset="0"/>
+                  <a:cs typeface="Segoe UI Semibold" panose="020B0702040204020203" pitchFamily="34" charset="0"/>
+                </a:rPr>
+                <a:t>Please Turn Off/Silence Your Devices </a:t>
+              </a:r>
+              <a:r>
+                <a:rPr lang="zh-TW" altLang="en-US" sz="1600" b="1" dirty="0">
+                  <a:latin typeface="Source Sans Pro" panose="020B0503030403020204" pitchFamily="34" charset="0"/>
+                  <a:ea typeface="Microsoft JhengHei" panose="020B0604030504040204" pitchFamily="34" charset="-120"/>
+                </a:rPr>
+                <a:t>請靜音或關閉所有電子設備</a:t>
+              </a:r>
+              <a:endParaRPr lang="ja-JP" altLang="en-US" sz="1600" b="1" dirty="0">
+                <a:latin typeface="Source Sans Pro" panose="020B0503030403020204" pitchFamily="34" charset="0"/>
+                <a:ea typeface="Microsoft JhengHei" panose="020B0604030504040204" pitchFamily="34" charset="-120"/>
+              </a:endParaRPr>
+            </a:p>
+          </p:txBody>
+        </p:sp>
+        <p:pic>
+          <p:nvPicPr>
+            <p:cNvPr id="14" name="Picture 13" descr="Shape&#10;&#10;Description automatically generated with low confidence">
+              <a:extLst>
+                <a:ext uri="{FF2B5EF4-FFF2-40B4-BE49-F238E27FC236}">
+                  <a16:creationId xmlns:a16="http://schemas.microsoft.com/office/drawing/2014/main" id="{92750C7C-CA6C-4AA6-B792-86C275BAB652}"/>
+                </a:ext>
+              </a:extLst>
+            </p:cNvPr>
+            <p:cNvPicPr>
+              <a:picLocks noChangeAspect="1"/>
+            </p:cNvPicPr>
+            <p:nvPr/>
+          </p:nvPicPr>
+          <p:blipFill>
+            <a:blip r:embed="rId5" cstate="print">
+              <a:extLst>
+                <a:ext uri="{BEBA8EAE-BF5A-486C-A8C5-ECC9F3942E4B}">
+                  <a14:imgProps xmlns:a14="http://schemas.microsoft.com/office/drawing/2010/main">
+                    <a14:imgLayer r:embed="rId6">
+                      <a14:imgEffect>
+                        <a14:colorTemperature colorTemp="11500"/>
+                      </a14:imgEffect>
+                      <a14:imgEffect>
+                        <a14:saturation sat="400000"/>
+                      </a14:imgEffect>
+                      <a14:imgEffect>
+                        <a14:brightnessContrast bright="-40000" contrast="-40000"/>
+                      </a14:imgEffect>
+                    </a14:imgLayer>
+                  </a14:imgProps>
+                </a:ext>
+                <a:ext uri="{28A0092B-C50C-407E-A947-70E740481C1C}">
+                  <a14:useLocalDpi xmlns:a14="http://schemas.microsoft.com/office/drawing/2010/main" val="0"/>
+                </a:ext>
+              </a:extLst>
+            </a:blip>
+            <a:stretch>
+              <a:fillRect/>
+            </a:stretch>
+          </p:blipFill>
+          <p:spPr>
+            <a:xfrm>
+              <a:off x="11583067" y="6279910"/>
+              <a:ext cx="348008" cy="348008"/>
             </a:xfrm>
             <a:prstGeom prst="rect">
               <a:avLst/>
@@ -7934,8 +7923,8 @@
         </p:nvSpPr>
         <p:spPr bwMode="auto">
           <a:xfrm>
-            <a:off x="0" y="1340769"/>
-            <a:ext cx="12192000" cy="3816422"/>
+            <a:off x="0" y="1217231"/>
+            <a:ext cx="12192000" cy="4299997"/>
           </a:xfrm>
           <a:prstGeom prst="rect">
             <a:avLst/>
@@ -8011,7 +8000,7 @@
         </p:nvSpPr>
         <p:spPr bwMode="auto">
           <a:xfrm>
-            <a:off x="1871470" y="312177"/>
+            <a:off x="1871470" y="188640"/>
             <a:ext cx="8449060" cy="596543"/>
           </a:xfrm>
           <a:prstGeom prst="rect">
@@ -8174,7 +8163,7 @@
         </p:nvCxnSpPr>
         <p:spPr>
           <a:xfrm>
-            <a:off x="371364" y="1124744"/>
+            <a:off x="371364" y="1001207"/>
             <a:ext cx="11449272" cy="0"/>
           </a:xfrm>
           <a:prstGeom prst="line">
@@ -8203,135 +8192,6 @@
           </a:fontRef>
         </p:style>
       </p:cxnSp>
-      <p:grpSp>
-        <p:nvGrpSpPr>
-          <p:cNvPr id="2" name="Group 1">
-            <a:extLst>
-              <a:ext uri="{FF2B5EF4-FFF2-40B4-BE49-F238E27FC236}">
-                <a16:creationId xmlns:a16="http://schemas.microsoft.com/office/drawing/2014/main" id="{8367902A-50ED-D26E-3B4F-901961BBD302}"/>
-              </a:ext>
-            </a:extLst>
-          </p:cNvPr>
-          <p:cNvGrpSpPr/>
-          <p:nvPr/>
-        </p:nvGrpSpPr>
-        <p:grpSpPr>
-          <a:xfrm>
-            <a:off x="6744072" y="6335420"/>
-            <a:ext cx="5337952" cy="346472"/>
-            <a:chOff x="4943872" y="6231733"/>
-            <a:chExt cx="7030907" cy="444368"/>
-          </a:xfrm>
-        </p:grpSpPr>
-        <p:sp>
-          <p:nvSpPr>
-            <p:cNvPr id="10" name="TextBox 9">
-              <a:extLst>
-                <a:ext uri="{FF2B5EF4-FFF2-40B4-BE49-F238E27FC236}">
-                  <a16:creationId xmlns:a16="http://schemas.microsoft.com/office/drawing/2014/main" id="{36BC2124-799E-F669-5360-19FDAD42A2C6}"/>
-                </a:ext>
-              </a:extLst>
-            </p:cNvPr>
-            <p:cNvSpPr txBox="1"/>
-            <p:nvPr/>
-          </p:nvSpPr>
-          <p:spPr>
-            <a:xfrm>
-              <a:off x="4943872" y="6231733"/>
-              <a:ext cx="7030907" cy="444368"/>
-            </a:xfrm>
-            <a:prstGeom prst="roundRect">
-              <a:avLst>
-                <a:gd name="adj" fmla="val 20010"/>
-              </a:avLst>
-            </a:prstGeom>
-            <a:noFill/>
-            <a:ln w="19050">
-              <a:solidFill>
-                <a:srgbClr val="FF0000"/>
-              </a:solidFill>
-            </a:ln>
-          </p:spPr>
-          <p:txBody>
-            <a:bodyPr wrap="square" rtlCol="0" anchor="ctr">
-              <a:spAutoFit/>
-            </a:bodyPr>
-            <a:lstStyle/>
-            <a:p>
-              <a:r>
-                <a:rPr lang="en-GB" sz="1400" b="1" dirty="0">
-                  <a:latin typeface="Source Sans Pro" panose="020B0503030403020204" pitchFamily="34" charset="0"/>
-                  <a:ea typeface="Source Sans Pro" panose="020B0503030403020204" pitchFamily="34" charset="0"/>
-                  <a:cs typeface="Segoe UI Semibold" panose="020B0702040204020203" pitchFamily="34" charset="0"/>
-                </a:rPr>
-                <a:t>Please Turn Off/Silence Your Devices </a:t>
-              </a:r>
-              <a:r>
-                <a:rPr lang="zh-TW" altLang="en-US" sz="1400" b="1" dirty="0">
-                  <a:latin typeface="Source Sans Pro" panose="020B0503030403020204" pitchFamily="34" charset="0"/>
-                  <a:ea typeface="Microsoft JhengHei" panose="020B0604030504040204" pitchFamily="34" charset="-120"/>
-                </a:rPr>
-                <a:t>請靜音或關閉所有電子設備</a:t>
-              </a:r>
-              <a:endParaRPr lang="ja-JP" altLang="en-US" sz="1400" b="1" dirty="0">
-                <a:latin typeface="Source Sans Pro" panose="020B0503030403020204" pitchFamily="34" charset="0"/>
-                <a:ea typeface="Microsoft JhengHei" panose="020B0604030504040204" pitchFamily="34" charset="-120"/>
-              </a:endParaRPr>
-            </a:p>
-          </p:txBody>
-        </p:sp>
-        <p:pic>
-          <p:nvPicPr>
-            <p:cNvPr id="11" name="Picture 10" descr="Shape&#10;&#10;Description automatically generated with low confidence">
-              <a:extLst>
-                <a:ext uri="{FF2B5EF4-FFF2-40B4-BE49-F238E27FC236}">
-                  <a16:creationId xmlns:a16="http://schemas.microsoft.com/office/drawing/2014/main" id="{B41129D8-806A-B795-B5EE-141DE47DE010}"/>
-                </a:ext>
-              </a:extLst>
-            </p:cNvPr>
-            <p:cNvPicPr>
-              <a:picLocks noChangeAspect="1"/>
-            </p:cNvPicPr>
-            <p:nvPr/>
-          </p:nvPicPr>
-          <p:blipFill>
-            <a:blip r:embed="rId3" cstate="print">
-              <a:extLst>
-                <a:ext uri="{BEBA8EAE-BF5A-486C-A8C5-ECC9F3942E4B}">
-                  <a14:imgProps xmlns:a14="http://schemas.microsoft.com/office/drawing/2010/main">
-                    <a14:imgLayer r:embed="rId4">
-                      <a14:imgEffect>
-                        <a14:colorTemperature colorTemp="11500"/>
-                      </a14:imgEffect>
-                      <a14:imgEffect>
-                        <a14:saturation sat="400000"/>
-                      </a14:imgEffect>
-                      <a14:imgEffect>
-                        <a14:brightnessContrast bright="-40000" contrast="-40000"/>
-                      </a14:imgEffect>
-                    </a14:imgLayer>
-                  </a14:imgProps>
-                </a:ext>
-                <a:ext uri="{28A0092B-C50C-407E-A947-70E740481C1C}">
-                  <a14:useLocalDpi xmlns:a14="http://schemas.microsoft.com/office/drawing/2010/main" val="0"/>
-                </a:ext>
-              </a:extLst>
-            </a:blip>
-            <a:stretch>
-              <a:fillRect/>
-            </a:stretch>
-          </p:blipFill>
-          <p:spPr>
-            <a:xfrm>
-              <a:off x="11658489" y="6309320"/>
-              <a:ext cx="280267" cy="280267"/>
-            </a:xfrm>
-            <a:prstGeom prst="rect">
-              <a:avLst/>
-            </a:prstGeom>
-          </p:spPr>
-        </p:pic>
-      </p:grpSp>
       <p:grpSp>
         <p:nvGrpSpPr>
           <p:cNvPr id="12" name="Group 11">
@@ -8367,7 +8227,7 @@
             <p:nvPr/>
           </p:nvPicPr>
           <p:blipFill>
-            <a:blip r:embed="rId5" cstate="print">
+            <a:blip r:embed="rId3" cstate="print">
               <a:biLevel thresh="75000"/>
               <a:extLst>
                 <a:ext uri="{28A0092B-C50C-407E-A947-70E740481C1C}">
@@ -8404,7 +8264,7 @@
             <p:nvPr/>
           </p:nvPicPr>
           <p:blipFill rotWithShape="1">
-            <a:blip r:embed="rId6" cstate="print">
+            <a:blip r:embed="rId4" cstate="print">
               <a:biLevel thresh="75000"/>
               <a:extLst>
                 <a:ext uri="{28A0092B-C50C-407E-A947-70E740481C1C}">
@@ -8419,6 +8279,135 @@
             <a:xfrm>
               <a:off x="6745384" y="4609005"/>
               <a:ext cx="3595842" cy="841456"/>
+            </a:xfrm>
+            <a:prstGeom prst="rect">
+              <a:avLst/>
+            </a:prstGeom>
+          </p:spPr>
+        </p:pic>
+      </p:grpSp>
+      <p:grpSp>
+        <p:nvGrpSpPr>
+          <p:cNvPr id="4" name="Group 3">
+            <a:extLst>
+              <a:ext uri="{FF2B5EF4-FFF2-40B4-BE49-F238E27FC236}">
+                <a16:creationId xmlns:a16="http://schemas.microsoft.com/office/drawing/2014/main" id="{1E0372FE-5AA9-B8A6-0C22-5EC9CFB8AB40}"/>
+              </a:ext>
+            </a:extLst>
+          </p:cNvPr>
+          <p:cNvGrpSpPr/>
+          <p:nvPr/>
+        </p:nvGrpSpPr>
+        <p:grpSpPr>
+          <a:xfrm>
+            <a:off x="5951984" y="6318094"/>
+            <a:ext cx="6130040" cy="381119"/>
+            <a:chOff x="3900570" y="6209512"/>
+            <a:chExt cx="8074208" cy="488804"/>
+          </a:xfrm>
+        </p:grpSpPr>
+        <p:sp>
+          <p:nvSpPr>
+            <p:cNvPr id="5" name="TextBox 4">
+              <a:extLst>
+                <a:ext uri="{FF2B5EF4-FFF2-40B4-BE49-F238E27FC236}">
+                  <a16:creationId xmlns:a16="http://schemas.microsoft.com/office/drawing/2014/main" id="{EB56B832-7D00-1ED3-CB34-50FC4A9CA726}"/>
+                </a:ext>
+              </a:extLst>
+            </p:cNvPr>
+            <p:cNvSpPr txBox="1"/>
+            <p:nvPr/>
+          </p:nvSpPr>
+          <p:spPr>
+            <a:xfrm>
+              <a:off x="3900570" y="6209512"/>
+              <a:ext cx="8074208" cy="488804"/>
+            </a:xfrm>
+            <a:prstGeom prst="roundRect">
+              <a:avLst>
+                <a:gd name="adj" fmla="val 20010"/>
+              </a:avLst>
+            </a:prstGeom>
+            <a:noFill/>
+            <a:ln w="19050">
+              <a:solidFill>
+                <a:srgbClr val="FF0000"/>
+              </a:solidFill>
+            </a:ln>
+          </p:spPr>
+          <p:txBody>
+            <a:bodyPr wrap="square" rtlCol="0" anchor="ctr">
+              <a:spAutoFit/>
+            </a:bodyPr>
+            <a:lstStyle/>
+            <a:p>
+              <a:r>
+                <a:rPr lang="en-GB" sz="1600" b="1" dirty="0">
+                  <a:latin typeface="Source Sans Pro" panose="020B0503030403020204" pitchFamily="34" charset="0"/>
+                  <a:ea typeface="Source Sans Pro" panose="020B0503030403020204" pitchFamily="34" charset="0"/>
+                  <a:cs typeface="Segoe UI Semibold" panose="020B0702040204020203" pitchFamily="34" charset="0"/>
+                </a:rPr>
+                <a:t>Please Turn Off/Silence Your Devices </a:t>
+              </a:r>
+              <a:r>
+                <a:rPr lang="zh-TW" altLang="en-US" sz="1600" b="1" dirty="0">
+                  <a:latin typeface="Source Sans Pro" panose="020B0503030403020204" pitchFamily="34" charset="0"/>
+                  <a:ea typeface="Microsoft JhengHei" panose="020B0604030504040204" pitchFamily="34" charset="-120"/>
+                </a:rPr>
+                <a:t>請靜音或關閉所有電子設備</a:t>
+              </a:r>
+              <a:endParaRPr lang="ja-JP" altLang="en-US" sz="1600" b="1" dirty="0">
+                <a:latin typeface="Source Sans Pro" panose="020B0503030403020204" pitchFamily="34" charset="0"/>
+                <a:ea typeface="Microsoft JhengHei" panose="020B0604030504040204" pitchFamily="34" charset="-120"/>
+              </a:endParaRPr>
+            </a:p>
+          </p:txBody>
+        </p:sp>
+        <p:pic>
+          <p:nvPicPr>
+            <p:cNvPr id="8" name="Picture 7" descr="Shape&#10;&#10;Description automatically generated with low confidence">
+              <a:extLst>
+                <a:ext uri="{FF2B5EF4-FFF2-40B4-BE49-F238E27FC236}">
+                  <a16:creationId xmlns:a16="http://schemas.microsoft.com/office/drawing/2014/main" id="{5473835D-54C0-38F1-4A61-4A4FA9F1A7DB}"/>
+                </a:ext>
+              </a:extLst>
+            </p:cNvPr>
+            <p:cNvPicPr>
+              <a:picLocks noChangeAspect="1"/>
+            </p:cNvPicPr>
+            <p:nvPr/>
+          </p:nvPicPr>
+          <p:blipFill>
+            <a:blip r:embed="rId5" cstate="print">
+              <a:extLst>
+                <a:ext uri="{BEBA8EAE-BF5A-486C-A8C5-ECC9F3942E4B}">
+                  <a14:imgProps xmlns:a14="http://schemas.microsoft.com/office/drawing/2010/main">
+                    <a14:imgLayer r:embed="rId6">
+                      <a14:imgEffect>
+                        <a14:colorTemperature colorTemp="11500"/>
+                      </a14:imgEffect>
+                      <a14:imgEffect>
+                        <a14:saturation sat="400000"/>
+                      </a14:imgEffect>
+                      <a14:imgEffect>
+                        <a14:brightnessContrast bright="-40000" contrast="-40000"/>
+                      </a14:imgEffect>
+                    </a14:imgLayer>
+                  </a14:imgProps>
+                </a:ext>
+                <a:ext uri="{28A0092B-C50C-407E-A947-70E740481C1C}">
+                  <a14:useLocalDpi xmlns:a14="http://schemas.microsoft.com/office/drawing/2010/main" val="0"/>
+                </a:ext>
+              </a:extLst>
+            </a:blip>
+            <a:stretch>
+              <a:fillRect/>
+            </a:stretch>
+          </p:blipFill>
+          <p:spPr>
+            <a:xfrm>
+              <a:off x="11583067" y="6279910"/>
+              <a:ext cx="348008" cy="348008"/>
             </a:xfrm>
             <a:prstGeom prst="rect">
               <a:avLst/>
@@ -8660,135 +8649,6 @@
       </p:cxnSp>
       <p:grpSp>
         <p:nvGrpSpPr>
-          <p:cNvPr id="11" name="Group 10">
-            <a:extLst>
-              <a:ext uri="{FF2B5EF4-FFF2-40B4-BE49-F238E27FC236}">
-                <a16:creationId xmlns:a16="http://schemas.microsoft.com/office/drawing/2014/main" id="{73DB8264-F158-55BC-5A07-EBEA03C1601B}"/>
-              </a:ext>
-            </a:extLst>
-          </p:cNvPr>
-          <p:cNvGrpSpPr/>
-          <p:nvPr/>
-        </p:nvGrpSpPr>
-        <p:grpSpPr>
-          <a:xfrm>
-            <a:off x="6744072" y="6335420"/>
-            <a:ext cx="5337952" cy="346472"/>
-            <a:chOff x="4943872" y="6231733"/>
-            <a:chExt cx="7030907" cy="444368"/>
-          </a:xfrm>
-        </p:grpSpPr>
-        <p:sp>
-          <p:nvSpPr>
-            <p:cNvPr id="13" name="TextBox 12">
-              <a:extLst>
-                <a:ext uri="{FF2B5EF4-FFF2-40B4-BE49-F238E27FC236}">
-                  <a16:creationId xmlns:a16="http://schemas.microsoft.com/office/drawing/2014/main" id="{AA091F8C-56CC-67B8-DD5F-BB0BCB61B42B}"/>
-                </a:ext>
-              </a:extLst>
-            </p:cNvPr>
-            <p:cNvSpPr txBox="1"/>
-            <p:nvPr/>
-          </p:nvSpPr>
-          <p:spPr>
-            <a:xfrm>
-              <a:off x="4943872" y="6231733"/>
-              <a:ext cx="7030907" cy="444368"/>
-            </a:xfrm>
-            <a:prstGeom prst="roundRect">
-              <a:avLst>
-                <a:gd name="adj" fmla="val 20010"/>
-              </a:avLst>
-            </a:prstGeom>
-            <a:noFill/>
-            <a:ln w="19050">
-              <a:solidFill>
-                <a:srgbClr val="FF0000"/>
-              </a:solidFill>
-            </a:ln>
-          </p:spPr>
-          <p:txBody>
-            <a:bodyPr wrap="square" rtlCol="0" anchor="ctr">
-              <a:spAutoFit/>
-            </a:bodyPr>
-            <a:lstStyle/>
-            <a:p>
-              <a:r>
-                <a:rPr lang="en-GB" sz="1400" b="1" dirty="0">
-                  <a:latin typeface="Source Sans Pro" panose="020B0503030403020204" pitchFamily="34" charset="0"/>
-                  <a:ea typeface="Source Sans Pro" panose="020B0503030403020204" pitchFamily="34" charset="0"/>
-                  <a:cs typeface="Segoe UI Semibold" panose="020B0702040204020203" pitchFamily="34" charset="0"/>
-                </a:rPr>
-                <a:t>Please Turn Off/Silence Your Devices </a:t>
-              </a:r>
-              <a:r>
-                <a:rPr lang="zh-TW" altLang="en-US" sz="1400" b="1" dirty="0">
-                  <a:latin typeface="Source Sans Pro" panose="020B0503030403020204" pitchFamily="34" charset="0"/>
-                  <a:ea typeface="Microsoft JhengHei" panose="020B0604030504040204" pitchFamily="34" charset="-120"/>
-                </a:rPr>
-                <a:t>請靜音或關閉所有電子設備</a:t>
-              </a:r>
-              <a:endParaRPr lang="ja-JP" altLang="en-US" sz="1400" b="1" dirty="0">
-                <a:latin typeface="Source Sans Pro" panose="020B0503030403020204" pitchFamily="34" charset="0"/>
-                <a:ea typeface="Microsoft JhengHei" panose="020B0604030504040204" pitchFamily="34" charset="-120"/>
-              </a:endParaRPr>
-            </a:p>
-          </p:txBody>
-        </p:sp>
-        <p:pic>
-          <p:nvPicPr>
-            <p:cNvPr id="14" name="Picture 13" descr="Shape&#10;&#10;Description automatically generated with low confidence">
-              <a:extLst>
-                <a:ext uri="{FF2B5EF4-FFF2-40B4-BE49-F238E27FC236}">
-                  <a16:creationId xmlns:a16="http://schemas.microsoft.com/office/drawing/2014/main" id="{B326A042-3BCF-3CF8-3EC2-EA401CCDC1D0}"/>
-                </a:ext>
-              </a:extLst>
-            </p:cNvPr>
-            <p:cNvPicPr>
-              <a:picLocks noChangeAspect="1"/>
-            </p:cNvPicPr>
-            <p:nvPr/>
-          </p:nvPicPr>
-          <p:blipFill>
-            <a:blip r:embed="rId3" cstate="print">
-              <a:extLst>
-                <a:ext uri="{BEBA8EAE-BF5A-486C-A8C5-ECC9F3942E4B}">
-                  <a14:imgProps xmlns:a14="http://schemas.microsoft.com/office/drawing/2010/main">
-                    <a14:imgLayer r:embed="rId4">
-                      <a14:imgEffect>
-                        <a14:colorTemperature colorTemp="11500"/>
-                      </a14:imgEffect>
-                      <a14:imgEffect>
-                        <a14:saturation sat="400000"/>
-                      </a14:imgEffect>
-                      <a14:imgEffect>
-                        <a14:brightnessContrast bright="-40000" contrast="-40000"/>
-                      </a14:imgEffect>
-                    </a14:imgLayer>
-                  </a14:imgProps>
-                </a:ext>
-                <a:ext uri="{28A0092B-C50C-407E-A947-70E740481C1C}">
-                  <a14:useLocalDpi xmlns:a14="http://schemas.microsoft.com/office/drawing/2010/main" val="0"/>
-                </a:ext>
-              </a:extLst>
-            </a:blip>
-            <a:stretch>
-              <a:fillRect/>
-            </a:stretch>
-          </p:blipFill>
-          <p:spPr>
-            <a:xfrm>
-              <a:off x="11658489" y="6309320"/>
-              <a:ext cx="280267" cy="280267"/>
-            </a:xfrm>
-            <a:prstGeom prst="rect">
-              <a:avLst/>
-            </a:prstGeom>
-          </p:spPr>
-        </p:pic>
-      </p:grpSp>
-      <p:grpSp>
-        <p:nvGrpSpPr>
           <p:cNvPr id="9" name="Group 8">
             <a:extLst>
               <a:ext uri="{FF2B5EF4-FFF2-40B4-BE49-F238E27FC236}">
@@ -8822,7 +8682,7 @@
             <p:nvPr/>
           </p:nvPicPr>
           <p:blipFill>
-            <a:blip r:embed="rId5" cstate="print">
+            <a:blip r:embed="rId3" cstate="print">
               <a:biLevel thresh="75000"/>
               <a:extLst>
                 <a:ext uri="{28A0092B-C50C-407E-A947-70E740481C1C}">
@@ -8859,7 +8719,7 @@
             <p:nvPr/>
           </p:nvPicPr>
           <p:blipFill rotWithShape="1">
-            <a:blip r:embed="rId6" cstate="print">
+            <a:blip r:embed="rId4" cstate="print">
               <a:biLevel thresh="75000"/>
               <a:extLst>
                 <a:ext uri="{28A0092B-C50C-407E-A947-70E740481C1C}">
@@ -8874,6 +8734,135 @@
             <a:xfrm>
               <a:off x="6745384" y="4609005"/>
               <a:ext cx="3595842" cy="841456"/>
+            </a:xfrm>
+            <a:prstGeom prst="rect">
+              <a:avLst/>
+            </a:prstGeom>
+          </p:spPr>
+        </p:pic>
+      </p:grpSp>
+      <p:grpSp>
+        <p:nvGrpSpPr>
+          <p:cNvPr id="2" name="Group 1">
+            <a:extLst>
+              <a:ext uri="{FF2B5EF4-FFF2-40B4-BE49-F238E27FC236}">
+                <a16:creationId xmlns:a16="http://schemas.microsoft.com/office/drawing/2014/main" id="{0C4DCD01-F533-D0DB-7F33-AE31162B0AE9}"/>
+              </a:ext>
+            </a:extLst>
+          </p:cNvPr>
+          <p:cNvGrpSpPr/>
+          <p:nvPr/>
+        </p:nvGrpSpPr>
+        <p:grpSpPr>
+          <a:xfrm>
+            <a:off x="5951984" y="6318094"/>
+            <a:ext cx="6130040" cy="381119"/>
+            <a:chOff x="3900570" y="6209512"/>
+            <a:chExt cx="8074208" cy="488804"/>
+          </a:xfrm>
+        </p:grpSpPr>
+        <p:sp>
+          <p:nvSpPr>
+            <p:cNvPr id="4" name="TextBox 3">
+              <a:extLst>
+                <a:ext uri="{FF2B5EF4-FFF2-40B4-BE49-F238E27FC236}">
+                  <a16:creationId xmlns:a16="http://schemas.microsoft.com/office/drawing/2014/main" id="{CA779E26-5AE4-C061-0771-74282A5EFBFC}"/>
+                </a:ext>
+              </a:extLst>
+            </p:cNvPr>
+            <p:cNvSpPr txBox="1"/>
+            <p:nvPr/>
+          </p:nvSpPr>
+          <p:spPr>
+            <a:xfrm>
+              <a:off x="3900570" y="6209512"/>
+              <a:ext cx="8074208" cy="488804"/>
+            </a:xfrm>
+            <a:prstGeom prst="roundRect">
+              <a:avLst>
+                <a:gd name="adj" fmla="val 20010"/>
+              </a:avLst>
+            </a:prstGeom>
+            <a:noFill/>
+            <a:ln w="19050">
+              <a:solidFill>
+                <a:srgbClr val="FF0000"/>
+              </a:solidFill>
+            </a:ln>
+          </p:spPr>
+          <p:txBody>
+            <a:bodyPr wrap="square" rtlCol="0" anchor="ctr">
+              <a:spAutoFit/>
+            </a:bodyPr>
+            <a:lstStyle/>
+            <a:p>
+              <a:r>
+                <a:rPr lang="en-GB" sz="1600" b="1" dirty="0">
+                  <a:latin typeface="Source Sans Pro" panose="020B0503030403020204" pitchFamily="34" charset="0"/>
+                  <a:ea typeface="Source Sans Pro" panose="020B0503030403020204" pitchFamily="34" charset="0"/>
+                  <a:cs typeface="Segoe UI Semibold" panose="020B0702040204020203" pitchFamily="34" charset="0"/>
+                </a:rPr>
+                <a:t>Please Turn Off/Silence Your Devices </a:t>
+              </a:r>
+              <a:r>
+                <a:rPr lang="zh-TW" altLang="en-US" sz="1600" b="1" dirty="0">
+                  <a:latin typeface="Source Sans Pro" panose="020B0503030403020204" pitchFamily="34" charset="0"/>
+                  <a:ea typeface="Microsoft JhengHei" panose="020B0604030504040204" pitchFamily="34" charset="-120"/>
+                </a:rPr>
+                <a:t>請靜音或關閉所有電子設備</a:t>
+              </a:r>
+              <a:endParaRPr lang="ja-JP" altLang="en-US" sz="1600" b="1" dirty="0">
+                <a:latin typeface="Source Sans Pro" panose="020B0503030403020204" pitchFamily="34" charset="0"/>
+                <a:ea typeface="Microsoft JhengHei" panose="020B0604030504040204" pitchFamily="34" charset="-120"/>
+              </a:endParaRPr>
+            </a:p>
+          </p:txBody>
+        </p:sp>
+        <p:pic>
+          <p:nvPicPr>
+            <p:cNvPr id="5" name="Picture 4" descr="Shape&#10;&#10;Description automatically generated with low confidence">
+              <a:extLst>
+                <a:ext uri="{FF2B5EF4-FFF2-40B4-BE49-F238E27FC236}">
+                  <a16:creationId xmlns:a16="http://schemas.microsoft.com/office/drawing/2014/main" id="{FE203ED7-5A90-07EA-C1AB-C2B10D34433D}"/>
+                </a:ext>
+              </a:extLst>
+            </p:cNvPr>
+            <p:cNvPicPr>
+              <a:picLocks noChangeAspect="1"/>
+            </p:cNvPicPr>
+            <p:nvPr/>
+          </p:nvPicPr>
+          <p:blipFill>
+            <a:blip r:embed="rId5" cstate="print">
+              <a:extLst>
+                <a:ext uri="{BEBA8EAE-BF5A-486C-A8C5-ECC9F3942E4B}">
+                  <a14:imgProps xmlns:a14="http://schemas.microsoft.com/office/drawing/2010/main">
+                    <a14:imgLayer r:embed="rId6">
+                      <a14:imgEffect>
+                        <a14:colorTemperature colorTemp="11500"/>
+                      </a14:imgEffect>
+                      <a14:imgEffect>
+                        <a14:saturation sat="400000"/>
+                      </a14:imgEffect>
+                      <a14:imgEffect>
+                        <a14:brightnessContrast bright="-40000" contrast="-40000"/>
+                      </a14:imgEffect>
+                    </a14:imgLayer>
+                  </a14:imgProps>
+                </a:ext>
+                <a:ext uri="{28A0092B-C50C-407E-A947-70E740481C1C}">
+                  <a14:useLocalDpi xmlns:a14="http://schemas.microsoft.com/office/drawing/2010/main" val="0"/>
+                </a:ext>
+              </a:extLst>
+            </a:blip>
+            <a:stretch>
+              <a:fillRect/>
+            </a:stretch>
+          </p:blipFill>
+          <p:spPr>
+            <a:xfrm>
+              <a:off x="11583067" y="6279910"/>
+              <a:ext cx="348008" cy="348008"/>
             </a:xfrm>
             <a:prstGeom prst="rect">
               <a:avLst/>
@@ -9115,135 +9104,6 @@
       </p:cxnSp>
       <p:grpSp>
         <p:nvGrpSpPr>
-          <p:cNvPr id="8" name="Group 7">
-            <a:extLst>
-              <a:ext uri="{FF2B5EF4-FFF2-40B4-BE49-F238E27FC236}">
-                <a16:creationId xmlns:a16="http://schemas.microsoft.com/office/drawing/2014/main" id="{878809A9-4ADC-F8CC-4A5F-0615899B85EF}"/>
-              </a:ext>
-            </a:extLst>
-          </p:cNvPr>
-          <p:cNvGrpSpPr/>
-          <p:nvPr/>
-        </p:nvGrpSpPr>
-        <p:grpSpPr>
-          <a:xfrm>
-            <a:off x="6744072" y="6335420"/>
-            <a:ext cx="5337952" cy="346472"/>
-            <a:chOff x="4943872" y="6231733"/>
-            <a:chExt cx="7030907" cy="444368"/>
-          </a:xfrm>
-        </p:grpSpPr>
-        <p:sp>
-          <p:nvSpPr>
-            <p:cNvPr id="11" name="TextBox 10">
-              <a:extLst>
-                <a:ext uri="{FF2B5EF4-FFF2-40B4-BE49-F238E27FC236}">
-                  <a16:creationId xmlns:a16="http://schemas.microsoft.com/office/drawing/2014/main" id="{0F6C6C20-ED22-5979-0F5C-FD476ED21FE4}"/>
-                </a:ext>
-              </a:extLst>
-            </p:cNvPr>
-            <p:cNvSpPr txBox="1"/>
-            <p:nvPr/>
-          </p:nvSpPr>
-          <p:spPr>
-            <a:xfrm>
-              <a:off x="4943872" y="6231733"/>
-              <a:ext cx="7030907" cy="444368"/>
-            </a:xfrm>
-            <a:prstGeom prst="roundRect">
-              <a:avLst>
-                <a:gd name="adj" fmla="val 20010"/>
-              </a:avLst>
-            </a:prstGeom>
-            <a:noFill/>
-            <a:ln w="19050">
-              <a:solidFill>
-                <a:srgbClr val="FF0000"/>
-              </a:solidFill>
-            </a:ln>
-          </p:spPr>
-          <p:txBody>
-            <a:bodyPr wrap="square" rtlCol="0" anchor="ctr">
-              <a:spAutoFit/>
-            </a:bodyPr>
-            <a:lstStyle/>
-            <a:p>
-              <a:r>
-                <a:rPr lang="en-GB" sz="1400" b="1" dirty="0">
-                  <a:latin typeface="Source Sans Pro" panose="020B0503030403020204" pitchFamily="34" charset="0"/>
-                  <a:ea typeface="Source Sans Pro" panose="020B0503030403020204" pitchFamily="34" charset="0"/>
-                  <a:cs typeface="Segoe UI Semibold" panose="020B0702040204020203" pitchFamily="34" charset="0"/>
-                </a:rPr>
-                <a:t>Please Turn Off/Silence Your Devices </a:t>
-              </a:r>
-              <a:r>
-                <a:rPr lang="zh-TW" altLang="en-US" sz="1400" b="1" dirty="0">
-                  <a:latin typeface="Source Sans Pro" panose="020B0503030403020204" pitchFamily="34" charset="0"/>
-                  <a:ea typeface="Microsoft JhengHei" panose="020B0604030504040204" pitchFamily="34" charset="-120"/>
-                </a:rPr>
-                <a:t>請靜音或關閉所有電子設備</a:t>
-              </a:r>
-              <a:endParaRPr lang="ja-JP" altLang="en-US" sz="1400" b="1" dirty="0">
-                <a:latin typeface="Source Sans Pro" panose="020B0503030403020204" pitchFamily="34" charset="0"/>
-                <a:ea typeface="Microsoft JhengHei" panose="020B0604030504040204" pitchFamily="34" charset="-120"/>
-              </a:endParaRPr>
-            </a:p>
-          </p:txBody>
-        </p:sp>
-        <p:pic>
-          <p:nvPicPr>
-            <p:cNvPr id="14" name="Picture 13" descr="Shape&#10;&#10;Description automatically generated with low confidence">
-              <a:extLst>
-                <a:ext uri="{FF2B5EF4-FFF2-40B4-BE49-F238E27FC236}">
-                  <a16:creationId xmlns:a16="http://schemas.microsoft.com/office/drawing/2014/main" id="{B995DAF9-696A-0966-F82A-F13D7D3B3C81}"/>
-                </a:ext>
-              </a:extLst>
-            </p:cNvPr>
-            <p:cNvPicPr>
-              <a:picLocks noChangeAspect="1"/>
-            </p:cNvPicPr>
-            <p:nvPr/>
-          </p:nvPicPr>
-          <p:blipFill>
-            <a:blip r:embed="rId3" cstate="print">
-              <a:extLst>
-                <a:ext uri="{BEBA8EAE-BF5A-486C-A8C5-ECC9F3942E4B}">
-                  <a14:imgProps xmlns:a14="http://schemas.microsoft.com/office/drawing/2010/main">
-                    <a14:imgLayer r:embed="rId4">
-                      <a14:imgEffect>
-                        <a14:colorTemperature colorTemp="11500"/>
-                      </a14:imgEffect>
-                      <a14:imgEffect>
-                        <a14:saturation sat="400000"/>
-                      </a14:imgEffect>
-                      <a14:imgEffect>
-                        <a14:brightnessContrast bright="-40000" contrast="-40000"/>
-                      </a14:imgEffect>
-                    </a14:imgLayer>
-                  </a14:imgProps>
-                </a:ext>
-                <a:ext uri="{28A0092B-C50C-407E-A947-70E740481C1C}">
-                  <a14:useLocalDpi xmlns:a14="http://schemas.microsoft.com/office/drawing/2010/main" val="0"/>
-                </a:ext>
-              </a:extLst>
-            </a:blip>
-            <a:stretch>
-              <a:fillRect/>
-            </a:stretch>
-          </p:blipFill>
-          <p:spPr>
-            <a:xfrm>
-              <a:off x="11658489" y="6309320"/>
-              <a:ext cx="280267" cy="280267"/>
-            </a:xfrm>
-            <a:prstGeom prst="rect">
-              <a:avLst/>
-            </a:prstGeom>
-          </p:spPr>
-        </p:pic>
-      </p:grpSp>
-      <p:grpSp>
-        <p:nvGrpSpPr>
           <p:cNvPr id="2" name="Group 1">
             <a:extLst>
               <a:ext uri="{FF2B5EF4-FFF2-40B4-BE49-F238E27FC236}">
@@ -9277,7 +9137,7 @@
             <p:nvPr/>
           </p:nvPicPr>
           <p:blipFill>
-            <a:blip r:embed="rId5" cstate="print">
+            <a:blip r:embed="rId3" cstate="print">
               <a:biLevel thresh="75000"/>
               <a:extLst>
                 <a:ext uri="{28A0092B-C50C-407E-A947-70E740481C1C}">
@@ -9314,7 +9174,7 @@
             <p:nvPr/>
           </p:nvPicPr>
           <p:blipFill rotWithShape="1">
-            <a:blip r:embed="rId6" cstate="print">
+            <a:blip r:embed="rId4" cstate="print">
               <a:biLevel thresh="75000"/>
               <a:extLst>
                 <a:ext uri="{28A0092B-C50C-407E-A947-70E740481C1C}">
@@ -9329,6 +9189,135 @@
             <a:xfrm>
               <a:off x="6745384" y="4609005"/>
               <a:ext cx="3595842" cy="841456"/>
+            </a:xfrm>
+            <a:prstGeom prst="rect">
+              <a:avLst/>
+            </a:prstGeom>
+          </p:spPr>
+        </p:pic>
+      </p:grpSp>
+      <p:grpSp>
+        <p:nvGrpSpPr>
+          <p:cNvPr id="6" name="Group 5">
+            <a:extLst>
+              <a:ext uri="{FF2B5EF4-FFF2-40B4-BE49-F238E27FC236}">
+                <a16:creationId xmlns:a16="http://schemas.microsoft.com/office/drawing/2014/main" id="{702E56C3-3C87-EB7C-8382-9F614BEFE1E2}"/>
+              </a:ext>
+            </a:extLst>
+          </p:cNvPr>
+          <p:cNvGrpSpPr/>
+          <p:nvPr/>
+        </p:nvGrpSpPr>
+        <p:grpSpPr>
+          <a:xfrm>
+            <a:off x="5951984" y="6318094"/>
+            <a:ext cx="6130040" cy="381119"/>
+            <a:chOff x="3900570" y="6209512"/>
+            <a:chExt cx="8074208" cy="488804"/>
+          </a:xfrm>
+        </p:grpSpPr>
+        <p:sp>
+          <p:nvSpPr>
+            <p:cNvPr id="7" name="TextBox 6">
+              <a:extLst>
+                <a:ext uri="{FF2B5EF4-FFF2-40B4-BE49-F238E27FC236}">
+                  <a16:creationId xmlns:a16="http://schemas.microsoft.com/office/drawing/2014/main" id="{0A55337A-AADB-6D6B-F423-3C94AEFD8966}"/>
+                </a:ext>
+              </a:extLst>
+            </p:cNvPr>
+            <p:cNvSpPr txBox="1"/>
+            <p:nvPr/>
+          </p:nvSpPr>
+          <p:spPr>
+            <a:xfrm>
+              <a:off x="3900570" y="6209512"/>
+              <a:ext cx="8074208" cy="488804"/>
+            </a:xfrm>
+            <a:prstGeom prst="roundRect">
+              <a:avLst>
+                <a:gd name="adj" fmla="val 20010"/>
+              </a:avLst>
+            </a:prstGeom>
+            <a:noFill/>
+            <a:ln w="19050">
+              <a:solidFill>
+                <a:srgbClr val="FF0000"/>
+              </a:solidFill>
+            </a:ln>
+          </p:spPr>
+          <p:txBody>
+            <a:bodyPr wrap="square" rtlCol="0" anchor="ctr">
+              <a:spAutoFit/>
+            </a:bodyPr>
+            <a:lstStyle/>
+            <a:p>
+              <a:r>
+                <a:rPr lang="en-GB" sz="1600" b="1" dirty="0">
+                  <a:latin typeface="Source Sans Pro" panose="020B0503030403020204" pitchFamily="34" charset="0"/>
+                  <a:ea typeface="Source Sans Pro" panose="020B0503030403020204" pitchFamily="34" charset="0"/>
+                  <a:cs typeface="Segoe UI Semibold" panose="020B0702040204020203" pitchFamily="34" charset="0"/>
+                </a:rPr>
+                <a:t>Please Turn Off/Silence Your Devices </a:t>
+              </a:r>
+              <a:r>
+                <a:rPr lang="zh-TW" altLang="en-US" sz="1600" b="1" dirty="0">
+                  <a:latin typeface="Source Sans Pro" panose="020B0503030403020204" pitchFamily="34" charset="0"/>
+                  <a:ea typeface="Microsoft JhengHei" panose="020B0604030504040204" pitchFamily="34" charset="-120"/>
+                </a:rPr>
+                <a:t>請靜音或關閉所有電子設備</a:t>
+              </a:r>
+              <a:endParaRPr lang="ja-JP" altLang="en-US" sz="1600" b="1" dirty="0">
+                <a:latin typeface="Source Sans Pro" panose="020B0503030403020204" pitchFamily="34" charset="0"/>
+                <a:ea typeface="Microsoft JhengHei" panose="020B0604030504040204" pitchFamily="34" charset="-120"/>
+              </a:endParaRPr>
+            </a:p>
+          </p:txBody>
+        </p:sp>
+        <p:pic>
+          <p:nvPicPr>
+            <p:cNvPr id="9" name="Picture 8" descr="Shape&#10;&#10;Description automatically generated with low confidence">
+              <a:extLst>
+                <a:ext uri="{FF2B5EF4-FFF2-40B4-BE49-F238E27FC236}">
+                  <a16:creationId xmlns:a16="http://schemas.microsoft.com/office/drawing/2014/main" id="{D9FC682E-3882-3060-F7AB-43EE5A9993B9}"/>
+                </a:ext>
+              </a:extLst>
+            </p:cNvPr>
+            <p:cNvPicPr>
+              <a:picLocks noChangeAspect="1"/>
+            </p:cNvPicPr>
+            <p:nvPr/>
+          </p:nvPicPr>
+          <p:blipFill>
+            <a:blip r:embed="rId5" cstate="print">
+              <a:extLst>
+                <a:ext uri="{BEBA8EAE-BF5A-486C-A8C5-ECC9F3942E4B}">
+                  <a14:imgProps xmlns:a14="http://schemas.microsoft.com/office/drawing/2010/main">
+                    <a14:imgLayer r:embed="rId6">
+                      <a14:imgEffect>
+                        <a14:colorTemperature colorTemp="11500"/>
+                      </a14:imgEffect>
+                      <a14:imgEffect>
+                        <a14:saturation sat="400000"/>
+                      </a14:imgEffect>
+                      <a14:imgEffect>
+                        <a14:brightnessContrast bright="-40000" contrast="-40000"/>
+                      </a14:imgEffect>
+                    </a14:imgLayer>
+                  </a14:imgProps>
+                </a:ext>
+                <a:ext uri="{28A0092B-C50C-407E-A947-70E740481C1C}">
+                  <a14:useLocalDpi xmlns:a14="http://schemas.microsoft.com/office/drawing/2010/main" val="0"/>
+                </a:ext>
+              </a:extLst>
+            </a:blip>
+            <a:stretch>
+              <a:fillRect/>
+            </a:stretch>
+          </p:blipFill>
+          <p:spPr>
+            <a:xfrm>
+              <a:off x="11583067" y="6279910"/>
+              <a:ext cx="348008" cy="348008"/>
             </a:xfrm>
             <a:prstGeom prst="rect">
               <a:avLst/>
@@ -9842,135 +9831,6 @@
       </p:cxnSp>
       <p:grpSp>
         <p:nvGrpSpPr>
-          <p:cNvPr id="4" name="Group 3">
-            <a:extLst>
-              <a:ext uri="{FF2B5EF4-FFF2-40B4-BE49-F238E27FC236}">
-                <a16:creationId xmlns:a16="http://schemas.microsoft.com/office/drawing/2014/main" id="{693E133D-DF1B-7F7D-6550-2495E4BBD097}"/>
-              </a:ext>
-            </a:extLst>
-          </p:cNvPr>
-          <p:cNvGrpSpPr/>
-          <p:nvPr/>
-        </p:nvGrpSpPr>
-        <p:grpSpPr>
-          <a:xfrm>
-            <a:off x="6744072" y="6335420"/>
-            <a:ext cx="5337952" cy="346472"/>
-            <a:chOff x="4943872" y="6231733"/>
-            <a:chExt cx="7030907" cy="444368"/>
-          </a:xfrm>
-        </p:grpSpPr>
-        <p:sp>
-          <p:nvSpPr>
-            <p:cNvPr id="9" name="TextBox 8">
-              <a:extLst>
-                <a:ext uri="{FF2B5EF4-FFF2-40B4-BE49-F238E27FC236}">
-                  <a16:creationId xmlns:a16="http://schemas.microsoft.com/office/drawing/2014/main" id="{4FAE7F7B-A496-507F-A835-8274147A0967}"/>
-                </a:ext>
-              </a:extLst>
-            </p:cNvPr>
-            <p:cNvSpPr txBox="1"/>
-            <p:nvPr/>
-          </p:nvSpPr>
-          <p:spPr>
-            <a:xfrm>
-              <a:off x="4943872" y="6231733"/>
-              <a:ext cx="7030907" cy="444368"/>
-            </a:xfrm>
-            <a:prstGeom prst="roundRect">
-              <a:avLst>
-                <a:gd name="adj" fmla="val 20010"/>
-              </a:avLst>
-            </a:prstGeom>
-            <a:noFill/>
-            <a:ln w="19050">
-              <a:solidFill>
-                <a:srgbClr val="FF0000"/>
-              </a:solidFill>
-            </a:ln>
-          </p:spPr>
-          <p:txBody>
-            <a:bodyPr wrap="square" rtlCol="0" anchor="ctr">
-              <a:spAutoFit/>
-            </a:bodyPr>
-            <a:lstStyle/>
-            <a:p>
-              <a:r>
-                <a:rPr lang="en-GB" sz="1400" b="1" dirty="0">
-                  <a:latin typeface="Source Sans Pro" panose="020B0503030403020204" pitchFamily="34" charset="0"/>
-                  <a:ea typeface="Source Sans Pro" panose="020B0503030403020204" pitchFamily="34" charset="0"/>
-                  <a:cs typeface="Segoe UI Semibold" panose="020B0702040204020203" pitchFamily="34" charset="0"/>
-                </a:rPr>
-                <a:t>Please Turn Off/Silence Your Devices </a:t>
-              </a:r>
-              <a:r>
-                <a:rPr lang="zh-TW" altLang="en-US" sz="1400" b="1" dirty="0">
-                  <a:latin typeface="Source Sans Pro" panose="020B0503030403020204" pitchFamily="34" charset="0"/>
-                  <a:ea typeface="Microsoft JhengHei" panose="020B0604030504040204" pitchFamily="34" charset="-120"/>
-                </a:rPr>
-                <a:t>請靜音或關閉所有電子設備</a:t>
-              </a:r>
-              <a:endParaRPr lang="ja-JP" altLang="en-US" sz="1400" b="1" dirty="0">
-                <a:latin typeface="Source Sans Pro" panose="020B0503030403020204" pitchFamily="34" charset="0"/>
-                <a:ea typeface="Microsoft JhengHei" panose="020B0604030504040204" pitchFamily="34" charset="-120"/>
-              </a:endParaRPr>
-            </a:p>
-          </p:txBody>
-        </p:sp>
-        <p:pic>
-          <p:nvPicPr>
-            <p:cNvPr id="10" name="Picture 9" descr="Shape&#10;&#10;Description automatically generated with low confidence">
-              <a:extLst>
-                <a:ext uri="{FF2B5EF4-FFF2-40B4-BE49-F238E27FC236}">
-                  <a16:creationId xmlns:a16="http://schemas.microsoft.com/office/drawing/2014/main" id="{40D80585-4F91-1EB0-DBD6-D5F00DF97B6B}"/>
-                </a:ext>
-              </a:extLst>
-            </p:cNvPr>
-            <p:cNvPicPr>
-              <a:picLocks noChangeAspect="1"/>
-            </p:cNvPicPr>
-            <p:nvPr/>
-          </p:nvPicPr>
-          <p:blipFill>
-            <a:blip r:embed="rId3" cstate="print">
-              <a:extLst>
-                <a:ext uri="{BEBA8EAE-BF5A-486C-A8C5-ECC9F3942E4B}">
-                  <a14:imgProps xmlns:a14="http://schemas.microsoft.com/office/drawing/2010/main">
-                    <a14:imgLayer r:embed="rId4">
-                      <a14:imgEffect>
-                        <a14:colorTemperature colorTemp="11500"/>
-                      </a14:imgEffect>
-                      <a14:imgEffect>
-                        <a14:saturation sat="400000"/>
-                      </a14:imgEffect>
-                      <a14:imgEffect>
-                        <a14:brightnessContrast bright="-40000" contrast="-40000"/>
-                      </a14:imgEffect>
-                    </a14:imgLayer>
-                  </a14:imgProps>
-                </a:ext>
-                <a:ext uri="{28A0092B-C50C-407E-A947-70E740481C1C}">
-                  <a14:useLocalDpi xmlns:a14="http://schemas.microsoft.com/office/drawing/2010/main" val="0"/>
-                </a:ext>
-              </a:extLst>
-            </a:blip>
-            <a:stretch>
-              <a:fillRect/>
-            </a:stretch>
-          </p:blipFill>
-          <p:spPr>
-            <a:xfrm>
-              <a:off x="11658489" y="6309320"/>
-              <a:ext cx="280267" cy="280267"/>
-            </a:xfrm>
-            <a:prstGeom prst="rect">
-              <a:avLst/>
-            </a:prstGeom>
-          </p:spPr>
-        </p:pic>
-      </p:grpSp>
-      <p:grpSp>
-        <p:nvGrpSpPr>
           <p:cNvPr id="12" name="Group 11">
             <a:extLst>
               <a:ext uri="{FF2B5EF4-FFF2-40B4-BE49-F238E27FC236}">
@@ -10004,7 +9864,7 @@
             <p:nvPr/>
           </p:nvPicPr>
           <p:blipFill>
-            <a:blip r:embed="rId5" cstate="print">
+            <a:blip r:embed="rId3" cstate="print">
               <a:biLevel thresh="75000"/>
               <a:extLst>
                 <a:ext uri="{28A0092B-C50C-407E-A947-70E740481C1C}">
@@ -10041,7 +9901,7 @@
             <p:nvPr/>
           </p:nvPicPr>
           <p:blipFill rotWithShape="1">
-            <a:blip r:embed="rId6" cstate="print">
+            <a:blip r:embed="rId4" cstate="print">
               <a:biLevel thresh="75000"/>
               <a:extLst>
                 <a:ext uri="{28A0092B-C50C-407E-A947-70E740481C1C}">
@@ -10056,6 +9916,135 @@
             <a:xfrm>
               <a:off x="6745384" y="4609005"/>
               <a:ext cx="3595842" cy="841456"/>
+            </a:xfrm>
+            <a:prstGeom prst="rect">
+              <a:avLst/>
+            </a:prstGeom>
+          </p:spPr>
+        </p:pic>
+      </p:grpSp>
+      <p:grpSp>
+        <p:nvGrpSpPr>
+          <p:cNvPr id="3" name="Group 2">
+            <a:extLst>
+              <a:ext uri="{FF2B5EF4-FFF2-40B4-BE49-F238E27FC236}">
+                <a16:creationId xmlns:a16="http://schemas.microsoft.com/office/drawing/2014/main" id="{FB1FC76F-617A-2EDC-4039-7724B4CD712D}"/>
+              </a:ext>
+            </a:extLst>
+          </p:cNvPr>
+          <p:cNvGrpSpPr/>
+          <p:nvPr/>
+        </p:nvGrpSpPr>
+        <p:grpSpPr>
+          <a:xfrm>
+            <a:off x="5951984" y="6318094"/>
+            <a:ext cx="6130040" cy="381119"/>
+            <a:chOff x="3900570" y="6209512"/>
+            <a:chExt cx="8074208" cy="488804"/>
+          </a:xfrm>
+        </p:grpSpPr>
+        <p:sp>
+          <p:nvSpPr>
+            <p:cNvPr id="16" name="TextBox 15">
+              <a:extLst>
+                <a:ext uri="{FF2B5EF4-FFF2-40B4-BE49-F238E27FC236}">
+                  <a16:creationId xmlns:a16="http://schemas.microsoft.com/office/drawing/2014/main" id="{55F25537-3667-C3B7-D198-34E47B23F579}"/>
+                </a:ext>
+              </a:extLst>
+            </p:cNvPr>
+            <p:cNvSpPr txBox="1"/>
+            <p:nvPr/>
+          </p:nvSpPr>
+          <p:spPr>
+            <a:xfrm>
+              <a:off x="3900570" y="6209512"/>
+              <a:ext cx="8074208" cy="488804"/>
+            </a:xfrm>
+            <a:prstGeom prst="roundRect">
+              <a:avLst>
+                <a:gd name="adj" fmla="val 20010"/>
+              </a:avLst>
+            </a:prstGeom>
+            <a:noFill/>
+            <a:ln w="19050">
+              <a:solidFill>
+                <a:srgbClr val="FF0000"/>
+              </a:solidFill>
+            </a:ln>
+          </p:spPr>
+          <p:txBody>
+            <a:bodyPr wrap="square" rtlCol="0" anchor="ctr">
+              <a:spAutoFit/>
+            </a:bodyPr>
+            <a:lstStyle/>
+            <a:p>
+              <a:r>
+                <a:rPr lang="en-GB" sz="1600" b="1" dirty="0">
+                  <a:latin typeface="Source Sans Pro" panose="020B0503030403020204" pitchFamily="34" charset="0"/>
+                  <a:ea typeface="Source Sans Pro" panose="020B0503030403020204" pitchFamily="34" charset="0"/>
+                  <a:cs typeface="Segoe UI Semibold" panose="020B0702040204020203" pitchFamily="34" charset="0"/>
+                </a:rPr>
+                <a:t>Please Turn Off/Silence Your Devices </a:t>
+              </a:r>
+              <a:r>
+                <a:rPr lang="zh-TW" altLang="en-US" sz="1600" b="1" dirty="0">
+                  <a:latin typeface="Source Sans Pro" panose="020B0503030403020204" pitchFamily="34" charset="0"/>
+                  <a:ea typeface="Microsoft JhengHei" panose="020B0604030504040204" pitchFamily="34" charset="-120"/>
+                </a:rPr>
+                <a:t>請靜音或關閉所有電子設備</a:t>
+              </a:r>
+              <a:endParaRPr lang="ja-JP" altLang="en-US" sz="1600" b="1" dirty="0">
+                <a:latin typeface="Source Sans Pro" panose="020B0503030403020204" pitchFamily="34" charset="0"/>
+                <a:ea typeface="Microsoft JhengHei" panose="020B0604030504040204" pitchFamily="34" charset="-120"/>
+              </a:endParaRPr>
+            </a:p>
+          </p:txBody>
+        </p:sp>
+        <p:pic>
+          <p:nvPicPr>
+            <p:cNvPr id="18" name="Picture 17" descr="Shape&#10;&#10;Description automatically generated with low confidence">
+              <a:extLst>
+                <a:ext uri="{FF2B5EF4-FFF2-40B4-BE49-F238E27FC236}">
+                  <a16:creationId xmlns:a16="http://schemas.microsoft.com/office/drawing/2014/main" id="{D24884B4-E9EB-80EE-3B6F-640FA2B31C12}"/>
+                </a:ext>
+              </a:extLst>
+            </p:cNvPr>
+            <p:cNvPicPr>
+              <a:picLocks noChangeAspect="1"/>
+            </p:cNvPicPr>
+            <p:nvPr/>
+          </p:nvPicPr>
+          <p:blipFill>
+            <a:blip r:embed="rId5" cstate="print">
+              <a:extLst>
+                <a:ext uri="{BEBA8EAE-BF5A-486C-A8C5-ECC9F3942E4B}">
+                  <a14:imgProps xmlns:a14="http://schemas.microsoft.com/office/drawing/2010/main">
+                    <a14:imgLayer r:embed="rId6">
+                      <a14:imgEffect>
+                        <a14:colorTemperature colorTemp="11500"/>
+                      </a14:imgEffect>
+                      <a14:imgEffect>
+                        <a14:saturation sat="400000"/>
+                      </a14:imgEffect>
+                      <a14:imgEffect>
+                        <a14:brightnessContrast bright="-40000" contrast="-40000"/>
+                      </a14:imgEffect>
+                    </a14:imgLayer>
+                  </a14:imgProps>
+                </a:ext>
+                <a:ext uri="{28A0092B-C50C-407E-A947-70E740481C1C}">
+                  <a14:useLocalDpi xmlns:a14="http://schemas.microsoft.com/office/drawing/2010/main" val="0"/>
+                </a:ext>
+              </a:extLst>
+            </a:blip>
+            <a:stretch>
+              <a:fillRect/>
+            </a:stretch>
+          </p:blipFill>
+          <p:spPr>
+            <a:xfrm>
+              <a:off x="11583067" y="6279910"/>
+              <a:ext cx="348008" cy="348008"/>
             </a:xfrm>
             <a:prstGeom prst="rect">
               <a:avLst/>
@@ -10101,7 +10090,7 @@
         </p:nvSpPr>
         <p:spPr>
           <a:xfrm>
-            <a:off x="0" y="391868"/>
+            <a:off x="0" y="116632"/>
             <a:ext cx="12191999" cy="954107"/>
           </a:xfrm>
           <a:prstGeom prst="rect">
@@ -10158,8 +10147,8 @@
         </p:nvSpPr>
         <p:spPr>
           <a:xfrm>
-            <a:off x="335360" y="1988840"/>
-            <a:ext cx="5760640" cy="3416320"/>
+            <a:off x="335359" y="1679897"/>
+            <a:ext cx="5760640" cy="3693319"/>
           </a:xfrm>
           <a:prstGeom prst="rect">
             <a:avLst/>
@@ -10167,14 +10156,14 @@
           <a:noFill/>
         </p:spPr>
         <p:txBody>
-          <a:bodyPr wrap="square" lIns="0" rtlCol="0" anchor="ctr">
+          <a:bodyPr wrap="square" lIns="0" rtlCol="0" anchor="t">
             <a:spAutoFit/>
           </a:bodyPr>
           <a:lstStyle/>
           <a:p>
             <a:pPr algn="l"/>
             <a:r>
-              <a:rPr lang="en-GB" sz="2400" i="0" dirty="0">
+              <a:rPr lang="en-GB" sz="2600" i="0" dirty="0">
                 <a:effectLst/>
                 <a:latin typeface="Source Sans Pro Semibold" panose="020B0603030403020204" pitchFamily="34" charset="0"/>
                 <a:ea typeface="Source Sans Pro Semibold" panose="020B0603030403020204" pitchFamily="34" charset="0"/>
@@ -10185,7 +10174,7 @@
           <a:p>
             <a:pPr algn="l"/>
             <a:r>
-              <a:rPr lang="en-GB" sz="2400" i="0" dirty="0">
+              <a:rPr lang="en-GB" sz="2600" i="0" dirty="0">
                 <a:effectLst/>
                 <a:latin typeface="Source Sans Pro Semibold" panose="020B0603030403020204" pitchFamily="34" charset="0"/>
                 <a:ea typeface="Source Sans Pro Semibold" panose="020B0603030403020204" pitchFamily="34" charset="0"/>
@@ -10196,7 +10185,7 @@
           <a:p>
             <a:pPr algn="l"/>
             <a:r>
-              <a:rPr lang="en-GB" sz="2400" i="0" dirty="0">
+              <a:rPr lang="en-GB" sz="2600" i="0" dirty="0">
                 <a:effectLst/>
                 <a:latin typeface="Source Sans Pro Semibold" panose="020B0603030403020204" pitchFamily="34" charset="0"/>
                 <a:ea typeface="Source Sans Pro Semibold" panose="020B0603030403020204" pitchFamily="34" charset="0"/>
@@ -10204,7 +10193,7 @@
               <a:t>Begin by saying, </a:t>
             </a:r>
             <a:r>
-              <a:rPr lang="en-GB" sz="2400" b="1" i="1" dirty="0">
+              <a:rPr lang="en-GB" sz="2600" b="1" i="1" dirty="0">
                 <a:solidFill>
                   <a:schemeClr val="accent1">
                     <a:lumMod val="75000"/>
@@ -10216,7 +10205,7 @@
               </a:rPr>
               <a:t>“In the name of the Lord Jesus Christ I pray.”</a:t>
             </a:r>
-            <a:endParaRPr lang="en-GB" sz="2400" b="1" i="0" dirty="0">
+            <a:endParaRPr lang="en-GB" sz="2600" b="1" i="0" dirty="0">
               <a:solidFill>
                 <a:schemeClr val="accent1">
                   <a:lumMod val="75000"/>
@@ -10230,7 +10219,7 @@
           <a:p>
             <a:pPr algn="l"/>
             <a:r>
-              <a:rPr lang="en-GB" sz="2400" i="0" dirty="0">
+              <a:rPr lang="en-GB" sz="2600" i="0" dirty="0">
                 <a:effectLst/>
                 <a:latin typeface="Source Sans Pro Semibold" panose="020B0603030403020204" pitchFamily="34" charset="0"/>
                 <a:ea typeface="Source Sans Pro Semibold" panose="020B0603030403020204" pitchFamily="34" charset="0"/>
@@ -10238,7 +10227,7 @@
               <a:t>Praise the Lord by saying, </a:t>
             </a:r>
             <a:r>
-              <a:rPr lang="en-GB" sz="2400" b="1" i="1" dirty="0">
+              <a:rPr lang="en-GB" sz="2600" b="1" i="1" dirty="0">
                 <a:solidFill>
                   <a:schemeClr val="accent1">
                     <a:lumMod val="75000"/>
@@ -10250,7 +10239,7 @@
               </a:rPr>
               <a:t>“Hallelujah!”</a:t>
             </a:r>
-            <a:endParaRPr lang="en-GB" sz="2400" b="1" i="0" dirty="0">
+            <a:endParaRPr lang="en-GB" sz="2600" b="1" i="0" dirty="0">
               <a:solidFill>
                 <a:schemeClr val="accent1">
                   <a:lumMod val="75000"/>
@@ -10264,7 +10253,7 @@
           <a:p>
             <a:pPr algn="l"/>
             <a:r>
-              <a:rPr lang="en-GB" sz="2400" i="0" dirty="0">
+              <a:rPr lang="en-GB" sz="2600" i="0" dirty="0">
                 <a:effectLst/>
                 <a:latin typeface="Source Sans Pro Semibold" panose="020B0603030403020204" pitchFamily="34" charset="0"/>
                 <a:ea typeface="Source Sans Pro Semibold" panose="020B0603030403020204" pitchFamily="34" charset="0"/>
@@ -10275,7 +10264,7 @@
           <a:p>
             <a:pPr algn="l"/>
             <a:r>
-              <a:rPr lang="en-GB" sz="2400" i="0" dirty="0">
+              <a:rPr lang="en-GB" sz="2600" i="0" dirty="0">
                 <a:effectLst/>
                 <a:latin typeface="Source Sans Pro Semibold" panose="020B0603030403020204" pitchFamily="34" charset="0"/>
                 <a:ea typeface="Source Sans Pro Semibold" panose="020B0603030403020204" pitchFamily="34" charset="0"/>
@@ -10283,7 +10272,7 @@
               <a:t>Conclude your prayer with, </a:t>
             </a:r>
             <a:r>
-              <a:rPr lang="en-GB" sz="2400" b="1" i="1" dirty="0">
+              <a:rPr lang="en-GB" sz="2600" b="1" i="1" dirty="0">
                 <a:solidFill>
                   <a:schemeClr val="accent1">
                     <a:lumMod val="75000"/>
@@ -10295,7 +10284,7 @@
               </a:rPr>
               <a:t>“Amen.”</a:t>
             </a:r>
-            <a:endParaRPr lang="en-GB" sz="2400" b="1" i="0" dirty="0">
+            <a:endParaRPr lang="en-GB" sz="2600" b="1" i="0" dirty="0">
               <a:solidFill>
                 <a:schemeClr val="accent1">
                   <a:lumMod val="75000"/>
@@ -10322,7 +10311,7 @@
         </p:nvSpPr>
         <p:spPr>
           <a:xfrm>
-            <a:off x="6168008" y="1988840"/>
+            <a:off x="6168009" y="1679897"/>
             <a:ext cx="6023991" cy="3539430"/>
           </a:xfrm>
           <a:prstGeom prst="rect">
@@ -10568,7 +10557,7 @@
         </p:nvCxnSpPr>
         <p:spPr>
           <a:xfrm>
-            <a:off x="294302" y="1484784"/>
+            <a:off x="294302" y="1196752"/>
             <a:ext cx="11603397" cy="0"/>
           </a:xfrm>
           <a:prstGeom prst="line">
@@ -10597,63 +10586,12 @@
           </a:fontRef>
         </p:style>
       </p:cxnSp>
-      <p:pic>
-        <p:nvPicPr>
-          <p:cNvPr id="12" name="Picture 11" descr="Shape&#10;&#10;Description automatically generated with low confidence">
+      <p:grpSp>
+        <p:nvGrpSpPr>
+          <p:cNvPr id="7" name="Group 6">
             <a:extLst>
               <a:ext uri="{FF2B5EF4-FFF2-40B4-BE49-F238E27FC236}">
-                <a16:creationId xmlns:a16="http://schemas.microsoft.com/office/drawing/2014/main" id="{FEC4D4CE-A7C1-BCBC-7A85-5B9B3572D951}"/>
-              </a:ext>
-            </a:extLst>
-          </p:cNvPr>
-          <p:cNvPicPr>
-            <a:picLocks noChangeAspect="1"/>
-          </p:cNvPicPr>
-          <p:nvPr/>
-        </p:nvPicPr>
-        <p:blipFill>
-          <a:blip r:embed="rId3" cstate="print">
-            <a:extLst>
-              <a:ext uri="{BEBA8EAE-BF5A-486C-A8C5-ECC9F3942E4B}">
-                <a14:imgProps xmlns:a14="http://schemas.microsoft.com/office/drawing/2010/main">
-                  <a14:imgLayer r:embed="rId4">
-                    <a14:imgEffect>
-                      <a14:colorTemperature colorTemp="11500"/>
-                    </a14:imgEffect>
-                    <a14:imgEffect>
-                      <a14:saturation sat="400000"/>
-                    </a14:imgEffect>
-                    <a14:imgEffect>
-                      <a14:brightnessContrast bright="-40000" contrast="-40000"/>
-                    </a14:imgEffect>
-                  </a14:imgLayer>
-                </a14:imgProps>
-              </a:ext>
-              <a:ext uri="{28A0092B-C50C-407E-A947-70E740481C1C}">
-                <a14:useLocalDpi xmlns:a14="http://schemas.microsoft.com/office/drawing/2010/main" val="0"/>
-              </a:ext>
-            </a:extLst>
-          </a:blip>
-          <a:stretch>
-            <a:fillRect/>
-          </a:stretch>
-        </p:blipFill>
-        <p:spPr>
-          <a:xfrm>
-            <a:off x="11835414" y="6395917"/>
-            <a:ext cx="218523" cy="218523"/>
-          </a:xfrm>
-          <a:prstGeom prst="rect">
-            <a:avLst/>
-          </a:prstGeom>
-        </p:spPr>
-      </p:pic>
-      <p:grpSp>
-        <p:nvGrpSpPr>
-          <p:cNvPr id="4" name="Group 3">
-            <a:extLst>
-              <a:ext uri="{FF2B5EF4-FFF2-40B4-BE49-F238E27FC236}">
-                <a16:creationId xmlns:a16="http://schemas.microsoft.com/office/drawing/2014/main" id="{D9786849-9205-B85E-F066-F6175FCE0F47}"/>
+                <a16:creationId xmlns:a16="http://schemas.microsoft.com/office/drawing/2014/main" id="{AC2557A4-1DE5-B506-624D-F4E57A9EDDFD}"/>
               </a:ext>
             </a:extLst>
           </p:cNvPr>
@@ -10662,18 +10600,112 @@
         </p:nvGrpSpPr>
         <p:grpSpPr>
           <a:xfrm>
-            <a:off x="6744072" y="6335420"/>
-            <a:ext cx="5337952" cy="346472"/>
-            <a:chOff x="4943872" y="6231733"/>
-            <a:chExt cx="7030907" cy="444368"/>
+            <a:off x="220248" y="6400838"/>
+            <a:ext cx="3139448" cy="268522"/>
+            <a:chOff x="503270" y="4609005"/>
+            <a:chExt cx="9837956" cy="841457"/>
+          </a:xfrm>
+        </p:grpSpPr>
+        <p:pic>
+          <p:nvPicPr>
+            <p:cNvPr id="8" name="Picture 7" descr="Logo&#10;&#10;Description automatically generated">
+              <a:extLst>
+                <a:ext uri="{FF2B5EF4-FFF2-40B4-BE49-F238E27FC236}">
+                  <a16:creationId xmlns:a16="http://schemas.microsoft.com/office/drawing/2014/main" id="{BD467B69-75C5-D531-2D7C-EA62D5D6B7E8}"/>
+                </a:ext>
+              </a:extLst>
+            </p:cNvPr>
+            <p:cNvPicPr>
+              <a:picLocks noChangeAspect="1"/>
+            </p:cNvPicPr>
+            <p:nvPr/>
+          </p:nvPicPr>
+          <p:blipFill>
+            <a:blip r:embed="rId3" cstate="print">
+              <a:biLevel thresh="75000"/>
+              <a:extLst>
+                <a:ext uri="{28A0092B-C50C-407E-A947-70E740481C1C}">
+                  <a14:useLocalDpi xmlns:a14="http://schemas.microsoft.com/office/drawing/2010/main" val="0"/>
+                </a:ext>
+              </a:extLst>
+            </a:blip>
+            <a:stretch>
+              <a:fillRect/>
+            </a:stretch>
+          </p:blipFill>
+          <p:spPr>
+            <a:xfrm>
+              <a:off x="503270" y="4661782"/>
+              <a:ext cx="6094347" cy="788680"/>
+            </a:xfrm>
+            <a:prstGeom prst="rect">
+              <a:avLst/>
+            </a:prstGeom>
+          </p:spPr>
+        </p:pic>
+        <p:pic>
+          <p:nvPicPr>
+            <p:cNvPr id="10" name="Picture 9" descr="A picture containing icon&#10;&#10;Description automatically generated">
+              <a:extLst>
+                <a:ext uri="{FF2B5EF4-FFF2-40B4-BE49-F238E27FC236}">
+                  <a16:creationId xmlns:a16="http://schemas.microsoft.com/office/drawing/2014/main" id="{0E0FDBFE-3370-231C-E16B-EBAD1F93563C}"/>
+                </a:ext>
+              </a:extLst>
+            </p:cNvPr>
+            <p:cNvPicPr>
+              <a:picLocks noChangeAspect="1"/>
+            </p:cNvPicPr>
+            <p:nvPr/>
+          </p:nvPicPr>
+          <p:blipFill rotWithShape="1">
+            <a:blip r:embed="rId4" cstate="print">
+              <a:biLevel thresh="75000"/>
+              <a:extLst>
+                <a:ext uri="{28A0092B-C50C-407E-A947-70E740481C1C}">
+                  <a14:useLocalDpi xmlns:a14="http://schemas.microsoft.com/office/drawing/2010/main" val="0"/>
+                </a:ext>
+              </a:extLst>
+            </a:blip>
+            <a:srcRect l="27488"/>
+            <a:stretch/>
+          </p:blipFill>
+          <p:spPr>
+            <a:xfrm>
+              <a:off x="6745384" y="4609005"/>
+              <a:ext cx="3595842" cy="841456"/>
+            </a:xfrm>
+            <a:prstGeom prst="rect">
+              <a:avLst/>
+            </a:prstGeom>
+          </p:spPr>
+        </p:pic>
+      </p:grpSp>
+      <p:grpSp>
+        <p:nvGrpSpPr>
+          <p:cNvPr id="3" name="Group 2">
+            <a:extLst>
+              <a:ext uri="{FF2B5EF4-FFF2-40B4-BE49-F238E27FC236}">
+                <a16:creationId xmlns:a16="http://schemas.microsoft.com/office/drawing/2014/main" id="{0C117D11-0BC7-0B3D-9531-40EA33203852}"/>
+              </a:ext>
+            </a:extLst>
+          </p:cNvPr>
+          <p:cNvGrpSpPr/>
+          <p:nvPr/>
+        </p:nvGrpSpPr>
+        <p:grpSpPr>
+          <a:xfrm>
+            <a:off x="5951984" y="6318094"/>
+            <a:ext cx="6130040" cy="381119"/>
+            <a:chOff x="3900570" y="6209512"/>
+            <a:chExt cx="8074208" cy="488804"/>
           </a:xfrm>
         </p:grpSpPr>
         <p:sp>
           <p:nvSpPr>
-            <p:cNvPr id="6" name="TextBox 5">
+            <p:cNvPr id="14" name="TextBox 13">
               <a:extLst>
                 <a:ext uri="{FF2B5EF4-FFF2-40B4-BE49-F238E27FC236}">
-                  <a16:creationId xmlns:a16="http://schemas.microsoft.com/office/drawing/2014/main" id="{14DEC182-9EF8-EAB6-94C7-9396D690208A}"/>
+                  <a16:creationId xmlns:a16="http://schemas.microsoft.com/office/drawing/2014/main" id="{1F20659A-912A-A3F5-7438-9DCDEDE4CF19}"/>
                 </a:ext>
               </a:extLst>
             </p:cNvPr>
@@ -10682,8 +10714,8 @@
           </p:nvSpPr>
           <p:spPr>
             <a:xfrm>
-              <a:off x="4943872" y="6231733"/>
-              <a:ext cx="7030907" cy="444368"/>
+              <a:off x="3900570" y="6209512"/>
+              <a:ext cx="8074208" cy="488804"/>
             </a:xfrm>
             <a:prstGeom prst="roundRect">
               <a:avLst>
@@ -10704,7 +10736,7 @@
             <a:lstStyle/>
             <a:p>
               <a:r>
-                <a:rPr lang="en-GB" sz="1400" b="1" dirty="0">
+                <a:rPr lang="en-GB" sz="1600" b="1" dirty="0">
                   <a:latin typeface="Source Sans Pro" panose="020B0503030403020204" pitchFamily="34" charset="0"/>
                   <a:ea typeface="Source Sans Pro" panose="020B0503030403020204" pitchFamily="34" charset="0"/>
                   <a:cs typeface="Segoe UI Semibold" panose="020B0702040204020203" pitchFamily="34" charset="0"/>
@@ -10712,13 +10744,13 @@
                 <a:t>Please Turn Off/Silence Your Devices </a:t>
               </a:r>
               <a:r>
-                <a:rPr lang="zh-TW" altLang="en-US" sz="1400" b="1" dirty="0">
+                <a:rPr lang="zh-TW" altLang="en-US" sz="1600" b="1" dirty="0">
                   <a:latin typeface="Source Sans Pro" panose="020B0503030403020204" pitchFamily="34" charset="0"/>
                   <a:ea typeface="Microsoft JhengHei" panose="020B0604030504040204" pitchFamily="34" charset="-120"/>
                 </a:rPr>
                 <a:t>請靜音或關閉所有電子設備</a:t>
               </a:r>
-              <a:endParaRPr lang="ja-JP" altLang="en-US" sz="1400" b="1" dirty="0">
+              <a:endParaRPr lang="ja-JP" altLang="en-US" sz="1600" b="1" dirty="0">
                 <a:latin typeface="Source Sans Pro" panose="020B0503030403020204" pitchFamily="34" charset="0"/>
                 <a:ea typeface="Microsoft JhengHei" panose="020B0604030504040204" pitchFamily="34" charset="-120"/>
               </a:endParaRPr>
@@ -10727,10 +10759,10 @@
         </p:sp>
         <p:pic>
           <p:nvPicPr>
-            <p:cNvPr id="9" name="Picture 8" descr="Shape&#10;&#10;Description automatically generated with low confidence">
+            <p:cNvPr id="15" name="Picture 14" descr="Shape&#10;&#10;Description automatically generated with low confidence">
               <a:extLst>
                 <a:ext uri="{FF2B5EF4-FFF2-40B4-BE49-F238E27FC236}">
-                  <a16:creationId xmlns:a16="http://schemas.microsoft.com/office/drawing/2014/main" id="{74E2B17A-B797-DFF3-75E3-4A476DDBC4D0}"/>
+                  <a16:creationId xmlns:a16="http://schemas.microsoft.com/office/drawing/2014/main" id="{2519B31D-8076-C37B-E4E3-6FA3747760A2}"/>
                 </a:ext>
               </a:extLst>
             </p:cNvPr>
@@ -10768,102 +10800,8 @@
           </p:blipFill>
           <p:spPr>
             <a:xfrm>
-              <a:off x="11658489" y="6309320"/>
-              <a:ext cx="280267" cy="280267"/>
-            </a:xfrm>
-            <a:prstGeom prst="rect">
-              <a:avLst/>
-            </a:prstGeom>
-          </p:spPr>
-        </p:pic>
-      </p:grpSp>
-      <p:grpSp>
-        <p:nvGrpSpPr>
-          <p:cNvPr id="7" name="Group 6">
-            <a:extLst>
-              <a:ext uri="{FF2B5EF4-FFF2-40B4-BE49-F238E27FC236}">
-                <a16:creationId xmlns:a16="http://schemas.microsoft.com/office/drawing/2014/main" id="{AC2557A4-1DE5-B506-624D-F4E57A9EDDFD}"/>
-              </a:ext>
-            </a:extLst>
-          </p:cNvPr>
-          <p:cNvGrpSpPr/>
-          <p:nvPr/>
-        </p:nvGrpSpPr>
-        <p:grpSpPr>
-          <a:xfrm>
-            <a:off x="220248" y="6400838"/>
-            <a:ext cx="3139448" cy="268522"/>
-            <a:chOff x="503270" y="4609005"/>
-            <a:chExt cx="9837956" cy="841457"/>
-          </a:xfrm>
-        </p:grpSpPr>
-        <p:pic>
-          <p:nvPicPr>
-            <p:cNvPr id="8" name="Picture 7" descr="Logo&#10;&#10;Description automatically generated">
-              <a:extLst>
-                <a:ext uri="{FF2B5EF4-FFF2-40B4-BE49-F238E27FC236}">
-                  <a16:creationId xmlns:a16="http://schemas.microsoft.com/office/drawing/2014/main" id="{BD467B69-75C5-D531-2D7C-EA62D5D6B7E8}"/>
-                </a:ext>
-              </a:extLst>
-            </p:cNvPr>
-            <p:cNvPicPr>
-              <a:picLocks noChangeAspect="1"/>
-            </p:cNvPicPr>
-            <p:nvPr/>
-          </p:nvPicPr>
-          <p:blipFill>
-            <a:blip r:embed="rId7" cstate="print">
-              <a:biLevel thresh="75000"/>
-              <a:extLst>
-                <a:ext uri="{28A0092B-C50C-407E-A947-70E740481C1C}">
-                  <a14:useLocalDpi xmlns:a14="http://schemas.microsoft.com/office/drawing/2010/main" val="0"/>
-                </a:ext>
-              </a:extLst>
-            </a:blip>
-            <a:stretch>
-              <a:fillRect/>
-            </a:stretch>
-          </p:blipFill>
-          <p:spPr>
-            <a:xfrm>
-              <a:off x="503270" y="4661782"/>
-              <a:ext cx="6094347" cy="788680"/>
-            </a:xfrm>
-            <a:prstGeom prst="rect">
-              <a:avLst/>
-            </a:prstGeom>
-          </p:spPr>
-        </p:pic>
-        <p:pic>
-          <p:nvPicPr>
-            <p:cNvPr id="10" name="Picture 9" descr="A picture containing icon&#10;&#10;Description automatically generated">
-              <a:extLst>
-                <a:ext uri="{FF2B5EF4-FFF2-40B4-BE49-F238E27FC236}">
-                  <a16:creationId xmlns:a16="http://schemas.microsoft.com/office/drawing/2014/main" id="{0E0FDBFE-3370-231C-E16B-EBAD1F93563C}"/>
-                </a:ext>
-              </a:extLst>
-            </p:cNvPr>
-            <p:cNvPicPr>
-              <a:picLocks noChangeAspect="1"/>
-            </p:cNvPicPr>
-            <p:nvPr/>
-          </p:nvPicPr>
-          <p:blipFill rotWithShape="1">
-            <a:blip r:embed="rId8" cstate="print">
-              <a:biLevel thresh="75000"/>
-              <a:extLst>
-                <a:ext uri="{28A0092B-C50C-407E-A947-70E740481C1C}">
-                  <a14:useLocalDpi xmlns:a14="http://schemas.microsoft.com/office/drawing/2010/main" val="0"/>
-                </a:ext>
-              </a:extLst>
-            </a:blip>
-            <a:srcRect l="27488"/>
-            <a:stretch/>
-          </p:blipFill>
-          <p:spPr>
-            <a:xfrm>
-              <a:off x="6745384" y="4609005"/>
-              <a:ext cx="3595842" cy="841456"/>
+              <a:off x="11583067" y="6279910"/>
+              <a:ext cx="348008" cy="348008"/>
             </a:xfrm>
             <a:prstGeom prst="rect">
               <a:avLst/>

</xml_diff>

<commit_message>
03/02/23 V2 Design Change to white background and spacing
</commit_message>
<xml_diff>
--- a/TJCPowerPoint/Resources/ServiceWidescreen.pptx
+++ b/TJCPowerPoint/Resources/ServiceWidescreen.pptx
@@ -4435,7 +4435,7 @@
     <p:bg>
       <p:bgPr>
         <a:solidFill>
-          <a:srgbClr val="DFE4EF"/>
+          <a:schemeClr val="bg1"/>
         </a:solidFill>
         <a:effectLst/>
       </p:bgPr>
@@ -5071,7 +5071,7 @@
                 <a:cs typeface="Segoe UI" panose="020B0502040204020203" pitchFamily="34" charset="0"/>
               </a:rPr>
               <a:pPr algn="ctr"/>
-              <a:t>Sunday, January 22, 2023</a:t>
+              <a:t>Friday, February 3, 2023</a:t>
             </a:fld>
             <a:endParaRPr lang="en-US" altLang="en-US" sz="5400" b="1" dirty="0">
               <a:solidFill>
@@ -6610,7 +6610,7 @@
         </p:nvSpPr>
         <p:spPr bwMode="auto">
           <a:xfrm>
-            <a:off x="1519747" y="2412740"/>
+            <a:off x="1524000" y="2385820"/>
             <a:ext cx="9144000" cy="584775"/>
           </a:xfrm>
           <a:prstGeom prst="rect">
@@ -6670,8 +6670,8 @@
         </p:nvSpPr>
         <p:spPr bwMode="auto">
           <a:xfrm>
-            <a:off x="1519747" y="3140968"/>
-            <a:ext cx="9137431" cy="830997"/>
+            <a:off x="1527285" y="3040779"/>
+            <a:ext cx="9137431" cy="2980509"/>
           </a:xfrm>
           <a:prstGeom prst="rect">
             <a:avLst/>
@@ -6711,8 +6711,8 @@
           </a:extLst>
         </p:spPr>
         <p:txBody>
-          <a:bodyPr wrap="square">
-            <a:spAutoFit/>
+          <a:bodyPr wrap="square" anchor="t">
+            <a:noAutofit/>
           </a:bodyPr>
           <a:lstStyle/>
           <a:p>
@@ -7923,8 +7923,8 @@
         </p:nvSpPr>
         <p:spPr bwMode="auto">
           <a:xfrm>
-            <a:off x="0" y="1073219"/>
-            <a:ext cx="12192000" cy="4299997"/>
+            <a:off x="0" y="1224129"/>
+            <a:ext cx="12192000" cy="4352498"/>
           </a:xfrm>
           <a:prstGeom prst="rect">
             <a:avLst/>
@@ -7964,7 +7964,7 @@
           </a:extLst>
         </p:spPr>
         <p:txBody>
-          <a:bodyPr wrap="square" anchor="ctr">
+          <a:bodyPr wrap="square" anchor="t">
             <a:noAutofit/>
           </a:bodyPr>
           <a:lstStyle/>

</xml_diff>

<commit_message>
25/02/23 - 1 Kings Chinese fix, Removed movable titles for sermon title slide
</commit_message>
<xml_diff>
--- a/TJCPowerPoint/Resources/ServiceWidescreen.pptx
+++ b/TJCPowerPoint/Resources/ServiceWidescreen.pptx
@@ -5071,7 +5071,7 @@
                 <a:cs typeface="Segoe UI" panose="020B0502040204020203" pitchFamily="34" charset="0"/>
               </a:rPr>
               <a:pPr algn="ctr"/>
-              <a:t>Friday, February 17, 2023</a:t>
+              <a:t>Saturday, February 25, 2023</a:t>
             </a:fld>
             <a:endParaRPr lang="en-US" altLang="en-US" sz="5400" b="1" dirty="0">
               <a:solidFill>
@@ -5918,8 +5918,8 @@
         </p:nvSpPr>
         <p:spPr bwMode="auto">
           <a:xfrm>
-            <a:off x="0" y="2169918"/>
-            <a:ext cx="12192000" cy="923330"/>
+            <a:off x="0" y="2420888"/>
+            <a:ext cx="12192000" cy="830997"/>
           </a:xfrm>
           <a:prstGeom prst="rect">
             <a:avLst/>
@@ -5970,7 +5970,7 @@
               </a:spcBef>
             </a:pPr>
             <a:r>
-              <a:rPr lang="en-US" altLang="zh-CN" sz="5400" b="1" dirty="0">
+              <a:rPr lang="en-US" altLang="zh-CN" sz="4800" b="1" dirty="0">
                 <a:latin typeface="Source Sans Pro" panose="020B0503030403020204" pitchFamily="34" charset="0"/>
                 <a:ea typeface="Source Sans Pro" panose="020B0503030403020204" pitchFamily="34" charset="0"/>
                 <a:cs typeface="Segoe UI" panose="020B0502040204020203" pitchFamily="34" charset="0"/>
@@ -5990,8 +5990,8 @@
         </p:nvSpPr>
         <p:spPr bwMode="auto">
           <a:xfrm>
-            <a:off x="0" y="3153742"/>
-            <a:ext cx="12192000" cy="923330"/>
+            <a:off x="0" y="3312379"/>
+            <a:ext cx="12192000" cy="830997"/>
           </a:xfrm>
           <a:prstGeom prst="rect">
             <a:avLst/>
@@ -6042,7 +6042,7 @@
               </a:spcBef>
             </a:pPr>
             <a:r>
-              <a:rPr lang="en-US" altLang="zh-CN" sz="5400" b="1" dirty="0">
+              <a:rPr lang="en-US" altLang="zh-CN" sz="4800" b="1" dirty="0">
                 <a:solidFill>
                   <a:schemeClr val="accent1">
                     <a:lumMod val="75000"/>

</xml_diff>

<commit_message>
15/05/23 - V3 Beginning of refactoring + webview
</commit_message>
<xml_diff>
--- a/TJCPowerPoint/Resources/ServiceWidescreen.pptx
+++ b/TJCPowerPoint/Resources/ServiceWidescreen.pptx
@@ -21,7 +21,7 @@
     <p:sldId id="361" r:id="rId9"/>
     <p:sldId id="359" r:id="rId10"/>
     <p:sldId id="363" r:id="rId11"/>
-    <p:sldId id="364" r:id="rId12"/>
+    <p:sldId id="370" r:id="rId12"/>
   </p:sldIdLst>
   <p:sldSz cx="12192000" cy="6858000"/>
   <p:notesSz cx="6858000" cy="9144000"/>
@@ -1258,7 +1258,7 @@
           <a:p>
             <a:r>
               <a:rPr lang="en-GB" dirty="0"/>
-              <a:t>Service Timetable</a:t>
+              <a:t>Service Times</a:t>
             </a:r>
           </a:p>
         </p:txBody>
@@ -1290,7 +1290,7 @@
     </p:spTree>
     <p:extLst>
       <p:ext uri="{BB962C8B-B14F-4D97-AF65-F5344CB8AC3E}">
-        <p14:creationId xmlns:p14="http://schemas.microsoft.com/office/powerpoint/2010/main" val="370275210"/>
+        <p14:creationId xmlns:p14="http://schemas.microsoft.com/office/powerpoint/2010/main" val="3795032222"/>
       </p:ext>
     </p:extLst>
   </p:cSld>
@@ -5071,7 +5071,7 @@
                 <a:cs typeface="Segoe UI" panose="020B0502040204020203" pitchFamily="34" charset="0"/>
               </a:rPr>
               <a:pPr algn="ctr"/>
-              <a:t>Saturday, February 25, 2023</a:t>
+              <a:t>Friday, May 12, 2023</a:t>
             </a:fld>
             <a:endParaRPr lang="en-US" altLang="en-US" sz="5400" b="1" dirty="0">
               <a:solidFill>
@@ -5617,50 +5617,217 @@
       </p:grpSpPr>
       <p:sp>
         <p:nvSpPr>
-          <p:cNvPr id="11" name="TextBox 10">
+          <p:cNvPr id="12" name="Text Box 12">
             <a:extLst>
               <a:ext uri="{FF2B5EF4-FFF2-40B4-BE49-F238E27FC236}">
-                <a16:creationId xmlns:a16="http://schemas.microsoft.com/office/drawing/2014/main" id="{ADA8455D-134F-486C-C096-FFC55CA1AF07}"/>
+                <a16:creationId xmlns:a16="http://schemas.microsoft.com/office/drawing/2014/main" id="{591C97DC-F419-4C94-A84E-E8038EFB7F71}"/>
               </a:ext>
             </a:extLst>
           </p:cNvPr>
-          <p:cNvSpPr txBox="1"/>
+          <p:cNvSpPr txBox="1">
+            <a:spLocks noChangeArrowheads="1"/>
+          </p:cNvSpPr>
           <p:nvPr/>
         </p:nvSpPr>
-        <p:spPr>
+        <p:spPr bwMode="auto">
           <a:xfrm>
-            <a:off x="3575720" y="3105834"/>
-            <a:ext cx="5040560" cy="646331"/>
+            <a:off x="0" y="876782"/>
+            <a:ext cx="12192000" cy="5360530"/>
           </a:xfrm>
           <a:prstGeom prst="rect">
             <a:avLst/>
           </a:prstGeom>
           <a:noFill/>
+          <a:ln>
+            <a:noFill/>
+          </a:ln>
+          <a:effectLst/>
+          <a:extLst>
+            <a:ext uri="{909E8E84-426E-40DD-AFC4-6F175D3DCCD1}">
+              <a14:hiddenFill xmlns:a14="http://schemas.microsoft.com/office/drawing/2010/main">
+                <a:solidFill>
+                  <a:schemeClr val="accent1"/>
+                </a:solidFill>
+              </a14:hiddenFill>
+            </a:ext>
+            <a:ext uri="{91240B29-F687-4F45-9708-019B960494DF}">
+              <a14:hiddenLine xmlns:a14="http://schemas.microsoft.com/office/drawing/2010/main" w="9525">
+                <a:solidFill>
+                  <a:schemeClr val="tx1"/>
+                </a:solidFill>
+                <a:miter lim="800000"/>
+                <a:headEnd/>
+                <a:tailEnd/>
+              </a14:hiddenLine>
+            </a:ext>
+            <a:ext uri="{AF507438-7753-43E0-B8FC-AC1667EBCBE1}">
+              <a14:hiddenEffects xmlns:a14="http://schemas.microsoft.com/office/drawing/2010/main">
+                <a:effectLst>
+                  <a:outerShdw dist="35921" dir="2700000" algn="ctr" rotWithShape="0">
+                    <a:schemeClr val="bg2"/>
+                  </a:outerShdw>
+                </a:effectLst>
+              </a14:hiddenEffects>
+            </a:ext>
+          </a:extLst>
         </p:spPr>
         <p:txBody>
-          <a:bodyPr wrap="square" rtlCol="0">
-            <a:spAutoFit/>
+          <a:bodyPr wrap="square">
+            <a:noAutofit/>
           </a:bodyPr>
           <a:lstStyle/>
           <a:p>
             <a:pPr algn="ctr"/>
-            <a:r>
-              <a:rPr lang="en-GB" sz="3600" b="1" dirty="0">
+            <a:endParaRPr lang="en-GB" altLang="zh-TW" sz="2400" dirty="0">
+              <a:latin typeface="Century Gothic" panose="020B0502020202020204" pitchFamily="34" charset="0"/>
+              <a:ea typeface="金梅新中楷全字體" panose="02010509060101010101" pitchFamily="49" charset="-120"/>
+            </a:endParaRPr>
+          </a:p>
+        </p:txBody>
+      </p:sp>
+      <p:sp>
+        <p:nvSpPr>
+          <p:cNvPr id="13" name="Text Box 12">
+            <a:extLst>
+              <a:ext uri="{FF2B5EF4-FFF2-40B4-BE49-F238E27FC236}">
+                <a16:creationId xmlns:a16="http://schemas.microsoft.com/office/drawing/2014/main" id="{977E556A-8801-4241-B610-C5D48A41FAF4}"/>
+              </a:ext>
+            </a:extLst>
+          </p:cNvPr>
+          <p:cNvSpPr txBox="1">
+            <a:spLocks noChangeArrowheads="1"/>
+          </p:cNvSpPr>
+          <p:nvPr/>
+        </p:nvSpPr>
+        <p:spPr bwMode="auto">
+          <a:xfrm>
+            <a:off x="2615493" y="188640"/>
+            <a:ext cx="6961014" cy="576064"/>
+          </a:xfrm>
+          <a:prstGeom prst="rect">
+            <a:avLst/>
+          </a:prstGeom>
+          <a:noFill/>
+          <a:ln>
+            <a:noFill/>
+          </a:ln>
+          <a:effectLst/>
+          <a:extLst>
+            <a:ext uri="{909E8E84-426E-40DD-AFC4-6F175D3DCCD1}">
+              <a14:hiddenFill xmlns:a14="http://schemas.microsoft.com/office/drawing/2010/main">
+                <a:solidFill>
+                  <a:schemeClr val="accent1"/>
+                </a:solidFill>
+              </a14:hiddenFill>
+            </a:ext>
+            <a:ext uri="{91240B29-F687-4F45-9708-019B960494DF}">
+              <a14:hiddenLine xmlns:a14="http://schemas.microsoft.com/office/drawing/2010/main" w="9525">
+                <a:solidFill>
+                  <a:schemeClr val="tx1"/>
+                </a:solidFill>
+                <a:miter lim="800000"/>
+                <a:headEnd/>
+                <a:tailEnd/>
+              </a14:hiddenLine>
+            </a:ext>
+            <a:ext uri="{AF507438-7753-43E0-B8FC-AC1667EBCBE1}">
+              <a14:hiddenEffects xmlns:a14="http://schemas.microsoft.com/office/drawing/2010/main">
+                <a:effectLst>
+                  <a:outerShdw dist="35921" dir="2700000" algn="ctr" rotWithShape="0">
+                    <a:schemeClr val="bg2"/>
+                  </a:outerShdw>
+                </a:effectLst>
+              </a14:hiddenEffects>
+            </a:ext>
+          </a:extLst>
+        </p:spPr>
+        <p:txBody>
+          <a:bodyPr wrap="square">
+            <a:noAutofit/>
+          </a:bodyPr>
+          <a:lstStyle/>
+          <a:p>
+            <a:pPr algn="ctr"/>
+            <a:r>
+              <a:rPr lang="en-GB" altLang="en-US" sz="2800" b="1" dirty="0">
                 <a:latin typeface="Source Sans Pro" panose="020B0503030403020204" pitchFamily="34" charset="0"/>
                 <a:ea typeface="Source Sans Pro" panose="020B0503030403020204" pitchFamily="34" charset="0"/>
                 <a:cs typeface="Segoe UI" panose="020B0502040204020203" pitchFamily="34" charset="0"/>
               </a:rPr>
-              <a:t>SERVICE TIMES IMAGE</a:t>
-            </a:r>
-          </a:p>
-        </p:txBody>
-      </p:sp>
+              <a:t>SERVICE TIMES</a:t>
+            </a:r>
+            <a:r>
+              <a:rPr lang="en-GB" altLang="en-US" sz="2800" b="1" dirty="0">
+                <a:latin typeface="Source Sans Pro" panose="020B0503030403020204" pitchFamily="34" charset="0"/>
+                <a:ea typeface="Source Sans Pro" panose="020B0503030403020204" pitchFamily="34" charset="0"/>
+              </a:rPr>
+              <a:t> </a:t>
+            </a:r>
+            <a:r>
+              <a:rPr lang="zh-TW" altLang="en-US" sz="2800" b="1" dirty="0">
+                <a:latin typeface="Source Sans Pro" panose="020B0503030403020204" pitchFamily="34" charset="0"/>
+                <a:ea typeface="Microsoft JhengHei" panose="020B0604030504040204" pitchFamily="34" charset="-120"/>
+              </a:rPr>
+              <a:t>佈告</a:t>
+            </a:r>
+            <a:endParaRPr lang="en-GB" altLang="zh-TW" sz="2800" b="1" dirty="0">
+              <a:latin typeface="Source Sans Pro" panose="020B0503030403020204" pitchFamily="34" charset="0"/>
+              <a:ea typeface="Source Sans Pro" panose="020B0503030403020204" pitchFamily="34" charset="0"/>
+            </a:endParaRPr>
+          </a:p>
+        </p:txBody>
+      </p:sp>
+      <p:cxnSp>
+        <p:nvCxnSpPr>
+          <p:cNvPr id="5" name="Straight Connector 4">
+            <a:extLst>
+              <a:ext uri="{FF2B5EF4-FFF2-40B4-BE49-F238E27FC236}">
+                <a16:creationId xmlns:a16="http://schemas.microsoft.com/office/drawing/2014/main" id="{B04EBCD1-ED31-BE05-65B6-951653243CCF}"/>
+              </a:ext>
+            </a:extLst>
+          </p:cNvPr>
+          <p:cNvCxnSpPr>
+            <a:cxnSpLocks/>
+          </p:cNvCxnSpPr>
+          <p:nvPr/>
+        </p:nvCxnSpPr>
+        <p:spPr>
+          <a:xfrm>
+            <a:off x="371364" y="779695"/>
+            <a:ext cx="11449272" cy="0"/>
+          </a:xfrm>
+          <a:prstGeom prst="line">
+            <a:avLst/>
+          </a:prstGeom>
+          <a:ln w="38100">
+            <a:solidFill>
+              <a:schemeClr val="accent1">
+                <a:lumMod val="75000"/>
+              </a:schemeClr>
+            </a:solidFill>
+          </a:ln>
+        </p:spPr>
+        <p:style>
+          <a:lnRef idx="1">
+            <a:schemeClr val="accent4"/>
+          </a:lnRef>
+          <a:fillRef idx="0">
+            <a:schemeClr val="accent4"/>
+          </a:fillRef>
+          <a:effectRef idx="0">
+            <a:schemeClr val="accent4"/>
+          </a:effectRef>
+          <a:fontRef idx="minor">
+            <a:schemeClr val="tx1"/>
+          </a:fontRef>
+        </p:style>
+      </p:cxnSp>
       <p:grpSp>
         <p:nvGrpSpPr>
-          <p:cNvPr id="12" name="Group 11">
+          <p:cNvPr id="6" name="Group 5">
             <a:extLst>
               <a:ext uri="{FF2B5EF4-FFF2-40B4-BE49-F238E27FC236}">
-                <a16:creationId xmlns:a16="http://schemas.microsoft.com/office/drawing/2014/main" id="{1BA6BC62-6F78-C802-AA56-E6AE52E2D600}"/>
+                <a16:creationId xmlns:a16="http://schemas.microsoft.com/office/drawing/2014/main" id="{702E56C3-3C87-EB7C-8382-9F614BEFE1E2}"/>
               </a:ext>
             </a:extLst>
           </p:cNvPr>
@@ -5677,10 +5844,10 @@
         </p:grpSpPr>
         <p:sp>
           <p:nvSpPr>
-            <p:cNvPr id="13" name="TextBox 12">
+            <p:cNvPr id="7" name="TextBox 6">
               <a:extLst>
                 <a:ext uri="{FF2B5EF4-FFF2-40B4-BE49-F238E27FC236}">
-                  <a16:creationId xmlns:a16="http://schemas.microsoft.com/office/drawing/2014/main" id="{FCA5E6AC-05AA-9E2C-D56D-CB9F9AB12C50}"/>
+                  <a16:creationId xmlns:a16="http://schemas.microsoft.com/office/drawing/2014/main" id="{0A55337A-AADB-6D6B-F423-3C94AEFD8966}"/>
                 </a:ext>
               </a:extLst>
             </p:cNvPr>
@@ -5734,10 +5901,10 @@
         </p:sp>
         <p:pic>
           <p:nvPicPr>
-            <p:cNvPr id="14" name="Picture 13" descr="Shape&#10;&#10;Description automatically generated with low confidence">
+            <p:cNvPr id="9" name="Picture 8" descr="Shape&#10;&#10;Description automatically generated with low confidence">
               <a:extLst>
                 <a:ext uri="{FF2B5EF4-FFF2-40B4-BE49-F238E27FC236}">
-                  <a16:creationId xmlns:a16="http://schemas.microsoft.com/office/drawing/2014/main" id="{6332E253-2426-9EEA-8968-F1F3F92FC20F}"/>
+                  <a16:creationId xmlns:a16="http://schemas.microsoft.com/office/drawing/2014/main" id="{D9FC682E-3882-3060-F7AB-43EE5A9993B9}"/>
                 </a:ext>
               </a:extLst>
             </p:cNvPr>
@@ -5786,10 +5953,10 @@
       </p:grpSp>
       <p:grpSp>
         <p:nvGrpSpPr>
-          <p:cNvPr id="2" name="Group 1">
+          <p:cNvPr id="8" name="Group 7">
             <a:extLst>
               <a:ext uri="{FF2B5EF4-FFF2-40B4-BE49-F238E27FC236}">
-                <a16:creationId xmlns:a16="http://schemas.microsoft.com/office/drawing/2014/main" id="{3A25FCFF-20D4-53F8-7873-DDC68870D0F2}"/>
+                <a16:creationId xmlns:a16="http://schemas.microsoft.com/office/drawing/2014/main" id="{AF7526A1-2211-EB1C-EA11-20399FCF7205}"/>
               </a:ext>
             </a:extLst>
           </p:cNvPr>
@@ -5806,10 +5973,10 @@
         </p:grpSpPr>
         <p:pic>
           <p:nvPicPr>
-            <p:cNvPr id="3" name="Picture 2" descr="Logo&#10;&#10;Description automatically generated">
+            <p:cNvPr id="10" name="Picture 9" descr="Logo&#10;&#10;Description automatically generated">
               <a:extLst>
                 <a:ext uri="{FF2B5EF4-FFF2-40B4-BE49-F238E27FC236}">
-                  <a16:creationId xmlns:a16="http://schemas.microsoft.com/office/drawing/2014/main" id="{ED6615E2-37A3-BF9B-4F66-59BE2230FB35}"/>
+                  <a16:creationId xmlns:a16="http://schemas.microsoft.com/office/drawing/2014/main" id="{28349FCA-8B8A-2791-BE1E-DA5C14643C08}"/>
                 </a:ext>
               </a:extLst>
             </p:cNvPr>
@@ -5843,10 +6010,10 @@
         </p:pic>
         <p:pic>
           <p:nvPicPr>
-            <p:cNvPr id="4" name="Picture 3" descr="A picture containing icon&#10;&#10;Description automatically generated">
+            <p:cNvPr id="11" name="Picture 10" descr="A picture containing icon&#10;&#10;Description automatically generated">
               <a:extLst>
                 <a:ext uri="{FF2B5EF4-FFF2-40B4-BE49-F238E27FC236}">
-                  <a16:creationId xmlns:a16="http://schemas.microsoft.com/office/drawing/2014/main" id="{B89C5FCE-32EE-6802-CD07-D83CC191DD0C}"/>
+                  <a16:creationId xmlns:a16="http://schemas.microsoft.com/office/drawing/2014/main" id="{2A6626B5-6385-E0C7-1672-4558C84DE0AC}"/>
                 </a:ext>
               </a:extLst>
             </p:cNvPr>
@@ -5881,7 +6048,7 @@
     </p:spTree>
     <p:extLst>
       <p:ext uri="{BB962C8B-B14F-4D97-AF65-F5344CB8AC3E}">
-        <p14:creationId xmlns:p14="http://schemas.microsoft.com/office/powerpoint/2010/main" val="3742231344"/>
+        <p14:creationId xmlns:p14="http://schemas.microsoft.com/office/powerpoint/2010/main" val="491890482"/>
       </p:ext>
     </p:extLst>
   </p:cSld>

</xml_diff>

<commit_message>
22/06/23 Refreshsed Design + Tab changes
</commit_message>
<xml_diff>
--- a/TJCPowerPoint/Resources/ServiceWidescreen.pptx
+++ b/TJCPowerPoint/Resources/ServiceWidescreen.pptx
@@ -5071,7 +5071,7 @@
                 <a:cs typeface="Segoe UI" panose="020B0502040204020203" pitchFamily="34" charset="0"/>
               </a:rPr>
               <a:pPr algn="ctr"/>
-              <a:t>Thursday, May 18, 2023</a:t>
+              <a:t>Thursday, June 22, 2023</a:t>
             </a:fld>
             <a:endParaRPr lang="en-US" altLang="en-US" sz="5400" b="1" dirty="0">
               <a:solidFill>
@@ -5196,10 +5196,10 @@
       </p:sp>
       <p:grpSp>
         <p:nvGrpSpPr>
-          <p:cNvPr id="18" name="Group 17">
+          <p:cNvPr id="12" name="Group 11">
             <a:extLst>
               <a:ext uri="{FF2B5EF4-FFF2-40B4-BE49-F238E27FC236}">
-                <a16:creationId xmlns:a16="http://schemas.microsoft.com/office/drawing/2014/main" id="{C95A4823-73E1-7D36-9679-4836E506D962}"/>
+                <a16:creationId xmlns:a16="http://schemas.microsoft.com/office/drawing/2014/main" id="{04620E52-7B5B-C0F5-3E40-BA58C5F82396}"/>
               </a:ext>
             </a:extLst>
           </p:cNvPr>
@@ -5208,18 +5208,18 @@
         </p:nvGrpSpPr>
         <p:grpSpPr>
           <a:xfrm>
-            <a:off x="3803688" y="305481"/>
-            <a:ext cx="4584618" cy="392130"/>
-            <a:chOff x="503270" y="4609005"/>
-            <a:chExt cx="9837956" cy="841457"/>
+            <a:off x="3718599" y="328470"/>
+            <a:ext cx="4754803" cy="396343"/>
+            <a:chOff x="3719736" y="328470"/>
+            <a:chExt cx="4754803" cy="396343"/>
           </a:xfrm>
         </p:grpSpPr>
         <p:pic>
           <p:nvPicPr>
-            <p:cNvPr id="15" name="Picture 14" descr="Logo&#10;&#10;Description automatically generated">
+            <p:cNvPr id="4" name="Picture 3">
               <a:extLst>
                 <a:ext uri="{FF2B5EF4-FFF2-40B4-BE49-F238E27FC236}">
-                  <a16:creationId xmlns:a16="http://schemas.microsoft.com/office/drawing/2014/main" id="{97D954FD-4C49-EBCD-071F-33D0D00EED91}"/>
+                  <a16:creationId xmlns:a16="http://schemas.microsoft.com/office/drawing/2014/main" id="{993ECB1B-3015-5D9D-13A4-92BE55C44244}"/>
                 </a:ext>
               </a:extLst>
             </p:cNvPr>
@@ -5230,7 +5230,6 @@
           </p:nvPicPr>
           <p:blipFill>
             <a:blip r:embed="rId3">
-              <a:biLevel thresh="75000"/>
               <a:extLst>
                 <a:ext uri="{28A0092B-C50C-407E-A947-70E740481C1C}">
                   <a14:useLocalDpi xmlns:a14="http://schemas.microsoft.com/office/drawing/2010/main" val="0"/>
@@ -5243,8 +5242,8 @@
           </p:blipFill>
           <p:spPr>
             <a:xfrm>
-              <a:off x="503270" y="4661782"/>
-              <a:ext cx="6094347" cy="788680"/>
+              <a:off x="3719736" y="328470"/>
+              <a:ext cx="3030311" cy="392158"/>
             </a:xfrm>
             <a:prstGeom prst="rect">
               <a:avLst/>
@@ -5253,10 +5252,10 @@
         </p:pic>
         <p:pic>
           <p:nvPicPr>
-            <p:cNvPr id="17" name="Picture 16" descr="A picture containing icon&#10;&#10;Description automatically generated">
+            <p:cNvPr id="6" name="Picture 5" descr="A blue text on a black background&#10;&#10;Description automatically generated with low confidence">
               <a:extLst>
                 <a:ext uri="{FF2B5EF4-FFF2-40B4-BE49-F238E27FC236}">
-                  <a16:creationId xmlns:a16="http://schemas.microsoft.com/office/drawing/2014/main" id="{D6997496-4F6A-7A6B-DA48-631512238283}"/>
+                  <a16:creationId xmlns:a16="http://schemas.microsoft.com/office/drawing/2014/main" id="{821F2D92-0E16-54AC-56A2-674E715F7840}"/>
                 </a:ext>
               </a:extLst>
             </p:cNvPr>
@@ -5267,20 +5266,19 @@
           </p:nvPicPr>
           <p:blipFill rotWithShape="1">
             <a:blip r:embed="rId4" cstate="print">
-              <a:biLevel thresh="75000"/>
               <a:extLst>
                 <a:ext uri="{28A0092B-C50C-407E-A947-70E740481C1C}">
                   <a14:useLocalDpi xmlns:a14="http://schemas.microsoft.com/office/drawing/2010/main" val="0"/>
                 </a:ext>
               </a:extLst>
             </a:blip>
-            <a:srcRect l="27488"/>
+            <a:srcRect l="28239" r="1"/>
             <a:stretch/>
           </p:blipFill>
           <p:spPr>
             <a:xfrm>
-              <a:off x="6745384" y="4609005"/>
-              <a:ext cx="3595842" cy="841456"/>
+              <a:off x="6816080" y="332656"/>
+              <a:ext cx="1658459" cy="392157"/>
             </a:xfrm>
             <a:prstGeom prst="rect">
               <a:avLst/>
@@ -5327,7 +5325,7 @@
         </p:nvSpPr>
         <p:spPr>
           <a:xfrm>
-            <a:off x="479377" y="980728"/>
+            <a:off x="479377" y="1332015"/>
             <a:ext cx="11233247" cy="1323439"/>
           </a:xfrm>
           <a:prstGeom prst="rect">
@@ -5388,7 +5386,7 @@
         </p:nvGrpSpPr>
         <p:grpSpPr>
           <a:xfrm>
-            <a:off x="3578711" y="2708920"/>
+            <a:off x="3578711" y="3060207"/>
             <a:ext cx="5034575" cy="2096985"/>
             <a:chOff x="1710701" y="2869813"/>
             <a:chExt cx="5664564" cy="2359386"/>
@@ -5493,10 +5491,10 @@
       </p:grpSp>
       <p:grpSp>
         <p:nvGrpSpPr>
-          <p:cNvPr id="7" name="Group 6">
+          <p:cNvPr id="2" name="Group 1">
             <a:extLst>
               <a:ext uri="{FF2B5EF4-FFF2-40B4-BE49-F238E27FC236}">
-                <a16:creationId xmlns:a16="http://schemas.microsoft.com/office/drawing/2014/main" id="{809615FA-75EE-A623-CE85-45DE391CE464}"/>
+                <a16:creationId xmlns:a16="http://schemas.microsoft.com/office/drawing/2014/main" id="{8DDFE1AF-AC7B-B360-10C7-84813443D507}"/>
               </a:ext>
             </a:extLst>
           </p:cNvPr>
@@ -5505,18 +5503,18 @@
         </p:nvGrpSpPr>
         <p:grpSpPr>
           <a:xfrm>
-            <a:off x="220247" y="6381328"/>
-            <a:ext cx="3367551" cy="288032"/>
-            <a:chOff x="503270" y="4609005"/>
-            <a:chExt cx="9837956" cy="841457"/>
+            <a:off x="3718599" y="328470"/>
+            <a:ext cx="4754803" cy="396343"/>
+            <a:chOff x="3719736" y="328470"/>
+            <a:chExt cx="4754803" cy="396343"/>
           </a:xfrm>
         </p:grpSpPr>
         <p:pic>
           <p:nvPicPr>
-            <p:cNvPr id="10" name="Picture 9" descr="Logo&#10;&#10;Description automatically generated">
+            <p:cNvPr id="6" name="Picture 5">
               <a:extLst>
                 <a:ext uri="{FF2B5EF4-FFF2-40B4-BE49-F238E27FC236}">
-                  <a16:creationId xmlns:a16="http://schemas.microsoft.com/office/drawing/2014/main" id="{8BE94FF0-EA8B-C2B2-C1F6-48BC91E6475F}"/>
+                  <a16:creationId xmlns:a16="http://schemas.microsoft.com/office/drawing/2014/main" id="{AFAF29F9-FD1F-926F-E8E7-E3C4C89562AF}"/>
                 </a:ext>
               </a:extLst>
             </p:cNvPr>
@@ -5526,8 +5524,7 @@
             <p:nvPr/>
           </p:nvPicPr>
           <p:blipFill>
-            <a:blip r:embed="rId7" cstate="print">
-              <a:biLevel thresh="75000"/>
+            <a:blip r:embed="rId7">
               <a:extLst>
                 <a:ext uri="{28A0092B-C50C-407E-A947-70E740481C1C}">
                   <a14:useLocalDpi xmlns:a14="http://schemas.microsoft.com/office/drawing/2010/main" val="0"/>
@@ -5540,8 +5537,8 @@
           </p:blipFill>
           <p:spPr>
             <a:xfrm>
-              <a:off x="503270" y="4661782"/>
-              <a:ext cx="6094347" cy="788680"/>
+              <a:off x="3719736" y="328470"/>
+              <a:ext cx="3030311" cy="392158"/>
             </a:xfrm>
             <a:prstGeom prst="rect">
               <a:avLst/>
@@ -5550,10 +5547,10 @@
         </p:pic>
         <p:pic>
           <p:nvPicPr>
-            <p:cNvPr id="11" name="Picture 10" descr="A picture containing icon&#10;&#10;Description automatically generated">
+            <p:cNvPr id="8" name="Picture 7" descr="A blue text on a black background&#10;&#10;Description automatically generated with low confidence">
               <a:extLst>
                 <a:ext uri="{FF2B5EF4-FFF2-40B4-BE49-F238E27FC236}">
-                  <a16:creationId xmlns:a16="http://schemas.microsoft.com/office/drawing/2014/main" id="{F22E8FA5-34D2-62E2-E552-999BEA4FC6A1}"/>
+                  <a16:creationId xmlns:a16="http://schemas.microsoft.com/office/drawing/2014/main" id="{97DE0D3E-B869-6933-E1E3-24DBDF4A0FFE}"/>
                 </a:ext>
               </a:extLst>
             </p:cNvPr>
@@ -5564,20 +5561,19 @@
           </p:nvPicPr>
           <p:blipFill rotWithShape="1">
             <a:blip r:embed="rId8" cstate="print">
-              <a:biLevel thresh="75000"/>
               <a:extLst>
                 <a:ext uri="{28A0092B-C50C-407E-A947-70E740481C1C}">
                   <a14:useLocalDpi xmlns:a14="http://schemas.microsoft.com/office/drawing/2010/main" val="0"/>
                 </a:ext>
               </a:extLst>
             </a:blip>
-            <a:srcRect l="27488"/>
+            <a:srcRect l="28239" r="1"/>
             <a:stretch/>
           </p:blipFill>
           <p:spPr>
             <a:xfrm>
-              <a:off x="6745384" y="4609005"/>
-              <a:ext cx="3595842" cy="841456"/>
+              <a:off x="6816080" y="332656"/>
+              <a:ext cx="1658459" cy="392157"/>
             </a:xfrm>
             <a:prstGeom prst="rect">
               <a:avLst/>
@@ -5801,9 +5797,7 @@
           </a:prstGeom>
           <a:ln w="38100">
             <a:solidFill>
-              <a:schemeClr val="accent1">
-                <a:lumMod val="75000"/>
-              </a:schemeClr>
+              <a:srgbClr val="004D91"/>
             </a:solidFill>
           </a:ln>
         </p:spPr>
@@ -5824,10 +5818,10 @@
       </p:cxnSp>
       <p:grpSp>
         <p:nvGrpSpPr>
-          <p:cNvPr id="6" name="Group 5">
+          <p:cNvPr id="2" name="Group 1">
             <a:extLst>
               <a:ext uri="{FF2B5EF4-FFF2-40B4-BE49-F238E27FC236}">
-                <a16:creationId xmlns:a16="http://schemas.microsoft.com/office/drawing/2014/main" id="{702E56C3-3C87-EB7C-8382-9F614BEFE1E2}"/>
+                <a16:creationId xmlns:a16="http://schemas.microsoft.com/office/drawing/2014/main" id="{46FB9DC8-35C6-B361-F2BE-0B1F559C93A7}"/>
               </a:ext>
             </a:extLst>
           </p:cNvPr>
@@ -5838,16 +5832,16 @@
           <a:xfrm>
             <a:off x="5951984" y="6318094"/>
             <a:ext cx="6130040" cy="381119"/>
-            <a:chOff x="3900570" y="6209512"/>
-            <a:chExt cx="8074208" cy="488804"/>
+            <a:chOff x="5951984" y="6318094"/>
+            <a:chExt cx="6130040" cy="381119"/>
           </a:xfrm>
         </p:grpSpPr>
         <p:sp>
           <p:nvSpPr>
-            <p:cNvPr id="7" name="TextBox 6">
+            <p:cNvPr id="3" name="TextBox 2">
               <a:extLst>
                 <a:ext uri="{FF2B5EF4-FFF2-40B4-BE49-F238E27FC236}">
-                  <a16:creationId xmlns:a16="http://schemas.microsoft.com/office/drawing/2014/main" id="{0A55337A-AADB-6D6B-F423-3C94AEFD8966}"/>
+                  <a16:creationId xmlns:a16="http://schemas.microsoft.com/office/drawing/2014/main" id="{951DA20E-0A6F-419F-0929-9648E41E8981}"/>
                 </a:ext>
               </a:extLst>
             </p:cNvPr>
@@ -5856,19 +5850,19 @@
           </p:nvSpPr>
           <p:spPr>
             <a:xfrm>
-              <a:off x="3900570" y="6209512"/>
-              <a:ext cx="8074208" cy="488804"/>
+              <a:off x="5951984" y="6318094"/>
+              <a:ext cx="6130040" cy="381119"/>
             </a:xfrm>
             <a:prstGeom prst="roundRect">
               <a:avLst>
                 <a:gd name="adj" fmla="val 20010"/>
               </a:avLst>
             </a:prstGeom>
-            <a:noFill/>
+            <a:solidFill>
+              <a:srgbClr val="004B8D"/>
+            </a:solidFill>
             <a:ln w="19050">
-              <a:solidFill>
-                <a:srgbClr val="FF0000"/>
-              </a:solidFill>
+              <a:noFill/>
             </a:ln>
           </p:spPr>
           <p:txBody>
@@ -5879,6 +5873,9 @@
             <a:p>
               <a:r>
                 <a:rPr lang="en-GB" sz="1600" b="1" dirty="0">
+                  <a:solidFill>
+                    <a:schemeClr val="bg1"/>
+                  </a:solidFill>
                   <a:latin typeface="Source Sans Pro" panose="020B0503030403020204" pitchFamily="34" charset="0"/>
                   <a:ea typeface="Source Sans Pro" panose="020B0503030403020204" pitchFamily="34" charset="0"/>
                   <a:cs typeface="Segoe UI Semibold" panose="020B0702040204020203" pitchFamily="34" charset="0"/>
@@ -5887,12 +5884,18 @@
               </a:r>
               <a:r>
                 <a:rPr lang="zh-TW" altLang="en-US" sz="1600" b="1" dirty="0">
+                  <a:solidFill>
+                    <a:schemeClr val="bg1"/>
+                  </a:solidFill>
                   <a:latin typeface="Source Sans Pro" panose="020B0503030403020204" pitchFamily="34" charset="0"/>
                   <a:ea typeface="Microsoft JhengHei" panose="020B0604030504040204" pitchFamily="34" charset="-120"/>
                 </a:rPr>
                 <a:t>請靜音或關閉所有電子設備</a:t>
               </a:r>
               <a:endParaRPr lang="ja-JP" altLang="en-US" sz="1600" b="1" dirty="0">
+                <a:solidFill>
+                  <a:schemeClr val="bg1"/>
+                </a:solidFill>
                 <a:latin typeface="Source Sans Pro" panose="020B0503030403020204" pitchFamily="34" charset="0"/>
                 <a:ea typeface="Microsoft JhengHei" panose="020B0604030504040204" pitchFamily="34" charset="-120"/>
               </a:endParaRPr>
@@ -5901,10 +5904,10 @@
         </p:sp>
         <p:pic>
           <p:nvPicPr>
-            <p:cNvPr id="9" name="Picture 8" descr="Shape&#10;&#10;Description automatically generated with low confidence">
+            <p:cNvPr id="4" name="Picture 3" descr="Shape&#10;&#10;Description automatically generated with low confidence">
               <a:extLst>
                 <a:ext uri="{FF2B5EF4-FFF2-40B4-BE49-F238E27FC236}">
-                  <a16:creationId xmlns:a16="http://schemas.microsoft.com/office/drawing/2014/main" id="{D9FC682E-3882-3060-F7AB-43EE5A9993B9}"/>
+                  <a16:creationId xmlns:a16="http://schemas.microsoft.com/office/drawing/2014/main" id="{C304BA47-78DC-6B31-60E7-C59741B55AFC}"/>
                 </a:ext>
               </a:extLst>
             </p:cNvPr>
@@ -5915,12 +5918,16 @@
           </p:nvPicPr>
           <p:blipFill>
             <a:blip r:embed="rId3" cstate="print">
+              <a:lum bright="70000" contrast="-70000"/>
               <a:extLst>
                 <a:ext uri="{BEBA8EAE-BF5A-486C-A8C5-ECC9F3942E4B}">
                   <a14:imgProps xmlns:a14="http://schemas.microsoft.com/office/drawing/2010/main">
                     <a14:imgLayer r:embed="rId4">
                       <a14:imgEffect>
-                        <a14:colorTemperature colorTemp="11500"/>
+                        <a14:artisticPhotocopy/>
+                      </a14:imgEffect>
+                      <a14:imgEffect>
+                        <a14:colorTemperature colorTemp="11200"/>
                       </a14:imgEffect>
                       <a14:imgEffect>
                         <a14:saturation sat="400000"/>
@@ -5942,21 +5949,24 @@
           </p:blipFill>
           <p:spPr>
             <a:xfrm>
-              <a:off x="11583067" y="6279910"/>
-              <a:ext cx="348008" cy="348008"/>
+              <a:off x="11784632" y="6372983"/>
+              <a:ext cx="264212" cy="271341"/>
             </a:xfrm>
             <a:prstGeom prst="rect">
               <a:avLst/>
             </a:prstGeom>
+            <a:solidFill>
+              <a:srgbClr val="004B8D"/>
+            </a:solidFill>
           </p:spPr>
         </p:pic>
       </p:grpSp>
       <p:grpSp>
         <p:nvGrpSpPr>
-          <p:cNvPr id="8" name="Group 7">
+          <p:cNvPr id="14" name="Group 13">
             <a:extLst>
               <a:ext uri="{FF2B5EF4-FFF2-40B4-BE49-F238E27FC236}">
-                <a16:creationId xmlns:a16="http://schemas.microsoft.com/office/drawing/2014/main" id="{AF7526A1-2211-EB1C-EA11-20399FCF7205}"/>
+                <a16:creationId xmlns:a16="http://schemas.microsoft.com/office/drawing/2014/main" id="{BE757074-DE35-1B2E-A2C5-5646BFC302AF}"/>
               </a:ext>
             </a:extLst>
           </p:cNvPr>
@@ -5965,18 +5975,18 @@
         </p:nvGrpSpPr>
         <p:grpSpPr>
           <a:xfrm>
-            <a:off x="220247" y="6381328"/>
-            <a:ext cx="3367551" cy="288032"/>
-            <a:chOff x="503270" y="4609005"/>
-            <a:chExt cx="9837956" cy="841457"/>
+            <a:off x="191344" y="6381328"/>
+            <a:ext cx="3312368" cy="276107"/>
+            <a:chOff x="3719736" y="328470"/>
+            <a:chExt cx="4754803" cy="396343"/>
           </a:xfrm>
         </p:grpSpPr>
         <p:pic>
           <p:nvPicPr>
-            <p:cNvPr id="10" name="Picture 9" descr="Logo&#10;&#10;Description automatically generated">
+            <p:cNvPr id="15" name="Picture 14">
               <a:extLst>
                 <a:ext uri="{FF2B5EF4-FFF2-40B4-BE49-F238E27FC236}">
-                  <a16:creationId xmlns:a16="http://schemas.microsoft.com/office/drawing/2014/main" id="{28349FCA-8B8A-2791-BE1E-DA5C14643C08}"/>
+                  <a16:creationId xmlns:a16="http://schemas.microsoft.com/office/drawing/2014/main" id="{793CC90E-DC89-C740-3A3E-80EF08F44E25}"/>
                 </a:ext>
               </a:extLst>
             </p:cNvPr>
@@ -5987,7 +5997,6 @@
           </p:nvPicPr>
           <p:blipFill>
             <a:blip r:embed="rId5" cstate="print">
-              <a:biLevel thresh="75000"/>
               <a:extLst>
                 <a:ext uri="{28A0092B-C50C-407E-A947-70E740481C1C}">
                   <a14:useLocalDpi xmlns:a14="http://schemas.microsoft.com/office/drawing/2010/main" val="0"/>
@@ -6000,8 +6009,8 @@
           </p:blipFill>
           <p:spPr>
             <a:xfrm>
-              <a:off x="503270" y="4661782"/>
-              <a:ext cx="6094347" cy="788680"/>
+              <a:off x="3719736" y="328470"/>
+              <a:ext cx="3030311" cy="392158"/>
             </a:xfrm>
             <a:prstGeom prst="rect">
               <a:avLst/>
@@ -6010,10 +6019,10 @@
         </p:pic>
         <p:pic>
           <p:nvPicPr>
-            <p:cNvPr id="11" name="Picture 10" descr="A picture containing icon&#10;&#10;Description automatically generated">
+            <p:cNvPr id="16" name="Picture 15" descr="A blue text on a black background&#10;&#10;Description automatically generated with low confidence">
               <a:extLst>
                 <a:ext uri="{FF2B5EF4-FFF2-40B4-BE49-F238E27FC236}">
-                  <a16:creationId xmlns:a16="http://schemas.microsoft.com/office/drawing/2014/main" id="{2A6626B5-6385-E0C7-1672-4558C84DE0AC}"/>
+                  <a16:creationId xmlns:a16="http://schemas.microsoft.com/office/drawing/2014/main" id="{0A351EDF-5530-4A06-D6AD-F2569775A0CB}"/>
                 </a:ext>
               </a:extLst>
             </p:cNvPr>
@@ -6024,20 +6033,19 @@
           </p:nvPicPr>
           <p:blipFill rotWithShape="1">
             <a:blip r:embed="rId6" cstate="print">
-              <a:biLevel thresh="75000"/>
               <a:extLst>
                 <a:ext uri="{28A0092B-C50C-407E-A947-70E740481C1C}">
                   <a14:useLocalDpi xmlns:a14="http://schemas.microsoft.com/office/drawing/2010/main" val="0"/>
                 </a:ext>
               </a:extLst>
             </a:blip>
-            <a:srcRect l="27488"/>
+            <a:srcRect l="28239" r="1"/>
             <a:stretch/>
           </p:blipFill>
           <p:spPr>
             <a:xfrm>
-              <a:off x="6745384" y="4609005"/>
-              <a:ext cx="3595842" cy="841456"/>
+              <a:off x="6816080" y="332656"/>
+              <a:ext cx="1658459" cy="392157"/>
             </a:xfrm>
             <a:prstGeom prst="rect">
               <a:avLst/>
@@ -6211,9 +6219,7 @@
             <a:r>
               <a:rPr lang="en-US" altLang="zh-CN" sz="4800" b="1" dirty="0">
                 <a:solidFill>
-                  <a:schemeClr val="accent1">
-                    <a:lumMod val="75000"/>
-                  </a:schemeClr>
+                  <a:srgbClr val="004B8D"/>
                 </a:solidFill>
                 <a:latin typeface="Microsoft JhengHei" panose="020B0604030504040204" pitchFamily="34" charset="-120"/>
                 <a:ea typeface="Microsoft JhengHei" panose="020B0604030504040204" pitchFamily="34" charset="-120"/>
@@ -6302,10 +6308,10 @@
       </p:sp>
       <p:grpSp>
         <p:nvGrpSpPr>
-          <p:cNvPr id="4" name="Group 3">
+          <p:cNvPr id="14" name="Group 13">
             <a:extLst>
               <a:ext uri="{FF2B5EF4-FFF2-40B4-BE49-F238E27FC236}">
-                <a16:creationId xmlns:a16="http://schemas.microsoft.com/office/drawing/2014/main" id="{4AEC406B-5B23-72C8-4A8F-20618A8FDE41}"/>
+                <a16:creationId xmlns:a16="http://schemas.microsoft.com/office/drawing/2014/main" id="{595402E6-F458-30E3-1C6D-348805A5A772}"/>
               </a:ext>
             </a:extLst>
           </p:cNvPr>
@@ -6316,8 +6322,8 @@
           <a:xfrm>
             <a:off x="5951984" y="6318094"/>
             <a:ext cx="6130040" cy="381119"/>
-            <a:chOff x="3900570" y="6209512"/>
-            <a:chExt cx="8074208" cy="488804"/>
+            <a:chOff x="5951984" y="6318094"/>
+            <a:chExt cx="6130040" cy="381119"/>
           </a:xfrm>
         </p:grpSpPr>
         <p:sp>
@@ -6334,19 +6340,19 @@
           </p:nvSpPr>
           <p:spPr>
             <a:xfrm>
-              <a:off x="3900570" y="6209512"/>
-              <a:ext cx="8074208" cy="488804"/>
+              <a:off x="5951984" y="6318094"/>
+              <a:ext cx="6130040" cy="381119"/>
             </a:xfrm>
             <a:prstGeom prst="roundRect">
               <a:avLst>
                 <a:gd name="adj" fmla="val 20010"/>
               </a:avLst>
             </a:prstGeom>
-            <a:noFill/>
+            <a:solidFill>
+              <a:srgbClr val="004B8D"/>
+            </a:solidFill>
             <a:ln w="19050">
-              <a:solidFill>
-                <a:srgbClr val="FF0000"/>
-              </a:solidFill>
+              <a:noFill/>
             </a:ln>
           </p:spPr>
           <p:txBody>
@@ -6357,6 +6363,9 @@
             <a:p>
               <a:r>
                 <a:rPr lang="en-GB" sz="1600" b="1" dirty="0">
+                  <a:solidFill>
+                    <a:schemeClr val="bg1"/>
+                  </a:solidFill>
                   <a:latin typeface="Source Sans Pro" panose="020B0503030403020204" pitchFamily="34" charset="0"/>
                   <a:ea typeface="Source Sans Pro" panose="020B0503030403020204" pitchFamily="34" charset="0"/>
                   <a:cs typeface="Segoe UI Semibold" panose="020B0702040204020203" pitchFamily="34" charset="0"/>
@@ -6365,12 +6374,18 @@
               </a:r>
               <a:r>
                 <a:rPr lang="zh-TW" altLang="en-US" sz="1600" b="1" dirty="0">
+                  <a:solidFill>
+                    <a:schemeClr val="bg1"/>
+                  </a:solidFill>
                   <a:latin typeface="Source Sans Pro" panose="020B0503030403020204" pitchFamily="34" charset="0"/>
                   <a:ea typeface="Microsoft JhengHei" panose="020B0604030504040204" pitchFamily="34" charset="-120"/>
                 </a:rPr>
                 <a:t>請靜音或關閉所有電子設備</a:t>
               </a:r>
               <a:endParaRPr lang="ja-JP" altLang="en-US" sz="1600" b="1" dirty="0">
+                <a:solidFill>
+                  <a:schemeClr val="bg1"/>
+                </a:solidFill>
                 <a:latin typeface="Source Sans Pro" panose="020B0503030403020204" pitchFamily="34" charset="0"/>
                 <a:ea typeface="Microsoft JhengHei" panose="020B0604030504040204" pitchFamily="34" charset="-120"/>
               </a:endParaRPr>
@@ -6393,12 +6408,16 @@
           </p:nvPicPr>
           <p:blipFill>
             <a:blip r:embed="rId3" cstate="print">
+              <a:lum bright="70000" contrast="-70000"/>
               <a:extLst>
                 <a:ext uri="{BEBA8EAE-BF5A-486C-A8C5-ECC9F3942E4B}">
                   <a14:imgProps xmlns:a14="http://schemas.microsoft.com/office/drawing/2010/main">
                     <a14:imgLayer r:embed="rId4">
                       <a14:imgEffect>
-                        <a14:colorTemperature colorTemp="11500"/>
+                        <a14:artisticPhotocopy/>
+                      </a14:imgEffect>
+                      <a14:imgEffect>
+                        <a14:colorTemperature colorTemp="11200"/>
                       </a14:imgEffect>
                       <a14:imgEffect>
                         <a14:saturation sat="400000"/>
@@ -6420,21 +6439,24 @@
           </p:blipFill>
           <p:spPr>
             <a:xfrm>
-              <a:off x="11583067" y="6279910"/>
-              <a:ext cx="348008" cy="348008"/>
+              <a:off x="11784632" y="6372983"/>
+              <a:ext cx="264212" cy="271341"/>
             </a:xfrm>
             <a:prstGeom prst="rect">
               <a:avLst/>
             </a:prstGeom>
+            <a:solidFill>
+              <a:srgbClr val="004B8D"/>
+            </a:solidFill>
           </p:spPr>
         </p:pic>
       </p:grpSp>
       <p:grpSp>
         <p:nvGrpSpPr>
-          <p:cNvPr id="3" name="Group 2">
+          <p:cNvPr id="19" name="Group 18">
             <a:extLst>
               <a:ext uri="{FF2B5EF4-FFF2-40B4-BE49-F238E27FC236}">
-                <a16:creationId xmlns:a16="http://schemas.microsoft.com/office/drawing/2014/main" id="{B5A03BA5-464A-3AF1-0556-ACFFBF228C35}"/>
+                <a16:creationId xmlns:a16="http://schemas.microsoft.com/office/drawing/2014/main" id="{2FDD7E67-6056-6C1C-5B32-D2C15C318D99}"/>
               </a:ext>
             </a:extLst>
           </p:cNvPr>
@@ -6443,18 +6465,18 @@
         </p:nvGrpSpPr>
         <p:grpSpPr>
           <a:xfrm>
-            <a:off x="3803688" y="305481"/>
-            <a:ext cx="4584618" cy="392130"/>
-            <a:chOff x="503270" y="4609005"/>
-            <a:chExt cx="9837956" cy="841457"/>
+            <a:off x="3718599" y="328470"/>
+            <a:ext cx="4754803" cy="396343"/>
+            <a:chOff x="3719736" y="328470"/>
+            <a:chExt cx="4754803" cy="396343"/>
           </a:xfrm>
         </p:grpSpPr>
         <p:pic>
           <p:nvPicPr>
-            <p:cNvPr id="9" name="Picture 8" descr="Logo&#10;&#10;Description automatically generated">
+            <p:cNvPr id="20" name="Picture 19">
               <a:extLst>
                 <a:ext uri="{FF2B5EF4-FFF2-40B4-BE49-F238E27FC236}">
-                  <a16:creationId xmlns:a16="http://schemas.microsoft.com/office/drawing/2014/main" id="{E06FCD63-070E-0CEA-BAF0-3EFE274B6E68}"/>
+                  <a16:creationId xmlns:a16="http://schemas.microsoft.com/office/drawing/2014/main" id="{432469CB-BE82-455D-81F7-7AFA46601562}"/>
                 </a:ext>
               </a:extLst>
             </p:cNvPr>
@@ -6465,7 +6487,6 @@
           </p:nvPicPr>
           <p:blipFill>
             <a:blip r:embed="rId5">
-              <a:biLevel thresh="75000"/>
               <a:extLst>
                 <a:ext uri="{28A0092B-C50C-407E-A947-70E740481C1C}">
                   <a14:useLocalDpi xmlns:a14="http://schemas.microsoft.com/office/drawing/2010/main" val="0"/>
@@ -6478,8 +6499,8 @@
           </p:blipFill>
           <p:spPr>
             <a:xfrm>
-              <a:off x="503270" y="4661782"/>
-              <a:ext cx="6094347" cy="788680"/>
+              <a:off x="3719736" y="328470"/>
+              <a:ext cx="3030311" cy="392158"/>
             </a:xfrm>
             <a:prstGeom prst="rect">
               <a:avLst/>
@@ -6488,10 +6509,10 @@
         </p:pic>
         <p:pic>
           <p:nvPicPr>
-            <p:cNvPr id="10" name="Picture 9" descr="A picture containing icon&#10;&#10;Description automatically generated">
+            <p:cNvPr id="21" name="Picture 20" descr="A blue text on a black background&#10;&#10;Description automatically generated with low confidence">
               <a:extLst>
                 <a:ext uri="{FF2B5EF4-FFF2-40B4-BE49-F238E27FC236}">
-                  <a16:creationId xmlns:a16="http://schemas.microsoft.com/office/drawing/2014/main" id="{BD46DD56-07CD-A3F2-9CFA-3709C5D2C208}"/>
+                  <a16:creationId xmlns:a16="http://schemas.microsoft.com/office/drawing/2014/main" id="{0B597627-5DF6-47E1-4E44-12CB7D85340C}"/>
                 </a:ext>
               </a:extLst>
             </p:cNvPr>
@@ -6502,20 +6523,19 @@
           </p:nvPicPr>
           <p:blipFill rotWithShape="1">
             <a:blip r:embed="rId6" cstate="print">
-              <a:biLevel thresh="75000"/>
               <a:extLst>
                 <a:ext uri="{28A0092B-C50C-407E-A947-70E740481C1C}">
                   <a14:useLocalDpi xmlns:a14="http://schemas.microsoft.com/office/drawing/2010/main" val="0"/>
                 </a:ext>
               </a:extLst>
             </a:blip>
-            <a:srcRect l="27488"/>
+            <a:srcRect l="28239" r="1"/>
             <a:stretch/>
           </p:blipFill>
           <p:spPr>
             <a:xfrm>
-              <a:off x="6745384" y="4609005"/>
-              <a:ext cx="3595842" cy="841456"/>
+              <a:off x="6816080" y="332656"/>
+              <a:ext cx="1658459" cy="392157"/>
             </a:xfrm>
             <a:prstGeom prst="rect">
               <a:avLst/>
@@ -6709,9 +6729,7 @@
               <a:r>
                 <a:rPr lang="en-US" altLang="zh-CN" sz="4800" b="1" dirty="0">
                   <a:solidFill>
-                    <a:schemeClr val="accent1">
-                      <a:lumMod val="75000"/>
-                    </a:schemeClr>
+                    <a:srgbClr val="004B8D"/>
                   </a:solidFill>
                   <a:latin typeface="Microsoft JhengHei" panose="020B0604030504040204" pitchFamily="34" charset="-120"/>
                   <a:ea typeface="Microsoft JhengHei" panose="020B0604030504040204" pitchFamily="34" charset="-120"/>
@@ -6745,9 +6763,7 @@
             </a:prstGeom>
             <a:ln w="38100">
               <a:solidFill>
-                <a:schemeClr val="accent1">
-                  <a:lumMod val="75000"/>
-                </a:schemeClr>
+                <a:srgbClr val="004B8D"/>
               </a:solidFill>
             </a:ln>
           </p:spPr>
@@ -6979,10 +6995,10 @@
       </p:sp>
       <p:grpSp>
         <p:nvGrpSpPr>
-          <p:cNvPr id="12" name="Group 11">
+          <p:cNvPr id="8" name="Group 7">
             <a:extLst>
               <a:ext uri="{FF2B5EF4-FFF2-40B4-BE49-F238E27FC236}">
-                <a16:creationId xmlns:a16="http://schemas.microsoft.com/office/drawing/2014/main" id="{A38B7C7F-C60D-A3CD-ED43-998BB57525D4}"/>
+                <a16:creationId xmlns:a16="http://schemas.microsoft.com/office/drawing/2014/main" id="{CA8DC233-92CB-DDF6-DFDD-1CE43038E2B0}"/>
               </a:ext>
             </a:extLst>
           </p:cNvPr>
@@ -6991,18 +7007,84 @@
         </p:nvGrpSpPr>
         <p:grpSpPr>
           <a:xfrm>
-            <a:off x="220248" y="6400838"/>
-            <a:ext cx="3139448" cy="268522"/>
-            <a:chOff x="503270" y="4609005"/>
-            <a:chExt cx="9837956" cy="841457"/>
+            <a:off x="5951984" y="6318094"/>
+            <a:ext cx="6130040" cy="381119"/>
+            <a:chOff x="5951984" y="6318094"/>
+            <a:chExt cx="6130040" cy="381119"/>
           </a:xfrm>
         </p:grpSpPr>
+        <p:sp>
+          <p:nvSpPr>
+            <p:cNvPr id="9" name="TextBox 8">
+              <a:extLst>
+                <a:ext uri="{FF2B5EF4-FFF2-40B4-BE49-F238E27FC236}">
+                  <a16:creationId xmlns:a16="http://schemas.microsoft.com/office/drawing/2014/main" id="{51135275-7A97-21D8-9DD3-AB216F7864DA}"/>
+                </a:ext>
+              </a:extLst>
+            </p:cNvPr>
+            <p:cNvSpPr txBox="1"/>
+            <p:nvPr/>
+          </p:nvSpPr>
+          <p:spPr>
+            <a:xfrm>
+              <a:off x="5951984" y="6318094"/>
+              <a:ext cx="6130040" cy="381119"/>
+            </a:xfrm>
+            <a:prstGeom prst="roundRect">
+              <a:avLst>
+                <a:gd name="adj" fmla="val 20010"/>
+              </a:avLst>
+            </a:prstGeom>
+            <a:solidFill>
+              <a:srgbClr val="004B8D"/>
+            </a:solidFill>
+            <a:ln w="19050">
+              <a:noFill/>
+            </a:ln>
+          </p:spPr>
+          <p:txBody>
+            <a:bodyPr wrap="square" rtlCol="0" anchor="ctr">
+              <a:spAutoFit/>
+            </a:bodyPr>
+            <a:lstStyle/>
+            <a:p>
+              <a:r>
+                <a:rPr lang="en-GB" sz="1600" b="1" dirty="0">
+                  <a:solidFill>
+                    <a:schemeClr val="bg1"/>
+                  </a:solidFill>
+                  <a:latin typeface="Source Sans Pro" panose="020B0503030403020204" pitchFamily="34" charset="0"/>
+                  <a:ea typeface="Source Sans Pro" panose="020B0503030403020204" pitchFamily="34" charset="0"/>
+                  <a:cs typeface="Segoe UI Semibold" panose="020B0702040204020203" pitchFamily="34" charset="0"/>
+                </a:rPr>
+                <a:t>Please Turn Off/Silence Your Devices </a:t>
+              </a:r>
+              <a:r>
+                <a:rPr lang="zh-TW" altLang="en-US" sz="1600" b="1" dirty="0">
+                  <a:solidFill>
+                    <a:schemeClr val="bg1"/>
+                  </a:solidFill>
+                  <a:latin typeface="Source Sans Pro" panose="020B0503030403020204" pitchFamily="34" charset="0"/>
+                  <a:ea typeface="Microsoft JhengHei" panose="020B0604030504040204" pitchFamily="34" charset="-120"/>
+                </a:rPr>
+                <a:t>請靜音或關閉所有電子設備</a:t>
+              </a:r>
+              <a:endParaRPr lang="ja-JP" altLang="en-US" sz="1600" b="1" dirty="0">
+                <a:solidFill>
+                  <a:schemeClr val="bg1"/>
+                </a:solidFill>
+                <a:latin typeface="Source Sans Pro" panose="020B0503030403020204" pitchFamily="34" charset="0"/>
+                <a:ea typeface="Microsoft JhengHei" panose="020B0604030504040204" pitchFamily="34" charset="-120"/>
+              </a:endParaRPr>
+            </a:p>
+          </p:txBody>
+        </p:sp>
         <p:pic>
           <p:nvPicPr>
-            <p:cNvPr id="13" name="Picture 12" descr="Logo&#10;&#10;Description automatically generated">
+            <p:cNvPr id="10" name="Picture 9" descr="Shape&#10;&#10;Description automatically generated with low confidence">
               <a:extLst>
                 <a:ext uri="{FF2B5EF4-FFF2-40B4-BE49-F238E27FC236}">
-                  <a16:creationId xmlns:a16="http://schemas.microsoft.com/office/drawing/2014/main" id="{D1428430-D715-0181-127F-0FF871A5AA36}"/>
+                  <a16:creationId xmlns:a16="http://schemas.microsoft.com/office/drawing/2014/main" id="{8FDA1062-532B-35D2-5284-2BF2EA2FD338}"/>
                 </a:ext>
               </a:extLst>
             </p:cNvPr>
@@ -7013,163 +7095,16 @@
           </p:nvPicPr>
           <p:blipFill>
             <a:blip r:embed="rId3" cstate="print">
-              <a:biLevel thresh="75000"/>
-              <a:extLst>
-                <a:ext uri="{28A0092B-C50C-407E-A947-70E740481C1C}">
-                  <a14:useLocalDpi xmlns:a14="http://schemas.microsoft.com/office/drawing/2010/main" val="0"/>
-                </a:ext>
-              </a:extLst>
-            </a:blip>
-            <a:stretch>
-              <a:fillRect/>
-            </a:stretch>
-          </p:blipFill>
-          <p:spPr>
-            <a:xfrm>
-              <a:off x="503270" y="4661782"/>
-              <a:ext cx="6094347" cy="788680"/>
-            </a:xfrm>
-            <a:prstGeom prst="rect">
-              <a:avLst/>
-            </a:prstGeom>
-          </p:spPr>
-        </p:pic>
-        <p:pic>
-          <p:nvPicPr>
-            <p:cNvPr id="14" name="Picture 13" descr="A picture containing icon&#10;&#10;Description automatically generated">
-              <a:extLst>
-                <a:ext uri="{FF2B5EF4-FFF2-40B4-BE49-F238E27FC236}">
-                  <a16:creationId xmlns:a16="http://schemas.microsoft.com/office/drawing/2014/main" id="{86D42523-F166-DD50-7562-E636386F59EE}"/>
-                </a:ext>
-              </a:extLst>
-            </p:cNvPr>
-            <p:cNvPicPr>
-              <a:picLocks noChangeAspect="1"/>
-            </p:cNvPicPr>
-            <p:nvPr/>
-          </p:nvPicPr>
-          <p:blipFill rotWithShape="1">
-            <a:blip r:embed="rId4" cstate="print">
-              <a:biLevel thresh="75000"/>
-              <a:extLst>
-                <a:ext uri="{28A0092B-C50C-407E-A947-70E740481C1C}">
-                  <a14:useLocalDpi xmlns:a14="http://schemas.microsoft.com/office/drawing/2010/main" val="0"/>
-                </a:ext>
-              </a:extLst>
-            </a:blip>
-            <a:srcRect l="27488"/>
-            <a:stretch/>
-          </p:blipFill>
-          <p:spPr>
-            <a:xfrm>
-              <a:off x="6745384" y="4609005"/>
-              <a:ext cx="3595842" cy="841456"/>
-            </a:xfrm>
-            <a:prstGeom prst="rect">
-              <a:avLst/>
-            </a:prstGeom>
-          </p:spPr>
-        </p:pic>
-      </p:grpSp>
-      <p:grpSp>
-        <p:nvGrpSpPr>
-          <p:cNvPr id="4" name="Group 3">
-            <a:extLst>
-              <a:ext uri="{FF2B5EF4-FFF2-40B4-BE49-F238E27FC236}">
-                <a16:creationId xmlns:a16="http://schemas.microsoft.com/office/drawing/2014/main" id="{17FDF6B0-AED5-8AD6-3A96-68D07DD91030}"/>
-              </a:ext>
-            </a:extLst>
-          </p:cNvPr>
-          <p:cNvGrpSpPr/>
-          <p:nvPr/>
-        </p:nvGrpSpPr>
-        <p:grpSpPr>
-          <a:xfrm>
-            <a:off x="5951984" y="6318094"/>
-            <a:ext cx="6130040" cy="381119"/>
-            <a:chOff x="3900570" y="6209512"/>
-            <a:chExt cx="8074208" cy="488804"/>
-          </a:xfrm>
-        </p:grpSpPr>
-        <p:sp>
-          <p:nvSpPr>
-            <p:cNvPr id="5" name="TextBox 4">
-              <a:extLst>
-                <a:ext uri="{FF2B5EF4-FFF2-40B4-BE49-F238E27FC236}">
-                  <a16:creationId xmlns:a16="http://schemas.microsoft.com/office/drawing/2014/main" id="{834E9ADC-F8FF-E7F4-9C09-314716E5FCC3}"/>
-                </a:ext>
-              </a:extLst>
-            </p:cNvPr>
-            <p:cNvSpPr txBox="1"/>
-            <p:nvPr/>
-          </p:nvSpPr>
-          <p:spPr>
-            <a:xfrm>
-              <a:off x="3900570" y="6209512"/>
-              <a:ext cx="8074208" cy="488804"/>
-            </a:xfrm>
-            <a:prstGeom prst="roundRect">
-              <a:avLst>
-                <a:gd name="adj" fmla="val 20010"/>
-              </a:avLst>
-            </a:prstGeom>
-            <a:noFill/>
-            <a:ln w="19050">
-              <a:solidFill>
-                <a:srgbClr val="FF0000"/>
-              </a:solidFill>
-            </a:ln>
-          </p:spPr>
-          <p:txBody>
-            <a:bodyPr wrap="square" rtlCol="0" anchor="ctr">
-              <a:spAutoFit/>
-            </a:bodyPr>
-            <a:lstStyle/>
-            <a:p>
-              <a:r>
-                <a:rPr lang="en-GB" sz="1600" b="1" dirty="0">
-                  <a:latin typeface="Source Sans Pro" panose="020B0503030403020204" pitchFamily="34" charset="0"/>
-                  <a:ea typeface="Source Sans Pro" panose="020B0503030403020204" pitchFamily="34" charset="0"/>
-                  <a:cs typeface="Segoe UI Semibold" panose="020B0702040204020203" pitchFamily="34" charset="0"/>
-                </a:rPr>
-                <a:t>Please Turn Off/Silence Your Devices </a:t>
-              </a:r>
-              <a:r>
-                <a:rPr lang="zh-TW" altLang="en-US" sz="1600" b="1" dirty="0">
-                  <a:latin typeface="Source Sans Pro" panose="020B0503030403020204" pitchFamily="34" charset="0"/>
-                  <a:ea typeface="Microsoft JhengHei" panose="020B0604030504040204" pitchFamily="34" charset="-120"/>
-                </a:rPr>
-                <a:t>請靜音或關閉所有電子設備</a:t>
-              </a:r>
-              <a:endParaRPr lang="ja-JP" altLang="en-US" sz="1600" b="1" dirty="0">
-                <a:latin typeface="Source Sans Pro" panose="020B0503030403020204" pitchFamily="34" charset="0"/>
-                <a:ea typeface="Microsoft JhengHei" panose="020B0604030504040204" pitchFamily="34" charset="-120"/>
-              </a:endParaRPr>
-            </a:p>
-          </p:txBody>
-        </p:sp>
-        <p:pic>
-          <p:nvPicPr>
-            <p:cNvPr id="6" name="Picture 5" descr="Shape&#10;&#10;Description automatically generated with low confidence">
-              <a:extLst>
-                <a:ext uri="{FF2B5EF4-FFF2-40B4-BE49-F238E27FC236}">
-                  <a16:creationId xmlns:a16="http://schemas.microsoft.com/office/drawing/2014/main" id="{ECB84A56-E5B7-DB3B-25F6-4B70CF33C6EA}"/>
-                </a:ext>
-              </a:extLst>
-            </p:cNvPr>
-            <p:cNvPicPr>
-              <a:picLocks noChangeAspect="1"/>
-            </p:cNvPicPr>
-            <p:nvPr/>
-          </p:nvPicPr>
-          <p:blipFill>
-            <a:blip r:embed="rId5" cstate="print">
+              <a:lum bright="70000" contrast="-70000"/>
               <a:extLst>
                 <a:ext uri="{BEBA8EAE-BF5A-486C-A8C5-ECC9F3942E4B}">
                   <a14:imgProps xmlns:a14="http://schemas.microsoft.com/office/drawing/2010/main">
-                    <a14:imgLayer r:embed="rId6">
+                    <a14:imgLayer r:embed="rId4">
                       <a14:imgEffect>
-                        <a14:colorTemperature colorTemp="11500"/>
+                        <a14:artisticPhotocopy/>
+                      </a14:imgEffect>
+                      <a14:imgEffect>
+                        <a14:colorTemperature colorTemp="11200"/>
                       </a14:imgEffect>
                       <a14:imgEffect>
                         <a14:saturation sat="400000"/>
@@ -7191,8 +7126,103 @@
           </p:blipFill>
           <p:spPr>
             <a:xfrm>
-              <a:off x="11583067" y="6279910"/>
-              <a:ext cx="348008" cy="348008"/>
+              <a:off x="11784632" y="6372983"/>
+              <a:ext cx="264212" cy="271341"/>
+            </a:xfrm>
+            <a:prstGeom prst="rect">
+              <a:avLst/>
+            </a:prstGeom>
+            <a:solidFill>
+              <a:srgbClr val="004B8D"/>
+            </a:solidFill>
+          </p:spPr>
+        </p:pic>
+      </p:grpSp>
+      <p:grpSp>
+        <p:nvGrpSpPr>
+          <p:cNvPr id="23" name="Group 22">
+            <a:extLst>
+              <a:ext uri="{FF2B5EF4-FFF2-40B4-BE49-F238E27FC236}">
+                <a16:creationId xmlns:a16="http://schemas.microsoft.com/office/drawing/2014/main" id="{F69244F0-5CED-B1EA-477F-EF651A9CDE84}"/>
+              </a:ext>
+            </a:extLst>
+          </p:cNvPr>
+          <p:cNvGrpSpPr/>
+          <p:nvPr/>
+        </p:nvGrpSpPr>
+        <p:grpSpPr>
+          <a:xfrm>
+            <a:off x="191344" y="6381328"/>
+            <a:ext cx="3312368" cy="276107"/>
+            <a:chOff x="3719736" y="328470"/>
+            <a:chExt cx="4754803" cy="396343"/>
+          </a:xfrm>
+        </p:grpSpPr>
+        <p:pic>
+          <p:nvPicPr>
+            <p:cNvPr id="24" name="Picture 23">
+              <a:extLst>
+                <a:ext uri="{FF2B5EF4-FFF2-40B4-BE49-F238E27FC236}">
+                  <a16:creationId xmlns:a16="http://schemas.microsoft.com/office/drawing/2014/main" id="{C0B7A978-65DC-ED9D-326B-24E71B4415A2}"/>
+                </a:ext>
+              </a:extLst>
+            </p:cNvPr>
+            <p:cNvPicPr>
+              <a:picLocks noChangeAspect="1"/>
+            </p:cNvPicPr>
+            <p:nvPr/>
+          </p:nvPicPr>
+          <p:blipFill>
+            <a:blip r:embed="rId5" cstate="print">
+              <a:extLst>
+                <a:ext uri="{28A0092B-C50C-407E-A947-70E740481C1C}">
+                  <a14:useLocalDpi xmlns:a14="http://schemas.microsoft.com/office/drawing/2010/main" val="0"/>
+                </a:ext>
+              </a:extLst>
+            </a:blip>
+            <a:stretch>
+              <a:fillRect/>
+            </a:stretch>
+          </p:blipFill>
+          <p:spPr>
+            <a:xfrm>
+              <a:off x="3719736" y="328470"/>
+              <a:ext cx="3030311" cy="392158"/>
+            </a:xfrm>
+            <a:prstGeom prst="rect">
+              <a:avLst/>
+            </a:prstGeom>
+          </p:spPr>
+        </p:pic>
+        <p:pic>
+          <p:nvPicPr>
+            <p:cNvPr id="25" name="Picture 24" descr="A blue text on a black background&#10;&#10;Description automatically generated with low confidence">
+              <a:extLst>
+                <a:ext uri="{FF2B5EF4-FFF2-40B4-BE49-F238E27FC236}">
+                  <a16:creationId xmlns:a16="http://schemas.microsoft.com/office/drawing/2014/main" id="{F8F8CAAA-40AB-55FD-5681-5CD1DE027733}"/>
+                </a:ext>
+              </a:extLst>
+            </p:cNvPr>
+            <p:cNvPicPr>
+              <a:picLocks noChangeAspect="1"/>
+            </p:cNvPicPr>
+            <p:nvPr/>
+          </p:nvPicPr>
+          <p:blipFill rotWithShape="1">
+            <a:blip r:embed="rId6" cstate="print">
+              <a:extLst>
+                <a:ext uri="{28A0092B-C50C-407E-A947-70E740481C1C}">
+                  <a14:useLocalDpi xmlns:a14="http://schemas.microsoft.com/office/drawing/2010/main" val="0"/>
+                </a:ext>
+              </a:extLst>
+            </a:blip>
+            <a:srcRect l="28239" r="1"/>
+            <a:stretch/>
+          </p:blipFill>
+          <p:spPr>
+            <a:xfrm>
+              <a:off x="6816080" y="332656"/>
+              <a:ext cx="1658459" cy="392157"/>
             </a:xfrm>
             <a:prstGeom prst="rect">
               <a:avLst/>
@@ -7823,10 +7853,10 @@
       </p:sp>
       <p:grpSp>
         <p:nvGrpSpPr>
-          <p:cNvPr id="7" name="Group 6">
+          <p:cNvPr id="3" name="Group 2">
             <a:extLst>
               <a:ext uri="{FF2B5EF4-FFF2-40B4-BE49-F238E27FC236}">
-                <a16:creationId xmlns:a16="http://schemas.microsoft.com/office/drawing/2014/main" id="{3133E815-7F3F-056F-427A-BA35F78A2C80}"/>
+                <a16:creationId xmlns:a16="http://schemas.microsoft.com/office/drawing/2014/main" id="{D37B60FB-5A8B-DE0F-E7A3-C0CAD80A4A94}"/>
               </a:ext>
             </a:extLst>
           </p:cNvPr>
@@ -7835,18 +7865,84 @@
         </p:nvGrpSpPr>
         <p:grpSpPr>
           <a:xfrm>
-            <a:off x="220247" y="6381328"/>
-            <a:ext cx="3367551" cy="288032"/>
-            <a:chOff x="503270" y="4609005"/>
-            <a:chExt cx="9837956" cy="841457"/>
+            <a:off x="5951984" y="6318094"/>
+            <a:ext cx="6130040" cy="381119"/>
+            <a:chOff x="5951984" y="6318094"/>
+            <a:chExt cx="6130040" cy="381119"/>
           </a:xfrm>
         </p:grpSpPr>
+        <p:sp>
+          <p:nvSpPr>
+            <p:cNvPr id="10" name="TextBox 9">
+              <a:extLst>
+                <a:ext uri="{FF2B5EF4-FFF2-40B4-BE49-F238E27FC236}">
+                  <a16:creationId xmlns:a16="http://schemas.microsoft.com/office/drawing/2014/main" id="{C681487A-C1BB-EB06-10DD-66228D86DAEF}"/>
+                </a:ext>
+              </a:extLst>
+            </p:cNvPr>
+            <p:cNvSpPr txBox="1"/>
+            <p:nvPr/>
+          </p:nvSpPr>
+          <p:spPr>
+            <a:xfrm>
+              <a:off x="5951984" y="6318094"/>
+              <a:ext cx="6130040" cy="381119"/>
+            </a:xfrm>
+            <a:prstGeom prst="roundRect">
+              <a:avLst>
+                <a:gd name="adj" fmla="val 20010"/>
+              </a:avLst>
+            </a:prstGeom>
+            <a:solidFill>
+              <a:srgbClr val="004B8D"/>
+            </a:solidFill>
+            <a:ln w="19050">
+              <a:noFill/>
+            </a:ln>
+          </p:spPr>
+          <p:txBody>
+            <a:bodyPr wrap="square" rtlCol="0" anchor="ctr">
+              <a:spAutoFit/>
+            </a:bodyPr>
+            <a:lstStyle/>
+            <a:p>
+              <a:r>
+                <a:rPr lang="en-GB" sz="1600" b="1" dirty="0">
+                  <a:solidFill>
+                    <a:schemeClr val="bg1"/>
+                  </a:solidFill>
+                  <a:latin typeface="Source Sans Pro" panose="020B0503030403020204" pitchFamily="34" charset="0"/>
+                  <a:ea typeface="Source Sans Pro" panose="020B0503030403020204" pitchFamily="34" charset="0"/>
+                  <a:cs typeface="Segoe UI Semibold" panose="020B0702040204020203" pitchFamily="34" charset="0"/>
+                </a:rPr>
+                <a:t>Please Turn Off/Silence Your Devices </a:t>
+              </a:r>
+              <a:r>
+                <a:rPr lang="zh-TW" altLang="en-US" sz="1600" b="1" dirty="0">
+                  <a:solidFill>
+                    <a:schemeClr val="bg1"/>
+                  </a:solidFill>
+                  <a:latin typeface="Source Sans Pro" panose="020B0503030403020204" pitchFamily="34" charset="0"/>
+                  <a:ea typeface="Microsoft JhengHei" panose="020B0604030504040204" pitchFamily="34" charset="-120"/>
+                </a:rPr>
+                <a:t>請靜音或關閉所有電子設備</a:t>
+              </a:r>
+              <a:endParaRPr lang="ja-JP" altLang="en-US" sz="1600" b="1" dirty="0">
+                <a:solidFill>
+                  <a:schemeClr val="bg1"/>
+                </a:solidFill>
+                <a:latin typeface="Source Sans Pro" panose="020B0503030403020204" pitchFamily="34" charset="0"/>
+                <a:ea typeface="Microsoft JhengHei" panose="020B0604030504040204" pitchFamily="34" charset="-120"/>
+              </a:endParaRPr>
+            </a:p>
+          </p:txBody>
+        </p:sp>
         <p:pic>
           <p:nvPicPr>
-            <p:cNvPr id="8" name="Picture 7" descr="Logo&#10;&#10;Description automatically generated">
+            <p:cNvPr id="11" name="Picture 10" descr="Shape&#10;&#10;Description automatically generated with low confidence">
               <a:extLst>
                 <a:ext uri="{FF2B5EF4-FFF2-40B4-BE49-F238E27FC236}">
-                  <a16:creationId xmlns:a16="http://schemas.microsoft.com/office/drawing/2014/main" id="{2440C703-349D-5187-8D2E-26BB7927AEA2}"/>
+                  <a16:creationId xmlns:a16="http://schemas.microsoft.com/office/drawing/2014/main" id="{6DEE7500-FE87-D395-FB3D-73ED4800F9BC}"/>
                 </a:ext>
               </a:extLst>
             </p:cNvPr>
@@ -7857,163 +7953,16 @@
           </p:nvPicPr>
           <p:blipFill>
             <a:blip r:embed="rId3" cstate="print">
-              <a:biLevel thresh="75000"/>
-              <a:extLst>
-                <a:ext uri="{28A0092B-C50C-407E-A947-70E740481C1C}">
-                  <a14:useLocalDpi xmlns:a14="http://schemas.microsoft.com/office/drawing/2010/main" val="0"/>
-                </a:ext>
-              </a:extLst>
-            </a:blip>
-            <a:stretch>
-              <a:fillRect/>
-            </a:stretch>
-          </p:blipFill>
-          <p:spPr>
-            <a:xfrm>
-              <a:off x="503270" y="4661782"/>
-              <a:ext cx="6094347" cy="788680"/>
-            </a:xfrm>
-            <a:prstGeom prst="rect">
-              <a:avLst/>
-            </a:prstGeom>
-          </p:spPr>
-        </p:pic>
-        <p:pic>
-          <p:nvPicPr>
-            <p:cNvPr id="9" name="Picture 8" descr="A picture containing icon&#10;&#10;Description automatically generated">
-              <a:extLst>
-                <a:ext uri="{FF2B5EF4-FFF2-40B4-BE49-F238E27FC236}">
-                  <a16:creationId xmlns:a16="http://schemas.microsoft.com/office/drawing/2014/main" id="{6FBA67FE-19C7-15E8-C4F7-C711EA8B5D44}"/>
-                </a:ext>
-              </a:extLst>
-            </p:cNvPr>
-            <p:cNvPicPr>
-              <a:picLocks noChangeAspect="1"/>
-            </p:cNvPicPr>
-            <p:nvPr/>
-          </p:nvPicPr>
-          <p:blipFill rotWithShape="1">
-            <a:blip r:embed="rId4" cstate="print">
-              <a:biLevel thresh="75000"/>
-              <a:extLst>
-                <a:ext uri="{28A0092B-C50C-407E-A947-70E740481C1C}">
-                  <a14:useLocalDpi xmlns:a14="http://schemas.microsoft.com/office/drawing/2010/main" val="0"/>
-                </a:ext>
-              </a:extLst>
-            </a:blip>
-            <a:srcRect l="27488"/>
-            <a:stretch/>
-          </p:blipFill>
-          <p:spPr>
-            <a:xfrm>
-              <a:off x="6745384" y="4609005"/>
-              <a:ext cx="3595842" cy="841456"/>
-            </a:xfrm>
-            <a:prstGeom prst="rect">
-              <a:avLst/>
-            </a:prstGeom>
-          </p:spPr>
-        </p:pic>
-      </p:grpSp>
-      <p:grpSp>
-        <p:nvGrpSpPr>
-          <p:cNvPr id="12" name="Group 11">
-            <a:extLst>
-              <a:ext uri="{FF2B5EF4-FFF2-40B4-BE49-F238E27FC236}">
-                <a16:creationId xmlns:a16="http://schemas.microsoft.com/office/drawing/2014/main" id="{80F5226D-30D1-E385-621D-D5BF5B3AEE47}"/>
-              </a:ext>
-            </a:extLst>
-          </p:cNvPr>
-          <p:cNvGrpSpPr/>
-          <p:nvPr/>
-        </p:nvGrpSpPr>
-        <p:grpSpPr>
-          <a:xfrm>
-            <a:off x="5951984" y="6318094"/>
-            <a:ext cx="6130040" cy="381119"/>
-            <a:chOff x="3900570" y="6209512"/>
-            <a:chExt cx="8074208" cy="488804"/>
-          </a:xfrm>
-        </p:grpSpPr>
-        <p:sp>
-          <p:nvSpPr>
-            <p:cNvPr id="13" name="TextBox 12">
-              <a:extLst>
-                <a:ext uri="{FF2B5EF4-FFF2-40B4-BE49-F238E27FC236}">
-                  <a16:creationId xmlns:a16="http://schemas.microsoft.com/office/drawing/2014/main" id="{AF69CD71-8B27-7762-1389-A7E372787B3C}"/>
-                </a:ext>
-              </a:extLst>
-            </p:cNvPr>
-            <p:cNvSpPr txBox="1"/>
-            <p:nvPr/>
-          </p:nvSpPr>
-          <p:spPr>
-            <a:xfrm>
-              <a:off x="3900570" y="6209512"/>
-              <a:ext cx="8074208" cy="488804"/>
-            </a:xfrm>
-            <a:prstGeom prst="roundRect">
-              <a:avLst>
-                <a:gd name="adj" fmla="val 20010"/>
-              </a:avLst>
-            </a:prstGeom>
-            <a:noFill/>
-            <a:ln w="19050">
-              <a:solidFill>
-                <a:srgbClr val="FF0000"/>
-              </a:solidFill>
-            </a:ln>
-          </p:spPr>
-          <p:txBody>
-            <a:bodyPr wrap="square" rtlCol="0" anchor="ctr">
-              <a:spAutoFit/>
-            </a:bodyPr>
-            <a:lstStyle/>
-            <a:p>
-              <a:r>
-                <a:rPr lang="en-GB" sz="1600" b="1" dirty="0">
-                  <a:latin typeface="Source Sans Pro" panose="020B0503030403020204" pitchFamily="34" charset="0"/>
-                  <a:ea typeface="Source Sans Pro" panose="020B0503030403020204" pitchFamily="34" charset="0"/>
-                  <a:cs typeface="Segoe UI Semibold" panose="020B0702040204020203" pitchFamily="34" charset="0"/>
-                </a:rPr>
-                <a:t>Please Turn Off/Silence Your Devices </a:t>
-              </a:r>
-              <a:r>
-                <a:rPr lang="zh-TW" altLang="en-US" sz="1600" b="1" dirty="0">
-                  <a:latin typeface="Source Sans Pro" panose="020B0503030403020204" pitchFamily="34" charset="0"/>
-                  <a:ea typeface="Microsoft JhengHei" panose="020B0604030504040204" pitchFamily="34" charset="-120"/>
-                </a:rPr>
-                <a:t>請靜音或關閉所有電子設備</a:t>
-              </a:r>
-              <a:endParaRPr lang="ja-JP" altLang="en-US" sz="1600" b="1" dirty="0">
-                <a:latin typeface="Source Sans Pro" panose="020B0503030403020204" pitchFamily="34" charset="0"/>
-                <a:ea typeface="Microsoft JhengHei" panose="020B0604030504040204" pitchFamily="34" charset="-120"/>
-              </a:endParaRPr>
-            </a:p>
-          </p:txBody>
-        </p:sp>
-        <p:pic>
-          <p:nvPicPr>
-            <p:cNvPr id="14" name="Picture 13" descr="Shape&#10;&#10;Description automatically generated with low confidence">
-              <a:extLst>
-                <a:ext uri="{FF2B5EF4-FFF2-40B4-BE49-F238E27FC236}">
-                  <a16:creationId xmlns:a16="http://schemas.microsoft.com/office/drawing/2014/main" id="{92750C7C-CA6C-4AA6-B792-86C275BAB652}"/>
-                </a:ext>
-              </a:extLst>
-            </p:cNvPr>
-            <p:cNvPicPr>
-              <a:picLocks noChangeAspect="1"/>
-            </p:cNvPicPr>
-            <p:nvPr/>
-          </p:nvPicPr>
-          <p:blipFill>
-            <a:blip r:embed="rId5" cstate="print">
+              <a:lum bright="70000" contrast="-70000"/>
               <a:extLst>
                 <a:ext uri="{BEBA8EAE-BF5A-486C-A8C5-ECC9F3942E4B}">
                   <a14:imgProps xmlns:a14="http://schemas.microsoft.com/office/drawing/2010/main">
-                    <a14:imgLayer r:embed="rId6">
+                    <a14:imgLayer r:embed="rId4">
                       <a14:imgEffect>
-                        <a14:colorTemperature colorTemp="11500"/>
+                        <a14:artisticPhotocopy/>
+                      </a14:imgEffect>
+                      <a14:imgEffect>
+                        <a14:colorTemperature colorTemp="11200"/>
                       </a14:imgEffect>
                       <a14:imgEffect>
                         <a14:saturation sat="400000"/>
@@ -8035,8 +7984,103 @@
           </p:blipFill>
           <p:spPr>
             <a:xfrm>
-              <a:off x="11583067" y="6279910"/>
-              <a:ext cx="348008" cy="348008"/>
+              <a:off x="11784632" y="6372983"/>
+              <a:ext cx="264212" cy="271341"/>
+            </a:xfrm>
+            <a:prstGeom prst="rect">
+              <a:avLst/>
+            </a:prstGeom>
+            <a:solidFill>
+              <a:srgbClr val="004B8D"/>
+            </a:solidFill>
+          </p:spPr>
+        </p:pic>
+      </p:grpSp>
+      <p:grpSp>
+        <p:nvGrpSpPr>
+          <p:cNvPr id="18" name="Group 17">
+            <a:extLst>
+              <a:ext uri="{FF2B5EF4-FFF2-40B4-BE49-F238E27FC236}">
+                <a16:creationId xmlns:a16="http://schemas.microsoft.com/office/drawing/2014/main" id="{14D2BF5B-6D58-206A-F500-59F1D48D6064}"/>
+              </a:ext>
+            </a:extLst>
+          </p:cNvPr>
+          <p:cNvGrpSpPr/>
+          <p:nvPr/>
+        </p:nvGrpSpPr>
+        <p:grpSpPr>
+          <a:xfrm>
+            <a:off x="191344" y="6381328"/>
+            <a:ext cx="3312368" cy="276107"/>
+            <a:chOff x="3719736" y="328470"/>
+            <a:chExt cx="4754803" cy="396343"/>
+          </a:xfrm>
+        </p:grpSpPr>
+        <p:pic>
+          <p:nvPicPr>
+            <p:cNvPr id="19" name="Picture 18">
+              <a:extLst>
+                <a:ext uri="{FF2B5EF4-FFF2-40B4-BE49-F238E27FC236}">
+                  <a16:creationId xmlns:a16="http://schemas.microsoft.com/office/drawing/2014/main" id="{B105F02E-20FD-EE41-26B6-7043E046CC0B}"/>
+                </a:ext>
+              </a:extLst>
+            </p:cNvPr>
+            <p:cNvPicPr>
+              <a:picLocks noChangeAspect="1"/>
+            </p:cNvPicPr>
+            <p:nvPr/>
+          </p:nvPicPr>
+          <p:blipFill>
+            <a:blip r:embed="rId5" cstate="print">
+              <a:extLst>
+                <a:ext uri="{28A0092B-C50C-407E-A947-70E740481C1C}">
+                  <a14:useLocalDpi xmlns:a14="http://schemas.microsoft.com/office/drawing/2010/main" val="0"/>
+                </a:ext>
+              </a:extLst>
+            </a:blip>
+            <a:stretch>
+              <a:fillRect/>
+            </a:stretch>
+          </p:blipFill>
+          <p:spPr>
+            <a:xfrm>
+              <a:off x="3719736" y="328470"/>
+              <a:ext cx="3030311" cy="392158"/>
+            </a:xfrm>
+            <a:prstGeom prst="rect">
+              <a:avLst/>
+            </a:prstGeom>
+          </p:spPr>
+        </p:pic>
+        <p:pic>
+          <p:nvPicPr>
+            <p:cNvPr id="20" name="Picture 19" descr="A blue text on a black background&#10;&#10;Description automatically generated with low confidence">
+              <a:extLst>
+                <a:ext uri="{FF2B5EF4-FFF2-40B4-BE49-F238E27FC236}">
+                  <a16:creationId xmlns:a16="http://schemas.microsoft.com/office/drawing/2014/main" id="{FC2C347B-A107-FE3B-0E6E-4634C115D5D1}"/>
+                </a:ext>
+              </a:extLst>
+            </p:cNvPr>
+            <p:cNvPicPr>
+              <a:picLocks noChangeAspect="1"/>
+            </p:cNvPicPr>
+            <p:nvPr/>
+          </p:nvPicPr>
+          <p:blipFill rotWithShape="1">
+            <a:blip r:embed="rId6" cstate="print">
+              <a:extLst>
+                <a:ext uri="{28A0092B-C50C-407E-A947-70E740481C1C}">
+                  <a14:useLocalDpi xmlns:a14="http://schemas.microsoft.com/office/drawing/2010/main" val="0"/>
+                </a:ext>
+              </a:extLst>
+            </a:blip>
+            <a:srcRect l="28239" r="1"/>
+            <a:stretch/>
+          </p:blipFill>
+          <p:spPr>
+            <a:xfrm>
+              <a:off x="6816080" y="332656"/>
+              <a:ext cx="1658459" cy="392157"/>
             </a:xfrm>
             <a:prstGeom prst="rect">
               <a:avLst/>
@@ -8338,9 +8382,7 @@
           </a:prstGeom>
           <a:ln w="38100">
             <a:solidFill>
-              <a:schemeClr val="accent1">
-                <a:lumMod val="75000"/>
-              </a:schemeClr>
+              <a:srgbClr val="004B8D"/>
             </a:solidFill>
           </a:ln>
         </p:spPr>
@@ -8361,10 +8403,10 @@
       </p:cxnSp>
       <p:grpSp>
         <p:nvGrpSpPr>
-          <p:cNvPr id="4" name="Group 3">
+          <p:cNvPr id="11" name="Group 10">
             <a:extLst>
               <a:ext uri="{FF2B5EF4-FFF2-40B4-BE49-F238E27FC236}">
-                <a16:creationId xmlns:a16="http://schemas.microsoft.com/office/drawing/2014/main" id="{1E0372FE-5AA9-B8A6-0C22-5EC9CFB8AB40}"/>
+                <a16:creationId xmlns:a16="http://schemas.microsoft.com/office/drawing/2014/main" id="{F4F183C5-3ED9-E762-9F8F-FA5586BC7315}"/>
               </a:ext>
             </a:extLst>
           </p:cNvPr>
@@ -8375,16 +8417,16 @@
           <a:xfrm>
             <a:off x="5951984" y="6318094"/>
             <a:ext cx="6130040" cy="381119"/>
-            <a:chOff x="3900570" y="6209512"/>
-            <a:chExt cx="8074208" cy="488804"/>
+            <a:chOff x="5951984" y="6318094"/>
+            <a:chExt cx="6130040" cy="381119"/>
           </a:xfrm>
         </p:grpSpPr>
         <p:sp>
           <p:nvSpPr>
-            <p:cNvPr id="5" name="TextBox 4">
+            <p:cNvPr id="12" name="TextBox 11">
               <a:extLst>
                 <a:ext uri="{FF2B5EF4-FFF2-40B4-BE49-F238E27FC236}">
-                  <a16:creationId xmlns:a16="http://schemas.microsoft.com/office/drawing/2014/main" id="{EB56B832-7D00-1ED3-CB34-50FC4A9CA726}"/>
+                  <a16:creationId xmlns:a16="http://schemas.microsoft.com/office/drawing/2014/main" id="{62DBDB56-9D21-60BC-B6C6-E46E8A2C9620}"/>
                 </a:ext>
               </a:extLst>
             </p:cNvPr>
@@ -8393,19 +8435,19 @@
           </p:nvSpPr>
           <p:spPr>
             <a:xfrm>
-              <a:off x="3900570" y="6209512"/>
-              <a:ext cx="8074208" cy="488804"/>
+              <a:off x="5951984" y="6318094"/>
+              <a:ext cx="6130040" cy="381119"/>
             </a:xfrm>
             <a:prstGeom prst="roundRect">
               <a:avLst>
                 <a:gd name="adj" fmla="val 20010"/>
               </a:avLst>
             </a:prstGeom>
-            <a:noFill/>
+            <a:solidFill>
+              <a:srgbClr val="004B8D"/>
+            </a:solidFill>
             <a:ln w="19050">
-              <a:solidFill>
-                <a:srgbClr val="FF0000"/>
-              </a:solidFill>
+              <a:noFill/>
             </a:ln>
           </p:spPr>
           <p:txBody>
@@ -8416,6 +8458,9 @@
             <a:p>
               <a:r>
                 <a:rPr lang="en-GB" sz="1600" b="1" dirty="0">
+                  <a:solidFill>
+                    <a:schemeClr val="bg1"/>
+                  </a:solidFill>
                   <a:latin typeface="Source Sans Pro" panose="020B0503030403020204" pitchFamily="34" charset="0"/>
                   <a:ea typeface="Source Sans Pro" panose="020B0503030403020204" pitchFamily="34" charset="0"/>
                   <a:cs typeface="Segoe UI Semibold" panose="020B0702040204020203" pitchFamily="34" charset="0"/>
@@ -8424,12 +8469,18 @@
               </a:r>
               <a:r>
                 <a:rPr lang="zh-TW" altLang="en-US" sz="1600" b="1" dirty="0">
+                  <a:solidFill>
+                    <a:schemeClr val="bg1"/>
+                  </a:solidFill>
                   <a:latin typeface="Source Sans Pro" panose="020B0503030403020204" pitchFamily="34" charset="0"/>
                   <a:ea typeface="Microsoft JhengHei" panose="020B0604030504040204" pitchFamily="34" charset="-120"/>
                 </a:rPr>
                 <a:t>請靜音或關閉所有電子設備</a:t>
               </a:r>
               <a:endParaRPr lang="ja-JP" altLang="en-US" sz="1600" b="1" dirty="0">
+                <a:solidFill>
+                  <a:schemeClr val="bg1"/>
+                </a:solidFill>
                 <a:latin typeface="Source Sans Pro" panose="020B0503030403020204" pitchFamily="34" charset="0"/>
                 <a:ea typeface="Microsoft JhengHei" panose="020B0604030504040204" pitchFamily="34" charset="-120"/>
               </a:endParaRPr>
@@ -8438,10 +8489,10 @@
         </p:sp>
         <p:pic>
           <p:nvPicPr>
-            <p:cNvPr id="8" name="Picture 7" descr="Shape&#10;&#10;Description automatically generated with low confidence">
+            <p:cNvPr id="13" name="Picture 12" descr="Shape&#10;&#10;Description automatically generated with low confidence">
               <a:extLst>
                 <a:ext uri="{FF2B5EF4-FFF2-40B4-BE49-F238E27FC236}">
-                  <a16:creationId xmlns:a16="http://schemas.microsoft.com/office/drawing/2014/main" id="{5473835D-54C0-38F1-4A61-4A4FA9F1A7DB}"/>
+                  <a16:creationId xmlns:a16="http://schemas.microsoft.com/office/drawing/2014/main" id="{04537517-CAC7-D7A3-2323-B2EE8031BA44}"/>
                 </a:ext>
               </a:extLst>
             </p:cNvPr>
@@ -8452,12 +8503,16 @@
           </p:nvPicPr>
           <p:blipFill>
             <a:blip r:embed="rId3" cstate="print">
+              <a:lum bright="70000" contrast="-70000"/>
               <a:extLst>
                 <a:ext uri="{BEBA8EAE-BF5A-486C-A8C5-ECC9F3942E4B}">
                   <a14:imgProps xmlns:a14="http://schemas.microsoft.com/office/drawing/2010/main">
                     <a14:imgLayer r:embed="rId4">
                       <a14:imgEffect>
-                        <a14:colorTemperature colorTemp="11500"/>
+                        <a14:artisticPhotocopy/>
+                      </a14:imgEffect>
+                      <a14:imgEffect>
+                        <a14:colorTemperature colorTemp="11200"/>
                       </a14:imgEffect>
                       <a14:imgEffect>
                         <a14:saturation sat="400000"/>
@@ -8479,21 +8534,24 @@
           </p:blipFill>
           <p:spPr>
             <a:xfrm>
-              <a:off x="11583067" y="6279910"/>
-              <a:ext cx="348008" cy="348008"/>
+              <a:off x="11784632" y="6372983"/>
+              <a:ext cx="264212" cy="271341"/>
             </a:xfrm>
             <a:prstGeom prst="rect">
               <a:avLst/>
             </a:prstGeom>
+            <a:solidFill>
+              <a:srgbClr val="004B8D"/>
+            </a:solidFill>
           </p:spPr>
         </p:pic>
       </p:grpSp>
       <p:grpSp>
         <p:nvGrpSpPr>
-          <p:cNvPr id="2" name="Group 1">
+          <p:cNvPr id="14" name="Group 13">
             <a:extLst>
               <a:ext uri="{FF2B5EF4-FFF2-40B4-BE49-F238E27FC236}">
-                <a16:creationId xmlns:a16="http://schemas.microsoft.com/office/drawing/2014/main" id="{87FED79B-F10A-0FCD-D534-F24CE5CEEFCD}"/>
+                <a16:creationId xmlns:a16="http://schemas.microsoft.com/office/drawing/2014/main" id="{3911759B-A7C6-8804-91FF-0F93B331B372}"/>
               </a:ext>
             </a:extLst>
           </p:cNvPr>
@@ -8502,18 +8560,18 @@
         </p:nvGrpSpPr>
         <p:grpSpPr>
           <a:xfrm>
-            <a:off x="220247" y="6381328"/>
-            <a:ext cx="3367551" cy="288032"/>
-            <a:chOff x="503270" y="4609005"/>
-            <a:chExt cx="9837956" cy="841457"/>
+            <a:off x="191344" y="6381328"/>
+            <a:ext cx="3312368" cy="276107"/>
+            <a:chOff x="3719736" y="328470"/>
+            <a:chExt cx="4754803" cy="396343"/>
           </a:xfrm>
         </p:grpSpPr>
         <p:pic>
           <p:nvPicPr>
-            <p:cNvPr id="9" name="Picture 8" descr="Logo&#10;&#10;Description automatically generated">
+            <p:cNvPr id="16" name="Picture 15">
               <a:extLst>
                 <a:ext uri="{FF2B5EF4-FFF2-40B4-BE49-F238E27FC236}">
-                  <a16:creationId xmlns:a16="http://schemas.microsoft.com/office/drawing/2014/main" id="{D5091D81-EABC-F254-ED2A-EB2100BBF390}"/>
+                  <a16:creationId xmlns:a16="http://schemas.microsoft.com/office/drawing/2014/main" id="{6ED8EFDC-4DF0-C0C0-634A-705600B0CC71}"/>
                 </a:ext>
               </a:extLst>
             </p:cNvPr>
@@ -8524,7 +8582,6 @@
           </p:nvPicPr>
           <p:blipFill>
             <a:blip r:embed="rId5" cstate="print">
-              <a:biLevel thresh="75000"/>
               <a:extLst>
                 <a:ext uri="{28A0092B-C50C-407E-A947-70E740481C1C}">
                   <a14:useLocalDpi xmlns:a14="http://schemas.microsoft.com/office/drawing/2010/main" val="0"/>
@@ -8537,8 +8594,8 @@
           </p:blipFill>
           <p:spPr>
             <a:xfrm>
-              <a:off x="503270" y="4661782"/>
-              <a:ext cx="6094347" cy="788680"/>
+              <a:off x="3719736" y="328470"/>
+              <a:ext cx="3030311" cy="392158"/>
             </a:xfrm>
             <a:prstGeom prst="rect">
               <a:avLst/>
@@ -8547,10 +8604,10 @@
         </p:pic>
         <p:pic>
           <p:nvPicPr>
-            <p:cNvPr id="10" name="Picture 9" descr="A picture containing icon&#10;&#10;Description automatically generated">
+            <p:cNvPr id="17" name="Picture 16" descr="A blue text on a black background&#10;&#10;Description automatically generated with low confidence">
               <a:extLst>
                 <a:ext uri="{FF2B5EF4-FFF2-40B4-BE49-F238E27FC236}">
-                  <a16:creationId xmlns:a16="http://schemas.microsoft.com/office/drawing/2014/main" id="{A4CA5380-F497-1A89-C991-0DC290F018CF}"/>
+                  <a16:creationId xmlns:a16="http://schemas.microsoft.com/office/drawing/2014/main" id="{B9EEBFE4-EA73-2472-1C65-58DEC85CCE82}"/>
                 </a:ext>
               </a:extLst>
             </p:cNvPr>
@@ -8561,20 +8618,19 @@
           </p:nvPicPr>
           <p:blipFill rotWithShape="1">
             <a:blip r:embed="rId6" cstate="print">
-              <a:biLevel thresh="75000"/>
               <a:extLst>
                 <a:ext uri="{28A0092B-C50C-407E-A947-70E740481C1C}">
                   <a14:useLocalDpi xmlns:a14="http://schemas.microsoft.com/office/drawing/2010/main" val="0"/>
                 </a:ext>
               </a:extLst>
             </a:blip>
-            <a:srcRect l="27488"/>
+            <a:srcRect l="28239" r="1"/>
             <a:stretch/>
           </p:blipFill>
           <p:spPr>
             <a:xfrm>
-              <a:off x="6745384" y="4609005"/>
-              <a:ext cx="3595842" cy="841456"/>
+              <a:off x="6816080" y="332656"/>
+              <a:ext cx="1658459" cy="392157"/>
             </a:xfrm>
             <a:prstGeom prst="rect">
               <a:avLst/>
@@ -8793,9 +8849,7 @@
           </a:prstGeom>
           <a:ln w="38100">
             <a:solidFill>
-              <a:schemeClr val="accent1">
-                <a:lumMod val="75000"/>
-              </a:schemeClr>
+              <a:srgbClr val="004B8D"/>
             </a:solidFill>
           </a:ln>
         </p:spPr>
@@ -8816,10 +8870,10 @@
       </p:cxnSp>
       <p:grpSp>
         <p:nvGrpSpPr>
-          <p:cNvPr id="2" name="Group 1">
+          <p:cNvPr id="9" name="Group 8">
             <a:extLst>
               <a:ext uri="{FF2B5EF4-FFF2-40B4-BE49-F238E27FC236}">
-                <a16:creationId xmlns:a16="http://schemas.microsoft.com/office/drawing/2014/main" id="{0C4DCD01-F533-D0DB-7F33-AE31162B0AE9}"/>
+                <a16:creationId xmlns:a16="http://schemas.microsoft.com/office/drawing/2014/main" id="{2EF57000-0D73-1528-7661-C8EF84183CF2}"/>
               </a:ext>
             </a:extLst>
           </p:cNvPr>
@@ -8830,16 +8884,16 @@
           <a:xfrm>
             <a:off x="5951984" y="6318094"/>
             <a:ext cx="6130040" cy="381119"/>
-            <a:chOff x="3900570" y="6209512"/>
-            <a:chExt cx="8074208" cy="488804"/>
+            <a:chOff x="5951984" y="6318094"/>
+            <a:chExt cx="6130040" cy="381119"/>
           </a:xfrm>
         </p:grpSpPr>
         <p:sp>
           <p:nvSpPr>
-            <p:cNvPr id="4" name="TextBox 3">
+            <p:cNvPr id="10" name="TextBox 9">
               <a:extLst>
                 <a:ext uri="{FF2B5EF4-FFF2-40B4-BE49-F238E27FC236}">
-                  <a16:creationId xmlns:a16="http://schemas.microsoft.com/office/drawing/2014/main" id="{CA779E26-5AE4-C061-0771-74282A5EFBFC}"/>
+                  <a16:creationId xmlns:a16="http://schemas.microsoft.com/office/drawing/2014/main" id="{B3CB4E3F-A187-31E5-11E8-7B677D21C0C6}"/>
                 </a:ext>
               </a:extLst>
             </p:cNvPr>
@@ -8848,19 +8902,19 @@
           </p:nvSpPr>
           <p:spPr>
             <a:xfrm>
-              <a:off x="3900570" y="6209512"/>
-              <a:ext cx="8074208" cy="488804"/>
+              <a:off x="5951984" y="6318094"/>
+              <a:ext cx="6130040" cy="381119"/>
             </a:xfrm>
             <a:prstGeom prst="roundRect">
               <a:avLst>
                 <a:gd name="adj" fmla="val 20010"/>
               </a:avLst>
             </a:prstGeom>
-            <a:noFill/>
+            <a:solidFill>
+              <a:srgbClr val="004B8D"/>
+            </a:solidFill>
             <a:ln w="19050">
-              <a:solidFill>
-                <a:srgbClr val="FF0000"/>
-              </a:solidFill>
+              <a:noFill/>
             </a:ln>
           </p:spPr>
           <p:txBody>
@@ -8871,6 +8925,9 @@
             <a:p>
               <a:r>
                 <a:rPr lang="en-GB" sz="1600" b="1" dirty="0">
+                  <a:solidFill>
+                    <a:schemeClr val="bg1"/>
+                  </a:solidFill>
                   <a:latin typeface="Source Sans Pro" panose="020B0503030403020204" pitchFamily="34" charset="0"/>
                   <a:ea typeface="Source Sans Pro" panose="020B0503030403020204" pitchFamily="34" charset="0"/>
                   <a:cs typeface="Segoe UI Semibold" panose="020B0702040204020203" pitchFamily="34" charset="0"/>
@@ -8879,12 +8936,18 @@
               </a:r>
               <a:r>
                 <a:rPr lang="zh-TW" altLang="en-US" sz="1600" b="1" dirty="0">
+                  <a:solidFill>
+                    <a:schemeClr val="bg1"/>
+                  </a:solidFill>
                   <a:latin typeface="Source Sans Pro" panose="020B0503030403020204" pitchFamily="34" charset="0"/>
                   <a:ea typeface="Microsoft JhengHei" panose="020B0604030504040204" pitchFamily="34" charset="-120"/>
                 </a:rPr>
                 <a:t>請靜音或關閉所有電子設備</a:t>
               </a:r>
               <a:endParaRPr lang="ja-JP" altLang="en-US" sz="1600" b="1" dirty="0">
+                <a:solidFill>
+                  <a:schemeClr val="bg1"/>
+                </a:solidFill>
                 <a:latin typeface="Source Sans Pro" panose="020B0503030403020204" pitchFamily="34" charset="0"/>
                 <a:ea typeface="Microsoft JhengHei" panose="020B0604030504040204" pitchFamily="34" charset="-120"/>
               </a:endParaRPr>
@@ -8893,10 +8956,10 @@
         </p:sp>
         <p:pic>
           <p:nvPicPr>
-            <p:cNvPr id="5" name="Picture 4" descr="Shape&#10;&#10;Description automatically generated with low confidence">
+            <p:cNvPr id="12" name="Picture 11" descr="Shape&#10;&#10;Description automatically generated with low confidence">
               <a:extLst>
                 <a:ext uri="{FF2B5EF4-FFF2-40B4-BE49-F238E27FC236}">
-                  <a16:creationId xmlns:a16="http://schemas.microsoft.com/office/drawing/2014/main" id="{FE203ED7-5A90-07EA-C1AB-C2B10D34433D}"/>
+                  <a16:creationId xmlns:a16="http://schemas.microsoft.com/office/drawing/2014/main" id="{6BDE222E-477F-DABC-688B-6CA8472B6B6D}"/>
                 </a:ext>
               </a:extLst>
             </p:cNvPr>
@@ -8907,12 +8970,16 @@
           </p:nvPicPr>
           <p:blipFill>
             <a:blip r:embed="rId3" cstate="print">
+              <a:lum bright="70000" contrast="-70000"/>
               <a:extLst>
                 <a:ext uri="{BEBA8EAE-BF5A-486C-A8C5-ECC9F3942E4B}">
                   <a14:imgProps xmlns:a14="http://schemas.microsoft.com/office/drawing/2010/main">
                     <a14:imgLayer r:embed="rId4">
                       <a14:imgEffect>
-                        <a14:colorTemperature colorTemp="11500"/>
+                        <a14:artisticPhotocopy/>
+                      </a14:imgEffect>
+                      <a14:imgEffect>
+                        <a14:colorTemperature colorTemp="11200"/>
                       </a14:imgEffect>
                       <a14:imgEffect>
                         <a14:saturation sat="400000"/>
@@ -8934,21 +9001,24 @@
           </p:blipFill>
           <p:spPr>
             <a:xfrm>
-              <a:off x="11583067" y="6279910"/>
-              <a:ext cx="348008" cy="348008"/>
+              <a:off x="11784632" y="6372983"/>
+              <a:ext cx="264212" cy="271341"/>
             </a:xfrm>
             <a:prstGeom prst="rect">
               <a:avLst/>
             </a:prstGeom>
+            <a:solidFill>
+              <a:srgbClr val="004B8D"/>
+            </a:solidFill>
           </p:spPr>
         </p:pic>
       </p:grpSp>
       <p:grpSp>
         <p:nvGrpSpPr>
-          <p:cNvPr id="8" name="Group 7">
+          <p:cNvPr id="14" name="Group 13">
             <a:extLst>
               <a:ext uri="{FF2B5EF4-FFF2-40B4-BE49-F238E27FC236}">
-                <a16:creationId xmlns:a16="http://schemas.microsoft.com/office/drawing/2014/main" id="{235CE32E-B4E5-9746-79A9-51845A8D035C}"/>
+                <a16:creationId xmlns:a16="http://schemas.microsoft.com/office/drawing/2014/main" id="{3D332699-DD03-D5CA-D3EC-0D5647EBBA57}"/>
               </a:ext>
             </a:extLst>
           </p:cNvPr>
@@ -8957,18 +9027,18 @@
         </p:nvGrpSpPr>
         <p:grpSpPr>
           <a:xfrm>
-            <a:off x="220247" y="6381328"/>
-            <a:ext cx="3367551" cy="288032"/>
-            <a:chOff x="503270" y="4609005"/>
-            <a:chExt cx="9837956" cy="841457"/>
+            <a:off x="191344" y="6381328"/>
+            <a:ext cx="3312368" cy="276107"/>
+            <a:chOff x="3719736" y="328470"/>
+            <a:chExt cx="4754803" cy="396343"/>
           </a:xfrm>
         </p:grpSpPr>
         <p:pic>
           <p:nvPicPr>
-            <p:cNvPr id="11" name="Picture 10" descr="Logo&#10;&#10;Description automatically generated">
+            <p:cNvPr id="15" name="Picture 14">
               <a:extLst>
                 <a:ext uri="{FF2B5EF4-FFF2-40B4-BE49-F238E27FC236}">
-                  <a16:creationId xmlns:a16="http://schemas.microsoft.com/office/drawing/2014/main" id="{56A02108-2A87-8A00-9C2A-A0AB0154259B}"/>
+                  <a16:creationId xmlns:a16="http://schemas.microsoft.com/office/drawing/2014/main" id="{C720BD72-31C1-03E9-CE55-B467603EDF59}"/>
                 </a:ext>
               </a:extLst>
             </p:cNvPr>
@@ -8979,7 +9049,6 @@
           </p:nvPicPr>
           <p:blipFill>
             <a:blip r:embed="rId5" cstate="print">
-              <a:biLevel thresh="75000"/>
               <a:extLst>
                 <a:ext uri="{28A0092B-C50C-407E-A947-70E740481C1C}">
                   <a14:useLocalDpi xmlns:a14="http://schemas.microsoft.com/office/drawing/2010/main" val="0"/>
@@ -8992,8 +9061,8 @@
           </p:blipFill>
           <p:spPr>
             <a:xfrm>
-              <a:off x="503270" y="4661782"/>
-              <a:ext cx="6094347" cy="788680"/>
+              <a:off x="3719736" y="328470"/>
+              <a:ext cx="3030311" cy="392158"/>
             </a:xfrm>
             <a:prstGeom prst="rect">
               <a:avLst/>
@@ -9002,10 +9071,10 @@
         </p:pic>
         <p:pic>
           <p:nvPicPr>
-            <p:cNvPr id="13" name="Picture 12" descr="A picture containing icon&#10;&#10;Description automatically generated">
+            <p:cNvPr id="16" name="Picture 15" descr="A blue text on a black background&#10;&#10;Description automatically generated with low confidence">
               <a:extLst>
                 <a:ext uri="{FF2B5EF4-FFF2-40B4-BE49-F238E27FC236}">
-                  <a16:creationId xmlns:a16="http://schemas.microsoft.com/office/drawing/2014/main" id="{BD8BF4EB-8A09-B264-823F-12DCE6A7414F}"/>
+                  <a16:creationId xmlns:a16="http://schemas.microsoft.com/office/drawing/2014/main" id="{8D11CD00-EB4D-CD0F-527B-4F26520F980F}"/>
                 </a:ext>
               </a:extLst>
             </p:cNvPr>
@@ -9016,20 +9085,19 @@
           </p:nvPicPr>
           <p:blipFill rotWithShape="1">
             <a:blip r:embed="rId6" cstate="print">
-              <a:biLevel thresh="75000"/>
               <a:extLst>
                 <a:ext uri="{28A0092B-C50C-407E-A947-70E740481C1C}">
                   <a14:useLocalDpi xmlns:a14="http://schemas.microsoft.com/office/drawing/2010/main" val="0"/>
                 </a:ext>
               </a:extLst>
             </a:blip>
-            <a:srcRect l="27488"/>
+            <a:srcRect l="28239" r="1"/>
             <a:stretch/>
           </p:blipFill>
           <p:spPr>
             <a:xfrm>
-              <a:off x="6745384" y="4609005"/>
-              <a:ext cx="3595842" cy="841456"/>
+              <a:off x="6816080" y="332656"/>
+              <a:ext cx="1658459" cy="392157"/>
             </a:xfrm>
             <a:prstGeom prst="rect">
               <a:avLst/>
@@ -9248,9 +9316,7 @@
           </a:prstGeom>
           <a:ln w="38100">
             <a:solidFill>
-              <a:schemeClr val="accent1">
-                <a:lumMod val="75000"/>
-              </a:schemeClr>
+              <a:srgbClr val="004B8D"/>
             </a:solidFill>
           </a:ln>
         </p:spPr>
@@ -9271,10 +9337,10 @@
       </p:cxnSp>
       <p:grpSp>
         <p:nvGrpSpPr>
-          <p:cNvPr id="6" name="Group 5">
+          <p:cNvPr id="2" name="Group 1">
             <a:extLst>
               <a:ext uri="{FF2B5EF4-FFF2-40B4-BE49-F238E27FC236}">
-                <a16:creationId xmlns:a16="http://schemas.microsoft.com/office/drawing/2014/main" id="{702E56C3-3C87-EB7C-8382-9F614BEFE1E2}"/>
+                <a16:creationId xmlns:a16="http://schemas.microsoft.com/office/drawing/2014/main" id="{25583494-A4A7-E1A3-30DD-55BE5A8F8715}"/>
               </a:ext>
             </a:extLst>
           </p:cNvPr>
@@ -9285,16 +9351,16 @@
           <a:xfrm>
             <a:off x="5951984" y="6318094"/>
             <a:ext cx="6130040" cy="381119"/>
-            <a:chOff x="3900570" y="6209512"/>
-            <a:chExt cx="8074208" cy="488804"/>
+            <a:chOff x="5951984" y="6318094"/>
+            <a:chExt cx="6130040" cy="381119"/>
           </a:xfrm>
         </p:grpSpPr>
         <p:sp>
           <p:nvSpPr>
-            <p:cNvPr id="7" name="TextBox 6">
+            <p:cNvPr id="3" name="TextBox 2">
               <a:extLst>
                 <a:ext uri="{FF2B5EF4-FFF2-40B4-BE49-F238E27FC236}">
-                  <a16:creationId xmlns:a16="http://schemas.microsoft.com/office/drawing/2014/main" id="{0A55337A-AADB-6D6B-F423-3C94AEFD8966}"/>
+                  <a16:creationId xmlns:a16="http://schemas.microsoft.com/office/drawing/2014/main" id="{CA665FB4-42D0-C154-F14A-E1EE732FE24A}"/>
                 </a:ext>
               </a:extLst>
             </p:cNvPr>
@@ -9303,19 +9369,19 @@
           </p:nvSpPr>
           <p:spPr>
             <a:xfrm>
-              <a:off x="3900570" y="6209512"/>
-              <a:ext cx="8074208" cy="488804"/>
+              <a:off x="5951984" y="6318094"/>
+              <a:ext cx="6130040" cy="381119"/>
             </a:xfrm>
             <a:prstGeom prst="roundRect">
               <a:avLst>
                 <a:gd name="adj" fmla="val 20010"/>
               </a:avLst>
             </a:prstGeom>
-            <a:noFill/>
+            <a:solidFill>
+              <a:srgbClr val="004B8D"/>
+            </a:solidFill>
             <a:ln w="19050">
-              <a:solidFill>
-                <a:srgbClr val="FF0000"/>
-              </a:solidFill>
+              <a:noFill/>
             </a:ln>
           </p:spPr>
           <p:txBody>
@@ -9326,6 +9392,9 @@
             <a:p>
               <a:r>
                 <a:rPr lang="en-GB" sz="1600" b="1" dirty="0">
+                  <a:solidFill>
+                    <a:schemeClr val="bg1"/>
+                  </a:solidFill>
                   <a:latin typeface="Source Sans Pro" panose="020B0503030403020204" pitchFamily="34" charset="0"/>
                   <a:ea typeface="Source Sans Pro" panose="020B0503030403020204" pitchFamily="34" charset="0"/>
                   <a:cs typeface="Segoe UI Semibold" panose="020B0702040204020203" pitchFamily="34" charset="0"/>
@@ -9334,12 +9403,18 @@
               </a:r>
               <a:r>
                 <a:rPr lang="zh-TW" altLang="en-US" sz="1600" b="1" dirty="0">
+                  <a:solidFill>
+                    <a:schemeClr val="bg1"/>
+                  </a:solidFill>
                   <a:latin typeface="Source Sans Pro" panose="020B0503030403020204" pitchFamily="34" charset="0"/>
                   <a:ea typeface="Microsoft JhengHei" panose="020B0604030504040204" pitchFamily="34" charset="-120"/>
                 </a:rPr>
                 <a:t>請靜音或關閉所有電子設備</a:t>
               </a:r>
               <a:endParaRPr lang="ja-JP" altLang="en-US" sz="1600" b="1" dirty="0">
+                <a:solidFill>
+                  <a:schemeClr val="bg1"/>
+                </a:solidFill>
                 <a:latin typeface="Source Sans Pro" panose="020B0503030403020204" pitchFamily="34" charset="0"/>
                 <a:ea typeface="Microsoft JhengHei" panose="020B0604030504040204" pitchFamily="34" charset="-120"/>
               </a:endParaRPr>
@@ -9348,10 +9423,10 @@
         </p:sp>
         <p:pic>
           <p:nvPicPr>
-            <p:cNvPr id="9" name="Picture 8" descr="Shape&#10;&#10;Description automatically generated with low confidence">
+            <p:cNvPr id="4" name="Picture 3" descr="Shape&#10;&#10;Description automatically generated with low confidence">
               <a:extLst>
                 <a:ext uri="{FF2B5EF4-FFF2-40B4-BE49-F238E27FC236}">
-                  <a16:creationId xmlns:a16="http://schemas.microsoft.com/office/drawing/2014/main" id="{D9FC682E-3882-3060-F7AB-43EE5A9993B9}"/>
+                  <a16:creationId xmlns:a16="http://schemas.microsoft.com/office/drawing/2014/main" id="{0AD2B9C4-B659-F256-54CB-94DCC920968A}"/>
                 </a:ext>
               </a:extLst>
             </p:cNvPr>
@@ -9362,12 +9437,16 @@
           </p:nvPicPr>
           <p:blipFill>
             <a:blip r:embed="rId3" cstate="print">
+              <a:lum bright="70000" contrast="-70000"/>
               <a:extLst>
                 <a:ext uri="{BEBA8EAE-BF5A-486C-A8C5-ECC9F3942E4B}">
                   <a14:imgProps xmlns:a14="http://schemas.microsoft.com/office/drawing/2010/main">
                     <a14:imgLayer r:embed="rId4">
                       <a14:imgEffect>
-                        <a14:colorTemperature colorTemp="11500"/>
+                        <a14:artisticPhotocopy/>
+                      </a14:imgEffect>
+                      <a14:imgEffect>
+                        <a14:colorTemperature colorTemp="11200"/>
                       </a14:imgEffect>
                       <a14:imgEffect>
                         <a14:saturation sat="400000"/>
@@ -9389,21 +9468,24 @@
           </p:blipFill>
           <p:spPr>
             <a:xfrm>
-              <a:off x="11583067" y="6279910"/>
-              <a:ext cx="348008" cy="348008"/>
+              <a:off x="11784632" y="6372983"/>
+              <a:ext cx="264212" cy="271341"/>
             </a:xfrm>
             <a:prstGeom prst="rect">
               <a:avLst/>
             </a:prstGeom>
+            <a:solidFill>
+              <a:srgbClr val="004B8D"/>
+            </a:solidFill>
           </p:spPr>
         </p:pic>
       </p:grpSp>
       <p:grpSp>
         <p:nvGrpSpPr>
-          <p:cNvPr id="8" name="Group 7">
+          <p:cNvPr id="14" name="Group 13">
             <a:extLst>
               <a:ext uri="{FF2B5EF4-FFF2-40B4-BE49-F238E27FC236}">
-                <a16:creationId xmlns:a16="http://schemas.microsoft.com/office/drawing/2014/main" id="{AF7526A1-2211-EB1C-EA11-20399FCF7205}"/>
+                <a16:creationId xmlns:a16="http://schemas.microsoft.com/office/drawing/2014/main" id="{CDB6F33C-2A84-5482-333C-60222242A092}"/>
               </a:ext>
             </a:extLst>
           </p:cNvPr>
@@ -9412,18 +9494,18 @@
         </p:nvGrpSpPr>
         <p:grpSpPr>
           <a:xfrm>
-            <a:off x="220247" y="6381328"/>
-            <a:ext cx="3367551" cy="288032"/>
-            <a:chOff x="503270" y="4609005"/>
-            <a:chExt cx="9837956" cy="841457"/>
+            <a:off x="191344" y="6381328"/>
+            <a:ext cx="3312368" cy="276107"/>
+            <a:chOff x="3719736" y="328470"/>
+            <a:chExt cx="4754803" cy="396343"/>
           </a:xfrm>
         </p:grpSpPr>
         <p:pic>
           <p:nvPicPr>
-            <p:cNvPr id="10" name="Picture 9" descr="Logo&#10;&#10;Description automatically generated">
+            <p:cNvPr id="15" name="Picture 14">
               <a:extLst>
                 <a:ext uri="{FF2B5EF4-FFF2-40B4-BE49-F238E27FC236}">
-                  <a16:creationId xmlns:a16="http://schemas.microsoft.com/office/drawing/2014/main" id="{28349FCA-8B8A-2791-BE1E-DA5C14643C08}"/>
+                  <a16:creationId xmlns:a16="http://schemas.microsoft.com/office/drawing/2014/main" id="{DB3A339E-31CA-53FE-DCC3-F6516E0FFE54}"/>
                 </a:ext>
               </a:extLst>
             </p:cNvPr>
@@ -9434,7 +9516,6 @@
           </p:nvPicPr>
           <p:blipFill>
             <a:blip r:embed="rId5" cstate="print">
-              <a:biLevel thresh="75000"/>
               <a:extLst>
                 <a:ext uri="{28A0092B-C50C-407E-A947-70E740481C1C}">
                   <a14:useLocalDpi xmlns:a14="http://schemas.microsoft.com/office/drawing/2010/main" val="0"/>
@@ -9447,8 +9528,8 @@
           </p:blipFill>
           <p:spPr>
             <a:xfrm>
-              <a:off x="503270" y="4661782"/>
-              <a:ext cx="6094347" cy="788680"/>
+              <a:off x="3719736" y="328470"/>
+              <a:ext cx="3030311" cy="392158"/>
             </a:xfrm>
             <a:prstGeom prst="rect">
               <a:avLst/>
@@ -9457,10 +9538,10 @@
         </p:pic>
         <p:pic>
           <p:nvPicPr>
-            <p:cNvPr id="11" name="Picture 10" descr="A picture containing icon&#10;&#10;Description automatically generated">
+            <p:cNvPr id="16" name="Picture 15" descr="A blue text on a black background&#10;&#10;Description automatically generated with low confidence">
               <a:extLst>
                 <a:ext uri="{FF2B5EF4-FFF2-40B4-BE49-F238E27FC236}">
-                  <a16:creationId xmlns:a16="http://schemas.microsoft.com/office/drawing/2014/main" id="{2A6626B5-6385-E0C7-1672-4558C84DE0AC}"/>
+                  <a16:creationId xmlns:a16="http://schemas.microsoft.com/office/drawing/2014/main" id="{D62A02D3-0C97-A2A6-7C37-D95C56FC8728}"/>
                 </a:ext>
               </a:extLst>
             </p:cNvPr>
@@ -9471,20 +9552,19 @@
           </p:nvPicPr>
           <p:blipFill rotWithShape="1">
             <a:blip r:embed="rId6" cstate="print">
-              <a:biLevel thresh="75000"/>
               <a:extLst>
                 <a:ext uri="{28A0092B-C50C-407E-A947-70E740481C1C}">
                   <a14:useLocalDpi xmlns:a14="http://schemas.microsoft.com/office/drawing/2010/main" val="0"/>
                 </a:ext>
               </a:extLst>
             </a:blip>
-            <a:srcRect l="27488"/>
+            <a:srcRect l="28239" r="1"/>
             <a:stretch/>
           </p:blipFill>
           <p:spPr>
             <a:xfrm>
-              <a:off x="6745384" y="4609005"/>
-              <a:ext cx="3595842" cy="841456"/>
+              <a:off x="6816080" y="332656"/>
+              <a:ext cx="1658459" cy="392157"/>
             </a:xfrm>
             <a:prstGeom prst="rect">
               <a:avLst/>
@@ -9769,9 +9849,7 @@
             <a:r>
               <a:rPr lang="en-GB" sz="3200" b="1" dirty="0">
                 <a:solidFill>
-                  <a:schemeClr val="accent1">
-                    <a:lumMod val="75000"/>
-                  </a:schemeClr>
+                  <a:srgbClr val="004D91"/>
                 </a:solidFill>
                 <a:latin typeface="Source Sans Pro" panose="020B0503030403020204" pitchFamily="34" charset="0"/>
                 <a:ea typeface="Source Sans Pro" panose="020B0503030403020204" pitchFamily="34" charset="0"/>
@@ -9782,9 +9860,7 @@
             <a:r>
               <a:rPr lang="ja-JP" altLang="en-US" sz="3200" b="1" dirty="0">
                 <a:solidFill>
-                  <a:schemeClr val="accent1">
-                    <a:lumMod val="75000"/>
-                  </a:schemeClr>
+                  <a:srgbClr val="004D91"/>
                 </a:solidFill>
                 <a:latin typeface="Source Sans Pro" panose="020B0503030403020204" pitchFamily="34" charset="0"/>
                 <a:ea typeface="Microsoft JhengHei" panose="020B0604030504040204" pitchFamily="34" charset="-120"/>
@@ -9795,9 +9871,7 @@
             <a:r>
               <a:rPr lang="en-GB" sz="3200" b="1" dirty="0">
                 <a:solidFill>
-                  <a:schemeClr val="accent1">
-                    <a:lumMod val="75000"/>
-                  </a:schemeClr>
+                  <a:srgbClr val="004D91"/>
                 </a:solidFill>
                 <a:latin typeface="Source Sans Pro" panose="020B0503030403020204" pitchFamily="34" charset="0"/>
                 <a:ea typeface="Source Sans Pro" panose="020B0503030403020204" pitchFamily="34" charset="0"/>
@@ -9844,9 +9918,7 @@
             <a:r>
               <a:rPr lang="en-GB" sz="2800" b="1" dirty="0">
                 <a:solidFill>
-                  <a:schemeClr val="accent1">
-                    <a:lumMod val="75000"/>
-                  </a:schemeClr>
+                  <a:srgbClr val="004D91"/>
                 </a:solidFill>
                 <a:latin typeface="Source Sans Pro" panose="020B0503030403020204" pitchFamily="34" charset="0"/>
                 <a:ea typeface="Source Sans Pro" panose="020B0503030403020204" pitchFamily="34" charset="0"/>
@@ -9893,9 +9965,7 @@
             <a:r>
               <a:rPr lang="en-GB" sz="2800" b="1" dirty="0">
                 <a:solidFill>
-                  <a:schemeClr val="accent1">
-                    <a:lumMod val="75000"/>
-                  </a:schemeClr>
+                  <a:srgbClr val="004D91"/>
                 </a:solidFill>
                 <a:latin typeface="Source Sans Pro" panose="020B0503030403020204" pitchFamily="34" charset="0"/>
                 <a:ea typeface="Source Sans Pro" panose="020B0503030403020204" pitchFamily="34" charset="0"/>
@@ -9930,9 +10000,7 @@
           </a:prstGeom>
           <a:ln w="38100">
             <a:solidFill>
-              <a:schemeClr val="accent1">
-                <a:lumMod val="75000"/>
-              </a:schemeClr>
+              <a:srgbClr val="004B8D"/>
             </a:solidFill>
           </a:ln>
         </p:spPr>
@@ -9975,9 +10043,7 @@
           </a:prstGeom>
           <a:ln w="38100">
             <a:solidFill>
-              <a:schemeClr val="accent1">
-                <a:lumMod val="75000"/>
-              </a:schemeClr>
+              <a:srgbClr val="004B8D"/>
             </a:solidFill>
           </a:ln>
         </p:spPr>
@@ -9998,10 +10064,10 @@
       </p:cxnSp>
       <p:grpSp>
         <p:nvGrpSpPr>
-          <p:cNvPr id="4" name="Group 3">
+          <p:cNvPr id="15" name="Group 14">
             <a:extLst>
               <a:ext uri="{FF2B5EF4-FFF2-40B4-BE49-F238E27FC236}">
-                <a16:creationId xmlns:a16="http://schemas.microsoft.com/office/drawing/2014/main" id="{71A0711C-9D4E-883C-6D34-14B664B913D8}"/>
+                <a16:creationId xmlns:a16="http://schemas.microsoft.com/office/drawing/2014/main" id="{0B17F78B-2B64-EF2E-DB80-DB0D6C30AC74}"/>
               </a:ext>
             </a:extLst>
           </p:cNvPr>
@@ -10010,18 +10076,18 @@
         </p:nvGrpSpPr>
         <p:grpSpPr>
           <a:xfrm>
-            <a:off x="220247" y="6381328"/>
-            <a:ext cx="3367551" cy="288032"/>
-            <a:chOff x="503270" y="4609005"/>
-            <a:chExt cx="9837956" cy="841457"/>
+            <a:off x="191344" y="6381328"/>
+            <a:ext cx="3312368" cy="276107"/>
+            <a:chOff x="3719736" y="328470"/>
+            <a:chExt cx="4754803" cy="396343"/>
           </a:xfrm>
         </p:grpSpPr>
         <p:pic>
           <p:nvPicPr>
-            <p:cNvPr id="9" name="Picture 8" descr="Logo&#10;&#10;Description automatically generated">
+            <p:cNvPr id="16" name="Picture 15">
               <a:extLst>
                 <a:ext uri="{FF2B5EF4-FFF2-40B4-BE49-F238E27FC236}">
-                  <a16:creationId xmlns:a16="http://schemas.microsoft.com/office/drawing/2014/main" id="{CBF3AE04-BF95-E8EE-BC5D-D8BF74B7B4EF}"/>
+                  <a16:creationId xmlns:a16="http://schemas.microsoft.com/office/drawing/2014/main" id="{BA2CA04B-E272-DCD7-2BB8-6702A3B6EB27}"/>
                 </a:ext>
               </a:extLst>
             </p:cNvPr>
@@ -10032,7 +10098,6 @@
           </p:nvPicPr>
           <p:blipFill>
             <a:blip r:embed="rId3" cstate="print">
-              <a:biLevel thresh="75000"/>
               <a:extLst>
                 <a:ext uri="{28A0092B-C50C-407E-A947-70E740481C1C}">
                   <a14:useLocalDpi xmlns:a14="http://schemas.microsoft.com/office/drawing/2010/main" val="0"/>
@@ -10045,8 +10110,8 @@
           </p:blipFill>
           <p:spPr>
             <a:xfrm>
-              <a:off x="503270" y="4661782"/>
-              <a:ext cx="6094347" cy="788680"/>
+              <a:off x="3719736" y="328470"/>
+              <a:ext cx="3030311" cy="392158"/>
             </a:xfrm>
             <a:prstGeom prst="rect">
               <a:avLst/>
@@ -10055,10 +10120,10 @@
         </p:pic>
         <p:pic>
           <p:nvPicPr>
-            <p:cNvPr id="10" name="Picture 9" descr="A picture containing icon&#10;&#10;Description automatically generated">
+            <p:cNvPr id="18" name="Picture 17" descr="A blue text on a black background&#10;&#10;Description automatically generated with low confidence">
               <a:extLst>
                 <a:ext uri="{FF2B5EF4-FFF2-40B4-BE49-F238E27FC236}">
-                  <a16:creationId xmlns:a16="http://schemas.microsoft.com/office/drawing/2014/main" id="{47F2BEE1-6CA9-20C6-FDC5-8F46E9CB4DAC}"/>
+                  <a16:creationId xmlns:a16="http://schemas.microsoft.com/office/drawing/2014/main" id="{28FFCDB1-92EC-C8E9-C4D1-6BA6FAC550FC}"/>
                 </a:ext>
               </a:extLst>
             </p:cNvPr>
@@ -10069,20 +10134,19 @@
           </p:nvPicPr>
           <p:blipFill rotWithShape="1">
             <a:blip r:embed="rId4" cstate="print">
-              <a:biLevel thresh="75000"/>
               <a:extLst>
                 <a:ext uri="{28A0092B-C50C-407E-A947-70E740481C1C}">
                   <a14:useLocalDpi xmlns:a14="http://schemas.microsoft.com/office/drawing/2010/main" val="0"/>
                 </a:ext>
               </a:extLst>
             </a:blip>
-            <a:srcRect l="27488"/>
+            <a:srcRect l="28239" r="1"/>
             <a:stretch/>
           </p:blipFill>
           <p:spPr>
             <a:xfrm>
-              <a:off x="6745384" y="4609005"/>
-              <a:ext cx="3595842" cy="841456"/>
+              <a:off x="6816080" y="332656"/>
+              <a:ext cx="1658459" cy="392157"/>
             </a:xfrm>
             <a:prstGeom prst="rect">
               <a:avLst/>
@@ -10233,9 +10297,7 @@
             <a:r>
               <a:rPr lang="en-GB" sz="2600" b="1" i="1" dirty="0">
                 <a:solidFill>
-                  <a:schemeClr val="accent1">
-                    <a:lumMod val="75000"/>
-                  </a:schemeClr>
+                  <a:srgbClr val="004D91"/>
                 </a:solidFill>
                 <a:effectLst/>
                 <a:latin typeface="Source Sans Pro" panose="020B0503030403020204" pitchFamily="34" charset="0"/>
@@ -10245,9 +10307,7 @@
             </a:r>
             <a:endParaRPr lang="en-GB" sz="2600" b="1" i="0" dirty="0">
               <a:solidFill>
-                <a:schemeClr val="accent1">
-                  <a:lumMod val="75000"/>
-                </a:schemeClr>
+                <a:srgbClr val="004D91"/>
               </a:solidFill>
               <a:effectLst/>
               <a:latin typeface="Source Sans Pro" panose="020B0503030403020204" pitchFamily="34" charset="0"/>
@@ -10267,9 +10327,7 @@
             <a:r>
               <a:rPr lang="en-GB" sz="2600" b="1" i="1" dirty="0">
                 <a:solidFill>
-                  <a:schemeClr val="accent1">
-                    <a:lumMod val="75000"/>
-                  </a:schemeClr>
+                  <a:srgbClr val="004D91"/>
                 </a:solidFill>
                 <a:effectLst/>
                 <a:latin typeface="Source Sans Pro" panose="020B0503030403020204" pitchFamily="34" charset="0"/>
@@ -10279,9 +10337,7 @@
             </a:r>
             <a:endParaRPr lang="en-GB" sz="2600" b="1" i="0" dirty="0">
               <a:solidFill>
-                <a:schemeClr val="accent1">
-                  <a:lumMod val="75000"/>
-                </a:schemeClr>
+                <a:srgbClr val="004D91"/>
               </a:solidFill>
               <a:effectLst/>
               <a:latin typeface="Source Sans Pro" panose="020B0503030403020204" pitchFamily="34" charset="0"/>
@@ -10312,9 +10368,7 @@
             <a:r>
               <a:rPr lang="en-GB" sz="2600" b="1" i="1" dirty="0">
                 <a:solidFill>
-                  <a:schemeClr val="accent1">
-                    <a:lumMod val="75000"/>
-                  </a:schemeClr>
+                  <a:srgbClr val="004D91"/>
                 </a:solidFill>
                 <a:effectLst/>
                 <a:latin typeface="Source Sans Pro" panose="020B0503030403020204" pitchFamily="34" charset="0"/>
@@ -10324,9 +10378,7 @@
             </a:r>
             <a:endParaRPr lang="en-GB" sz="2600" b="1" i="0" dirty="0">
               <a:solidFill>
-                <a:schemeClr val="accent1">
-                  <a:lumMod val="75000"/>
-                </a:schemeClr>
+                <a:srgbClr val="004D91"/>
               </a:solidFill>
               <a:effectLst/>
               <a:latin typeface="Source Sans Pro" panose="020B0503030403020204" pitchFamily="34" charset="0"/>
@@ -10405,9 +10457,7 @@
             <a:r>
               <a:rPr lang="en-US" altLang="zh-TW" sz="3200" b="1" i="0" dirty="0">
                 <a:solidFill>
-                  <a:schemeClr val="accent1">
-                    <a:lumMod val="75000"/>
-                  </a:schemeClr>
+                  <a:srgbClr val="004D91"/>
                 </a:solidFill>
                 <a:effectLst/>
                 <a:latin typeface="Microsoft JhengHei" panose="020B0604030504040204" pitchFamily="34" charset="-120"/>
@@ -10418,9 +10468,7 @@
             <a:r>
               <a:rPr lang="zh-TW" altLang="en-US" sz="3200" b="1" i="0" dirty="0">
                 <a:solidFill>
-                  <a:schemeClr val="accent1">
-                    <a:lumMod val="75000"/>
-                  </a:schemeClr>
+                  <a:srgbClr val="004D91"/>
                 </a:solidFill>
                 <a:effectLst/>
                 <a:latin typeface="Microsoft JhengHei" panose="020B0604030504040204" pitchFamily="34" charset="-120"/>
@@ -10450,9 +10498,7 @@
             <a:r>
               <a:rPr lang="en-US" altLang="zh-TW" sz="3200" b="1" i="0" dirty="0">
                 <a:solidFill>
-                  <a:schemeClr val="accent1">
-                    <a:lumMod val="75000"/>
-                  </a:schemeClr>
+                  <a:srgbClr val="004D91"/>
                 </a:solidFill>
                 <a:effectLst/>
                 <a:latin typeface="Microsoft JhengHei" panose="020B0604030504040204" pitchFamily="34" charset="-120"/>
@@ -10463,9 +10509,7 @@
             <a:r>
               <a:rPr lang="zh-TW" altLang="en-US" sz="3200" b="1" i="0" dirty="0">
                 <a:solidFill>
-                  <a:schemeClr val="accent1">
-                    <a:lumMod val="75000"/>
-                  </a:schemeClr>
+                  <a:srgbClr val="004D91"/>
                 </a:solidFill>
                 <a:effectLst/>
                 <a:latin typeface="Microsoft JhengHei" panose="020B0604030504040204" pitchFamily="34" charset="-120"/>
@@ -10476,9 +10520,7 @@
             <a:r>
               <a:rPr lang="en-US" altLang="zh-TW" sz="3200" b="1" i="0" dirty="0">
                 <a:solidFill>
-                  <a:schemeClr val="accent1">
-                    <a:lumMod val="75000"/>
-                  </a:schemeClr>
+                  <a:srgbClr val="004D91"/>
                 </a:solidFill>
                 <a:effectLst/>
                 <a:latin typeface="Microsoft JhengHei" panose="020B0604030504040204" pitchFamily="34" charset="-120"/>
@@ -10489,9 +10531,7 @@
             <a:r>
               <a:rPr lang="zh-TW" altLang="en-US" sz="3200" b="1" i="0" dirty="0">
                 <a:solidFill>
-                  <a:schemeClr val="accent1">
-                    <a:lumMod val="75000"/>
-                  </a:schemeClr>
+                  <a:srgbClr val="004D91"/>
                 </a:solidFill>
                 <a:effectLst/>
                 <a:latin typeface="Microsoft JhengHei" panose="020B0604030504040204" pitchFamily="34" charset="-120"/>
@@ -10540,9 +10580,7 @@
             <a:r>
               <a:rPr lang="zh-TW" altLang="en-US" sz="3200" b="1" i="0" dirty="0">
                 <a:solidFill>
-                  <a:schemeClr val="accent1">
-                    <a:lumMod val="75000"/>
-                  </a:schemeClr>
+                  <a:srgbClr val="004D91"/>
                 </a:solidFill>
                 <a:effectLst/>
                 <a:latin typeface="Microsoft JhengHei" panose="020B0604030504040204" pitchFamily="34" charset="-120"/>
@@ -10553,9 +10591,7 @@
             <a:r>
               <a:rPr lang="en-US" altLang="zh-TW" sz="3200" b="1" i="0" dirty="0">
                 <a:solidFill>
-                  <a:schemeClr val="accent1">
-                    <a:lumMod val="75000"/>
-                  </a:schemeClr>
+                  <a:srgbClr val="004D91"/>
                 </a:solidFill>
                 <a:effectLst/>
                 <a:latin typeface="Microsoft JhengHei" panose="020B0604030504040204" pitchFamily="34" charset="-120"/>
@@ -10626,10 +10662,10 @@
       </p:cxnSp>
       <p:grpSp>
         <p:nvGrpSpPr>
-          <p:cNvPr id="3" name="Group 2">
+          <p:cNvPr id="7" name="Group 6">
             <a:extLst>
               <a:ext uri="{FF2B5EF4-FFF2-40B4-BE49-F238E27FC236}">
-                <a16:creationId xmlns:a16="http://schemas.microsoft.com/office/drawing/2014/main" id="{0C117D11-0BC7-0B3D-9531-40EA33203852}"/>
+                <a16:creationId xmlns:a16="http://schemas.microsoft.com/office/drawing/2014/main" id="{72DC5880-BDED-92C0-586D-1160A0C3A6C1}"/>
               </a:ext>
             </a:extLst>
           </p:cNvPr>
@@ -10640,16 +10676,16 @@
           <a:xfrm>
             <a:off x="5951984" y="6318094"/>
             <a:ext cx="6130040" cy="381119"/>
-            <a:chOff x="3900570" y="6209512"/>
-            <a:chExt cx="8074208" cy="488804"/>
+            <a:chOff x="5951984" y="6318094"/>
+            <a:chExt cx="6130040" cy="381119"/>
           </a:xfrm>
         </p:grpSpPr>
         <p:sp>
           <p:nvSpPr>
-            <p:cNvPr id="14" name="TextBox 13">
+            <p:cNvPr id="8" name="TextBox 7">
               <a:extLst>
                 <a:ext uri="{FF2B5EF4-FFF2-40B4-BE49-F238E27FC236}">
-                  <a16:creationId xmlns:a16="http://schemas.microsoft.com/office/drawing/2014/main" id="{1F20659A-912A-A3F5-7438-9DCDEDE4CF19}"/>
+                  <a16:creationId xmlns:a16="http://schemas.microsoft.com/office/drawing/2014/main" id="{6DCD3134-7024-047D-5EAB-0FBC0300B30E}"/>
                 </a:ext>
               </a:extLst>
             </p:cNvPr>
@@ -10658,19 +10694,19 @@
           </p:nvSpPr>
           <p:spPr>
             <a:xfrm>
-              <a:off x="3900570" y="6209512"/>
-              <a:ext cx="8074208" cy="488804"/>
+              <a:off x="5951984" y="6318094"/>
+              <a:ext cx="6130040" cy="381119"/>
             </a:xfrm>
             <a:prstGeom prst="roundRect">
               <a:avLst>
                 <a:gd name="adj" fmla="val 20010"/>
               </a:avLst>
             </a:prstGeom>
-            <a:noFill/>
+            <a:solidFill>
+              <a:srgbClr val="004B8D"/>
+            </a:solidFill>
             <a:ln w="19050">
-              <a:solidFill>
-                <a:srgbClr val="FF0000"/>
-              </a:solidFill>
+              <a:noFill/>
             </a:ln>
           </p:spPr>
           <p:txBody>
@@ -10681,6 +10717,9 @@
             <a:p>
               <a:r>
                 <a:rPr lang="en-GB" sz="1600" b="1" dirty="0">
+                  <a:solidFill>
+                    <a:schemeClr val="bg1"/>
+                  </a:solidFill>
                   <a:latin typeface="Source Sans Pro" panose="020B0503030403020204" pitchFamily="34" charset="0"/>
                   <a:ea typeface="Source Sans Pro" panose="020B0503030403020204" pitchFamily="34" charset="0"/>
                   <a:cs typeface="Segoe UI Semibold" panose="020B0702040204020203" pitchFamily="34" charset="0"/>
@@ -10689,12 +10728,18 @@
               </a:r>
               <a:r>
                 <a:rPr lang="zh-TW" altLang="en-US" sz="1600" b="1" dirty="0">
+                  <a:solidFill>
+                    <a:schemeClr val="bg1"/>
+                  </a:solidFill>
                   <a:latin typeface="Source Sans Pro" panose="020B0503030403020204" pitchFamily="34" charset="0"/>
                   <a:ea typeface="Microsoft JhengHei" panose="020B0604030504040204" pitchFamily="34" charset="-120"/>
                 </a:rPr>
                 <a:t>請靜音或關閉所有電子設備</a:t>
               </a:r>
               <a:endParaRPr lang="ja-JP" altLang="en-US" sz="1600" b="1" dirty="0">
+                <a:solidFill>
+                  <a:schemeClr val="bg1"/>
+                </a:solidFill>
                 <a:latin typeface="Source Sans Pro" panose="020B0503030403020204" pitchFamily="34" charset="0"/>
                 <a:ea typeface="Microsoft JhengHei" panose="020B0604030504040204" pitchFamily="34" charset="-120"/>
               </a:endParaRPr>
@@ -10703,10 +10748,10 @@
         </p:sp>
         <p:pic>
           <p:nvPicPr>
-            <p:cNvPr id="15" name="Picture 14" descr="Shape&#10;&#10;Description automatically generated with low confidence">
+            <p:cNvPr id="10" name="Picture 9" descr="Shape&#10;&#10;Description automatically generated with low confidence">
               <a:extLst>
                 <a:ext uri="{FF2B5EF4-FFF2-40B4-BE49-F238E27FC236}">
-                  <a16:creationId xmlns:a16="http://schemas.microsoft.com/office/drawing/2014/main" id="{2519B31D-8076-C37B-E4E3-6FA3747760A2}"/>
+                  <a16:creationId xmlns:a16="http://schemas.microsoft.com/office/drawing/2014/main" id="{65957422-7A97-498E-9DEE-5954AFEE2526}"/>
                 </a:ext>
               </a:extLst>
             </p:cNvPr>
@@ -10717,12 +10762,16 @@
           </p:nvPicPr>
           <p:blipFill>
             <a:blip r:embed="rId3" cstate="print">
+              <a:lum bright="70000" contrast="-70000"/>
               <a:extLst>
                 <a:ext uri="{BEBA8EAE-BF5A-486C-A8C5-ECC9F3942E4B}">
                   <a14:imgProps xmlns:a14="http://schemas.microsoft.com/office/drawing/2010/main">
                     <a14:imgLayer r:embed="rId4">
                       <a14:imgEffect>
-                        <a14:colorTemperature colorTemp="11500"/>
+                        <a14:artisticPhotocopy/>
+                      </a14:imgEffect>
+                      <a14:imgEffect>
+                        <a14:colorTemperature colorTemp="11200"/>
                       </a14:imgEffect>
                       <a14:imgEffect>
                         <a14:saturation sat="400000"/>
@@ -10744,21 +10793,24 @@
           </p:blipFill>
           <p:spPr>
             <a:xfrm>
-              <a:off x="11583067" y="6279910"/>
-              <a:ext cx="348008" cy="348008"/>
+              <a:off x="11784632" y="6372983"/>
+              <a:ext cx="264212" cy="271341"/>
             </a:xfrm>
             <a:prstGeom prst="rect">
               <a:avLst/>
             </a:prstGeom>
+            <a:solidFill>
+              <a:srgbClr val="004B8D"/>
+            </a:solidFill>
           </p:spPr>
         </p:pic>
       </p:grpSp>
       <p:grpSp>
         <p:nvGrpSpPr>
-          <p:cNvPr id="4" name="Group 3">
+          <p:cNvPr id="12" name="Group 11">
             <a:extLst>
               <a:ext uri="{FF2B5EF4-FFF2-40B4-BE49-F238E27FC236}">
-                <a16:creationId xmlns:a16="http://schemas.microsoft.com/office/drawing/2014/main" id="{03693CCC-5425-94EC-76C5-1DBC756C591A}"/>
+                <a16:creationId xmlns:a16="http://schemas.microsoft.com/office/drawing/2014/main" id="{9993B85C-7609-546F-2D6C-4BE5BCFD19BE}"/>
               </a:ext>
             </a:extLst>
           </p:cNvPr>
@@ -10767,18 +10819,18 @@
         </p:nvGrpSpPr>
         <p:grpSpPr>
           <a:xfrm>
-            <a:off x="220247" y="6381328"/>
-            <a:ext cx="3367551" cy="288032"/>
-            <a:chOff x="503270" y="4609005"/>
-            <a:chExt cx="9837956" cy="841457"/>
+            <a:off x="191344" y="6381328"/>
+            <a:ext cx="3312368" cy="276107"/>
+            <a:chOff x="3719736" y="328470"/>
+            <a:chExt cx="4754803" cy="396343"/>
           </a:xfrm>
         </p:grpSpPr>
         <p:pic>
           <p:nvPicPr>
-            <p:cNvPr id="6" name="Picture 5" descr="Logo&#10;&#10;Description automatically generated">
+            <p:cNvPr id="16" name="Picture 15">
               <a:extLst>
                 <a:ext uri="{FF2B5EF4-FFF2-40B4-BE49-F238E27FC236}">
-                  <a16:creationId xmlns:a16="http://schemas.microsoft.com/office/drawing/2014/main" id="{8F4932B8-6137-D64C-532C-A72C1663C1AE}"/>
+                  <a16:creationId xmlns:a16="http://schemas.microsoft.com/office/drawing/2014/main" id="{C57D1458-A84E-1BC4-77A5-0DDADFD44293}"/>
                 </a:ext>
               </a:extLst>
             </p:cNvPr>
@@ -10789,7 +10841,6 @@
           </p:nvPicPr>
           <p:blipFill>
             <a:blip r:embed="rId5" cstate="print">
-              <a:biLevel thresh="75000"/>
               <a:extLst>
                 <a:ext uri="{28A0092B-C50C-407E-A947-70E740481C1C}">
                   <a14:useLocalDpi xmlns:a14="http://schemas.microsoft.com/office/drawing/2010/main" val="0"/>
@@ -10802,8 +10853,8 @@
           </p:blipFill>
           <p:spPr>
             <a:xfrm>
-              <a:off x="503270" y="4661782"/>
-              <a:ext cx="6094347" cy="788680"/>
+              <a:off x="3719736" y="328470"/>
+              <a:ext cx="3030311" cy="392158"/>
             </a:xfrm>
             <a:prstGeom prst="rect">
               <a:avLst/>
@@ -10812,10 +10863,10 @@
         </p:pic>
         <p:pic>
           <p:nvPicPr>
-            <p:cNvPr id="9" name="Picture 8" descr="A picture containing icon&#10;&#10;Description automatically generated">
+            <p:cNvPr id="17" name="Picture 16" descr="A blue text on a black background&#10;&#10;Description automatically generated with low confidence">
               <a:extLst>
                 <a:ext uri="{FF2B5EF4-FFF2-40B4-BE49-F238E27FC236}">
-                  <a16:creationId xmlns:a16="http://schemas.microsoft.com/office/drawing/2014/main" id="{CC75F0FE-0AD0-1716-B7E0-2D9E9C28B89A}"/>
+                  <a16:creationId xmlns:a16="http://schemas.microsoft.com/office/drawing/2014/main" id="{FD5E27C1-1E2D-D98E-B7FF-3096F1473D09}"/>
                 </a:ext>
               </a:extLst>
             </p:cNvPr>
@@ -10826,20 +10877,19 @@
           </p:nvPicPr>
           <p:blipFill rotWithShape="1">
             <a:blip r:embed="rId6" cstate="print">
-              <a:biLevel thresh="75000"/>
               <a:extLst>
                 <a:ext uri="{28A0092B-C50C-407E-A947-70E740481C1C}">
                   <a14:useLocalDpi xmlns:a14="http://schemas.microsoft.com/office/drawing/2010/main" val="0"/>
                 </a:ext>
               </a:extLst>
             </a:blip>
-            <a:srcRect l="27488"/>
+            <a:srcRect l="28239" r="1"/>
             <a:stretch/>
           </p:blipFill>
           <p:spPr>
             <a:xfrm>
-              <a:off x="6745384" y="4609005"/>
-              <a:ext cx="3595842" cy="841456"/>
+              <a:off x="6816080" y="332656"/>
+              <a:ext cx="1658459" cy="392157"/>
             </a:xfrm>
             <a:prstGeom prst="rect">
               <a:avLst/>

</xml_diff>

<commit_message>
30/08/23 - Roboto Design
</commit_message>
<xml_diff>
--- a/TJCPowerPoint/Resources/ServiceWidescreen.pptx
+++ b/TJCPowerPoint/Resources/ServiceWidescreen.pptx
@@ -5000,7 +5000,7 @@
         </p:nvSpPr>
         <p:spPr>
           <a:xfrm>
-            <a:off x="2374605" y="3278594"/>
+            <a:off x="2374605" y="3350602"/>
             <a:ext cx="7442790" cy="1446550"/>
           </a:xfrm>
           <a:prstGeom prst="rect">
@@ -5020,16 +5020,16 @@
             <a:pPr algn="ctr"/>
             <a:r>
               <a:rPr lang="en-GB" altLang="ja-JP" sz="8800" b="1" dirty="0">
-                <a:latin typeface="Century Gothic" panose="020B0502020202020204" pitchFamily="34" charset="0"/>
-                <a:ea typeface="Source Sans Pro" panose="020B0503030403020204" pitchFamily="34" charset="0"/>
-                <a:cs typeface="Segoe UI" panose="020B0502040204020203" pitchFamily="34" charset="0"/>
+                <a:latin typeface="Roboto" panose="02000000000000000000" pitchFamily="2" charset="0"/>
+                <a:ea typeface="Roboto" panose="02000000000000000000" pitchFamily="2" charset="0"/>
+                <a:cs typeface="Arial" panose="020B0604020202020204" pitchFamily="34" charset="0"/>
               </a:rPr>
               <a:t>TIME</a:t>
             </a:r>
             <a:endParaRPr lang="ja-JP" altLang="en-US" sz="8800" b="1" dirty="0">
-              <a:latin typeface="Century Gothic" panose="020B0502020202020204" pitchFamily="34" charset="0"/>
+              <a:latin typeface="Roboto" panose="02000000000000000000" pitchFamily="2" charset="0"/>
               <a:ea typeface="Microsoft JhengHei" panose="020B0604030504040204" pitchFamily="34" charset="-120"/>
-              <a:cs typeface="Segoe UI" panose="020B0502040204020203" pitchFamily="34" charset="0"/>
+              <a:cs typeface="Arial" panose="020B0604020202020204" pitchFamily="34" charset="0"/>
             </a:endParaRPr>
           </a:p>
         </p:txBody>
@@ -5052,7 +5052,7 @@
         </p:nvSpPr>
         <p:spPr>
           <a:xfrm>
-            <a:off x="883117" y="2636912"/>
+            <a:off x="883117" y="2708920"/>
             <a:ext cx="10425767" cy="620499"/>
           </a:xfrm>
         </p:spPr>
@@ -5066,20 +5066,20 @@
                 <a:solidFill>
                   <a:schemeClr val="tx1"/>
                 </a:solidFill>
-                <a:latin typeface="Source Sans Pro" panose="020B0503030403020204" pitchFamily="34" charset="0"/>
-                <a:ea typeface="Source Sans Pro" panose="020B0503030403020204" pitchFamily="34" charset="0"/>
-                <a:cs typeface="Segoe UI" panose="020B0502040204020203" pitchFamily="34" charset="0"/>
+                <a:latin typeface="Roboto" panose="02000000000000000000" pitchFamily="2" charset="0"/>
+                <a:ea typeface="Roboto" panose="02000000000000000000" pitchFamily="2" charset="0"/>
+                <a:cs typeface="Arial" panose="020B0604020202020204" pitchFamily="34" charset="0"/>
               </a:rPr>
               <a:pPr algn="ctr"/>
-              <a:t>Wednesday, July 12, 2023</a:t>
+              <a:t>Wednesday, August 30, 2023</a:t>
             </a:fld>
             <a:endParaRPr lang="en-US" altLang="en-US" sz="5400" b="1" dirty="0">
               <a:solidFill>
                 <a:schemeClr val="tx1"/>
               </a:solidFill>
-              <a:latin typeface="Source Sans Pro" panose="020B0503030403020204" pitchFamily="34" charset="0"/>
-              <a:ea typeface="Source Sans Pro" panose="020B0503030403020204" pitchFamily="34" charset="0"/>
-              <a:cs typeface="Segoe UI" panose="020B0502040204020203" pitchFamily="34" charset="0"/>
+              <a:latin typeface="Roboto" panose="02000000000000000000" pitchFamily="2" charset="0"/>
+              <a:ea typeface="Roboto" panose="02000000000000000000" pitchFamily="2" charset="0"/>
+              <a:cs typeface="Arial" panose="020B0604020202020204" pitchFamily="34" charset="0"/>
             </a:endParaRPr>
           </a:p>
         </p:txBody>
@@ -5098,7 +5098,7 @@
         </p:nvSpPr>
         <p:spPr>
           <a:xfrm>
-            <a:off x="1850771" y="765629"/>
+            <a:off x="1850771" y="792748"/>
             <a:ext cx="8490458" cy="954107"/>
           </a:xfrm>
           <a:prstGeom prst="rect">
@@ -5115,9 +5115,9 @@
             <a:pPr algn="ctr"/>
             <a:r>
               <a:rPr lang="en-GB" altLang="en-US" sz="2800" b="1" dirty="0">
-                <a:latin typeface="Source Sans Pro" panose="020B0503030403020204" pitchFamily="34" charset="0"/>
-                <a:ea typeface="Source Sans Pro" panose="020B0503030403020204" pitchFamily="34" charset="0"/>
-                <a:cs typeface="Segoe UI" panose="020B0502040204020203" pitchFamily="34" charset="0"/>
+                <a:latin typeface="Roboto" panose="02000000000000000000" pitchFamily="2" charset="0"/>
+                <a:ea typeface="Roboto" panose="02000000000000000000" pitchFamily="2" charset="0"/>
+                <a:cs typeface="Arial" panose="020B0604020202020204" pitchFamily="34" charset="0"/>
               </a:rPr>
               <a:t>Welcome To True Jesus Church </a:t>
             </a:r>
@@ -5235,7 +5235,7 @@
           <p:cNvPr id="8" name="Group 7">
             <a:extLst>
               <a:ext uri="{FF2B5EF4-FFF2-40B4-BE49-F238E27FC236}">
-                <a16:creationId xmlns:a16="http://schemas.microsoft.com/office/drawing/2014/main" id="{D62CAE8B-72DF-AE97-F546-421ACFCAE381}"/>
+                <a16:creationId xmlns:a16="http://schemas.microsoft.com/office/drawing/2014/main" id="{FC4383F5-92DA-8DF6-F885-EB1D6152FD1A}"/>
               </a:ext>
             </a:extLst>
           </p:cNvPr>
@@ -5244,10 +5244,10 @@
         </p:nvGrpSpPr>
         <p:grpSpPr>
           <a:xfrm>
-            <a:off x="2440607" y="6092254"/>
-            <a:ext cx="7310786" cy="433090"/>
-            <a:chOff x="5933021" y="6326519"/>
-            <a:chExt cx="6149003" cy="364266"/>
+            <a:off x="2963652" y="6272458"/>
+            <a:ext cx="6264696" cy="381119"/>
+            <a:chOff x="5807968" y="6327364"/>
+            <a:chExt cx="6264696" cy="381119"/>
           </a:xfrm>
         </p:grpSpPr>
         <p:sp>
@@ -5255,7 +5255,7 @@
             <p:cNvPr id="11" name="TextBox 10">
               <a:extLst>
                 <a:ext uri="{FF2B5EF4-FFF2-40B4-BE49-F238E27FC236}">
-                  <a16:creationId xmlns:a16="http://schemas.microsoft.com/office/drawing/2014/main" id="{08BE583C-B3A5-EBA5-8222-36AC1AB7AB2F}"/>
+                  <a16:creationId xmlns:a16="http://schemas.microsoft.com/office/drawing/2014/main" id="{CBD1F7FF-AF2E-162B-A4CC-87D8AE96912E}"/>
                 </a:ext>
               </a:extLst>
             </p:cNvPr>
@@ -5264,8 +5264,8 @@
           </p:nvSpPr>
           <p:spPr>
             <a:xfrm>
-              <a:off x="5933021" y="6326519"/>
-              <a:ext cx="6149003" cy="364266"/>
+              <a:off x="5807968" y="6327364"/>
+              <a:ext cx="6264696" cy="381119"/>
             </a:xfrm>
             <a:prstGeom prst="roundRect">
               <a:avLst>
@@ -5286,34 +5286,32 @@
             <a:lstStyle/>
             <a:p>
               <a:r>
-                <a:rPr lang="en-GB" sz="1900" b="1" dirty="0">
+                <a:rPr lang="en-GB" sz="1600" dirty="0">
+                  <a:solidFill>
+                    <a:schemeClr val="bg1"/>
+                  </a:solidFill>
+                  <a:latin typeface="Roboto" panose="02000000000000000000" pitchFamily="2" charset="0"/>
+                  <a:ea typeface="Roboto" panose="02000000000000000000" pitchFamily="2" charset="0"/>
+                  <a:cs typeface="Segoe UI Semibold" panose="020B0702040204020203" pitchFamily="34" charset="0"/>
+                </a:rPr>
+                <a:t>Please Turn Off/Silence Your Devices </a:t>
+              </a:r>
+              <a:r>
+                <a:rPr lang="zh-TW" altLang="en-US" sz="1600" dirty="0">
                   <a:solidFill>
                     <a:schemeClr val="bg1"/>
                   </a:solidFill>
                   <a:latin typeface="Source Sans Pro" panose="020B0503030403020204" pitchFamily="34" charset="0"/>
-                  <a:ea typeface="Source Sans Pro" panose="020B0503030403020204" pitchFamily="34" charset="0"/>
-                  <a:cs typeface="Segoe UI" panose="020B0502040204020203" pitchFamily="34" charset="0"/>
-                </a:rPr>
-                <a:t>Please Turn Off/Silence Your Devices </a:t>
-              </a:r>
-              <a:r>
-                <a:rPr lang="zh-TW" altLang="en-US" sz="1900" b="1" dirty="0">
-                  <a:solidFill>
-                    <a:schemeClr val="bg1"/>
-                  </a:solidFill>
-                  <a:latin typeface="Segoe UI" panose="020B0502040204020203" pitchFamily="34" charset="0"/>
                   <a:ea typeface="Microsoft JhengHei" panose="020B0604030504040204" pitchFamily="34" charset="-120"/>
-                  <a:cs typeface="Segoe UI" panose="020B0502040204020203" pitchFamily="34" charset="0"/>
                 </a:rPr>
                 <a:t>請靜音或關閉所有電子設備</a:t>
               </a:r>
-              <a:endParaRPr lang="ja-JP" altLang="en-US" sz="1900" b="1" dirty="0">
+              <a:endParaRPr lang="ja-JP" altLang="en-US" sz="1600" dirty="0">
                 <a:solidFill>
                   <a:schemeClr val="bg1"/>
                 </a:solidFill>
-                <a:latin typeface="Segoe UI" panose="020B0502040204020203" pitchFamily="34" charset="0"/>
+                <a:latin typeface="Source Sans Pro" panose="020B0503030403020204" pitchFamily="34" charset="0"/>
                 <a:ea typeface="Microsoft JhengHei" panose="020B0604030504040204" pitchFamily="34" charset="-120"/>
-                <a:cs typeface="Segoe UI" panose="020B0502040204020203" pitchFamily="34" charset="0"/>
               </a:endParaRPr>
             </a:p>
           </p:txBody>
@@ -5323,7 +5321,7 @@
             <p:cNvPr id="13" name="Picture 12" descr="Shape&#10;&#10;Description automatically generated with low confidence">
               <a:extLst>
                 <a:ext uri="{FF2B5EF4-FFF2-40B4-BE49-F238E27FC236}">
-                  <a16:creationId xmlns:a16="http://schemas.microsoft.com/office/drawing/2014/main" id="{C67057C2-5E28-4A2A-2706-EF519E22A3AB}"/>
+                  <a16:creationId xmlns:a16="http://schemas.microsoft.com/office/drawing/2014/main" id="{47463D50-60ED-B612-F9D1-60997220AA43}"/>
                 </a:ext>
               </a:extLst>
             </p:cNvPr>
@@ -5437,28 +5435,28 @@
           <a:p>
             <a:pPr algn="ctr"/>
             <a:r>
-              <a:rPr lang="en-GB" altLang="en-US" sz="4000" b="1" dirty="0">
+              <a:rPr lang="en-GB" altLang="en-US" sz="4000" dirty="0">
                 <a:solidFill>
                   <a:schemeClr val="bg1"/>
                 </a:solidFill>
-                <a:latin typeface="Source Sans Pro" panose="020B0503030403020204" pitchFamily="34" charset="0"/>
-                <a:ea typeface="Source Sans Pro" panose="020B0503030403020204" pitchFamily="34" charset="0"/>
+                <a:latin typeface="Roboto" panose="02000000000000000000" pitchFamily="2" charset="0"/>
+                <a:ea typeface="Roboto" panose="02000000000000000000" pitchFamily="2" charset="0"/>
                 <a:cs typeface="Segoe UI" panose="020B0502040204020203" pitchFamily="34" charset="0"/>
               </a:rPr>
               <a:t>Please Turn Off/Silence Your Devices</a:t>
             </a:r>
-            <a:endParaRPr lang="zh-TW" altLang="en-US" sz="4000" b="1" dirty="0">
+            <a:endParaRPr lang="zh-TW" altLang="en-US" sz="4000" dirty="0">
               <a:solidFill>
                 <a:schemeClr val="bg1"/>
               </a:solidFill>
-              <a:latin typeface="Source Sans Pro" panose="020B0503030403020204" pitchFamily="34" charset="0"/>
+              <a:latin typeface="Roboto" panose="02000000000000000000" pitchFamily="2" charset="0"/>
               <a:ea typeface="Microsoft JhengHei" panose="020B0604030504040204" pitchFamily="34" charset="-120"/>
             </a:endParaRPr>
           </a:p>
           <a:p>
             <a:pPr algn="ctr"/>
             <a:r>
-              <a:rPr lang="zh-TW" altLang="en-US" sz="4000" b="1" dirty="0">
+              <a:rPr lang="zh-TW" altLang="en-US" sz="4000" dirty="0">
                 <a:solidFill>
                   <a:schemeClr val="bg1"/>
                 </a:solidFill>
@@ -5467,7 +5465,7 @@
               </a:rPr>
               <a:t>請靜音或關閉所有電子設備</a:t>
             </a:r>
-            <a:endParaRPr lang="en-GB" sz="4000" b="1" dirty="0">
+            <a:endParaRPr lang="en-GB" sz="4000" dirty="0">
               <a:solidFill>
                 <a:schemeClr val="bg1"/>
               </a:solidFill>
@@ -5780,8 +5778,8 @@
           <a:p>
             <a:pPr algn="ctr"/>
             <a:endParaRPr lang="en-GB" altLang="zh-TW" sz="3200" dirty="0">
-              <a:latin typeface="Source Sans Pro" panose="020B0503030403020204" pitchFamily="34" charset="0"/>
-              <a:ea typeface="Source Sans Pro" panose="020B0503030403020204" pitchFamily="34" charset="0"/>
+              <a:latin typeface="Roboto" panose="02000000000000000000" pitchFamily="2" charset="0"/>
+              <a:ea typeface="Roboto" panose="02000000000000000000" pitchFamily="2" charset="0"/>
             </a:endParaRPr>
           </a:p>
         </p:txBody>
@@ -5851,16 +5849,16 @@
             <a:pPr algn="ctr"/>
             <a:r>
               <a:rPr lang="en-GB" altLang="en-US" sz="2800" b="1" dirty="0">
-                <a:latin typeface="Source Sans Pro" panose="020B0503030403020204" pitchFamily="34" charset="0"/>
-                <a:ea typeface="Source Sans Pro" panose="020B0503030403020204" pitchFamily="34" charset="0"/>
+                <a:latin typeface="Roboto" panose="02000000000000000000" pitchFamily="2" charset="0"/>
+                <a:ea typeface="Roboto" panose="02000000000000000000" pitchFamily="2" charset="0"/>
                 <a:cs typeface="Segoe UI" panose="020B0502040204020203" pitchFamily="34" charset="0"/>
               </a:rPr>
               <a:t>SERVICE TIMES</a:t>
             </a:r>
             <a:r>
               <a:rPr lang="en-GB" altLang="en-US" sz="2800" b="1" dirty="0">
-                <a:latin typeface="Source Sans Pro" panose="020B0503030403020204" pitchFamily="34" charset="0"/>
-                <a:ea typeface="Source Sans Pro" panose="020B0503030403020204" pitchFamily="34" charset="0"/>
+                <a:latin typeface="Roboto" panose="02000000000000000000" pitchFamily="2" charset="0"/>
+                <a:ea typeface="Roboto" panose="02000000000000000000" pitchFamily="2" charset="0"/>
               </a:rPr>
               <a:t> </a:t>
             </a:r>
@@ -5900,7 +5898,7 @@
           <a:prstGeom prst="line">
             <a:avLst/>
           </a:prstGeom>
-          <a:ln w="38100">
+          <a:ln w="19050">
             <a:solidFill>
               <a:srgbClr val="004D91"/>
             </a:solidFill>
@@ -5923,10 +5921,10 @@
       </p:cxnSp>
       <p:grpSp>
         <p:nvGrpSpPr>
-          <p:cNvPr id="2" name="Group 1">
+          <p:cNvPr id="14" name="Group 13">
             <a:extLst>
               <a:ext uri="{FF2B5EF4-FFF2-40B4-BE49-F238E27FC236}">
-                <a16:creationId xmlns:a16="http://schemas.microsoft.com/office/drawing/2014/main" id="{46FB9DC8-35C6-B361-F2BE-0B1F559C93A7}"/>
+                <a16:creationId xmlns:a16="http://schemas.microsoft.com/office/drawing/2014/main" id="{BE757074-DE35-1B2E-A2C5-5646BFC302AF}"/>
               </a:ext>
             </a:extLst>
           </p:cNvPr>
@@ -5935,18 +5933,110 @@
         </p:nvGrpSpPr>
         <p:grpSpPr>
           <a:xfrm>
-            <a:off x="5951984" y="6318094"/>
-            <a:ext cx="6130040" cy="381119"/>
-            <a:chOff x="5951984" y="6318094"/>
-            <a:chExt cx="6130040" cy="381119"/>
+            <a:off x="191344" y="6381328"/>
+            <a:ext cx="3312368" cy="276107"/>
+            <a:chOff x="3719736" y="328470"/>
+            <a:chExt cx="4754803" cy="396343"/>
+          </a:xfrm>
+        </p:grpSpPr>
+        <p:pic>
+          <p:nvPicPr>
+            <p:cNvPr id="15" name="Picture 14">
+              <a:extLst>
+                <a:ext uri="{FF2B5EF4-FFF2-40B4-BE49-F238E27FC236}">
+                  <a16:creationId xmlns:a16="http://schemas.microsoft.com/office/drawing/2014/main" id="{793CC90E-DC89-C740-3A3E-80EF08F44E25}"/>
+                </a:ext>
+              </a:extLst>
+            </p:cNvPr>
+            <p:cNvPicPr>
+              <a:picLocks noChangeAspect="1"/>
+            </p:cNvPicPr>
+            <p:nvPr/>
+          </p:nvPicPr>
+          <p:blipFill>
+            <a:blip r:embed="rId3" cstate="print">
+              <a:extLst>
+                <a:ext uri="{28A0092B-C50C-407E-A947-70E740481C1C}">
+                  <a14:useLocalDpi xmlns:a14="http://schemas.microsoft.com/office/drawing/2010/main" val="0"/>
+                </a:ext>
+              </a:extLst>
+            </a:blip>
+            <a:stretch>
+              <a:fillRect/>
+            </a:stretch>
+          </p:blipFill>
+          <p:spPr>
+            <a:xfrm>
+              <a:off x="3719736" y="328470"/>
+              <a:ext cx="3030311" cy="392158"/>
+            </a:xfrm>
+            <a:prstGeom prst="rect">
+              <a:avLst/>
+            </a:prstGeom>
+          </p:spPr>
+        </p:pic>
+        <p:pic>
+          <p:nvPicPr>
+            <p:cNvPr id="16" name="Picture 15" descr="A blue text on a black background&#10;&#10;Description automatically generated with low confidence">
+              <a:extLst>
+                <a:ext uri="{FF2B5EF4-FFF2-40B4-BE49-F238E27FC236}">
+                  <a16:creationId xmlns:a16="http://schemas.microsoft.com/office/drawing/2014/main" id="{0A351EDF-5530-4A06-D6AD-F2569775A0CB}"/>
+                </a:ext>
+              </a:extLst>
+            </p:cNvPr>
+            <p:cNvPicPr>
+              <a:picLocks noChangeAspect="1"/>
+            </p:cNvPicPr>
+            <p:nvPr/>
+          </p:nvPicPr>
+          <p:blipFill rotWithShape="1">
+            <a:blip r:embed="rId4" cstate="print">
+              <a:extLst>
+                <a:ext uri="{28A0092B-C50C-407E-A947-70E740481C1C}">
+                  <a14:useLocalDpi xmlns:a14="http://schemas.microsoft.com/office/drawing/2010/main" val="0"/>
+                </a:ext>
+              </a:extLst>
+            </a:blip>
+            <a:srcRect l="28239" r="1"/>
+            <a:stretch/>
+          </p:blipFill>
+          <p:spPr>
+            <a:xfrm>
+              <a:off x="6816080" y="332656"/>
+              <a:ext cx="1658459" cy="392157"/>
+            </a:xfrm>
+            <a:prstGeom prst="rect">
+              <a:avLst/>
+            </a:prstGeom>
+          </p:spPr>
+        </p:pic>
+      </p:grpSp>
+      <p:grpSp>
+        <p:nvGrpSpPr>
+          <p:cNvPr id="6" name="Group 5">
+            <a:extLst>
+              <a:ext uri="{FF2B5EF4-FFF2-40B4-BE49-F238E27FC236}">
+                <a16:creationId xmlns:a16="http://schemas.microsoft.com/office/drawing/2014/main" id="{FF586E6E-6C6B-7726-7830-A8900184C7D8}"/>
+              </a:ext>
+            </a:extLst>
+          </p:cNvPr>
+          <p:cNvGrpSpPr/>
+          <p:nvPr/>
+        </p:nvGrpSpPr>
+        <p:grpSpPr>
+          <a:xfrm>
+            <a:off x="5807968" y="6327364"/>
+            <a:ext cx="6264696" cy="381119"/>
+            <a:chOff x="5807968" y="6327364"/>
+            <a:chExt cx="6264696" cy="381119"/>
           </a:xfrm>
         </p:grpSpPr>
         <p:sp>
           <p:nvSpPr>
-            <p:cNvPr id="3" name="TextBox 2">
+            <p:cNvPr id="7" name="TextBox 6">
               <a:extLst>
                 <a:ext uri="{FF2B5EF4-FFF2-40B4-BE49-F238E27FC236}">
-                  <a16:creationId xmlns:a16="http://schemas.microsoft.com/office/drawing/2014/main" id="{951DA20E-0A6F-419F-0929-9648E41E8981}"/>
+                  <a16:creationId xmlns:a16="http://schemas.microsoft.com/office/drawing/2014/main" id="{051713FF-0768-1623-E43B-60D920D8C2EF}"/>
                 </a:ext>
               </a:extLst>
             </p:cNvPr>
@@ -5955,8 +6045,8 @@
           </p:nvSpPr>
           <p:spPr>
             <a:xfrm>
-              <a:off x="5951984" y="6318094"/>
-              <a:ext cx="6130040" cy="381119"/>
+              <a:off x="5807968" y="6327364"/>
+              <a:ext cx="6264696" cy="381119"/>
             </a:xfrm>
             <a:prstGeom prst="roundRect">
               <a:avLst>
@@ -5977,18 +6067,18 @@
             <a:lstStyle/>
             <a:p>
               <a:r>
-                <a:rPr lang="en-GB" sz="1600" b="1" dirty="0">
+                <a:rPr lang="en-GB" sz="1600" dirty="0">
                   <a:solidFill>
                     <a:schemeClr val="bg1"/>
                   </a:solidFill>
-                  <a:latin typeface="Source Sans Pro" panose="020B0503030403020204" pitchFamily="34" charset="0"/>
-                  <a:ea typeface="Source Sans Pro" panose="020B0503030403020204" pitchFamily="34" charset="0"/>
+                  <a:latin typeface="Roboto" panose="02000000000000000000" pitchFamily="2" charset="0"/>
+                  <a:ea typeface="Roboto" panose="02000000000000000000" pitchFamily="2" charset="0"/>
                   <a:cs typeface="Segoe UI Semibold" panose="020B0702040204020203" pitchFamily="34" charset="0"/>
                 </a:rPr>
                 <a:t>Please Turn Off/Silence Your Devices </a:t>
               </a:r>
               <a:r>
-                <a:rPr lang="zh-TW" altLang="en-US" sz="1600" b="1" dirty="0">
+                <a:rPr lang="zh-TW" altLang="en-US" sz="1600" dirty="0">
                   <a:solidFill>
                     <a:schemeClr val="bg1"/>
                   </a:solidFill>
@@ -5997,7 +6087,7 @@
                 </a:rPr>
                 <a:t>請靜音或關閉所有電子設備</a:t>
               </a:r>
-              <a:endParaRPr lang="ja-JP" altLang="en-US" sz="1600" b="1" dirty="0">
+              <a:endParaRPr lang="ja-JP" altLang="en-US" sz="1600" dirty="0">
                 <a:solidFill>
                   <a:schemeClr val="bg1"/>
                 </a:solidFill>
@@ -6009,10 +6099,10 @@
         </p:sp>
         <p:pic>
           <p:nvPicPr>
-            <p:cNvPr id="4" name="Picture 3" descr="Shape&#10;&#10;Description automatically generated with low confidence">
+            <p:cNvPr id="8" name="Picture 7" descr="Shape&#10;&#10;Description automatically generated with low confidence">
               <a:extLst>
                 <a:ext uri="{FF2B5EF4-FFF2-40B4-BE49-F238E27FC236}">
-                  <a16:creationId xmlns:a16="http://schemas.microsoft.com/office/drawing/2014/main" id="{C304BA47-78DC-6B31-60E7-C59741B55AFC}"/>
+                  <a16:creationId xmlns:a16="http://schemas.microsoft.com/office/drawing/2014/main" id="{83D4579A-2EBC-6DEA-525B-E0F1E9FDD410}"/>
                 </a:ext>
               </a:extLst>
             </p:cNvPr>
@@ -6022,12 +6112,12 @@
             <p:nvPr/>
           </p:nvPicPr>
           <p:blipFill>
-            <a:blip r:embed="rId3" cstate="print">
+            <a:blip r:embed="rId5" cstate="print">
               <a:lum bright="70000" contrast="-70000"/>
               <a:extLst>
                 <a:ext uri="{BEBA8EAE-BF5A-486C-A8C5-ECC9F3942E4B}">
                   <a14:imgProps xmlns:a14="http://schemas.microsoft.com/office/drawing/2010/main">
-                    <a14:imgLayer r:embed="rId4">
+                    <a14:imgLayer r:embed="rId6">
                       <a14:imgEffect>
                         <a14:artisticPhotocopy/>
                       </a14:imgEffect>
@@ -6063,98 +6153,6 @@
             <a:solidFill>
               <a:srgbClr val="004B8D"/>
             </a:solidFill>
-          </p:spPr>
-        </p:pic>
-      </p:grpSp>
-      <p:grpSp>
-        <p:nvGrpSpPr>
-          <p:cNvPr id="14" name="Group 13">
-            <a:extLst>
-              <a:ext uri="{FF2B5EF4-FFF2-40B4-BE49-F238E27FC236}">
-                <a16:creationId xmlns:a16="http://schemas.microsoft.com/office/drawing/2014/main" id="{BE757074-DE35-1B2E-A2C5-5646BFC302AF}"/>
-              </a:ext>
-            </a:extLst>
-          </p:cNvPr>
-          <p:cNvGrpSpPr/>
-          <p:nvPr/>
-        </p:nvGrpSpPr>
-        <p:grpSpPr>
-          <a:xfrm>
-            <a:off x="191344" y="6381328"/>
-            <a:ext cx="3312368" cy="276107"/>
-            <a:chOff x="3719736" y="328470"/>
-            <a:chExt cx="4754803" cy="396343"/>
-          </a:xfrm>
-        </p:grpSpPr>
-        <p:pic>
-          <p:nvPicPr>
-            <p:cNvPr id="15" name="Picture 14">
-              <a:extLst>
-                <a:ext uri="{FF2B5EF4-FFF2-40B4-BE49-F238E27FC236}">
-                  <a16:creationId xmlns:a16="http://schemas.microsoft.com/office/drawing/2014/main" id="{793CC90E-DC89-C740-3A3E-80EF08F44E25}"/>
-                </a:ext>
-              </a:extLst>
-            </p:cNvPr>
-            <p:cNvPicPr>
-              <a:picLocks noChangeAspect="1"/>
-            </p:cNvPicPr>
-            <p:nvPr/>
-          </p:nvPicPr>
-          <p:blipFill>
-            <a:blip r:embed="rId5" cstate="print">
-              <a:extLst>
-                <a:ext uri="{28A0092B-C50C-407E-A947-70E740481C1C}">
-                  <a14:useLocalDpi xmlns:a14="http://schemas.microsoft.com/office/drawing/2010/main" val="0"/>
-                </a:ext>
-              </a:extLst>
-            </a:blip>
-            <a:stretch>
-              <a:fillRect/>
-            </a:stretch>
-          </p:blipFill>
-          <p:spPr>
-            <a:xfrm>
-              <a:off x="3719736" y="328470"/>
-              <a:ext cx="3030311" cy="392158"/>
-            </a:xfrm>
-            <a:prstGeom prst="rect">
-              <a:avLst/>
-            </a:prstGeom>
-          </p:spPr>
-        </p:pic>
-        <p:pic>
-          <p:nvPicPr>
-            <p:cNvPr id="16" name="Picture 15" descr="A blue text on a black background&#10;&#10;Description automatically generated with low confidence">
-              <a:extLst>
-                <a:ext uri="{FF2B5EF4-FFF2-40B4-BE49-F238E27FC236}">
-                  <a16:creationId xmlns:a16="http://schemas.microsoft.com/office/drawing/2014/main" id="{0A351EDF-5530-4A06-D6AD-F2569775A0CB}"/>
-                </a:ext>
-              </a:extLst>
-            </p:cNvPr>
-            <p:cNvPicPr>
-              <a:picLocks noChangeAspect="1"/>
-            </p:cNvPicPr>
-            <p:nvPr/>
-          </p:nvPicPr>
-          <p:blipFill rotWithShape="1">
-            <a:blip r:embed="rId6" cstate="print">
-              <a:extLst>
-                <a:ext uri="{28A0092B-C50C-407E-A947-70E740481C1C}">
-                  <a14:useLocalDpi xmlns:a14="http://schemas.microsoft.com/office/drawing/2010/main" val="0"/>
-                </a:ext>
-              </a:extLst>
-            </a:blip>
-            <a:srcRect l="28239" r="1"/>
-            <a:stretch/>
-          </p:blipFill>
-          <p:spPr>
-            <a:xfrm>
-              <a:off x="6816080" y="332656"/>
-              <a:ext cx="1658459" cy="392157"/>
-            </a:xfrm>
-            <a:prstGeom prst="rect">
-              <a:avLst/>
-            </a:prstGeom>
           </p:spPr>
         </p:pic>
       </p:grpSp>
@@ -6251,8 +6249,8 @@
             </a:pPr>
             <a:r>
               <a:rPr lang="en-US" altLang="zh-CN" sz="4800" b="1" dirty="0">
-                <a:latin typeface="Source Sans Pro" panose="020B0503030403020204" pitchFamily="34" charset="0"/>
-                <a:ea typeface="Source Sans Pro" panose="020B0503030403020204" pitchFamily="34" charset="0"/>
+                <a:latin typeface="Roboto" panose="02000000000000000000" pitchFamily="2" charset="0"/>
+                <a:ea typeface="Roboto" panose="02000000000000000000" pitchFamily="2" charset="0"/>
                 <a:cs typeface="Segoe UI" panose="020B0502040204020203" pitchFamily="34" charset="0"/>
               </a:rPr>
               <a:t>English</a:t>
@@ -6350,7 +6348,7 @@
         </p:nvSpPr>
         <p:spPr bwMode="auto">
           <a:xfrm>
-            <a:off x="3930567" y="652626"/>
+            <a:off x="3930567" y="582020"/>
             <a:ext cx="4330866" cy="400110"/>
           </a:xfrm>
           <a:prstGeom prst="rect">
@@ -6425,8 +6423,8 @@
         </p:nvGrpSpPr>
         <p:grpSpPr>
           <a:xfrm>
-            <a:off x="3718599" y="328470"/>
-            <a:ext cx="4754803" cy="396343"/>
+            <a:off x="4422474" y="306692"/>
+            <a:ext cx="3347052" cy="278997"/>
             <a:chOff x="3719736" y="328470"/>
             <a:chExt cx="4754803" cy="396343"/>
           </a:xfrm>
@@ -6446,7 +6444,7 @@
             <p:nvPr/>
           </p:nvPicPr>
           <p:blipFill>
-            <a:blip r:embed="rId3">
+            <a:blip r:embed="rId3" cstate="print">
               <a:extLst>
                 <a:ext uri="{28A0092B-C50C-407E-A947-70E740481C1C}">
                   <a14:useLocalDpi xmlns:a14="http://schemas.microsoft.com/office/drawing/2010/main" val="0"/>
@@ -6505,10 +6503,10 @@
       </p:grpSp>
       <p:grpSp>
         <p:nvGrpSpPr>
-          <p:cNvPr id="5" name="Group 4">
+          <p:cNvPr id="2" name="Group 1">
             <a:extLst>
               <a:ext uri="{FF2B5EF4-FFF2-40B4-BE49-F238E27FC236}">
-                <a16:creationId xmlns:a16="http://schemas.microsoft.com/office/drawing/2014/main" id="{4E631C18-72C9-FB8D-5A58-F4527705D10F}"/>
+                <a16:creationId xmlns:a16="http://schemas.microsoft.com/office/drawing/2014/main" id="{4519ECDE-7B7F-1E88-3CF4-C4DBAE73DA4F}"/>
               </a:ext>
             </a:extLst>
           </p:cNvPr>
@@ -6517,18 +6515,18 @@
         </p:nvGrpSpPr>
         <p:grpSpPr>
           <a:xfrm>
-            <a:off x="2440607" y="6092254"/>
-            <a:ext cx="7310786" cy="433090"/>
-            <a:chOff x="5933021" y="6326519"/>
-            <a:chExt cx="6149003" cy="364266"/>
+            <a:off x="2963652" y="6272458"/>
+            <a:ext cx="6264696" cy="381119"/>
+            <a:chOff x="5807968" y="6327364"/>
+            <a:chExt cx="6264696" cy="381119"/>
           </a:xfrm>
         </p:grpSpPr>
         <p:sp>
           <p:nvSpPr>
-            <p:cNvPr id="6" name="TextBox 5">
+            <p:cNvPr id="3" name="TextBox 2">
               <a:extLst>
                 <a:ext uri="{FF2B5EF4-FFF2-40B4-BE49-F238E27FC236}">
-                  <a16:creationId xmlns:a16="http://schemas.microsoft.com/office/drawing/2014/main" id="{F46F5070-83D3-0307-7CBF-3C04B56AE194}"/>
+                  <a16:creationId xmlns:a16="http://schemas.microsoft.com/office/drawing/2014/main" id="{8971E9E0-EB35-5896-D7BC-7FA265B12818}"/>
                 </a:ext>
               </a:extLst>
             </p:cNvPr>
@@ -6537,8 +6535,8 @@
           </p:nvSpPr>
           <p:spPr>
             <a:xfrm>
-              <a:off x="5933021" y="6326519"/>
-              <a:ext cx="6149003" cy="364266"/>
+              <a:off x="5807968" y="6327364"/>
+              <a:ext cx="6264696" cy="381119"/>
             </a:xfrm>
             <a:prstGeom prst="roundRect">
               <a:avLst>
@@ -6559,44 +6557,42 @@
             <a:lstStyle/>
             <a:p>
               <a:r>
-                <a:rPr lang="en-GB" sz="1900" b="1" dirty="0">
+                <a:rPr lang="en-GB" sz="1600" dirty="0">
+                  <a:solidFill>
+                    <a:schemeClr val="bg1"/>
+                  </a:solidFill>
+                  <a:latin typeface="Roboto" panose="02000000000000000000" pitchFamily="2" charset="0"/>
+                  <a:ea typeface="Roboto" panose="02000000000000000000" pitchFamily="2" charset="0"/>
+                  <a:cs typeface="Segoe UI Semibold" panose="020B0702040204020203" pitchFamily="34" charset="0"/>
+                </a:rPr>
+                <a:t>Please Turn Off/Silence Your Devices </a:t>
+              </a:r>
+              <a:r>
+                <a:rPr lang="zh-TW" altLang="en-US" sz="1600" dirty="0">
                   <a:solidFill>
                     <a:schemeClr val="bg1"/>
                   </a:solidFill>
                   <a:latin typeface="Source Sans Pro" panose="020B0503030403020204" pitchFamily="34" charset="0"/>
-                  <a:ea typeface="Source Sans Pro" panose="020B0503030403020204" pitchFamily="34" charset="0"/>
-                  <a:cs typeface="Segoe UI" panose="020B0502040204020203" pitchFamily="34" charset="0"/>
-                </a:rPr>
-                <a:t>Please Turn Off/Silence Your Devices </a:t>
-              </a:r>
-              <a:r>
-                <a:rPr lang="zh-TW" altLang="en-US" sz="1900" b="1" dirty="0">
-                  <a:solidFill>
-                    <a:schemeClr val="bg1"/>
-                  </a:solidFill>
-                  <a:latin typeface="Segoe UI" panose="020B0502040204020203" pitchFamily="34" charset="0"/>
                   <a:ea typeface="Microsoft JhengHei" panose="020B0604030504040204" pitchFamily="34" charset="-120"/>
-                  <a:cs typeface="Segoe UI" panose="020B0502040204020203" pitchFamily="34" charset="0"/>
                 </a:rPr>
                 <a:t>請靜音或關閉所有電子設備</a:t>
               </a:r>
-              <a:endParaRPr lang="ja-JP" altLang="en-US" sz="1900" b="1" dirty="0">
+              <a:endParaRPr lang="ja-JP" altLang="en-US" sz="1600" dirty="0">
                 <a:solidFill>
                   <a:schemeClr val="bg1"/>
                 </a:solidFill>
-                <a:latin typeface="Segoe UI" panose="020B0502040204020203" pitchFamily="34" charset="0"/>
+                <a:latin typeface="Source Sans Pro" panose="020B0503030403020204" pitchFamily="34" charset="0"/>
                 <a:ea typeface="Microsoft JhengHei" panose="020B0604030504040204" pitchFamily="34" charset="-120"/>
-                <a:cs typeface="Segoe UI" panose="020B0502040204020203" pitchFamily="34" charset="0"/>
               </a:endParaRPr>
             </a:p>
           </p:txBody>
         </p:sp>
         <p:pic>
           <p:nvPicPr>
-            <p:cNvPr id="7" name="Picture 6" descr="Shape&#10;&#10;Description automatically generated with low confidence">
+            <p:cNvPr id="4" name="Picture 3" descr="Shape&#10;&#10;Description automatically generated with low confidence">
               <a:extLst>
                 <a:ext uri="{FF2B5EF4-FFF2-40B4-BE49-F238E27FC236}">
-                  <a16:creationId xmlns:a16="http://schemas.microsoft.com/office/drawing/2014/main" id="{7E2A0DE7-DB97-0BE4-6CBF-ECEEC316ADB1}"/>
+                  <a16:creationId xmlns:a16="http://schemas.microsoft.com/office/drawing/2014/main" id="{AB6BE041-EBBF-969A-6C70-EB02A3643863}"/>
                 </a:ext>
               </a:extLst>
             </p:cNvPr>
@@ -6743,8 +6739,8 @@
             </a:pPr>
             <a:r>
               <a:rPr lang="en-US" altLang="zh-CN" sz="4800" b="1" dirty="0">
-                <a:latin typeface="Source Sans Pro" panose="020B0503030403020204" pitchFamily="34" charset="0"/>
-                <a:ea typeface="Source Sans Pro" panose="020B0503030403020204" pitchFamily="34" charset="0"/>
+                <a:latin typeface="Roboto" panose="02000000000000000000" pitchFamily="2" charset="0"/>
+                <a:ea typeface="Roboto" panose="02000000000000000000" pitchFamily="2" charset="0"/>
                 <a:cs typeface="Segoe UI" panose="020B0502040204020203" pitchFamily="34" charset="0"/>
               </a:rPr>
               <a:t>English</a:t>
@@ -6868,7 +6864,7 @@
             <a:prstGeom prst="line">
               <a:avLst/>
             </a:prstGeom>
-            <a:ln w="38100">
+            <a:ln w="19050">
               <a:solidFill>
                 <a:srgbClr val="004B8D"/>
               </a:solidFill>
@@ -6928,11 +6924,19 @@
             </a:pPr>
             <a:r>
               <a:rPr lang="en-GB" altLang="en-US" sz="2800" b="1" dirty="0">
+                <a:latin typeface="Roboto" panose="02000000000000000000" pitchFamily="2" charset="0"/>
+                <a:ea typeface="Roboto" panose="02000000000000000000" pitchFamily="2" charset="0"/>
+                <a:cs typeface="Segoe UI" panose="020B0502040204020203" pitchFamily="34" charset="0"/>
+              </a:rPr>
+              <a:t>HYMNS</a:t>
+            </a:r>
+            <a:r>
+              <a:rPr lang="en-GB" altLang="en-US" sz="2800" b="1" dirty="0">
                 <a:latin typeface="Source Sans Pro" panose="020B0503030403020204" pitchFamily="34" charset="0"/>
                 <a:ea typeface="Source Sans Pro" panose="020B0503030403020204" pitchFamily="34" charset="0"/>
                 <a:cs typeface="Segoe UI" panose="020B0502040204020203" pitchFamily="34" charset="0"/>
               </a:rPr>
-              <a:t>HYMNS </a:t>
+              <a:t> </a:t>
             </a:r>
             <a:r>
               <a:rPr lang="zh-TW" altLang="en-US" sz="2800" b="1" dirty="0">
@@ -7016,7 +7020,8 @@
             </a:pPr>
             <a:r>
               <a:rPr lang="en-US" altLang="en-US" sz="6000" dirty="0">
-                <a:latin typeface="Century Gothic" panose="020B0502020202020204" pitchFamily="34" charset="0"/>
+                <a:latin typeface="Roboto" panose="02000000000000000000" pitchFamily="2" charset="0"/>
+                <a:ea typeface="Roboto" panose="02000000000000000000" pitchFamily="2" charset="0"/>
               </a:rPr>
               <a:t>Hymn No.</a:t>
             </a:r>
@@ -7114,10 +7119,10 @@
         </p:nvGrpSpPr>
         <p:grpSpPr>
           <a:xfrm>
-            <a:off x="5951984" y="6318094"/>
-            <a:ext cx="6130040" cy="381119"/>
-            <a:chOff x="5951984" y="6318094"/>
-            <a:chExt cx="6130040" cy="381119"/>
+            <a:off x="5807968" y="6327364"/>
+            <a:ext cx="6264696" cy="381119"/>
+            <a:chOff x="5807968" y="6327364"/>
+            <a:chExt cx="6264696" cy="381119"/>
           </a:xfrm>
         </p:grpSpPr>
         <p:sp>
@@ -7134,8 +7139,8 @@
           </p:nvSpPr>
           <p:spPr>
             <a:xfrm>
-              <a:off x="5951984" y="6318094"/>
-              <a:ext cx="6130040" cy="381119"/>
+              <a:off x="5807968" y="6327364"/>
+              <a:ext cx="6264696" cy="381119"/>
             </a:xfrm>
             <a:prstGeom prst="roundRect">
               <a:avLst>
@@ -7156,18 +7161,18 @@
             <a:lstStyle/>
             <a:p>
               <a:r>
-                <a:rPr lang="en-GB" sz="1600" b="1" dirty="0">
+                <a:rPr lang="en-GB" sz="1600" dirty="0">
                   <a:solidFill>
                     <a:schemeClr val="bg1"/>
                   </a:solidFill>
-                  <a:latin typeface="Source Sans Pro" panose="020B0503030403020204" pitchFamily="34" charset="0"/>
-                  <a:ea typeface="Source Sans Pro" panose="020B0503030403020204" pitchFamily="34" charset="0"/>
+                  <a:latin typeface="Roboto" panose="02000000000000000000" pitchFamily="2" charset="0"/>
+                  <a:ea typeface="Roboto" panose="02000000000000000000" pitchFamily="2" charset="0"/>
                   <a:cs typeface="Segoe UI Semibold" panose="020B0702040204020203" pitchFamily="34" charset="0"/>
                 </a:rPr>
                 <a:t>Please Turn Off/Silence Your Devices </a:t>
               </a:r>
               <a:r>
-                <a:rPr lang="zh-TW" altLang="en-US" sz="1600" b="1" dirty="0">
+                <a:rPr lang="zh-TW" altLang="en-US" sz="1600" dirty="0">
                   <a:solidFill>
                     <a:schemeClr val="bg1"/>
                   </a:solidFill>
@@ -7176,7 +7181,7 @@
                 </a:rPr>
                 <a:t>請靜音或關閉所有電子設備</a:t>
               </a:r>
-              <a:endParaRPr lang="ja-JP" altLang="en-US" sz="1600" b="1" dirty="0">
+              <a:endParaRPr lang="ja-JP" altLang="en-US" sz="1600" dirty="0">
                 <a:solidFill>
                   <a:schemeClr val="bg1"/>
                 </a:solidFill>
@@ -7436,8 +7441,8 @@
             </a:pPr>
             <a:r>
               <a:rPr lang="en-US" altLang="zh-CN" sz="3600" b="1" dirty="0">
-                <a:latin typeface="Source Sans Pro" panose="020B0503030403020204" pitchFamily="34" charset="0"/>
-                <a:ea typeface="Source Sans Pro" panose="020B0503030403020204" pitchFamily="34" charset="0"/>
+                <a:latin typeface="Roboto" panose="02000000000000000000" pitchFamily="2" charset="0"/>
+                <a:ea typeface="Roboto" panose="02000000000000000000" pitchFamily="2" charset="0"/>
                 <a:cs typeface="Segoe UI" panose="020B0502040204020203" pitchFamily="34" charset="0"/>
               </a:rPr>
               <a:t>English</a:t>
@@ -7563,7 +7568,7 @@
             <a:prstGeom prst="line">
               <a:avLst/>
             </a:prstGeom>
-            <a:ln w="38100">
+            <a:ln w="19050">
               <a:solidFill>
                 <a:schemeClr val="accent1">
                   <a:lumMod val="75000"/>
@@ -7631,8 +7636,8 @@
                     <a:lumMod val="75000"/>
                   </a:schemeClr>
                 </a:solidFill>
-                <a:latin typeface="Source Sans Pro Semibold" panose="020B0603030403020204" pitchFamily="34" charset="0"/>
-                <a:ea typeface="Source Sans Pro Semibold" panose="020B0603030403020204" pitchFamily="34" charset="0"/>
+                <a:latin typeface="Roboto" panose="02000000000000000000" pitchFamily="2" charset="0"/>
+                <a:ea typeface="Roboto" panose="02000000000000000000" pitchFamily="2" charset="0"/>
                 <a:cs typeface="Segoe UI" panose="020B0502040204020203" pitchFamily="34" charset="0"/>
               </a:rPr>
               <a:t>BIBLE VERSE </a:t>
@@ -7663,224 +7668,245 @@
           </a:p>
         </p:txBody>
       </p:sp>
-      <p:sp>
-        <p:nvSpPr>
-          <p:cNvPr id="344071" name="Text Box 7"/>
-          <p:cNvSpPr txBox="1">
-            <a:spLocks noChangeArrowheads="1"/>
-          </p:cNvSpPr>
+      <p:grpSp>
+        <p:nvGrpSpPr>
+          <p:cNvPr id="10" name="Group 9">
+            <a:extLst>
+              <a:ext uri="{FF2B5EF4-FFF2-40B4-BE49-F238E27FC236}">
+                <a16:creationId xmlns:a16="http://schemas.microsoft.com/office/drawing/2014/main" id="{800E8C85-7B20-E8E0-FE06-83104E083FF4}"/>
+              </a:ext>
+            </a:extLst>
+          </p:cNvPr>
+          <p:cNvGrpSpPr/>
           <p:nvPr/>
-        </p:nvSpPr>
-        <p:spPr bwMode="auto">
+        </p:nvGrpSpPr>
+        <p:grpSpPr>
           <a:xfrm>
             <a:off x="-1" y="3033580"/>
-            <a:ext cx="5951985" cy="1077218"/>
+            <a:ext cx="12192000" cy="2051604"/>
+            <a:chOff x="-1" y="3033580"/>
+            <a:chExt cx="12192001" cy="2051604"/>
           </a:xfrm>
-          <a:prstGeom prst="rect">
-            <a:avLst/>
-          </a:prstGeom>
-          <a:noFill/>
-          <a:ln>
+        </p:grpSpPr>
+        <p:sp>
+          <p:nvSpPr>
+            <p:cNvPr id="344071" name="Text Box 7"/>
+            <p:cNvSpPr txBox="1">
+              <a:spLocks noChangeArrowheads="1"/>
+            </p:cNvSpPr>
+            <p:nvPr/>
+          </p:nvSpPr>
+          <p:spPr bwMode="auto">
+            <a:xfrm>
+              <a:off x="-1" y="3033580"/>
+              <a:ext cx="5951985" cy="1015663"/>
+            </a:xfrm>
+            <a:prstGeom prst="rect">
+              <a:avLst/>
+            </a:prstGeom>
             <a:noFill/>
-          </a:ln>
-          <a:effectLst/>
-          <a:extLst>
-            <a:ext uri="{909E8E84-426E-40DD-AFC4-6F175D3DCCD1}">
-              <a14:hiddenFill xmlns:a14="http://schemas.microsoft.com/office/drawing/2010/main">
-                <a:solidFill>
-                  <a:schemeClr val="accent1"/>
-                </a:solidFill>
-              </a14:hiddenFill>
-            </a:ext>
-            <a:ext uri="{91240B29-F687-4F45-9708-019B960494DF}">
-              <a14:hiddenLine xmlns:a14="http://schemas.microsoft.com/office/drawing/2010/main" w="9525">
-                <a:solidFill>
-                  <a:schemeClr val="tx1"/>
-                </a:solidFill>
-                <a:miter lim="800000"/>
-                <a:headEnd/>
-                <a:tailEnd/>
-              </a14:hiddenLine>
-            </a:ext>
-            <a:ext uri="{AF507438-7753-43E0-B8FC-AC1667EBCBE1}">
-              <a14:hiddenEffects xmlns:a14="http://schemas.microsoft.com/office/drawing/2010/main">
-                <a:effectLst>
-                  <a:outerShdw dist="35921" dir="2700000" algn="ctr" rotWithShape="0">
-                    <a:schemeClr val="bg2"/>
-                  </a:outerShdw>
-                </a:effectLst>
-              </a14:hiddenEffects>
-            </a:ext>
-          </a:extLst>
-        </p:spPr>
-        <p:txBody>
-          <a:bodyPr wrap="square">
-            <a:spAutoFit/>
-          </a:bodyPr>
-          <a:lstStyle/>
-          <a:p>
-            <a:pPr algn="r">
-              <a:spcBef>
-                <a:spcPct val="50000"/>
-              </a:spcBef>
-            </a:pPr>
-            <a:r>
-              <a:rPr lang="en-US" altLang="en-US" sz="6400" b="1" dirty="0">
-                <a:latin typeface="Source Sans Pro Semibold" panose="020B0603030403020204" pitchFamily="34" charset="0"/>
-                <a:ea typeface="Source Sans Pro Semibold" panose="020B0603030403020204" pitchFamily="34" charset="0"/>
-              </a:rPr>
-              <a:t>English Book</a:t>
-            </a:r>
-          </a:p>
-        </p:txBody>
-      </p:sp>
-      <p:sp>
-        <p:nvSpPr>
-          <p:cNvPr id="344072" name="Text Box 8"/>
-          <p:cNvSpPr txBox="1">
-            <a:spLocks noChangeArrowheads="1"/>
-          </p:cNvSpPr>
-          <p:nvPr/>
-        </p:nvSpPr>
-        <p:spPr bwMode="auto">
-          <a:xfrm>
-            <a:off x="0" y="4069521"/>
-            <a:ext cx="5951984" cy="1077218"/>
-          </a:xfrm>
-          <a:prstGeom prst="rect">
-            <a:avLst/>
-          </a:prstGeom>
-          <a:noFill/>
-          <a:ln>
+            <a:ln>
+              <a:noFill/>
+            </a:ln>
+            <a:effectLst/>
+            <a:extLst>
+              <a:ext uri="{909E8E84-426E-40DD-AFC4-6F175D3DCCD1}">
+                <a14:hiddenFill xmlns:a14="http://schemas.microsoft.com/office/drawing/2010/main">
+                  <a:solidFill>
+                    <a:schemeClr val="accent1"/>
+                  </a:solidFill>
+                </a14:hiddenFill>
+              </a:ext>
+              <a:ext uri="{91240B29-F687-4F45-9708-019B960494DF}">
+                <a14:hiddenLine xmlns:a14="http://schemas.microsoft.com/office/drawing/2010/main" w="9525">
+                  <a:solidFill>
+                    <a:schemeClr val="tx1"/>
+                  </a:solidFill>
+                  <a:miter lim="800000"/>
+                  <a:headEnd/>
+                  <a:tailEnd/>
+                </a14:hiddenLine>
+              </a:ext>
+              <a:ext uri="{AF507438-7753-43E0-B8FC-AC1667EBCBE1}">
+                <a14:hiddenEffects xmlns:a14="http://schemas.microsoft.com/office/drawing/2010/main">
+                  <a:effectLst>
+                    <a:outerShdw dist="35921" dir="2700000" algn="ctr" rotWithShape="0">
+                      <a:schemeClr val="bg2"/>
+                    </a:outerShdw>
+                  </a:effectLst>
+                </a14:hiddenEffects>
+              </a:ext>
+            </a:extLst>
+          </p:spPr>
+          <p:txBody>
+            <a:bodyPr wrap="square">
+              <a:spAutoFit/>
+            </a:bodyPr>
+            <a:lstStyle/>
+            <a:p>
+              <a:pPr algn="r">
+                <a:spcBef>
+                  <a:spcPct val="50000"/>
+                </a:spcBef>
+              </a:pPr>
+              <a:r>
+                <a:rPr lang="en-US" altLang="en-US" sz="6000" b="1" dirty="0">
+                  <a:latin typeface="Roboto" panose="02000000000000000000" pitchFamily="2" charset="0"/>
+                  <a:ea typeface="Roboto" panose="02000000000000000000" pitchFamily="2" charset="0"/>
+                </a:rPr>
+                <a:t>English Book</a:t>
+              </a:r>
+            </a:p>
+          </p:txBody>
+        </p:sp>
+        <p:sp>
+          <p:nvSpPr>
+            <p:cNvPr id="344072" name="Text Box 8"/>
+            <p:cNvSpPr txBox="1">
+              <a:spLocks noChangeArrowheads="1"/>
+            </p:cNvSpPr>
+            <p:nvPr/>
+          </p:nvSpPr>
+          <p:spPr bwMode="auto">
+            <a:xfrm>
+              <a:off x="0" y="4069521"/>
+              <a:ext cx="5951984" cy="1015663"/>
+            </a:xfrm>
+            <a:prstGeom prst="rect">
+              <a:avLst/>
+            </a:prstGeom>
             <a:noFill/>
-          </a:ln>
-          <a:effectLst/>
-          <a:extLst>
-            <a:ext uri="{909E8E84-426E-40DD-AFC4-6F175D3DCCD1}">
-              <a14:hiddenFill xmlns:a14="http://schemas.microsoft.com/office/drawing/2010/main">
-                <a:solidFill>
-                  <a:schemeClr val="accent1"/>
-                </a:solidFill>
-              </a14:hiddenFill>
-            </a:ext>
-            <a:ext uri="{91240B29-F687-4F45-9708-019B960494DF}">
-              <a14:hiddenLine xmlns:a14="http://schemas.microsoft.com/office/drawing/2010/main" w="9525">
-                <a:solidFill>
-                  <a:schemeClr val="tx1"/>
-                </a:solidFill>
-                <a:miter lim="800000"/>
-                <a:headEnd/>
-                <a:tailEnd/>
-              </a14:hiddenLine>
-            </a:ext>
-            <a:ext uri="{AF507438-7753-43E0-B8FC-AC1667EBCBE1}">
-              <a14:hiddenEffects xmlns:a14="http://schemas.microsoft.com/office/drawing/2010/main">
-                <a:effectLst>
-                  <a:outerShdw dist="35921" dir="2700000" algn="ctr" rotWithShape="0">
-                    <a:schemeClr val="bg2"/>
-                  </a:outerShdw>
-                </a:effectLst>
-              </a14:hiddenEffects>
-            </a:ext>
-          </a:extLst>
-        </p:spPr>
-        <p:txBody>
-          <a:bodyPr wrap="square">
-            <a:spAutoFit/>
-          </a:bodyPr>
-          <a:lstStyle/>
-          <a:p>
-            <a:pPr algn="r">
-              <a:spcBef>
-                <a:spcPct val="50000"/>
-              </a:spcBef>
-            </a:pPr>
-            <a:r>
-              <a:rPr lang="en-US" altLang="en-US" sz="6400" b="1" dirty="0">
-                <a:solidFill>
-                  <a:schemeClr val="accent1">
-                    <a:lumMod val="75000"/>
-                  </a:schemeClr>
-                </a:solidFill>
-                <a:latin typeface="Microsoft JhengHei" panose="020B0604030504040204" pitchFamily="34" charset="-120"/>
-                <a:ea typeface="Microsoft JhengHei" panose="020B0604030504040204" pitchFamily="34" charset="-120"/>
-              </a:rPr>
-              <a:t>Chinese Book</a:t>
-            </a:r>
-          </a:p>
-        </p:txBody>
-      </p:sp>
-      <p:sp>
-        <p:nvSpPr>
-          <p:cNvPr id="344073" name="Text Box 9"/>
-          <p:cNvSpPr txBox="1">
-            <a:spLocks noChangeArrowheads="1"/>
-          </p:cNvSpPr>
-          <p:nvPr/>
-        </p:nvSpPr>
-        <p:spPr bwMode="auto">
-          <a:xfrm>
-            <a:off x="6096000" y="3462897"/>
-            <a:ext cx="6095999" cy="1015663"/>
-          </a:xfrm>
-          <a:prstGeom prst="rect">
-            <a:avLst/>
-          </a:prstGeom>
-          <a:noFill/>
-          <a:ln>
+            <a:ln>
+              <a:noFill/>
+            </a:ln>
+            <a:effectLst/>
+            <a:extLst>
+              <a:ext uri="{909E8E84-426E-40DD-AFC4-6F175D3DCCD1}">
+                <a14:hiddenFill xmlns:a14="http://schemas.microsoft.com/office/drawing/2010/main">
+                  <a:solidFill>
+                    <a:schemeClr val="accent1"/>
+                  </a:solidFill>
+                </a14:hiddenFill>
+              </a:ext>
+              <a:ext uri="{91240B29-F687-4F45-9708-019B960494DF}">
+                <a14:hiddenLine xmlns:a14="http://schemas.microsoft.com/office/drawing/2010/main" w="9525">
+                  <a:solidFill>
+                    <a:schemeClr val="tx1"/>
+                  </a:solidFill>
+                  <a:miter lim="800000"/>
+                  <a:headEnd/>
+                  <a:tailEnd/>
+                </a14:hiddenLine>
+              </a:ext>
+              <a:ext uri="{AF507438-7753-43E0-B8FC-AC1667EBCBE1}">
+                <a14:hiddenEffects xmlns:a14="http://schemas.microsoft.com/office/drawing/2010/main">
+                  <a:effectLst>
+                    <a:outerShdw dist="35921" dir="2700000" algn="ctr" rotWithShape="0">
+                      <a:schemeClr val="bg2"/>
+                    </a:outerShdw>
+                  </a:effectLst>
+                </a14:hiddenEffects>
+              </a:ext>
+            </a:extLst>
+          </p:spPr>
+          <p:txBody>
+            <a:bodyPr wrap="square">
+              <a:spAutoFit/>
+            </a:bodyPr>
+            <a:lstStyle/>
+            <a:p>
+              <a:pPr algn="r">
+                <a:spcBef>
+                  <a:spcPct val="50000"/>
+                </a:spcBef>
+              </a:pPr>
+              <a:r>
+                <a:rPr lang="en-US" altLang="en-US" sz="6000" b="1" dirty="0">
+                  <a:solidFill>
+                    <a:schemeClr val="accent1">
+                      <a:lumMod val="75000"/>
+                    </a:schemeClr>
+                  </a:solidFill>
+                  <a:latin typeface="Microsoft JhengHei" panose="020B0604030504040204" pitchFamily="34" charset="-120"/>
+                  <a:ea typeface="Microsoft JhengHei" panose="020B0604030504040204" pitchFamily="34" charset="-120"/>
+                </a:rPr>
+                <a:t>Chinese Book</a:t>
+              </a:r>
+            </a:p>
+          </p:txBody>
+        </p:sp>
+        <p:sp>
+          <p:nvSpPr>
+            <p:cNvPr id="344073" name="Text Box 9"/>
+            <p:cNvSpPr txBox="1">
+              <a:spLocks noChangeArrowheads="1"/>
+            </p:cNvSpPr>
+            <p:nvPr/>
+          </p:nvSpPr>
+          <p:spPr bwMode="auto">
+            <a:xfrm>
+              <a:off x="6096000" y="3462897"/>
+              <a:ext cx="6096000" cy="1015663"/>
+            </a:xfrm>
+            <a:prstGeom prst="rect">
+              <a:avLst/>
+            </a:prstGeom>
             <a:noFill/>
-          </a:ln>
-          <a:effectLst/>
-          <a:extLst>
-            <a:ext uri="{909E8E84-426E-40DD-AFC4-6F175D3DCCD1}">
-              <a14:hiddenFill xmlns:a14="http://schemas.microsoft.com/office/drawing/2010/main">
-                <a:solidFill>
-                  <a:schemeClr val="accent1"/>
-                </a:solidFill>
-              </a14:hiddenFill>
-            </a:ext>
-            <a:ext uri="{91240B29-F687-4F45-9708-019B960494DF}">
-              <a14:hiddenLine xmlns:a14="http://schemas.microsoft.com/office/drawing/2010/main" w="9525">
-                <a:solidFill>
-                  <a:schemeClr val="tx1"/>
-                </a:solidFill>
-                <a:miter lim="800000"/>
-                <a:headEnd/>
-                <a:tailEnd/>
-              </a14:hiddenLine>
-            </a:ext>
-            <a:ext uri="{AF507438-7753-43E0-B8FC-AC1667EBCBE1}">
-              <a14:hiddenEffects xmlns:a14="http://schemas.microsoft.com/office/drawing/2010/main">
-                <a:effectLst>
-                  <a:outerShdw dist="35921" dir="2700000" algn="ctr" rotWithShape="0">
-                    <a:schemeClr val="bg2"/>
-                  </a:outerShdw>
-                </a:effectLst>
-              </a14:hiddenEffects>
-            </a:ext>
-          </a:extLst>
-        </p:spPr>
-        <p:txBody>
-          <a:bodyPr wrap="square" lIns="0" rIns="0">
-            <a:noAutofit/>
-          </a:bodyPr>
-          <a:lstStyle/>
-          <a:p>
-            <a:pPr>
-              <a:spcBef>
-                <a:spcPct val="50000"/>
-              </a:spcBef>
-            </a:pPr>
-            <a:r>
-              <a:rPr lang="en-US" altLang="zh-CN" sz="7200" b="1" dirty="0">
-                <a:latin typeface="Century Gothic" panose="020B0502020202020204" pitchFamily="34" charset="0"/>
-                <a:ea typeface="Source Sans Pro Semibold" panose="020B0603030403020204" pitchFamily="34" charset="0"/>
-              </a:rPr>
-              <a:t>Chapter &amp; Verse</a:t>
-            </a:r>
-          </a:p>
-        </p:txBody>
-      </p:sp>
+            <a:ln>
+              <a:noFill/>
+            </a:ln>
+            <a:effectLst/>
+            <a:extLst>
+              <a:ext uri="{909E8E84-426E-40DD-AFC4-6F175D3DCCD1}">
+                <a14:hiddenFill xmlns:a14="http://schemas.microsoft.com/office/drawing/2010/main">
+                  <a:solidFill>
+                    <a:schemeClr val="accent1"/>
+                  </a:solidFill>
+                </a14:hiddenFill>
+              </a:ext>
+              <a:ext uri="{91240B29-F687-4F45-9708-019B960494DF}">
+                <a14:hiddenLine xmlns:a14="http://schemas.microsoft.com/office/drawing/2010/main" w="9525">
+                  <a:solidFill>
+                    <a:schemeClr val="tx1"/>
+                  </a:solidFill>
+                  <a:miter lim="800000"/>
+                  <a:headEnd/>
+                  <a:tailEnd/>
+                </a14:hiddenLine>
+              </a:ext>
+              <a:ext uri="{AF507438-7753-43E0-B8FC-AC1667EBCBE1}">
+                <a14:hiddenEffects xmlns:a14="http://schemas.microsoft.com/office/drawing/2010/main">
+                  <a:effectLst>
+                    <a:outerShdw dist="35921" dir="2700000" algn="ctr" rotWithShape="0">
+                      <a:schemeClr val="bg2"/>
+                    </a:outerShdw>
+                  </a:effectLst>
+                </a14:hiddenEffects>
+              </a:ext>
+            </a:extLst>
+          </p:spPr>
+          <p:txBody>
+            <a:bodyPr wrap="square" lIns="0" rIns="0">
+              <a:noAutofit/>
+            </a:bodyPr>
+            <a:lstStyle/>
+            <a:p>
+              <a:pPr>
+                <a:spcBef>
+                  <a:spcPct val="50000"/>
+                </a:spcBef>
+              </a:pPr>
+              <a:r>
+                <a:rPr lang="en-US" altLang="zh-CN" sz="7000" b="1" dirty="0">
+                  <a:latin typeface="Roboto" panose="02000000000000000000" pitchFamily="2" charset="0"/>
+                  <a:ea typeface="Roboto" panose="02000000000000000000" pitchFamily="2" charset="0"/>
+                </a:rPr>
+                <a:t>Chapter &amp; Verse</a:t>
+              </a:r>
+            </a:p>
+          </p:txBody>
+        </p:sp>
+      </p:grpSp>
       <p:sp>
         <p:nvSpPr>
           <p:cNvPr id="2" name="Text Box 10">
@@ -7960,10 +7986,10 @@
       </p:sp>
       <p:grpSp>
         <p:nvGrpSpPr>
-          <p:cNvPr id="3" name="Group 2">
+          <p:cNvPr id="18" name="Group 17">
             <a:extLst>
               <a:ext uri="{FF2B5EF4-FFF2-40B4-BE49-F238E27FC236}">
-                <a16:creationId xmlns:a16="http://schemas.microsoft.com/office/drawing/2014/main" id="{D37B60FB-5A8B-DE0F-E7A3-C0CAD80A4A94}"/>
+                <a16:creationId xmlns:a16="http://schemas.microsoft.com/office/drawing/2014/main" id="{14D2BF5B-6D58-206A-F500-59F1D48D6064}"/>
               </a:ext>
             </a:extLst>
           </p:cNvPr>
@@ -7972,18 +7998,110 @@
         </p:nvGrpSpPr>
         <p:grpSpPr>
           <a:xfrm>
-            <a:off x="5951984" y="6318094"/>
-            <a:ext cx="6130040" cy="381119"/>
-            <a:chOff x="5951984" y="6318094"/>
-            <a:chExt cx="6130040" cy="381119"/>
+            <a:off x="191344" y="6381328"/>
+            <a:ext cx="3312368" cy="276107"/>
+            <a:chOff x="3719736" y="328470"/>
+            <a:chExt cx="4754803" cy="396343"/>
+          </a:xfrm>
+        </p:grpSpPr>
+        <p:pic>
+          <p:nvPicPr>
+            <p:cNvPr id="19" name="Picture 18">
+              <a:extLst>
+                <a:ext uri="{FF2B5EF4-FFF2-40B4-BE49-F238E27FC236}">
+                  <a16:creationId xmlns:a16="http://schemas.microsoft.com/office/drawing/2014/main" id="{B105F02E-20FD-EE41-26B6-7043E046CC0B}"/>
+                </a:ext>
+              </a:extLst>
+            </p:cNvPr>
+            <p:cNvPicPr>
+              <a:picLocks noChangeAspect="1"/>
+            </p:cNvPicPr>
+            <p:nvPr/>
+          </p:nvPicPr>
+          <p:blipFill>
+            <a:blip r:embed="rId3" cstate="print">
+              <a:extLst>
+                <a:ext uri="{28A0092B-C50C-407E-A947-70E740481C1C}">
+                  <a14:useLocalDpi xmlns:a14="http://schemas.microsoft.com/office/drawing/2010/main" val="0"/>
+                </a:ext>
+              </a:extLst>
+            </a:blip>
+            <a:stretch>
+              <a:fillRect/>
+            </a:stretch>
+          </p:blipFill>
+          <p:spPr>
+            <a:xfrm>
+              <a:off x="3719736" y="328470"/>
+              <a:ext cx="3030311" cy="392158"/>
+            </a:xfrm>
+            <a:prstGeom prst="rect">
+              <a:avLst/>
+            </a:prstGeom>
+          </p:spPr>
+        </p:pic>
+        <p:pic>
+          <p:nvPicPr>
+            <p:cNvPr id="20" name="Picture 19" descr="A blue text on a black background&#10;&#10;Description automatically generated with low confidence">
+              <a:extLst>
+                <a:ext uri="{FF2B5EF4-FFF2-40B4-BE49-F238E27FC236}">
+                  <a16:creationId xmlns:a16="http://schemas.microsoft.com/office/drawing/2014/main" id="{FC2C347B-A107-FE3B-0E6E-4634C115D5D1}"/>
+                </a:ext>
+              </a:extLst>
+            </p:cNvPr>
+            <p:cNvPicPr>
+              <a:picLocks noChangeAspect="1"/>
+            </p:cNvPicPr>
+            <p:nvPr/>
+          </p:nvPicPr>
+          <p:blipFill rotWithShape="1">
+            <a:blip r:embed="rId4" cstate="print">
+              <a:extLst>
+                <a:ext uri="{28A0092B-C50C-407E-A947-70E740481C1C}">
+                  <a14:useLocalDpi xmlns:a14="http://schemas.microsoft.com/office/drawing/2010/main" val="0"/>
+                </a:ext>
+              </a:extLst>
+            </a:blip>
+            <a:srcRect l="28239" r="1"/>
+            <a:stretch/>
+          </p:blipFill>
+          <p:spPr>
+            <a:xfrm>
+              <a:off x="6816080" y="332656"/>
+              <a:ext cx="1658459" cy="392157"/>
+            </a:xfrm>
+            <a:prstGeom prst="rect">
+              <a:avLst/>
+            </a:prstGeom>
+          </p:spPr>
+        </p:pic>
+      </p:grpSp>
+      <p:grpSp>
+        <p:nvGrpSpPr>
+          <p:cNvPr id="7" name="Group 6">
+            <a:extLst>
+              <a:ext uri="{FF2B5EF4-FFF2-40B4-BE49-F238E27FC236}">
+                <a16:creationId xmlns:a16="http://schemas.microsoft.com/office/drawing/2014/main" id="{5C3B6EE5-B972-0F30-6E01-55EA7D6703BC}"/>
+              </a:ext>
+            </a:extLst>
+          </p:cNvPr>
+          <p:cNvGrpSpPr/>
+          <p:nvPr/>
+        </p:nvGrpSpPr>
+        <p:grpSpPr>
+          <a:xfrm>
+            <a:off x="5807968" y="6327364"/>
+            <a:ext cx="6264696" cy="381119"/>
+            <a:chOff x="5807968" y="6327364"/>
+            <a:chExt cx="6264696" cy="381119"/>
           </a:xfrm>
         </p:grpSpPr>
         <p:sp>
           <p:nvSpPr>
-            <p:cNvPr id="10" name="TextBox 9">
+            <p:cNvPr id="8" name="TextBox 7">
               <a:extLst>
                 <a:ext uri="{FF2B5EF4-FFF2-40B4-BE49-F238E27FC236}">
-                  <a16:creationId xmlns:a16="http://schemas.microsoft.com/office/drawing/2014/main" id="{C681487A-C1BB-EB06-10DD-66228D86DAEF}"/>
+                  <a16:creationId xmlns:a16="http://schemas.microsoft.com/office/drawing/2014/main" id="{BB7E1353-CBFE-7117-91DA-0434A071127B}"/>
                 </a:ext>
               </a:extLst>
             </p:cNvPr>
@@ -7992,8 +8110,8 @@
           </p:nvSpPr>
           <p:spPr>
             <a:xfrm>
-              <a:off x="5951984" y="6318094"/>
-              <a:ext cx="6130040" cy="381119"/>
+              <a:off x="5807968" y="6327364"/>
+              <a:ext cx="6264696" cy="381119"/>
             </a:xfrm>
             <a:prstGeom prst="roundRect">
               <a:avLst>
@@ -8014,18 +8132,18 @@
             <a:lstStyle/>
             <a:p>
               <a:r>
-                <a:rPr lang="en-GB" sz="1600" b="1" dirty="0">
+                <a:rPr lang="en-GB" sz="1600" dirty="0">
                   <a:solidFill>
                     <a:schemeClr val="bg1"/>
                   </a:solidFill>
-                  <a:latin typeface="Source Sans Pro" panose="020B0503030403020204" pitchFamily="34" charset="0"/>
-                  <a:ea typeface="Source Sans Pro" panose="020B0503030403020204" pitchFamily="34" charset="0"/>
+                  <a:latin typeface="Roboto" panose="02000000000000000000" pitchFamily="2" charset="0"/>
+                  <a:ea typeface="Roboto" panose="02000000000000000000" pitchFamily="2" charset="0"/>
                   <a:cs typeface="Segoe UI Semibold" panose="020B0702040204020203" pitchFamily="34" charset="0"/>
                 </a:rPr>
                 <a:t>Please Turn Off/Silence Your Devices </a:t>
               </a:r>
               <a:r>
-                <a:rPr lang="zh-TW" altLang="en-US" sz="1600" b="1" dirty="0">
+                <a:rPr lang="zh-TW" altLang="en-US" sz="1600" dirty="0">
                   <a:solidFill>
                     <a:schemeClr val="bg1"/>
                   </a:solidFill>
@@ -8034,7 +8152,7 @@
                 </a:rPr>
                 <a:t>請靜音或關閉所有電子設備</a:t>
               </a:r>
-              <a:endParaRPr lang="ja-JP" altLang="en-US" sz="1600" b="1" dirty="0">
+              <a:endParaRPr lang="ja-JP" altLang="en-US" sz="1600" dirty="0">
                 <a:solidFill>
                   <a:schemeClr val="bg1"/>
                 </a:solidFill>
@@ -8046,10 +8164,10 @@
         </p:sp>
         <p:pic>
           <p:nvPicPr>
-            <p:cNvPr id="11" name="Picture 10" descr="Shape&#10;&#10;Description automatically generated with low confidence">
+            <p:cNvPr id="9" name="Picture 8" descr="Shape&#10;&#10;Description automatically generated with low confidence">
               <a:extLst>
                 <a:ext uri="{FF2B5EF4-FFF2-40B4-BE49-F238E27FC236}">
-                  <a16:creationId xmlns:a16="http://schemas.microsoft.com/office/drawing/2014/main" id="{6DEE7500-FE87-D395-FB3D-73ED4800F9BC}"/>
+                  <a16:creationId xmlns:a16="http://schemas.microsoft.com/office/drawing/2014/main" id="{287B44BF-812C-8A15-780B-715C92A9D6C2}"/>
                 </a:ext>
               </a:extLst>
             </p:cNvPr>
@@ -8059,12 +8177,12 @@
             <p:nvPr/>
           </p:nvPicPr>
           <p:blipFill>
-            <a:blip r:embed="rId3" cstate="print">
+            <a:blip r:embed="rId5" cstate="print">
               <a:lum bright="70000" contrast="-70000"/>
               <a:extLst>
                 <a:ext uri="{BEBA8EAE-BF5A-486C-A8C5-ECC9F3942E4B}">
                   <a14:imgProps xmlns:a14="http://schemas.microsoft.com/office/drawing/2010/main">
-                    <a14:imgLayer r:embed="rId4">
+                    <a14:imgLayer r:embed="rId6">
                       <a14:imgEffect>
                         <a14:artisticPhotocopy/>
                       </a14:imgEffect>
@@ -8100,98 +8218,6 @@
             <a:solidFill>
               <a:srgbClr val="004B8D"/>
             </a:solidFill>
-          </p:spPr>
-        </p:pic>
-      </p:grpSp>
-      <p:grpSp>
-        <p:nvGrpSpPr>
-          <p:cNvPr id="18" name="Group 17">
-            <a:extLst>
-              <a:ext uri="{FF2B5EF4-FFF2-40B4-BE49-F238E27FC236}">
-                <a16:creationId xmlns:a16="http://schemas.microsoft.com/office/drawing/2014/main" id="{14D2BF5B-6D58-206A-F500-59F1D48D6064}"/>
-              </a:ext>
-            </a:extLst>
-          </p:cNvPr>
-          <p:cNvGrpSpPr/>
-          <p:nvPr/>
-        </p:nvGrpSpPr>
-        <p:grpSpPr>
-          <a:xfrm>
-            <a:off x="191344" y="6381328"/>
-            <a:ext cx="3312368" cy="276107"/>
-            <a:chOff x="3719736" y="328470"/>
-            <a:chExt cx="4754803" cy="396343"/>
-          </a:xfrm>
-        </p:grpSpPr>
-        <p:pic>
-          <p:nvPicPr>
-            <p:cNvPr id="19" name="Picture 18">
-              <a:extLst>
-                <a:ext uri="{FF2B5EF4-FFF2-40B4-BE49-F238E27FC236}">
-                  <a16:creationId xmlns:a16="http://schemas.microsoft.com/office/drawing/2014/main" id="{B105F02E-20FD-EE41-26B6-7043E046CC0B}"/>
-                </a:ext>
-              </a:extLst>
-            </p:cNvPr>
-            <p:cNvPicPr>
-              <a:picLocks noChangeAspect="1"/>
-            </p:cNvPicPr>
-            <p:nvPr/>
-          </p:nvPicPr>
-          <p:blipFill>
-            <a:blip r:embed="rId5" cstate="print">
-              <a:extLst>
-                <a:ext uri="{28A0092B-C50C-407E-A947-70E740481C1C}">
-                  <a14:useLocalDpi xmlns:a14="http://schemas.microsoft.com/office/drawing/2010/main" val="0"/>
-                </a:ext>
-              </a:extLst>
-            </a:blip>
-            <a:stretch>
-              <a:fillRect/>
-            </a:stretch>
-          </p:blipFill>
-          <p:spPr>
-            <a:xfrm>
-              <a:off x="3719736" y="328470"/>
-              <a:ext cx="3030311" cy="392158"/>
-            </a:xfrm>
-            <a:prstGeom prst="rect">
-              <a:avLst/>
-            </a:prstGeom>
-          </p:spPr>
-        </p:pic>
-        <p:pic>
-          <p:nvPicPr>
-            <p:cNvPr id="20" name="Picture 19" descr="A blue text on a black background&#10;&#10;Description automatically generated with low confidence">
-              <a:extLst>
-                <a:ext uri="{FF2B5EF4-FFF2-40B4-BE49-F238E27FC236}">
-                  <a16:creationId xmlns:a16="http://schemas.microsoft.com/office/drawing/2014/main" id="{FC2C347B-A107-FE3B-0E6E-4634C115D5D1}"/>
-                </a:ext>
-              </a:extLst>
-            </p:cNvPr>
-            <p:cNvPicPr>
-              <a:picLocks noChangeAspect="1"/>
-            </p:cNvPicPr>
-            <p:nvPr/>
-          </p:nvPicPr>
-          <p:blipFill rotWithShape="1">
-            <a:blip r:embed="rId6" cstate="print">
-              <a:extLst>
-                <a:ext uri="{28A0092B-C50C-407E-A947-70E740481C1C}">
-                  <a14:useLocalDpi xmlns:a14="http://schemas.microsoft.com/office/drawing/2010/main" val="0"/>
-                </a:ext>
-              </a:extLst>
-            </a:blip>
-            <a:srcRect l="28239" r="1"/>
-            <a:stretch/>
-          </p:blipFill>
-          <p:spPr>
-            <a:xfrm>
-              <a:off x="6816080" y="332656"/>
-              <a:ext cx="1658459" cy="392157"/>
-            </a:xfrm>
-            <a:prstGeom prst="rect">
-              <a:avLst/>
-            </a:prstGeom>
           </p:spPr>
         </p:pic>
       </p:grpSp>
@@ -8294,8 +8320,8 @@
             </a:pPr>
             <a:r>
               <a:rPr lang="en-GB" altLang="zh-TW" sz="4800" dirty="0">
-                <a:latin typeface="Century Gothic" panose="020B0502020202020204" pitchFamily="34" charset="0"/>
-                <a:ea typeface="金梅新中楷全字體" panose="02010509060101010101" pitchFamily="49" charset="-120"/>
+                <a:latin typeface="Roboto" panose="02000000000000000000" pitchFamily="2" charset="0"/>
+                <a:ea typeface="Roboto" panose="02000000000000000000" pitchFamily="2" charset="0"/>
               </a:rPr>
               <a:t>Hymn No.</a:t>
             </a:r>
@@ -8367,11 +8393,19 @@
             <a:pPr algn="ctr"/>
             <a:r>
               <a:rPr lang="en-GB" altLang="en-US" sz="4000" b="1" dirty="0">
+                <a:latin typeface="Roboto" panose="02000000000000000000" pitchFamily="2" charset="0"/>
+                <a:ea typeface="Roboto" panose="02000000000000000000" pitchFamily="2" charset="0"/>
+                <a:cs typeface="Segoe UI" panose="020B0502040204020203" pitchFamily="34" charset="0"/>
+              </a:rPr>
+              <a:t>HYMNAL</a:t>
+            </a:r>
+            <a:r>
+              <a:rPr lang="en-GB" altLang="en-US" sz="4000" b="1" dirty="0">
                 <a:latin typeface="Source Sans Pro" panose="020B0503030403020204" pitchFamily="34" charset="0"/>
                 <a:ea typeface="Source Sans Pro" panose="020B0503030403020204" pitchFamily="34" charset="0"/>
                 <a:cs typeface="Segoe UI" panose="020B0502040204020203" pitchFamily="34" charset="0"/>
               </a:rPr>
-              <a:t>HYMNAL </a:t>
+              <a:t> </a:t>
             </a:r>
             <a:r>
               <a:rPr lang="ja-JP" altLang="en-US" sz="4000" b="1" dirty="0">
@@ -8487,7 +8521,7 @@
           <a:prstGeom prst="line">
             <a:avLst/>
           </a:prstGeom>
-          <a:ln w="38100">
+          <a:ln w="19050">
             <a:solidFill>
               <a:srgbClr val="004B8D"/>
             </a:solidFill>
@@ -8510,10 +8544,10 @@
       </p:cxnSp>
       <p:grpSp>
         <p:nvGrpSpPr>
-          <p:cNvPr id="11" name="Group 10">
+          <p:cNvPr id="14" name="Group 13">
             <a:extLst>
               <a:ext uri="{FF2B5EF4-FFF2-40B4-BE49-F238E27FC236}">
-                <a16:creationId xmlns:a16="http://schemas.microsoft.com/office/drawing/2014/main" id="{F4F183C5-3ED9-E762-9F8F-FA5586BC7315}"/>
+                <a16:creationId xmlns:a16="http://schemas.microsoft.com/office/drawing/2014/main" id="{3911759B-A7C6-8804-91FF-0F93B331B372}"/>
               </a:ext>
             </a:extLst>
           </p:cNvPr>
@@ -8522,18 +8556,110 @@
         </p:nvGrpSpPr>
         <p:grpSpPr>
           <a:xfrm>
-            <a:off x="5951984" y="6318094"/>
-            <a:ext cx="6130040" cy="381119"/>
-            <a:chOff x="5951984" y="6318094"/>
-            <a:chExt cx="6130040" cy="381119"/>
+            <a:off x="191344" y="6381328"/>
+            <a:ext cx="3312368" cy="276107"/>
+            <a:chOff x="3719736" y="328470"/>
+            <a:chExt cx="4754803" cy="396343"/>
+          </a:xfrm>
+        </p:grpSpPr>
+        <p:pic>
+          <p:nvPicPr>
+            <p:cNvPr id="16" name="Picture 15">
+              <a:extLst>
+                <a:ext uri="{FF2B5EF4-FFF2-40B4-BE49-F238E27FC236}">
+                  <a16:creationId xmlns:a16="http://schemas.microsoft.com/office/drawing/2014/main" id="{6ED8EFDC-4DF0-C0C0-634A-705600B0CC71}"/>
+                </a:ext>
+              </a:extLst>
+            </p:cNvPr>
+            <p:cNvPicPr>
+              <a:picLocks noChangeAspect="1"/>
+            </p:cNvPicPr>
+            <p:nvPr/>
+          </p:nvPicPr>
+          <p:blipFill>
+            <a:blip r:embed="rId3" cstate="print">
+              <a:extLst>
+                <a:ext uri="{28A0092B-C50C-407E-A947-70E740481C1C}">
+                  <a14:useLocalDpi xmlns:a14="http://schemas.microsoft.com/office/drawing/2010/main" val="0"/>
+                </a:ext>
+              </a:extLst>
+            </a:blip>
+            <a:stretch>
+              <a:fillRect/>
+            </a:stretch>
+          </p:blipFill>
+          <p:spPr>
+            <a:xfrm>
+              <a:off x="3719736" y="328470"/>
+              <a:ext cx="3030311" cy="392158"/>
+            </a:xfrm>
+            <a:prstGeom prst="rect">
+              <a:avLst/>
+            </a:prstGeom>
+          </p:spPr>
+        </p:pic>
+        <p:pic>
+          <p:nvPicPr>
+            <p:cNvPr id="17" name="Picture 16" descr="A blue text on a black background&#10;&#10;Description automatically generated with low confidence">
+              <a:extLst>
+                <a:ext uri="{FF2B5EF4-FFF2-40B4-BE49-F238E27FC236}">
+                  <a16:creationId xmlns:a16="http://schemas.microsoft.com/office/drawing/2014/main" id="{B9EEBFE4-EA73-2472-1C65-58DEC85CCE82}"/>
+                </a:ext>
+              </a:extLst>
+            </p:cNvPr>
+            <p:cNvPicPr>
+              <a:picLocks noChangeAspect="1"/>
+            </p:cNvPicPr>
+            <p:nvPr/>
+          </p:nvPicPr>
+          <p:blipFill rotWithShape="1">
+            <a:blip r:embed="rId4" cstate="print">
+              <a:extLst>
+                <a:ext uri="{28A0092B-C50C-407E-A947-70E740481C1C}">
+                  <a14:useLocalDpi xmlns:a14="http://schemas.microsoft.com/office/drawing/2010/main" val="0"/>
+                </a:ext>
+              </a:extLst>
+            </a:blip>
+            <a:srcRect l="28239" r="1"/>
+            <a:stretch/>
+          </p:blipFill>
+          <p:spPr>
+            <a:xfrm>
+              <a:off x="6816080" y="332656"/>
+              <a:ext cx="1658459" cy="392157"/>
+            </a:xfrm>
+            <a:prstGeom prst="rect">
+              <a:avLst/>
+            </a:prstGeom>
+          </p:spPr>
+        </p:pic>
+      </p:grpSp>
+      <p:grpSp>
+        <p:nvGrpSpPr>
+          <p:cNvPr id="2" name="Group 1">
+            <a:extLst>
+              <a:ext uri="{FF2B5EF4-FFF2-40B4-BE49-F238E27FC236}">
+                <a16:creationId xmlns:a16="http://schemas.microsoft.com/office/drawing/2014/main" id="{5BCA0B0B-98AE-59E1-915A-892F0D493E85}"/>
+              </a:ext>
+            </a:extLst>
+          </p:cNvPr>
+          <p:cNvGrpSpPr/>
+          <p:nvPr/>
+        </p:nvGrpSpPr>
+        <p:grpSpPr>
+          <a:xfrm>
+            <a:off x="5807968" y="6327364"/>
+            <a:ext cx="6264696" cy="381119"/>
+            <a:chOff x="5807968" y="6327364"/>
+            <a:chExt cx="6264696" cy="381119"/>
           </a:xfrm>
         </p:grpSpPr>
         <p:sp>
           <p:nvSpPr>
-            <p:cNvPr id="12" name="TextBox 11">
+            <p:cNvPr id="4" name="TextBox 3">
               <a:extLst>
                 <a:ext uri="{FF2B5EF4-FFF2-40B4-BE49-F238E27FC236}">
-                  <a16:creationId xmlns:a16="http://schemas.microsoft.com/office/drawing/2014/main" id="{62DBDB56-9D21-60BC-B6C6-E46E8A2C9620}"/>
+                  <a16:creationId xmlns:a16="http://schemas.microsoft.com/office/drawing/2014/main" id="{7E8F94B5-C57C-2FD3-B030-399C6EB7ABAD}"/>
                 </a:ext>
               </a:extLst>
             </p:cNvPr>
@@ -8542,8 +8668,8 @@
           </p:nvSpPr>
           <p:spPr>
             <a:xfrm>
-              <a:off x="5951984" y="6318094"/>
-              <a:ext cx="6130040" cy="381119"/>
+              <a:off x="5807968" y="6327364"/>
+              <a:ext cx="6264696" cy="381119"/>
             </a:xfrm>
             <a:prstGeom prst="roundRect">
               <a:avLst>
@@ -8564,18 +8690,18 @@
             <a:lstStyle/>
             <a:p>
               <a:r>
-                <a:rPr lang="en-GB" sz="1600" b="1" dirty="0">
+                <a:rPr lang="en-GB" sz="1600" dirty="0">
                   <a:solidFill>
                     <a:schemeClr val="bg1"/>
                   </a:solidFill>
-                  <a:latin typeface="Source Sans Pro" panose="020B0503030403020204" pitchFamily="34" charset="0"/>
-                  <a:ea typeface="Source Sans Pro" panose="020B0503030403020204" pitchFamily="34" charset="0"/>
+                  <a:latin typeface="Roboto" panose="02000000000000000000" pitchFamily="2" charset="0"/>
+                  <a:ea typeface="Roboto" panose="02000000000000000000" pitchFamily="2" charset="0"/>
                   <a:cs typeface="Segoe UI Semibold" panose="020B0702040204020203" pitchFamily="34" charset="0"/>
                 </a:rPr>
                 <a:t>Please Turn Off/Silence Your Devices </a:t>
               </a:r>
               <a:r>
-                <a:rPr lang="zh-TW" altLang="en-US" sz="1600" b="1" dirty="0">
+                <a:rPr lang="zh-TW" altLang="en-US" sz="1600" dirty="0">
                   <a:solidFill>
                     <a:schemeClr val="bg1"/>
                   </a:solidFill>
@@ -8584,7 +8710,7 @@
                 </a:rPr>
                 <a:t>請靜音或關閉所有電子設備</a:t>
               </a:r>
-              <a:endParaRPr lang="ja-JP" altLang="en-US" sz="1600" b="1" dirty="0">
+              <a:endParaRPr lang="ja-JP" altLang="en-US" sz="1600" dirty="0">
                 <a:solidFill>
                   <a:schemeClr val="bg1"/>
                 </a:solidFill>
@@ -8596,10 +8722,10 @@
         </p:sp>
         <p:pic>
           <p:nvPicPr>
-            <p:cNvPr id="13" name="Picture 12" descr="Shape&#10;&#10;Description automatically generated with low confidence">
+            <p:cNvPr id="5" name="Picture 4" descr="Shape&#10;&#10;Description automatically generated with low confidence">
               <a:extLst>
                 <a:ext uri="{FF2B5EF4-FFF2-40B4-BE49-F238E27FC236}">
-                  <a16:creationId xmlns:a16="http://schemas.microsoft.com/office/drawing/2014/main" id="{04537517-CAC7-D7A3-2323-B2EE8031BA44}"/>
+                  <a16:creationId xmlns:a16="http://schemas.microsoft.com/office/drawing/2014/main" id="{CCD3F959-C1F4-C385-A2F7-EF95F49873D3}"/>
                 </a:ext>
               </a:extLst>
             </p:cNvPr>
@@ -8609,12 +8735,12 @@
             <p:nvPr/>
           </p:nvPicPr>
           <p:blipFill>
-            <a:blip r:embed="rId3" cstate="print">
+            <a:blip r:embed="rId5" cstate="print">
               <a:lum bright="70000" contrast="-70000"/>
               <a:extLst>
                 <a:ext uri="{BEBA8EAE-BF5A-486C-A8C5-ECC9F3942E4B}">
                   <a14:imgProps xmlns:a14="http://schemas.microsoft.com/office/drawing/2010/main">
-                    <a14:imgLayer r:embed="rId4">
+                    <a14:imgLayer r:embed="rId6">
                       <a14:imgEffect>
                         <a14:artisticPhotocopy/>
                       </a14:imgEffect>
@@ -8650,98 +8776,6 @@
             <a:solidFill>
               <a:srgbClr val="004B8D"/>
             </a:solidFill>
-          </p:spPr>
-        </p:pic>
-      </p:grpSp>
-      <p:grpSp>
-        <p:nvGrpSpPr>
-          <p:cNvPr id="14" name="Group 13">
-            <a:extLst>
-              <a:ext uri="{FF2B5EF4-FFF2-40B4-BE49-F238E27FC236}">
-                <a16:creationId xmlns:a16="http://schemas.microsoft.com/office/drawing/2014/main" id="{3911759B-A7C6-8804-91FF-0F93B331B372}"/>
-              </a:ext>
-            </a:extLst>
-          </p:cNvPr>
-          <p:cNvGrpSpPr/>
-          <p:nvPr/>
-        </p:nvGrpSpPr>
-        <p:grpSpPr>
-          <a:xfrm>
-            <a:off x="191344" y="6381328"/>
-            <a:ext cx="3312368" cy="276107"/>
-            <a:chOff x="3719736" y="328470"/>
-            <a:chExt cx="4754803" cy="396343"/>
-          </a:xfrm>
-        </p:grpSpPr>
-        <p:pic>
-          <p:nvPicPr>
-            <p:cNvPr id="16" name="Picture 15">
-              <a:extLst>
-                <a:ext uri="{FF2B5EF4-FFF2-40B4-BE49-F238E27FC236}">
-                  <a16:creationId xmlns:a16="http://schemas.microsoft.com/office/drawing/2014/main" id="{6ED8EFDC-4DF0-C0C0-634A-705600B0CC71}"/>
-                </a:ext>
-              </a:extLst>
-            </p:cNvPr>
-            <p:cNvPicPr>
-              <a:picLocks noChangeAspect="1"/>
-            </p:cNvPicPr>
-            <p:nvPr/>
-          </p:nvPicPr>
-          <p:blipFill>
-            <a:blip r:embed="rId5" cstate="print">
-              <a:extLst>
-                <a:ext uri="{28A0092B-C50C-407E-A947-70E740481C1C}">
-                  <a14:useLocalDpi xmlns:a14="http://schemas.microsoft.com/office/drawing/2010/main" val="0"/>
-                </a:ext>
-              </a:extLst>
-            </a:blip>
-            <a:stretch>
-              <a:fillRect/>
-            </a:stretch>
-          </p:blipFill>
-          <p:spPr>
-            <a:xfrm>
-              <a:off x="3719736" y="328470"/>
-              <a:ext cx="3030311" cy="392158"/>
-            </a:xfrm>
-            <a:prstGeom prst="rect">
-              <a:avLst/>
-            </a:prstGeom>
-          </p:spPr>
-        </p:pic>
-        <p:pic>
-          <p:nvPicPr>
-            <p:cNvPr id="17" name="Picture 16" descr="A blue text on a black background&#10;&#10;Description automatically generated with low confidence">
-              <a:extLst>
-                <a:ext uri="{FF2B5EF4-FFF2-40B4-BE49-F238E27FC236}">
-                  <a16:creationId xmlns:a16="http://schemas.microsoft.com/office/drawing/2014/main" id="{B9EEBFE4-EA73-2472-1C65-58DEC85CCE82}"/>
-                </a:ext>
-              </a:extLst>
-            </p:cNvPr>
-            <p:cNvPicPr>
-              <a:picLocks noChangeAspect="1"/>
-            </p:cNvPicPr>
-            <p:nvPr/>
-          </p:nvPicPr>
-          <p:blipFill rotWithShape="1">
-            <a:blip r:embed="rId6" cstate="print">
-              <a:extLst>
-                <a:ext uri="{28A0092B-C50C-407E-A947-70E740481C1C}">
-                  <a14:useLocalDpi xmlns:a14="http://schemas.microsoft.com/office/drawing/2010/main" val="0"/>
-                </a:ext>
-              </a:extLst>
-            </a:blip>
-            <a:srcRect l="28239" r="1"/>
-            <a:stretch/>
-          </p:blipFill>
-          <p:spPr>
-            <a:xfrm>
-              <a:off x="6816080" y="332656"/>
-              <a:ext cx="1658459" cy="392157"/>
-            </a:xfrm>
-            <a:prstGeom prst="rect">
-              <a:avLst/>
-            </a:prstGeom>
           </p:spPr>
         </p:pic>
       </p:grpSp>
@@ -8839,8 +8873,8 @@
           <a:p>
             <a:pPr algn="ctr"/>
             <a:endParaRPr lang="en-GB" altLang="zh-TW" sz="3200" dirty="0">
-              <a:latin typeface="Source Sans Pro" panose="020B0503030403020204" pitchFamily="34" charset="0"/>
-              <a:ea typeface="Source Sans Pro" panose="020B0503030403020204" pitchFamily="34" charset="0"/>
+              <a:latin typeface="Roboto" panose="02000000000000000000" pitchFamily="2" charset="0"/>
+              <a:ea typeface="Roboto" panose="02000000000000000000" pitchFamily="2" charset="0"/>
             </a:endParaRPr>
           </a:p>
         </p:txBody>
@@ -8910,8 +8944,8 @@
             <a:pPr algn="ctr"/>
             <a:r>
               <a:rPr lang="en-GB" altLang="en-US" sz="2800" b="1" dirty="0">
-                <a:latin typeface="Source Sans Pro" panose="020B0503030403020204" pitchFamily="34" charset="0"/>
-                <a:ea typeface="Source Sans Pro" panose="020B0503030403020204" pitchFamily="34" charset="0"/>
+                <a:latin typeface="Roboto" panose="02000000000000000000" pitchFamily="2" charset="0"/>
+                <a:ea typeface="Roboto" panose="02000000000000000000" pitchFamily="2" charset="0"/>
                 <a:cs typeface="Segoe UI" panose="020B0502040204020203" pitchFamily="34" charset="0"/>
               </a:rPr>
               <a:t>PRAYER REQUESTS </a:t>
@@ -8954,7 +8988,7 @@
           <a:prstGeom prst="line">
             <a:avLst/>
           </a:prstGeom>
-          <a:ln w="38100">
+          <a:ln w="19050">
             <a:solidFill>
               <a:srgbClr val="004B8D"/>
             </a:solidFill>
@@ -8977,10 +9011,10 @@
       </p:cxnSp>
       <p:grpSp>
         <p:nvGrpSpPr>
-          <p:cNvPr id="9" name="Group 8">
+          <p:cNvPr id="14" name="Group 13">
             <a:extLst>
               <a:ext uri="{FF2B5EF4-FFF2-40B4-BE49-F238E27FC236}">
-                <a16:creationId xmlns:a16="http://schemas.microsoft.com/office/drawing/2014/main" id="{2EF57000-0D73-1528-7661-C8EF84183CF2}"/>
+                <a16:creationId xmlns:a16="http://schemas.microsoft.com/office/drawing/2014/main" id="{3D332699-DD03-D5CA-D3EC-0D5647EBBA57}"/>
               </a:ext>
             </a:extLst>
           </p:cNvPr>
@@ -8989,18 +9023,110 @@
         </p:nvGrpSpPr>
         <p:grpSpPr>
           <a:xfrm>
-            <a:off x="5951984" y="6318094"/>
-            <a:ext cx="6130040" cy="381119"/>
-            <a:chOff x="5951984" y="6318094"/>
-            <a:chExt cx="6130040" cy="381119"/>
+            <a:off x="191344" y="6381328"/>
+            <a:ext cx="3312368" cy="276107"/>
+            <a:chOff x="3719736" y="328470"/>
+            <a:chExt cx="4754803" cy="396343"/>
+          </a:xfrm>
+        </p:grpSpPr>
+        <p:pic>
+          <p:nvPicPr>
+            <p:cNvPr id="15" name="Picture 14">
+              <a:extLst>
+                <a:ext uri="{FF2B5EF4-FFF2-40B4-BE49-F238E27FC236}">
+                  <a16:creationId xmlns:a16="http://schemas.microsoft.com/office/drawing/2014/main" id="{C720BD72-31C1-03E9-CE55-B467603EDF59}"/>
+                </a:ext>
+              </a:extLst>
+            </p:cNvPr>
+            <p:cNvPicPr>
+              <a:picLocks noChangeAspect="1"/>
+            </p:cNvPicPr>
+            <p:nvPr/>
+          </p:nvPicPr>
+          <p:blipFill>
+            <a:blip r:embed="rId3" cstate="print">
+              <a:extLst>
+                <a:ext uri="{28A0092B-C50C-407E-A947-70E740481C1C}">
+                  <a14:useLocalDpi xmlns:a14="http://schemas.microsoft.com/office/drawing/2010/main" val="0"/>
+                </a:ext>
+              </a:extLst>
+            </a:blip>
+            <a:stretch>
+              <a:fillRect/>
+            </a:stretch>
+          </p:blipFill>
+          <p:spPr>
+            <a:xfrm>
+              <a:off x="3719736" y="328470"/>
+              <a:ext cx="3030311" cy="392158"/>
+            </a:xfrm>
+            <a:prstGeom prst="rect">
+              <a:avLst/>
+            </a:prstGeom>
+          </p:spPr>
+        </p:pic>
+        <p:pic>
+          <p:nvPicPr>
+            <p:cNvPr id="16" name="Picture 15" descr="A blue text on a black background&#10;&#10;Description automatically generated with low confidence">
+              <a:extLst>
+                <a:ext uri="{FF2B5EF4-FFF2-40B4-BE49-F238E27FC236}">
+                  <a16:creationId xmlns:a16="http://schemas.microsoft.com/office/drawing/2014/main" id="{8D11CD00-EB4D-CD0F-527B-4F26520F980F}"/>
+                </a:ext>
+              </a:extLst>
+            </p:cNvPr>
+            <p:cNvPicPr>
+              <a:picLocks noChangeAspect="1"/>
+            </p:cNvPicPr>
+            <p:nvPr/>
+          </p:nvPicPr>
+          <p:blipFill rotWithShape="1">
+            <a:blip r:embed="rId4" cstate="print">
+              <a:extLst>
+                <a:ext uri="{28A0092B-C50C-407E-A947-70E740481C1C}">
+                  <a14:useLocalDpi xmlns:a14="http://schemas.microsoft.com/office/drawing/2010/main" val="0"/>
+                </a:ext>
+              </a:extLst>
+            </a:blip>
+            <a:srcRect l="28239" r="1"/>
+            <a:stretch/>
+          </p:blipFill>
+          <p:spPr>
+            <a:xfrm>
+              <a:off x="6816080" y="332656"/>
+              <a:ext cx="1658459" cy="392157"/>
+            </a:xfrm>
+            <a:prstGeom prst="rect">
+              <a:avLst/>
+            </a:prstGeom>
+          </p:spPr>
+        </p:pic>
+      </p:grpSp>
+      <p:grpSp>
+        <p:nvGrpSpPr>
+          <p:cNvPr id="2" name="Group 1">
+            <a:extLst>
+              <a:ext uri="{FF2B5EF4-FFF2-40B4-BE49-F238E27FC236}">
+                <a16:creationId xmlns:a16="http://schemas.microsoft.com/office/drawing/2014/main" id="{5F6C5687-CD33-A6A1-A0DA-8DE6F87B2B5A}"/>
+              </a:ext>
+            </a:extLst>
+          </p:cNvPr>
+          <p:cNvGrpSpPr/>
+          <p:nvPr/>
+        </p:nvGrpSpPr>
+        <p:grpSpPr>
+          <a:xfrm>
+            <a:off x="5807968" y="6327364"/>
+            <a:ext cx="6264696" cy="381119"/>
+            <a:chOff x="5807968" y="6327364"/>
+            <a:chExt cx="6264696" cy="381119"/>
           </a:xfrm>
         </p:grpSpPr>
         <p:sp>
           <p:nvSpPr>
-            <p:cNvPr id="10" name="TextBox 9">
+            <p:cNvPr id="4" name="TextBox 3">
               <a:extLst>
                 <a:ext uri="{FF2B5EF4-FFF2-40B4-BE49-F238E27FC236}">
-                  <a16:creationId xmlns:a16="http://schemas.microsoft.com/office/drawing/2014/main" id="{B3CB4E3F-A187-31E5-11E8-7B677D21C0C6}"/>
+                  <a16:creationId xmlns:a16="http://schemas.microsoft.com/office/drawing/2014/main" id="{E6A1E79F-0D9F-0223-4FDD-F9A68520AA54}"/>
                 </a:ext>
               </a:extLst>
             </p:cNvPr>
@@ -9009,8 +9135,8 @@
           </p:nvSpPr>
           <p:spPr>
             <a:xfrm>
-              <a:off x="5951984" y="6318094"/>
-              <a:ext cx="6130040" cy="381119"/>
+              <a:off x="5807968" y="6327364"/>
+              <a:ext cx="6264696" cy="381119"/>
             </a:xfrm>
             <a:prstGeom prst="roundRect">
               <a:avLst>
@@ -9031,18 +9157,18 @@
             <a:lstStyle/>
             <a:p>
               <a:r>
-                <a:rPr lang="en-GB" sz="1600" b="1" dirty="0">
+                <a:rPr lang="en-GB" sz="1600" dirty="0">
                   <a:solidFill>
                     <a:schemeClr val="bg1"/>
                   </a:solidFill>
-                  <a:latin typeface="Source Sans Pro" panose="020B0503030403020204" pitchFamily="34" charset="0"/>
-                  <a:ea typeface="Source Sans Pro" panose="020B0503030403020204" pitchFamily="34" charset="0"/>
+                  <a:latin typeface="Roboto" panose="02000000000000000000" pitchFamily="2" charset="0"/>
+                  <a:ea typeface="Roboto" panose="02000000000000000000" pitchFamily="2" charset="0"/>
                   <a:cs typeface="Segoe UI Semibold" panose="020B0702040204020203" pitchFamily="34" charset="0"/>
                 </a:rPr>
                 <a:t>Please Turn Off/Silence Your Devices </a:t>
               </a:r>
               <a:r>
-                <a:rPr lang="zh-TW" altLang="en-US" sz="1600" b="1" dirty="0">
+                <a:rPr lang="zh-TW" altLang="en-US" sz="1600" dirty="0">
                   <a:solidFill>
                     <a:schemeClr val="bg1"/>
                   </a:solidFill>
@@ -9051,7 +9177,7 @@
                 </a:rPr>
                 <a:t>請靜音或關閉所有電子設備</a:t>
               </a:r>
-              <a:endParaRPr lang="ja-JP" altLang="en-US" sz="1600" b="1" dirty="0">
+              <a:endParaRPr lang="ja-JP" altLang="en-US" sz="1600" dirty="0">
                 <a:solidFill>
                   <a:schemeClr val="bg1"/>
                 </a:solidFill>
@@ -9063,10 +9189,10 @@
         </p:sp>
         <p:pic>
           <p:nvPicPr>
-            <p:cNvPr id="12" name="Picture 11" descr="Shape&#10;&#10;Description automatically generated with low confidence">
+            <p:cNvPr id="5" name="Picture 4" descr="Shape&#10;&#10;Description automatically generated with low confidence">
               <a:extLst>
                 <a:ext uri="{FF2B5EF4-FFF2-40B4-BE49-F238E27FC236}">
-                  <a16:creationId xmlns:a16="http://schemas.microsoft.com/office/drawing/2014/main" id="{6BDE222E-477F-DABC-688B-6CA8472B6B6D}"/>
+                  <a16:creationId xmlns:a16="http://schemas.microsoft.com/office/drawing/2014/main" id="{44EA96AE-5C19-DFB2-7B46-B9D6CFD2640A}"/>
                 </a:ext>
               </a:extLst>
             </p:cNvPr>
@@ -9076,12 +9202,12 @@
             <p:nvPr/>
           </p:nvPicPr>
           <p:blipFill>
-            <a:blip r:embed="rId3" cstate="print">
+            <a:blip r:embed="rId5" cstate="print">
               <a:lum bright="70000" contrast="-70000"/>
               <a:extLst>
                 <a:ext uri="{BEBA8EAE-BF5A-486C-A8C5-ECC9F3942E4B}">
                   <a14:imgProps xmlns:a14="http://schemas.microsoft.com/office/drawing/2010/main">
-                    <a14:imgLayer r:embed="rId4">
+                    <a14:imgLayer r:embed="rId6">
                       <a14:imgEffect>
                         <a14:artisticPhotocopy/>
                       </a14:imgEffect>
@@ -9117,98 +9243,6 @@
             <a:solidFill>
               <a:srgbClr val="004B8D"/>
             </a:solidFill>
-          </p:spPr>
-        </p:pic>
-      </p:grpSp>
-      <p:grpSp>
-        <p:nvGrpSpPr>
-          <p:cNvPr id="14" name="Group 13">
-            <a:extLst>
-              <a:ext uri="{FF2B5EF4-FFF2-40B4-BE49-F238E27FC236}">
-                <a16:creationId xmlns:a16="http://schemas.microsoft.com/office/drawing/2014/main" id="{3D332699-DD03-D5CA-D3EC-0D5647EBBA57}"/>
-              </a:ext>
-            </a:extLst>
-          </p:cNvPr>
-          <p:cNvGrpSpPr/>
-          <p:nvPr/>
-        </p:nvGrpSpPr>
-        <p:grpSpPr>
-          <a:xfrm>
-            <a:off x="191344" y="6381328"/>
-            <a:ext cx="3312368" cy="276107"/>
-            <a:chOff x="3719736" y="328470"/>
-            <a:chExt cx="4754803" cy="396343"/>
-          </a:xfrm>
-        </p:grpSpPr>
-        <p:pic>
-          <p:nvPicPr>
-            <p:cNvPr id="15" name="Picture 14">
-              <a:extLst>
-                <a:ext uri="{FF2B5EF4-FFF2-40B4-BE49-F238E27FC236}">
-                  <a16:creationId xmlns:a16="http://schemas.microsoft.com/office/drawing/2014/main" id="{C720BD72-31C1-03E9-CE55-B467603EDF59}"/>
-                </a:ext>
-              </a:extLst>
-            </p:cNvPr>
-            <p:cNvPicPr>
-              <a:picLocks noChangeAspect="1"/>
-            </p:cNvPicPr>
-            <p:nvPr/>
-          </p:nvPicPr>
-          <p:blipFill>
-            <a:blip r:embed="rId5" cstate="print">
-              <a:extLst>
-                <a:ext uri="{28A0092B-C50C-407E-A947-70E740481C1C}">
-                  <a14:useLocalDpi xmlns:a14="http://schemas.microsoft.com/office/drawing/2010/main" val="0"/>
-                </a:ext>
-              </a:extLst>
-            </a:blip>
-            <a:stretch>
-              <a:fillRect/>
-            </a:stretch>
-          </p:blipFill>
-          <p:spPr>
-            <a:xfrm>
-              <a:off x="3719736" y="328470"/>
-              <a:ext cx="3030311" cy="392158"/>
-            </a:xfrm>
-            <a:prstGeom prst="rect">
-              <a:avLst/>
-            </a:prstGeom>
-          </p:spPr>
-        </p:pic>
-        <p:pic>
-          <p:nvPicPr>
-            <p:cNvPr id="16" name="Picture 15" descr="A blue text on a black background&#10;&#10;Description automatically generated with low confidence">
-              <a:extLst>
-                <a:ext uri="{FF2B5EF4-FFF2-40B4-BE49-F238E27FC236}">
-                  <a16:creationId xmlns:a16="http://schemas.microsoft.com/office/drawing/2014/main" id="{8D11CD00-EB4D-CD0F-527B-4F26520F980F}"/>
-                </a:ext>
-              </a:extLst>
-            </p:cNvPr>
-            <p:cNvPicPr>
-              <a:picLocks noChangeAspect="1"/>
-            </p:cNvPicPr>
-            <p:nvPr/>
-          </p:nvPicPr>
-          <p:blipFill rotWithShape="1">
-            <a:blip r:embed="rId6" cstate="print">
-              <a:extLst>
-                <a:ext uri="{28A0092B-C50C-407E-A947-70E740481C1C}">
-                  <a14:useLocalDpi xmlns:a14="http://schemas.microsoft.com/office/drawing/2010/main" val="0"/>
-                </a:ext>
-              </a:extLst>
-            </a:blip>
-            <a:srcRect l="28239" r="1"/>
-            <a:stretch/>
-          </p:blipFill>
-          <p:spPr>
-            <a:xfrm>
-              <a:off x="6816080" y="332656"/>
-              <a:ext cx="1658459" cy="392157"/>
-            </a:xfrm>
-            <a:prstGeom prst="rect">
-              <a:avLst/>
-            </a:prstGeom>
           </p:spPr>
         </p:pic>
       </p:grpSp>
@@ -9301,8 +9335,8 @@
           <a:p>
             <a:pPr algn="ctr"/>
             <a:endParaRPr lang="en-GB" altLang="zh-TW" sz="3200" dirty="0">
-              <a:latin typeface="Source Sans Pro" panose="020B0503030403020204" pitchFamily="34" charset="0"/>
-              <a:ea typeface="Source Sans Pro" panose="020B0503030403020204" pitchFamily="34" charset="0"/>
+              <a:latin typeface="Roboto" panose="02000000000000000000" pitchFamily="2" charset="0"/>
+              <a:ea typeface="Roboto" panose="02000000000000000000" pitchFamily="2" charset="0"/>
             </a:endParaRPr>
           </a:p>
         </p:txBody>
@@ -9372,16 +9406,16 @@
             <a:pPr algn="ctr"/>
             <a:r>
               <a:rPr lang="en-GB" altLang="en-US" sz="2800" b="1" dirty="0">
-                <a:latin typeface="Source Sans Pro" panose="020B0503030403020204" pitchFamily="34" charset="0"/>
-                <a:ea typeface="Source Sans Pro" panose="020B0503030403020204" pitchFamily="34" charset="0"/>
+                <a:latin typeface="Roboto" panose="02000000000000000000" pitchFamily="2" charset="0"/>
+                <a:ea typeface="Roboto" panose="02000000000000000000" pitchFamily="2" charset="0"/>
                 <a:cs typeface="Segoe UI" panose="020B0502040204020203" pitchFamily="34" charset="0"/>
               </a:rPr>
               <a:t>ANNOUNCEMENTS</a:t>
             </a:r>
             <a:r>
               <a:rPr lang="en-GB" altLang="en-US" sz="2800" b="1" dirty="0">
-                <a:latin typeface="Source Sans Pro" panose="020B0503030403020204" pitchFamily="34" charset="0"/>
-                <a:ea typeface="Source Sans Pro" panose="020B0503030403020204" pitchFamily="34" charset="0"/>
+                <a:latin typeface="Roboto" panose="02000000000000000000" pitchFamily="2" charset="0"/>
+                <a:ea typeface="Roboto" panose="02000000000000000000" pitchFamily="2" charset="0"/>
               </a:rPr>
               <a:t> </a:t>
             </a:r>
@@ -9421,7 +9455,7 @@
           <a:prstGeom prst="line">
             <a:avLst/>
           </a:prstGeom>
-          <a:ln w="38100">
+          <a:ln w="19050">
             <a:solidFill>
               <a:srgbClr val="004B8D"/>
             </a:solidFill>
@@ -9444,10 +9478,10 @@
       </p:cxnSp>
       <p:grpSp>
         <p:nvGrpSpPr>
-          <p:cNvPr id="2" name="Group 1">
+          <p:cNvPr id="14" name="Group 13">
             <a:extLst>
               <a:ext uri="{FF2B5EF4-FFF2-40B4-BE49-F238E27FC236}">
-                <a16:creationId xmlns:a16="http://schemas.microsoft.com/office/drawing/2014/main" id="{25583494-A4A7-E1A3-30DD-55BE5A8F8715}"/>
+                <a16:creationId xmlns:a16="http://schemas.microsoft.com/office/drawing/2014/main" id="{CDB6F33C-2A84-5482-333C-60222242A092}"/>
               </a:ext>
             </a:extLst>
           </p:cNvPr>
@@ -9456,18 +9490,110 @@
         </p:nvGrpSpPr>
         <p:grpSpPr>
           <a:xfrm>
-            <a:off x="5951984" y="6318094"/>
-            <a:ext cx="6130040" cy="381119"/>
-            <a:chOff x="5951984" y="6318094"/>
-            <a:chExt cx="6130040" cy="381119"/>
+            <a:off x="191344" y="6381328"/>
+            <a:ext cx="3312368" cy="276107"/>
+            <a:chOff x="3719736" y="328470"/>
+            <a:chExt cx="4754803" cy="396343"/>
+          </a:xfrm>
+        </p:grpSpPr>
+        <p:pic>
+          <p:nvPicPr>
+            <p:cNvPr id="15" name="Picture 14">
+              <a:extLst>
+                <a:ext uri="{FF2B5EF4-FFF2-40B4-BE49-F238E27FC236}">
+                  <a16:creationId xmlns:a16="http://schemas.microsoft.com/office/drawing/2014/main" id="{DB3A339E-31CA-53FE-DCC3-F6516E0FFE54}"/>
+                </a:ext>
+              </a:extLst>
+            </p:cNvPr>
+            <p:cNvPicPr>
+              <a:picLocks noChangeAspect="1"/>
+            </p:cNvPicPr>
+            <p:nvPr/>
+          </p:nvPicPr>
+          <p:blipFill>
+            <a:blip r:embed="rId3" cstate="print">
+              <a:extLst>
+                <a:ext uri="{28A0092B-C50C-407E-A947-70E740481C1C}">
+                  <a14:useLocalDpi xmlns:a14="http://schemas.microsoft.com/office/drawing/2010/main" val="0"/>
+                </a:ext>
+              </a:extLst>
+            </a:blip>
+            <a:stretch>
+              <a:fillRect/>
+            </a:stretch>
+          </p:blipFill>
+          <p:spPr>
+            <a:xfrm>
+              <a:off x="3719736" y="328470"/>
+              <a:ext cx="3030311" cy="392158"/>
+            </a:xfrm>
+            <a:prstGeom prst="rect">
+              <a:avLst/>
+            </a:prstGeom>
+          </p:spPr>
+        </p:pic>
+        <p:pic>
+          <p:nvPicPr>
+            <p:cNvPr id="16" name="Picture 15" descr="A blue text on a black background&#10;&#10;Description automatically generated with low confidence">
+              <a:extLst>
+                <a:ext uri="{FF2B5EF4-FFF2-40B4-BE49-F238E27FC236}">
+                  <a16:creationId xmlns:a16="http://schemas.microsoft.com/office/drawing/2014/main" id="{D62A02D3-0C97-A2A6-7C37-D95C56FC8728}"/>
+                </a:ext>
+              </a:extLst>
+            </p:cNvPr>
+            <p:cNvPicPr>
+              <a:picLocks noChangeAspect="1"/>
+            </p:cNvPicPr>
+            <p:nvPr/>
+          </p:nvPicPr>
+          <p:blipFill rotWithShape="1">
+            <a:blip r:embed="rId4" cstate="print">
+              <a:extLst>
+                <a:ext uri="{28A0092B-C50C-407E-A947-70E740481C1C}">
+                  <a14:useLocalDpi xmlns:a14="http://schemas.microsoft.com/office/drawing/2010/main" val="0"/>
+                </a:ext>
+              </a:extLst>
+            </a:blip>
+            <a:srcRect l="28239" r="1"/>
+            <a:stretch/>
+          </p:blipFill>
+          <p:spPr>
+            <a:xfrm>
+              <a:off x="6816080" y="332656"/>
+              <a:ext cx="1658459" cy="392157"/>
+            </a:xfrm>
+            <a:prstGeom prst="rect">
+              <a:avLst/>
+            </a:prstGeom>
+          </p:spPr>
+        </p:pic>
+      </p:grpSp>
+      <p:grpSp>
+        <p:nvGrpSpPr>
+          <p:cNvPr id="6" name="Group 5">
+            <a:extLst>
+              <a:ext uri="{FF2B5EF4-FFF2-40B4-BE49-F238E27FC236}">
+                <a16:creationId xmlns:a16="http://schemas.microsoft.com/office/drawing/2014/main" id="{B9011AB9-798B-3EEF-D4DB-3B6D008A25B8}"/>
+              </a:ext>
+            </a:extLst>
+          </p:cNvPr>
+          <p:cNvGrpSpPr/>
+          <p:nvPr/>
+        </p:nvGrpSpPr>
+        <p:grpSpPr>
+          <a:xfrm>
+            <a:off x="5807968" y="6327364"/>
+            <a:ext cx="6264696" cy="381119"/>
+            <a:chOff x="5807968" y="6327364"/>
+            <a:chExt cx="6264696" cy="381119"/>
           </a:xfrm>
         </p:grpSpPr>
         <p:sp>
           <p:nvSpPr>
-            <p:cNvPr id="3" name="TextBox 2">
+            <p:cNvPr id="7" name="TextBox 6">
               <a:extLst>
                 <a:ext uri="{FF2B5EF4-FFF2-40B4-BE49-F238E27FC236}">
-                  <a16:creationId xmlns:a16="http://schemas.microsoft.com/office/drawing/2014/main" id="{CA665FB4-42D0-C154-F14A-E1EE732FE24A}"/>
+                  <a16:creationId xmlns:a16="http://schemas.microsoft.com/office/drawing/2014/main" id="{36536680-46C7-1F27-4772-238E5283DEF0}"/>
                 </a:ext>
               </a:extLst>
             </p:cNvPr>
@@ -9476,8 +9602,8 @@
           </p:nvSpPr>
           <p:spPr>
             <a:xfrm>
-              <a:off x="5951984" y="6318094"/>
-              <a:ext cx="6130040" cy="381119"/>
+              <a:off x="5807968" y="6327364"/>
+              <a:ext cx="6264696" cy="381119"/>
             </a:xfrm>
             <a:prstGeom prst="roundRect">
               <a:avLst>
@@ -9498,18 +9624,18 @@
             <a:lstStyle/>
             <a:p>
               <a:r>
-                <a:rPr lang="en-GB" sz="1600" b="1" dirty="0">
+                <a:rPr lang="en-GB" sz="1600" dirty="0">
                   <a:solidFill>
                     <a:schemeClr val="bg1"/>
                   </a:solidFill>
-                  <a:latin typeface="Source Sans Pro" panose="020B0503030403020204" pitchFamily="34" charset="0"/>
-                  <a:ea typeface="Source Sans Pro" panose="020B0503030403020204" pitchFamily="34" charset="0"/>
+                  <a:latin typeface="Roboto" panose="02000000000000000000" pitchFamily="2" charset="0"/>
+                  <a:ea typeface="Roboto" panose="02000000000000000000" pitchFamily="2" charset="0"/>
                   <a:cs typeface="Segoe UI Semibold" panose="020B0702040204020203" pitchFamily="34" charset="0"/>
                 </a:rPr>
                 <a:t>Please Turn Off/Silence Your Devices </a:t>
               </a:r>
               <a:r>
-                <a:rPr lang="zh-TW" altLang="en-US" sz="1600" b="1" dirty="0">
+                <a:rPr lang="zh-TW" altLang="en-US" sz="1600" dirty="0">
                   <a:solidFill>
                     <a:schemeClr val="bg1"/>
                   </a:solidFill>
@@ -9518,7 +9644,7 @@
                 </a:rPr>
                 <a:t>請靜音或關閉所有電子設備</a:t>
               </a:r>
-              <a:endParaRPr lang="ja-JP" altLang="en-US" sz="1600" b="1" dirty="0">
+              <a:endParaRPr lang="ja-JP" altLang="en-US" sz="1600" dirty="0">
                 <a:solidFill>
                   <a:schemeClr val="bg1"/>
                 </a:solidFill>
@@ -9530,10 +9656,10 @@
         </p:sp>
         <p:pic>
           <p:nvPicPr>
-            <p:cNvPr id="4" name="Picture 3" descr="Shape&#10;&#10;Description automatically generated with low confidence">
+            <p:cNvPr id="8" name="Picture 7" descr="Shape&#10;&#10;Description automatically generated with low confidence">
               <a:extLst>
                 <a:ext uri="{FF2B5EF4-FFF2-40B4-BE49-F238E27FC236}">
-                  <a16:creationId xmlns:a16="http://schemas.microsoft.com/office/drawing/2014/main" id="{0AD2B9C4-B659-F256-54CB-94DCC920968A}"/>
+                  <a16:creationId xmlns:a16="http://schemas.microsoft.com/office/drawing/2014/main" id="{05257657-1A92-9166-BE9F-6CE3263CC690}"/>
                 </a:ext>
               </a:extLst>
             </p:cNvPr>
@@ -9543,12 +9669,12 @@
             <p:nvPr/>
           </p:nvPicPr>
           <p:blipFill>
-            <a:blip r:embed="rId3" cstate="print">
+            <a:blip r:embed="rId5" cstate="print">
               <a:lum bright="70000" contrast="-70000"/>
               <a:extLst>
                 <a:ext uri="{BEBA8EAE-BF5A-486C-A8C5-ECC9F3942E4B}">
                   <a14:imgProps xmlns:a14="http://schemas.microsoft.com/office/drawing/2010/main">
-                    <a14:imgLayer r:embed="rId4">
+                    <a14:imgLayer r:embed="rId6">
                       <a14:imgEffect>
                         <a14:artisticPhotocopy/>
                       </a14:imgEffect>
@@ -9587,98 +9713,6 @@
           </p:spPr>
         </p:pic>
       </p:grpSp>
-      <p:grpSp>
-        <p:nvGrpSpPr>
-          <p:cNvPr id="14" name="Group 13">
-            <a:extLst>
-              <a:ext uri="{FF2B5EF4-FFF2-40B4-BE49-F238E27FC236}">
-                <a16:creationId xmlns:a16="http://schemas.microsoft.com/office/drawing/2014/main" id="{CDB6F33C-2A84-5482-333C-60222242A092}"/>
-              </a:ext>
-            </a:extLst>
-          </p:cNvPr>
-          <p:cNvGrpSpPr/>
-          <p:nvPr/>
-        </p:nvGrpSpPr>
-        <p:grpSpPr>
-          <a:xfrm>
-            <a:off x="191344" y="6381328"/>
-            <a:ext cx="3312368" cy="276107"/>
-            <a:chOff x="3719736" y="328470"/>
-            <a:chExt cx="4754803" cy="396343"/>
-          </a:xfrm>
-        </p:grpSpPr>
-        <p:pic>
-          <p:nvPicPr>
-            <p:cNvPr id="15" name="Picture 14">
-              <a:extLst>
-                <a:ext uri="{FF2B5EF4-FFF2-40B4-BE49-F238E27FC236}">
-                  <a16:creationId xmlns:a16="http://schemas.microsoft.com/office/drawing/2014/main" id="{DB3A339E-31CA-53FE-DCC3-F6516E0FFE54}"/>
-                </a:ext>
-              </a:extLst>
-            </p:cNvPr>
-            <p:cNvPicPr>
-              <a:picLocks noChangeAspect="1"/>
-            </p:cNvPicPr>
-            <p:nvPr/>
-          </p:nvPicPr>
-          <p:blipFill>
-            <a:blip r:embed="rId5" cstate="print">
-              <a:extLst>
-                <a:ext uri="{28A0092B-C50C-407E-A947-70E740481C1C}">
-                  <a14:useLocalDpi xmlns:a14="http://schemas.microsoft.com/office/drawing/2010/main" val="0"/>
-                </a:ext>
-              </a:extLst>
-            </a:blip>
-            <a:stretch>
-              <a:fillRect/>
-            </a:stretch>
-          </p:blipFill>
-          <p:spPr>
-            <a:xfrm>
-              <a:off x="3719736" y="328470"/>
-              <a:ext cx="3030311" cy="392158"/>
-            </a:xfrm>
-            <a:prstGeom prst="rect">
-              <a:avLst/>
-            </a:prstGeom>
-          </p:spPr>
-        </p:pic>
-        <p:pic>
-          <p:nvPicPr>
-            <p:cNvPr id="16" name="Picture 15" descr="A blue text on a black background&#10;&#10;Description automatically generated with low confidence">
-              <a:extLst>
-                <a:ext uri="{FF2B5EF4-FFF2-40B4-BE49-F238E27FC236}">
-                  <a16:creationId xmlns:a16="http://schemas.microsoft.com/office/drawing/2014/main" id="{D62A02D3-0C97-A2A6-7C37-D95C56FC8728}"/>
-                </a:ext>
-              </a:extLst>
-            </p:cNvPr>
-            <p:cNvPicPr>
-              <a:picLocks noChangeAspect="1"/>
-            </p:cNvPicPr>
-            <p:nvPr/>
-          </p:nvPicPr>
-          <p:blipFill rotWithShape="1">
-            <a:blip r:embed="rId6" cstate="print">
-              <a:extLst>
-                <a:ext uri="{28A0092B-C50C-407E-A947-70E740481C1C}">
-                  <a14:useLocalDpi xmlns:a14="http://schemas.microsoft.com/office/drawing/2010/main" val="0"/>
-                </a:ext>
-              </a:extLst>
-            </a:blip>
-            <a:srcRect l="28239" r="1"/>
-            <a:stretch/>
-          </p:blipFill>
-          <p:spPr>
-            <a:xfrm>
-              <a:off x="6816080" y="332656"/>
-              <a:ext cx="1658459" cy="392157"/>
-            </a:xfrm>
-            <a:prstGeom prst="rect">
-              <a:avLst/>
-            </a:prstGeom>
-          </p:spPr>
-        </p:pic>
-      </p:grpSp>
     </p:spTree>
     <p:extLst>
       <p:ext uri="{BB962C8B-B14F-4D97-AF65-F5344CB8AC3E}">
@@ -9723,8 +9757,8 @@
         </p:nvSpPr>
         <p:spPr>
           <a:xfrm>
-            <a:off x="488682" y="2852936"/>
-            <a:ext cx="5118640" cy="979242"/>
+            <a:off x="488682" y="2844985"/>
+            <a:ext cx="5118640" cy="995144"/>
           </a:xfrm>
           <a:prstGeom prst="rect">
             <a:avLst/>
@@ -9744,7 +9778,8 @@
             </a:pPr>
             <a:r>
               <a:rPr lang="en-GB" sz="4400" dirty="0">
-                <a:latin typeface="Century Gothic" panose="020B0502020202020204" pitchFamily="34" charset="0"/>
+                <a:latin typeface="Roboto" panose="02000000000000000000" pitchFamily="2" charset="0"/>
+                <a:ea typeface="Roboto" panose="02000000000000000000" pitchFamily="2" charset="0"/>
                 <a:cs typeface="Segoe UI" panose="020B0502040204020203" pitchFamily="34" charset="0"/>
               </a:rPr>
               <a:t>Hymn No.</a:t>
@@ -9787,8 +9822,8 @@
             </a:pPr>
             <a:r>
               <a:rPr lang="en-GB" sz="2400" dirty="0">
-                <a:latin typeface="Source Sans Pro" panose="020B0503030403020204" pitchFamily="34" charset="0"/>
-                <a:ea typeface="Source Sans Pro" panose="020B0503030403020204" pitchFamily="34" charset="0"/>
+                <a:latin typeface="Roboto" panose="02000000000000000000" pitchFamily="2" charset="0"/>
+                <a:ea typeface="Roboto" panose="02000000000000000000" pitchFamily="2" charset="0"/>
               </a:rPr>
               <a:t>-</a:t>
             </a:r>
@@ -9830,8 +9865,8 @@
             </a:pPr>
             <a:r>
               <a:rPr lang="en-GB" sz="2400" dirty="0">
-                <a:latin typeface="Source Sans Pro" panose="020B0503030403020204" pitchFamily="34" charset="0"/>
-                <a:ea typeface="Source Sans Pro" panose="020B0503030403020204" pitchFamily="34" charset="0"/>
+                <a:latin typeface="Roboto" panose="02000000000000000000" pitchFamily="2" charset="0"/>
+                <a:ea typeface="Roboto" panose="02000000000000000000" pitchFamily="2" charset="0"/>
               </a:rPr>
               <a:t>-</a:t>
             </a:r>
@@ -9903,8 +9938,8 @@
             <a:pPr algn="ctr"/>
             <a:r>
               <a:rPr lang="en-GB" altLang="en-US" sz="2800" b="1" dirty="0">
-                <a:latin typeface="Source Sans Pro" panose="020B0503030403020204" pitchFamily="34" charset="0"/>
-                <a:ea typeface="Source Sans Pro" panose="020B0503030403020204" pitchFamily="34" charset="0"/>
+                <a:latin typeface="Roboto" panose="02000000000000000000" pitchFamily="2" charset="0"/>
+                <a:ea typeface="Roboto" panose="02000000000000000000" pitchFamily="2" charset="0"/>
                 <a:cs typeface="Segoe UI" panose="020B0502040204020203" pitchFamily="34" charset="0"/>
               </a:rPr>
               <a:t>HOLY COMMUNION </a:t>
@@ -9958,11 +9993,22 @@
                 <a:solidFill>
                   <a:srgbClr val="004D91"/>
                 </a:solidFill>
+                <a:latin typeface="Roboto" panose="02000000000000000000" pitchFamily="2" charset="0"/>
+                <a:ea typeface="Roboto" panose="02000000000000000000" pitchFamily="2" charset="0"/>
+                <a:cs typeface="Segoe UI" panose="020B0502040204020203" pitchFamily="34" charset="0"/>
+              </a:rPr>
+              <a:t>HYMNS</a:t>
+            </a:r>
+            <a:r>
+              <a:rPr lang="en-GB" sz="3200" b="1" dirty="0">
+                <a:solidFill>
+                  <a:srgbClr val="004D91"/>
+                </a:solidFill>
                 <a:latin typeface="Source Sans Pro" panose="020B0503030403020204" pitchFamily="34" charset="0"/>
                 <a:ea typeface="Source Sans Pro" panose="020B0503030403020204" pitchFamily="34" charset="0"/>
                 <a:cs typeface="Segoe UI" panose="020B0502040204020203" pitchFamily="34" charset="0"/>
               </a:rPr>
-              <a:t>HYMNS </a:t>
+              <a:t> </a:t>
             </a:r>
             <a:r>
               <a:rPr lang="ja-JP" altLang="en-US" sz="3200" b="1" dirty="0">
@@ -10027,8 +10073,8 @@
                 <a:solidFill>
                   <a:srgbClr val="004D91"/>
                 </a:solidFill>
-                <a:latin typeface="Source Sans Pro" panose="020B0503030403020204" pitchFamily="34" charset="0"/>
-                <a:ea typeface="Source Sans Pro" panose="020B0503030403020204" pitchFamily="34" charset="0"/>
+                <a:latin typeface="Roboto" panose="02000000000000000000" pitchFamily="2" charset="0"/>
+                <a:ea typeface="Roboto" panose="02000000000000000000" pitchFamily="2" charset="0"/>
                 <a:cs typeface="Segoe UI" panose="020B0502040204020203" pitchFamily="34" charset="0"/>
               </a:rPr>
               <a:t>BREAD</a:t>
@@ -10074,8 +10120,8 @@
                 <a:solidFill>
                   <a:srgbClr val="004D91"/>
                 </a:solidFill>
-                <a:latin typeface="Source Sans Pro" panose="020B0503030403020204" pitchFamily="34" charset="0"/>
-                <a:ea typeface="Source Sans Pro" panose="020B0503030403020204" pitchFamily="34" charset="0"/>
+                <a:latin typeface="Roboto" panose="02000000000000000000" pitchFamily="2" charset="0"/>
+                <a:ea typeface="Roboto" panose="02000000000000000000" pitchFamily="2" charset="0"/>
                 <a:cs typeface="Segoe UI" panose="020B0502040204020203" pitchFamily="34" charset="0"/>
               </a:rPr>
               <a:t>CUP</a:t>
@@ -10105,7 +10151,7 @@
           <a:prstGeom prst="line">
             <a:avLst/>
           </a:prstGeom>
-          <a:ln w="38100">
+          <a:ln w="19050">
             <a:solidFill>
               <a:srgbClr val="004B8D"/>
             </a:solidFill>
@@ -10148,7 +10194,7 @@
           <a:prstGeom prst="line">
             <a:avLst/>
           </a:prstGeom>
-          <a:ln w="38100">
+          <a:ln w="19050">
             <a:solidFill>
               <a:srgbClr val="004B8D"/>
             </a:solidFill>
@@ -10299,8 +10345,8 @@
         </p:nvSpPr>
         <p:spPr>
           <a:xfrm>
-            <a:off x="0" y="116632"/>
-            <a:ext cx="12191999" cy="954107"/>
+            <a:off x="-1" y="213676"/>
+            <a:ext cx="12191999" cy="892552"/>
           </a:xfrm>
           <a:prstGeom prst="rect">
             <a:avLst/>
@@ -10315,27 +10361,51 @@
           <a:p>
             <a:pPr algn="ctr"/>
             <a:r>
-              <a:rPr lang="en-GB" altLang="en-US" sz="2800" b="1" dirty="0">
-                <a:latin typeface="Source Sans Pro" panose="020B0503030403020204" pitchFamily="34" charset="0"/>
-                <a:ea typeface="Source Sans Pro" panose="020B0503030403020204" pitchFamily="34" charset="0"/>
+              <a:rPr lang="en-GB" altLang="en-US" sz="2400" b="1" dirty="0">
+                <a:solidFill>
+                  <a:schemeClr val="tx1">
+                    <a:lumMod val="85000"/>
+                    <a:lumOff val="15000"/>
+                  </a:schemeClr>
+                </a:solidFill>
+                <a:latin typeface="Roboto" panose="02000000000000000000" pitchFamily="2" charset="0"/>
+                <a:ea typeface="Roboto" panose="02000000000000000000" pitchFamily="2" charset="0"/>
                 <a:cs typeface="Segoe UI" panose="020B0502040204020203" pitchFamily="34" charset="0"/>
               </a:rPr>
-              <a:t>Welcome To True Jesus Church , Please Join Us In Prayer </a:t>
+              <a:t>WELCOME TO TRUE JESUS CHURCH, PLEASE JOIN US IN PRAYER</a:t>
             </a:r>
             <a:br>
               <a:rPr lang="en-GB" altLang="en-US" sz="2800" b="1" dirty="0">
+                <a:solidFill>
+                  <a:schemeClr val="tx1">
+                    <a:lumMod val="85000"/>
+                    <a:lumOff val="15000"/>
+                  </a:schemeClr>
+                </a:solidFill>
                 <a:latin typeface="Source Sans Pro" panose="020B0503030403020204" pitchFamily="34" charset="0"/>
                 <a:ea typeface="Source Sans Pro" panose="020B0503030403020204" pitchFamily="34" charset="0"/>
               </a:rPr>
             </a:br>
             <a:r>
               <a:rPr lang="zh-TW" altLang="en-US" sz="2800" b="1" dirty="0">
+                <a:solidFill>
+                  <a:schemeClr val="tx1">
+                    <a:lumMod val="85000"/>
+                    <a:lumOff val="15000"/>
+                  </a:schemeClr>
+                </a:solidFill>
                 <a:latin typeface="Source Sans Pro" panose="020B0503030403020204" pitchFamily="34" charset="0"/>
                 <a:ea typeface="Microsoft JhengHei" panose="020B0604030504040204" pitchFamily="34" charset="-120"/>
               </a:rPr>
               <a:t>歡迎光臨真耶穌教會，請跟我們一起禱告</a:t>
             </a:r>
             <a:endParaRPr lang="en-GB" sz="2800" b="1" dirty="0">
+              <a:solidFill>
+                <a:schemeClr val="tx1">
+                  <a:lumMod val="85000"/>
+                  <a:lumOff val="15000"/>
+                </a:schemeClr>
+              </a:solidFill>
               <a:latin typeface="Source Sans Pro" panose="020B0503030403020204" pitchFamily="34" charset="0"/>
               <a:ea typeface="Source Sans Pro" panose="020B0503030403020204" pitchFamily="34" charset="0"/>
             </a:endParaRPr>
@@ -10374,8 +10444,8 @@
             <a:r>
               <a:rPr lang="en-GB" sz="2600" i="0" dirty="0">
                 <a:effectLst/>
-                <a:latin typeface="Source Sans Pro Semibold" panose="020B0603030403020204" pitchFamily="34" charset="0"/>
-                <a:ea typeface="Source Sans Pro Semibold" panose="020B0603030403020204" pitchFamily="34" charset="0"/>
+                <a:latin typeface="Roboto" panose="02000000000000000000" pitchFamily="2" charset="0"/>
+                <a:ea typeface="Roboto" panose="02000000000000000000" pitchFamily="2" charset="0"/>
               </a:rPr>
               <a:t>Kneel with humility.</a:t>
             </a:r>
@@ -10385,8 +10455,8 @@
             <a:r>
               <a:rPr lang="en-GB" sz="2600" i="0" dirty="0">
                 <a:effectLst/>
-                <a:latin typeface="Source Sans Pro Semibold" panose="020B0603030403020204" pitchFamily="34" charset="0"/>
-                <a:ea typeface="Source Sans Pro Semibold" panose="020B0603030403020204" pitchFamily="34" charset="0"/>
+                <a:latin typeface="Roboto" panose="02000000000000000000" pitchFamily="2" charset="0"/>
+                <a:ea typeface="Roboto" panose="02000000000000000000" pitchFamily="2" charset="0"/>
               </a:rPr>
               <a:t>Close your eyes to concentrate.</a:t>
             </a:r>
@@ -10396,8 +10466,8 @@
             <a:r>
               <a:rPr lang="en-GB" sz="2600" i="0" dirty="0">
                 <a:effectLst/>
-                <a:latin typeface="Source Sans Pro Semibold" panose="020B0603030403020204" pitchFamily="34" charset="0"/>
-                <a:ea typeface="Source Sans Pro Semibold" panose="020B0603030403020204" pitchFamily="34" charset="0"/>
+                <a:latin typeface="Roboto" panose="02000000000000000000" pitchFamily="2" charset="0"/>
+                <a:ea typeface="Roboto" panose="02000000000000000000" pitchFamily="2" charset="0"/>
               </a:rPr>
               <a:t>Begin by saying, </a:t>
             </a:r>
@@ -10407,8 +10477,8 @@
                   <a:srgbClr val="004D91"/>
                 </a:solidFill>
                 <a:effectLst/>
-                <a:latin typeface="Source Sans Pro" panose="020B0503030403020204" pitchFamily="34" charset="0"/>
-                <a:ea typeface="Source Sans Pro" panose="020B0503030403020204" pitchFamily="34" charset="0"/>
+                <a:latin typeface="Roboto" panose="02000000000000000000" pitchFamily="2" charset="0"/>
+                <a:ea typeface="Roboto" panose="02000000000000000000" pitchFamily="2" charset="0"/>
               </a:rPr>
               <a:t>“In the name of the Lord Jesus Christ I pray.”</a:t>
             </a:r>
@@ -10417,8 +10487,8 @@
                 <a:srgbClr val="004D91"/>
               </a:solidFill>
               <a:effectLst/>
-              <a:latin typeface="Source Sans Pro" panose="020B0503030403020204" pitchFamily="34" charset="0"/>
-              <a:ea typeface="Source Sans Pro" panose="020B0503030403020204" pitchFamily="34" charset="0"/>
+              <a:latin typeface="Roboto" panose="02000000000000000000" pitchFamily="2" charset="0"/>
+              <a:ea typeface="Roboto" panose="02000000000000000000" pitchFamily="2" charset="0"/>
             </a:endParaRPr>
           </a:p>
           <a:p>
@@ -10426,8 +10496,8 @@
             <a:r>
               <a:rPr lang="en-GB" sz="2600" i="0" dirty="0">
                 <a:effectLst/>
-                <a:latin typeface="Source Sans Pro Semibold" panose="020B0603030403020204" pitchFamily="34" charset="0"/>
-                <a:ea typeface="Source Sans Pro Semibold" panose="020B0603030403020204" pitchFamily="34" charset="0"/>
+                <a:latin typeface="Roboto" panose="02000000000000000000" pitchFamily="2" charset="0"/>
+                <a:ea typeface="Roboto" panose="02000000000000000000" pitchFamily="2" charset="0"/>
               </a:rPr>
               <a:t>Praise the Lord by saying, </a:t>
             </a:r>
@@ -10437,8 +10507,8 @@
                   <a:srgbClr val="004D91"/>
                 </a:solidFill>
                 <a:effectLst/>
-                <a:latin typeface="Source Sans Pro" panose="020B0503030403020204" pitchFamily="34" charset="0"/>
-                <a:ea typeface="Source Sans Pro" panose="020B0503030403020204" pitchFamily="34" charset="0"/>
+                <a:latin typeface="Roboto" panose="02000000000000000000" pitchFamily="2" charset="0"/>
+                <a:ea typeface="Roboto" panose="02000000000000000000" pitchFamily="2" charset="0"/>
               </a:rPr>
               <a:t>“Hallelujah!”</a:t>
             </a:r>
@@ -10447,8 +10517,8 @@
                 <a:srgbClr val="004D91"/>
               </a:solidFill>
               <a:effectLst/>
-              <a:latin typeface="Source Sans Pro" panose="020B0503030403020204" pitchFamily="34" charset="0"/>
-              <a:ea typeface="Source Sans Pro" panose="020B0503030403020204" pitchFamily="34" charset="0"/>
+              <a:latin typeface="Roboto" panose="02000000000000000000" pitchFamily="2" charset="0"/>
+              <a:ea typeface="Roboto" panose="02000000000000000000" pitchFamily="2" charset="0"/>
             </a:endParaRPr>
           </a:p>
           <a:p>
@@ -10456,8 +10526,8 @@
             <a:r>
               <a:rPr lang="en-GB" sz="2600" i="0" dirty="0">
                 <a:effectLst/>
-                <a:latin typeface="Source Sans Pro Semibold" panose="020B0603030403020204" pitchFamily="34" charset="0"/>
-                <a:ea typeface="Source Sans Pro Semibold" panose="020B0603030403020204" pitchFamily="34" charset="0"/>
+                <a:latin typeface="Roboto" panose="02000000000000000000" pitchFamily="2" charset="0"/>
+                <a:ea typeface="Roboto" panose="02000000000000000000" pitchFamily="2" charset="0"/>
               </a:rPr>
               <a:t>Spend time to speak with God from your heart and ask Him to fill you with the Holy Spirit.</a:t>
             </a:r>
@@ -10467,8 +10537,8 @@
             <a:r>
               <a:rPr lang="en-GB" sz="2600" i="0" dirty="0">
                 <a:effectLst/>
-                <a:latin typeface="Source Sans Pro Semibold" panose="020B0603030403020204" pitchFamily="34" charset="0"/>
-                <a:ea typeface="Source Sans Pro Semibold" panose="020B0603030403020204" pitchFamily="34" charset="0"/>
+                <a:latin typeface="Roboto" panose="02000000000000000000" pitchFamily="2" charset="0"/>
+                <a:ea typeface="Roboto" panose="02000000000000000000" pitchFamily="2" charset="0"/>
               </a:rPr>
               <a:t>Conclude your prayer with, </a:t>
             </a:r>
@@ -10478,8 +10548,8 @@
                   <a:srgbClr val="004D91"/>
                 </a:solidFill>
                 <a:effectLst/>
-                <a:latin typeface="Source Sans Pro" panose="020B0503030403020204" pitchFamily="34" charset="0"/>
-                <a:ea typeface="Source Sans Pro" panose="020B0503030403020204" pitchFamily="34" charset="0"/>
+                <a:latin typeface="Roboto" panose="02000000000000000000" pitchFamily="2" charset="0"/>
+                <a:ea typeface="Roboto" panose="02000000000000000000" pitchFamily="2" charset="0"/>
               </a:rPr>
               <a:t>“Amen.”</a:t>
             </a:r>
@@ -10488,8 +10558,8 @@
                 <a:srgbClr val="004D91"/>
               </a:solidFill>
               <a:effectLst/>
-              <a:latin typeface="Source Sans Pro" panose="020B0503030403020204" pitchFamily="34" charset="0"/>
-              <a:ea typeface="Source Sans Pro" panose="020B0503030403020204" pitchFamily="34" charset="0"/>
+              <a:latin typeface="Roboto" panose="02000000000000000000" pitchFamily="2" charset="0"/>
+              <a:ea typeface="Roboto" panose="02000000000000000000" pitchFamily="2" charset="0"/>
             </a:endParaRPr>
           </a:p>
         </p:txBody>
@@ -10524,7 +10594,7 @@
           <a:p>
             <a:pPr algn="l"/>
             <a:r>
-              <a:rPr lang="zh-TW" altLang="en-US" sz="3200" b="1" i="0" dirty="0">
+              <a:rPr lang="zh-TW" altLang="en-US" sz="3200" i="0" dirty="0">
                 <a:effectLst/>
                 <a:latin typeface="Microsoft JhengHei" panose="020B0604030504040204" pitchFamily="34" charset="-120"/>
                 <a:ea typeface="Microsoft JhengHei" panose="020B0604030504040204" pitchFamily="34" charset="-120"/>
@@ -10535,7 +10605,7 @@
           <a:p>
             <a:pPr algn="l"/>
             <a:r>
-              <a:rPr lang="zh-TW" altLang="en-US" sz="3200" b="1" i="0" dirty="0">
+              <a:rPr lang="zh-TW" altLang="en-US" sz="3200" i="0" dirty="0">
                 <a:effectLst/>
                 <a:latin typeface="Microsoft JhengHei" panose="020B0604030504040204" pitchFamily="34" charset="-120"/>
                 <a:ea typeface="Microsoft JhengHei" panose="020B0604030504040204" pitchFamily="34" charset="-120"/>
@@ -10546,7 +10616,7 @@
           <a:p>
             <a:pPr algn="l"/>
             <a:r>
-              <a:rPr lang="zh-TW" altLang="en-US" sz="3200" b="1" i="0" dirty="0">
+              <a:rPr lang="zh-TW" altLang="en-US" sz="3200" i="0" dirty="0">
                 <a:effectLst/>
                 <a:latin typeface="Microsoft JhengHei" panose="020B0604030504040204" pitchFamily="34" charset="-120"/>
                 <a:ea typeface="Microsoft JhengHei" panose="020B0604030504040204" pitchFamily="34" charset="-120"/>
@@ -10554,7 +10624,48 @@
               <a:t>先唸</a:t>
             </a:r>
             <a:r>
-              <a:rPr lang="en-US" altLang="zh-TW" sz="3200" b="1" i="0" dirty="0">
+              <a:rPr lang="en-US" altLang="zh-TW" sz="3200" i="0" dirty="0">
+                <a:effectLst/>
+                <a:latin typeface="Microsoft JhengHei" panose="020B0604030504040204" pitchFamily="34" charset="-120"/>
+                <a:ea typeface="Microsoft JhengHei" panose="020B0604030504040204" pitchFamily="34" charset="-120"/>
+              </a:rPr>
+              <a:t>, </a:t>
+            </a:r>
+            <a:r>
+              <a:rPr lang="en-US" altLang="zh-TW" sz="3200" b="1" dirty="0">
+                <a:solidFill>
+                  <a:srgbClr val="004D91"/>
+                </a:solidFill>
+                <a:effectLst/>
+                <a:latin typeface="Microsoft JhengHei" panose="020B0604030504040204" pitchFamily="34" charset="-120"/>
+                <a:ea typeface="Microsoft JhengHei" panose="020B0604030504040204" pitchFamily="34" charset="-120"/>
+              </a:rPr>
+              <a:t>“</a:t>
+            </a:r>
+            <a:r>
+              <a:rPr lang="zh-TW" altLang="en-US" sz="3200" b="1" dirty="0">
+                <a:solidFill>
+                  <a:srgbClr val="004D91"/>
+                </a:solidFill>
+                <a:effectLst/>
+                <a:latin typeface="Microsoft JhengHei" panose="020B0604030504040204" pitchFamily="34" charset="-120"/>
+                <a:ea typeface="Microsoft JhengHei" panose="020B0604030504040204" pitchFamily="34" charset="-120"/>
+              </a:rPr>
+              <a:t>奉主耶穌聖名禱告”</a:t>
+            </a:r>
+          </a:p>
+          <a:p>
+            <a:pPr algn="l"/>
+            <a:r>
+              <a:rPr lang="zh-TW" altLang="en-US" sz="3200" i="0" dirty="0">
+                <a:effectLst/>
+                <a:latin typeface="Microsoft JhengHei" panose="020B0604030504040204" pitchFamily="34" charset="-120"/>
+                <a:ea typeface="Microsoft JhengHei" panose="020B0604030504040204" pitchFamily="34" charset="-120"/>
+              </a:rPr>
+              <a:t>重複唸</a:t>
+            </a:r>
+            <a:r>
+              <a:rPr lang="en-US" altLang="zh-TW" sz="3200" i="0" dirty="0">
                 <a:effectLst/>
                 <a:latin typeface="Microsoft JhengHei" panose="020B0604030504040204" pitchFamily="34" charset="-120"/>
                 <a:ea typeface="Microsoft JhengHei" panose="020B0604030504040204" pitchFamily="34" charset="-120"/>
@@ -10581,47 +10692,6 @@
                 <a:latin typeface="Microsoft JhengHei" panose="020B0604030504040204" pitchFamily="34" charset="-120"/>
                 <a:ea typeface="Microsoft JhengHei" panose="020B0604030504040204" pitchFamily="34" charset="-120"/>
               </a:rPr>
-              <a:t>奉主耶穌聖名禱告”</a:t>
-            </a:r>
-          </a:p>
-          <a:p>
-            <a:pPr algn="l"/>
-            <a:r>
-              <a:rPr lang="zh-TW" altLang="en-US" sz="3200" b="1" i="0" dirty="0">
-                <a:effectLst/>
-                <a:latin typeface="Microsoft JhengHei" panose="020B0604030504040204" pitchFamily="34" charset="-120"/>
-                <a:ea typeface="Microsoft JhengHei" panose="020B0604030504040204" pitchFamily="34" charset="-120"/>
-              </a:rPr>
-              <a:t>重複唸</a:t>
-            </a:r>
-            <a:r>
-              <a:rPr lang="en-US" altLang="zh-TW" sz="3200" b="1" i="0" dirty="0">
-                <a:effectLst/>
-                <a:latin typeface="Microsoft JhengHei" panose="020B0604030504040204" pitchFamily="34" charset="-120"/>
-                <a:ea typeface="Microsoft JhengHei" panose="020B0604030504040204" pitchFamily="34" charset="-120"/>
-              </a:rPr>
-              <a:t>, </a:t>
-            </a:r>
-            <a:r>
-              <a:rPr lang="en-US" altLang="zh-TW" sz="3200" b="1" i="0" dirty="0">
-                <a:solidFill>
-                  <a:srgbClr val="004D91"/>
-                </a:solidFill>
-                <a:effectLst/>
-                <a:latin typeface="Microsoft JhengHei" panose="020B0604030504040204" pitchFamily="34" charset="-120"/>
-                <a:ea typeface="Microsoft JhengHei" panose="020B0604030504040204" pitchFamily="34" charset="-120"/>
-              </a:rPr>
-              <a:t>“</a:t>
-            </a:r>
-            <a:r>
-              <a:rPr lang="zh-TW" altLang="en-US" sz="3200" b="1" i="0" dirty="0">
-                <a:solidFill>
-                  <a:srgbClr val="004D91"/>
-                </a:solidFill>
-                <a:effectLst/>
-                <a:latin typeface="Microsoft JhengHei" panose="020B0604030504040204" pitchFamily="34" charset="-120"/>
-                <a:ea typeface="Microsoft JhengHei" panose="020B0604030504040204" pitchFamily="34" charset="-120"/>
-              </a:rPr>
               <a:t>哈利路亞</a:t>
             </a:r>
             <a:r>
@@ -10650,7 +10720,7 @@
           <a:p>
             <a:pPr algn="l"/>
             <a:r>
-              <a:rPr lang="zh-TW" altLang="en-US" sz="3200" b="1" i="0" dirty="0">
+              <a:rPr lang="zh-TW" altLang="en-US" sz="3200" i="0" dirty="0">
                 <a:effectLst/>
                 <a:latin typeface="Microsoft JhengHei" panose="020B0604030504040204" pitchFamily="34" charset="-120"/>
                 <a:ea typeface="Microsoft JhengHei" panose="020B0604030504040204" pitchFamily="34" charset="-120"/>
@@ -10658,7 +10728,7 @@
               <a:t>您也可以將您的需要告訴神</a:t>
             </a:r>
             <a:r>
-              <a:rPr lang="en-US" altLang="zh-TW" sz="3200" b="1" i="0" dirty="0">
+              <a:rPr lang="en-US" altLang="zh-TW" sz="3200" i="0" dirty="0">
                 <a:effectLst/>
                 <a:latin typeface="Microsoft JhengHei" panose="020B0604030504040204" pitchFamily="34" charset="-120"/>
                 <a:ea typeface="Microsoft JhengHei" panose="020B0604030504040204" pitchFamily="34" charset="-120"/>
@@ -10666,7 +10736,7 @@
               <a:t>, </a:t>
             </a:r>
             <a:r>
-              <a:rPr lang="zh-TW" altLang="en-US" sz="3200" b="1" i="0" dirty="0">
+              <a:rPr lang="zh-TW" altLang="en-US" sz="3200" i="0" dirty="0">
                 <a:effectLst/>
                 <a:latin typeface="Microsoft JhengHei" panose="020B0604030504040204" pitchFamily="34" charset="-120"/>
                 <a:ea typeface="Microsoft JhengHei" panose="020B0604030504040204" pitchFamily="34" charset="-120"/>
@@ -10677,7 +10747,7 @@
           <a:p>
             <a:pPr algn="l"/>
             <a:r>
-              <a:rPr lang="zh-TW" altLang="en-US" sz="3200" b="1" i="0" dirty="0">
+              <a:rPr lang="zh-TW" altLang="en-US" sz="3200" i="0" dirty="0">
                 <a:effectLst/>
                 <a:latin typeface="Microsoft JhengHei" panose="020B0604030504040204" pitchFamily="34" charset="-120"/>
                 <a:ea typeface="Microsoft JhengHei" panose="020B0604030504040204" pitchFamily="34" charset="-120"/>
@@ -10707,14 +10777,14 @@
               <a:t>!” </a:t>
             </a:r>
             <a:r>
-              <a:rPr lang="zh-TW" altLang="en-US" sz="3200" b="1" i="0" dirty="0">
+              <a:rPr lang="zh-TW" altLang="en-US" sz="3200" i="0" dirty="0">
                 <a:effectLst/>
                 <a:latin typeface="Microsoft JhengHei" panose="020B0604030504040204" pitchFamily="34" charset="-120"/>
                 <a:ea typeface="Microsoft JhengHei" panose="020B0604030504040204" pitchFamily="34" charset="-120"/>
               </a:rPr>
               <a:t>結束禱告</a:t>
             </a:r>
-            <a:endParaRPr lang="en-GB" sz="3200" b="1" i="0" dirty="0">
+            <a:endParaRPr lang="en-GB" sz="3200" i="0" dirty="0">
               <a:effectLst/>
               <a:latin typeface="Microsoft JhengHei" panose="020B0604030504040204" pitchFamily="34" charset="-120"/>
               <a:ea typeface="Microsoft JhengHei" panose="020B0604030504040204" pitchFamily="34" charset="-120"/>
@@ -10744,7 +10814,7 @@
           <a:prstGeom prst="line">
             <a:avLst/>
           </a:prstGeom>
-          <a:ln w="38100">
+          <a:ln w="19050">
             <a:solidFill>
               <a:schemeClr val="accent1">
                 <a:lumMod val="75000"/>
@@ -10769,10 +10839,10 @@
       </p:cxnSp>
       <p:grpSp>
         <p:nvGrpSpPr>
-          <p:cNvPr id="7" name="Group 6">
+          <p:cNvPr id="12" name="Group 11">
             <a:extLst>
               <a:ext uri="{FF2B5EF4-FFF2-40B4-BE49-F238E27FC236}">
-                <a16:creationId xmlns:a16="http://schemas.microsoft.com/office/drawing/2014/main" id="{72DC5880-BDED-92C0-586D-1160A0C3A6C1}"/>
+                <a16:creationId xmlns:a16="http://schemas.microsoft.com/office/drawing/2014/main" id="{9993B85C-7609-546F-2D6C-4BE5BCFD19BE}"/>
               </a:ext>
             </a:extLst>
           </p:cNvPr>
@@ -10781,18 +10851,110 @@
         </p:nvGrpSpPr>
         <p:grpSpPr>
           <a:xfrm>
-            <a:off x="5951984" y="6318094"/>
-            <a:ext cx="6130040" cy="381119"/>
-            <a:chOff x="5951984" y="6318094"/>
-            <a:chExt cx="6130040" cy="381119"/>
+            <a:off x="191344" y="6381328"/>
+            <a:ext cx="3312368" cy="276107"/>
+            <a:chOff x="3719736" y="328470"/>
+            <a:chExt cx="4754803" cy="396343"/>
+          </a:xfrm>
+        </p:grpSpPr>
+        <p:pic>
+          <p:nvPicPr>
+            <p:cNvPr id="16" name="Picture 15">
+              <a:extLst>
+                <a:ext uri="{FF2B5EF4-FFF2-40B4-BE49-F238E27FC236}">
+                  <a16:creationId xmlns:a16="http://schemas.microsoft.com/office/drawing/2014/main" id="{C57D1458-A84E-1BC4-77A5-0DDADFD44293}"/>
+                </a:ext>
+              </a:extLst>
+            </p:cNvPr>
+            <p:cNvPicPr>
+              <a:picLocks noChangeAspect="1"/>
+            </p:cNvPicPr>
+            <p:nvPr/>
+          </p:nvPicPr>
+          <p:blipFill>
+            <a:blip r:embed="rId3" cstate="print">
+              <a:extLst>
+                <a:ext uri="{28A0092B-C50C-407E-A947-70E740481C1C}">
+                  <a14:useLocalDpi xmlns:a14="http://schemas.microsoft.com/office/drawing/2010/main" val="0"/>
+                </a:ext>
+              </a:extLst>
+            </a:blip>
+            <a:stretch>
+              <a:fillRect/>
+            </a:stretch>
+          </p:blipFill>
+          <p:spPr>
+            <a:xfrm>
+              <a:off x="3719736" y="328470"/>
+              <a:ext cx="3030311" cy="392158"/>
+            </a:xfrm>
+            <a:prstGeom prst="rect">
+              <a:avLst/>
+            </a:prstGeom>
+          </p:spPr>
+        </p:pic>
+        <p:pic>
+          <p:nvPicPr>
+            <p:cNvPr id="17" name="Picture 16" descr="A blue text on a black background&#10;&#10;Description automatically generated with low confidence">
+              <a:extLst>
+                <a:ext uri="{FF2B5EF4-FFF2-40B4-BE49-F238E27FC236}">
+                  <a16:creationId xmlns:a16="http://schemas.microsoft.com/office/drawing/2014/main" id="{FD5E27C1-1E2D-D98E-B7FF-3096F1473D09}"/>
+                </a:ext>
+              </a:extLst>
+            </p:cNvPr>
+            <p:cNvPicPr>
+              <a:picLocks noChangeAspect="1"/>
+            </p:cNvPicPr>
+            <p:nvPr/>
+          </p:nvPicPr>
+          <p:blipFill rotWithShape="1">
+            <a:blip r:embed="rId4" cstate="print">
+              <a:extLst>
+                <a:ext uri="{28A0092B-C50C-407E-A947-70E740481C1C}">
+                  <a14:useLocalDpi xmlns:a14="http://schemas.microsoft.com/office/drawing/2010/main" val="0"/>
+                </a:ext>
+              </a:extLst>
+            </a:blip>
+            <a:srcRect l="28239" r="1"/>
+            <a:stretch/>
+          </p:blipFill>
+          <p:spPr>
+            <a:xfrm>
+              <a:off x="6816080" y="332656"/>
+              <a:ext cx="1658459" cy="392157"/>
+            </a:xfrm>
+            <a:prstGeom prst="rect">
+              <a:avLst/>
+            </a:prstGeom>
+          </p:spPr>
+        </p:pic>
+      </p:grpSp>
+      <p:grpSp>
+        <p:nvGrpSpPr>
+          <p:cNvPr id="9" name="Group 8">
+            <a:extLst>
+              <a:ext uri="{FF2B5EF4-FFF2-40B4-BE49-F238E27FC236}">
+                <a16:creationId xmlns:a16="http://schemas.microsoft.com/office/drawing/2014/main" id="{2CEC43C3-0008-9ABB-03CB-9D577B58A1E1}"/>
+              </a:ext>
+            </a:extLst>
+          </p:cNvPr>
+          <p:cNvGrpSpPr/>
+          <p:nvPr/>
+        </p:nvGrpSpPr>
+        <p:grpSpPr>
+          <a:xfrm>
+            <a:off x="5807968" y="6327364"/>
+            <a:ext cx="6264696" cy="381119"/>
+            <a:chOff x="5807968" y="6327364"/>
+            <a:chExt cx="6264696" cy="381119"/>
           </a:xfrm>
         </p:grpSpPr>
         <p:sp>
           <p:nvSpPr>
-            <p:cNvPr id="8" name="TextBox 7">
+            <p:cNvPr id="14" name="TextBox 13">
               <a:extLst>
                 <a:ext uri="{FF2B5EF4-FFF2-40B4-BE49-F238E27FC236}">
-                  <a16:creationId xmlns:a16="http://schemas.microsoft.com/office/drawing/2014/main" id="{6DCD3134-7024-047D-5EAB-0FBC0300B30E}"/>
+                  <a16:creationId xmlns:a16="http://schemas.microsoft.com/office/drawing/2014/main" id="{0520127B-7F44-CC98-7D2A-DBFCFE72FD31}"/>
                 </a:ext>
               </a:extLst>
             </p:cNvPr>
@@ -10801,8 +10963,8 @@
           </p:nvSpPr>
           <p:spPr>
             <a:xfrm>
-              <a:off x="5951984" y="6318094"/>
-              <a:ext cx="6130040" cy="381119"/>
+              <a:off x="5807968" y="6327364"/>
+              <a:ext cx="6264696" cy="381119"/>
             </a:xfrm>
             <a:prstGeom prst="roundRect">
               <a:avLst>
@@ -10823,18 +10985,18 @@
             <a:lstStyle/>
             <a:p>
               <a:r>
-                <a:rPr lang="en-GB" sz="1600" b="1" dirty="0">
+                <a:rPr lang="en-GB" sz="1600" dirty="0">
                   <a:solidFill>
                     <a:schemeClr val="bg1"/>
                   </a:solidFill>
-                  <a:latin typeface="Source Sans Pro" panose="020B0503030403020204" pitchFamily="34" charset="0"/>
-                  <a:ea typeface="Source Sans Pro" panose="020B0503030403020204" pitchFamily="34" charset="0"/>
+                  <a:latin typeface="Roboto" panose="02000000000000000000" pitchFamily="2" charset="0"/>
+                  <a:ea typeface="Roboto" panose="02000000000000000000" pitchFamily="2" charset="0"/>
                   <a:cs typeface="Segoe UI Semibold" panose="020B0702040204020203" pitchFamily="34" charset="0"/>
                 </a:rPr>
                 <a:t>Please Turn Off/Silence Your Devices </a:t>
               </a:r>
               <a:r>
-                <a:rPr lang="zh-TW" altLang="en-US" sz="1600" b="1" dirty="0">
+                <a:rPr lang="zh-TW" altLang="en-US" sz="1600" dirty="0">
                   <a:solidFill>
                     <a:schemeClr val="bg1"/>
                   </a:solidFill>
@@ -10843,7 +11005,7 @@
                 </a:rPr>
                 <a:t>請靜音或關閉所有電子設備</a:t>
               </a:r>
-              <a:endParaRPr lang="ja-JP" altLang="en-US" sz="1600" b="1" dirty="0">
+              <a:endParaRPr lang="ja-JP" altLang="en-US" sz="1600" dirty="0">
                 <a:solidFill>
                   <a:schemeClr val="bg1"/>
                 </a:solidFill>
@@ -10855,10 +11017,10 @@
         </p:sp>
         <p:pic>
           <p:nvPicPr>
-            <p:cNvPr id="10" name="Picture 9" descr="Shape&#10;&#10;Description automatically generated with low confidence">
+            <p:cNvPr id="15" name="Picture 14" descr="Shape&#10;&#10;Description automatically generated with low confidence">
               <a:extLst>
                 <a:ext uri="{FF2B5EF4-FFF2-40B4-BE49-F238E27FC236}">
-                  <a16:creationId xmlns:a16="http://schemas.microsoft.com/office/drawing/2014/main" id="{65957422-7A97-498E-9DEE-5954AFEE2526}"/>
+                  <a16:creationId xmlns:a16="http://schemas.microsoft.com/office/drawing/2014/main" id="{27D35DFB-481C-870F-CFBD-85D61BC88AB0}"/>
                 </a:ext>
               </a:extLst>
             </p:cNvPr>
@@ -10868,12 +11030,12 @@
             <p:nvPr/>
           </p:nvPicPr>
           <p:blipFill>
-            <a:blip r:embed="rId3" cstate="print">
+            <a:blip r:embed="rId5" cstate="print">
               <a:lum bright="70000" contrast="-70000"/>
               <a:extLst>
                 <a:ext uri="{BEBA8EAE-BF5A-486C-A8C5-ECC9F3942E4B}">
                   <a14:imgProps xmlns:a14="http://schemas.microsoft.com/office/drawing/2010/main">
-                    <a14:imgLayer r:embed="rId4">
+                    <a14:imgLayer r:embed="rId6">
                       <a14:imgEffect>
                         <a14:artisticPhotocopy/>
                       </a14:imgEffect>
@@ -10909,98 +11071,6 @@
             <a:solidFill>
               <a:srgbClr val="004B8D"/>
             </a:solidFill>
-          </p:spPr>
-        </p:pic>
-      </p:grpSp>
-      <p:grpSp>
-        <p:nvGrpSpPr>
-          <p:cNvPr id="12" name="Group 11">
-            <a:extLst>
-              <a:ext uri="{FF2B5EF4-FFF2-40B4-BE49-F238E27FC236}">
-                <a16:creationId xmlns:a16="http://schemas.microsoft.com/office/drawing/2014/main" id="{9993B85C-7609-546F-2D6C-4BE5BCFD19BE}"/>
-              </a:ext>
-            </a:extLst>
-          </p:cNvPr>
-          <p:cNvGrpSpPr/>
-          <p:nvPr/>
-        </p:nvGrpSpPr>
-        <p:grpSpPr>
-          <a:xfrm>
-            <a:off x="191344" y="6381328"/>
-            <a:ext cx="3312368" cy="276107"/>
-            <a:chOff x="3719736" y="328470"/>
-            <a:chExt cx="4754803" cy="396343"/>
-          </a:xfrm>
-        </p:grpSpPr>
-        <p:pic>
-          <p:nvPicPr>
-            <p:cNvPr id="16" name="Picture 15">
-              <a:extLst>
-                <a:ext uri="{FF2B5EF4-FFF2-40B4-BE49-F238E27FC236}">
-                  <a16:creationId xmlns:a16="http://schemas.microsoft.com/office/drawing/2014/main" id="{C57D1458-A84E-1BC4-77A5-0DDADFD44293}"/>
-                </a:ext>
-              </a:extLst>
-            </p:cNvPr>
-            <p:cNvPicPr>
-              <a:picLocks noChangeAspect="1"/>
-            </p:cNvPicPr>
-            <p:nvPr/>
-          </p:nvPicPr>
-          <p:blipFill>
-            <a:blip r:embed="rId5" cstate="print">
-              <a:extLst>
-                <a:ext uri="{28A0092B-C50C-407E-A947-70E740481C1C}">
-                  <a14:useLocalDpi xmlns:a14="http://schemas.microsoft.com/office/drawing/2010/main" val="0"/>
-                </a:ext>
-              </a:extLst>
-            </a:blip>
-            <a:stretch>
-              <a:fillRect/>
-            </a:stretch>
-          </p:blipFill>
-          <p:spPr>
-            <a:xfrm>
-              <a:off x="3719736" y="328470"/>
-              <a:ext cx="3030311" cy="392158"/>
-            </a:xfrm>
-            <a:prstGeom prst="rect">
-              <a:avLst/>
-            </a:prstGeom>
-          </p:spPr>
-        </p:pic>
-        <p:pic>
-          <p:nvPicPr>
-            <p:cNvPr id="17" name="Picture 16" descr="A blue text on a black background&#10;&#10;Description automatically generated with low confidence">
-              <a:extLst>
-                <a:ext uri="{FF2B5EF4-FFF2-40B4-BE49-F238E27FC236}">
-                  <a16:creationId xmlns:a16="http://schemas.microsoft.com/office/drawing/2014/main" id="{FD5E27C1-1E2D-D98E-B7FF-3096F1473D09}"/>
-                </a:ext>
-              </a:extLst>
-            </p:cNvPr>
-            <p:cNvPicPr>
-              <a:picLocks noChangeAspect="1"/>
-            </p:cNvPicPr>
-            <p:nvPr/>
-          </p:nvPicPr>
-          <p:blipFill rotWithShape="1">
-            <a:blip r:embed="rId6" cstate="print">
-              <a:extLst>
-                <a:ext uri="{28A0092B-C50C-407E-A947-70E740481C1C}">
-                  <a14:useLocalDpi xmlns:a14="http://schemas.microsoft.com/office/drawing/2010/main" val="0"/>
-                </a:ext>
-              </a:extLst>
-            </a:blip>
-            <a:srcRect l="28239" r="1"/>
-            <a:stretch/>
-          </p:blipFill>
-          <p:spPr>
-            <a:xfrm>
-              <a:off x="6816080" y="332656"/>
-              <a:ext cx="1658459" cy="392157"/>
-            </a:xfrm>
-            <a:prstGeom prst="rect">
-              <a:avLst/>
-            </a:prstGeom>
           </p:spPr>
         </p:pic>
       </p:grpSp>

</xml_diff>